<commit_message>
2014 05 13 09:00
edição as app
</commit_message>
<xml_diff>
--- a/SAS/Planejamento/Docs/#3 - Apresentação do projeto.pptx
+++ b/SAS/Planejamento/Docs/#3 - Apresentação do projeto.pptx
@@ -1615,6 +1615,753 @@
 </file>
 
 <file path=ppt/diagrams/colors3.xml><?xml version="1.0" encoding="utf-8"?>
+<dgm:colorsDef xmlns:dgm="http://schemas.openxmlformats.org/drawingml/2006/diagram" xmlns:a="http://schemas.openxmlformats.org/drawingml/2006/main" uniqueId="urn:microsoft.com/office/officeart/2005/8/colors/accent1_2">
+  <dgm:title val=""/>
+  <dgm:desc val=""/>
+  <dgm:catLst>
+    <dgm:cat type="accent1" pri="11200"/>
+  </dgm:catLst>
+  <dgm:styleLbl name="node0">
+    <dgm:fillClrLst meth="repeat">
+      <a:schemeClr val="accent1"/>
+    </dgm:fillClrLst>
+    <dgm:linClrLst meth="repeat">
+      <a:schemeClr val="lt1"/>
+    </dgm:linClrLst>
+    <dgm:effectClrLst/>
+    <dgm:txLinClrLst/>
+    <dgm:txFillClrLst/>
+    <dgm:txEffectClrLst/>
+  </dgm:styleLbl>
+  <dgm:styleLbl name="alignNode1">
+    <dgm:fillClrLst meth="repeat">
+      <a:schemeClr val="accent1"/>
+    </dgm:fillClrLst>
+    <dgm:linClrLst meth="repeat">
+      <a:schemeClr val="accent1"/>
+    </dgm:linClrLst>
+    <dgm:effectClrLst/>
+    <dgm:txLinClrLst/>
+    <dgm:txFillClrLst/>
+    <dgm:txEffectClrLst/>
+  </dgm:styleLbl>
+  <dgm:styleLbl name="node1">
+    <dgm:fillClrLst meth="repeat">
+      <a:schemeClr val="accent1"/>
+    </dgm:fillClrLst>
+    <dgm:linClrLst meth="repeat">
+      <a:schemeClr val="lt1"/>
+    </dgm:linClrLst>
+    <dgm:effectClrLst/>
+    <dgm:txLinClrLst/>
+    <dgm:txFillClrLst/>
+    <dgm:txEffectClrLst/>
+  </dgm:styleLbl>
+  <dgm:styleLbl name="lnNode1">
+    <dgm:fillClrLst meth="repeat">
+      <a:schemeClr val="accent1"/>
+    </dgm:fillClrLst>
+    <dgm:linClrLst meth="repeat">
+      <a:schemeClr val="lt1"/>
+    </dgm:linClrLst>
+    <dgm:effectClrLst/>
+    <dgm:txLinClrLst/>
+    <dgm:txFillClrLst/>
+    <dgm:txEffectClrLst/>
+  </dgm:styleLbl>
+  <dgm:styleLbl name="vennNode1">
+    <dgm:fillClrLst meth="repeat">
+      <a:schemeClr val="accent1">
+        <a:alpha val="50000"/>
+      </a:schemeClr>
+    </dgm:fillClrLst>
+    <dgm:linClrLst meth="repeat">
+      <a:schemeClr val="lt1"/>
+    </dgm:linClrLst>
+    <dgm:effectClrLst/>
+    <dgm:txLinClrLst/>
+    <dgm:txFillClrLst/>
+    <dgm:txEffectClrLst/>
+  </dgm:styleLbl>
+  <dgm:styleLbl name="node2">
+    <dgm:fillClrLst meth="repeat">
+      <a:schemeClr val="accent1"/>
+    </dgm:fillClrLst>
+    <dgm:linClrLst meth="repeat">
+      <a:schemeClr val="lt1"/>
+    </dgm:linClrLst>
+    <dgm:effectClrLst/>
+    <dgm:txLinClrLst/>
+    <dgm:txFillClrLst/>
+    <dgm:txEffectClrLst/>
+  </dgm:styleLbl>
+  <dgm:styleLbl name="node3">
+    <dgm:fillClrLst meth="repeat">
+      <a:schemeClr val="accent1"/>
+    </dgm:fillClrLst>
+    <dgm:linClrLst meth="repeat">
+      <a:schemeClr val="lt1"/>
+    </dgm:linClrLst>
+    <dgm:effectClrLst/>
+    <dgm:txLinClrLst/>
+    <dgm:txFillClrLst/>
+    <dgm:txEffectClrLst/>
+  </dgm:styleLbl>
+  <dgm:styleLbl name="node4">
+    <dgm:fillClrLst meth="repeat">
+      <a:schemeClr val="accent1"/>
+    </dgm:fillClrLst>
+    <dgm:linClrLst meth="repeat">
+      <a:schemeClr val="lt1"/>
+    </dgm:linClrLst>
+    <dgm:effectClrLst/>
+    <dgm:txLinClrLst/>
+    <dgm:txFillClrLst/>
+    <dgm:txEffectClrLst/>
+  </dgm:styleLbl>
+  <dgm:styleLbl name="fgImgPlace1">
+    <dgm:fillClrLst meth="repeat">
+      <a:schemeClr val="accent1">
+        <a:tint val="50000"/>
+      </a:schemeClr>
+    </dgm:fillClrLst>
+    <dgm:linClrLst meth="repeat">
+      <a:schemeClr val="lt1"/>
+    </dgm:linClrLst>
+    <dgm:effectClrLst/>
+    <dgm:txLinClrLst/>
+    <dgm:txFillClrLst meth="repeat">
+      <a:schemeClr val="lt1"/>
+    </dgm:txFillClrLst>
+    <dgm:txEffectClrLst/>
+  </dgm:styleLbl>
+  <dgm:styleLbl name="alignImgPlace1">
+    <dgm:fillClrLst meth="repeat">
+      <a:schemeClr val="accent1">
+        <a:tint val="50000"/>
+      </a:schemeClr>
+    </dgm:fillClrLst>
+    <dgm:linClrLst meth="repeat">
+      <a:schemeClr val="lt1"/>
+    </dgm:linClrLst>
+    <dgm:effectClrLst/>
+    <dgm:txLinClrLst/>
+    <dgm:txFillClrLst meth="repeat">
+      <a:schemeClr val="lt1"/>
+    </dgm:txFillClrLst>
+    <dgm:txEffectClrLst/>
+  </dgm:styleLbl>
+  <dgm:styleLbl name="bgImgPlace1">
+    <dgm:fillClrLst meth="repeat">
+      <a:schemeClr val="accent1">
+        <a:tint val="50000"/>
+      </a:schemeClr>
+    </dgm:fillClrLst>
+    <dgm:linClrLst meth="repeat">
+      <a:schemeClr val="lt1"/>
+    </dgm:linClrLst>
+    <dgm:effectClrLst/>
+    <dgm:txLinClrLst/>
+    <dgm:txFillClrLst meth="repeat">
+      <a:schemeClr val="lt1"/>
+    </dgm:txFillClrLst>
+    <dgm:txEffectClrLst/>
+  </dgm:styleLbl>
+  <dgm:styleLbl name="sibTrans2D1">
+    <dgm:fillClrLst meth="repeat">
+      <a:schemeClr val="accent1">
+        <a:tint val="60000"/>
+      </a:schemeClr>
+    </dgm:fillClrLst>
+    <dgm:linClrLst meth="repeat">
+      <a:schemeClr val="accent1">
+        <a:tint val="60000"/>
+      </a:schemeClr>
+    </dgm:linClrLst>
+    <dgm:effectClrLst/>
+    <dgm:txLinClrLst/>
+    <dgm:txFillClrLst/>
+    <dgm:txEffectClrLst/>
+  </dgm:styleLbl>
+  <dgm:styleLbl name="fgSibTrans2D1">
+    <dgm:fillClrLst meth="repeat">
+      <a:schemeClr val="accent1">
+        <a:tint val="60000"/>
+      </a:schemeClr>
+    </dgm:fillClrLst>
+    <dgm:linClrLst meth="repeat">
+      <a:schemeClr val="accent1">
+        <a:tint val="60000"/>
+      </a:schemeClr>
+    </dgm:linClrLst>
+    <dgm:effectClrLst/>
+    <dgm:txLinClrLst/>
+    <dgm:txFillClrLst/>
+    <dgm:txEffectClrLst/>
+  </dgm:styleLbl>
+  <dgm:styleLbl name="bgSibTrans2D1">
+    <dgm:fillClrLst meth="repeat">
+      <a:schemeClr val="accent1">
+        <a:tint val="60000"/>
+      </a:schemeClr>
+    </dgm:fillClrLst>
+    <dgm:linClrLst meth="repeat">
+      <a:schemeClr val="accent1">
+        <a:tint val="60000"/>
+      </a:schemeClr>
+    </dgm:linClrLst>
+    <dgm:effectClrLst/>
+    <dgm:txLinClrLst/>
+    <dgm:txFillClrLst/>
+    <dgm:txEffectClrLst/>
+  </dgm:styleLbl>
+  <dgm:styleLbl name="sibTrans1D1">
+    <dgm:fillClrLst meth="repeat">
+      <a:schemeClr val="accent1"/>
+    </dgm:fillClrLst>
+    <dgm:linClrLst meth="repeat">
+      <a:schemeClr val="accent1"/>
+    </dgm:linClrLst>
+    <dgm:effectClrLst/>
+    <dgm:txLinClrLst/>
+    <dgm:txFillClrLst meth="repeat">
+      <a:schemeClr val="tx1"/>
+    </dgm:txFillClrLst>
+    <dgm:txEffectClrLst/>
+  </dgm:styleLbl>
+  <dgm:styleLbl name="callout">
+    <dgm:fillClrLst meth="repeat">
+      <a:schemeClr val="accent1"/>
+    </dgm:fillClrLst>
+    <dgm:linClrLst meth="repeat">
+      <a:schemeClr val="accent1">
+        <a:tint val="50000"/>
+      </a:schemeClr>
+    </dgm:linClrLst>
+    <dgm:effectClrLst/>
+    <dgm:txLinClrLst/>
+    <dgm:txFillClrLst meth="repeat">
+      <a:schemeClr val="tx1"/>
+    </dgm:txFillClrLst>
+    <dgm:txEffectClrLst/>
+  </dgm:styleLbl>
+  <dgm:styleLbl name="asst0">
+    <dgm:fillClrLst meth="repeat">
+      <a:schemeClr val="accent1"/>
+    </dgm:fillClrLst>
+    <dgm:linClrLst meth="repeat">
+      <a:schemeClr val="lt1"/>
+    </dgm:linClrLst>
+    <dgm:effectClrLst/>
+    <dgm:txLinClrLst/>
+    <dgm:txFillClrLst/>
+    <dgm:txEffectClrLst/>
+  </dgm:styleLbl>
+  <dgm:styleLbl name="asst1">
+    <dgm:fillClrLst meth="repeat">
+      <a:schemeClr val="accent1"/>
+    </dgm:fillClrLst>
+    <dgm:linClrLst meth="repeat">
+      <a:schemeClr val="lt1"/>
+    </dgm:linClrLst>
+    <dgm:effectClrLst/>
+    <dgm:txLinClrLst/>
+    <dgm:txFillClrLst/>
+    <dgm:txEffectClrLst/>
+  </dgm:styleLbl>
+  <dgm:styleLbl name="asst2">
+    <dgm:fillClrLst meth="repeat">
+      <a:schemeClr val="accent1"/>
+    </dgm:fillClrLst>
+    <dgm:linClrLst meth="repeat">
+      <a:schemeClr val="lt1"/>
+    </dgm:linClrLst>
+    <dgm:effectClrLst/>
+    <dgm:txLinClrLst/>
+    <dgm:txFillClrLst/>
+    <dgm:txEffectClrLst/>
+  </dgm:styleLbl>
+  <dgm:styleLbl name="asst3">
+    <dgm:fillClrLst meth="repeat">
+      <a:schemeClr val="accent1"/>
+    </dgm:fillClrLst>
+    <dgm:linClrLst meth="repeat">
+      <a:schemeClr val="lt1"/>
+    </dgm:linClrLst>
+    <dgm:effectClrLst/>
+    <dgm:txLinClrLst/>
+    <dgm:txFillClrLst/>
+    <dgm:txEffectClrLst/>
+  </dgm:styleLbl>
+  <dgm:styleLbl name="asst4">
+    <dgm:fillClrLst meth="repeat">
+      <a:schemeClr val="accent1"/>
+    </dgm:fillClrLst>
+    <dgm:linClrLst meth="repeat">
+      <a:schemeClr val="lt1"/>
+    </dgm:linClrLst>
+    <dgm:effectClrLst/>
+    <dgm:txLinClrLst/>
+    <dgm:txFillClrLst/>
+    <dgm:txEffectClrLst/>
+  </dgm:styleLbl>
+  <dgm:styleLbl name="parChTrans2D1">
+    <dgm:fillClrLst meth="repeat">
+      <a:schemeClr val="accent1">
+        <a:tint val="60000"/>
+      </a:schemeClr>
+    </dgm:fillClrLst>
+    <dgm:linClrLst meth="repeat">
+      <a:schemeClr val="accent1">
+        <a:tint val="60000"/>
+      </a:schemeClr>
+    </dgm:linClrLst>
+    <dgm:effectClrLst/>
+    <dgm:txLinClrLst/>
+    <dgm:txFillClrLst meth="repeat">
+      <a:schemeClr val="lt1"/>
+    </dgm:txFillClrLst>
+    <dgm:txEffectClrLst/>
+  </dgm:styleLbl>
+  <dgm:styleLbl name="parChTrans2D2">
+    <dgm:fillClrLst meth="repeat">
+      <a:schemeClr val="accent1"/>
+    </dgm:fillClrLst>
+    <dgm:linClrLst meth="repeat">
+      <a:schemeClr val="accent1"/>
+    </dgm:linClrLst>
+    <dgm:effectClrLst/>
+    <dgm:txLinClrLst/>
+    <dgm:txFillClrLst meth="repeat">
+      <a:schemeClr val="lt1"/>
+    </dgm:txFillClrLst>
+    <dgm:txEffectClrLst/>
+  </dgm:styleLbl>
+  <dgm:styleLbl name="parChTrans2D3">
+    <dgm:fillClrLst meth="repeat">
+      <a:schemeClr val="accent1"/>
+    </dgm:fillClrLst>
+    <dgm:linClrLst meth="repeat">
+      <a:schemeClr val="accent1"/>
+    </dgm:linClrLst>
+    <dgm:effectClrLst/>
+    <dgm:txLinClrLst/>
+    <dgm:txFillClrLst meth="repeat">
+      <a:schemeClr val="lt1"/>
+    </dgm:txFillClrLst>
+    <dgm:txEffectClrLst/>
+  </dgm:styleLbl>
+  <dgm:styleLbl name="parChTrans2D4">
+    <dgm:fillClrLst meth="repeat">
+      <a:schemeClr val="accent1"/>
+    </dgm:fillClrLst>
+    <dgm:linClrLst meth="repeat">
+      <a:schemeClr val="accent1"/>
+    </dgm:linClrLst>
+    <dgm:effectClrLst/>
+    <dgm:txLinClrLst/>
+    <dgm:txFillClrLst meth="repeat">
+      <a:schemeClr val="lt1"/>
+    </dgm:txFillClrLst>
+    <dgm:txEffectClrLst/>
+  </dgm:styleLbl>
+  <dgm:styleLbl name="parChTrans1D1">
+    <dgm:fillClrLst meth="repeat">
+      <a:schemeClr val="accent1"/>
+    </dgm:fillClrLst>
+    <dgm:linClrLst meth="repeat">
+      <a:schemeClr val="accent1">
+        <a:shade val="60000"/>
+      </a:schemeClr>
+    </dgm:linClrLst>
+    <dgm:effectClrLst/>
+    <dgm:txLinClrLst/>
+    <dgm:txFillClrLst meth="repeat">
+      <a:schemeClr val="tx1"/>
+    </dgm:txFillClrLst>
+    <dgm:txEffectClrLst/>
+  </dgm:styleLbl>
+  <dgm:styleLbl name="parChTrans1D2">
+    <dgm:fillClrLst meth="repeat">
+      <a:schemeClr val="accent1"/>
+    </dgm:fillClrLst>
+    <dgm:linClrLst meth="repeat">
+      <a:schemeClr val="accent1">
+        <a:shade val="60000"/>
+      </a:schemeClr>
+    </dgm:linClrLst>
+    <dgm:effectClrLst/>
+    <dgm:txLinClrLst/>
+    <dgm:txFillClrLst meth="repeat">
+      <a:schemeClr val="tx1"/>
+    </dgm:txFillClrLst>
+    <dgm:txEffectClrLst/>
+  </dgm:styleLbl>
+  <dgm:styleLbl name="parChTrans1D3">
+    <dgm:fillClrLst meth="repeat">
+      <a:schemeClr val="accent1"/>
+    </dgm:fillClrLst>
+    <dgm:linClrLst meth="repeat">
+      <a:schemeClr val="accent1">
+        <a:shade val="80000"/>
+      </a:schemeClr>
+    </dgm:linClrLst>
+    <dgm:effectClrLst/>
+    <dgm:txLinClrLst/>
+    <dgm:txFillClrLst meth="repeat">
+      <a:schemeClr val="tx1"/>
+    </dgm:txFillClrLst>
+    <dgm:txEffectClrLst/>
+  </dgm:styleLbl>
+  <dgm:styleLbl name="parChTrans1D4">
+    <dgm:fillClrLst meth="repeat">
+      <a:schemeClr val="accent1"/>
+    </dgm:fillClrLst>
+    <dgm:linClrLst meth="repeat">
+      <a:schemeClr val="accent1">
+        <a:shade val="80000"/>
+      </a:schemeClr>
+    </dgm:linClrLst>
+    <dgm:effectClrLst/>
+    <dgm:txLinClrLst/>
+    <dgm:txFillClrLst meth="repeat">
+      <a:schemeClr val="tx1"/>
+    </dgm:txFillClrLst>
+    <dgm:txEffectClrLst/>
+  </dgm:styleLbl>
+  <dgm:styleLbl name="fgAcc1">
+    <dgm:fillClrLst meth="repeat">
+      <a:schemeClr val="lt1">
+        <a:alpha val="90000"/>
+      </a:schemeClr>
+    </dgm:fillClrLst>
+    <dgm:linClrLst meth="repeat">
+      <a:schemeClr val="accent1"/>
+    </dgm:linClrLst>
+    <dgm:effectClrLst/>
+    <dgm:txLinClrLst/>
+    <dgm:txFillClrLst meth="repeat">
+      <a:schemeClr val="dk1"/>
+    </dgm:txFillClrLst>
+    <dgm:txEffectClrLst/>
+  </dgm:styleLbl>
+  <dgm:styleLbl name="conFgAcc1">
+    <dgm:fillClrLst meth="repeat">
+      <a:schemeClr val="lt1">
+        <a:alpha val="90000"/>
+      </a:schemeClr>
+    </dgm:fillClrLst>
+    <dgm:linClrLst meth="repeat">
+      <a:schemeClr val="accent1"/>
+    </dgm:linClrLst>
+    <dgm:effectClrLst/>
+    <dgm:txLinClrLst/>
+    <dgm:txFillClrLst meth="repeat">
+      <a:schemeClr val="dk1"/>
+    </dgm:txFillClrLst>
+    <dgm:txEffectClrLst/>
+  </dgm:styleLbl>
+  <dgm:styleLbl name="alignAcc1">
+    <dgm:fillClrLst meth="repeat">
+      <a:schemeClr val="lt1">
+        <a:alpha val="90000"/>
+      </a:schemeClr>
+    </dgm:fillClrLst>
+    <dgm:linClrLst meth="repeat">
+      <a:schemeClr val="accent1"/>
+    </dgm:linClrLst>
+    <dgm:effectClrLst/>
+    <dgm:txLinClrLst/>
+    <dgm:txFillClrLst meth="repeat">
+      <a:schemeClr val="dk1"/>
+    </dgm:txFillClrLst>
+    <dgm:txEffectClrLst/>
+  </dgm:styleLbl>
+  <dgm:styleLbl name="trAlignAcc1">
+    <dgm:fillClrLst meth="repeat">
+      <a:schemeClr val="lt1">
+        <a:alpha val="40000"/>
+      </a:schemeClr>
+    </dgm:fillClrLst>
+    <dgm:linClrLst meth="repeat">
+      <a:schemeClr val="accent1"/>
+    </dgm:linClrLst>
+    <dgm:effectClrLst/>
+    <dgm:txLinClrLst/>
+    <dgm:txFillClrLst meth="repeat">
+      <a:schemeClr val="dk1"/>
+    </dgm:txFillClrLst>
+    <dgm:txEffectClrLst/>
+  </dgm:styleLbl>
+  <dgm:styleLbl name="bgAcc1">
+    <dgm:fillClrLst meth="repeat">
+      <a:schemeClr val="lt1">
+        <a:alpha val="90000"/>
+      </a:schemeClr>
+    </dgm:fillClrLst>
+    <dgm:linClrLst meth="repeat">
+      <a:schemeClr val="accent1"/>
+    </dgm:linClrLst>
+    <dgm:effectClrLst/>
+    <dgm:txLinClrLst/>
+    <dgm:txFillClrLst meth="repeat">
+      <a:schemeClr val="dk1"/>
+    </dgm:txFillClrLst>
+    <dgm:txEffectClrLst/>
+  </dgm:styleLbl>
+  <dgm:styleLbl name="solidFgAcc1">
+    <dgm:fillClrLst meth="repeat">
+      <a:schemeClr val="lt1"/>
+    </dgm:fillClrLst>
+    <dgm:linClrLst meth="repeat">
+      <a:schemeClr val="accent1"/>
+    </dgm:linClrLst>
+    <dgm:effectClrLst/>
+    <dgm:txLinClrLst/>
+    <dgm:txFillClrLst meth="repeat">
+      <a:schemeClr val="dk1"/>
+    </dgm:txFillClrLst>
+    <dgm:txEffectClrLst/>
+  </dgm:styleLbl>
+  <dgm:styleLbl name="solidAlignAcc1">
+    <dgm:fillClrLst meth="repeat">
+      <a:schemeClr val="lt1"/>
+    </dgm:fillClrLst>
+    <dgm:linClrLst meth="repeat">
+      <a:schemeClr val="accent1"/>
+    </dgm:linClrLst>
+    <dgm:effectClrLst/>
+    <dgm:txLinClrLst/>
+    <dgm:txFillClrLst meth="repeat">
+      <a:schemeClr val="dk1"/>
+    </dgm:txFillClrLst>
+    <dgm:txEffectClrLst/>
+  </dgm:styleLbl>
+  <dgm:styleLbl name="solidBgAcc1">
+    <dgm:fillClrLst meth="repeat">
+      <a:schemeClr val="lt1"/>
+    </dgm:fillClrLst>
+    <dgm:linClrLst meth="repeat">
+      <a:schemeClr val="accent1"/>
+    </dgm:linClrLst>
+    <dgm:effectClrLst/>
+    <dgm:txLinClrLst/>
+    <dgm:txFillClrLst meth="repeat">
+      <a:schemeClr val="dk1"/>
+    </dgm:txFillClrLst>
+    <dgm:txEffectClrLst/>
+  </dgm:styleLbl>
+  <dgm:styleLbl name="fgAccFollowNode1">
+    <dgm:fillClrLst meth="repeat">
+      <a:schemeClr val="accent1">
+        <a:alpha val="90000"/>
+        <a:tint val="40000"/>
+      </a:schemeClr>
+    </dgm:fillClrLst>
+    <dgm:linClrLst meth="repeat">
+      <a:schemeClr val="accent1">
+        <a:alpha val="90000"/>
+        <a:tint val="40000"/>
+      </a:schemeClr>
+    </dgm:linClrLst>
+    <dgm:effectClrLst/>
+    <dgm:txLinClrLst/>
+    <dgm:txFillClrLst meth="repeat">
+      <a:schemeClr val="dk1"/>
+    </dgm:txFillClrLst>
+    <dgm:txEffectClrLst/>
+  </dgm:styleLbl>
+  <dgm:styleLbl name="alignAccFollowNode1">
+    <dgm:fillClrLst meth="repeat">
+      <a:schemeClr val="accent1">
+        <a:alpha val="90000"/>
+        <a:tint val="40000"/>
+      </a:schemeClr>
+    </dgm:fillClrLst>
+    <dgm:linClrLst meth="repeat">
+      <a:schemeClr val="accent1">
+        <a:alpha val="90000"/>
+        <a:tint val="40000"/>
+      </a:schemeClr>
+    </dgm:linClrLst>
+    <dgm:effectClrLst/>
+    <dgm:txLinClrLst/>
+    <dgm:txFillClrLst meth="repeat">
+      <a:schemeClr val="dk1"/>
+    </dgm:txFillClrLst>
+    <dgm:txEffectClrLst/>
+  </dgm:styleLbl>
+  <dgm:styleLbl name="bgAccFollowNode1">
+    <dgm:fillClrLst meth="repeat">
+      <a:schemeClr val="accent1">
+        <a:alpha val="90000"/>
+        <a:tint val="40000"/>
+      </a:schemeClr>
+    </dgm:fillClrLst>
+    <dgm:linClrLst meth="repeat">
+      <a:schemeClr val="accent1">
+        <a:alpha val="90000"/>
+        <a:tint val="40000"/>
+      </a:schemeClr>
+    </dgm:linClrLst>
+    <dgm:effectClrLst/>
+    <dgm:txLinClrLst/>
+    <dgm:txFillClrLst meth="repeat">
+      <a:schemeClr val="dk1"/>
+    </dgm:txFillClrLst>
+    <dgm:txEffectClrLst/>
+  </dgm:styleLbl>
+  <dgm:styleLbl name="fgAcc0">
+    <dgm:fillClrLst meth="repeat">
+      <a:schemeClr val="lt1">
+        <a:alpha val="90000"/>
+      </a:schemeClr>
+    </dgm:fillClrLst>
+    <dgm:linClrLst meth="repeat">
+      <a:schemeClr val="accent1"/>
+    </dgm:linClrLst>
+    <dgm:effectClrLst/>
+    <dgm:txLinClrLst/>
+    <dgm:txFillClrLst meth="repeat">
+      <a:schemeClr val="dk1"/>
+    </dgm:txFillClrLst>
+    <dgm:txEffectClrLst/>
+  </dgm:styleLbl>
+  <dgm:styleLbl name="fgAcc2">
+    <dgm:fillClrLst meth="repeat">
+      <a:schemeClr val="lt1">
+        <a:alpha val="90000"/>
+      </a:schemeClr>
+    </dgm:fillClrLst>
+    <dgm:linClrLst meth="repeat">
+      <a:schemeClr val="accent1"/>
+    </dgm:linClrLst>
+    <dgm:effectClrLst/>
+    <dgm:txLinClrLst/>
+    <dgm:txFillClrLst meth="repeat">
+      <a:schemeClr val="dk1"/>
+    </dgm:txFillClrLst>
+    <dgm:txEffectClrLst/>
+  </dgm:styleLbl>
+  <dgm:styleLbl name="fgAcc3">
+    <dgm:fillClrLst meth="repeat">
+      <a:schemeClr val="lt1">
+        <a:alpha val="90000"/>
+      </a:schemeClr>
+    </dgm:fillClrLst>
+    <dgm:linClrLst meth="repeat">
+      <a:schemeClr val="accent1"/>
+    </dgm:linClrLst>
+    <dgm:effectClrLst/>
+    <dgm:txLinClrLst/>
+    <dgm:txFillClrLst meth="repeat">
+      <a:schemeClr val="dk1"/>
+    </dgm:txFillClrLst>
+    <dgm:txEffectClrLst/>
+  </dgm:styleLbl>
+  <dgm:styleLbl name="fgAcc4">
+    <dgm:fillClrLst meth="repeat">
+      <a:schemeClr val="lt1">
+        <a:alpha val="90000"/>
+      </a:schemeClr>
+    </dgm:fillClrLst>
+    <dgm:linClrLst meth="repeat">
+      <a:schemeClr val="accent1"/>
+    </dgm:linClrLst>
+    <dgm:effectClrLst/>
+    <dgm:txLinClrLst/>
+    <dgm:txFillClrLst meth="repeat">
+      <a:schemeClr val="dk1"/>
+    </dgm:txFillClrLst>
+    <dgm:txEffectClrLst/>
+  </dgm:styleLbl>
+  <dgm:styleLbl name="bgShp">
+    <dgm:fillClrLst meth="repeat">
+      <a:schemeClr val="accent1">
+        <a:tint val="40000"/>
+      </a:schemeClr>
+    </dgm:fillClrLst>
+    <dgm:linClrLst meth="repeat">
+      <a:schemeClr val="accent1"/>
+    </dgm:linClrLst>
+    <dgm:effectClrLst/>
+    <dgm:txLinClrLst/>
+    <dgm:txFillClrLst meth="repeat">
+      <a:schemeClr val="dk1"/>
+    </dgm:txFillClrLst>
+    <dgm:txEffectClrLst/>
+  </dgm:styleLbl>
+  <dgm:styleLbl name="dkBgShp">
+    <dgm:fillClrLst meth="repeat">
+      <a:schemeClr val="accent1">
+        <a:shade val="80000"/>
+      </a:schemeClr>
+    </dgm:fillClrLst>
+    <dgm:linClrLst meth="repeat">
+      <a:schemeClr val="accent1"/>
+    </dgm:linClrLst>
+    <dgm:effectClrLst/>
+    <dgm:txLinClrLst/>
+    <dgm:txFillClrLst meth="repeat">
+      <a:schemeClr val="lt1"/>
+    </dgm:txFillClrLst>
+    <dgm:txEffectClrLst/>
+  </dgm:styleLbl>
+  <dgm:styleLbl name="trBgShp">
+    <dgm:fillClrLst meth="repeat">
+      <a:schemeClr val="accent1">
+        <a:tint val="50000"/>
+        <a:alpha val="40000"/>
+      </a:schemeClr>
+    </dgm:fillClrLst>
+    <dgm:linClrLst meth="repeat">
+      <a:schemeClr val="accent1"/>
+    </dgm:linClrLst>
+    <dgm:effectClrLst/>
+    <dgm:txLinClrLst/>
+    <dgm:txFillClrLst meth="repeat">
+      <a:schemeClr val="lt1"/>
+    </dgm:txFillClrLst>
+    <dgm:txEffectClrLst/>
+  </dgm:styleLbl>
+  <dgm:styleLbl name="fgShp">
+    <dgm:fillClrLst meth="repeat">
+      <a:schemeClr val="accent1">
+        <a:tint val="60000"/>
+      </a:schemeClr>
+    </dgm:fillClrLst>
+    <dgm:linClrLst meth="repeat">
+      <a:schemeClr val="lt1"/>
+    </dgm:linClrLst>
+    <dgm:effectClrLst/>
+    <dgm:txLinClrLst/>
+    <dgm:txFillClrLst meth="repeat">
+      <a:schemeClr val="dk1"/>
+    </dgm:txFillClrLst>
+    <dgm:txEffectClrLst/>
+  </dgm:styleLbl>
+  <dgm:styleLbl name="revTx">
+    <dgm:fillClrLst meth="repeat">
+      <a:schemeClr val="lt1">
+        <a:alpha val="0"/>
+      </a:schemeClr>
+    </dgm:fillClrLst>
+    <dgm:linClrLst meth="repeat">
+      <a:schemeClr val="dk1">
+        <a:alpha val="0"/>
+      </a:schemeClr>
+    </dgm:linClrLst>
+    <dgm:effectClrLst/>
+    <dgm:txLinClrLst/>
+    <dgm:txFillClrLst meth="repeat">
+      <a:schemeClr val="tx1"/>
+    </dgm:txFillClrLst>
+    <dgm:txEffectClrLst/>
+  </dgm:styleLbl>
+</dgm:colorsDef>
+</file>
+
+<file path=ppt/diagrams/colors4.xml><?xml version="1.0" encoding="utf-8"?>
 <dgm:colorsDef xmlns:dgm="http://schemas.openxmlformats.org/drawingml/2006/diagram" xmlns:a="http://schemas.openxmlformats.org/drawingml/2006/main" uniqueId="urn:microsoft.com/office/officeart/2005/8/colors/accent2_1">
   <dgm:title val=""/>
   <dgm:desc val=""/>
@@ -2421,7 +3168,7 @@
 </dgm:colorsDef>
 </file>
 
-<file path=ppt/diagrams/colors4.xml><?xml version="1.0" encoding="utf-8"?>
+<file path=ppt/diagrams/colors5.xml><?xml version="1.0" encoding="utf-8"?>
 <dgm:colorsDef xmlns:dgm="http://schemas.openxmlformats.org/drawingml/2006/diagram" xmlns:a="http://schemas.openxmlformats.org/drawingml/2006/main" uniqueId="urn:microsoft.com/office/officeart/2005/8/colors/accent1_2">
   <dgm:title val=""/>
   <dgm:desc val=""/>
@@ -3168,7 +3915,7 @@
 </dgm:colorsDef>
 </file>
 
-<file path=ppt/diagrams/colors5.xml><?xml version="1.0" encoding="utf-8"?>
+<file path=ppt/diagrams/colors6.xml><?xml version="1.0" encoding="utf-8"?>
 <dgm:colorsDef xmlns:dgm="http://schemas.openxmlformats.org/drawingml/2006/diagram" xmlns:a="http://schemas.openxmlformats.org/drawingml/2006/main" uniqueId="urn:microsoft.com/office/officeart/2005/8/colors/accent1_2">
   <dgm:title val=""/>
   <dgm:desc val=""/>
@@ -4566,27 +5313,27 @@
     </dgm:pt>
   </dgm:ptLst>
   <dgm:cxnLst>
-    <dgm:cxn modelId="{49439F5F-703F-42C8-AC41-9D10F0F390C7}" srcId="{C9FFFE1F-6078-4D82-87D0-BC919E87007C}" destId="{3D263D67-4D7A-41A5-91A5-670388FEE69F}" srcOrd="0" destOrd="0" parTransId="{ACF50AC0-88E8-48BB-8EA1-B472F428EFC8}" sibTransId="{E1C076EE-C718-4411-AC8A-F6087CE2E2FC}"/>
-    <dgm:cxn modelId="{29B6EE33-46BD-4DFF-8EAB-6F54D53EE694}" srcId="{7204C1C4-4A05-4E69-9F7B-60981284C004}" destId="{FEEFF06B-F309-4B5C-9120-F2D5BB2A0B0A}" srcOrd="0" destOrd="0" parTransId="{92393A6B-0584-45D2-B927-C5E52B55B04B}" sibTransId="{9A34E78C-3E18-40E0-9559-08591574FBDD}"/>
-    <dgm:cxn modelId="{F8EDE821-F4CD-4FD2-80DE-63681A6BFEE6}" type="presOf" srcId="{8CD26415-961D-4B68-B921-E5200F5307C6}" destId="{7991AEF3-84F5-4F2F-9A87-D93011516A86}" srcOrd="0" destOrd="0" presId="urn:microsoft.com/office/officeart/2005/8/layout/vList5"/>
-    <dgm:cxn modelId="{E320DCA1-229B-464B-A3C2-83EF157F38FD}" type="presOf" srcId="{FEEFF06B-F309-4B5C-9120-F2D5BB2A0B0A}" destId="{4069C5B0-E0D3-47C9-9E5F-416939C594B9}" srcOrd="0" destOrd="0" presId="urn:microsoft.com/office/officeart/2005/8/layout/vList5"/>
-    <dgm:cxn modelId="{5146D501-AD3A-4D91-A2EE-6B8E055A8536}" type="presOf" srcId="{C9FFFE1F-6078-4D82-87D0-BC919E87007C}" destId="{F985ABD3-DA1F-4E90-952D-1C16820F198E}" srcOrd="0" destOrd="0" presId="urn:microsoft.com/office/officeart/2005/8/layout/vList5"/>
-    <dgm:cxn modelId="{16F3F74B-7060-4D12-9C89-BB95B103C25C}" type="presOf" srcId="{D7EEFC11-8883-4ED2-BE60-DD96E84152F9}" destId="{76D300D9-3977-4D02-95E9-3905CCACBD1B}" srcOrd="0" destOrd="0" presId="urn:microsoft.com/office/officeart/2005/8/layout/vList5"/>
+    <dgm:cxn modelId="{F9191076-F8DA-4139-AB2E-8676FB0EE6B9}" srcId="{F764DBA7-A3E6-41AE-AAE3-82E4B8468FDE}" destId="{8CD26415-961D-4B68-B921-E5200F5307C6}" srcOrd="0" destOrd="0" parTransId="{BA48AF34-0E50-497A-9716-D728A68A822C}" sibTransId="{442A9638-1598-4307-926B-38E8B2F5EC42}"/>
     <dgm:cxn modelId="{40518AFD-BA91-4B2F-AEA2-E573186B25A5}" srcId="{E42DA33D-4309-45A4-8090-C7C1B8DE2840}" destId="{3E8A25C2-92DB-4ED8-B8C9-EA3371ADABA4}" srcOrd="1" destOrd="0" parTransId="{AE9D5A4F-DE63-4C00-8459-58284FF23117}" sibTransId="{DFAB64E3-84EF-4A31-90B3-B1CB79332689}"/>
     <dgm:cxn modelId="{886B9366-E103-4F17-9B78-865383070892}" type="presOf" srcId="{3E8A25C2-92DB-4ED8-B8C9-EA3371ADABA4}" destId="{1C4CF5AE-B0A9-4E79-99D0-8192DD361FD5}" srcOrd="0" destOrd="0" presId="urn:microsoft.com/office/officeart/2005/8/layout/vList5"/>
+    <dgm:cxn modelId="{E320DCA1-229B-464B-A3C2-83EF157F38FD}" type="presOf" srcId="{FEEFF06B-F309-4B5C-9120-F2D5BB2A0B0A}" destId="{4069C5B0-E0D3-47C9-9E5F-416939C594B9}" srcOrd="0" destOrd="0" presId="urn:microsoft.com/office/officeart/2005/8/layout/vList5"/>
+    <dgm:cxn modelId="{287A446E-66DE-4E87-9D02-0CCC24AE66D5}" srcId="{3E8A25C2-92DB-4ED8-B8C9-EA3371ADABA4}" destId="{D7EEFC11-8883-4ED2-BE60-DD96E84152F9}" srcOrd="0" destOrd="0" parTransId="{B482877E-31B6-44B4-8CD6-B7C7B7B41713}" sibTransId="{6D43DDB6-F7AC-4CC2-A2C8-5A3FEEC47C1E}"/>
+    <dgm:cxn modelId="{02D36449-91AF-4126-9259-E191C70B70F8}" type="presOf" srcId="{3D263D67-4D7A-41A5-91A5-670388FEE69F}" destId="{232E8D04-E732-492E-A284-139D99DFE02C}" srcOrd="0" destOrd="0" presId="urn:microsoft.com/office/officeart/2005/8/layout/vList5"/>
+    <dgm:cxn modelId="{8A68C0B9-F522-4B3B-9EBF-E7A9F6BA3F83}" type="presOf" srcId="{F764DBA7-A3E6-41AE-AAE3-82E4B8468FDE}" destId="{DE3A8CA3-F5E7-47D6-9409-0DAEFC3883C5}" srcOrd="0" destOrd="0" presId="urn:microsoft.com/office/officeart/2005/8/layout/vList5"/>
+    <dgm:cxn modelId="{7DA06D24-3FE4-409C-A5B4-AABEB6DCE6D5}" srcId="{7204C1C4-4A05-4E69-9F7B-60981284C004}" destId="{532DDF30-8F85-4CC7-9DA6-BD224FB1F3F5}" srcOrd="2" destOrd="0" parTransId="{D1BC096E-7702-440B-BE80-860792D3DFB7}" sibTransId="{9D185A63-1973-4493-917E-43CEF87568E8}"/>
+    <dgm:cxn modelId="{482FF1F3-2CE5-45AC-BB2F-4517318D1C97}" type="presOf" srcId="{CD90799B-3B74-4BC7-8657-98A1B4DCC681}" destId="{4069C5B0-E0D3-47C9-9E5F-416939C594B9}" srcOrd="0" destOrd="1" presId="urn:microsoft.com/office/officeart/2005/8/layout/vList5"/>
+    <dgm:cxn modelId="{8992B31C-96AE-42D8-92E7-747632B0038C}" type="presOf" srcId="{532DDF30-8F85-4CC7-9DA6-BD224FB1F3F5}" destId="{4069C5B0-E0D3-47C9-9E5F-416939C594B9}" srcOrd="0" destOrd="2" presId="urn:microsoft.com/office/officeart/2005/8/layout/vList5"/>
+    <dgm:cxn modelId="{29B6EE33-46BD-4DFF-8EAB-6F54D53EE694}" srcId="{7204C1C4-4A05-4E69-9F7B-60981284C004}" destId="{FEEFF06B-F309-4B5C-9120-F2D5BB2A0B0A}" srcOrd="0" destOrd="0" parTransId="{92393A6B-0584-45D2-B927-C5E52B55B04B}" sibTransId="{9A34E78C-3E18-40E0-9559-08591574FBDD}"/>
+    <dgm:cxn modelId="{49439F5F-703F-42C8-AC41-9D10F0F390C7}" srcId="{C9FFFE1F-6078-4D82-87D0-BC919E87007C}" destId="{3D263D67-4D7A-41A5-91A5-670388FEE69F}" srcOrd="0" destOrd="0" parTransId="{ACF50AC0-88E8-48BB-8EA1-B472F428EFC8}" sibTransId="{E1C076EE-C718-4411-AC8A-F6087CE2E2FC}"/>
+    <dgm:cxn modelId="{B14882FA-3621-45BB-AD02-588DC237E259}" srcId="{E42DA33D-4309-45A4-8090-C7C1B8DE2840}" destId="{C9FFFE1F-6078-4D82-87D0-BC919E87007C}" srcOrd="3" destOrd="0" parTransId="{542BC124-9D9F-4260-8A13-671245865973}" sibTransId="{7CFEB858-7D09-4292-AFD8-A460BF109FDB}"/>
+    <dgm:cxn modelId="{5146D501-AD3A-4D91-A2EE-6B8E055A8536}" type="presOf" srcId="{C9FFFE1F-6078-4D82-87D0-BC919E87007C}" destId="{F985ABD3-DA1F-4E90-952D-1C16820F198E}" srcOrd="0" destOrd="0" presId="urn:microsoft.com/office/officeart/2005/8/layout/vList5"/>
+    <dgm:cxn modelId="{2F03713C-0490-4725-99D7-5056B7C29DD9}" type="presOf" srcId="{E42DA33D-4309-45A4-8090-C7C1B8DE2840}" destId="{9951C6AC-0F0C-48FA-BECF-6C3F336159BF}" srcOrd="0" destOrd="0" presId="urn:microsoft.com/office/officeart/2005/8/layout/vList5"/>
+    <dgm:cxn modelId="{87BA7E12-F7AF-46BE-8604-29232418CB3A}" srcId="{E42DA33D-4309-45A4-8090-C7C1B8DE2840}" destId="{7204C1C4-4A05-4E69-9F7B-60981284C004}" srcOrd="0" destOrd="0" parTransId="{4413B713-B44E-40B8-B9EC-C52CD6FE6A10}" sibTransId="{03005108-F32D-4EFF-9439-890CCA627D66}"/>
+    <dgm:cxn modelId="{16F3F74B-7060-4D12-9C89-BB95B103C25C}" type="presOf" srcId="{D7EEFC11-8883-4ED2-BE60-DD96E84152F9}" destId="{76D300D9-3977-4D02-95E9-3905CCACBD1B}" srcOrd="0" destOrd="0" presId="urn:microsoft.com/office/officeart/2005/8/layout/vList5"/>
+    <dgm:cxn modelId="{F8EDE821-F4CD-4FD2-80DE-63681A6BFEE6}" type="presOf" srcId="{8CD26415-961D-4B68-B921-E5200F5307C6}" destId="{7991AEF3-84F5-4F2F-9A87-D93011516A86}" srcOrd="0" destOrd="0" presId="urn:microsoft.com/office/officeart/2005/8/layout/vList5"/>
+    <dgm:cxn modelId="{7B753C74-0022-47C2-9FF5-93322A5AF332}" type="presOf" srcId="{7204C1C4-4A05-4E69-9F7B-60981284C004}" destId="{83285697-B771-41E8-BF80-D6B7B2E260A7}" srcOrd="0" destOrd="0" presId="urn:microsoft.com/office/officeart/2005/8/layout/vList5"/>
     <dgm:cxn modelId="{895F7E3F-AB1D-4DDA-9805-E992151AA0A5}" srcId="{E42DA33D-4309-45A4-8090-C7C1B8DE2840}" destId="{F764DBA7-A3E6-41AE-AAE3-82E4B8468FDE}" srcOrd="2" destOrd="0" parTransId="{DC130EEF-0F89-485F-A675-CEFBD90A8E41}" sibTransId="{41615984-E2C2-477B-BB5D-8BF374A79996}"/>
-    <dgm:cxn modelId="{482FF1F3-2CE5-45AC-BB2F-4517318D1C97}" type="presOf" srcId="{CD90799B-3B74-4BC7-8657-98A1B4DCC681}" destId="{4069C5B0-E0D3-47C9-9E5F-416939C594B9}" srcOrd="0" destOrd="1" presId="urn:microsoft.com/office/officeart/2005/8/layout/vList5"/>
-    <dgm:cxn modelId="{287A446E-66DE-4E87-9D02-0CCC24AE66D5}" srcId="{3E8A25C2-92DB-4ED8-B8C9-EA3371ADABA4}" destId="{D7EEFC11-8883-4ED2-BE60-DD96E84152F9}" srcOrd="0" destOrd="0" parTransId="{B482877E-31B6-44B4-8CD6-B7C7B7B41713}" sibTransId="{6D43DDB6-F7AC-4CC2-A2C8-5A3FEEC47C1E}"/>
-    <dgm:cxn modelId="{7DA06D24-3FE4-409C-A5B4-AABEB6DCE6D5}" srcId="{7204C1C4-4A05-4E69-9F7B-60981284C004}" destId="{532DDF30-8F85-4CC7-9DA6-BD224FB1F3F5}" srcOrd="2" destOrd="0" parTransId="{D1BC096E-7702-440B-BE80-860792D3DFB7}" sibTransId="{9D185A63-1973-4493-917E-43CEF87568E8}"/>
-    <dgm:cxn modelId="{B14882FA-3621-45BB-AD02-588DC237E259}" srcId="{E42DA33D-4309-45A4-8090-C7C1B8DE2840}" destId="{C9FFFE1F-6078-4D82-87D0-BC919E87007C}" srcOrd="3" destOrd="0" parTransId="{542BC124-9D9F-4260-8A13-671245865973}" sibTransId="{7CFEB858-7D09-4292-AFD8-A460BF109FDB}"/>
-    <dgm:cxn modelId="{87BA7E12-F7AF-46BE-8604-29232418CB3A}" srcId="{E42DA33D-4309-45A4-8090-C7C1B8DE2840}" destId="{7204C1C4-4A05-4E69-9F7B-60981284C004}" srcOrd="0" destOrd="0" parTransId="{4413B713-B44E-40B8-B9EC-C52CD6FE6A10}" sibTransId="{03005108-F32D-4EFF-9439-890CCA627D66}"/>
     <dgm:cxn modelId="{83312643-ADFE-4B1B-815A-D60947C8A4EC}" srcId="{7204C1C4-4A05-4E69-9F7B-60981284C004}" destId="{CD90799B-3B74-4BC7-8657-98A1B4DCC681}" srcOrd="1" destOrd="0" parTransId="{751EC021-411F-4A76-B34F-42C814479026}" sibTransId="{7A7CB2A3-1623-4099-B0DA-33EDC01CA133}"/>
-    <dgm:cxn modelId="{02D36449-91AF-4126-9259-E191C70B70F8}" type="presOf" srcId="{3D263D67-4D7A-41A5-91A5-670388FEE69F}" destId="{232E8D04-E732-492E-A284-139D99DFE02C}" srcOrd="0" destOrd="0" presId="urn:microsoft.com/office/officeart/2005/8/layout/vList5"/>
-    <dgm:cxn modelId="{2F03713C-0490-4725-99D7-5056B7C29DD9}" type="presOf" srcId="{E42DA33D-4309-45A4-8090-C7C1B8DE2840}" destId="{9951C6AC-0F0C-48FA-BECF-6C3F336159BF}" srcOrd="0" destOrd="0" presId="urn:microsoft.com/office/officeart/2005/8/layout/vList5"/>
-    <dgm:cxn modelId="{7B753C74-0022-47C2-9FF5-93322A5AF332}" type="presOf" srcId="{7204C1C4-4A05-4E69-9F7B-60981284C004}" destId="{83285697-B771-41E8-BF80-D6B7B2E260A7}" srcOrd="0" destOrd="0" presId="urn:microsoft.com/office/officeart/2005/8/layout/vList5"/>
-    <dgm:cxn modelId="{8A68C0B9-F522-4B3B-9EBF-E7A9F6BA3F83}" type="presOf" srcId="{F764DBA7-A3E6-41AE-AAE3-82E4B8468FDE}" destId="{DE3A8CA3-F5E7-47D6-9409-0DAEFC3883C5}" srcOrd="0" destOrd="0" presId="urn:microsoft.com/office/officeart/2005/8/layout/vList5"/>
-    <dgm:cxn modelId="{8992B31C-96AE-42D8-92E7-747632B0038C}" type="presOf" srcId="{532DDF30-8F85-4CC7-9DA6-BD224FB1F3F5}" destId="{4069C5B0-E0D3-47C9-9E5F-416939C594B9}" srcOrd="0" destOrd="2" presId="urn:microsoft.com/office/officeart/2005/8/layout/vList5"/>
-    <dgm:cxn modelId="{F9191076-F8DA-4139-AB2E-8676FB0EE6B9}" srcId="{F764DBA7-A3E6-41AE-AAE3-82E4B8468FDE}" destId="{8CD26415-961D-4B68-B921-E5200F5307C6}" srcOrd="0" destOrd="0" parTransId="{BA48AF34-0E50-497A-9716-D728A68A822C}" sibTransId="{442A9638-1598-4307-926B-38E8B2F5EC42}"/>
     <dgm:cxn modelId="{A3BB4633-1B83-438C-B46A-5AF3D92225A3}" type="presParOf" srcId="{9951C6AC-0F0C-48FA-BECF-6C3F336159BF}" destId="{74EA5511-F8C7-4860-A01C-41612C829EF5}" srcOrd="0" destOrd="0" presId="urn:microsoft.com/office/officeart/2005/8/layout/vList5"/>
     <dgm:cxn modelId="{8F3604BB-2758-4462-926E-F93AA05F30B5}" type="presParOf" srcId="{74EA5511-F8C7-4860-A01C-41612C829EF5}" destId="{83285697-B771-41E8-BF80-D6B7B2E260A7}" srcOrd="0" destOrd="0" presId="urn:microsoft.com/office/officeart/2005/8/layout/vList5"/>
     <dgm:cxn modelId="{C5A249E9-42F1-43F9-8331-FBEE8E16B894}" type="presParOf" srcId="{74EA5511-F8C7-4860-A01C-41612C829EF5}" destId="{4069C5B0-E0D3-47C9-9E5F-416939C594B9}" srcOrd="1" destOrd="0" presId="urn:microsoft.com/office/officeart/2005/8/layout/vList5"/>
@@ -4607,7 +5354,7 @@
   <dgm:whole/>
   <dgm:extLst>
     <a:ext uri="http://schemas.microsoft.com/office/drawing/2008/diagram">
-      <dsp:dataModelExt xmlns:dsp="http://schemas.microsoft.com/office/drawing/2008/diagram" xmlns="" relId="rId6" minVer="http://schemas.openxmlformats.org/drawingml/2006/diagram"/>
+      <dsp:dataModelExt xmlns:dsp="http://schemas.microsoft.com/office/drawing/2008/diagram" relId="rId6" minVer="http://schemas.openxmlformats.org/drawingml/2006/diagram"/>
     </a:ext>
   </dgm:extLst>
 </dgm:dataModel>
@@ -4717,10 +5464,10 @@
         <a:lstStyle/>
         <a:p>
           <a:r>
-            <a:rPr lang="pt-BR" sz="1600" dirty="0" smtClean="0"/>
+            <a:rPr lang="pt-BR" sz="1400" b="1" dirty="0" smtClean="0"/>
             <a:t>?</a:t>
           </a:r>
-          <a:endParaRPr lang="pt-BR" sz="1600" dirty="0"/>
+          <a:endParaRPr lang="pt-BR" sz="1400" b="1" dirty="0"/>
         </a:p>
       </dgm:t>
     </dgm:pt>
@@ -4836,10 +5583,10 @@
         <a:lstStyle/>
         <a:p>
           <a:r>
-            <a:rPr lang="pt-BR" sz="1600" dirty="0" smtClean="0"/>
+            <a:rPr lang="pt-BR" sz="1400" b="1" dirty="0" smtClean="0"/>
             <a:t>?</a:t>
           </a:r>
-          <a:endParaRPr lang="pt-BR" sz="1600" dirty="0"/>
+          <a:endParaRPr lang="pt-BR" sz="1400" b="1" dirty="0"/>
         </a:p>
       </dgm:t>
     </dgm:pt>
@@ -4940,10 +5687,10 @@
         <a:lstStyle/>
         <a:p>
           <a:r>
-            <a:rPr lang="pt-BR" sz="1600" dirty="0" smtClean="0"/>
+            <a:rPr lang="pt-BR" sz="1400" b="1" dirty="0" smtClean="0"/>
             <a:t>?</a:t>
           </a:r>
-          <a:endParaRPr lang="pt-BR" sz="1600" dirty="0"/>
+          <a:endParaRPr lang="pt-BR" sz="1400" b="1" dirty="0"/>
         </a:p>
       </dgm:t>
     </dgm:pt>
@@ -5173,26 +5920,26 @@
     </dgm:pt>
   </dgm:ptLst>
   <dgm:cxnLst>
+    <dgm:cxn modelId="{82215399-8FEF-435E-B12E-B0BBF6350A2D}" srcId="{140DB818-E071-4B39-BEDA-37F84C79FBA2}" destId="{57884B04-88D4-4FB2-8678-5199DF429E6F}" srcOrd="0" destOrd="0" parTransId="{C4B27B1D-C2E0-4804-B643-F031B63B66D3}" sibTransId="{B8942B1F-0DA1-4630-8D8B-34A3B43C11D5}"/>
+    <dgm:cxn modelId="{9C9CCD84-152C-4BF0-AE56-02A77DCE9308}" type="presOf" srcId="{AD7A2D0A-69C1-40D4-AC3C-50ACA39C45C1}" destId="{944B484B-F688-4CFA-A4FB-08B237CA5903}" srcOrd="1" destOrd="0" presId="urn:microsoft.com/office/officeart/2005/8/layout/process3"/>
+    <dgm:cxn modelId="{BB53AC73-5473-4487-A280-CC415E72C20C}" srcId="{E253E697-B0C3-42D4-81FD-D3ABCA72938E}" destId="{140DB818-E071-4B39-BEDA-37F84C79FBA2}" srcOrd="1" destOrd="0" parTransId="{5D492640-F330-4177-9F25-0C2545064803}" sibTransId="{AAA7816F-0D18-434B-AF27-E1709A042EA5}"/>
+    <dgm:cxn modelId="{5A2ECE84-5973-469B-B8D7-72377C33E035}" type="presOf" srcId="{AAA7816F-0D18-434B-AF27-E1709A042EA5}" destId="{1390A124-BEDA-4A49-9B1B-0ED2FB571A6C}" srcOrd="0" destOrd="0" presId="urn:microsoft.com/office/officeart/2005/8/layout/process3"/>
+    <dgm:cxn modelId="{021B0986-616E-47A6-BC20-5C2A8AA71A81}" type="presOf" srcId="{E253E697-B0C3-42D4-81FD-D3ABCA72938E}" destId="{BCDBC707-4A93-4D55-A61A-79732B703027}" srcOrd="0" destOrd="0" presId="urn:microsoft.com/office/officeart/2005/8/layout/process3"/>
+    <dgm:cxn modelId="{605658C6-069A-4135-B3FB-B8571120DFAF}" type="presOf" srcId="{4BA36FF7-0F0F-4341-A68C-01E8516603CD}" destId="{DADC7395-583C-4FD5-8691-3342B823E6CA}" srcOrd="1" destOrd="0" presId="urn:microsoft.com/office/officeart/2005/8/layout/process3"/>
+    <dgm:cxn modelId="{7DDFCDF5-FB4B-4B56-AB28-D717E8E38C18}" type="presOf" srcId="{AAA7816F-0D18-434B-AF27-E1709A042EA5}" destId="{A890346F-3222-4081-BF76-FED6671C2558}" srcOrd="1" destOrd="0" presId="urn:microsoft.com/office/officeart/2005/8/layout/process3"/>
+    <dgm:cxn modelId="{1BD557F6-3147-4A3E-96E1-8774CC36B89A}" srcId="{E253E697-B0C3-42D4-81FD-D3ABCA72938E}" destId="{AD7A2D0A-69C1-40D4-AC3C-50ACA39C45C1}" srcOrd="2" destOrd="0" parTransId="{B65DA3CC-30DF-4011-97FD-91E67EF19982}" sibTransId="{D8E3431A-1020-45BC-A3A1-D9601A2EED84}"/>
+    <dgm:cxn modelId="{D95A37CA-F51F-4A08-8D0B-184665F642AA}" type="presOf" srcId="{579997AD-FA9A-4915-A323-8F17CA09514B}" destId="{330F8E89-32DF-4BC4-AED2-91D2D7CB94C5}" srcOrd="0" destOrd="0" presId="urn:microsoft.com/office/officeart/2005/8/layout/process3"/>
+    <dgm:cxn modelId="{3B833AF1-554A-4115-83EE-25F9C4E2AEFD}" type="presOf" srcId="{B2D64904-4778-414A-935C-AFC992C15E50}" destId="{A64C8272-FC1A-4572-A0B1-A3C36EACD2B6}" srcOrd="0" destOrd="0" presId="urn:microsoft.com/office/officeart/2005/8/layout/process3"/>
+    <dgm:cxn modelId="{13DDD5AB-9265-4DB2-9E66-512CAA799786}" srcId="{E253E697-B0C3-42D4-81FD-D3ABCA72938E}" destId="{4BA36FF7-0F0F-4341-A68C-01E8516603CD}" srcOrd="0" destOrd="0" parTransId="{9FBCD112-267C-4316-B4DD-D2608637A18B}" sibTransId="{579997AD-FA9A-4915-A323-8F17CA09514B}"/>
+    <dgm:cxn modelId="{5DDCBCED-AD9D-443E-B390-A89DFC1C749F}" type="presOf" srcId="{140DB818-E071-4B39-BEDA-37F84C79FBA2}" destId="{184053F0-8034-496C-9823-B7D238D8DC93}" srcOrd="0" destOrd="0" presId="urn:microsoft.com/office/officeart/2005/8/layout/process3"/>
+    <dgm:cxn modelId="{1797C3E7-363E-4D4F-BF7B-E725B7DA6E80}" type="presOf" srcId="{579997AD-FA9A-4915-A323-8F17CA09514B}" destId="{E703F4C6-A0E0-49AD-9FAC-F47DD1F01258}" srcOrd="1" destOrd="0" presId="urn:microsoft.com/office/officeart/2005/8/layout/process3"/>
+    <dgm:cxn modelId="{E6108260-E385-432B-A806-C31C8E849437}" srcId="{4BA36FF7-0F0F-4341-A68C-01E8516603CD}" destId="{B2D64904-4778-414A-935C-AFC992C15E50}" srcOrd="0" destOrd="0" parTransId="{3886B039-ED5A-4C35-9224-7296F3AB00E8}" sibTransId="{F27A2EE6-AA94-4404-920A-4FEA4A59E153}"/>
+    <dgm:cxn modelId="{E22A4332-4F38-4397-A0CA-E07AB4FDA400}" type="presOf" srcId="{AD7A2D0A-69C1-40D4-AC3C-50ACA39C45C1}" destId="{EA7354A6-04B1-4A5C-BE93-3D503C066108}" srcOrd="0" destOrd="0" presId="urn:microsoft.com/office/officeart/2005/8/layout/process3"/>
+    <dgm:cxn modelId="{AE01CECD-7460-4EE6-9855-462A6BAC54CD}" type="presOf" srcId="{21736AD5-ED16-41EE-9520-03DEC94C9DD9}" destId="{1993AEF3-68C8-4F83-9F1E-D1B7B5B4963C}" srcOrd="0" destOrd="0" presId="urn:microsoft.com/office/officeart/2005/8/layout/process3"/>
+    <dgm:cxn modelId="{625B97B1-48B9-4F79-AD12-9E967C7E5D25}" type="presOf" srcId="{57884B04-88D4-4FB2-8678-5199DF429E6F}" destId="{3E47BC9E-87C0-4D93-83F4-A810B62AEF07}" srcOrd="0" destOrd="0" presId="urn:microsoft.com/office/officeart/2005/8/layout/process3"/>
+    <dgm:cxn modelId="{D1284BD6-E3DA-48A8-BFF9-25C5710CED70}" type="presOf" srcId="{4BA36FF7-0F0F-4341-A68C-01E8516603CD}" destId="{209FD6B3-0ECB-4203-B962-7559934405BD}" srcOrd="0" destOrd="0" presId="urn:microsoft.com/office/officeart/2005/8/layout/process3"/>
+    <dgm:cxn modelId="{33D1B9A7-E56C-4778-97FB-A5B130BCA5C0}" srcId="{AD7A2D0A-69C1-40D4-AC3C-50ACA39C45C1}" destId="{21736AD5-ED16-41EE-9520-03DEC94C9DD9}" srcOrd="0" destOrd="0" parTransId="{9CB51E30-49E4-4E36-942B-179B5A0EC94C}" sibTransId="{DFDDDFD5-3525-4DBC-A81D-34093C1E23BA}"/>
     <dgm:cxn modelId="{C288C32A-3227-4782-B852-198321A78827}" type="presOf" srcId="{140DB818-E071-4B39-BEDA-37F84C79FBA2}" destId="{D6C82472-F7A1-44F8-BE16-C0E2E40E0D6B}" srcOrd="1" destOrd="0" presId="urn:microsoft.com/office/officeart/2005/8/layout/process3"/>
-    <dgm:cxn modelId="{021B0986-616E-47A6-BC20-5C2A8AA71A81}" type="presOf" srcId="{E253E697-B0C3-42D4-81FD-D3ABCA72938E}" destId="{BCDBC707-4A93-4D55-A61A-79732B703027}" srcOrd="0" destOrd="0" presId="urn:microsoft.com/office/officeart/2005/8/layout/process3"/>
-    <dgm:cxn modelId="{BB53AC73-5473-4487-A280-CC415E72C20C}" srcId="{E253E697-B0C3-42D4-81FD-D3ABCA72938E}" destId="{140DB818-E071-4B39-BEDA-37F84C79FBA2}" srcOrd="1" destOrd="0" parTransId="{5D492640-F330-4177-9F25-0C2545064803}" sibTransId="{AAA7816F-0D18-434B-AF27-E1709A042EA5}"/>
-    <dgm:cxn modelId="{82215399-8FEF-435E-B12E-B0BBF6350A2D}" srcId="{140DB818-E071-4B39-BEDA-37F84C79FBA2}" destId="{57884B04-88D4-4FB2-8678-5199DF429E6F}" srcOrd="0" destOrd="0" parTransId="{C4B27B1D-C2E0-4804-B643-F031B63B66D3}" sibTransId="{B8942B1F-0DA1-4630-8D8B-34A3B43C11D5}"/>
-    <dgm:cxn modelId="{E22A4332-4F38-4397-A0CA-E07AB4FDA400}" type="presOf" srcId="{AD7A2D0A-69C1-40D4-AC3C-50ACA39C45C1}" destId="{EA7354A6-04B1-4A5C-BE93-3D503C066108}" srcOrd="0" destOrd="0" presId="urn:microsoft.com/office/officeart/2005/8/layout/process3"/>
-    <dgm:cxn modelId="{1BD557F6-3147-4A3E-96E1-8774CC36B89A}" srcId="{E253E697-B0C3-42D4-81FD-D3ABCA72938E}" destId="{AD7A2D0A-69C1-40D4-AC3C-50ACA39C45C1}" srcOrd="2" destOrd="0" parTransId="{B65DA3CC-30DF-4011-97FD-91E67EF19982}" sibTransId="{D8E3431A-1020-45BC-A3A1-D9601A2EED84}"/>
-    <dgm:cxn modelId="{625B97B1-48B9-4F79-AD12-9E967C7E5D25}" type="presOf" srcId="{57884B04-88D4-4FB2-8678-5199DF429E6F}" destId="{3E47BC9E-87C0-4D93-83F4-A810B62AEF07}" srcOrd="0" destOrd="0" presId="urn:microsoft.com/office/officeart/2005/8/layout/process3"/>
-    <dgm:cxn modelId="{1797C3E7-363E-4D4F-BF7B-E725B7DA6E80}" type="presOf" srcId="{579997AD-FA9A-4915-A323-8F17CA09514B}" destId="{E703F4C6-A0E0-49AD-9FAC-F47DD1F01258}" srcOrd="1" destOrd="0" presId="urn:microsoft.com/office/officeart/2005/8/layout/process3"/>
-    <dgm:cxn modelId="{5DDCBCED-AD9D-443E-B390-A89DFC1C749F}" type="presOf" srcId="{140DB818-E071-4B39-BEDA-37F84C79FBA2}" destId="{184053F0-8034-496C-9823-B7D238D8DC93}" srcOrd="0" destOrd="0" presId="urn:microsoft.com/office/officeart/2005/8/layout/process3"/>
-    <dgm:cxn modelId="{605658C6-069A-4135-B3FB-B8571120DFAF}" type="presOf" srcId="{4BA36FF7-0F0F-4341-A68C-01E8516603CD}" destId="{DADC7395-583C-4FD5-8691-3342B823E6CA}" srcOrd="1" destOrd="0" presId="urn:microsoft.com/office/officeart/2005/8/layout/process3"/>
-    <dgm:cxn modelId="{D95A37CA-F51F-4A08-8D0B-184665F642AA}" type="presOf" srcId="{579997AD-FA9A-4915-A323-8F17CA09514B}" destId="{330F8E89-32DF-4BC4-AED2-91D2D7CB94C5}" srcOrd="0" destOrd="0" presId="urn:microsoft.com/office/officeart/2005/8/layout/process3"/>
-    <dgm:cxn modelId="{13DDD5AB-9265-4DB2-9E66-512CAA799786}" srcId="{E253E697-B0C3-42D4-81FD-D3ABCA72938E}" destId="{4BA36FF7-0F0F-4341-A68C-01E8516603CD}" srcOrd="0" destOrd="0" parTransId="{9FBCD112-267C-4316-B4DD-D2608637A18B}" sibTransId="{579997AD-FA9A-4915-A323-8F17CA09514B}"/>
-    <dgm:cxn modelId="{3B833AF1-554A-4115-83EE-25F9C4E2AEFD}" type="presOf" srcId="{B2D64904-4778-414A-935C-AFC992C15E50}" destId="{A64C8272-FC1A-4572-A0B1-A3C36EACD2B6}" srcOrd="0" destOrd="0" presId="urn:microsoft.com/office/officeart/2005/8/layout/process3"/>
-    <dgm:cxn modelId="{AE01CECD-7460-4EE6-9855-462A6BAC54CD}" type="presOf" srcId="{21736AD5-ED16-41EE-9520-03DEC94C9DD9}" destId="{1993AEF3-68C8-4F83-9F1E-D1B7B5B4963C}" srcOrd="0" destOrd="0" presId="urn:microsoft.com/office/officeart/2005/8/layout/process3"/>
-    <dgm:cxn modelId="{9C9CCD84-152C-4BF0-AE56-02A77DCE9308}" type="presOf" srcId="{AD7A2D0A-69C1-40D4-AC3C-50ACA39C45C1}" destId="{944B484B-F688-4CFA-A4FB-08B237CA5903}" srcOrd="1" destOrd="0" presId="urn:microsoft.com/office/officeart/2005/8/layout/process3"/>
-    <dgm:cxn modelId="{D1284BD6-E3DA-48A8-BFF9-25C5710CED70}" type="presOf" srcId="{4BA36FF7-0F0F-4341-A68C-01E8516603CD}" destId="{209FD6B3-0ECB-4203-B962-7559934405BD}" srcOrd="0" destOrd="0" presId="urn:microsoft.com/office/officeart/2005/8/layout/process3"/>
-    <dgm:cxn modelId="{7DDFCDF5-FB4B-4B56-AB28-D717E8E38C18}" type="presOf" srcId="{AAA7816F-0D18-434B-AF27-E1709A042EA5}" destId="{A890346F-3222-4081-BF76-FED6671C2558}" srcOrd="1" destOrd="0" presId="urn:microsoft.com/office/officeart/2005/8/layout/process3"/>
-    <dgm:cxn modelId="{5A2ECE84-5973-469B-B8D7-72377C33E035}" type="presOf" srcId="{AAA7816F-0D18-434B-AF27-E1709A042EA5}" destId="{1390A124-BEDA-4A49-9B1B-0ED2FB571A6C}" srcOrd="0" destOrd="0" presId="urn:microsoft.com/office/officeart/2005/8/layout/process3"/>
-    <dgm:cxn modelId="{E6108260-E385-432B-A806-C31C8E849437}" srcId="{4BA36FF7-0F0F-4341-A68C-01E8516603CD}" destId="{B2D64904-4778-414A-935C-AFC992C15E50}" srcOrd="0" destOrd="0" parTransId="{3886B039-ED5A-4C35-9224-7296F3AB00E8}" sibTransId="{F27A2EE6-AA94-4404-920A-4FEA4A59E153}"/>
-    <dgm:cxn modelId="{33D1B9A7-E56C-4778-97FB-A5B130BCA5C0}" srcId="{AD7A2D0A-69C1-40D4-AC3C-50ACA39C45C1}" destId="{21736AD5-ED16-41EE-9520-03DEC94C9DD9}" srcOrd="0" destOrd="0" parTransId="{9CB51E30-49E4-4E36-942B-179B5A0EC94C}" sibTransId="{DFDDDFD5-3525-4DBC-A81D-34093C1E23BA}"/>
     <dgm:cxn modelId="{7A716225-B15F-42A3-B0B1-95F5DAF585E6}" type="presParOf" srcId="{BCDBC707-4A93-4D55-A61A-79732B703027}" destId="{53AF55CF-52F1-471D-BD6D-B6FBBCD8ED56}" srcOrd="0" destOrd="0" presId="urn:microsoft.com/office/officeart/2005/8/layout/process3"/>
     <dgm:cxn modelId="{AB11F588-8517-43F7-B26C-B53A5C95128F}" type="presParOf" srcId="{53AF55CF-52F1-471D-BD6D-B6FBBCD8ED56}" destId="{209FD6B3-0ECB-4203-B962-7559934405BD}" srcOrd="0" destOrd="0" presId="urn:microsoft.com/office/officeart/2005/8/layout/process3"/>
     <dgm:cxn modelId="{ECA7C0B7-4EAB-47E7-B4DA-234ACDCD8581}" type="presParOf" srcId="{53AF55CF-52F1-471D-BD6D-B6FBBCD8ED56}" destId="{DADC7395-583C-4FD5-8691-3342B823E6CA}" srcOrd="1" destOrd="0" presId="urn:microsoft.com/office/officeart/2005/8/layout/process3"/>
@@ -5214,13 +5961,584 @@
   <dgm:whole/>
   <dgm:extLst>
     <a:ext uri="http://schemas.microsoft.com/office/drawing/2008/diagram">
-      <dsp:dataModelExt xmlns:dsp="http://schemas.microsoft.com/office/drawing/2008/diagram" xmlns="" relId="rId6" minVer="http://schemas.openxmlformats.org/drawingml/2006/diagram"/>
+      <dsp:dataModelExt xmlns:dsp="http://schemas.microsoft.com/office/drawing/2008/diagram" relId="rId6" minVer="http://schemas.openxmlformats.org/drawingml/2006/diagram"/>
     </a:ext>
   </dgm:extLst>
 </dgm:dataModel>
 </file>
 
 <file path=ppt/diagrams/data3.xml><?xml version="1.0" encoding="utf-8"?>
+<dgm:dataModel xmlns:dgm="http://schemas.openxmlformats.org/drawingml/2006/diagram" xmlns:a="http://schemas.openxmlformats.org/drawingml/2006/main">
+  <dgm:ptLst>
+    <dgm:pt modelId="{09E1FA74-CAD4-4D8F-8C9F-47DB10A12E4C}" type="doc">
+      <dgm:prSet loTypeId="urn:microsoft.com/office/officeart/2008/layout/SquareAccentList" loCatId="list" qsTypeId="urn:microsoft.com/office/officeart/2005/8/quickstyle/simple1" qsCatId="simple" csTypeId="urn:microsoft.com/office/officeart/2005/8/colors/accent1_2" csCatId="accent1" phldr="0"/>
+      <dgm:spPr/>
+      <dgm:t>
+        <a:bodyPr/>
+        <a:lstStyle/>
+        <a:p>
+          <a:endParaRPr lang="pt-BR"/>
+        </a:p>
+      </dgm:t>
+    </dgm:pt>
+    <dgm:pt modelId="{B41D75AE-2A29-4277-8DBB-D5E9CED79C4D}">
+      <dgm:prSet phldrT="[Texto]" phldr="1"/>
+      <dgm:spPr/>
+      <dgm:t>
+        <a:bodyPr/>
+        <a:lstStyle/>
+        <a:p>
+          <a:endParaRPr lang="pt-BR" dirty="0"/>
+        </a:p>
+      </dgm:t>
+    </dgm:pt>
+    <dgm:pt modelId="{E4BA2DF7-CD16-40C5-8D39-63D87AB06BAE}" type="parTrans" cxnId="{925D1D41-F295-4BF5-8F35-6B0283EB1660}">
+      <dgm:prSet/>
+      <dgm:spPr/>
+      <dgm:t>
+        <a:bodyPr/>
+        <a:lstStyle/>
+        <a:p>
+          <a:endParaRPr lang="pt-BR"/>
+        </a:p>
+      </dgm:t>
+    </dgm:pt>
+    <dgm:pt modelId="{49219BB6-AF08-4355-8AAC-CB63EB613BD5}" type="sibTrans" cxnId="{925D1D41-F295-4BF5-8F35-6B0283EB1660}">
+      <dgm:prSet/>
+      <dgm:spPr/>
+      <dgm:t>
+        <a:bodyPr/>
+        <a:lstStyle/>
+        <a:p>
+          <a:endParaRPr lang="pt-BR"/>
+        </a:p>
+      </dgm:t>
+    </dgm:pt>
+    <dgm:pt modelId="{B2A72572-DD94-49F3-9C74-F97F76DD77E8}">
+      <dgm:prSet phldrT="[Texto]" phldr="1"/>
+      <dgm:spPr/>
+      <dgm:t>
+        <a:bodyPr/>
+        <a:lstStyle/>
+        <a:p>
+          <a:endParaRPr lang="pt-BR"/>
+        </a:p>
+      </dgm:t>
+    </dgm:pt>
+    <dgm:pt modelId="{BE5BBF08-CB6C-410D-95EE-BD5BF25A6309}" type="parTrans" cxnId="{60B80743-7E71-47A9-8589-B22F3F761233}">
+      <dgm:prSet/>
+      <dgm:spPr/>
+      <dgm:t>
+        <a:bodyPr/>
+        <a:lstStyle/>
+        <a:p>
+          <a:endParaRPr lang="pt-BR"/>
+        </a:p>
+      </dgm:t>
+    </dgm:pt>
+    <dgm:pt modelId="{CFA313D8-C3A9-4765-881F-FD14965CDD61}" type="sibTrans" cxnId="{60B80743-7E71-47A9-8589-B22F3F761233}">
+      <dgm:prSet/>
+      <dgm:spPr/>
+      <dgm:t>
+        <a:bodyPr/>
+        <a:lstStyle/>
+        <a:p>
+          <a:endParaRPr lang="pt-BR"/>
+        </a:p>
+      </dgm:t>
+    </dgm:pt>
+    <dgm:pt modelId="{8AB1D12E-E418-4915-8CED-6AB0C84761F4}">
+      <dgm:prSet phldrT="[Texto]" phldr="1"/>
+      <dgm:spPr/>
+      <dgm:t>
+        <a:bodyPr/>
+        <a:lstStyle/>
+        <a:p>
+          <a:endParaRPr lang="pt-BR"/>
+        </a:p>
+      </dgm:t>
+    </dgm:pt>
+    <dgm:pt modelId="{1BE8EC8D-27D7-49EA-907A-2F9B0ACF5DCA}" type="parTrans" cxnId="{8ABF67CD-DAC4-41A3-926E-140CF6F92A23}">
+      <dgm:prSet/>
+      <dgm:spPr/>
+      <dgm:t>
+        <a:bodyPr/>
+        <a:lstStyle/>
+        <a:p>
+          <a:endParaRPr lang="pt-BR"/>
+        </a:p>
+      </dgm:t>
+    </dgm:pt>
+    <dgm:pt modelId="{293C271F-A78D-436A-A6CB-17A318394333}" type="sibTrans" cxnId="{8ABF67CD-DAC4-41A3-926E-140CF6F92A23}">
+      <dgm:prSet/>
+      <dgm:spPr/>
+      <dgm:t>
+        <a:bodyPr/>
+        <a:lstStyle/>
+        <a:p>
+          <a:endParaRPr lang="pt-BR"/>
+        </a:p>
+      </dgm:t>
+    </dgm:pt>
+    <dgm:pt modelId="{AC6C1CB8-BE46-44FC-93D0-1A13ABC82896}">
+      <dgm:prSet phldrT="[Texto]" phldr="1"/>
+      <dgm:spPr/>
+      <dgm:t>
+        <a:bodyPr/>
+        <a:lstStyle/>
+        <a:p>
+          <a:endParaRPr lang="pt-BR"/>
+        </a:p>
+      </dgm:t>
+    </dgm:pt>
+    <dgm:pt modelId="{368D3FFA-1706-4155-9796-459F27FB3F7F}" type="parTrans" cxnId="{E985D23C-CEF3-49BA-B2AA-6039D6462C30}">
+      <dgm:prSet/>
+      <dgm:spPr/>
+      <dgm:t>
+        <a:bodyPr/>
+        <a:lstStyle/>
+        <a:p>
+          <a:endParaRPr lang="pt-BR"/>
+        </a:p>
+      </dgm:t>
+    </dgm:pt>
+    <dgm:pt modelId="{47583708-E552-4706-B015-578F522A21EB}" type="sibTrans" cxnId="{E985D23C-CEF3-49BA-B2AA-6039D6462C30}">
+      <dgm:prSet/>
+      <dgm:spPr/>
+      <dgm:t>
+        <a:bodyPr/>
+        <a:lstStyle/>
+        <a:p>
+          <a:endParaRPr lang="pt-BR"/>
+        </a:p>
+      </dgm:t>
+    </dgm:pt>
+    <dgm:pt modelId="{AAC17C87-31E8-4276-B5AF-B8910E5CA9AA}">
+      <dgm:prSet phldrT="[Texto]" phldr="1"/>
+      <dgm:spPr/>
+      <dgm:t>
+        <a:bodyPr/>
+        <a:lstStyle/>
+        <a:p>
+          <a:endParaRPr lang="pt-BR"/>
+        </a:p>
+      </dgm:t>
+    </dgm:pt>
+    <dgm:pt modelId="{7EA781CD-E6A2-4979-963F-9C9A0A1B2730}" type="parTrans" cxnId="{3CFC8CA8-DC62-44AE-9367-B51D186B6958}">
+      <dgm:prSet/>
+      <dgm:spPr/>
+      <dgm:t>
+        <a:bodyPr/>
+        <a:lstStyle/>
+        <a:p>
+          <a:endParaRPr lang="pt-BR"/>
+        </a:p>
+      </dgm:t>
+    </dgm:pt>
+    <dgm:pt modelId="{B37090C3-402B-4158-91BD-832F4000D4BA}" type="sibTrans" cxnId="{3CFC8CA8-DC62-44AE-9367-B51D186B6958}">
+      <dgm:prSet/>
+      <dgm:spPr/>
+      <dgm:t>
+        <a:bodyPr/>
+        <a:lstStyle/>
+        <a:p>
+          <a:endParaRPr lang="pt-BR"/>
+        </a:p>
+      </dgm:t>
+    </dgm:pt>
+    <dgm:pt modelId="{22AB3F71-BC8F-4768-888B-F6E1856CFD5B}">
+      <dgm:prSet phldrT="[Texto]" phldr="1"/>
+      <dgm:spPr/>
+      <dgm:t>
+        <a:bodyPr/>
+        <a:lstStyle/>
+        <a:p>
+          <a:endParaRPr lang="pt-BR" dirty="0"/>
+        </a:p>
+      </dgm:t>
+    </dgm:pt>
+    <dgm:pt modelId="{72548C30-62AA-4264-A91B-6E316ED2D1D5}" type="parTrans" cxnId="{47F9B3B4-FA63-45BD-B156-69D5C1732BE8}">
+      <dgm:prSet/>
+      <dgm:spPr/>
+      <dgm:t>
+        <a:bodyPr/>
+        <a:lstStyle/>
+        <a:p>
+          <a:endParaRPr lang="pt-BR"/>
+        </a:p>
+      </dgm:t>
+    </dgm:pt>
+    <dgm:pt modelId="{C9F02517-C147-4C66-A0F0-11E0F557FBA6}" type="sibTrans" cxnId="{47F9B3B4-FA63-45BD-B156-69D5C1732BE8}">
+      <dgm:prSet/>
+      <dgm:spPr/>
+      <dgm:t>
+        <a:bodyPr/>
+        <a:lstStyle/>
+        <a:p>
+          <a:endParaRPr lang="pt-BR"/>
+        </a:p>
+      </dgm:t>
+    </dgm:pt>
+    <dgm:pt modelId="{3973E519-921D-4357-808F-65EA81567642}">
+      <dgm:prSet phldrT="[Texto]" phldr="1"/>
+      <dgm:spPr/>
+      <dgm:t>
+        <a:bodyPr/>
+        <a:lstStyle/>
+        <a:p>
+          <a:endParaRPr lang="pt-BR"/>
+        </a:p>
+      </dgm:t>
+    </dgm:pt>
+    <dgm:pt modelId="{74AF20CE-7799-4C8E-A894-EE0C2D449A5F}" type="parTrans" cxnId="{762F7717-D26E-4D1C-A6FD-498F6E1B02A3}">
+      <dgm:prSet/>
+      <dgm:spPr/>
+      <dgm:t>
+        <a:bodyPr/>
+        <a:lstStyle/>
+        <a:p>
+          <a:endParaRPr lang="pt-BR"/>
+        </a:p>
+      </dgm:t>
+    </dgm:pt>
+    <dgm:pt modelId="{ED0B01CC-F5BD-4E3D-9811-96F476147302}" type="sibTrans" cxnId="{762F7717-D26E-4D1C-A6FD-498F6E1B02A3}">
+      <dgm:prSet/>
+      <dgm:spPr/>
+      <dgm:t>
+        <a:bodyPr/>
+        <a:lstStyle/>
+        <a:p>
+          <a:endParaRPr lang="pt-BR"/>
+        </a:p>
+      </dgm:t>
+    </dgm:pt>
+    <dgm:pt modelId="{25E09C33-42FD-4F52-8CB0-452BF541B7EE}">
+      <dgm:prSet phldrT="[Texto]" phldr="1"/>
+      <dgm:spPr/>
+      <dgm:t>
+        <a:bodyPr/>
+        <a:lstStyle/>
+        <a:p>
+          <a:endParaRPr lang="pt-BR"/>
+        </a:p>
+      </dgm:t>
+    </dgm:pt>
+    <dgm:pt modelId="{2E5C60CF-085B-4C66-A01B-83A3AF9AC5CE}" type="parTrans" cxnId="{2FFE2D2F-5254-486D-A83F-5A8A96275BDB}">
+      <dgm:prSet/>
+      <dgm:spPr/>
+      <dgm:t>
+        <a:bodyPr/>
+        <a:lstStyle/>
+        <a:p>
+          <a:endParaRPr lang="pt-BR"/>
+        </a:p>
+      </dgm:t>
+    </dgm:pt>
+    <dgm:pt modelId="{F9299BC1-DA27-4702-A02B-E2D61037A6E5}" type="sibTrans" cxnId="{2FFE2D2F-5254-486D-A83F-5A8A96275BDB}">
+      <dgm:prSet/>
+      <dgm:spPr/>
+      <dgm:t>
+        <a:bodyPr/>
+        <a:lstStyle/>
+        <a:p>
+          <a:endParaRPr lang="pt-BR"/>
+        </a:p>
+      </dgm:t>
+    </dgm:pt>
+    <dgm:pt modelId="{2971BC93-77C3-4078-A105-8597E86CC05C}" type="pres">
+      <dgm:prSet presAssocID="{09E1FA74-CAD4-4D8F-8C9F-47DB10A12E4C}" presName="layout" presStyleCnt="0">
+        <dgm:presLayoutVars>
+          <dgm:chMax/>
+          <dgm:chPref/>
+          <dgm:dir/>
+          <dgm:resizeHandles/>
+        </dgm:presLayoutVars>
+      </dgm:prSet>
+      <dgm:spPr/>
+    </dgm:pt>
+    <dgm:pt modelId="{1AE39575-5131-457E-87D9-250C20E4AF30}" type="pres">
+      <dgm:prSet presAssocID="{B41D75AE-2A29-4277-8DBB-D5E9CED79C4D}" presName="root" presStyleCnt="0">
+        <dgm:presLayoutVars>
+          <dgm:chMax/>
+          <dgm:chPref/>
+        </dgm:presLayoutVars>
+      </dgm:prSet>
+      <dgm:spPr/>
+    </dgm:pt>
+    <dgm:pt modelId="{118FBAA4-28AC-4EB8-89A4-219E83C3BCBE}" type="pres">
+      <dgm:prSet presAssocID="{B41D75AE-2A29-4277-8DBB-D5E9CED79C4D}" presName="rootComposite" presStyleCnt="0">
+        <dgm:presLayoutVars/>
+      </dgm:prSet>
+      <dgm:spPr/>
+    </dgm:pt>
+    <dgm:pt modelId="{78E90345-FE91-47A7-8E8D-7EC91F8F325D}" type="pres">
+      <dgm:prSet presAssocID="{B41D75AE-2A29-4277-8DBB-D5E9CED79C4D}" presName="ParentAccent" presStyleLbl="alignNode1" presStyleIdx="0" presStyleCnt="2"/>
+      <dgm:spPr/>
+    </dgm:pt>
+    <dgm:pt modelId="{442AB41D-A8B9-4C81-AFE5-A9DDC7C501DB}" type="pres">
+      <dgm:prSet presAssocID="{B41D75AE-2A29-4277-8DBB-D5E9CED79C4D}" presName="ParentSmallAccent" presStyleLbl="fgAcc1" presStyleIdx="0" presStyleCnt="2"/>
+      <dgm:spPr/>
+    </dgm:pt>
+    <dgm:pt modelId="{F0A18B1E-4B8C-49D0-A2C5-B72A0992791A}" type="pres">
+      <dgm:prSet presAssocID="{B41D75AE-2A29-4277-8DBB-D5E9CED79C4D}" presName="Parent" presStyleLbl="revTx" presStyleIdx="0" presStyleCnt="8">
+        <dgm:presLayoutVars>
+          <dgm:chMax/>
+          <dgm:chPref val="4"/>
+          <dgm:bulletEnabled val="1"/>
+        </dgm:presLayoutVars>
+      </dgm:prSet>
+      <dgm:spPr/>
+    </dgm:pt>
+    <dgm:pt modelId="{0FA6566D-FEDB-48F5-ABEA-024A465C109F}" type="pres">
+      <dgm:prSet presAssocID="{B41D75AE-2A29-4277-8DBB-D5E9CED79C4D}" presName="childShape" presStyleCnt="0">
+        <dgm:presLayoutVars>
+          <dgm:chMax val="0"/>
+          <dgm:chPref val="0"/>
+        </dgm:presLayoutVars>
+      </dgm:prSet>
+      <dgm:spPr/>
+    </dgm:pt>
+    <dgm:pt modelId="{62A25A0F-804E-414B-B883-656CEF17090B}" type="pres">
+      <dgm:prSet presAssocID="{B2A72572-DD94-49F3-9C74-F97F76DD77E8}" presName="childComposite" presStyleCnt="0">
+        <dgm:presLayoutVars>
+          <dgm:chMax val="0"/>
+          <dgm:chPref val="0"/>
+        </dgm:presLayoutVars>
+      </dgm:prSet>
+      <dgm:spPr/>
+    </dgm:pt>
+    <dgm:pt modelId="{8A80B33F-319E-4097-BABE-6D06200B4059}" type="pres">
+      <dgm:prSet presAssocID="{B2A72572-DD94-49F3-9C74-F97F76DD77E8}" presName="ChildAccent" presStyleLbl="solidFgAcc1" presStyleIdx="0" presStyleCnt="6"/>
+      <dgm:spPr/>
+    </dgm:pt>
+    <dgm:pt modelId="{22C7BCBD-CEEE-4C3C-8575-8FCB6CDA438E}" type="pres">
+      <dgm:prSet presAssocID="{B2A72572-DD94-49F3-9C74-F97F76DD77E8}" presName="Child" presStyleLbl="revTx" presStyleIdx="1" presStyleCnt="8">
+        <dgm:presLayoutVars>
+          <dgm:chMax val="0"/>
+          <dgm:chPref val="0"/>
+          <dgm:bulletEnabled val="1"/>
+        </dgm:presLayoutVars>
+      </dgm:prSet>
+      <dgm:spPr/>
+    </dgm:pt>
+    <dgm:pt modelId="{714E1039-AB1A-451F-B96D-3478333B02AD}" type="pres">
+      <dgm:prSet presAssocID="{8AB1D12E-E418-4915-8CED-6AB0C84761F4}" presName="childComposite" presStyleCnt="0">
+        <dgm:presLayoutVars>
+          <dgm:chMax val="0"/>
+          <dgm:chPref val="0"/>
+        </dgm:presLayoutVars>
+      </dgm:prSet>
+      <dgm:spPr/>
+    </dgm:pt>
+    <dgm:pt modelId="{FDEBDDC6-2C76-49BA-AA17-2EC6B30C86BD}" type="pres">
+      <dgm:prSet presAssocID="{8AB1D12E-E418-4915-8CED-6AB0C84761F4}" presName="ChildAccent" presStyleLbl="solidFgAcc1" presStyleIdx="1" presStyleCnt="6"/>
+      <dgm:spPr/>
+    </dgm:pt>
+    <dgm:pt modelId="{B93FB06B-349E-4C46-9386-C2A7693F919C}" type="pres">
+      <dgm:prSet presAssocID="{8AB1D12E-E418-4915-8CED-6AB0C84761F4}" presName="Child" presStyleLbl="revTx" presStyleIdx="2" presStyleCnt="8">
+        <dgm:presLayoutVars>
+          <dgm:chMax val="0"/>
+          <dgm:chPref val="0"/>
+          <dgm:bulletEnabled val="1"/>
+        </dgm:presLayoutVars>
+      </dgm:prSet>
+      <dgm:spPr/>
+    </dgm:pt>
+    <dgm:pt modelId="{5FAF6DA5-2465-4BF5-9700-5D88837B55E0}" type="pres">
+      <dgm:prSet presAssocID="{AC6C1CB8-BE46-44FC-93D0-1A13ABC82896}" presName="childComposite" presStyleCnt="0">
+        <dgm:presLayoutVars>
+          <dgm:chMax val="0"/>
+          <dgm:chPref val="0"/>
+        </dgm:presLayoutVars>
+      </dgm:prSet>
+      <dgm:spPr/>
+    </dgm:pt>
+    <dgm:pt modelId="{F1021B75-F18F-4829-9EBD-5BA808E16033}" type="pres">
+      <dgm:prSet presAssocID="{AC6C1CB8-BE46-44FC-93D0-1A13ABC82896}" presName="ChildAccent" presStyleLbl="solidFgAcc1" presStyleIdx="2" presStyleCnt="6"/>
+      <dgm:spPr/>
+    </dgm:pt>
+    <dgm:pt modelId="{3094B189-7DCD-4266-B46D-8752B3C3A89E}" type="pres">
+      <dgm:prSet presAssocID="{AC6C1CB8-BE46-44FC-93D0-1A13ABC82896}" presName="Child" presStyleLbl="revTx" presStyleIdx="3" presStyleCnt="8">
+        <dgm:presLayoutVars>
+          <dgm:chMax val="0"/>
+          <dgm:chPref val="0"/>
+          <dgm:bulletEnabled val="1"/>
+        </dgm:presLayoutVars>
+      </dgm:prSet>
+      <dgm:spPr/>
+    </dgm:pt>
+    <dgm:pt modelId="{4739CC76-1879-4428-9113-81461854485F}" type="pres">
+      <dgm:prSet presAssocID="{AAC17C87-31E8-4276-B5AF-B8910E5CA9AA}" presName="root" presStyleCnt="0">
+        <dgm:presLayoutVars>
+          <dgm:chMax/>
+          <dgm:chPref/>
+        </dgm:presLayoutVars>
+      </dgm:prSet>
+      <dgm:spPr/>
+    </dgm:pt>
+    <dgm:pt modelId="{1005F66E-C10C-47D4-A53B-66F12BDBC241}" type="pres">
+      <dgm:prSet presAssocID="{AAC17C87-31E8-4276-B5AF-B8910E5CA9AA}" presName="rootComposite" presStyleCnt="0">
+        <dgm:presLayoutVars/>
+      </dgm:prSet>
+      <dgm:spPr/>
+    </dgm:pt>
+    <dgm:pt modelId="{1101818C-F9E6-48B1-8106-9EDF7C77010F}" type="pres">
+      <dgm:prSet presAssocID="{AAC17C87-31E8-4276-B5AF-B8910E5CA9AA}" presName="ParentAccent" presStyleLbl="alignNode1" presStyleIdx="1" presStyleCnt="2"/>
+      <dgm:spPr/>
+    </dgm:pt>
+    <dgm:pt modelId="{84502440-DF3A-49DD-9E3E-7B520195C2F2}" type="pres">
+      <dgm:prSet presAssocID="{AAC17C87-31E8-4276-B5AF-B8910E5CA9AA}" presName="ParentSmallAccent" presStyleLbl="fgAcc1" presStyleIdx="1" presStyleCnt="2"/>
+      <dgm:spPr/>
+    </dgm:pt>
+    <dgm:pt modelId="{920C1E90-5036-40EE-8B7B-C03BC172C6F4}" type="pres">
+      <dgm:prSet presAssocID="{AAC17C87-31E8-4276-B5AF-B8910E5CA9AA}" presName="Parent" presStyleLbl="revTx" presStyleIdx="4" presStyleCnt="8">
+        <dgm:presLayoutVars>
+          <dgm:chMax/>
+          <dgm:chPref val="4"/>
+          <dgm:bulletEnabled val="1"/>
+        </dgm:presLayoutVars>
+      </dgm:prSet>
+      <dgm:spPr/>
+    </dgm:pt>
+    <dgm:pt modelId="{8916CAB2-5D03-4865-BE99-9310931B985C}" type="pres">
+      <dgm:prSet presAssocID="{AAC17C87-31E8-4276-B5AF-B8910E5CA9AA}" presName="childShape" presStyleCnt="0">
+        <dgm:presLayoutVars>
+          <dgm:chMax val="0"/>
+          <dgm:chPref val="0"/>
+        </dgm:presLayoutVars>
+      </dgm:prSet>
+      <dgm:spPr/>
+    </dgm:pt>
+    <dgm:pt modelId="{108F68D3-5B08-4715-A9C5-FF97D1351BC4}" type="pres">
+      <dgm:prSet presAssocID="{22AB3F71-BC8F-4768-888B-F6E1856CFD5B}" presName="childComposite" presStyleCnt="0">
+        <dgm:presLayoutVars>
+          <dgm:chMax val="0"/>
+          <dgm:chPref val="0"/>
+        </dgm:presLayoutVars>
+      </dgm:prSet>
+      <dgm:spPr/>
+    </dgm:pt>
+    <dgm:pt modelId="{AC7AB7D7-9945-4B50-9E90-95E126A5DEAB}" type="pres">
+      <dgm:prSet presAssocID="{22AB3F71-BC8F-4768-888B-F6E1856CFD5B}" presName="ChildAccent" presStyleLbl="solidFgAcc1" presStyleIdx="3" presStyleCnt="6"/>
+      <dgm:spPr/>
+    </dgm:pt>
+    <dgm:pt modelId="{D13322E5-B7AE-4570-A9FC-84DF641F4452}" type="pres">
+      <dgm:prSet presAssocID="{22AB3F71-BC8F-4768-888B-F6E1856CFD5B}" presName="Child" presStyleLbl="revTx" presStyleIdx="5" presStyleCnt="8">
+        <dgm:presLayoutVars>
+          <dgm:chMax val="0"/>
+          <dgm:chPref val="0"/>
+          <dgm:bulletEnabled val="1"/>
+        </dgm:presLayoutVars>
+      </dgm:prSet>
+      <dgm:spPr/>
+    </dgm:pt>
+    <dgm:pt modelId="{04D70E1E-E0BB-4881-94EE-5A0B1EA590AE}" type="pres">
+      <dgm:prSet presAssocID="{3973E519-921D-4357-808F-65EA81567642}" presName="childComposite" presStyleCnt="0">
+        <dgm:presLayoutVars>
+          <dgm:chMax val="0"/>
+          <dgm:chPref val="0"/>
+        </dgm:presLayoutVars>
+      </dgm:prSet>
+      <dgm:spPr/>
+    </dgm:pt>
+    <dgm:pt modelId="{51818F82-5864-453D-89E1-3C9A291A4AF3}" type="pres">
+      <dgm:prSet presAssocID="{3973E519-921D-4357-808F-65EA81567642}" presName="ChildAccent" presStyleLbl="solidFgAcc1" presStyleIdx="4" presStyleCnt="6"/>
+      <dgm:spPr/>
+    </dgm:pt>
+    <dgm:pt modelId="{37B72757-B95B-4606-93FF-4ADF0BB6D429}" type="pres">
+      <dgm:prSet presAssocID="{3973E519-921D-4357-808F-65EA81567642}" presName="Child" presStyleLbl="revTx" presStyleIdx="6" presStyleCnt="8">
+        <dgm:presLayoutVars>
+          <dgm:chMax val="0"/>
+          <dgm:chPref val="0"/>
+          <dgm:bulletEnabled val="1"/>
+        </dgm:presLayoutVars>
+      </dgm:prSet>
+      <dgm:spPr/>
+    </dgm:pt>
+    <dgm:pt modelId="{FEBF50CC-C092-4B47-ACC4-1B61B3D473F4}" type="pres">
+      <dgm:prSet presAssocID="{25E09C33-42FD-4F52-8CB0-452BF541B7EE}" presName="childComposite" presStyleCnt="0">
+        <dgm:presLayoutVars>
+          <dgm:chMax val="0"/>
+          <dgm:chPref val="0"/>
+        </dgm:presLayoutVars>
+      </dgm:prSet>
+      <dgm:spPr/>
+    </dgm:pt>
+    <dgm:pt modelId="{EF37E1C5-C3F1-4532-9E9C-884D1DE44A7F}" type="pres">
+      <dgm:prSet presAssocID="{25E09C33-42FD-4F52-8CB0-452BF541B7EE}" presName="ChildAccent" presStyleLbl="solidFgAcc1" presStyleIdx="5" presStyleCnt="6"/>
+      <dgm:spPr/>
+    </dgm:pt>
+    <dgm:pt modelId="{310F8D48-7B6A-4438-922B-86FD094F44BF}" type="pres">
+      <dgm:prSet presAssocID="{25E09C33-42FD-4F52-8CB0-452BF541B7EE}" presName="Child" presStyleLbl="revTx" presStyleIdx="7" presStyleCnt="8">
+        <dgm:presLayoutVars>
+          <dgm:chMax val="0"/>
+          <dgm:chPref val="0"/>
+          <dgm:bulletEnabled val="1"/>
+        </dgm:presLayoutVars>
+      </dgm:prSet>
+      <dgm:spPr/>
+    </dgm:pt>
+  </dgm:ptLst>
+  <dgm:cxnLst>
+    <dgm:cxn modelId="{81B1CFBD-C7CF-48AB-9083-40917936C34C}" type="presOf" srcId="{22AB3F71-BC8F-4768-888B-F6E1856CFD5B}" destId="{D13322E5-B7AE-4570-A9FC-84DF641F4452}" srcOrd="0" destOrd="0" presId="urn:microsoft.com/office/officeart/2008/layout/SquareAccentList"/>
+    <dgm:cxn modelId="{20432680-5755-4423-833B-CC830ADE86E0}" type="presOf" srcId="{AC6C1CB8-BE46-44FC-93D0-1A13ABC82896}" destId="{3094B189-7DCD-4266-B46D-8752B3C3A89E}" srcOrd="0" destOrd="0" presId="urn:microsoft.com/office/officeart/2008/layout/SquareAccentList"/>
+    <dgm:cxn modelId="{9A6ED448-CFA2-47B1-840B-9E2EC9DFCAC6}" type="presOf" srcId="{8AB1D12E-E418-4915-8CED-6AB0C84761F4}" destId="{B93FB06B-349E-4C46-9386-C2A7693F919C}" srcOrd="0" destOrd="0" presId="urn:microsoft.com/office/officeart/2008/layout/SquareAccentList"/>
+    <dgm:cxn modelId="{60B80743-7E71-47A9-8589-B22F3F761233}" srcId="{B41D75AE-2A29-4277-8DBB-D5E9CED79C4D}" destId="{B2A72572-DD94-49F3-9C74-F97F76DD77E8}" srcOrd="0" destOrd="0" parTransId="{BE5BBF08-CB6C-410D-95EE-BD5BF25A6309}" sibTransId="{CFA313D8-C3A9-4765-881F-FD14965CDD61}"/>
+    <dgm:cxn modelId="{72C0EA02-CE57-4BCE-9DFC-77D06D07A6E0}" type="presOf" srcId="{09E1FA74-CAD4-4D8F-8C9F-47DB10A12E4C}" destId="{2971BC93-77C3-4078-A105-8597E86CC05C}" srcOrd="0" destOrd="0" presId="urn:microsoft.com/office/officeart/2008/layout/SquareAccentList"/>
+    <dgm:cxn modelId="{1F206E67-18A9-468B-81B0-CFC639595DB4}" type="presOf" srcId="{AAC17C87-31E8-4276-B5AF-B8910E5CA9AA}" destId="{920C1E90-5036-40EE-8B7B-C03BC172C6F4}" srcOrd="0" destOrd="0" presId="urn:microsoft.com/office/officeart/2008/layout/SquareAccentList"/>
+    <dgm:cxn modelId="{47F9B3B4-FA63-45BD-B156-69D5C1732BE8}" srcId="{AAC17C87-31E8-4276-B5AF-B8910E5CA9AA}" destId="{22AB3F71-BC8F-4768-888B-F6E1856CFD5B}" srcOrd="0" destOrd="0" parTransId="{72548C30-62AA-4264-A91B-6E316ED2D1D5}" sibTransId="{C9F02517-C147-4C66-A0F0-11E0F557FBA6}"/>
+    <dgm:cxn modelId="{1DC85611-0410-4ED4-8902-8BD2FFC85606}" type="presOf" srcId="{3973E519-921D-4357-808F-65EA81567642}" destId="{37B72757-B95B-4606-93FF-4ADF0BB6D429}" srcOrd="0" destOrd="0" presId="urn:microsoft.com/office/officeart/2008/layout/SquareAccentList"/>
+    <dgm:cxn modelId="{8ABF67CD-DAC4-41A3-926E-140CF6F92A23}" srcId="{B41D75AE-2A29-4277-8DBB-D5E9CED79C4D}" destId="{8AB1D12E-E418-4915-8CED-6AB0C84761F4}" srcOrd="1" destOrd="0" parTransId="{1BE8EC8D-27D7-49EA-907A-2F9B0ACF5DCA}" sibTransId="{293C271F-A78D-436A-A6CB-17A318394333}"/>
+    <dgm:cxn modelId="{3CFC8CA8-DC62-44AE-9367-B51D186B6958}" srcId="{09E1FA74-CAD4-4D8F-8C9F-47DB10A12E4C}" destId="{AAC17C87-31E8-4276-B5AF-B8910E5CA9AA}" srcOrd="1" destOrd="0" parTransId="{7EA781CD-E6A2-4979-963F-9C9A0A1B2730}" sibTransId="{B37090C3-402B-4158-91BD-832F4000D4BA}"/>
+    <dgm:cxn modelId="{E985D23C-CEF3-49BA-B2AA-6039D6462C30}" srcId="{B41D75AE-2A29-4277-8DBB-D5E9CED79C4D}" destId="{AC6C1CB8-BE46-44FC-93D0-1A13ABC82896}" srcOrd="2" destOrd="0" parTransId="{368D3FFA-1706-4155-9796-459F27FB3F7F}" sibTransId="{47583708-E552-4706-B015-578F522A21EB}"/>
+    <dgm:cxn modelId="{762F7717-D26E-4D1C-A6FD-498F6E1B02A3}" srcId="{AAC17C87-31E8-4276-B5AF-B8910E5CA9AA}" destId="{3973E519-921D-4357-808F-65EA81567642}" srcOrd="1" destOrd="0" parTransId="{74AF20CE-7799-4C8E-A894-EE0C2D449A5F}" sibTransId="{ED0B01CC-F5BD-4E3D-9811-96F476147302}"/>
+    <dgm:cxn modelId="{2FFE2D2F-5254-486D-A83F-5A8A96275BDB}" srcId="{AAC17C87-31E8-4276-B5AF-B8910E5CA9AA}" destId="{25E09C33-42FD-4F52-8CB0-452BF541B7EE}" srcOrd="2" destOrd="0" parTransId="{2E5C60CF-085B-4C66-A01B-83A3AF9AC5CE}" sibTransId="{F9299BC1-DA27-4702-A02B-E2D61037A6E5}"/>
+    <dgm:cxn modelId="{8AA5F746-7156-4DB2-A9F1-5EE035A94C1A}" type="presOf" srcId="{25E09C33-42FD-4F52-8CB0-452BF541B7EE}" destId="{310F8D48-7B6A-4438-922B-86FD094F44BF}" srcOrd="0" destOrd="0" presId="urn:microsoft.com/office/officeart/2008/layout/SquareAccentList"/>
+    <dgm:cxn modelId="{94F1B5B2-61A2-400D-A8C6-E55B5540F793}" type="presOf" srcId="{B41D75AE-2A29-4277-8DBB-D5E9CED79C4D}" destId="{F0A18B1E-4B8C-49D0-A2C5-B72A0992791A}" srcOrd="0" destOrd="0" presId="urn:microsoft.com/office/officeart/2008/layout/SquareAccentList"/>
+    <dgm:cxn modelId="{22916866-A373-422E-8CBF-39C46B6193BE}" type="presOf" srcId="{B2A72572-DD94-49F3-9C74-F97F76DD77E8}" destId="{22C7BCBD-CEEE-4C3C-8575-8FCB6CDA438E}" srcOrd="0" destOrd="0" presId="urn:microsoft.com/office/officeart/2008/layout/SquareAccentList"/>
+    <dgm:cxn modelId="{925D1D41-F295-4BF5-8F35-6B0283EB1660}" srcId="{09E1FA74-CAD4-4D8F-8C9F-47DB10A12E4C}" destId="{B41D75AE-2A29-4277-8DBB-D5E9CED79C4D}" srcOrd="0" destOrd="0" parTransId="{E4BA2DF7-CD16-40C5-8D39-63D87AB06BAE}" sibTransId="{49219BB6-AF08-4355-8AAC-CB63EB613BD5}"/>
+    <dgm:cxn modelId="{064285E3-34A1-4473-AFA2-984276405DD6}" type="presParOf" srcId="{2971BC93-77C3-4078-A105-8597E86CC05C}" destId="{1AE39575-5131-457E-87D9-250C20E4AF30}" srcOrd="0" destOrd="0" presId="urn:microsoft.com/office/officeart/2008/layout/SquareAccentList"/>
+    <dgm:cxn modelId="{6FBA1FB6-3AEF-4196-91D5-1E807F540EF6}" type="presParOf" srcId="{1AE39575-5131-457E-87D9-250C20E4AF30}" destId="{118FBAA4-28AC-4EB8-89A4-219E83C3BCBE}" srcOrd="0" destOrd="0" presId="urn:microsoft.com/office/officeart/2008/layout/SquareAccentList"/>
+    <dgm:cxn modelId="{C89C8E44-B260-4647-98D2-09067DCA96B7}" type="presParOf" srcId="{118FBAA4-28AC-4EB8-89A4-219E83C3BCBE}" destId="{78E90345-FE91-47A7-8E8D-7EC91F8F325D}" srcOrd="0" destOrd="0" presId="urn:microsoft.com/office/officeart/2008/layout/SquareAccentList"/>
+    <dgm:cxn modelId="{62B0852E-194D-4851-A725-4B11E4EB9B80}" type="presParOf" srcId="{118FBAA4-28AC-4EB8-89A4-219E83C3BCBE}" destId="{442AB41D-A8B9-4C81-AFE5-A9DDC7C501DB}" srcOrd="1" destOrd="0" presId="urn:microsoft.com/office/officeart/2008/layout/SquareAccentList"/>
+    <dgm:cxn modelId="{6CD04290-FCC8-4B09-8AA6-49294D463217}" type="presParOf" srcId="{118FBAA4-28AC-4EB8-89A4-219E83C3BCBE}" destId="{F0A18B1E-4B8C-49D0-A2C5-B72A0992791A}" srcOrd="2" destOrd="0" presId="urn:microsoft.com/office/officeart/2008/layout/SquareAccentList"/>
+    <dgm:cxn modelId="{05DFAC3D-505B-4515-ACD2-97604A8BE151}" type="presParOf" srcId="{1AE39575-5131-457E-87D9-250C20E4AF30}" destId="{0FA6566D-FEDB-48F5-ABEA-024A465C109F}" srcOrd="1" destOrd="0" presId="urn:microsoft.com/office/officeart/2008/layout/SquareAccentList"/>
+    <dgm:cxn modelId="{70D09C4E-D529-4E3B-8D21-E233E1ABF527}" type="presParOf" srcId="{0FA6566D-FEDB-48F5-ABEA-024A465C109F}" destId="{62A25A0F-804E-414B-B883-656CEF17090B}" srcOrd="0" destOrd="0" presId="urn:microsoft.com/office/officeart/2008/layout/SquareAccentList"/>
+    <dgm:cxn modelId="{3D22A1D3-A3A9-4474-A2D7-685D833743C9}" type="presParOf" srcId="{62A25A0F-804E-414B-B883-656CEF17090B}" destId="{8A80B33F-319E-4097-BABE-6D06200B4059}" srcOrd="0" destOrd="0" presId="urn:microsoft.com/office/officeart/2008/layout/SquareAccentList"/>
+    <dgm:cxn modelId="{18EB0A53-4332-4257-AB55-63DA3B0BFD82}" type="presParOf" srcId="{62A25A0F-804E-414B-B883-656CEF17090B}" destId="{22C7BCBD-CEEE-4C3C-8575-8FCB6CDA438E}" srcOrd="1" destOrd="0" presId="urn:microsoft.com/office/officeart/2008/layout/SquareAccentList"/>
+    <dgm:cxn modelId="{5823D72D-3540-4A8B-B387-7192795A683F}" type="presParOf" srcId="{0FA6566D-FEDB-48F5-ABEA-024A465C109F}" destId="{714E1039-AB1A-451F-B96D-3478333B02AD}" srcOrd="1" destOrd="0" presId="urn:microsoft.com/office/officeart/2008/layout/SquareAccentList"/>
+    <dgm:cxn modelId="{92CD0294-1722-4E79-BA90-97CD3DD70786}" type="presParOf" srcId="{714E1039-AB1A-451F-B96D-3478333B02AD}" destId="{FDEBDDC6-2C76-49BA-AA17-2EC6B30C86BD}" srcOrd="0" destOrd="0" presId="urn:microsoft.com/office/officeart/2008/layout/SquareAccentList"/>
+    <dgm:cxn modelId="{B0FF0511-8CA4-4F72-8C5B-73521FE41346}" type="presParOf" srcId="{714E1039-AB1A-451F-B96D-3478333B02AD}" destId="{B93FB06B-349E-4C46-9386-C2A7693F919C}" srcOrd="1" destOrd="0" presId="urn:microsoft.com/office/officeart/2008/layout/SquareAccentList"/>
+    <dgm:cxn modelId="{CA2B5D92-EB9C-44E3-B458-849C11F32090}" type="presParOf" srcId="{0FA6566D-FEDB-48F5-ABEA-024A465C109F}" destId="{5FAF6DA5-2465-4BF5-9700-5D88837B55E0}" srcOrd="2" destOrd="0" presId="urn:microsoft.com/office/officeart/2008/layout/SquareAccentList"/>
+    <dgm:cxn modelId="{07C6BB04-A71E-493F-B159-CE6831D71A16}" type="presParOf" srcId="{5FAF6DA5-2465-4BF5-9700-5D88837B55E0}" destId="{F1021B75-F18F-4829-9EBD-5BA808E16033}" srcOrd="0" destOrd="0" presId="urn:microsoft.com/office/officeart/2008/layout/SquareAccentList"/>
+    <dgm:cxn modelId="{6134D06E-0E1A-4949-8043-06C5BFC99124}" type="presParOf" srcId="{5FAF6DA5-2465-4BF5-9700-5D88837B55E0}" destId="{3094B189-7DCD-4266-B46D-8752B3C3A89E}" srcOrd="1" destOrd="0" presId="urn:microsoft.com/office/officeart/2008/layout/SquareAccentList"/>
+    <dgm:cxn modelId="{61B1DDD9-DF31-4FD2-BCD6-5D62F42D67C4}" type="presParOf" srcId="{2971BC93-77C3-4078-A105-8597E86CC05C}" destId="{4739CC76-1879-4428-9113-81461854485F}" srcOrd="1" destOrd="0" presId="urn:microsoft.com/office/officeart/2008/layout/SquareAccentList"/>
+    <dgm:cxn modelId="{6FEEADF2-9EB5-4C48-B124-CD57F8D27BCC}" type="presParOf" srcId="{4739CC76-1879-4428-9113-81461854485F}" destId="{1005F66E-C10C-47D4-A53B-66F12BDBC241}" srcOrd="0" destOrd="0" presId="urn:microsoft.com/office/officeart/2008/layout/SquareAccentList"/>
+    <dgm:cxn modelId="{7E03ACA1-154F-48C2-B69A-0E2F8CDA2A38}" type="presParOf" srcId="{1005F66E-C10C-47D4-A53B-66F12BDBC241}" destId="{1101818C-F9E6-48B1-8106-9EDF7C77010F}" srcOrd="0" destOrd="0" presId="urn:microsoft.com/office/officeart/2008/layout/SquareAccentList"/>
+    <dgm:cxn modelId="{51280580-404E-4448-BF68-076553029427}" type="presParOf" srcId="{1005F66E-C10C-47D4-A53B-66F12BDBC241}" destId="{84502440-DF3A-49DD-9E3E-7B520195C2F2}" srcOrd="1" destOrd="0" presId="urn:microsoft.com/office/officeart/2008/layout/SquareAccentList"/>
+    <dgm:cxn modelId="{136F5C26-E167-4D3C-ADC8-FCB42DE05201}" type="presParOf" srcId="{1005F66E-C10C-47D4-A53B-66F12BDBC241}" destId="{920C1E90-5036-40EE-8B7B-C03BC172C6F4}" srcOrd="2" destOrd="0" presId="urn:microsoft.com/office/officeart/2008/layout/SquareAccentList"/>
+    <dgm:cxn modelId="{E6E09298-BA97-40C7-A3C5-FCE9707378D8}" type="presParOf" srcId="{4739CC76-1879-4428-9113-81461854485F}" destId="{8916CAB2-5D03-4865-BE99-9310931B985C}" srcOrd="1" destOrd="0" presId="urn:microsoft.com/office/officeart/2008/layout/SquareAccentList"/>
+    <dgm:cxn modelId="{352A1B73-1A14-45E7-AF0D-E6FE052C2E41}" type="presParOf" srcId="{8916CAB2-5D03-4865-BE99-9310931B985C}" destId="{108F68D3-5B08-4715-A9C5-FF97D1351BC4}" srcOrd="0" destOrd="0" presId="urn:microsoft.com/office/officeart/2008/layout/SquareAccentList"/>
+    <dgm:cxn modelId="{113F84C5-6AEC-41EC-8D35-7ECDE1842C51}" type="presParOf" srcId="{108F68D3-5B08-4715-A9C5-FF97D1351BC4}" destId="{AC7AB7D7-9945-4B50-9E90-95E126A5DEAB}" srcOrd="0" destOrd="0" presId="urn:microsoft.com/office/officeart/2008/layout/SquareAccentList"/>
+    <dgm:cxn modelId="{B7E2B464-1FFC-427D-A39A-18B5E769EC8F}" type="presParOf" srcId="{108F68D3-5B08-4715-A9C5-FF97D1351BC4}" destId="{D13322E5-B7AE-4570-A9FC-84DF641F4452}" srcOrd="1" destOrd="0" presId="urn:microsoft.com/office/officeart/2008/layout/SquareAccentList"/>
+    <dgm:cxn modelId="{5813F726-CB40-47DA-B917-73D6F5146105}" type="presParOf" srcId="{8916CAB2-5D03-4865-BE99-9310931B985C}" destId="{04D70E1E-E0BB-4881-94EE-5A0B1EA590AE}" srcOrd="1" destOrd="0" presId="urn:microsoft.com/office/officeart/2008/layout/SquareAccentList"/>
+    <dgm:cxn modelId="{D8153181-E850-48CA-9A30-DAF70FF3041C}" type="presParOf" srcId="{04D70E1E-E0BB-4881-94EE-5A0B1EA590AE}" destId="{51818F82-5864-453D-89E1-3C9A291A4AF3}" srcOrd="0" destOrd="0" presId="urn:microsoft.com/office/officeart/2008/layout/SquareAccentList"/>
+    <dgm:cxn modelId="{A9E74956-7528-499A-8C6A-B67D7D05888D}" type="presParOf" srcId="{04D70E1E-E0BB-4881-94EE-5A0B1EA590AE}" destId="{37B72757-B95B-4606-93FF-4ADF0BB6D429}" srcOrd="1" destOrd="0" presId="urn:microsoft.com/office/officeart/2008/layout/SquareAccentList"/>
+    <dgm:cxn modelId="{C64494B5-2CD3-443E-8E20-4C084DE346B7}" type="presParOf" srcId="{8916CAB2-5D03-4865-BE99-9310931B985C}" destId="{FEBF50CC-C092-4B47-ACC4-1B61B3D473F4}" srcOrd="2" destOrd="0" presId="urn:microsoft.com/office/officeart/2008/layout/SquareAccentList"/>
+    <dgm:cxn modelId="{EF339190-358A-4B7A-9842-B5186CBA9698}" type="presParOf" srcId="{FEBF50CC-C092-4B47-ACC4-1B61B3D473F4}" destId="{EF37E1C5-C3F1-4532-9E9C-884D1DE44A7F}" srcOrd="0" destOrd="0" presId="urn:microsoft.com/office/officeart/2008/layout/SquareAccentList"/>
+    <dgm:cxn modelId="{4A2C66FD-EEEC-4FEB-9884-9EC7B80172AA}" type="presParOf" srcId="{FEBF50CC-C092-4B47-ACC4-1B61B3D473F4}" destId="{310F8D48-7B6A-4438-922B-86FD094F44BF}" srcOrd="1" destOrd="0" presId="urn:microsoft.com/office/officeart/2008/layout/SquareAccentList"/>
+  </dgm:cxnLst>
+  <dgm:bg/>
+  <dgm:whole/>
+  <dgm:extLst>
+    <a:ext uri="http://schemas.microsoft.com/office/drawing/2008/diagram">
+      <dsp:dataModelExt xmlns:dsp="http://schemas.microsoft.com/office/drawing/2008/diagram" relId="rId6" minVer="http://schemas.openxmlformats.org/drawingml/2006/diagram"/>
+    </a:ext>
+  </dgm:extLst>
+</dgm:dataModel>
+</file>
+
+<file path=ppt/diagrams/data4.xml><?xml version="1.0" encoding="utf-8"?>
 <dgm:dataModel xmlns:dgm="http://schemas.openxmlformats.org/drawingml/2006/diagram" xmlns:a="http://schemas.openxmlformats.org/drawingml/2006/main">
   <dgm:ptLst>
     <dgm:pt modelId="{4412B91F-CF8D-4A42-83DF-7CDCCDA80F7D}" type="doc">
@@ -5987,30 +7305,30 @@
     </dgm:pt>
   </dgm:ptLst>
   <dgm:cxnLst>
+    <dgm:cxn modelId="{C9B3EE4E-01DF-4274-A896-B826614E44E8}" type="presOf" srcId="{1198010A-7CD9-47DF-8300-D5AB8FDF717B}" destId="{77351131-57DF-4AF2-A89D-95AF9C6149DC}" srcOrd="0" destOrd="1" presId="urn:microsoft.com/office/officeart/2005/8/layout/hProcess4"/>
+    <dgm:cxn modelId="{D8151DDD-A87C-4D2A-AE89-DC88BEAD8F5E}" type="presOf" srcId="{1198010A-7CD9-47DF-8300-D5AB8FDF717B}" destId="{CEA85225-BA33-4729-B542-7DD51242ADCB}" srcOrd="1" destOrd="1" presId="urn:microsoft.com/office/officeart/2005/8/layout/hProcess4"/>
     <dgm:cxn modelId="{4696573D-7AAF-40C4-A299-E5634AF135CD}" type="presOf" srcId="{80BADE98-2C43-40D5-937A-874A1B627145}" destId="{388BBD37-9C2B-4172-8678-CDF3BB968BFB}" srcOrd="1" destOrd="0" presId="urn:microsoft.com/office/officeart/2005/8/layout/hProcess4"/>
+    <dgm:cxn modelId="{96F1515C-012C-4FBA-939B-73396FC64F01}" type="presOf" srcId="{7DFE07BF-9A88-4152-9E58-09C9E20DB3CE}" destId="{168FD8A5-9BA3-47FA-8D32-ED60BCA98D24}" srcOrd="0" destOrd="0" presId="urn:microsoft.com/office/officeart/2005/8/layout/hProcess4"/>
+    <dgm:cxn modelId="{5CB851DE-B309-4D32-BF02-58D05478E534}" srcId="{7DFE07BF-9A88-4152-9E58-09C9E20DB3CE}" destId="{7F7E1F91-F6F4-48A9-B4FA-337B2EBD2C9A}" srcOrd="0" destOrd="0" parTransId="{0796D45F-4D57-413D-A4BB-33573B2F1CF3}" sibTransId="{0FC519C8-F4CD-4D2A-B852-2C233866BAF3}"/>
     <dgm:cxn modelId="{BF29565E-C27D-4C89-8F7E-C084E8C699E7}" srcId="{7DFE07BF-9A88-4152-9E58-09C9E20DB3CE}" destId="{1198010A-7CD9-47DF-8300-D5AB8FDF717B}" srcOrd="1" destOrd="0" parTransId="{67755E1A-2705-4297-9986-0E390CA27394}" sibTransId="{0231FB8D-A362-4F4A-8E56-6DAC699F1D6F}"/>
-    <dgm:cxn modelId="{D8151DDD-A87C-4D2A-AE89-DC88BEAD8F5E}" type="presOf" srcId="{1198010A-7CD9-47DF-8300-D5AB8FDF717B}" destId="{CEA85225-BA33-4729-B542-7DD51242ADCB}" srcOrd="1" destOrd="1" presId="urn:microsoft.com/office/officeart/2005/8/layout/hProcess4"/>
+    <dgm:cxn modelId="{CABFBE03-3760-43FE-A793-4570B6274A4D}" type="presOf" srcId="{2F3DF7DE-E5C9-4440-80D1-538313244BE6}" destId="{39B7AE1B-7006-4AD9-AFC0-AD9AB09ED28C}" srcOrd="1" destOrd="0" presId="urn:microsoft.com/office/officeart/2005/8/layout/hProcess4"/>
+    <dgm:cxn modelId="{C730B313-4D1D-4229-8314-A3150E0294B1}" type="presOf" srcId="{E68D9850-B3A4-4979-A4D0-E3D401A29AB5}" destId="{BB47B8A7-A69A-47BA-8429-499D75D98923}" srcOrd="0" destOrd="0" presId="urn:microsoft.com/office/officeart/2005/8/layout/hProcess4"/>
+    <dgm:cxn modelId="{F52A89F1-D611-4436-8916-14DEFBEAC79D}" srcId="{4412B91F-CF8D-4A42-83DF-7CDCCDA80F7D}" destId="{7DFE07BF-9A88-4152-9E58-09C9E20DB3CE}" srcOrd="0" destOrd="0" parTransId="{F2C6A117-64F1-4ED9-9C2B-9510107D76CB}" sibTransId="{E68D9850-B3A4-4979-A4D0-E3D401A29AB5}"/>
+    <dgm:cxn modelId="{286DB79C-095B-4A03-8241-456F11CF2F5D}" srcId="{F3A2DAB8-2AB9-419A-82D3-D743A16978C8}" destId="{FFBB95A5-64CA-4277-8EC9-9A4877C06A11}" srcOrd="1" destOrd="0" parTransId="{E5A1EA11-2B41-4DD3-8BF1-0CF84454CAE5}" sibTransId="{49EC4B80-42F4-4C68-8C02-F267FE81602E}"/>
+    <dgm:cxn modelId="{9ED5A29A-4F56-4F4A-943D-8B8035CAB709}" type="presOf" srcId="{FFBB95A5-64CA-4277-8EC9-9A4877C06A11}" destId="{AE566E9F-D101-4F88-9692-208EF2AE8557}" srcOrd="0" destOrd="1" presId="urn:microsoft.com/office/officeart/2005/8/layout/hProcess4"/>
+    <dgm:cxn modelId="{B4DEC388-DC62-483F-A05C-5555B345D4B2}" type="presOf" srcId="{7F7E1F91-F6F4-48A9-B4FA-337B2EBD2C9A}" destId="{77351131-57DF-4AF2-A89D-95AF9C6149DC}" srcOrd="0" destOrd="0" presId="urn:microsoft.com/office/officeart/2005/8/layout/hProcess4"/>
+    <dgm:cxn modelId="{076FA099-FCD5-4C11-8A08-746949589EB9}" type="presOf" srcId="{FFBB95A5-64CA-4277-8EC9-9A4877C06A11}" destId="{388BBD37-9C2B-4172-8678-CDF3BB968BFB}" srcOrd="1" destOrd="1" presId="urn:microsoft.com/office/officeart/2005/8/layout/hProcess4"/>
+    <dgm:cxn modelId="{FD321DDD-0FBF-4119-B35F-BF41A6D1FACA}" type="presOf" srcId="{80BADE98-2C43-40D5-937A-874A1B627145}" destId="{AE566E9F-D101-4F88-9692-208EF2AE8557}" srcOrd="0" destOrd="0" presId="urn:microsoft.com/office/officeart/2005/8/layout/hProcess4"/>
+    <dgm:cxn modelId="{C03BE492-3E48-4B5B-B223-BD9B09A0499C}" type="presOf" srcId="{4412B91F-CF8D-4A42-83DF-7CDCCDA80F7D}" destId="{50C663CD-616C-44EE-98F1-BB5FDDDEDCC8}" srcOrd="0" destOrd="0" presId="urn:microsoft.com/office/officeart/2005/8/layout/hProcess4"/>
+    <dgm:cxn modelId="{66AF1316-005D-4157-AB49-7D09464E8313}" type="presOf" srcId="{7F7E1F91-F6F4-48A9-B4FA-337B2EBD2C9A}" destId="{CEA85225-BA33-4729-B542-7DD51242ADCB}" srcOrd="1" destOrd="0" presId="urn:microsoft.com/office/officeart/2005/8/layout/hProcess4"/>
+    <dgm:cxn modelId="{F6F5BFB7-87A2-418B-8A67-5193C4B8B5C2}" type="presOf" srcId="{3865D5FF-DA00-4906-B6F5-07C839464584}" destId="{85BA2879-403E-43AC-A59E-A90A5FACC251}" srcOrd="0" destOrd="0" presId="urn:microsoft.com/office/officeart/2005/8/layout/hProcess4"/>
+    <dgm:cxn modelId="{D058A61E-2631-4792-87A9-3570D8D2DB0F}" srcId="{3865D5FF-DA00-4906-B6F5-07C839464584}" destId="{2F3DF7DE-E5C9-4440-80D1-538313244BE6}" srcOrd="0" destOrd="0" parTransId="{3C0BC7DD-F66C-4719-92AE-5E9E7825604D}" sibTransId="{4569B2FB-90CA-4536-9206-69C81C9FC0BD}"/>
+    <dgm:cxn modelId="{81BAC1B0-D183-4179-9A55-029F538E675D}" srcId="{F3A2DAB8-2AB9-419A-82D3-D743A16978C8}" destId="{80BADE98-2C43-40D5-937A-874A1B627145}" srcOrd="0" destOrd="0" parTransId="{61694F4E-3BB3-4806-8315-F9C9DE55D766}" sibTransId="{1B940CC1-D5C1-4465-A2E5-B629FA2D9A4E}"/>
+    <dgm:cxn modelId="{E819844F-6C63-4A97-8468-0C16FFCB7637}" type="presOf" srcId="{2F3DF7DE-E5C9-4440-80D1-538313244BE6}" destId="{0C27C69B-3C82-4A7E-9AEC-146B678149A2}" srcOrd="0" destOrd="0" presId="urn:microsoft.com/office/officeart/2005/8/layout/hProcess4"/>
     <dgm:cxn modelId="{C9D8935F-6C23-483A-8258-A9CABF3C76B0}" srcId="{4412B91F-CF8D-4A42-83DF-7CDCCDA80F7D}" destId="{3865D5FF-DA00-4906-B6F5-07C839464584}" srcOrd="1" destOrd="0" parTransId="{49FB8D0F-E70F-4A66-9F99-3E0F33864CA6}" sibTransId="{CFF97A55-CF3E-4E1D-AF04-5A3631D6CB6D}"/>
     <dgm:cxn modelId="{A5D7F522-490D-4613-A205-B81A1D2FF7FB}" type="presOf" srcId="{F3A2DAB8-2AB9-419A-82D3-D743A16978C8}" destId="{301F9B7A-61FD-4D71-8D0E-DCB457B0DAC9}" srcOrd="0" destOrd="0" presId="urn:microsoft.com/office/officeart/2005/8/layout/hProcess4"/>
-    <dgm:cxn modelId="{CABFBE03-3760-43FE-A793-4570B6274A4D}" type="presOf" srcId="{2F3DF7DE-E5C9-4440-80D1-538313244BE6}" destId="{39B7AE1B-7006-4AD9-AFC0-AD9AB09ED28C}" srcOrd="1" destOrd="0" presId="urn:microsoft.com/office/officeart/2005/8/layout/hProcess4"/>
-    <dgm:cxn modelId="{E819844F-6C63-4A97-8468-0C16FFCB7637}" type="presOf" srcId="{2F3DF7DE-E5C9-4440-80D1-538313244BE6}" destId="{0C27C69B-3C82-4A7E-9AEC-146B678149A2}" srcOrd="0" destOrd="0" presId="urn:microsoft.com/office/officeart/2005/8/layout/hProcess4"/>
-    <dgm:cxn modelId="{5CB851DE-B309-4D32-BF02-58D05478E534}" srcId="{7DFE07BF-9A88-4152-9E58-09C9E20DB3CE}" destId="{7F7E1F91-F6F4-48A9-B4FA-337B2EBD2C9A}" srcOrd="0" destOrd="0" parTransId="{0796D45F-4D57-413D-A4BB-33573B2F1CF3}" sibTransId="{0FC519C8-F4CD-4D2A-B852-2C233866BAF3}"/>
-    <dgm:cxn modelId="{B4DEC388-DC62-483F-A05C-5555B345D4B2}" type="presOf" srcId="{7F7E1F91-F6F4-48A9-B4FA-337B2EBD2C9A}" destId="{77351131-57DF-4AF2-A89D-95AF9C6149DC}" srcOrd="0" destOrd="0" presId="urn:microsoft.com/office/officeart/2005/8/layout/hProcess4"/>
-    <dgm:cxn modelId="{9ED5A29A-4F56-4F4A-943D-8B8035CAB709}" type="presOf" srcId="{FFBB95A5-64CA-4277-8EC9-9A4877C06A11}" destId="{AE566E9F-D101-4F88-9692-208EF2AE8557}" srcOrd="0" destOrd="1" presId="urn:microsoft.com/office/officeart/2005/8/layout/hProcess4"/>
-    <dgm:cxn modelId="{286DB79C-095B-4A03-8241-456F11CF2F5D}" srcId="{F3A2DAB8-2AB9-419A-82D3-D743A16978C8}" destId="{FFBB95A5-64CA-4277-8EC9-9A4877C06A11}" srcOrd="1" destOrd="0" parTransId="{E5A1EA11-2B41-4DD3-8BF1-0CF84454CAE5}" sibTransId="{49EC4B80-42F4-4C68-8C02-F267FE81602E}"/>
     <dgm:cxn modelId="{FCD6A96D-054B-4471-90ED-6EB5ED0EBFF9}" type="presOf" srcId="{CFF97A55-CF3E-4E1D-AF04-5A3631D6CB6D}" destId="{E5E8036A-476D-4F9C-9D7B-4ED08A33C842}" srcOrd="0" destOrd="0" presId="urn:microsoft.com/office/officeart/2005/8/layout/hProcess4"/>
-    <dgm:cxn modelId="{C730B313-4D1D-4229-8314-A3150E0294B1}" type="presOf" srcId="{E68D9850-B3A4-4979-A4D0-E3D401A29AB5}" destId="{BB47B8A7-A69A-47BA-8429-499D75D98923}" srcOrd="0" destOrd="0" presId="urn:microsoft.com/office/officeart/2005/8/layout/hProcess4"/>
-    <dgm:cxn modelId="{076FA099-FCD5-4C11-8A08-746949589EB9}" type="presOf" srcId="{FFBB95A5-64CA-4277-8EC9-9A4877C06A11}" destId="{388BBD37-9C2B-4172-8678-CDF3BB968BFB}" srcOrd="1" destOrd="1" presId="urn:microsoft.com/office/officeart/2005/8/layout/hProcess4"/>
-    <dgm:cxn modelId="{F52A89F1-D611-4436-8916-14DEFBEAC79D}" srcId="{4412B91F-CF8D-4A42-83DF-7CDCCDA80F7D}" destId="{7DFE07BF-9A88-4152-9E58-09C9E20DB3CE}" srcOrd="0" destOrd="0" parTransId="{F2C6A117-64F1-4ED9-9C2B-9510107D76CB}" sibTransId="{E68D9850-B3A4-4979-A4D0-E3D401A29AB5}"/>
-    <dgm:cxn modelId="{FD321DDD-0FBF-4119-B35F-BF41A6D1FACA}" type="presOf" srcId="{80BADE98-2C43-40D5-937A-874A1B627145}" destId="{AE566E9F-D101-4F88-9692-208EF2AE8557}" srcOrd="0" destOrd="0" presId="urn:microsoft.com/office/officeart/2005/8/layout/hProcess4"/>
-    <dgm:cxn modelId="{C03BE492-3E48-4B5B-B223-BD9B09A0499C}" type="presOf" srcId="{4412B91F-CF8D-4A42-83DF-7CDCCDA80F7D}" destId="{50C663CD-616C-44EE-98F1-BB5FDDDEDCC8}" srcOrd="0" destOrd="0" presId="urn:microsoft.com/office/officeart/2005/8/layout/hProcess4"/>
     <dgm:cxn modelId="{4A7FA099-9464-4ACD-A790-6102C1584AD1}" srcId="{4412B91F-CF8D-4A42-83DF-7CDCCDA80F7D}" destId="{F3A2DAB8-2AB9-419A-82D3-D743A16978C8}" srcOrd="2" destOrd="0" parTransId="{62C15E06-9F1B-4472-A7B4-FEFADBC7E807}" sibTransId="{401344D0-ED0B-4340-9FCD-FF07FE375E6C}"/>
-    <dgm:cxn modelId="{66AF1316-005D-4157-AB49-7D09464E8313}" type="presOf" srcId="{7F7E1F91-F6F4-48A9-B4FA-337B2EBD2C9A}" destId="{CEA85225-BA33-4729-B542-7DD51242ADCB}" srcOrd="1" destOrd="0" presId="urn:microsoft.com/office/officeart/2005/8/layout/hProcess4"/>
-    <dgm:cxn modelId="{D058A61E-2631-4792-87A9-3570D8D2DB0F}" srcId="{3865D5FF-DA00-4906-B6F5-07C839464584}" destId="{2F3DF7DE-E5C9-4440-80D1-538313244BE6}" srcOrd="0" destOrd="0" parTransId="{3C0BC7DD-F66C-4719-92AE-5E9E7825604D}" sibTransId="{4569B2FB-90CA-4536-9206-69C81C9FC0BD}"/>
-    <dgm:cxn modelId="{F6F5BFB7-87A2-418B-8A67-5193C4B8B5C2}" type="presOf" srcId="{3865D5FF-DA00-4906-B6F5-07C839464584}" destId="{85BA2879-403E-43AC-A59E-A90A5FACC251}" srcOrd="0" destOrd="0" presId="urn:microsoft.com/office/officeart/2005/8/layout/hProcess4"/>
-    <dgm:cxn modelId="{C9B3EE4E-01DF-4274-A896-B826614E44E8}" type="presOf" srcId="{1198010A-7CD9-47DF-8300-D5AB8FDF717B}" destId="{77351131-57DF-4AF2-A89D-95AF9C6149DC}" srcOrd="0" destOrd="1" presId="urn:microsoft.com/office/officeart/2005/8/layout/hProcess4"/>
-    <dgm:cxn modelId="{96F1515C-012C-4FBA-939B-73396FC64F01}" type="presOf" srcId="{7DFE07BF-9A88-4152-9E58-09C9E20DB3CE}" destId="{168FD8A5-9BA3-47FA-8D32-ED60BCA98D24}" srcOrd="0" destOrd="0" presId="urn:microsoft.com/office/officeart/2005/8/layout/hProcess4"/>
-    <dgm:cxn modelId="{81BAC1B0-D183-4179-9A55-029F538E675D}" srcId="{F3A2DAB8-2AB9-419A-82D3-D743A16978C8}" destId="{80BADE98-2C43-40D5-937A-874A1B627145}" srcOrd="0" destOrd="0" parTransId="{61694F4E-3BB3-4806-8315-F9C9DE55D766}" sibTransId="{1B940CC1-D5C1-4465-A2E5-B629FA2D9A4E}"/>
     <dgm:cxn modelId="{DC8F0603-A30F-4881-8DB3-C28DAA5234EB}" type="presParOf" srcId="{50C663CD-616C-44EE-98F1-BB5FDDDEDCC8}" destId="{138CD9C0-127E-45DD-BA5D-F929D722FD16}" srcOrd="0" destOrd="0" presId="urn:microsoft.com/office/officeart/2005/8/layout/hProcess4"/>
     <dgm:cxn modelId="{5A02F5F5-BF03-478E-AB04-0CF1957AA6B2}" type="presParOf" srcId="{50C663CD-616C-44EE-98F1-BB5FDDDEDCC8}" destId="{EF0649EA-CFC7-443D-9E0B-71BBF1A268A7}" srcOrd="1" destOrd="0" presId="urn:microsoft.com/office/officeart/2005/8/layout/hProcess4"/>
     <dgm:cxn modelId="{28FB9728-D277-4EA0-9D1D-8BA739CBDE26}" type="presParOf" srcId="{50C663CD-616C-44EE-98F1-BB5FDDDEDCC8}" destId="{2FA38D1F-3777-488A-AF41-E467FA0BCCBE}" srcOrd="2" destOrd="0" presId="urn:microsoft.com/office/officeart/2005/8/layout/hProcess4"/>
@@ -6039,13 +7357,13 @@
   <dgm:whole/>
   <dgm:extLst>
     <a:ext uri="http://schemas.microsoft.com/office/drawing/2008/diagram">
-      <dsp:dataModelExt xmlns:dsp="http://schemas.microsoft.com/office/drawing/2008/diagram" xmlns="" relId="rId6" minVer="http://schemas.openxmlformats.org/drawingml/2006/diagram"/>
+      <dsp:dataModelExt xmlns:dsp="http://schemas.microsoft.com/office/drawing/2008/diagram" relId="rId6" minVer="http://schemas.openxmlformats.org/drawingml/2006/diagram"/>
     </a:ext>
   </dgm:extLst>
 </dgm:dataModel>
 </file>
 
-<file path=ppt/diagrams/data4.xml><?xml version="1.0" encoding="utf-8"?>
+<file path=ppt/diagrams/data5.xml><?xml version="1.0" encoding="utf-8"?>
 <dgm:dataModel xmlns:dgm="http://schemas.openxmlformats.org/drawingml/2006/diagram" xmlns:a="http://schemas.openxmlformats.org/drawingml/2006/main">
   <dgm:ptLst>
     <dgm:pt modelId="{D4F2E4FB-49BF-4721-8707-3457AAE0EB88}" type="doc">
@@ -6477,29 +7795,29 @@
     </dgm:pt>
   </dgm:ptLst>
   <dgm:cxnLst>
+    <dgm:cxn modelId="{CFD51472-FE86-49A1-902F-BA2DC34B29F5}" type="presOf" srcId="{0F4EE5F8-CE65-4C01-BA1B-62373453CD4B}" destId="{FFC83820-1F59-4B99-B0E5-5EF505EF981A}" srcOrd="1" destOrd="0" presId="urn:microsoft.com/office/officeart/2005/8/layout/radial5"/>
     <dgm:cxn modelId="{7366D01B-7B1A-4F7E-8897-A92969695C89}" type="presOf" srcId="{88E727E9-53A4-4E95-A459-039A49E93B44}" destId="{BED8CFF9-57DF-415B-BFD2-F23237B98D78}" srcOrd="0" destOrd="0" presId="urn:microsoft.com/office/officeart/2005/8/layout/radial5"/>
+    <dgm:cxn modelId="{6E4D8FAC-DF79-4656-AACF-B63351959842}" type="presOf" srcId="{C9CB2A3C-AA8A-4C63-ADAF-BB4A990106BF}" destId="{D32B50BC-8F9A-4A06-941D-13004E7B3F17}" srcOrd="0" destOrd="0" presId="urn:microsoft.com/office/officeart/2005/8/layout/radial5"/>
+    <dgm:cxn modelId="{28AC89FC-11D9-4755-B886-3A3759AAC780}" type="presOf" srcId="{036DF210-BB24-491F-9B05-BED9EB97CCEA}" destId="{2BEFA425-F024-4BD4-B31D-0FB6C45896F7}" srcOrd="1" destOrd="0" presId="urn:microsoft.com/office/officeart/2005/8/layout/radial5"/>
+    <dgm:cxn modelId="{A2C98141-733B-400B-91DC-A4454889E5AA}" srcId="{9ADEF162-76FA-4A3C-8220-3CD2B3D3023E}" destId="{600CB5D7-2D85-4AF5-BB05-4A1B86521FA2}" srcOrd="1" destOrd="0" parTransId="{0F4EE5F8-CE65-4C01-BA1B-62373453CD4B}" sibTransId="{D8ED6D04-2132-4167-966C-2933CD0F8E51}"/>
+    <dgm:cxn modelId="{89D3A26C-01B0-47D3-9792-AD7AC1141C23}" type="presOf" srcId="{0F4EE5F8-CE65-4C01-BA1B-62373453CD4B}" destId="{9D95D45C-9B20-4A4E-AD6C-37161FDE50AF}" srcOrd="0" destOrd="0" presId="urn:microsoft.com/office/officeart/2005/8/layout/radial5"/>
     <dgm:cxn modelId="{23207EC2-56B0-44E0-A6C7-84051896C37C}" type="presOf" srcId="{036DF210-BB24-491F-9B05-BED9EB97CCEA}" destId="{D858E594-9B1F-454E-812B-1D569755D339}" srcOrd="0" destOrd="0" presId="urn:microsoft.com/office/officeart/2005/8/layout/radial5"/>
+    <dgm:cxn modelId="{7442BC64-C27B-46B2-8FDA-C8CB7A69BB78}" type="presOf" srcId="{5CD5CAC8-AC56-4175-8B02-D9FDE7591724}" destId="{63B15D18-84CC-4B8C-A7B8-9D7C87C445EE}" srcOrd="1" destOrd="0" presId="urn:microsoft.com/office/officeart/2005/8/layout/radial5"/>
+    <dgm:cxn modelId="{4D528558-CCA4-4766-9340-8DBA49C0C449}" type="presOf" srcId="{E65E6258-30CC-439C-9E12-987FB207C0BA}" destId="{AE23CEE4-5E78-4BF2-A4EC-856A2ACE758E}" srcOrd="0" destOrd="0" presId="urn:microsoft.com/office/officeart/2005/8/layout/radial5"/>
+    <dgm:cxn modelId="{B760B6A1-7F60-4ADC-BA75-CB0BE4EEDB34}" type="presOf" srcId="{5CD5CAC8-AC56-4175-8B02-D9FDE7591724}" destId="{8F93543A-5059-4DE8-A2FC-A99D358C55C0}" srcOrd="0" destOrd="0" presId="urn:microsoft.com/office/officeart/2005/8/layout/radial5"/>
+    <dgm:cxn modelId="{A3234599-2A1F-4705-A7DB-C8EF644A84F6}" srcId="{9ADEF162-76FA-4A3C-8220-3CD2B3D3023E}" destId="{31E1C8DB-A788-4C7C-8E35-369521C571A2}" srcOrd="2" destOrd="0" parTransId="{5CD5CAC8-AC56-4175-8B02-D9FDE7591724}" sibTransId="{78634723-FA66-4AF5-9D17-D9106FB2D70F}"/>
+    <dgm:cxn modelId="{DB098DF9-4AC3-48C4-BC74-3A1AFF298A39}" srcId="{9ADEF162-76FA-4A3C-8220-3CD2B3D3023E}" destId="{597E7FEA-0A6D-4074-A2A0-EDBE84388C7A}" srcOrd="3" destOrd="0" parTransId="{C9CB2A3C-AA8A-4C63-ADAF-BB4A990106BF}" sibTransId="{78A577AF-6145-4A2C-8D9E-BB70A9BDA682}"/>
+    <dgm:cxn modelId="{E76B003B-3141-48DA-8297-E3AA243031E5}" type="presOf" srcId="{D4F2E4FB-49BF-4721-8707-3457AAE0EB88}" destId="{6A9D9649-AA51-48D6-B507-7AEDD979430C}" srcOrd="0" destOrd="0" presId="urn:microsoft.com/office/officeart/2005/8/layout/radial5"/>
     <dgm:cxn modelId="{622C7C39-11F8-4758-9549-8841122B7ED2}" type="presOf" srcId="{31E1C8DB-A788-4C7C-8E35-369521C571A2}" destId="{4AE6AAFA-D59A-4F35-A5E8-C6D2EC6BBFF0}" srcOrd="0" destOrd="0" presId="urn:microsoft.com/office/officeart/2005/8/layout/radial5"/>
-    <dgm:cxn modelId="{89D3A26C-01B0-47D3-9792-AD7AC1141C23}" type="presOf" srcId="{0F4EE5F8-CE65-4C01-BA1B-62373453CD4B}" destId="{9D95D45C-9B20-4A4E-AD6C-37161FDE50AF}" srcOrd="0" destOrd="0" presId="urn:microsoft.com/office/officeart/2005/8/layout/radial5"/>
+    <dgm:cxn modelId="{CD189AED-CAFC-49C6-B708-4C84F713FF42}" type="presOf" srcId="{47D5C472-6F40-4426-8E86-BCB2F2BD330B}" destId="{E0159EA0-1A5D-476D-AD51-865243B2D714}" srcOrd="0" destOrd="0" presId="urn:microsoft.com/office/officeart/2005/8/layout/radial5"/>
+    <dgm:cxn modelId="{B7E99F65-BDD3-4DC8-BA59-474161888B08}" srcId="{9ADEF162-76FA-4A3C-8220-3CD2B3D3023E}" destId="{E65E6258-30CC-439C-9E12-987FB207C0BA}" srcOrd="4" destOrd="0" parTransId="{88E727E9-53A4-4E95-A459-039A49E93B44}" sibTransId="{C1A9E9C8-E1E8-41AC-8025-94E945EC2819}"/>
+    <dgm:cxn modelId="{F195A791-DD89-4913-8E1E-8DC4F82B6DC9}" srcId="{9ADEF162-76FA-4A3C-8220-3CD2B3D3023E}" destId="{47D5C472-6F40-4426-8E86-BCB2F2BD330B}" srcOrd="0" destOrd="0" parTransId="{036DF210-BB24-491F-9B05-BED9EB97CCEA}" sibTransId="{8F34451D-735F-4913-B0FC-D3B45BB4B61F}"/>
+    <dgm:cxn modelId="{0AB8AA39-130D-4082-8073-DCFF557B8490}" srcId="{D4F2E4FB-49BF-4721-8707-3457AAE0EB88}" destId="{9ADEF162-76FA-4A3C-8220-3CD2B3D3023E}" srcOrd="0" destOrd="0" parTransId="{70CEE8AE-1BA1-4498-BED4-2294652E694E}" sibTransId="{8D6656CE-2472-4600-8A8A-680BB044CFF5}"/>
+    <dgm:cxn modelId="{B6EF3246-0AA5-4CF3-8B72-C7979057E203}" type="presOf" srcId="{9ADEF162-76FA-4A3C-8220-3CD2B3D3023E}" destId="{18F2EB1D-555E-470E-B78B-9F32BC1302F0}" srcOrd="0" destOrd="0" presId="urn:microsoft.com/office/officeart/2005/8/layout/radial5"/>
+    <dgm:cxn modelId="{8F72D950-79DD-429B-81A7-418362F720F6}" type="presOf" srcId="{600CB5D7-2D85-4AF5-BB05-4A1B86521FA2}" destId="{892AB89D-9357-4946-A690-9AB770094366}" srcOrd="0" destOrd="0" presId="urn:microsoft.com/office/officeart/2005/8/layout/radial5"/>
     <dgm:cxn modelId="{20E80264-2731-447C-89A6-6EF6F3B07D7B}" type="presOf" srcId="{C9CB2A3C-AA8A-4C63-ADAF-BB4A990106BF}" destId="{DA7B04D8-8B81-4E5B-97E0-2DFA07EF08B4}" srcOrd="1" destOrd="0" presId="urn:microsoft.com/office/officeart/2005/8/layout/radial5"/>
     <dgm:cxn modelId="{742A00C4-D75C-4EB9-B6C7-8556F6BF3B40}" type="presOf" srcId="{88E727E9-53A4-4E95-A459-039A49E93B44}" destId="{30E14BBC-7822-4D38-BD74-0C71B2A3B30C}" srcOrd="1" destOrd="0" presId="urn:microsoft.com/office/officeart/2005/8/layout/radial5"/>
-    <dgm:cxn modelId="{A2C98141-733B-400B-91DC-A4454889E5AA}" srcId="{9ADEF162-76FA-4A3C-8220-3CD2B3D3023E}" destId="{600CB5D7-2D85-4AF5-BB05-4A1B86521FA2}" srcOrd="1" destOrd="0" parTransId="{0F4EE5F8-CE65-4C01-BA1B-62373453CD4B}" sibTransId="{D8ED6D04-2132-4167-966C-2933CD0F8E51}"/>
-    <dgm:cxn modelId="{0AB8AA39-130D-4082-8073-DCFF557B8490}" srcId="{D4F2E4FB-49BF-4721-8707-3457AAE0EB88}" destId="{9ADEF162-76FA-4A3C-8220-3CD2B3D3023E}" srcOrd="0" destOrd="0" parTransId="{70CEE8AE-1BA1-4498-BED4-2294652E694E}" sibTransId="{8D6656CE-2472-4600-8A8A-680BB044CFF5}"/>
-    <dgm:cxn modelId="{7442BC64-C27B-46B2-8FDA-C8CB7A69BB78}" type="presOf" srcId="{5CD5CAC8-AC56-4175-8B02-D9FDE7591724}" destId="{63B15D18-84CC-4B8C-A7B8-9D7C87C445EE}" srcOrd="1" destOrd="0" presId="urn:microsoft.com/office/officeart/2005/8/layout/radial5"/>
-    <dgm:cxn modelId="{A3234599-2A1F-4705-A7DB-C8EF644A84F6}" srcId="{9ADEF162-76FA-4A3C-8220-3CD2B3D3023E}" destId="{31E1C8DB-A788-4C7C-8E35-369521C571A2}" srcOrd="2" destOrd="0" parTransId="{5CD5CAC8-AC56-4175-8B02-D9FDE7591724}" sibTransId="{78634723-FA66-4AF5-9D17-D9106FB2D70F}"/>
-    <dgm:cxn modelId="{E76B003B-3141-48DA-8297-E3AA243031E5}" type="presOf" srcId="{D4F2E4FB-49BF-4721-8707-3457AAE0EB88}" destId="{6A9D9649-AA51-48D6-B507-7AEDD979430C}" srcOrd="0" destOrd="0" presId="urn:microsoft.com/office/officeart/2005/8/layout/radial5"/>
-    <dgm:cxn modelId="{4D528558-CCA4-4766-9340-8DBA49C0C449}" type="presOf" srcId="{E65E6258-30CC-439C-9E12-987FB207C0BA}" destId="{AE23CEE4-5E78-4BF2-A4EC-856A2ACE758E}" srcOrd="0" destOrd="0" presId="urn:microsoft.com/office/officeart/2005/8/layout/radial5"/>
-    <dgm:cxn modelId="{28AC89FC-11D9-4755-B886-3A3759AAC780}" type="presOf" srcId="{036DF210-BB24-491F-9B05-BED9EB97CCEA}" destId="{2BEFA425-F024-4BD4-B31D-0FB6C45896F7}" srcOrd="1" destOrd="0" presId="urn:microsoft.com/office/officeart/2005/8/layout/radial5"/>
-    <dgm:cxn modelId="{8F72D950-79DD-429B-81A7-418362F720F6}" type="presOf" srcId="{600CB5D7-2D85-4AF5-BB05-4A1B86521FA2}" destId="{892AB89D-9357-4946-A690-9AB770094366}" srcOrd="0" destOrd="0" presId="urn:microsoft.com/office/officeart/2005/8/layout/radial5"/>
-    <dgm:cxn modelId="{F195A791-DD89-4913-8E1E-8DC4F82B6DC9}" srcId="{9ADEF162-76FA-4A3C-8220-3CD2B3D3023E}" destId="{47D5C472-6F40-4426-8E86-BCB2F2BD330B}" srcOrd="0" destOrd="0" parTransId="{036DF210-BB24-491F-9B05-BED9EB97CCEA}" sibTransId="{8F34451D-735F-4913-B0FC-D3B45BB4B61F}"/>
-    <dgm:cxn modelId="{6E4D8FAC-DF79-4656-AACF-B63351959842}" type="presOf" srcId="{C9CB2A3C-AA8A-4C63-ADAF-BB4A990106BF}" destId="{D32B50BC-8F9A-4A06-941D-13004E7B3F17}" srcOrd="0" destOrd="0" presId="urn:microsoft.com/office/officeart/2005/8/layout/radial5"/>
-    <dgm:cxn modelId="{B6EF3246-0AA5-4CF3-8B72-C7979057E203}" type="presOf" srcId="{9ADEF162-76FA-4A3C-8220-3CD2B3D3023E}" destId="{18F2EB1D-555E-470E-B78B-9F32BC1302F0}" srcOrd="0" destOrd="0" presId="urn:microsoft.com/office/officeart/2005/8/layout/radial5"/>
-    <dgm:cxn modelId="{B760B6A1-7F60-4ADC-BA75-CB0BE4EEDB34}" type="presOf" srcId="{5CD5CAC8-AC56-4175-8B02-D9FDE7591724}" destId="{8F93543A-5059-4DE8-A2FC-A99D358C55C0}" srcOrd="0" destOrd="0" presId="urn:microsoft.com/office/officeart/2005/8/layout/radial5"/>
-    <dgm:cxn modelId="{DB098DF9-4AC3-48C4-BC74-3A1AFF298A39}" srcId="{9ADEF162-76FA-4A3C-8220-3CD2B3D3023E}" destId="{597E7FEA-0A6D-4074-A2A0-EDBE84388C7A}" srcOrd="3" destOrd="0" parTransId="{C9CB2A3C-AA8A-4C63-ADAF-BB4A990106BF}" sibTransId="{78A577AF-6145-4A2C-8D9E-BB70A9BDA682}"/>
-    <dgm:cxn modelId="{CD189AED-CAFC-49C6-B708-4C84F713FF42}" type="presOf" srcId="{47D5C472-6F40-4426-8E86-BCB2F2BD330B}" destId="{E0159EA0-1A5D-476D-AD51-865243B2D714}" srcOrd="0" destOrd="0" presId="urn:microsoft.com/office/officeart/2005/8/layout/radial5"/>
     <dgm:cxn modelId="{B076A0DE-C14B-4C8D-AC1B-44814383AFD4}" type="presOf" srcId="{597E7FEA-0A6D-4074-A2A0-EDBE84388C7A}" destId="{42C28B57-95B0-4561-B729-7C55DC80C4C3}" srcOrd="0" destOrd="0" presId="urn:microsoft.com/office/officeart/2005/8/layout/radial5"/>
-    <dgm:cxn modelId="{B7E99F65-BDD3-4DC8-BA59-474161888B08}" srcId="{9ADEF162-76FA-4A3C-8220-3CD2B3D3023E}" destId="{E65E6258-30CC-439C-9E12-987FB207C0BA}" srcOrd="4" destOrd="0" parTransId="{88E727E9-53A4-4E95-A459-039A49E93B44}" sibTransId="{C1A9E9C8-E1E8-41AC-8025-94E945EC2819}"/>
-    <dgm:cxn modelId="{CFD51472-FE86-49A1-902F-BA2DC34B29F5}" type="presOf" srcId="{0F4EE5F8-CE65-4C01-BA1B-62373453CD4B}" destId="{FFC83820-1F59-4B99-B0E5-5EF505EF981A}" srcOrd="1" destOrd="0" presId="urn:microsoft.com/office/officeart/2005/8/layout/radial5"/>
     <dgm:cxn modelId="{D491739B-54EC-489C-A1A7-1DBEF4DF8E38}" type="presParOf" srcId="{6A9D9649-AA51-48D6-B507-7AEDD979430C}" destId="{18F2EB1D-555E-470E-B78B-9F32BC1302F0}" srcOrd="0" destOrd="0" presId="urn:microsoft.com/office/officeart/2005/8/layout/radial5"/>
     <dgm:cxn modelId="{5AB7F0EB-EAF7-40B7-8C32-386285178AF5}" type="presParOf" srcId="{6A9D9649-AA51-48D6-B507-7AEDD979430C}" destId="{D858E594-9B1F-454E-812B-1D569755D339}" srcOrd="1" destOrd="0" presId="urn:microsoft.com/office/officeart/2005/8/layout/radial5"/>
     <dgm:cxn modelId="{5E5AB94B-B50E-481F-A3CF-F462EDC78FD1}" type="presParOf" srcId="{D858E594-9B1F-454E-812B-1D569755D339}" destId="{2BEFA425-F024-4BD4-B31D-0FB6C45896F7}" srcOrd="0" destOrd="0" presId="urn:microsoft.com/office/officeart/2005/8/layout/radial5"/>
@@ -6521,13 +7839,13 @@
   <dgm:whole/>
   <dgm:extLst>
     <a:ext uri="http://schemas.microsoft.com/office/drawing/2008/diagram">
-      <dsp:dataModelExt xmlns:dsp="http://schemas.microsoft.com/office/drawing/2008/diagram" xmlns="" relId="rId6" minVer="http://schemas.openxmlformats.org/drawingml/2006/diagram"/>
+      <dsp:dataModelExt xmlns:dsp="http://schemas.microsoft.com/office/drawing/2008/diagram" relId="rId6" minVer="http://schemas.openxmlformats.org/drawingml/2006/diagram"/>
     </a:ext>
   </dgm:extLst>
 </dgm:dataModel>
 </file>
 
-<file path=ppt/diagrams/data5.xml><?xml version="1.0" encoding="utf-8"?>
+<file path=ppt/diagrams/data6.xml><?xml version="1.0" encoding="utf-8"?>
 <dgm:dataModel xmlns:dgm="http://schemas.openxmlformats.org/drawingml/2006/diagram" xmlns:a="http://schemas.openxmlformats.org/drawingml/2006/main">
   <dgm:ptLst>
     <dgm:pt modelId="{739AC528-84CD-4C4C-9AAA-944987E13663}" type="doc">
@@ -7467,25 +8785,25 @@
     </dgm:pt>
   </dgm:ptLst>
   <dgm:cxnLst>
+    <dgm:cxn modelId="{D6B9F938-FD89-4765-A5F4-595BA2C69F68}" type="presOf" srcId="{34E518D1-49BF-45FE-BD69-68CCC11C553D}" destId="{390F44BF-71AC-4D9F-BF5E-075FA28FE010}" srcOrd="0" destOrd="0" presId="urn:microsoft.com/office/officeart/2005/8/layout/list1"/>
+    <dgm:cxn modelId="{98F30085-95A3-4899-83ED-263051B4121C}" srcId="{739AC528-84CD-4C4C-9AAA-944987E13663}" destId="{EBE94DE7-18A9-4985-A440-D262D93A6316}" srcOrd="1" destOrd="0" parTransId="{7151D90C-DDED-45CE-9D5D-F45918DF7AF3}" sibTransId="{11D717CD-56AA-45FC-9323-4DF14FDC4A6F}"/>
+    <dgm:cxn modelId="{492DC469-18AA-4F1C-B5CB-83AA42592B95}" srcId="{739AC528-84CD-4C4C-9AAA-944987E13663}" destId="{34E518D1-49BF-45FE-BD69-68CCC11C553D}" srcOrd="5" destOrd="0" parTransId="{6E148B5F-7DF9-4BF6-BE15-08EA16D770D4}" sibTransId="{23E81CB5-6F0A-42EB-ADC8-9150ECA984D5}"/>
+    <dgm:cxn modelId="{0E348F8C-122A-48CD-A8DB-40A9364F57F3}" type="presOf" srcId="{EBE94DE7-18A9-4985-A440-D262D93A6316}" destId="{9939078C-FCDB-4354-9260-A7140D211969}" srcOrd="1" destOrd="0" presId="urn:microsoft.com/office/officeart/2005/8/layout/list1"/>
+    <dgm:cxn modelId="{917C61F7-4EFA-4F87-8A86-AA04AD093EB6}" type="presOf" srcId="{C0424938-EAAD-4AFD-89AA-F9DAA339B8CE}" destId="{3572EF4A-4D38-4BBD-9DE4-D188D70E2CAD}" srcOrd="0" destOrd="0" presId="urn:microsoft.com/office/officeart/2005/8/layout/list1"/>
+    <dgm:cxn modelId="{08B77D2D-50A3-4665-B5BC-776198A4C49D}" type="presOf" srcId="{64726959-BFCF-468E-8583-201CF07ACAB4}" destId="{5CF09D25-445D-4024-9E09-27B9086F12C2}" srcOrd="0" destOrd="0" presId="urn:microsoft.com/office/officeart/2005/8/layout/list1"/>
+    <dgm:cxn modelId="{E58C8AA9-859D-436C-829F-177A8BC2DA06}" type="presOf" srcId="{C0424938-EAAD-4AFD-89AA-F9DAA339B8CE}" destId="{6C17C5F1-150A-491F-92CE-A1BE931BB55D}" srcOrd="1" destOrd="0" presId="urn:microsoft.com/office/officeart/2005/8/layout/list1"/>
     <dgm:cxn modelId="{B7B87462-1DAB-4820-9D8D-39215A0FD83D}" srcId="{739AC528-84CD-4C4C-9AAA-944987E13663}" destId="{64726959-BFCF-468E-8583-201CF07ACAB4}" srcOrd="0" destOrd="0" parTransId="{1621746A-50DC-494D-BB5D-7D8ADC851307}" sibTransId="{8835803B-4868-4BFF-8B3A-814A6D4954C8}"/>
-    <dgm:cxn modelId="{7E93702C-2125-4942-BCFA-451032FA8C07}" type="presOf" srcId="{22558875-04DE-48A8-8D08-7DF713D16D36}" destId="{D78DBF14-3A29-4E42-B56E-7380E92A6552}" srcOrd="1" destOrd="0" presId="urn:microsoft.com/office/officeart/2005/8/layout/list1"/>
-    <dgm:cxn modelId="{BC163CB6-4CBD-44DB-AD17-AFC4FDDC684C}" type="presOf" srcId="{EBE94DE7-18A9-4985-A440-D262D93A6316}" destId="{62A2C154-6AB5-4321-A742-C06A0E020873}" srcOrd="0" destOrd="0" presId="urn:microsoft.com/office/officeart/2005/8/layout/list1"/>
+    <dgm:cxn modelId="{0E9F3CED-8870-48EB-AC03-616E89BB9C2E}" type="presOf" srcId="{64726959-BFCF-468E-8583-201CF07ACAB4}" destId="{B171C0C5-1265-474F-9A24-5267C4DEA6BB}" srcOrd="1" destOrd="0" presId="urn:microsoft.com/office/officeart/2005/8/layout/list1"/>
     <dgm:cxn modelId="{E7BB10A8-4E7A-44F2-865F-A7389730AEBC}" srcId="{739AC528-84CD-4C4C-9AAA-944987E13663}" destId="{B682214D-3E19-400B-B148-C04F02C27327}" srcOrd="4" destOrd="0" parTransId="{328229DF-DAE6-431B-9EB1-E273DFF5EA70}" sibTransId="{4037F445-FC2C-47AE-89AE-E418F2282E02}"/>
+    <dgm:cxn modelId="{265C6533-7DF8-4BF6-8C28-3C782A037CF3}" type="presOf" srcId="{B682214D-3E19-400B-B148-C04F02C27327}" destId="{846A3F17-1641-4BB9-AC38-13C0E8AB7383}" srcOrd="0" destOrd="0" presId="urn:microsoft.com/office/officeart/2005/8/layout/list1"/>
     <dgm:cxn modelId="{4650B4FA-5E46-4507-BF35-61AB090D393E}" srcId="{739AC528-84CD-4C4C-9AAA-944987E13663}" destId="{22558875-04DE-48A8-8D08-7DF713D16D36}" srcOrd="2" destOrd="0" parTransId="{AEADCE07-7102-4416-8E67-31648F62FFBE}" sibTransId="{6C26663C-5E0F-469C-A84B-4E7D60C2ACED}"/>
-    <dgm:cxn modelId="{265C6533-7DF8-4BF6-8C28-3C782A037CF3}" type="presOf" srcId="{B682214D-3E19-400B-B148-C04F02C27327}" destId="{846A3F17-1641-4BB9-AC38-13C0E8AB7383}" srcOrd="0" destOrd="0" presId="urn:microsoft.com/office/officeart/2005/8/layout/list1"/>
     <dgm:cxn modelId="{F9C7EEAC-7918-45CA-816F-B33C04B8B070}" srcId="{739AC528-84CD-4C4C-9AAA-944987E13663}" destId="{C0424938-EAAD-4AFD-89AA-F9DAA339B8CE}" srcOrd="3" destOrd="0" parTransId="{D85B5D0B-0237-4236-B15A-3AC15A4C8D6A}" sibTransId="{EBF62A40-6125-4DD5-8EDA-1F45E06B9030}"/>
     <dgm:cxn modelId="{09CDA0F1-41AD-4AA3-BABC-AB3C68FE1F20}" type="presOf" srcId="{B682214D-3E19-400B-B148-C04F02C27327}" destId="{231A70AB-9760-4FFF-B875-5D31C52D60AE}" srcOrd="1" destOrd="0" presId="urn:microsoft.com/office/officeart/2005/8/layout/list1"/>
+    <dgm:cxn modelId="{81B323AF-A255-4CEA-BAE8-041C43CF3A80}" type="presOf" srcId="{739AC528-84CD-4C4C-9AAA-944987E13663}" destId="{5C305753-02C2-4005-B25D-F75DD4B08137}" srcOrd="0" destOrd="0" presId="urn:microsoft.com/office/officeart/2005/8/layout/list1"/>
+    <dgm:cxn modelId="{7E93702C-2125-4942-BCFA-451032FA8C07}" type="presOf" srcId="{22558875-04DE-48A8-8D08-7DF713D16D36}" destId="{D78DBF14-3A29-4E42-B56E-7380E92A6552}" srcOrd="1" destOrd="0" presId="urn:microsoft.com/office/officeart/2005/8/layout/list1"/>
     <dgm:cxn modelId="{1842B81B-6CE1-4E7A-B9A2-8AECFE2C9FD1}" type="presOf" srcId="{34E518D1-49BF-45FE-BD69-68CCC11C553D}" destId="{029B9D8C-4A77-4645-9520-CB1F079C0081}" srcOrd="1" destOrd="0" presId="urn:microsoft.com/office/officeart/2005/8/layout/list1"/>
     <dgm:cxn modelId="{DC3681F8-CC97-4E15-8231-5EBA82EFEFD3}" type="presOf" srcId="{22558875-04DE-48A8-8D08-7DF713D16D36}" destId="{7CCD4125-60BB-4322-B726-7F91B5CDFF30}" srcOrd="0" destOrd="0" presId="urn:microsoft.com/office/officeart/2005/8/layout/list1"/>
-    <dgm:cxn modelId="{D6B9F938-FD89-4765-A5F4-595BA2C69F68}" type="presOf" srcId="{34E518D1-49BF-45FE-BD69-68CCC11C553D}" destId="{390F44BF-71AC-4D9F-BF5E-075FA28FE010}" srcOrd="0" destOrd="0" presId="urn:microsoft.com/office/officeart/2005/8/layout/list1"/>
-    <dgm:cxn modelId="{08B77D2D-50A3-4665-B5BC-776198A4C49D}" type="presOf" srcId="{64726959-BFCF-468E-8583-201CF07ACAB4}" destId="{5CF09D25-445D-4024-9E09-27B9086F12C2}" srcOrd="0" destOrd="0" presId="urn:microsoft.com/office/officeart/2005/8/layout/list1"/>
-    <dgm:cxn modelId="{492DC469-18AA-4F1C-B5CB-83AA42592B95}" srcId="{739AC528-84CD-4C4C-9AAA-944987E13663}" destId="{34E518D1-49BF-45FE-BD69-68CCC11C553D}" srcOrd="5" destOrd="0" parTransId="{6E148B5F-7DF9-4BF6-BE15-08EA16D770D4}" sibTransId="{23E81CB5-6F0A-42EB-ADC8-9150ECA984D5}"/>
-    <dgm:cxn modelId="{0E9F3CED-8870-48EB-AC03-616E89BB9C2E}" type="presOf" srcId="{64726959-BFCF-468E-8583-201CF07ACAB4}" destId="{B171C0C5-1265-474F-9A24-5267C4DEA6BB}" srcOrd="1" destOrd="0" presId="urn:microsoft.com/office/officeart/2005/8/layout/list1"/>
-    <dgm:cxn modelId="{E58C8AA9-859D-436C-829F-177A8BC2DA06}" type="presOf" srcId="{C0424938-EAAD-4AFD-89AA-F9DAA339B8CE}" destId="{6C17C5F1-150A-491F-92CE-A1BE931BB55D}" srcOrd="1" destOrd="0" presId="urn:microsoft.com/office/officeart/2005/8/layout/list1"/>
-    <dgm:cxn modelId="{0E348F8C-122A-48CD-A8DB-40A9364F57F3}" type="presOf" srcId="{EBE94DE7-18A9-4985-A440-D262D93A6316}" destId="{9939078C-FCDB-4354-9260-A7140D211969}" srcOrd="1" destOrd="0" presId="urn:microsoft.com/office/officeart/2005/8/layout/list1"/>
-    <dgm:cxn modelId="{917C61F7-4EFA-4F87-8A86-AA04AD093EB6}" type="presOf" srcId="{C0424938-EAAD-4AFD-89AA-F9DAA339B8CE}" destId="{3572EF4A-4D38-4BBD-9DE4-D188D70E2CAD}" srcOrd="0" destOrd="0" presId="urn:microsoft.com/office/officeart/2005/8/layout/list1"/>
-    <dgm:cxn modelId="{98F30085-95A3-4899-83ED-263051B4121C}" srcId="{739AC528-84CD-4C4C-9AAA-944987E13663}" destId="{EBE94DE7-18A9-4985-A440-D262D93A6316}" srcOrd="1" destOrd="0" parTransId="{7151D90C-DDED-45CE-9D5D-F45918DF7AF3}" sibTransId="{11D717CD-56AA-45FC-9323-4DF14FDC4A6F}"/>
-    <dgm:cxn modelId="{81B323AF-A255-4CEA-BAE8-041C43CF3A80}" type="presOf" srcId="{739AC528-84CD-4C4C-9AAA-944987E13663}" destId="{5C305753-02C2-4005-B25D-F75DD4B08137}" srcOrd="0" destOrd="0" presId="urn:microsoft.com/office/officeart/2005/8/layout/list1"/>
+    <dgm:cxn modelId="{BC163CB6-4CBD-44DB-AD17-AFC4FDDC684C}" type="presOf" srcId="{EBE94DE7-18A9-4985-A440-D262D93A6316}" destId="{62A2C154-6AB5-4321-A742-C06A0E020873}" srcOrd="0" destOrd="0" presId="urn:microsoft.com/office/officeart/2005/8/layout/list1"/>
     <dgm:cxn modelId="{5CEE8E5E-6F76-4967-8862-364C72A0F09D}" type="presParOf" srcId="{5C305753-02C2-4005-B25D-F75DD4B08137}" destId="{B34D6D7E-5F2E-4AC9-BD73-0DDE9F8BB618}" srcOrd="0" destOrd="0" presId="urn:microsoft.com/office/officeart/2005/8/layout/list1"/>
     <dgm:cxn modelId="{49AB42FC-D96F-419C-AA12-35C9654D957E}" type="presParOf" srcId="{B34D6D7E-5F2E-4AC9-BD73-0DDE9F8BB618}" destId="{5CF09D25-445D-4024-9E09-27B9086F12C2}" srcOrd="0" destOrd="0" presId="urn:microsoft.com/office/officeart/2005/8/layout/list1"/>
     <dgm:cxn modelId="{16B0EBB0-1939-4496-898C-63BE915DB1B6}" type="presParOf" srcId="{B34D6D7E-5F2E-4AC9-BD73-0DDE9F8BB618}" destId="{B171C0C5-1265-474F-9A24-5267C4DEA6BB}" srcOrd="1" destOrd="0" presId="urn:microsoft.com/office/officeart/2005/8/layout/list1"/>
@@ -7526,14 +8844,14 @@
   <dgm:whole/>
   <dgm:extLst>
     <a:ext uri="http://schemas.microsoft.com/office/drawing/2008/diagram">
-      <dsp:dataModelExt xmlns:dsp="http://schemas.microsoft.com/office/drawing/2008/diagram" xmlns="" relId="rId6" minVer="http://schemas.openxmlformats.org/drawingml/2006/diagram"/>
+      <dsp:dataModelExt xmlns:dsp="http://schemas.microsoft.com/office/drawing/2008/diagram" relId="rId6" minVer="http://schemas.openxmlformats.org/drawingml/2006/diagram"/>
     </a:ext>
   </dgm:extLst>
 </dgm:dataModel>
 </file>
 
 <file path=ppt/diagrams/drawing1.xml><?xml version="1.0" encoding="utf-8"?>
-<dsp:drawing xmlns:dgm="http://schemas.openxmlformats.org/drawingml/2006/diagram" xmlns:a="http://schemas.openxmlformats.org/drawingml/2006/main" xmlns:dsp="http://schemas.microsoft.com/office/drawing/2008/diagram">
+<dsp:drawing xmlns:dgm="http://schemas.openxmlformats.org/drawingml/2006/diagram" xmlns:dsp="http://schemas.microsoft.com/office/drawing/2008/diagram" xmlns:a="http://schemas.openxmlformats.org/drawingml/2006/main">
   <dsp:spTree>
     <dsp:nvGrpSpPr>
       <dsp:cNvPr id="0" name=""/>
@@ -7667,9 +8985,9 @@
           <a:endParaRPr lang="pt-BR" sz="1600" kern="1200" dirty="0"/>
         </a:p>
       </dsp:txBody>
-      <dsp:txXfrm rot="5400000">
-        <a:off x="5471223" y="-2232760"/>
-        <a:ext cx="871601" cy="5559552"/>
+      <dsp:txXfrm rot="-5400000">
+        <a:off x="3127248" y="153763"/>
+        <a:ext cx="5517004" cy="786505"/>
       </dsp:txXfrm>
     </dsp:sp>
     <dsp:sp modelId="{83285697-B771-41E8-BF80-D6B7B2E260A7}">
@@ -7822,8 +9140,8 @@
         </a:p>
       </dsp:txBody>
       <dsp:txXfrm>
-        <a:off x="0" y="0"/>
-        <a:ext cx="3127248" cy="1089501"/>
+        <a:off x="53185" y="53185"/>
+        <a:ext cx="3020878" cy="983131"/>
       </dsp:txXfrm>
     </dsp:sp>
     <dsp:sp modelId="{76D300D9-3977-4D02-95E9-3905CCACBD1B}">
@@ -7911,9 +9229,9 @@
           <a:endParaRPr lang="pt-BR" sz="1600" kern="1200" dirty="0"/>
         </a:p>
       </dsp:txBody>
-      <dsp:txXfrm rot="5400000">
-        <a:off x="5471223" y="-1088783"/>
-        <a:ext cx="871601" cy="5559552"/>
+      <dsp:txXfrm rot="-5400000">
+        <a:off x="3127248" y="1297740"/>
+        <a:ext cx="5517004" cy="786505"/>
       </dsp:txXfrm>
     </dsp:sp>
     <dsp:sp modelId="{1C4CF5AE-B0A9-4E79-99D0-8192DD361FD5}">
@@ -8066,8 +9384,8 @@
         </a:p>
       </dsp:txBody>
       <dsp:txXfrm>
-        <a:off x="0" y="1146241"/>
-        <a:ext cx="3127248" cy="1089501"/>
+        <a:off x="53185" y="1199426"/>
+        <a:ext cx="3020878" cy="983131"/>
       </dsp:txXfrm>
     </dsp:sp>
     <dsp:sp modelId="{7991AEF3-84F5-4F2F-9A87-D93011516A86}">
@@ -8163,9 +9481,9 @@
           <a:endParaRPr lang="pt-BR" sz="1600" kern="1200" dirty="0"/>
         </a:p>
       </dsp:txBody>
-      <dsp:txXfrm rot="5400000">
-        <a:off x="5471223" y="55193"/>
-        <a:ext cx="871601" cy="5559552"/>
+      <dsp:txXfrm rot="-5400000">
+        <a:off x="3127248" y="2441716"/>
+        <a:ext cx="5517004" cy="786505"/>
       </dsp:txXfrm>
     </dsp:sp>
     <dsp:sp modelId="{DE3A8CA3-F5E7-47D6-9409-0DAEFC3883C5}">
@@ -8318,8 +9636,8 @@
         </a:p>
       </dsp:txBody>
       <dsp:txXfrm>
-        <a:off x="0" y="2290218"/>
-        <a:ext cx="3127248" cy="1089501"/>
+        <a:off x="53185" y="2343403"/>
+        <a:ext cx="3020878" cy="983131"/>
       </dsp:txXfrm>
     </dsp:sp>
     <dsp:sp modelId="{232E8D04-E732-492E-A284-139D99DFE02C}">
@@ -8411,9 +9729,9 @@
           <a:endParaRPr lang="pt-BR" sz="1600" kern="1200" dirty="0"/>
         </a:p>
       </dsp:txBody>
-      <dsp:txXfrm rot="5400000">
-        <a:off x="5471223" y="1199170"/>
-        <a:ext cx="871601" cy="5559552"/>
+      <dsp:txXfrm rot="-5400000">
+        <a:off x="3127248" y="3585693"/>
+        <a:ext cx="5517004" cy="786505"/>
       </dsp:txXfrm>
     </dsp:sp>
     <dsp:sp modelId="{F985ABD3-DA1F-4E90-952D-1C16820F198E}">
@@ -8566,8 +9884,8 @@
         </a:p>
       </dsp:txBody>
       <dsp:txXfrm>
-        <a:off x="0" y="3434195"/>
-        <a:ext cx="3127248" cy="1089501"/>
+        <a:off x="53185" y="3487380"/>
+        <a:ext cx="3020878" cy="983131"/>
       </dsp:txXfrm>
     </dsp:sp>
   </dsp:spTree>
@@ -8575,7 +9893,7 @@
 </file>
 
 <file path=ppt/diagrams/drawing2.xml><?xml version="1.0" encoding="utf-8"?>
-<dsp:drawing xmlns:dgm="http://schemas.openxmlformats.org/drawingml/2006/diagram" xmlns:a="http://schemas.openxmlformats.org/drawingml/2006/main" xmlns:dsp="http://schemas.microsoft.com/office/drawing/2008/diagram">
+<dsp:drawing xmlns:dgm="http://schemas.openxmlformats.org/drawingml/2006/diagram" xmlns:dsp="http://schemas.microsoft.com/office/drawing/2008/diagram" xmlns:a="http://schemas.openxmlformats.org/drawingml/2006/main">
   <dsp:spTree>
     <dsp:nvGrpSpPr>
       <dsp:cNvPr id="0" name=""/>
@@ -8756,12 +10074,12 @@
         </a:fontRef>
       </dsp:style>
       <dsp:txBody>
-        <a:bodyPr spcFirstLastPara="0" vert="horz" wrap="square" lIns="113792" tIns="113792" rIns="113792" bIns="113792" numCol="1" spcCol="1270" anchor="t" anchorCtr="0">
+        <a:bodyPr spcFirstLastPara="0" vert="horz" wrap="square" lIns="99568" tIns="99568" rIns="99568" bIns="99568" numCol="1" spcCol="1270" anchor="t" anchorCtr="0">
           <a:noAutofit/>
         </a:bodyPr>
         <a:lstStyle/>
         <a:p>
-          <a:pPr marL="171450" lvl="1" indent="-171450" algn="l" defTabSz="711200">
+          <a:pPr marL="114300" lvl="1" indent="-114300" algn="l" defTabSz="622300">
             <a:lnSpc>
               <a:spcPct val="90000"/>
             </a:lnSpc>
@@ -8774,15 +10092,15 @@
             <a:buChar char="••"/>
           </a:pPr>
           <a:r>
-            <a:rPr lang="pt-BR" sz="1600" kern="1200" dirty="0" smtClean="0"/>
+            <a:rPr lang="pt-BR" sz="1400" b="1" kern="1200" dirty="0" smtClean="0"/>
             <a:t>?</a:t>
           </a:r>
-          <a:endParaRPr lang="pt-BR" sz="1600" kern="1200" dirty="0"/>
+          <a:endParaRPr lang="pt-BR" sz="1400" b="1" kern="1200" dirty="0"/>
         </a:p>
       </dsp:txBody>
       <dsp:txXfrm>
-        <a:off x="406678" y="812672"/>
-        <a:ext cx="1964455" cy="3686400"/>
+        <a:off x="464215" y="870209"/>
+        <a:ext cx="1849381" cy="3571326"/>
       </dsp:txXfrm>
     </dsp:sp>
     <dsp:sp modelId="{330F8E89-32DF-4BC4-AED2-91D2D7CB94C5}">
@@ -8911,8 +10229,8 @@
         </a:p>
       </dsp:txBody>
       <dsp:txXfrm>
-        <a:off x="2266580" y="175234"/>
-        <a:ext cx="631345" cy="489092"/>
+        <a:off x="2266580" y="273052"/>
+        <a:ext cx="484617" cy="293456"/>
       </dsp:txXfrm>
     </dsp:sp>
     <dsp:sp modelId="{D6C82472-F7A1-44F8-BE16-C0E2E40E0D6B}">
@@ -9089,12 +10407,12 @@
         </a:fontRef>
       </dsp:style>
       <dsp:txBody>
-        <a:bodyPr spcFirstLastPara="0" vert="horz" wrap="square" lIns="113792" tIns="113792" rIns="113792" bIns="113792" numCol="1" spcCol="1270" anchor="t" anchorCtr="0">
+        <a:bodyPr spcFirstLastPara="0" vert="horz" wrap="square" lIns="99568" tIns="99568" rIns="99568" bIns="99568" numCol="1" spcCol="1270" anchor="t" anchorCtr="0">
           <a:noAutofit/>
         </a:bodyPr>
         <a:lstStyle/>
         <a:p>
-          <a:pPr marL="171450" lvl="1" indent="-171450" algn="l" defTabSz="711200">
+          <a:pPr marL="114300" lvl="1" indent="-114300" algn="l" defTabSz="622300">
             <a:lnSpc>
               <a:spcPct val="90000"/>
             </a:lnSpc>
@@ -9107,15 +10425,15 @@
             <a:buChar char="••"/>
           </a:pPr>
           <a:r>
-            <a:rPr lang="pt-BR" sz="1600" kern="1200" dirty="0" smtClean="0"/>
+            <a:rPr lang="pt-BR" sz="1400" b="1" kern="1200" dirty="0" smtClean="0"/>
             <a:t>?</a:t>
           </a:r>
-          <a:endParaRPr lang="pt-BR" sz="1600" kern="1200" dirty="0"/>
+          <a:endParaRPr lang="pt-BR" sz="1400" b="1" kern="1200" dirty="0"/>
         </a:p>
       </dsp:txBody>
       <dsp:txXfrm>
-        <a:off x="3562351" y="812672"/>
-        <a:ext cx="1964455" cy="3686400"/>
+        <a:off x="3619888" y="870209"/>
+        <a:ext cx="1849381" cy="3571326"/>
       </dsp:txXfrm>
     </dsp:sp>
     <dsp:sp modelId="{1390A124-BEDA-4A49-9B1B-0ED2FB571A6C}">
@@ -9244,8 +10562,8 @@
         </a:p>
       </dsp:txBody>
       <dsp:txXfrm>
-        <a:off x="5422252" y="175234"/>
-        <a:ext cx="631345" cy="489092"/>
+        <a:off x="5422252" y="273052"/>
+        <a:ext cx="484617" cy="293456"/>
       </dsp:txXfrm>
     </dsp:sp>
     <dsp:sp modelId="{944B484B-F688-4CFA-A4FB-08B237CA5903}">
@@ -9422,12 +10740,12 @@
         </a:fontRef>
       </dsp:style>
       <dsp:txBody>
-        <a:bodyPr spcFirstLastPara="0" vert="horz" wrap="square" lIns="113792" tIns="113792" rIns="113792" bIns="113792" numCol="1" spcCol="1270" anchor="t" anchorCtr="0">
+        <a:bodyPr spcFirstLastPara="0" vert="horz" wrap="square" lIns="99568" tIns="99568" rIns="99568" bIns="99568" numCol="1" spcCol="1270" anchor="t" anchorCtr="0">
           <a:noAutofit/>
         </a:bodyPr>
         <a:lstStyle/>
         <a:p>
-          <a:pPr marL="171450" lvl="1" indent="-171450" algn="l" defTabSz="711200">
+          <a:pPr marL="114300" lvl="1" indent="-114300" algn="l" defTabSz="622300">
             <a:lnSpc>
               <a:spcPct val="90000"/>
             </a:lnSpc>
@@ -9440,15 +10758,15 @@
             <a:buChar char="••"/>
           </a:pPr>
           <a:r>
-            <a:rPr lang="pt-BR" sz="1600" kern="1200" dirty="0" smtClean="0"/>
+            <a:rPr lang="pt-BR" sz="1400" b="1" kern="1200" dirty="0" smtClean="0"/>
             <a:t>?</a:t>
           </a:r>
-          <a:endParaRPr lang="pt-BR" sz="1600" kern="1200" dirty="0"/>
+          <a:endParaRPr lang="pt-BR" sz="1400" b="1" kern="1200" dirty="0"/>
         </a:p>
       </dsp:txBody>
       <dsp:txXfrm>
-        <a:off x="6718024" y="812672"/>
-        <a:ext cx="1964455" cy="3686400"/>
+        <a:off x="6775561" y="870209"/>
+        <a:ext cx="1849381" cy="3571326"/>
       </dsp:txXfrm>
     </dsp:sp>
   </dsp:spTree>
@@ -9456,7 +10774,943 @@
 </file>
 
 <file path=ppt/diagrams/drawing3.xml><?xml version="1.0" encoding="utf-8"?>
-<dsp:drawing xmlns:dgm="http://schemas.openxmlformats.org/drawingml/2006/diagram" xmlns:a="http://schemas.openxmlformats.org/drawingml/2006/main" xmlns:dsp="http://schemas.microsoft.com/office/drawing/2008/diagram">
+<dsp:drawing xmlns:dgm="http://schemas.openxmlformats.org/drawingml/2006/diagram" xmlns:dsp="http://schemas.microsoft.com/office/drawing/2008/diagram" xmlns:a="http://schemas.openxmlformats.org/drawingml/2006/main">
+  <dsp:spTree>
+    <dsp:nvGrpSpPr>
+      <dsp:cNvPr id="0" name=""/>
+      <dsp:cNvGrpSpPr/>
+    </dsp:nvGrpSpPr>
+    <dsp:grpSpPr/>
+    <dsp:sp modelId="{78E90345-FE91-47A7-8E8D-7EC91F8F325D}">
+      <dsp:nvSpPr>
+        <dsp:cNvPr id="0" name=""/>
+        <dsp:cNvSpPr/>
+      </dsp:nvSpPr>
+      <dsp:spPr>
+        <a:xfrm>
+          <a:off x="5677" y="894390"/>
+          <a:ext cx="4231924" cy="497873"/>
+        </a:xfrm>
+        <a:prstGeom prst="rect">
+          <a:avLst/>
+        </a:prstGeom>
+        <a:solidFill>
+          <a:schemeClr val="accent1">
+            <a:hueOff val="0"/>
+            <a:satOff val="0"/>
+            <a:lumOff val="0"/>
+            <a:alphaOff val="0"/>
+          </a:schemeClr>
+        </a:solidFill>
+        <a:ln w="25400" cap="flat" cmpd="sng" algn="ctr">
+          <a:solidFill>
+            <a:schemeClr val="accent1">
+              <a:hueOff val="0"/>
+              <a:satOff val="0"/>
+              <a:lumOff val="0"/>
+              <a:alphaOff val="0"/>
+            </a:schemeClr>
+          </a:solidFill>
+          <a:prstDash val="solid"/>
+        </a:ln>
+        <a:effectLst/>
+      </dsp:spPr>
+      <dsp:style>
+        <a:lnRef idx="2">
+          <a:scrgbClr r="0" g="0" b="0"/>
+        </a:lnRef>
+        <a:fillRef idx="1">
+          <a:scrgbClr r="0" g="0" b="0"/>
+        </a:fillRef>
+        <a:effectRef idx="0">
+          <a:scrgbClr r="0" g="0" b="0"/>
+        </a:effectRef>
+        <a:fontRef idx="minor">
+          <a:schemeClr val="lt1"/>
+        </a:fontRef>
+      </dsp:style>
+    </dsp:sp>
+    <dsp:sp modelId="{442AB41D-A8B9-4C81-AFE5-A9DDC7C501DB}">
+      <dsp:nvSpPr>
+        <dsp:cNvPr id="0" name=""/>
+        <dsp:cNvSpPr/>
+      </dsp:nvSpPr>
+      <dsp:spPr>
+        <a:xfrm>
+          <a:off x="5677" y="1081371"/>
+          <a:ext cx="310892" cy="310892"/>
+        </a:xfrm>
+        <a:prstGeom prst="rect">
+          <a:avLst/>
+        </a:prstGeom>
+        <a:solidFill>
+          <a:schemeClr val="lt1">
+            <a:alpha val="90000"/>
+            <a:hueOff val="0"/>
+            <a:satOff val="0"/>
+            <a:lumOff val="0"/>
+            <a:alphaOff val="0"/>
+          </a:schemeClr>
+        </a:solidFill>
+        <a:ln w="25400" cap="flat" cmpd="sng" algn="ctr">
+          <a:solidFill>
+            <a:schemeClr val="accent1">
+              <a:hueOff val="0"/>
+              <a:satOff val="0"/>
+              <a:lumOff val="0"/>
+              <a:alphaOff val="0"/>
+            </a:schemeClr>
+          </a:solidFill>
+          <a:prstDash val="solid"/>
+        </a:ln>
+        <a:effectLst/>
+      </dsp:spPr>
+      <dsp:style>
+        <a:lnRef idx="2">
+          <a:scrgbClr r="0" g="0" b="0"/>
+        </a:lnRef>
+        <a:fillRef idx="1">
+          <a:scrgbClr r="0" g="0" b="0"/>
+        </a:fillRef>
+        <a:effectRef idx="0">
+          <a:scrgbClr r="0" g="0" b="0"/>
+        </a:effectRef>
+        <a:fontRef idx="minor"/>
+      </dsp:style>
+    </dsp:sp>
+    <dsp:sp modelId="{F0A18B1E-4B8C-49D0-A2C5-B72A0992791A}">
+      <dsp:nvSpPr>
+        <dsp:cNvPr id="0" name=""/>
+        <dsp:cNvSpPr/>
+      </dsp:nvSpPr>
+      <dsp:spPr>
+        <a:xfrm>
+          <a:off x="5677" y="0"/>
+          <a:ext cx="4231924" cy="894390"/>
+        </a:xfrm>
+        <a:prstGeom prst="rect">
+          <a:avLst/>
+        </a:prstGeom>
+        <a:noFill/>
+        <a:ln>
+          <a:noFill/>
+        </a:ln>
+        <a:effectLst/>
+      </dsp:spPr>
+      <dsp:style>
+        <a:lnRef idx="0">
+          <a:scrgbClr r="0" g="0" b="0"/>
+        </a:lnRef>
+        <a:fillRef idx="0">
+          <a:scrgbClr r="0" g="0" b="0"/>
+        </a:fillRef>
+        <a:effectRef idx="0">
+          <a:scrgbClr r="0" g="0" b="0"/>
+        </a:effectRef>
+        <a:fontRef idx="minor"/>
+      </dsp:style>
+      <dsp:txBody>
+        <a:bodyPr spcFirstLastPara="0" vert="horz" wrap="square" lIns="108585" tIns="72390" rIns="108585" bIns="72390" numCol="1" spcCol="1270" anchor="ctr" anchorCtr="0">
+          <a:noAutofit/>
+        </a:bodyPr>
+        <a:lstStyle/>
+        <a:p>
+          <a:pPr lvl="0" algn="l" defTabSz="2533650">
+            <a:lnSpc>
+              <a:spcPct val="90000"/>
+            </a:lnSpc>
+            <a:spcBef>
+              <a:spcPct val="0"/>
+            </a:spcBef>
+            <a:spcAft>
+              <a:spcPct val="35000"/>
+            </a:spcAft>
+          </a:pPr>
+          <a:endParaRPr lang="pt-BR" sz="5700" kern="1200"/>
+        </a:p>
+      </dsp:txBody>
+      <dsp:txXfrm>
+        <a:off x="5677" y="0"/>
+        <a:ext cx="4231924" cy="894390"/>
+      </dsp:txXfrm>
+    </dsp:sp>
+    <dsp:sp modelId="{8A80B33F-319E-4097-BABE-6D06200B4059}">
+      <dsp:nvSpPr>
+        <dsp:cNvPr id="0" name=""/>
+        <dsp:cNvSpPr/>
+      </dsp:nvSpPr>
+      <dsp:spPr>
+        <a:xfrm>
+          <a:off x="5677" y="1806052"/>
+          <a:ext cx="310884" cy="310884"/>
+        </a:xfrm>
+        <a:prstGeom prst="rect">
+          <a:avLst/>
+        </a:prstGeom>
+        <a:solidFill>
+          <a:schemeClr val="lt1">
+            <a:hueOff val="0"/>
+            <a:satOff val="0"/>
+            <a:lumOff val="0"/>
+            <a:alphaOff val="0"/>
+          </a:schemeClr>
+        </a:solidFill>
+        <a:ln w="25400" cap="flat" cmpd="sng" algn="ctr">
+          <a:solidFill>
+            <a:schemeClr val="accent1">
+              <a:hueOff val="0"/>
+              <a:satOff val="0"/>
+              <a:lumOff val="0"/>
+              <a:alphaOff val="0"/>
+            </a:schemeClr>
+          </a:solidFill>
+          <a:prstDash val="solid"/>
+        </a:ln>
+        <a:effectLst/>
+      </dsp:spPr>
+      <dsp:style>
+        <a:lnRef idx="2">
+          <a:scrgbClr r="0" g="0" b="0"/>
+        </a:lnRef>
+        <a:fillRef idx="1">
+          <a:scrgbClr r="0" g="0" b="0"/>
+        </a:fillRef>
+        <a:effectRef idx="0">
+          <a:scrgbClr r="0" g="0" b="0"/>
+        </a:effectRef>
+        <a:fontRef idx="minor"/>
+      </dsp:style>
+    </dsp:sp>
+    <dsp:sp modelId="{22C7BCBD-CEEE-4C3C-8575-8FCB6CDA438E}">
+      <dsp:nvSpPr>
+        <dsp:cNvPr id="0" name=""/>
+        <dsp:cNvSpPr/>
+      </dsp:nvSpPr>
+      <dsp:spPr>
+        <a:xfrm>
+          <a:off x="301911" y="1599157"/>
+          <a:ext cx="3935690" cy="724673"/>
+        </a:xfrm>
+        <a:prstGeom prst="rect">
+          <a:avLst/>
+        </a:prstGeom>
+        <a:noFill/>
+        <a:ln>
+          <a:noFill/>
+        </a:ln>
+        <a:effectLst/>
+      </dsp:spPr>
+      <dsp:style>
+        <a:lnRef idx="0">
+          <a:scrgbClr r="0" g="0" b="0"/>
+        </a:lnRef>
+        <a:fillRef idx="0">
+          <a:scrgbClr r="0" g="0" b="0"/>
+        </a:fillRef>
+        <a:effectRef idx="0">
+          <a:scrgbClr r="0" g="0" b="0"/>
+        </a:effectRef>
+        <a:fontRef idx="minor"/>
+      </dsp:style>
+      <dsp:txBody>
+        <a:bodyPr spcFirstLastPara="0" vert="horz" wrap="square" lIns="184912" tIns="184912" rIns="184912" bIns="184912" numCol="1" spcCol="1270" anchor="ctr" anchorCtr="0">
+          <a:noAutofit/>
+        </a:bodyPr>
+        <a:lstStyle/>
+        <a:p>
+          <a:pPr lvl="0" algn="l" defTabSz="1155700">
+            <a:lnSpc>
+              <a:spcPct val="90000"/>
+            </a:lnSpc>
+            <a:spcBef>
+              <a:spcPct val="0"/>
+            </a:spcBef>
+            <a:spcAft>
+              <a:spcPct val="35000"/>
+            </a:spcAft>
+          </a:pPr>
+          <a:endParaRPr lang="pt-BR" sz="2600" kern="1200"/>
+        </a:p>
+      </dsp:txBody>
+      <dsp:txXfrm>
+        <a:off x="301911" y="1599157"/>
+        <a:ext cx="3935690" cy="724673"/>
+      </dsp:txXfrm>
+    </dsp:sp>
+    <dsp:sp modelId="{FDEBDDC6-2C76-49BA-AA17-2EC6B30C86BD}">
+      <dsp:nvSpPr>
+        <dsp:cNvPr id="0" name=""/>
+        <dsp:cNvSpPr/>
+      </dsp:nvSpPr>
+      <dsp:spPr>
+        <a:xfrm>
+          <a:off x="5677" y="2530725"/>
+          <a:ext cx="310884" cy="310884"/>
+        </a:xfrm>
+        <a:prstGeom prst="rect">
+          <a:avLst/>
+        </a:prstGeom>
+        <a:solidFill>
+          <a:schemeClr val="lt1">
+            <a:hueOff val="0"/>
+            <a:satOff val="0"/>
+            <a:lumOff val="0"/>
+            <a:alphaOff val="0"/>
+          </a:schemeClr>
+        </a:solidFill>
+        <a:ln w="25400" cap="flat" cmpd="sng" algn="ctr">
+          <a:solidFill>
+            <a:schemeClr val="accent1">
+              <a:hueOff val="0"/>
+              <a:satOff val="0"/>
+              <a:lumOff val="0"/>
+              <a:alphaOff val="0"/>
+            </a:schemeClr>
+          </a:solidFill>
+          <a:prstDash val="solid"/>
+        </a:ln>
+        <a:effectLst/>
+      </dsp:spPr>
+      <dsp:style>
+        <a:lnRef idx="2">
+          <a:scrgbClr r="0" g="0" b="0"/>
+        </a:lnRef>
+        <a:fillRef idx="1">
+          <a:scrgbClr r="0" g="0" b="0"/>
+        </a:fillRef>
+        <a:effectRef idx="0">
+          <a:scrgbClr r="0" g="0" b="0"/>
+        </a:effectRef>
+        <a:fontRef idx="minor"/>
+      </dsp:style>
+    </dsp:sp>
+    <dsp:sp modelId="{B93FB06B-349E-4C46-9386-C2A7693F919C}">
+      <dsp:nvSpPr>
+        <dsp:cNvPr id="0" name=""/>
+        <dsp:cNvSpPr/>
+      </dsp:nvSpPr>
+      <dsp:spPr>
+        <a:xfrm>
+          <a:off x="301911" y="2323831"/>
+          <a:ext cx="3935690" cy="724673"/>
+        </a:xfrm>
+        <a:prstGeom prst="rect">
+          <a:avLst/>
+        </a:prstGeom>
+        <a:noFill/>
+        <a:ln>
+          <a:noFill/>
+        </a:ln>
+        <a:effectLst/>
+      </dsp:spPr>
+      <dsp:style>
+        <a:lnRef idx="0">
+          <a:scrgbClr r="0" g="0" b="0"/>
+        </a:lnRef>
+        <a:fillRef idx="0">
+          <a:scrgbClr r="0" g="0" b="0"/>
+        </a:fillRef>
+        <a:effectRef idx="0">
+          <a:scrgbClr r="0" g="0" b="0"/>
+        </a:effectRef>
+        <a:fontRef idx="minor"/>
+      </dsp:style>
+      <dsp:txBody>
+        <a:bodyPr spcFirstLastPara="0" vert="horz" wrap="square" lIns="184912" tIns="184912" rIns="184912" bIns="184912" numCol="1" spcCol="1270" anchor="ctr" anchorCtr="0">
+          <a:noAutofit/>
+        </a:bodyPr>
+        <a:lstStyle/>
+        <a:p>
+          <a:pPr lvl="0" algn="l" defTabSz="1155700">
+            <a:lnSpc>
+              <a:spcPct val="90000"/>
+            </a:lnSpc>
+            <a:spcBef>
+              <a:spcPct val="0"/>
+            </a:spcBef>
+            <a:spcAft>
+              <a:spcPct val="35000"/>
+            </a:spcAft>
+          </a:pPr>
+          <a:endParaRPr lang="pt-BR" sz="2600" kern="1200"/>
+        </a:p>
+      </dsp:txBody>
+      <dsp:txXfrm>
+        <a:off x="301911" y="2323831"/>
+        <a:ext cx="3935690" cy="724673"/>
+      </dsp:txXfrm>
+    </dsp:sp>
+    <dsp:sp modelId="{F1021B75-F18F-4829-9EBD-5BA808E16033}">
+      <dsp:nvSpPr>
+        <dsp:cNvPr id="0" name=""/>
+        <dsp:cNvSpPr/>
+      </dsp:nvSpPr>
+      <dsp:spPr>
+        <a:xfrm>
+          <a:off x="5677" y="3255398"/>
+          <a:ext cx="310884" cy="310884"/>
+        </a:xfrm>
+        <a:prstGeom prst="rect">
+          <a:avLst/>
+        </a:prstGeom>
+        <a:solidFill>
+          <a:schemeClr val="lt1">
+            <a:hueOff val="0"/>
+            <a:satOff val="0"/>
+            <a:lumOff val="0"/>
+            <a:alphaOff val="0"/>
+          </a:schemeClr>
+        </a:solidFill>
+        <a:ln w="25400" cap="flat" cmpd="sng" algn="ctr">
+          <a:solidFill>
+            <a:schemeClr val="accent1">
+              <a:hueOff val="0"/>
+              <a:satOff val="0"/>
+              <a:lumOff val="0"/>
+              <a:alphaOff val="0"/>
+            </a:schemeClr>
+          </a:solidFill>
+          <a:prstDash val="solid"/>
+        </a:ln>
+        <a:effectLst/>
+      </dsp:spPr>
+      <dsp:style>
+        <a:lnRef idx="2">
+          <a:scrgbClr r="0" g="0" b="0"/>
+        </a:lnRef>
+        <a:fillRef idx="1">
+          <a:scrgbClr r="0" g="0" b="0"/>
+        </a:fillRef>
+        <a:effectRef idx="0">
+          <a:scrgbClr r="0" g="0" b="0"/>
+        </a:effectRef>
+        <a:fontRef idx="minor"/>
+      </dsp:style>
+    </dsp:sp>
+    <dsp:sp modelId="{3094B189-7DCD-4266-B46D-8752B3C3A89E}">
+      <dsp:nvSpPr>
+        <dsp:cNvPr id="0" name=""/>
+        <dsp:cNvSpPr/>
+      </dsp:nvSpPr>
+      <dsp:spPr>
+        <a:xfrm>
+          <a:off x="301911" y="3048504"/>
+          <a:ext cx="3935690" cy="724673"/>
+        </a:xfrm>
+        <a:prstGeom prst="rect">
+          <a:avLst/>
+        </a:prstGeom>
+        <a:noFill/>
+        <a:ln>
+          <a:noFill/>
+        </a:ln>
+        <a:effectLst/>
+      </dsp:spPr>
+      <dsp:style>
+        <a:lnRef idx="0">
+          <a:scrgbClr r="0" g="0" b="0"/>
+        </a:lnRef>
+        <a:fillRef idx="0">
+          <a:scrgbClr r="0" g="0" b="0"/>
+        </a:fillRef>
+        <a:effectRef idx="0">
+          <a:scrgbClr r="0" g="0" b="0"/>
+        </a:effectRef>
+        <a:fontRef idx="minor"/>
+      </dsp:style>
+      <dsp:txBody>
+        <a:bodyPr spcFirstLastPara="0" vert="horz" wrap="square" lIns="184912" tIns="184912" rIns="184912" bIns="184912" numCol="1" spcCol="1270" anchor="ctr" anchorCtr="0">
+          <a:noAutofit/>
+        </a:bodyPr>
+        <a:lstStyle/>
+        <a:p>
+          <a:pPr lvl="0" algn="l" defTabSz="1155700">
+            <a:lnSpc>
+              <a:spcPct val="90000"/>
+            </a:lnSpc>
+            <a:spcBef>
+              <a:spcPct val="0"/>
+            </a:spcBef>
+            <a:spcAft>
+              <a:spcPct val="35000"/>
+            </a:spcAft>
+          </a:pPr>
+          <a:endParaRPr lang="pt-BR" sz="2600" kern="1200"/>
+        </a:p>
+      </dsp:txBody>
+      <dsp:txXfrm>
+        <a:off x="301911" y="3048504"/>
+        <a:ext cx="3935690" cy="724673"/>
+      </dsp:txXfrm>
+    </dsp:sp>
+    <dsp:sp modelId="{1101818C-F9E6-48B1-8106-9EDF7C77010F}">
+      <dsp:nvSpPr>
+        <dsp:cNvPr id="0" name=""/>
+        <dsp:cNvSpPr/>
+      </dsp:nvSpPr>
+      <dsp:spPr>
+        <a:xfrm>
+          <a:off x="4449198" y="894390"/>
+          <a:ext cx="4231924" cy="497873"/>
+        </a:xfrm>
+        <a:prstGeom prst="rect">
+          <a:avLst/>
+        </a:prstGeom>
+        <a:solidFill>
+          <a:schemeClr val="accent1">
+            <a:hueOff val="0"/>
+            <a:satOff val="0"/>
+            <a:lumOff val="0"/>
+            <a:alphaOff val="0"/>
+          </a:schemeClr>
+        </a:solidFill>
+        <a:ln w="25400" cap="flat" cmpd="sng" algn="ctr">
+          <a:solidFill>
+            <a:schemeClr val="accent1">
+              <a:hueOff val="0"/>
+              <a:satOff val="0"/>
+              <a:lumOff val="0"/>
+              <a:alphaOff val="0"/>
+            </a:schemeClr>
+          </a:solidFill>
+          <a:prstDash val="solid"/>
+        </a:ln>
+        <a:effectLst/>
+      </dsp:spPr>
+      <dsp:style>
+        <a:lnRef idx="2">
+          <a:scrgbClr r="0" g="0" b="0"/>
+        </a:lnRef>
+        <a:fillRef idx="1">
+          <a:scrgbClr r="0" g="0" b="0"/>
+        </a:fillRef>
+        <a:effectRef idx="0">
+          <a:scrgbClr r="0" g="0" b="0"/>
+        </a:effectRef>
+        <a:fontRef idx="minor">
+          <a:schemeClr val="lt1"/>
+        </a:fontRef>
+      </dsp:style>
+    </dsp:sp>
+    <dsp:sp modelId="{84502440-DF3A-49DD-9E3E-7B520195C2F2}">
+      <dsp:nvSpPr>
+        <dsp:cNvPr id="0" name=""/>
+        <dsp:cNvSpPr/>
+      </dsp:nvSpPr>
+      <dsp:spPr>
+        <a:xfrm>
+          <a:off x="4449198" y="1081371"/>
+          <a:ext cx="310892" cy="310892"/>
+        </a:xfrm>
+        <a:prstGeom prst="rect">
+          <a:avLst/>
+        </a:prstGeom>
+        <a:solidFill>
+          <a:schemeClr val="lt1">
+            <a:alpha val="90000"/>
+            <a:hueOff val="0"/>
+            <a:satOff val="0"/>
+            <a:lumOff val="0"/>
+            <a:alphaOff val="0"/>
+          </a:schemeClr>
+        </a:solidFill>
+        <a:ln w="25400" cap="flat" cmpd="sng" algn="ctr">
+          <a:solidFill>
+            <a:schemeClr val="accent1">
+              <a:hueOff val="0"/>
+              <a:satOff val="0"/>
+              <a:lumOff val="0"/>
+              <a:alphaOff val="0"/>
+            </a:schemeClr>
+          </a:solidFill>
+          <a:prstDash val="solid"/>
+        </a:ln>
+        <a:effectLst/>
+      </dsp:spPr>
+      <dsp:style>
+        <a:lnRef idx="2">
+          <a:scrgbClr r="0" g="0" b="0"/>
+        </a:lnRef>
+        <a:fillRef idx="1">
+          <a:scrgbClr r="0" g="0" b="0"/>
+        </a:fillRef>
+        <a:effectRef idx="0">
+          <a:scrgbClr r="0" g="0" b="0"/>
+        </a:effectRef>
+        <a:fontRef idx="minor"/>
+      </dsp:style>
+    </dsp:sp>
+    <dsp:sp modelId="{920C1E90-5036-40EE-8B7B-C03BC172C6F4}">
+      <dsp:nvSpPr>
+        <dsp:cNvPr id="0" name=""/>
+        <dsp:cNvSpPr/>
+      </dsp:nvSpPr>
+      <dsp:spPr>
+        <a:xfrm>
+          <a:off x="4449198" y="0"/>
+          <a:ext cx="4231924" cy="894390"/>
+        </a:xfrm>
+        <a:prstGeom prst="rect">
+          <a:avLst/>
+        </a:prstGeom>
+        <a:noFill/>
+        <a:ln>
+          <a:noFill/>
+        </a:ln>
+        <a:effectLst/>
+      </dsp:spPr>
+      <dsp:style>
+        <a:lnRef idx="0">
+          <a:scrgbClr r="0" g="0" b="0"/>
+        </a:lnRef>
+        <a:fillRef idx="0">
+          <a:scrgbClr r="0" g="0" b="0"/>
+        </a:fillRef>
+        <a:effectRef idx="0">
+          <a:scrgbClr r="0" g="0" b="0"/>
+        </a:effectRef>
+        <a:fontRef idx="minor"/>
+      </dsp:style>
+      <dsp:txBody>
+        <a:bodyPr spcFirstLastPara="0" vert="horz" wrap="square" lIns="108585" tIns="72390" rIns="108585" bIns="72390" numCol="1" spcCol="1270" anchor="ctr" anchorCtr="0">
+          <a:noAutofit/>
+        </a:bodyPr>
+        <a:lstStyle/>
+        <a:p>
+          <a:pPr lvl="0" algn="l" defTabSz="2533650">
+            <a:lnSpc>
+              <a:spcPct val="90000"/>
+            </a:lnSpc>
+            <a:spcBef>
+              <a:spcPct val="0"/>
+            </a:spcBef>
+            <a:spcAft>
+              <a:spcPct val="35000"/>
+            </a:spcAft>
+          </a:pPr>
+          <a:endParaRPr lang="pt-BR" sz="5700" kern="1200"/>
+        </a:p>
+      </dsp:txBody>
+      <dsp:txXfrm>
+        <a:off x="4449198" y="0"/>
+        <a:ext cx="4231924" cy="894390"/>
+      </dsp:txXfrm>
+    </dsp:sp>
+    <dsp:sp modelId="{AC7AB7D7-9945-4B50-9E90-95E126A5DEAB}">
+      <dsp:nvSpPr>
+        <dsp:cNvPr id="0" name=""/>
+        <dsp:cNvSpPr/>
+      </dsp:nvSpPr>
+      <dsp:spPr>
+        <a:xfrm>
+          <a:off x="4449198" y="1806052"/>
+          <a:ext cx="310884" cy="310884"/>
+        </a:xfrm>
+        <a:prstGeom prst="rect">
+          <a:avLst/>
+        </a:prstGeom>
+        <a:solidFill>
+          <a:schemeClr val="lt1">
+            <a:hueOff val="0"/>
+            <a:satOff val="0"/>
+            <a:lumOff val="0"/>
+            <a:alphaOff val="0"/>
+          </a:schemeClr>
+        </a:solidFill>
+        <a:ln w="25400" cap="flat" cmpd="sng" algn="ctr">
+          <a:solidFill>
+            <a:schemeClr val="accent1">
+              <a:hueOff val="0"/>
+              <a:satOff val="0"/>
+              <a:lumOff val="0"/>
+              <a:alphaOff val="0"/>
+            </a:schemeClr>
+          </a:solidFill>
+          <a:prstDash val="solid"/>
+        </a:ln>
+        <a:effectLst/>
+      </dsp:spPr>
+      <dsp:style>
+        <a:lnRef idx="2">
+          <a:scrgbClr r="0" g="0" b="0"/>
+        </a:lnRef>
+        <a:fillRef idx="1">
+          <a:scrgbClr r="0" g="0" b="0"/>
+        </a:fillRef>
+        <a:effectRef idx="0">
+          <a:scrgbClr r="0" g="0" b="0"/>
+        </a:effectRef>
+        <a:fontRef idx="minor"/>
+      </dsp:style>
+    </dsp:sp>
+    <dsp:sp modelId="{D13322E5-B7AE-4570-A9FC-84DF641F4452}">
+      <dsp:nvSpPr>
+        <dsp:cNvPr id="0" name=""/>
+        <dsp:cNvSpPr/>
+      </dsp:nvSpPr>
+      <dsp:spPr>
+        <a:xfrm>
+          <a:off x="4745432" y="1599157"/>
+          <a:ext cx="3935690" cy="724673"/>
+        </a:xfrm>
+        <a:prstGeom prst="rect">
+          <a:avLst/>
+        </a:prstGeom>
+        <a:noFill/>
+        <a:ln>
+          <a:noFill/>
+        </a:ln>
+        <a:effectLst/>
+      </dsp:spPr>
+      <dsp:style>
+        <a:lnRef idx="0">
+          <a:scrgbClr r="0" g="0" b="0"/>
+        </a:lnRef>
+        <a:fillRef idx="0">
+          <a:scrgbClr r="0" g="0" b="0"/>
+        </a:fillRef>
+        <a:effectRef idx="0">
+          <a:scrgbClr r="0" g="0" b="0"/>
+        </a:effectRef>
+        <a:fontRef idx="minor"/>
+      </dsp:style>
+      <dsp:txBody>
+        <a:bodyPr spcFirstLastPara="0" vert="horz" wrap="square" lIns="184912" tIns="184912" rIns="184912" bIns="184912" numCol="1" spcCol="1270" anchor="ctr" anchorCtr="0">
+          <a:noAutofit/>
+        </a:bodyPr>
+        <a:lstStyle/>
+        <a:p>
+          <a:pPr lvl="0" algn="l" defTabSz="1155700">
+            <a:lnSpc>
+              <a:spcPct val="90000"/>
+            </a:lnSpc>
+            <a:spcBef>
+              <a:spcPct val="0"/>
+            </a:spcBef>
+            <a:spcAft>
+              <a:spcPct val="35000"/>
+            </a:spcAft>
+          </a:pPr>
+          <a:endParaRPr lang="pt-BR" sz="2600" kern="1200"/>
+        </a:p>
+      </dsp:txBody>
+      <dsp:txXfrm>
+        <a:off x="4745432" y="1599157"/>
+        <a:ext cx="3935690" cy="724673"/>
+      </dsp:txXfrm>
+    </dsp:sp>
+    <dsp:sp modelId="{51818F82-5864-453D-89E1-3C9A291A4AF3}">
+      <dsp:nvSpPr>
+        <dsp:cNvPr id="0" name=""/>
+        <dsp:cNvSpPr/>
+      </dsp:nvSpPr>
+      <dsp:spPr>
+        <a:xfrm>
+          <a:off x="4449198" y="2530725"/>
+          <a:ext cx="310884" cy="310884"/>
+        </a:xfrm>
+        <a:prstGeom prst="rect">
+          <a:avLst/>
+        </a:prstGeom>
+        <a:solidFill>
+          <a:schemeClr val="lt1">
+            <a:hueOff val="0"/>
+            <a:satOff val="0"/>
+            <a:lumOff val="0"/>
+            <a:alphaOff val="0"/>
+          </a:schemeClr>
+        </a:solidFill>
+        <a:ln w="25400" cap="flat" cmpd="sng" algn="ctr">
+          <a:solidFill>
+            <a:schemeClr val="accent1">
+              <a:hueOff val="0"/>
+              <a:satOff val="0"/>
+              <a:lumOff val="0"/>
+              <a:alphaOff val="0"/>
+            </a:schemeClr>
+          </a:solidFill>
+          <a:prstDash val="solid"/>
+        </a:ln>
+        <a:effectLst/>
+      </dsp:spPr>
+      <dsp:style>
+        <a:lnRef idx="2">
+          <a:scrgbClr r="0" g="0" b="0"/>
+        </a:lnRef>
+        <a:fillRef idx="1">
+          <a:scrgbClr r="0" g="0" b="0"/>
+        </a:fillRef>
+        <a:effectRef idx="0">
+          <a:scrgbClr r="0" g="0" b="0"/>
+        </a:effectRef>
+        <a:fontRef idx="minor"/>
+      </dsp:style>
+    </dsp:sp>
+    <dsp:sp modelId="{37B72757-B95B-4606-93FF-4ADF0BB6D429}">
+      <dsp:nvSpPr>
+        <dsp:cNvPr id="0" name=""/>
+        <dsp:cNvSpPr/>
+      </dsp:nvSpPr>
+      <dsp:spPr>
+        <a:xfrm>
+          <a:off x="4745432" y="2323831"/>
+          <a:ext cx="3935690" cy="724673"/>
+        </a:xfrm>
+        <a:prstGeom prst="rect">
+          <a:avLst/>
+        </a:prstGeom>
+        <a:noFill/>
+        <a:ln>
+          <a:noFill/>
+        </a:ln>
+        <a:effectLst/>
+      </dsp:spPr>
+      <dsp:style>
+        <a:lnRef idx="0">
+          <a:scrgbClr r="0" g="0" b="0"/>
+        </a:lnRef>
+        <a:fillRef idx="0">
+          <a:scrgbClr r="0" g="0" b="0"/>
+        </a:fillRef>
+        <a:effectRef idx="0">
+          <a:scrgbClr r="0" g="0" b="0"/>
+        </a:effectRef>
+        <a:fontRef idx="minor"/>
+      </dsp:style>
+      <dsp:txBody>
+        <a:bodyPr spcFirstLastPara="0" vert="horz" wrap="square" lIns="184912" tIns="184912" rIns="184912" bIns="184912" numCol="1" spcCol="1270" anchor="ctr" anchorCtr="0">
+          <a:noAutofit/>
+        </a:bodyPr>
+        <a:lstStyle/>
+        <a:p>
+          <a:pPr lvl="0" algn="l" defTabSz="1155700">
+            <a:lnSpc>
+              <a:spcPct val="90000"/>
+            </a:lnSpc>
+            <a:spcBef>
+              <a:spcPct val="0"/>
+            </a:spcBef>
+            <a:spcAft>
+              <a:spcPct val="35000"/>
+            </a:spcAft>
+          </a:pPr>
+          <a:endParaRPr lang="pt-BR" sz="2600" kern="1200"/>
+        </a:p>
+      </dsp:txBody>
+      <dsp:txXfrm>
+        <a:off x="4745432" y="2323831"/>
+        <a:ext cx="3935690" cy="724673"/>
+      </dsp:txXfrm>
+    </dsp:sp>
+    <dsp:sp modelId="{EF37E1C5-C3F1-4532-9E9C-884D1DE44A7F}">
+      <dsp:nvSpPr>
+        <dsp:cNvPr id="0" name=""/>
+        <dsp:cNvSpPr/>
+      </dsp:nvSpPr>
+      <dsp:spPr>
+        <a:xfrm>
+          <a:off x="4449198" y="3255398"/>
+          <a:ext cx="310884" cy="310884"/>
+        </a:xfrm>
+        <a:prstGeom prst="rect">
+          <a:avLst/>
+        </a:prstGeom>
+        <a:solidFill>
+          <a:schemeClr val="lt1">
+            <a:hueOff val="0"/>
+            <a:satOff val="0"/>
+            <a:lumOff val="0"/>
+            <a:alphaOff val="0"/>
+          </a:schemeClr>
+        </a:solidFill>
+        <a:ln w="25400" cap="flat" cmpd="sng" algn="ctr">
+          <a:solidFill>
+            <a:schemeClr val="accent1">
+              <a:hueOff val="0"/>
+              <a:satOff val="0"/>
+              <a:lumOff val="0"/>
+              <a:alphaOff val="0"/>
+            </a:schemeClr>
+          </a:solidFill>
+          <a:prstDash val="solid"/>
+        </a:ln>
+        <a:effectLst/>
+      </dsp:spPr>
+      <dsp:style>
+        <a:lnRef idx="2">
+          <a:scrgbClr r="0" g="0" b="0"/>
+        </a:lnRef>
+        <a:fillRef idx="1">
+          <a:scrgbClr r="0" g="0" b="0"/>
+        </a:fillRef>
+        <a:effectRef idx="0">
+          <a:scrgbClr r="0" g="0" b="0"/>
+        </a:effectRef>
+        <a:fontRef idx="minor"/>
+      </dsp:style>
+    </dsp:sp>
+    <dsp:sp modelId="{310F8D48-7B6A-4438-922B-86FD094F44BF}">
+      <dsp:nvSpPr>
+        <dsp:cNvPr id="0" name=""/>
+        <dsp:cNvSpPr/>
+      </dsp:nvSpPr>
+      <dsp:spPr>
+        <a:xfrm>
+          <a:off x="4745432" y="3048504"/>
+          <a:ext cx="3935690" cy="724673"/>
+        </a:xfrm>
+        <a:prstGeom prst="rect">
+          <a:avLst/>
+        </a:prstGeom>
+        <a:noFill/>
+        <a:ln>
+          <a:noFill/>
+        </a:ln>
+        <a:effectLst/>
+      </dsp:spPr>
+      <dsp:style>
+        <a:lnRef idx="0">
+          <a:scrgbClr r="0" g="0" b="0"/>
+        </a:lnRef>
+        <a:fillRef idx="0">
+          <a:scrgbClr r="0" g="0" b="0"/>
+        </a:fillRef>
+        <a:effectRef idx="0">
+          <a:scrgbClr r="0" g="0" b="0"/>
+        </a:effectRef>
+        <a:fontRef idx="minor"/>
+      </dsp:style>
+      <dsp:txBody>
+        <a:bodyPr spcFirstLastPara="0" vert="horz" wrap="square" lIns="184912" tIns="184912" rIns="184912" bIns="184912" numCol="1" spcCol="1270" anchor="ctr" anchorCtr="0">
+          <a:noAutofit/>
+        </a:bodyPr>
+        <a:lstStyle/>
+        <a:p>
+          <a:pPr lvl="0" algn="l" defTabSz="1155700">
+            <a:lnSpc>
+              <a:spcPct val="90000"/>
+            </a:lnSpc>
+            <a:spcBef>
+              <a:spcPct val="0"/>
+            </a:spcBef>
+            <a:spcAft>
+              <a:spcPct val="35000"/>
+            </a:spcAft>
+          </a:pPr>
+          <a:endParaRPr lang="pt-BR" sz="2600" kern="1200"/>
+        </a:p>
+      </dsp:txBody>
+      <dsp:txXfrm>
+        <a:off x="4745432" y="3048504"/>
+        <a:ext cx="3935690" cy="724673"/>
+      </dsp:txXfrm>
+    </dsp:sp>
+  </dsp:spTree>
+</dsp:drawing>
+</file>
+
+<file path=ppt/diagrams/drawing4.xml><?xml version="1.0" encoding="utf-8"?>
+<dsp:drawing xmlns:dgm="http://schemas.openxmlformats.org/drawingml/2006/diagram" xmlns:dsp="http://schemas.microsoft.com/office/drawing/2008/diagram" xmlns:a="http://schemas.openxmlformats.org/drawingml/2006/main">
   <dsp:spTree>
     <dsp:nvGrpSpPr>
       <dsp:cNvPr id="0" name=""/>
@@ -9619,8 +11873,8 @@
         </a:p>
       </dsp:txBody>
       <dsp:txXfrm>
-        <a:off x="3739" y="1495569"/>
-        <a:ext cx="2373731" cy="1205932"/>
+        <a:off x="39060" y="1530890"/>
+        <a:ext cx="2303089" cy="1135290"/>
       </dsp:txXfrm>
     </dsp:sp>
     <dsp:sp modelId="{BB47B8A7-A69A-47BA-8429-499D75D98923}">
@@ -9880,8 +12134,8 @@
         </a:p>
       </dsp:txBody>
       <dsp:txXfrm>
-        <a:off x="450782" y="938731"/>
-        <a:ext cx="2109983" cy="657781"/>
+        <a:off x="470048" y="957997"/>
+        <a:ext cx="2071451" cy="619249"/>
       </dsp:txXfrm>
     </dsp:sp>
     <dsp:sp modelId="{0C27C69B-3C82-4A7E-9AEC-146B678149A2}">
@@ -10019,8 +12273,8 @@
         </a:p>
       </dsp:txBody>
       <dsp:txXfrm>
-        <a:off x="3024660" y="1824460"/>
-        <a:ext cx="2373731" cy="1205932"/>
+        <a:off x="3059981" y="1859781"/>
+        <a:ext cx="2303089" cy="1135290"/>
       </dsp:txXfrm>
     </dsp:sp>
     <dsp:sp modelId="{E5E8036A-476D-4F9C-9D7B-4ED08A33C842}">
@@ -10286,8 +12540,8 @@
         </a:p>
       </dsp:txBody>
       <dsp:txXfrm>
-        <a:off x="3475120" y="938736"/>
-        <a:ext cx="2109983" cy="657781"/>
+        <a:off x="3494386" y="958002"/>
+        <a:ext cx="2071451" cy="619249"/>
       </dsp:txXfrm>
     </dsp:sp>
     <dsp:sp modelId="{AE566E9F-D101-4F88-9692-208EF2AE8557}">
@@ -10446,8 +12700,8 @@
         </a:p>
       </dsp:txBody>
       <dsp:txXfrm>
-        <a:off x="6045580" y="1495569"/>
-        <a:ext cx="2373731" cy="1205932"/>
+        <a:off x="6080901" y="1530890"/>
+        <a:ext cx="2303089" cy="1135290"/>
       </dsp:txXfrm>
     </dsp:sp>
     <dsp:sp modelId="{301F9B7A-61FD-4D71-8D0E-DCB457B0DAC9}">
@@ -10583,16 +12837,16 @@
         </a:p>
       </dsp:txBody>
       <dsp:txXfrm>
-        <a:off x="6499438" y="938731"/>
-        <a:ext cx="2109983" cy="657781"/>
+        <a:off x="6518704" y="957997"/>
+        <a:ext cx="2071451" cy="619249"/>
       </dsp:txXfrm>
     </dsp:sp>
   </dsp:spTree>
 </dsp:drawing>
 </file>
 
-<file path=ppt/diagrams/drawing4.xml><?xml version="1.0" encoding="utf-8"?>
-<dsp:drawing xmlns:dgm="http://schemas.openxmlformats.org/drawingml/2006/diagram" xmlns:a="http://schemas.openxmlformats.org/drawingml/2006/main" xmlns:dsp="http://schemas.microsoft.com/office/drawing/2008/diagram">
+<file path=ppt/diagrams/drawing5.xml><?xml version="1.0" encoding="utf-8"?>
+<dsp:drawing xmlns:dgm="http://schemas.openxmlformats.org/drawingml/2006/diagram" xmlns:dsp="http://schemas.microsoft.com/office/drawing/2008/diagram" xmlns:a="http://schemas.openxmlformats.org/drawingml/2006/main">
   <dsp:spTree>
     <dsp:nvGrpSpPr>
       <dsp:cNvPr id="0" name=""/>
@@ -10672,8 +12926,8 @@
         </a:p>
       </dsp:txBody>
       <dsp:txXfrm>
-        <a:off x="3555504" y="1625330"/>
-        <a:ext cx="1575790" cy="1617659"/>
+        <a:off x="3786273" y="1862231"/>
+        <a:ext cx="1114252" cy="1143857"/>
       </dsp:txXfrm>
     </dsp:sp>
     <dsp:sp modelId="{D858E594-9B1F-454E-812B-1D569755D339}">
@@ -10740,9 +12994,9 @@
           <a:endParaRPr lang="pt-BR" sz="1900" kern="1200"/>
         </a:p>
       </dsp:txBody>
-      <dsp:txXfrm rot="16200000">
-        <a:off x="4252145" y="1240913"/>
-        <a:ext cx="182509" cy="434806"/>
+      <dsp:txXfrm>
+        <a:off x="4279522" y="1355251"/>
+        <a:ext cx="127756" cy="260884"/>
       </dsp:txXfrm>
     </dsp:sp>
     <dsp:sp modelId="{E0159EA0-1A5D-476D-AD51-865243B2D714}">
@@ -10814,8 +13068,8 @@
         </a:p>
       </dsp:txBody>
       <dsp:txXfrm>
-        <a:off x="3703978" y="2130"/>
-        <a:ext cx="1278842" cy="1278842"/>
+        <a:off x="3891260" y="189412"/>
+        <a:ext cx="904278" cy="904278"/>
       </dsp:txXfrm>
     </dsp:sp>
     <dsp:sp modelId="{9D95D45C-9B20-4A4E-AD6C-37161FDE50AF}">
@@ -10882,9 +13136,9 @@
           <a:endParaRPr lang="pt-BR" sz="1900" kern="1200"/>
         </a:p>
       </dsp:txBody>
-      <dsp:txXfrm rot="20520000">
-        <a:off x="5165881" y="1918229"/>
-        <a:ext cx="192581" cy="434806"/>
+      <dsp:txXfrm>
+        <a:off x="5167295" y="2014117"/>
+        <a:ext cx="134807" cy="260884"/>
       </dsp:txXfrm>
     </dsp:sp>
     <dsp:sp modelId="{892AB89D-9357-4946-A690-9AB770094366}">
@@ -10956,8 +13210,8 @@
         </a:p>
       </dsp:txBody>
       <dsp:txXfrm>
-        <a:off x="5408849" y="1240792"/>
-        <a:ext cx="1278842" cy="1278842"/>
+        <a:off x="5596131" y="1428074"/>
+        <a:ext cx="904278" cy="904278"/>
       </dsp:txXfrm>
     </dsp:sp>
     <dsp:sp modelId="{8F93543A-5059-4DE8-A2FC-A99D358C55C0}">
@@ -11024,9 +13278,9 @@
           <a:endParaRPr lang="pt-BR" sz="1900" kern="1200"/>
         </a:p>
       </dsp:txBody>
-      <dsp:txXfrm rot="3240000">
-        <a:off x="4821518" y="3003138"/>
-        <a:ext cx="186441" cy="434806"/>
+      <dsp:txXfrm>
+        <a:off x="4833046" y="3067474"/>
+        <a:ext cx="130509" cy="260884"/>
       </dsp:txXfrm>
     </dsp:sp>
     <dsp:sp modelId="{4AE6AAFA-D59A-4F35-A5E8-C6D2EC6BBFF0}">
@@ -11098,8 +13352,8 @@
         </a:p>
       </dsp:txBody>
       <dsp:txXfrm>
-        <a:off x="4757647" y="3244988"/>
-        <a:ext cx="1278842" cy="1278842"/>
+        <a:off x="4944929" y="3432270"/>
+        <a:ext cx="904278" cy="904278"/>
       </dsp:txXfrm>
     </dsp:sp>
     <dsp:sp modelId="{D32B50BC-8F9A-4A06-941D-13004E7B3F17}">
@@ -11166,9 +13420,9 @@
           <a:endParaRPr lang="pt-BR" sz="1900" kern="1200"/>
         </a:p>
       </dsp:txBody>
-      <dsp:txXfrm rot="7560000">
-        <a:off x="3678839" y="3003138"/>
-        <a:ext cx="186441" cy="434806"/>
+      <dsp:txXfrm rot="10800000">
+        <a:off x="3723243" y="3067474"/>
+        <a:ext cx="130509" cy="260884"/>
       </dsp:txXfrm>
     </dsp:sp>
     <dsp:sp modelId="{42C28B57-95B0-4561-B729-7C55DC80C4C3}">
@@ -11240,8 +13494,8 @@
         </a:p>
       </dsp:txBody>
       <dsp:txXfrm>
-        <a:off x="2650310" y="3244988"/>
-        <a:ext cx="1278842" cy="1278842"/>
+        <a:off x="2837592" y="3432270"/>
+        <a:ext cx="904278" cy="904278"/>
       </dsp:txXfrm>
     </dsp:sp>
     <dsp:sp modelId="{BED8CFF9-57DF-415B-BFD2-F23237B98D78}">
@@ -11308,9 +13562,9 @@
           <a:endParaRPr lang="pt-BR" sz="1900" kern="1200"/>
         </a:p>
       </dsp:txBody>
-      <dsp:txXfrm rot="11880000">
-        <a:off x="3328336" y="1918229"/>
-        <a:ext cx="192581" cy="434806"/>
+      <dsp:txXfrm rot="10800000">
+        <a:off x="3384696" y="2014117"/>
+        <a:ext cx="134807" cy="260884"/>
       </dsp:txXfrm>
     </dsp:sp>
     <dsp:sp modelId="{AE23CEE4-5E78-4BF2-A4EC-856A2ACE758E}">
@@ -11382,16 +13636,16 @@
         </a:p>
       </dsp:txBody>
       <dsp:txXfrm>
-        <a:off x="1999107" y="1240792"/>
-        <a:ext cx="1278842" cy="1278842"/>
+        <a:off x="2186389" y="1428074"/>
+        <a:ext cx="904278" cy="904278"/>
       </dsp:txXfrm>
     </dsp:sp>
   </dsp:spTree>
 </dsp:drawing>
 </file>
 
-<file path=ppt/diagrams/drawing5.xml><?xml version="1.0" encoding="utf-8"?>
-<dsp:drawing xmlns:dgm="http://schemas.openxmlformats.org/drawingml/2006/diagram" xmlns:a="http://schemas.openxmlformats.org/drawingml/2006/main" xmlns:dsp="http://schemas.microsoft.com/office/drawing/2008/diagram">
+<file path=ppt/diagrams/drawing6.xml><?xml version="1.0" encoding="utf-8"?>
+<dsp:drawing xmlns:dgm="http://schemas.openxmlformats.org/drawingml/2006/diagram" xmlns:dsp="http://schemas.microsoft.com/office/drawing/2008/diagram" xmlns:a="http://schemas.openxmlformats.org/drawingml/2006/main">
   <dsp:spTree>
     <dsp:nvGrpSpPr>
       <dsp:cNvPr id="0" name=""/>
@@ -11555,8 +13809,8 @@
         </a:p>
       </dsp:txBody>
       <dsp:txXfrm>
-        <a:off x="434340" y="0"/>
-        <a:ext cx="6080760" cy="590400"/>
+        <a:off x="463161" y="28821"/>
+        <a:ext cx="6023118" cy="532758"/>
       </dsp:txXfrm>
     </dsp:sp>
     <dsp:sp modelId="{122429B3-75B2-4400-B819-CC67C8478699}">
@@ -11716,8 +13970,8 @@
         </a:p>
       </dsp:txBody>
       <dsp:txXfrm>
-        <a:off x="434340" y="895849"/>
-        <a:ext cx="6080760" cy="590400"/>
+        <a:off x="463161" y="924670"/>
+        <a:ext cx="6023118" cy="532758"/>
       </dsp:txXfrm>
     </dsp:sp>
     <dsp:sp modelId="{06A3C85D-CDEB-4A13-9986-AD53F22D8EA9}">
@@ -11877,8 +14131,8 @@
         </a:p>
       </dsp:txBody>
       <dsp:txXfrm>
-        <a:off x="434340" y="1803049"/>
-        <a:ext cx="6080760" cy="590400"/>
+        <a:off x="463161" y="1831870"/>
+        <a:ext cx="6023118" cy="532758"/>
       </dsp:txXfrm>
     </dsp:sp>
     <dsp:sp modelId="{BC58E8B0-740A-43C6-B230-1401E78D7A5B}">
@@ -12038,8 +14292,8 @@
         </a:p>
       </dsp:txBody>
       <dsp:txXfrm>
-        <a:off x="434340" y="2754299"/>
-        <a:ext cx="6080760" cy="590400"/>
+        <a:off x="463161" y="2783120"/>
+        <a:ext cx="6023118" cy="532758"/>
       </dsp:txXfrm>
     </dsp:sp>
     <dsp:sp modelId="{7D8B9C6D-02C3-420B-906C-B43C36EE3306}">
@@ -12199,8 +14453,8 @@
         </a:p>
       </dsp:txBody>
       <dsp:txXfrm>
-        <a:off x="434340" y="3661499"/>
-        <a:ext cx="6080760" cy="590400"/>
+        <a:off x="463161" y="3690320"/>
+        <a:ext cx="6023118" cy="532758"/>
       </dsp:txXfrm>
     </dsp:sp>
     <dsp:sp modelId="{338DDB9A-A6BB-4D1C-8303-E07E7D076CB7}">
@@ -12360,8 +14614,8 @@
         </a:p>
       </dsp:txBody>
       <dsp:txXfrm>
-        <a:off x="434340" y="4568699"/>
-        <a:ext cx="6080760" cy="590400"/>
+        <a:off x="463161" y="4597520"/>
+        <a:ext cx="6023118" cy="532758"/>
       </dsp:txXfrm>
     </dsp:sp>
   </dsp:spTree>
@@ -12903,6 +15157,394 @@
 </file>
 
 <file path=ppt/diagrams/layout3.xml><?xml version="1.0" encoding="utf-8"?>
+<dgm:layoutDef xmlns:dgm="http://schemas.openxmlformats.org/drawingml/2006/diagram" xmlns:a="http://schemas.openxmlformats.org/drawingml/2006/main" uniqueId="urn:microsoft.com/office/officeart/2008/layout/SquareAccentList">
+  <dgm:title val=""/>
+  <dgm:desc val=""/>
+  <dgm:catLst>
+    <dgm:cat type="list" pri="5500"/>
+  </dgm:catLst>
+  <dgm:sampData>
+    <dgm:dataModel>
+      <dgm:ptLst>
+        <dgm:pt modelId="0" type="doc"/>
+        <dgm:pt modelId="10">
+          <dgm:prSet phldr="1"/>
+        </dgm:pt>
+        <dgm:pt modelId="11">
+          <dgm:prSet phldr="1"/>
+        </dgm:pt>
+        <dgm:pt modelId="12">
+          <dgm:prSet phldr="1"/>
+        </dgm:pt>
+        <dgm:pt modelId="13">
+          <dgm:prSet phldr="1"/>
+        </dgm:pt>
+        <dgm:pt modelId="20">
+          <dgm:prSet phldr="1"/>
+        </dgm:pt>
+        <dgm:pt modelId="21">
+          <dgm:prSet phldr="1"/>
+        </dgm:pt>
+        <dgm:pt modelId="22">
+          <dgm:prSet phldr="1"/>
+        </dgm:pt>
+        <dgm:pt modelId="23">
+          <dgm:prSet phldr="1"/>
+        </dgm:pt>
+      </dgm:ptLst>
+      <dgm:cxnLst>
+        <dgm:cxn modelId="1" srcId="0" destId="10" srcOrd="0" destOrd="0"/>
+        <dgm:cxn modelId="2" srcId="10" destId="11" srcOrd="0" destOrd="0"/>
+        <dgm:cxn modelId="3" srcId="10" destId="12" srcOrd="1" destOrd="0"/>
+        <dgm:cxn modelId="4" srcId="10" destId="13" srcOrd="2" destOrd="0"/>
+        <dgm:cxn modelId="5" srcId="0" destId="20" srcOrd="0" destOrd="0"/>
+        <dgm:cxn modelId="6" srcId="20" destId="21" srcOrd="0" destOrd="0"/>
+        <dgm:cxn modelId="7" srcId="20" destId="22" srcOrd="1" destOrd="0"/>
+        <dgm:cxn modelId="8" srcId="20" destId="23" srcOrd="2" destOrd="0"/>
+      </dgm:cxnLst>
+      <dgm:bg/>
+      <dgm:whole/>
+    </dgm:dataModel>
+  </dgm:sampData>
+  <dgm:styleData>
+    <dgm:dataModel>
+      <dgm:ptLst>
+        <dgm:pt modelId="0" type="doc"/>
+        <dgm:pt modelId="10">
+          <dgm:prSet phldr="1"/>
+        </dgm:pt>
+        <dgm:pt modelId="11">
+          <dgm:prSet phldr="1"/>
+        </dgm:pt>
+        <dgm:pt modelId="12">
+          <dgm:prSet phldr="1"/>
+        </dgm:pt>
+        <dgm:pt modelId="13">
+          <dgm:prSet phldr="1"/>
+        </dgm:pt>
+        <dgm:pt modelId="20">
+          <dgm:prSet phldr="1"/>
+        </dgm:pt>
+        <dgm:pt modelId="21">
+          <dgm:prSet phldr="1"/>
+        </dgm:pt>
+        <dgm:pt modelId="22">
+          <dgm:prSet phldr="1"/>
+        </dgm:pt>
+        <dgm:pt modelId="23">
+          <dgm:prSet phldr="1"/>
+        </dgm:pt>
+      </dgm:ptLst>
+      <dgm:cxnLst>
+        <dgm:cxn modelId="1" srcId="0" destId="10" srcOrd="0" destOrd="0"/>
+        <dgm:cxn modelId="2" srcId="10" destId="11" srcOrd="0" destOrd="0"/>
+        <dgm:cxn modelId="3" srcId="10" destId="12" srcOrd="1" destOrd="0"/>
+        <dgm:cxn modelId="4" srcId="10" destId="13" srcOrd="2" destOrd="0"/>
+        <dgm:cxn modelId="5" srcId="0" destId="20" srcOrd="0" destOrd="0"/>
+        <dgm:cxn modelId="6" srcId="20" destId="21" srcOrd="0" destOrd="0"/>
+        <dgm:cxn modelId="7" srcId="20" destId="22" srcOrd="1" destOrd="0"/>
+        <dgm:cxn modelId="8" srcId="20" destId="23" srcOrd="2" destOrd="0"/>
+      </dgm:cxnLst>
+      <dgm:bg/>
+      <dgm:whole/>
+    </dgm:dataModel>
+  </dgm:styleData>
+  <dgm:clrData>
+    <dgm:dataModel>
+      <dgm:ptLst>
+        <dgm:pt modelId="0" type="doc"/>
+        <dgm:pt modelId="10">
+          <dgm:prSet phldr="1"/>
+        </dgm:pt>
+        <dgm:pt modelId="11">
+          <dgm:prSet phldr="1"/>
+        </dgm:pt>
+        <dgm:pt modelId="12">
+          <dgm:prSet phldr="1"/>
+        </dgm:pt>
+        <dgm:pt modelId="13">
+          <dgm:prSet phldr="1"/>
+        </dgm:pt>
+        <dgm:pt modelId="20">
+          <dgm:prSet phldr="1"/>
+        </dgm:pt>
+        <dgm:pt modelId="21">
+          <dgm:prSet phldr="1"/>
+        </dgm:pt>
+        <dgm:pt modelId="22">
+          <dgm:prSet phldr="1"/>
+        </dgm:pt>
+        <dgm:pt modelId="23">
+          <dgm:prSet phldr="1"/>
+        </dgm:pt>
+      </dgm:ptLst>
+      <dgm:cxnLst>
+        <dgm:cxn modelId="1" srcId="0" destId="10" srcOrd="0" destOrd="0"/>
+        <dgm:cxn modelId="2" srcId="10" destId="11" srcOrd="0" destOrd="0"/>
+        <dgm:cxn modelId="3" srcId="10" destId="12" srcOrd="1" destOrd="0"/>
+        <dgm:cxn modelId="4" srcId="10" destId="13" srcOrd="2" destOrd="0"/>
+        <dgm:cxn modelId="5" srcId="0" destId="20" srcOrd="0" destOrd="0"/>
+        <dgm:cxn modelId="6" srcId="20" destId="21" srcOrd="0" destOrd="0"/>
+        <dgm:cxn modelId="7" srcId="20" destId="22" srcOrd="1" destOrd="0"/>
+        <dgm:cxn modelId="8" srcId="20" destId="23" srcOrd="2" destOrd="0"/>
+      </dgm:cxnLst>
+      <dgm:bg/>
+      <dgm:whole/>
+    </dgm:dataModel>
+  </dgm:clrData>
+  <dgm:layoutNode name="layout">
+    <dgm:varLst>
+      <dgm:chMax/>
+      <dgm:chPref/>
+      <dgm:dir/>
+      <dgm:resizeHandles/>
+    </dgm:varLst>
+    <dgm:choose name="Name0">
+      <dgm:if name="Name1" func="var" arg="dir" op="equ" val="norm">
+        <dgm:alg type="hierChild">
+          <dgm:param type="linDir" val="fromL"/>
+          <dgm:param type="vertAlign" val="t"/>
+          <dgm:param type="nodeVertAlign" val="t"/>
+          <dgm:param type="horzAlign" val="ctr"/>
+          <dgm:param type="fallback" val="1D"/>
+        </dgm:alg>
+      </dgm:if>
+      <dgm:else name="Name2">
+        <dgm:alg type="hierChild">
+          <dgm:param type="linDir" val="fromR"/>
+          <dgm:param type="vertAlign" val="t"/>
+          <dgm:param type="nodeVertAlign" val="t"/>
+          <dgm:param type="horzAlign" val="ctr"/>
+          <dgm:param type="fallback" val="1D"/>
+        </dgm:alg>
+      </dgm:else>
+    </dgm:choose>
+    <dgm:shape xmlns:r="http://schemas.openxmlformats.org/officeDocument/2006/relationships" r:blip="">
+      <dgm:adjLst/>
+    </dgm:shape>
+    <dgm:presOf/>
+    <dgm:constrLst>
+      <dgm:constr type="primFontSz" for="des" forName="Parent" op="equ" val="65"/>
+      <dgm:constr type="primFontSz" for="des" forName="Child" op="equ" val="65"/>
+      <dgm:constr type="primFontSz" for="des" forName="Child" refType="primFontSz" refFor="des" refForName="Parent" op="lte"/>
+      <dgm:constr type="w" for="des" forName="rootComposite" refType="h" refFor="des" refForName="rootComposite" fact="3.0396"/>
+      <dgm:constr type="h" for="des" forName="rootComposite" refType="h"/>
+      <dgm:constr type="w" for="des" forName="childComposite" refType="w" refFor="des" refForName="rootComposite"/>
+      <dgm:constr type="h" for="des" forName="childComposite" refType="h" refFor="des" refForName="rootComposite" fact="0.5205"/>
+      <dgm:constr type="sibSp" refType="w" refFor="des" refForName="rootComposite" fact="0.05"/>
+      <dgm:constr type="sp" for="des" forName="root" refType="h" refFor="des" refForName="childComposite" fact="0.2855"/>
+    </dgm:constrLst>
+    <dgm:ruleLst/>
+    <dgm:forEach name="Name3" axis="ch">
+      <dgm:forEach name="Name4" axis="self" ptType="node" cnt="1">
+        <dgm:layoutNode name="root">
+          <dgm:varLst>
+            <dgm:chMax/>
+            <dgm:chPref/>
+          </dgm:varLst>
+          <dgm:alg type="hierRoot">
+            <dgm:param type="hierAlign" val="tL"/>
+          </dgm:alg>
+          <dgm:shape xmlns:r="http://schemas.openxmlformats.org/officeDocument/2006/relationships" r:blip="">
+            <dgm:adjLst/>
+          </dgm:shape>
+          <dgm:presOf/>
+          <dgm:constrLst/>
+          <dgm:ruleLst/>
+          <dgm:layoutNode name="rootComposite">
+            <dgm:varLst/>
+            <dgm:alg type="composite"/>
+            <dgm:shape xmlns:r="http://schemas.openxmlformats.org/officeDocument/2006/relationships" r:blip="">
+              <dgm:adjLst/>
+            </dgm:shape>
+            <dgm:presOf axis="self" ptType="node" cnt="1"/>
+            <dgm:choose name="Name5">
+              <dgm:if name="Name6" func="var" arg="dir" op="equ" val="norm">
+                <dgm:constrLst>
+                  <dgm:constr type="l" for="ch" forName="Parent" refType="w" fact="0"/>
+                  <dgm:constr type="t" for="ch" forName="Parent" refType="h" fact="0"/>
+                  <dgm:constr type="w" for="ch" forName="Parent" refType="w"/>
+                  <dgm:constr type="h" for="ch" forName="Parent" refType="h" fact="0.6424"/>
+                  <dgm:constr type="l" for="ch" forName="ParentAccent" refType="w" fact="0"/>
+                  <dgm:constr type="b" for="ch" forName="ParentAccent" refType="h"/>
+                  <dgm:constr type="w" for="ch" forName="ParentAccent" refType="w"/>
+                  <dgm:constr type="h" for="ch" forName="ParentAccent" refType="h" fact="0.3576"/>
+                  <dgm:constr type="l" for="ch" forName="ParentSmallAccent" refType="w" fact="0"/>
+                  <dgm:constr type="b" for="ch" forName="ParentSmallAccent" refType="h"/>
+                  <dgm:constr type="w" for="ch" forName="ParentSmallAccent" refType="h" fact="0.2233"/>
+                  <dgm:constr type="h" for="ch" forName="ParentSmallAccent" refType="h" fact="0.2233"/>
+                </dgm:constrLst>
+              </dgm:if>
+              <dgm:else name="Name7">
+                <dgm:constrLst>
+                  <dgm:constr type="l" for="ch" forName="Parent" refType="w" fact="0"/>
+                  <dgm:constr type="t" for="ch" forName="Parent" refType="h" fact="0"/>
+                  <dgm:constr type="w" for="ch" forName="Parent" refType="w"/>
+                  <dgm:constr type="h" for="ch" forName="Parent" refType="h" fact="0.6424"/>
+                  <dgm:constr type="l" for="ch" forName="ParentAccent" refType="w" fact="0"/>
+                  <dgm:constr type="b" for="ch" forName="ParentAccent" refType="h"/>
+                  <dgm:constr type="w" for="ch" forName="ParentAccent" refType="w"/>
+                  <dgm:constr type="h" for="ch" forName="ParentAccent" refType="h" fact="0.3576"/>
+                  <dgm:constr type="r" for="ch" forName="ParentSmallAccent" refType="w"/>
+                  <dgm:constr type="b" for="ch" forName="ParentSmallAccent" refType="h"/>
+                  <dgm:constr type="w" for="ch" forName="ParentSmallAccent" refType="h" fact="0.2233"/>
+                  <dgm:constr type="h" for="ch" forName="ParentSmallAccent" refType="h" fact="0.2233"/>
+                </dgm:constrLst>
+              </dgm:else>
+            </dgm:choose>
+            <dgm:ruleLst/>
+            <dgm:layoutNode name="ParentAccent" styleLbl="alignNode1">
+              <dgm:alg type="sp"/>
+              <dgm:shape xmlns:r="http://schemas.openxmlformats.org/officeDocument/2006/relationships" type="rect" r:blip="">
+                <dgm:adjLst/>
+              </dgm:shape>
+              <dgm:presOf/>
+            </dgm:layoutNode>
+            <dgm:layoutNode name="ParentSmallAccent" styleLbl="fgAcc1">
+              <dgm:alg type="sp"/>
+              <dgm:shape xmlns:r="http://schemas.openxmlformats.org/officeDocument/2006/relationships" type="rect" r:blip="">
+                <dgm:adjLst/>
+              </dgm:shape>
+              <dgm:presOf/>
+            </dgm:layoutNode>
+            <dgm:layoutNode name="Parent" styleLbl="revTx">
+              <dgm:varLst>
+                <dgm:chMax/>
+                <dgm:chPref val="4"/>
+                <dgm:bulletEnabled val="1"/>
+              </dgm:varLst>
+              <dgm:choose name="Name8">
+                <dgm:if name="Name9" func="var" arg="dir" op="equ" val="norm">
+                  <dgm:alg type="tx">
+                    <dgm:param type="txAnchorVertCh" val="mid"/>
+                    <dgm:param type="parTxLTRAlign" val="l"/>
+                  </dgm:alg>
+                </dgm:if>
+                <dgm:else name="Name10">
+                  <dgm:alg type="tx">
+                    <dgm:param type="txAnchorVertCh" val="mid"/>
+                    <dgm:param type="parTxLTRAlign" val="r"/>
+                  </dgm:alg>
+                </dgm:else>
+              </dgm:choose>
+              <dgm:shape xmlns:r="http://schemas.openxmlformats.org/officeDocument/2006/relationships" type="rect" r:blip="">
+                <dgm:adjLst/>
+              </dgm:shape>
+              <dgm:presOf axis="self" ptType="node"/>
+              <dgm:constrLst>
+                <dgm:constr type="tMarg" refType="primFontSz" fact="0.1"/>
+                <dgm:constr type="bMarg" refType="primFontSz" fact="0.1"/>
+                <dgm:constr type="lMarg" refType="primFontSz" fact="0.15"/>
+                <dgm:constr type="rMarg" refType="primFontSz" fact="0.15"/>
+              </dgm:constrLst>
+              <dgm:ruleLst>
+                <dgm:rule type="primFontSz" val="5" fact="NaN" max="NaN"/>
+                <dgm:rule type="primFontSz" val="65" fact="NaN" max="NaN"/>
+              </dgm:ruleLst>
+            </dgm:layoutNode>
+          </dgm:layoutNode>
+          <dgm:layoutNode name="childShape">
+            <dgm:varLst>
+              <dgm:chMax val="0"/>
+              <dgm:chPref val="0"/>
+            </dgm:varLst>
+            <dgm:alg type="hierChild">
+              <dgm:param type="chAlign" val="r"/>
+              <dgm:param type="linDir" val="fromT"/>
+              <dgm:param type="fallback" val="2D"/>
+            </dgm:alg>
+            <dgm:shape xmlns:r="http://schemas.openxmlformats.org/officeDocument/2006/relationships" r:blip="">
+              <dgm:adjLst/>
+            </dgm:shape>
+            <dgm:presOf/>
+            <dgm:constrLst/>
+            <dgm:ruleLst/>
+            <dgm:forEach name="Name11" axis="ch">
+              <dgm:forEach name="Name12" axis="self" ptType="node">
+                <dgm:layoutNode name="childComposite">
+                  <dgm:varLst>
+                    <dgm:chMax val="0"/>
+                    <dgm:chPref val="0"/>
+                  </dgm:varLst>
+                  <dgm:alg type="composite"/>
+                  <dgm:shape xmlns:r="http://schemas.openxmlformats.org/officeDocument/2006/relationships" r:blip="">
+                    <dgm:adjLst/>
+                  </dgm:shape>
+                  <dgm:presOf/>
+                  <dgm:choose name="Name13">
+                    <dgm:if name="Name14" func="var" arg="dir" op="equ" val="norm">
+                      <dgm:constrLst>
+                        <dgm:constr type="w" for="ch" forName="ChildAccent" refType="h" fact="0.429"/>
+                        <dgm:constr type="h" for="ch" forName="ChildAccent" refType="h" fact="0.429"/>
+                        <dgm:constr type="l" for="ch" forName="ChildAccent" refType="w" fact="0"/>
+                        <dgm:constr type="t" for="ch" forName="ChildAccent" refType="h" fact="0.2855"/>
+                        <dgm:constr type="w" for="ch" forName="Child" refType="w" fact="0.93"/>
+                        <dgm:constr type="h" for="ch" forName="Child" refType="h"/>
+                        <dgm:constr type="l" for="ch" forName="Child" refType="w" fact="0.07"/>
+                        <dgm:constr type="t" for="ch" forName="Child" refType="h" fact="0"/>
+                      </dgm:constrLst>
+                    </dgm:if>
+                    <dgm:else name="Name15">
+                      <dgm:constrLst>
+                        <dgm:constr type="w" for="ch" forName="ChildAccent" refType="h" fact="0.429"/>
+                        <dgm:constr type="h" for="ch" forName="ChildAccent" refType="h" fact="0.429"/>
+                        <dgm:constr type="r" for="ch" forName="ChildAccent" refType="w"/>
+                        <dgm:constr type="t" for="ch" forName="ChildAccent" refType="h" fact="0.2855"/>
+                        <dgm:constr type="w" for="ch" forName="Child" refType="w" fact="0.93"/>
+                        <dgm:constr type="h" for="ch" forName="Child" refType="h"/>
+                        <dgm:constr type="r" for="ch" forName="Child" refType="w" fact="0.93"/>
+                        <dgm:constr type="t" for="ch" forName="Child" refType="h" fact="0"/>
+                      </dgm:constrLst>
+                    </dgm:else>
+                  </dgm:choose>
+                  <dgm:ruleLst/>
+                  <dgm:layoutNode name="ChildAccent" styleLbl="solidFgAcc1">
+                    <dgm:alg type="sp"/>
+                    <dgm:shape xmlns:r="http://schemas.openxmlformats.org/officeDocument/2006/relationships" type="rect" r:blip="">
+                      <dgm:adjLst/>
+                    </dgm:shape>
+                    <dgm:presOf/>
+                  </dgm:layoutNode>
+                  <dgm:layoutNode name="Child" styleLbl="revTx">
+                    <dgm:varLst>
+                      <dgm:chMax val="0"/>
+                      <dgm:chPref val="0"/>
+                      <dgm:bulletEnabled val="1"/>
+                    </dgm:varLst>
+                    <dgm:choose name="Name16">
+                      <dgm:if name="Name17" func="var" arg="dir" op="equ" val="norm">
+                        <dgm:alg type="tx">
+                          <dgm:param type="txAnchorVertCh" val="mid"/>
+                          <dgm:param type="parTxLTRAlign" val="l"/>
+                        </dgm:alg>
+                      </dgm:if>
+                      <dgm:else name="Name18">
+                        <dgm:alg type="tx">
+                          <dgm:param type="txAnchorVertCh" val="mid"/>
+                          <dgm:param type="parTxLTRAlign" val="r"/>
+                        </dgm:alg>
+                      </dgm:else>
+                    </dgm:choose>
+                    <dgm:shape xmlns:r="http://schemas.openxmlformats.org/officeDocument/2006/relationships" type="rect" r:blip="">
+                      <dgm:adjLst/>
+                    </dgm:shape>
+                    <dgm:presOf axis="desOrSelf" ptType="node node"/>
+                    <dgm:ruleLst>
+                      <dgm:rule type="primFontSz" val="5" fact="NaN" max="NaN"/>
+                    </dgm:ruleLst>
+                  </dgm:layoutNode>
+                </dgm:layoutNode>
+              </dgm:forEach>
+            </dgm:forEach>
+          </dgm:layoutNode>
+        </dgm:layoutNode>
+      </dgm:forEach>
+    </dgm:forEach>
+  </dgm:layoutNode>
+</dgm:layoutDef>
+</file>
+
+<file path=ppt/diagrams/layout4.xml><?xml version="1.0" encoding="utf-8"?>
 <dgm:layoutDef xmlns:dgm="http://schemas.openxmlformats.org/drawingml/2006/diagram" xmlns:a="http://schemas.openxmlformats.org/drawingml/2006/main" uniqueId="urn:microsoft.com/office/officeart/2005/8/layout/hProcess4">
   <dgm:title val=""/>
   <dgm:desc val=""/>
@@ -13446,7 +16088,7 @@
 </dgm:layoutDef>
 </file>
 
-<file path=ppt/diagrams/layout4.xml><?xml version="1.0" encoding="utf-8"?>
+<file path=ppt/diagrams/layout5.xml><?xml version="1.0" encoding="utf-8"?>
 <dgm:layoutDef xmlns:dgm="http://schemas.openxmlformats.org/drawingml/2006/diagram" xmlns:a="http://schemas.openxmlformats.org/drawingml/2006/main" uniqueId="urn:microsoft.com/office/officeart/2005/8/layout/radial5">
   <dgm:title val=""/>
   <dgm:desc val=""/>
@@ -13685,7 +16327,7 @@
 </dgm:layoutDef>
 </file>
 
-<file path=ppt/diagrams/layout5.xml><?xml version="1.0" encoding="utf-8"?>
+<file path=ppt/diagrams/layout6.xml><?xml version="1.0" encoding="utf-8"?>
 <dgm:layoutDef xmlns:dgm="http://schemas.openxmlformats.org/drawingml/2006/diagram" xmlns:a="http://schemas.openxmlformats.org/drawingml/2006/main" uniqueId="urn:microsoft.com/office/officeart/2005/8/layout/list1">
   <dgm:title val=""/>
   <dgm:desc val=""/>
@@ -16062,6 +18704,1040 @@
 </file>
 
 <file path=ppt/diagrams/quickStyle3.xml><?xml version="1.0" encoding="utf-8"?>
+<dgm:styleDef xmlns:dgm="http://schemas.openxmlformats.org/drawingml/2006/diagram" xmlns:a="http://schemas.openxmlformats.org/drawingml/2006/main" uniqueId="urn:microsoft.com/office/officeart/2005/8/quickstyle/simple1">
+  <dgm:title val=""/>
+  <dgm:desc val=""/>
+  <dgm:catLst>
+    <dgm:cat type="simple" pri="10100"/>
+  </dgm:catLst>
+  <dgm:scene3d>
+    <a:camera prst="orthographicFront"/>
+    <a:lightRig rig="threePt" dir="t"/>
+  </dgm:scene3d>
+  <dgm:styleLbl name="node0">
+    <dgm:scene3d>
+      <a:camera prst="orthographicFront"/>
+      <a:lightRig rig="threePt" dir="t"/>
+    </dgm:scene3d>
+    <dgm:sp3d/>
+    <dgm:txPr/>
+    <dgm:style>
+      <a:lnRef idx="2">
+        <a:scrgbClr r="0" g="0" b="0"/>
+      </a:lnRef>
+      <a:fillRef idx="1">
+        <a:scrgbClr r="0" g="0" b="0"/>
+      </a:fillRef>
+      <a:effectRef idx="0">
+        <a:scrgbClr r="0" g="0" b="0"/>
+      </a:effectRef>
+      <a:fontRef idx="minor">
+        <a:schemeClr val="lt1"/>
+      </a:fontRef>
+    </dgm:style>
+  </dgm:styleLbl>
+  <dgm:styleLbl name="lnNode1">
+    <dgm:scene3d>
+      <a:camera prst="orthographicFront"/>
+      <a:lightRig rig="threePt" dir="t"/>
+    </dgm:scene3d>
+    <dgm:sp3d/>
+    <dgm:txPr/>
+    <dgm:style>
+      <a:lnRef idx="2">
+        <a:scrgbClr r="0" g="0" b="0"/>
+      </a:lnRef>
+      <a:fillRef idx="1">
+        <a:scrgbClr r="0" g="0" b="0"/>
+      </a:fillRef>
+      <a:effectRef idx="0">
+        <a:scrgbClr r="0" g="0" b="0"/>
+      </a:effectRef>
+      <a:fontRef idx="minor">
+        <a:schemeClr val="lt1"/>
+      </a:fontRef>
+    </dgm:style>
+  </dgm:styleLbl>
+  <dgm:styleLbl name="vennNode1">
+    <dgm:scene3d>
+      <a:camera prst="orthographicFront"/>
+      <a:lightRig rig="threePt" dir="t"/>
+    </dgm:scene3d>
+    <dgm:sp3d/>
+    <dgm:txPr/>
+    <dgm:style>
+      <a:lnRef idx="2">
+        <a:scrgbClr r="0" g="0" b="0"/>
+      </a:lnRef>
+      <a:fillRef idx="1">
+        <a:scrgbClr r="0" g="0" b="0"/>
+      </a:fillRef>
+      <a:effectRef idx="0">
+        <a:scrgbClr r="0" g="0" b="0"/>
+      </a:effectRef>
+      <a:fontRef idx="minor">
+        <a:schemeClr val="tx1"/>
+      </a:fontRef>
+    </dgm:style>
+  </dgm:styleLbl>
+  <dgm:styleLbl name="alignNode1">
+    <dgm:scene3d>
+      <a:camera prst="orthographicFront"/>
+      <a:lightRig rig="threePt" dir="t"/>
+    </dgm:scene3d>
+    <dgm:sp3d/>
+    <dgm:txPr/>
+    <dgm:style>
+      <a:lnRef idx="2">
+        <a:scrgbClr r="0" g="0" b="0"/>
+      </a:lnRef>
+      <a:fillRef idx="1">
+        <a:scrgbClr r="0" g="0" b="0"/>
+      </a:fillRef>
+      <a:effectRef idx="0">
+        <a:scrgbClr r="0" g="0" b="0"/>
+      </a:effectRef>
+      <a:fontRef idx="minor">
+        <a:schemeClr val="lt1"/>
+      </a:fontRef>
+    </dgm:style>
+  </dgm:styleLbl>
+  <dgm:styleLbl name="node1">
+    <dgm:scene3d>
+      <a:camera prst="orthographicFront"/>
+      <a:lightRig rig="threePt" dir="t"/>
+    </dgm:scene3d>
+    <dgm:sp3d/>
+    <dgm:txPr/>
+    <dgm:style>
+      <a:lnRef idx="2">
+        <a:scrgbClr r="0" g="0" b="0"/>
+      </a:lnRef>
+      <a:fillRef idx="1">
+        <a:scrgbClr r="0" g="0" b="0"/>
+      </a:fillRef>
+      <a:effectRef idx="0">
+        <a:scrgbClr r="0" g="0" b="0"/>
+      </a:effectRef>
+      <a:fontRef idx="minor">
+        <a:schemeClr val="lt1"/>
+      </a:fontRef>
+    </dgm:style>
+  </dgm:styleLbl>
+  <dgm:styleLbl name="node2">
+    <dgm:scene3d>
+      <a:camera prst="orthographicFront"/>
+      <a:lightRig rig="threePt" dir="t"/>
+    </dgm:scene3d>
+    <dgm:sp3d/>
+    <dgm:txPr/>
+    <dgm:style>
+      <a:lnRef idx="2">
+        <a:scrgbClr r="0" g="0" b="0"/>
+      </a:lnRef>
+      <a:fillRef idx="1">
+        <a:scrgbClr r="0" g="0" b="0"/>
+      </a:fillRef>
+      <a:effectRef idx="0">
+        <a:scrgbClr r="0" g="0" b="0"/>
+      </a:effectRef>
+      <a:fontRef idx="minor">
+        <a:schemeClr val="lt1"/>
+      </a:fontRef>
+    </dgm:style>
+  </dgm:styleLbl>
+  <dgm:styleLbl name="node3">
+    <dgm:scene3d>
+      <a:camera prst="orthographicFront"/>
+      <a:lightRig rig="threePt" dir="t"/>
+    </dgm:scene3d>
+    <dgm:sp3d/>
+    <dgm:txPr/>
+    <dgm:style>
+      <a:lnRef idx="2">
+        <a:scrgbClr r="0" g="0" b="0"/>
+      </a:lnRef>
+      <a:fillRef idx="1">
+        <a:scrgbClr r="0" g="0" b="0"/>
+      </a:fillRef>
+      <a:effectRef idx="0">
+        <a:scrgbClr r="0" g="0" b="0"/>
+      </a:effectRef>
+      <a:fontRef idx="minor">
+        <a:schemeClr val="lt1"/>
+      </a:fontRef>
+    </dgm:style>
+  </dgm:styleLbl>
+  <dgm:styleLbl name="node4">
+    <dgm:scene3d>
+      <a:camera prst="orthographicFront"/>
+      <a:lightRig rig="threePt" dir="t"/>
+    </dgm:scene3d>
+    <dgm:sp3d/>
+    <dgm:txPr/>
+    <dgm:style>
+      <a:lnRef idx="2">
+        <a:scrgbClr r="0" g="0" b="0"/>
+      </a:lnRef>
+      <a:fillRef idx="1">
+        <a:scrgbClr r="0" g="0" b="0"/>
+      </a:fillRef>
+      <a:effectRef idx="0">
+        <a:scrgbClr r="0" g="0" b="0"/>
+      </a:effectRef>
+      <a:fontRef idx="minor">
+        <a:schemeClr val="lt1"/>
+      </a:fontRef>
+    </dgm:style>
+  </dgm:styleLbl>
+  <dgm:styleLbl name="fgImgPlace1">
+    <dgm:scene3d>
+      <a:camera prst="orthographicFront"/>
+      <a:lightRig rig="threePt" dir="t"/>
+    </dgm:scene3d>
+    <dgm:sp3d/>
+    <dgm:txPr/>
+    <dgm:style>
+      <a:lnRef idx="2">
+        <a:scrgbClr r="0" g="0" b="0"/>
+      </a:lnRef>
+      <a:fillRef idx="1">
+        <a:scrgbClr r="0" g="0" b="0"/>
+      </a:fillRef>
+      <a:effectRef idx="0">
+        <a:scrgbClr r="0" g="0" b="0"/>
+      </a:effectRef>
+      <a:fontRef idx="minor"/>
+    </dgm:style>
+  </dgm:styleLbl>
+  <dgm:styleLbl name="alignImgPlace1">
+    <dgm:scene3d>
+      <a:camera prst="orthographicFront"/>
+      <a:lightRig rig="threePt" dir="t"/>
+    </dgm:scene3d>
+    <dgm:sp3d/>
+    <dgm:txPr/>
+    <dgm:style>
+      <a:lnRef idx="2">
+        <a:scrgbClr r="0" g="0" b="0"/>
+      </a:lnRef>
+      <a:fillRef idx="1">
+        <a:scrgbClr r="0" g="0" b="0"/>
+      </a:fillRef>
+      <a:effectRef idx="0">
+        <a:scrgbClr r="0" g="0" b="0"/>
+      </a:effectRef>
+      <a:fontRef idx="minor"/>
+    </dgm:style>
+  </dgm:styleLbl>
+  <dgm:styleLbl name="bgImgPlace1">
+    <dgm:scene3d>
+      <a:camera prst="orthographicFront"/>
+      <a:lightRig rig="threePt" dir="t"/>
+    </dgm:scene3d>
+    <dgm:sp3d/>
+    <dgm:txPr/>
+    <dgm:style>
+      <a:lnRef idx="2">
+        <a:scrgbClr r="0" g="0" b="0"/>
+      </a:lnRef>
+      <a:fillRef idx="1">
+        <a:scrgbClr r="0" g="0" b="0"/>
+      </a:fillRef>
+      <a:effectRef idx="0">
+        <a:scrgbClr r="0" g="0" b="0"/>
+      </a:effectRef>
+      <a:fontRef idx="minor"/>
+    </dgm:style>
+  </dgm:styleLbl>
+  <dgm:styleLbl name="sibTrans2D1">
+    <dgm:scene3d>
+      <a:camera prst="orthographicFront"/>
+      <a:lightRig rig="threePt" dir="t"/>
+    </dgm:scene3d>
+    <dgm:sp3d/>
+    <dgm:txPr/>
+    <dgm:style>
+      <a:lnRef idx="0">
+        <a:scrgbClr r="0" g="0" b="0"/>
+      </a:lnRef>
+      <a:fillRef idx="1">
+        <a:scrgbClr r="0" g="0" b="0"/>
+      </a:fillRef>
+      <a:effectRef idx="0">
+        <a:scrgbClr r="0" g="0" b="0"/>
+      </a:effectRef>
+      <a:fontRef idx="minor">
+        <a:schemeClr val="lt1"/>
+      </a:fontRef>
+    </dgm:style>
+  </dgm:styleLbl>
+  <dgm:styleLbl name="fgSibTrans2D1">
+    <dgm:scene3d>
+      <a:camera prst="orthographicFront"/>
+      <a:lightRig rig="threePt" dir="t"/>
+    </dgm:scene3d>
+    <dgm:sp3d/>
+    <dgm:txPr/>
+    <dgm:style>
+      <a:lnRef idx="0">
+        <a:scrgbClr r="0" g="0" b="0"/>
+      </a:lnRef>
+      <a:fillRef idx="1">
+        <a:scrgbClr r="0" g="0" b="0"/>
+      </a:fillRef>
+      <a:effectRef idx="0">
+        <a:scrgbClr r="0" g="0" b="0"/>
+      </a:effectRef>
+      <a:fontRef idx="minor">
+        <a:schemeClr val="lt1"/>
+      </a:fontRef>
+    </dgm:style>
+  </dgm:styleLbl>
+  <dgm:styleLbl name="bgSibTrans2D1">
+    <dgm:scene3d>
+      <a:camera prst="orthographicFront"/>
+      <a:lightRig rig="threePt" dir="t"/>
+    </dgm:scene3d>
+    <dgm:sp3d/>
+    <dgm:txPr/>
+    <dgm:style>
+      <a:lnRef idx="0">
+        <a:scrgbClr r="0" g="0" b="0"/>
+      </a:lnRef>
+      <a:fillRef idx="1">
+        <a:scrgbClr r="0" g="0" b="0"/>
+      </a:fillRef>
+      <a:effectRef idx="0">
+        <a:scrgbClr r="0" g="0" b="0"/>
+      </a:effectRef>
+      <a:fontRef idx="minor">
+        <a:schemeClr val="lt1"/>
+      </a:fontRef>
+    </dgm:style>
+  </dgm:styleLbl>
+  <dgm:styleLbl name="sibTrans1D1">
+    <dgm:scene3d>
+      <a:camera prst="orthographicFront"/>
+      <a:lightRig rig="threePt" dir="t"/>
+    </dgm:scene3d>
+    <dgm:sp3d/>
+    <dgm:txPr/>
+    <dgm:style>
+      <a:lnRef idx="1">
+        <a:scrgbClr r="0" g="0" b="0"/>
+      </a:lnRef>
+      <a:fillRef idx="0">
+        <a:scrgbClr r="0" g="0" b="0"/>
+      </a:fillRef>
+      <a:effectRef idx="0">
+        <a:scrgbClr r="0" g="0" b="0"/>
+      </a:effectRef>
+      <a:fontRef idx="minor"/>
+    </dgm:style>
+  </dgm:styleLbl>
+  <dgm:styleLbl name="callout">
+    <dgm:scene3d>
+      <a:camera prst="orthographicFront"/>
+      <a:lightRig rig="threePt" dir="t"/>
+    </dgm:scene3d>
+    <dgm:sp3d/>
+    <dgm:txPr/>
+    <dgm:style>
+      <a:lnRef idx="2">
+        <a:scrgbClr r="0" g="0" b="0"/>
+      </a:lnRef>
+      <a:fillRef idx="1">
+        <a:scrgbClr r="0" g="0" b="0"/>
+      </a:fillRef>
+      <a:effectRef idx="0">
+        <a:scrgbClr r="0" g="0" b="0"/>
+      </a:effectRef>
+      <a:fontRef idx="minor"/>
+    </dgm:style>
+  </dgm:styleLbl>
+  <dgm:styleLbl name="asst0">
+    <dgm:scene3d>
+      <a:camera prst="orthographicFront"/>
+      <a:lightRig rig="threePt" dir="t"/>
+    </dgm:scene3d>
+    <dgm:sp3d/>
+    <dgm:txPr/>
+    <dgm:style>
+      <a:lnRef idx="2">
+        <a:scrgbClr r="0" g="0" b="0"/>
+      </a:lnRef>
+      <a:fillRef idx="1">
+        <a:scrgbClr r="0" g="0" b="0"/>
+      </a:fillRef>
+      <a:effectRef idx="0">
+        <a:scrgbClr r="0" g="0" b="0"/>
+      </a:effectRef>
+      <a:fontRef idx="minor">
+        <a:schemeClr val="lt1"/>
+      </a:fontRef>
+    </dgm:style>
+  </dgm:styleLbl>
+  <dgm:styleLbl name="asst1">
+    <dgm:scene3d>
+      <a:camera prst="orthographicFront"/>
+      <a:lightRig rig="threePt" dir="t"/>
+    </dgm:scene3d>
+    <dgm:sp3d/>
+    <dgm:txPr/>
+    <dgm:style>
+      <a:lnRef idx="2">
+        <a:scrgbClr r="0" g="0" b="0"/>
+      </a:lnRef>
+      <a:fillRef idx="1">
+        <a:scrgbClr r="0" g="0" b="0"/>
+      </a:fillRef>
+      <a:effectRef idx="0">
+        <a:scrgbClr r="0" g="0" b="0"/>
+      </a:effectRef>
+      <a:fontRef idx="minor">
+        <a:schemeClr val="lt1"/>
+      </a:fontRef>
+    </dgm:style>
+  </dgm:styleLbl>
+  <dgm:styleLbl name="asst2">
+    <dgm:scene3d>
+      <a:camera prst="orthographicFront"/>
+      <a:lightRig rig="threePt" dir="t"/>
+    </dgm:scene3d>
+    <dgm:sp3d/>
+    <dgm:txPr/>
+    <dgm:style>
+      <a:lnRef idx="2">
+        <a:scrgbClr r="0" g="0" b="0"/>
+      </a:lnRef>
+      <a:fillRef idx="1">
+        <a:scrgbClr r="0" g="0" b="0"/>
+      </a:fillRef>
+      <a:effectRef idx="0">
+        <a:scrgbClr r="0" g="0" b="0"/>
+      </a:effectRef>
+      <a:fontRef idx="minor">
+        <a:schemeClr val="lt1"/>
+      </a:fontRef>
+    </dgm:style>
+  </dgm:styleLbl>
+  <dgm:styleLbl name="asst3">
+    <dgm:scene3d>
+      <a:camera prst="orthographicFront"/>
+      <a:lightRig rig="threePt" dir="t"/>
+    </dgm:scene3d>
+    <dgm:sp3d/>
+    <dgm:txPr/>
+    <dgm:style>
+      <a:lnRef idx="2">
+        <a:scrgbClr r="0" g="0" b="0"/>
+      </a:lnRef>
+      <a:fillRef idx="1">
+        <a:scrgbClr r="0" g="0" b="0"/>
+      </a:fillRef>
+      <a:effectRef idx="0">
+        <a:scrgbClr r="0" g="0" b="0"/>
+      </a:effectRef>
+      <a:fontRef idx="minor">
+        <a:schemeClr val="lt1"/>
+      </a:fontRef>
+    </dgm:style>
+  </dgm:styleLbl>
+  <dgm:styleLbl name="asst4">
+    <dgm:scene3d>
+      <a:camera prst="orthographicFront"/>
+      <a:lightRig rig="threePt" dir="t"/>
+    </dgm:scene3d>
+    <dgm:sp3d/>
+    <dgm:txPr/>
+    <dgm:style>
+      <a:lnRef idx="2">
+        <a:scrgbClr r="0" g="0" b="0"/>
+      </a:lnRef>
+      <a:fillRef idx="1">
+        <a:scrgbClr r="0" g="0" b="0"/>
+      </a:fillRef>
+      <a:effectRef idx="0">
+        <a:scrgbClr r="0" g="0" b="0"/>
+      </a:effectRef>
+      <a:fontRef idx="minor">
+        <a:schemeClr val="lt1"/>
+      </a:fontRef>
+    </dgm:style>
+  </dgm:styleLbl>
+  <dgm:styleLbl name="parChTrans2D1">
+    <dgm:scene3d>
+      <a:camera prst="orthographicFront"/>
+      <a:lightRig rig="threePt" dir="t"/>
+    </dgm:scene3d>
+    <dgm:sp3d/>
+    <dgm:txPr/>
+    <dgm:style>
+      <a:lnRef idx="2">
+        <a:scrgbClr r="0" g="0" b="0"/>
+      </a:lnRef>
+      <a:fillRef idx="1">
+        <a:scrgbClr r="0" g="0" b="0"/>
+      </a:fillRef>
+      <a:effectRef idx="0">
+        <a:scrgbClr r="0" g="0" b="0"/>
+      </a:effectRef>
+      <a:fontRef idx="minor">
+        <a:schemeClr val="lt1"/>
+      </a:fontRef>
+    </dgm:style>
+  </dgm:styleLbl>
+  <dgm:styleLbl name="parChTrans2D2">
+    <dgm:scene3d>
+      <a:camera prst="orthographicFront"/>
+      <a:lightRig rig="threePt" dir="t"/>
+    </dgm:scene3d>
+    <dgm:sp3d/>
+    <dgm:txPr/>
+    <dgm:style>
+      <a:lnRef idx="2">
+        <a:scrgbClr r="0" g="0" b="0"/>
+      </a:lnRef>
+      <a:fillRef idx="1">
+        <a:scrgbClr r="0" g="0" b="0"/>
+      </a:fillRef>
+      <a:effectRef idx="0">
+        <a:scrgbClr r="0" g="0" b="0"/>
+      </a:effectRef>
+      <a:fontRef idx="minor">
+        <a:schemeClr val="lt1"/>
+      </a:fontRef>
+    </dgm:style>
+  </dgm:styleLbl>
+  <dgm:styleLbl name="parChTrans2D3">
+    <dgm:scene3d>
+      <a:camera prst="orthographicFront"/>
+      <a:lightRig rig="threePt" dir="t"/>
+    </dgm:scene3d>
+    <dgm:sp3d/>
+    <dgm:txPr/>
+    <dgm:style>
+      <a:lnRef idx="2">
+        <a:scrgbClr r="0" g="0" b="0"/>
+      </a:lnRef>
+      <a:fillRef idx="1">
+        <a:scrgbClr r="0" g="0" b="0"/>
+      </a:fillRef>
+      <a:effectRef idx="0">
+        <a:scrgbClr r="0" g="0" b="0"/>
+      </a:effectRef>
+      <a:fontRef idx="minor">
+        <a:schemeClr val="lt1"/>
+      </a:fontRef>
+    </dgm:style>
+  </dgm:styleLbl>
+  <dgm:styleLbl name="parChTrans2D4">
+    <dgm:scene3d>
+      <a:camera prst="orthographicFront"/>
+      <a:lightRig rig="threePt" dir="t"/>
+    </dgm:scene3d>
+    <dgm:sp3d/>
+    <dgm:txPr/>
+    <dgm:style>
+      <a:lnRef idx="2">
+        <a:scrgbClr r="0" g="0" b="0"/>
+      </a:lnRef>
+      <a:fillRef idx="1">
+        <a:scrgbClr r="0" g="0" b="0"/>
+      </a:fillRef>
+      <a:effectRef idx="0">
+        <a:scrgbClr r="0" g="0" b="0"/>
+      </a:effectRef>
+      <a:fontRef idx="minor">
+        <a:schemeClr val="lt1"/>
+      </a:fontRef>
+    </dgm:style>
+  </dgm:styleLbl>
+  <dgm:styleLbl name="parChTrans1D1">
+    <dgm:scene3d>
+      <a:camera prst="orthographicFront"/>
+      <a:lightRig rig="threePt" dir="t"/>
+    </dgm:scene3d>
+    <dgm:sp3d/>
+    <dgm:txPr/>
+    <dgm:style>
+      <a:lnRef idx="2">
+        <a:scrgbClr r="0" g="0" b="0"/>
+      </a:lnRef>
+      <a:fillRef idx="0">
+        <a:scrgbClr r="0" g="0" b="0"/>
+      </a:fillRef>
+      <a:effectRef idx="0">
+        <a:scrgbClr r="0" g="0" b="0"/>
+      </a:effectRef>
+      <a:fontRef idx="minor"/>
+    </dgm:style>
+  </dgm:styleLbl>
+  <dgm:styleLbl name="parChTrans1D2">
+    <dgm:scene3d>
+      <a:camera prst="orthographicFront"/>
+      <a:lightRig rig="threePt" dir="t"/>
+    </dgm:scene3d>
+    <dgm:sp3d/>
+    <dgm:txPr/>
+    <dgm:style>
+      <a:lnRef idx="2">
+        <a:scrgbClr r="0" g="0" b="0"/>
+      </a:lnRef>
+      <a:fillRef idx="0">
+        <a:scrgbClr r="0" g="0" b="0"/>
+      </a:fillRef>
+      <a:effectRef idx="0">
+        <a:scrgbClr r="0" g="0" b="0"/>
+      </a:effectRef>
+      <a:fontRef idx="minor"/>
+    </dgm:style>
+  </dgm:styleLbl>
+  <dgm:styleLbl name="parChTrans1D3">
+    <dgm:scene3d>
+      <a:camera prst="orthographicFront"/>
+      <a:lightRig rig="threePt" dir="t"/>
+    </dgm:scene3d>
+    <dgm:sp3d/>
+    <dgm:txPr/>
+    <dgm:style>
+      <a:lnRef idx="2">
+        <a:scrgbClr r="0" g="0" b="0"/>
+      </a:lnRef>
+      <a:fillRef idx="0">
+        <a:scrgbClr r="0" g="0" b="0"/>
+      </a:fillRef>
+      <a:effectRef idx="0">
+        <a:scrgbClr r="0" g="0" b="0"/>
+      </a:effectRef>
+      <a:fontRef idx="minor"/>
+    </dgm:style>
+  </dgm:styleLbl>
+  <dgm:styleLbl name="parChTrans1D4">
+    <dgm:scene3d>
+      <a:camera prst="orthographicFront"/>
+      <a:lightRig rig="threePt" dir="t"/>
+    </dgm:scene3d>
+    <dgm:sp3d/>
+    <dgm:txPr/>
+    <dgm:style>
+      <a:lnRef idx="2">
+        <a:scrgbClr r="0" g="0" b="0"/>
+      </a:lnRef>
+      <a:fillRef idx="0">
+        <a:scrgbClr r="0" g="0" b="0"/>
+      </a:fillRef>
+      <a:effectRef idx="0">
+        <a:scrgbClr r="0" g="0" b="0"/>
+      </a:effectRef>
+      <a:fontRef idx="minor"/>
+    </dgm:style>
+  </dgm:styleLbl>
+  <dgm:styleLbl name="fgAcc1">
+    <dgm:scene3d>
+      <a:camera prst="orthographicFront"/>
+      <a:lightRig rig="threePt" dir="t"/>
+    </dgm:scene3d>
+    <dgm:sp3d/>
+    <dgm:txPr/>
+    <dgm:style>
+      <a:lnRef idx="2">
+        <a:scrgbClr r="0" g="0" b="0"/>
+      </a:lnRef>
+      <a:fillRef idx="1">
+        <a:scrgbClr r="0" g="0" b="0"/>
+      </a:fillRef>
+      <a:effectRef idx="0">
+        <a:scrgbClr r="0" g="0" b="0"/>
+      </a:effectRef>
+      <a:fontRef idx="minor"/>
+    </dgm:style>
+  </dgm:styleLbl>
+  <dgm:styleLbl name="conFgAcc1">
+    <dgm:scene3d>
+      <a:camera prst="orthographicFront"/>
+      <a:lightRig rig="threePt" dir="t"/>
+    </dgm:scene3d>
+    <dgm:sp3d/>
+    <dgm:txPr/>
+    <dgm:style>
+      <a:lnRef idx="2">
+        <a:scrgbClr r="0" g="0" b="0"/>
+      </a:lnRef>
+      <a:fillRef idx="1">
+        <a:scrgbClr r="0" g="0" b="0"/>
+      </a:fillRef>
+      <a:effectRef idx="0">
+        <a:scrgbClr r="0" g="0" b="0"/>
+      </a:effectRef>
+      <a:fontRef idx="minor"/>
+    </dgm:style>
+  </dgm:styleLbl>
+  <dgm:styleLbl name="alignAcc1">
+    <dgm:scene3d>
+      <a:camera prst="orthographicFront"/>
+      <a:lightRig rig="threePt" dir="t"/>
+    </dgm:scene3d>
+    <dgm:sp3d/>
+    <dgm:txPr/>
+    <dgm:style>
+      <a:lnRef idx="2">
+        <a:scrgbClr r="0" g="0" b="0"/>
+      </a:lnRef>
+      <a:fillRef idx="1">
+        <a:scrgbClr r="0" g="0" b="0"/>
+      </a:fillRef>
+      <a:effectRef idx="0">
+        <a:scrgbClr r="0" g="0" b="0"/>
+      </a:effectRef>
+      <a:fontRef idx="minor"/>
+    </dgm:style>
+  </dgm:styleLbl>
+  <dgm:styleLbl name="trAlignAcc1">
+    <dgm:scene3d>
+      <a:camera prst="orthographicFront"/>
+      <a:lightRig rig="threePt" dir="t"/>
+    </dgm:scene3d>
+    <dgm:sp3d/>
+    <dgm:txPr/>
+    <dgm:style>
+      <a:lnRef idx="1">
+        <a:scrgbClr r="0" g="0" b="0"/>
+      </a:lnRef>
+      <a:fillRef idx="1">
+        <a:scrgbClr r="0" g="0" b="0"/>
+      </a:fillRef>
+      <a:effectRef idx="0">
+        <a:scrgbClr r="0" g="0" b="0"/>
+      </a:effectRef>
+      <a:fontRef idx="minor"/>
+    </dgm:style>
+  </dgm:styleLbl>
+  <dgm:styleLbl name="bgAcc1">
+    <dgm:scene3d>
+      <a:camera prst="orthographicFront"/>
+      <a:lightRig rig="threePt" dir="t"/>
+    </dgm:scene3d>
+    <dgm:sp3d/>
+    <dgm:txPr/>
+    <dgm:style>
+      <a:lnRef idx="2">
+        <a:scrgbClr r="0" g="0" b="0"/>
+      </a:lnRef>
+      <a:fillRef idx="1">
+        <a:scrgbClr r="0" g="0" b="0"/>
+      </a:fillRef>
+      <a:effectRef idx="0">
+        <a:scrgbClr r="0" g="0" b="0"/>
+      </a:effectRef>
+      <a:fontRef idx="minor"/>
+    </dgm:style>
+  </dgm:styleLbl>
+  <dgm:styleLbl name="solidFgAcc1">
+    <dgm:scene3d>
+      <a:camera prst="orthographicFront"/>
+      <a:lightRig rig="threePt" dir="t"/>
+    </dgm:scene3d>
+    <dgm:sp3d/>
+    <dgm:txPr/>
+    <dgm:style>
+      <a:lnRef idx="2">
+        <a:scrgbClr r="0" g="0" b="0"/>
+      </a:lnRef>
+      <a:fillRef idx="1">
+        <a:scrgbClr r="0" g="0" b="0"/>
+      </a:fillRef>
+      <a:effectRef idx="0">
+        <a:scrgbClr r="0" g="0" b="0"/>
+      </a:effectRef>
+      <a:fontRef idx="minor"/>
+    </dgm:style>
+  </dgm:styleLbl>
+  <dgm:styleLbl name="solidAlignAcc1">
+    <dgm:scene3d>
+      <a:camera prst="orthographicFront"/>
+      <a:lightRig rig="threePt" dir="t"/>
+    </dgm:scene3d>
+    <dgm:sp3d/>
+    <dgm:txPr/>
+    <dgm:style>
+      <a:lnRef idx="2">
+        <a:scrgbClr r="0" g="0" b="0"/>
+      </a:lnRef>
+      <a:fillRef idx="1">
+        <a:scrgbClr r="0" g="0" b="0"/>
+      </a:fillRef>
+      <a:effectRef idx="0">
+        <a:scrgbClr r="0" g="0" b="0"/>
+      </a:effectRef>
+      <a:fontRef idx="minor"/>
+    </dgm:style>
+  </dgm:styleLbl>
+  <dgm:styleLbl name="solidBgAcc1">
+    <dgm:scene3d>
+      <a:camera prst="orthographicFront"/>
+      <a:lightRig rig="threePt" dir="t"/>
+    </dgm:scene3d>
+    <dgm:sp3d/>
+    <dgm:txPr/>
+    <dgm:style>
+      <a:lnRef idx="2">
+        <a:scrgbClr r="0" g="0" b="0"/>
+      </a:lnRef>
+      <a:fillRef idx="1">
+        <a:scrgbClr r="0" g="0" b="0"/>
+      </a:fillRef>
+      <a:effectRef idx="0">
+        <a:scrgbClr r="0" g="0" b="0"/>
+      </a:effectRef>
+      <a:fontRef idx="minor"/>
+    </dgm:style>
+  </dgm:styleLbl>
+  <dgm:styleLbl name="fgAccFollowNode1">
+    <dgm:scene3d>
+      <a:camera prst="orthographicFront"/>
+      <a:lightRig rig="threePt" dir="t"/>
+    </dgm:scene3d>
+    <dgm:sp3d/>
+    <dgm:txPr/>
+    <dgm:style>
+      <a:lnRef idx="2">
+        <a:scrgbClr r="0" g="0" b="0"/>
+      </a:lnRef>
+      <a:fillRef idx="1">
+        <a:scrgbClr r="0" g="0" b="0"/>
+      </a:fillRef>
+      <a:effectRef idx="0">
+        <a:scrgbClr r="0" g="0" b="0"/>
+      </a:effectRef>
+      <a:fontRef idx="minor"/>
+    </dgm:style>
+  </dgm:styleLbl>
+  <dgm:styleLbl name="alignAccFollowNode1">
+    <dgm:scene3d>
+      <a:camera prst="orthographicFront"/>
+      <a:lightRig rig="threePt" dir="t"/>
+    </dgm:scene3d>
+    <dgm:sp3d/>
+    <dgm:txPr/>
+    <dgm:style>
+      <a:lnRef idx="2">
+        <a:scrgbClr r="0" g="0" b="0"/>
+      </a:lnRef>
+      <a:fillRef idx="1">
+        <a:scrgbClr r="0" g="0" b="0"/>
+      </a:fillRef>
+      <a:effectRef idx="0">
+        <a:scrgbClr r="0" g="0" b="0"/>
+      </a:effectRef>
+      <a:fontRef idx="minor"/>
+    </dgm:style>
+  </dgm:styleLbl>
+  <dgm:styleLbl name="bgAccFollowNode1">
+    <dgm:scene3d>
+      <a:camera prst="orthographicFront"/>
+      <a:lightRig rig="threePt" dir="t"/>
+    </dgm:scene3d>
+    <dgm:sp3d/>
+    <dgm:txPr/>
+    <dgm:style>
+      <a:lnRef idx="2">
+        <a:scrgbClr r="0" g="0" b="0"/>
+      </a:lnRef>
+      <a:fillRef idx="1">
+        <a:scrgbClr r="0" g="0" b="0"/>
+      </a:fillRef>
+      <a:effectRef idx="0">
+        <a:scrgbClr r="0" g="0" b="0"/>
+      </a:effectRef>
+      <a:fontRef idx="minor"/>
+    </dgm:style>
+  </dgm:styleLbl>
+  <dgm:styleLbl name="fgAcc0">
+    <dgm:scene3d>
+      <a:camera prst="orthographicFront"/>
+      <a:lightRig rig="threePt" dir="t"/>
+    </dgm:scene3d>
+    <dgm:sp3d/>
+    <dgm:txPr/>
+    <dgm:style>
+      <a:lnRef idx="2">
+        <a:scrgbClr r="0" g="0" b="0"/>
+      </a:lnRef>
+      <a:fillRef idx="1">
+        <a:scrgbClr r="0" g="0" b="0"/>
+      </a:fillRef>
+      <a:effectRef idx="0">
+        <a:scrgbClr r="0" g="0" b="0"/>
+      </a:effectRef>
+      <a:fontRef idx="minor"/>
+    </dgm:style>
+  </dgm:styleLbl>
+  <dgm:styleLbl name="fgAcc2">
+    <dgm:scene3d>
+      <a:camera prst="orthographicFront"/>
+      <a:lightRig rig="threePt" dir="t"/>
+    </dgm:scene3d>
+    <dgm:sp3d/>
+    <dgm:txPr/>
+    <dgm:style>
+      <a:lnRef idx="2">
+        <a:scrgbClr r="0" g="0" b="0"/>
+      </a:lnRef>
+      <a:fillRef idx="1">
+        <a:scrgbClr r="0" g="0" b="0"/>
+      </a:fillRef>
+      <a:effectRef idx="0">
+        <a:scrgbClr r="0" g="0" b="0"/>
+      </a:effectRef>
+      <a:fontRef idx="minor"/>
+    </dgm:style>
+  </dgm:styleLbl>
+  <dgm:styleLbl name="fgAcc3">
+    <dgm:scene3d>
+      <a:camera prst="orthographicFront"/>
+      <a:lightRig rig="threePt" dir="t"/>
+    </dgm:scene3d>
+    <dgm:sp3d/>
+    <dgm:txPr/>
+    <dgm:style>
+      <a:lnRef idx="2">
+        <a:scrgbClr r="0" g="0" b="0"/>
+      </a:lnRef>
+      <a:fillRef idx="1">
+        <a:scrgbClr r="0" g="0" b="0"/>
+      </a:fillRef>
+      <a:effectRef idx="0">
+        <a:scrgbClr r="0" g="0" b="0"/>
+      </a:effectRef>
+      <a:fontRef idx="minor"/>
+    </dgm:style>
+  </dgm:styleLbl>
+  <dgm:styleLbl name="fgAcc4">
+    <dgm:scene3d>
+      <a:camera prst="orthographicFront"/>
+      <a:lightRig rig="threePt" dir="t"/>
+    </dgm:scene3d>
+    <dgm:sp3d/>
+    <dgm:txPr/>
+    <dgm:style>
+      <a:lnRef idx="2">
+        <a:scrgbClr r="0" g="0" b="0"/>
+      </a:lnRef>
+      <a:fillRef idx="1">
+        <a:scrgbClr r="0" g="0" b="0"/>
+      </a:fillRef>
+      <a:effectRef idx="0">
+        <a:scrgbClr r="0" g="0" b="0"/>
+      </a:effectRef>
+      <a:fontRef idx="minor"/>
+    </dgm:style>
+  </dgm:styleLbl>
+  <dgm:styleLbl name="bgShp">
+    <dgm:scene3d>
+      <a:camera prst="orthographicFront"/>
+      <a:lightRig rig="threePt" dir="t"/>
+    </dgm:scene3d>
+    <dgm:sp3d/>
+    <dgm:txPr/>
+    <dgm:style>
+      <a:lnRef idx="0">
+        <a:scrgbClr r="0" g="0" b="0"/>
+      </a:lnRef>
+      <a:fillRef idx="1">
+        <a:scrgbClr r="0" g="0" b="0"/>
+      </a:fillRef>
+      <a:effectRef idx="0">
+        <a:scrgbClr r="0" g="0" b="0"/>
+      </a:effectRef>
+      <a:fontRef idx="minor"/>
+    </dgm:style>
+  </dgm:styleLbl>
+  <dgm:styleLbl name="dkBgShp">
+    <dgm:scene3d>
+      <a:camera prst="orthographicFront"/>
+      <a:lightRig rig="threePt" dir="t"/>
+    </dgm:scene3d>
+    <dgm:sp3d/>
+    <dgm:txPr/>
+    <dgm:style>
+      <a:lnRef idx="0">
+        <a:scrgbClr r="0" g="0" b="0"/>
+      </a:lnRef>
+      <a:fillRef idx="1">
+        <a:scrgbClr r="0" g="0" b="0"/>
+      </a:fillRef>
+      <a:effectRef idx="0">
+        <a:scrgbClr r="0" g="0" b="0"/>
+      </a:effectRef>
+      <a:fontRef idx="minor"/>
+    </dgm:style>
+  </dgm:styleLbl>
+  <dgm:styleLbl name="trBgShp">
+    <dgm:scene3d>
+      <a:camera prst="orthographicFront"/>
+      <a:lightRig rig="threePt" dir="t"/>
+    </dgm:scene3d>
+    <dgm:sp3d/>
+    <dgm:txPr/>
+    <dgm:style>
+      <a:lnRef idx="0">
+        <a:scrgbClr r="0" g="0" b="0"/>
+      </a:lnRef>
+      <a:fillRef idx="1">
+        <a:scrgbClr r="0" g="0" b="0"/>
+      </a:fillRef>
+      <a:effectRef idx="0">
+        <a:scrgbClr r="0" g="0" b="0"/>
+      </a:effectRef>
+      <a:fontRef idx="minor"/>
+    </dgm:style>
+  </dgm:styleLbl>
+  <dgm:styleLbl name="fgShp">
+    <dgm:scene3d>
+      <a:camera prst="orthographicFront"/>
+      <a:lightRig rig="threePt" dir="t"/>
+    </dgm:scene3d>
+    <dgm:sp3d/>
+    <dgm:txPr/>
+    <dgm:style>
+      <a:lnRef idx="2">
+        <a:scrgbClr r="0" g="0" b="0"/>
+      </a:lnRef>
+      <a:fillRef idx="1">
+        <a:scrgbClr r="0" g="0" b="0"/>
+      </a:fillRef>
+      <a:effectRef idx="0">
+        <a:scrgbClr r="0" g="0" b="0"/>
+      </a:effectRef>
+      <a:fontRef idx="minor"/>
+    </dgm:style>
+  </dgm:styleLbl>
+  <dgm:styleLbl name="revTx">
+    <dgm:scene3d>
+      <a:camera prst="orthographicFront"/>
+      <a:lightRig rig="threePt" dir="t"/>
+    </dgm:scene3d>
+    <dgm:sp3d/>
+    <dgm:txPr/>
+    <dgm:style>
+      <a:lnRef idx="0">
+        <a:scrgbClr r="0" g="0" b="0"/>
+      </a:lnRef>
+      <a:fillRef idx="0">
+        <a:scrgbClr r="0" g="0" b="0"/>
+      </a:fillRef>
+      <a:effectRef idx="0">
+        <a:scrgbClr r="0" g="0" b="0"/>
+      </a:effectRef>
+      <a:fontRef idx="minor"/>
+    </dgm:style>
+  </dgm:styleLbl>
+</dgm:styleDef>
+</file>
+
+<file path=ppt/diagrams/quickStyle4.xml><?xml version="1.0" encoding="utf-8"?>
 <dgm:styleDef xmlns:dgm="http://schemas.openxmlformats.org/drawingml/2006/diagram" xmlns:a="http://schemas.openxmlformats.org/drawingml/2006/main" uniqueId="urn:microsoft.com/office/officeart/2005/8/quickstyle/3d1">
   <dgm:title val=""/>
   <dgm:desc val=""/>
@@ -17178,7 +20854,7 @@
 </dgm:styleDef>
 </file>
 
-<file path=ppt/diagrams/quickStyle4.xml><?xml version="1.0" encoding="utf-8"?>
+<file path=ppt/diagrams/quickStyle5.xml><?xml version="1.0" encoding="utf-8"?>
 <dgm:styleDef xmlns:dgm="http://schemas.openxmlformats.org/drawingml/2006/diagram" xmlns:a="http://schemas.openxmlformats.org/drawingml/2006/main" uniqueId="urn:microsoft.com/office/officeart/2005/8/quickstyle/simple1">
   <dgm:title val=""/>
   <dgm:desc val=""/>
@@ -18212,7 +21888,7 @@
 </dgm:styleDef>
 </file>
 
-<file path=ppt/diagrams/quickStyle5.xml><?xml version="1.0" encoding="utf-8"?>
+<file path=ppt/diagrams/quickStyle6.xml><?xml version="1.0" encoding="utf-8"?>
 <dgm:styleDef xmlns:dgm="http://schemas.openxmlformats.org/drawingml/2006/diagram" xmlns:a="http://schemas.openxmlformats.org/drawingml/2006/main" uniqueId="urn:microsoft.com/office/officeart/2005/8/quickstyle/3d1">
   <dgm:title val=""/>
   <dgm:desc val=""/>
@@ -19505,7 +23181,7 @@
             <a:fld id="{229FDC3E-7424-49CF-AF38-AA35F4C77C8D}" type="datetimeFigureOut">
               <a:rPr lang="pt-BR" smtClean="0"/>
               <a:pPr/>
-              <a:t>04/04/2014</a:t>
+              <a:t>16/05/2014</a:t>
             </a:fld>
             <a:endParaRPr lang="pt-BR"/>
           </a:p>
@@ -19677,7 +23353,7 @@
             <a:fld id="{229FDC3E-7424-49CF-AF38-AA35F4C77C8D}" type="datetimeFigureOut">
               <a:rPr lang="pt-BR" smtClean="0"/>
               <a:pPr/>
-              <a:t>04/04/2014</a:t>
+              <a:t>16/05/2014</a:t>
             </a:fld>
             <a:endParaRPr lang="pt-BR"/>
           </a:p>
@@ -19854,7 +23530,7 @@
             <a:fld id="{229FDC3E-7424-49CF-AF38-AA35F4C77C8D}" type="datetimeFigureOut">
               <a:rPr lang="pt-BR" smtClean="0"/>
               <a:pPr/>
-              <a:t>04/04/2014</a:t>
+              <a:t>16/05/2014</a:t>
             </a:fld>
             <a:endParaRPr lang="pt-BR"/>
           </a:p>
@@ -20021,7 +23697,7 @@
             <a:fld id="{229FDC3E-7424-49CF-AF38-AA35F4C77C8D}" type="datetimeFigureOut">
               <a:rPr lang="pt-BR" smtClean="0"/>
               <a:pPr/>
-              <a:t>04/04/2014</a:t>
+              <a:t>16/05/2014</a:t>
             </a:fld>
             <a:endParaRPr lang="pt-BR"/>
           </a:p>
@@ -20257,7 +23933,7 @@
             <a:fld id="{229FDC3E-7424-49CF-AF38-AA35F4C77C8D}" type="datetimeFigureOut">
               <a:rPr lang="pt-BR" smtClean="0"/>
               <a:pPr/>
-              <a:t>04/04/2014</a:t>
+              <a:t>16/05/2014</a:t>
             </a:fld>
             <a:endParaRPr lang="pt-BR"/>
           </a:p>
@@ -20555,7 +24231,7 @@
             <a:fld id="{229FDC3E-7424-49CF-AF38-AA35F4C77C8D}" type="datetimeFigureOut">
               <a:rPr lang="pt-BR" smtClean="0"/>
               <a:pPr/>
-              <a:t>04/04/2014</a:t>
+              <a:t>16/05/2014</a:t>
             </a:fld>
             <a:endParaRPr lang="pt-BR"/>
           </a:p>
@@ -20941,7 +24617,7 @@
             <a:fld id="{229FDC3E-7424-49CF-AF38-AA35F4C77C8D}" type="datetimeFigureOut">
               <a:rPr lang="pt-BR" smtClean="0"/>
               <a:pPr/>
-              <a:t>04/04/2014</a:t>
+              <a:t>16/05/2014</a:t>
             </a:fld>
             <a:endParaRPr lang="pt-BR"/>
           </a:p>
@@ -21116,7 +24792,7 @@
             <a:fld id="{229FDC3E-7424-49CF-AF38-AA35F4C77C8D}" type="datetimeFigureOut">
               <a:rPr lang="pt-BR" smtClean="0"/>
               <a:pPr/>
-              <a:t>04/04/2014</a:t>
+              <a:t>16/05/2014</a:t>
             </a:fld>
             <a:endParaRPr lang="pt-BR"/>
           </a:p>
@@ -21208,7 +24884,7 @@
             <a:fld id="{229FDC3E-7424-49CF-AF38-AA35F4C77C8D}" type="datetimeFigureOut">
               <a:rPr lang="pt-BR" smtClean="0"/>
               <a:pPr/>
-              <a:t>04/04/2014</a:t>
+              <a:t>16/05/2014</a:t>
             </a:fld>
             <a:endParaRPr lang="pt-BR"/>
           </a:p>
@@ -21505,7 +25181,7 @@
             <a:fld id="{229FDC3E-7424-49CF-AF38-AA35F4C77C8D}" type="datetimeFigureOut">
               <a:rPr lang="pt-BR" smtClean="0"/>
               <a:pPr/>
-              <a:t>04/04/2014</a:t>
+              <a:t>16/05/2014</a:t>
             </a:fld>
             <a:endParaRPr lang="pt-BR"/>
           </a:p>
@@ -21641,7 +25317,7 @@
             <a:fld id="{229FDC3E-7424-49CF-AF38-AA35F4C77C8D}" type="datetimeFigureOut">
               <a:rPr lang="pt-BR" smtClean="0"/>
               <a:pPr/>
-              <a:t>04/04/2014</a:t>
+              <a:t>16/05/2014</a:t>
             </a:fld>
             <a:endParaRPr lang="pt-BR"/>
           </a:p>
@@ -21946,7 +25622,7 @@
             <a:fld id="{229FDC3E-7424-49CF-AF38-AA35F4C77C8D}" type="datetimeFigureOut">
               <a:rPr lang="pt-BR" smtClean="0"/>
               <a:pPr/>
-              <a:t>04/04/2014</a:t>
+              <a:t>16/05/2014</a:t>
             </a:fld>
             <a:endParaRPr lang="pt-BR"/>
           </a:p>
@@ -22711,7 +26387,7 @@
             <p:ph idx="1"/>
             <p:extLst>
               <p:ext uri="{D42A27DB-BD31-4B8C-83A1-F6EECF244321}">
-                <p14:modId xmlns:p14="http://schemas.microsoft.com/office/powerpoint/2010/main" xmlns="" val="2208909862"/>
+                <p14:modId xmlns:p14="http://schemas.microsoft.com/office/powerpoint/2010/main" val="2208909862"/>
               </p:ext>
             </p:extLst>
           </p:nvPr>
@@ -23067,7 +26743,7 @@
             <p:ph idx="1"/>
             <p:extLst>
               <p:ext uri="{D42A27DB-BD31-4B8C-83A1-F6EECF244321}">
-                <p14:modId xmlns:p14="http://schemas.microsoft.com/office/powerpoint/2010/main" xmlns="" val="311956969"/>
+                <p14:modId xmlns:p14="http://schemas.microsoft.com/office/powerpoint/2010/main" val="2118870426"/>
               </p:ext>
             </p:extLst>
           </p:nvPr>
@@ -23131,35 +26807,37 @@
           <a:p>
             <a:r>
               <a:rPr lang="pt-BR" dirty="0" smtClean="0"/>
-              <a:t>Descrição inicial </a:t>
-            </a:r>
-            <a:r>
-              <a:rPr lang="pt-BR" dirty="0" smtClean="0"/>
-              <a:t>do problema </a:t>
+              <a:t>Descrição inicial do problema </a:t>
             </a:r>
             <a:endParaRPr lang="pt-BR" dirty="0"/>
           </a:p>
         </p:txBody>
       </p:sp>
-      <p:sp>
-        <p:nvSpPr>
-          <p:cNvPr id="3" name="Espaço Reservado para Conteúdo 2"/>
-          <p:cNvSpPr>
-            <a:spLocks noGrp="1"/>
-          </p:cNvSpPr>
+      <p:graphicFrame>
+        <p:nvGraphicFramePr>
+          <p:cNvPr id="4" name="Espaço Reservado para Conteúdo 3"/>
+          <p:cNvGraphicFramePr>
+            <a:graphicFrameLocks noGrp="1"/>
+          </p:cNvGraphicFramePr>
           <p:nvPr>
             <p:ph idx="1"/>
+            <p:extLst>
+              <p:ext uri="{D42A27DB-BD31-4B8C-83A1-F6EECF244321}">
+                <p14:modId xmlns:p14="http://schemas.microsoft.com/office/powerpoint/2010/main" val="736405372"/>
+              </p:ext>
+            </p:extLst>
           </p:nvPr>
-        </p:nvSpPr>
-        <p:spPr/>
-        <p:txBody>
-          <a:bodyPr/>
-          <a:lstStyle/>
-          <a:p>
-            <a:endParaRPr lang="pt-BR" dirty="0"/>
-          </a:p>
-        </p:txBody>
-      </p:sp>
+        </p:nvGraphicFramePr>
+        <p:xfrm>
+          <a:off x="304800" y="1554163"/>
+          <a:ext cx="8686800" cy="4525962"/>
+        </p:xfrm>
+        <a:graphic>
+          <a:graphicData uri="http://schemas.openxmlformats.org/drawingml/2006/diagram">
+            <dgm:relIds xmlns:dgm="http://schemas.openxmlformats.org/drawingml/2006/diagram" xmlns:r="http://schemas.openxmlformats.org/officeDocument/2006/relationships" r:dm="rId2" r:lo="rId3" r:qs="rId4" r:cs="rId5"/>
+          </a:graphicData>
+        </a:graphic>
+      </p:graphicFrame>
     </p:spTree>
   </p:cSld>
   <p:clrMapOvr>

</xml_diff>

<commit_message>
2014 05 22 23:20
Edição do topicos e app
</commit_message>
<xml_diff>
--- a/SAS/Planejamento/Docs/#3 - Apresentação do projeto.pptx
+++ b/SAS/Planejamento/Docs/#3 - Apresentação do projeto.pptx
@@ -5313,27 +5313,27 @@
     </dgm:pt>
   </dgm:ptLst>
   <dgm:cxnLst>
-    <dgm:cxn modelId="{F9191076-F8DA-4139-AB2E-8676FB0EE6B9}" srcId="{F764DBA7-A3E6-41AE-AAE3-82E4B8468FDE}" destId="{8CD26415-961D-4B68-B921-E5200F5307C6}" srcOrd="0" destOrd="0" parTransId="{BA48AF34-0E50-497A-9716-D728A68A822C}" sibTransId="{442A9638-1598-4307-926B-38E8B2F5EC42}"/>
+    <dgm:cxn modelId="{49439F5F-703F-42C8-AC41-9D10F0F390C7}" srcId="{C9FFFE1F-6078-4D82-87D0-BC919E87007C}" destId="{3D263D67-4D7A-41A5-91A5-670388FEE69F}" srcOrd="0" destOrd="0" parTransId="{ACF50AC0-88E8-48BB-8EA1-B472F428EFC8}" sibTransId="{E1C076EE-C718-4411-AC8A-F6087CE2E2FC}"/>
+    <dgm:cxn modelId="{29B6EE33-46BD-4DFF-8EAB-6F54D53EE694}" srcId="{7204C1C4-4A05-4E69-9F7B-60981284C004}" destId="{FEEFF06B-F309-4B5C-9120-F2D5BB2A0B0A}" srcOrd="0" destOrd="0" parTransId="{92393A6B-0584-45D2-B927-C5E52B55B04B}" sibTransId="{9A34E78C-3E18-40E0-9559-08591574FBDD}"/>
+    <dgm:cxn modelId="{F8EDE821-F4CD-4FD2-80DE-63681A6BFEE6}" type="presOf" srcId="{8CD26415-961D-4B68-B921-E5200F5307C6}" destId="{7991AEF3-84F5-4F2F-9A87-D93011516A86}" srcOrd="0" destOrd="0" presId="urn:microsoft.com/office/officeart/2005/8/layout/vList5"/>
+    <dgm:cxn modelId="{E320DCA1-229B-464B-A3C2-83EF157F38FD}" type="presOf" srcId="{FEEFF06B-F309-4B5C-9120-F2D5BB2A0B0A}" destId="{4069C5B0-E0D3-47C9-9E5F-416939C594B9}" srcOrd="0" destOrd="0" presId="urn:microsoft.com/office/officeart/2005/8/layout/vList5"/>
+    <dgm:cxn modelId="{5146D501-AD3A-4D91-A2EE-6B8E055A8536}" type="presOf" srcId="{C9FFFE1F-6078-4D82-87D0-BC919E87007C}" destId="{F985ABD3-DA1F-4E90-952D-1C16820F198E}" srcOrd="0" destOrd="0" presId="urn:microsoft.com/office/officeart/2005/8/layout/vList5"/>
+    <dgm:cxn modelId="{16F3F74B-7060-4D12-9C89-BB95B103C25C}" type="presOf" srcId="{D7EEFC11-8883-4ED2-BE60-DD96E84152F9}" destId="{76D300D9-3977-4D02-95E9-3905CCACBD1B}" srcOrd="0" destOrd="0" presId="urn:microsoft.com/office/officeart/2005/8/layout/vList5"/>
     <dgm:cxn modelId="{40518AFD-BA91-4B2F-AEA2-E573186B25A5}" srcId="{E42DA33D-4309-45A4-8090-C7C1B8DE2840}" destId="{3E8A25C2-92DB-4ED8-B8C9-EA3371ADABA4}" srcOrd="1" destOrd="0" parTransId="{AE9D5A4F-DE63-4C00-8459-58284FF23117}" sibTransId="{DFAB64E3-84EF-4A31-90B3-B1CB79332689}"/>
     <dgm:cxn modelId="{886B9366-E103-4F17-9B78-865383070892}" type="presOf" srcId="{3E8A25C2-92DB-4ED8-B8C9-EA3371ADABA4}" destId="{1C4CF5AE-B0A9-4E79-99D0-8192DD361FD5}" srcOrd="0" destOrd="0" presId="urn:microsoft.com/office/officeart/2005/8/layout/vList5"/>
-    <dgm:cxn modelId="{E320DCA1-229B-464B-A3C2-83EF157F38FD}" type="presOf" srcId="{FEEFF06B-F309-4B5C-9120-F2D5BB2A0B0A}" destId="{4069C5B0-E0D3-47C9-9E5F-416939C594B9}" srcOrd="0" destOrd="0" presId="urn:microsoft.com/office/officeart/2005/8/layout/vList5"/>
+    <dgm:cxn modelId="{895F7E3F-AB1D-4DDA-9805-E992151AA0A5}" srcId="{E42DA33D-4309-45A4-8090-C7C1B8DE2840}" destId="{F764DBA7-A3E6-41AE-AAE3-82E4B8468FDE}" srcOrd="2" destOrd="0" parTransId="{DC130EEF-0F89-485F-A675-CEFBD90A8E41}" sibTransId="{41615984-E2C2-477B-BB5D-8BF374A79996}"/>
+    <dgm:cxn modelId="{482FF1F3-2CE5-45AC-BB2F-4517318D1C97}" type="presOf" srcId="{CD90799B-3B74-4BC7-8657-98A1B4DCC681}" destId="{4069C5B0-E0D3-47C9-9E5F-416939C594B9}" srcOrd="0" destOrd="1" presId="urn:microsoft.com/office/officeart/2005/8/layout/vList5"/>
     <dgm:cxn modelId="{287A446E-66DE-4E87-9D02-0CCC24AE66D5}" srcId="{3E8A25C2-92DB-4ED8-B8C9-EA3371ADABA4}" destId="{D7EEFC11-8883-4ED2-BE60-DD96E84152F9}" srcOrd="0" destOrd="0" parTransId="{B482877E-31B6-44B4-8CD6-B7C7B7B41713}" sibTransId="{6D43DDB6-F7AC-4CC2-A2C8-5A3FEEC47C1E}"/>
+    <dgm:cxn modelId="{7DA06D24-3FE4-409C-A5B4-AABEB6DCE6D5}" srcId="{7204C1C4-4A05-4E69-9F7B-60981284C004}" destId="{532DDF30-8F85-4CC7-9DA6-BD224FB1F3F5}" srcOrd="2" destOrd="0" parTransId="{D1BC096E-7702-440B-BE80-860792D3DFB7}" sibTransId="{9D185A63-1973-4493-917E-43CEF87568E8}"/>
+    <dgm:cxn modelId="{B14882FA-3621-45BB-AD02-588DC237E259}" srcId="{E42DA33D-4309-45A4-8090-C7C1B8DE2840}" destId="{C9FFFE1F-6078-4D82-87D0-BC919E87007C}" srcOrd="3" destOrd="0" parTransId="{542BC124-9D9F-4260-8A13-671245865973}" sibTransId="{7CFEB858-7D09-4292-AFD8-A460BF109FDB}"/>
+    <dgm:cxn modelId="{87BA7E12-F7AF-46BE-8604-29232418CB3A}" srcId="{E42DA33D-4309-45A4-8090-C7C1B8DE2840}" destId="{7204C1C4-4A05-4E69-9F7B-60981284C004}" srcOrd="0" destOrd="0" parTransId="{4413B713-B44E-40B8-B9EC-C52CD6FE6A10}" sibTransId="{03005108-F32D-4EFF-9439-890CCA627D66}"/>
+    <dgm:cxn modelId="{83312643-ADFE-4B1B-815A-D60947C8A4EC}" srcId="{7204C1C4-4A05-4E69-9F7B-60981284C004}" destId="{CD90799B-3B74-4BC7-8657-98A1B4DCC681}" srcOrd="1" destOrd="0" parTransId="{751EC021-411F-4A76-B34F-42C814479026}" sibTransId="{7A7CB2A3-1623-4099-B0DA-33EDC01CA133}"/>
     <dgm:cxn modelId="{02D36449-91AF-4126-9259-E191C70B70F8}" type="presOf" srcId="{3D263D67-4D7A-41A5-91A5-670388FEE69F}" destId="{232E8D04-E732-492E-A284-139D99DFE02C}" srcOrd="0" destOrd="0" presId="urn:microsoft.com/office/officeart/2005/8/layout/vList5"/>
+    <dgm:cxn modelId="{2F03713C-0490-4725-99D7-5056B7C29DD9}" type="presOf" srcId="{E42DA33D-4309-45A4-8090-C7C1B8DE2840}" destId="{9951C6AC-0F0C-48FA-BECF-6C3F336159BF}" srcOrd="0" destOrd="0" presId="urn:microsoft.com/office/officeart/2005/8/layout/vList5"/>
+    <dgm:cxn modelId="{7B753C74-0022-47C2-9FF5-93322A5AF332}" type="presOf" srcId="{7204C1C4-4A05-4E69-9F7B-60981284C004}" destId="{83285697-B771-41E8-BF80-D6B7B2E260A7}" srcOrd="0" destOrd="0" presId="urn:microsoft.com/office/officeart/2005/8/layout/vList5"/>
     <dgm:cxn modelId="{8A68C0B9-F522-4B3B-9EBF-E7A9F6BA3F83}" type="presOf" srcId="{F764DBA7-A3E6-41AE-AAE3-82E4B8468FDE}" destId="{DE3A8CA3-F5E7-47D6-9409-0DAEFC3883C5}" srcOrd="0" destOrd="0" presId="urn:microsoft.com/office/officeart/2005/8/layout/vList5"/>
-    <dgm:cxn modelId="{7DA06D24-3FE4-409C-A5B4-AABEB6DCE6D5}" srcId="{7204C1C4-4A05-4E69-9F7B-60981284C004}" destId="{532DDF30-8F85-4CC7-9DA6-BD224FB1F3F5}" srcOrd="2" destOrd="0" parTransId="{D1BC096E-7702-440B-BE80-860792D3DFB7}" sibTransId="{9D185A63-1973-4493-917E-43CEF87568E8}"/>
-    <dgm:cxn modelId="{482FF1F3-2CE5-45AC-BB2F-4517318D1C97}" type="presOf" srcId="{CD90799B-3B74-4BC7-8657-98A1B4DCC681}" destId="{4069C5B0-E0D3-47C9-9E5F-416939C594B9}" srcOrd="0" destOrd="1" presId="urn:microsoft.com/office/officeart/2005/8/layout/vList5"/>
     <dgm:cxn modelId="{8992B31C-96AE-42D8-92E7-747632B0038C}" type="presOf" srcId="{532DDF30-8F85-4CC7-9DA6-BD224FB1F3F5}" destId="{4069C5B0-E0D3-47C9-9E5F-416939C594B9}" srcOrd="0" destOrd="2" presId="urn:microsoft.com/office/officeart/2005/8/layout/vList5"/>
-    <dgm:cxn modelId="{29B6EE33-46BD-4DFF-8EAB-6F54D53EE694}" srcId="{7204C1C4-4A05-4E69-9F7B-60981284C004}" destId="{FEEFF06B-F309-4B5C-9120-F2D5BB2A0B0A}" srcOrd="0" destOrd="0" parTransId="{92393A6B-0584-45D2-B927-C5E52B55B04B}" sibTransId="{9A34E78C-3E18-40E0-9559-08591574FBDD}"/>
-    <dgm:cxn modelId="{49439F5F-703F-42C8-AC41-9D10F0F390C7}" srcId="{C9FFFE1F-6078-4D82-87D0-BC919E87007C}" destId="{3D263D67-4D7A-41A5-91A5-670388FEE69F}" srcOrd="0" destOrd="0" parTransId="{ACF50AC0-88E8-48BB-8EA1-B472F428EFC8}" sibTransId="{E1C076EE-C718-4411-AC8A-F6087CE2E2FC}"/>
-    <dgm:cxn modelId="{B14882FA-3621-45BB-AD02-588DC237E259}" srcId="{E42DA33D-4309-45A4-8090-C7C1B8DE2840}" destId="{C9FFFE1F-6078-4D82-87D0-BC919E87007C}" srcOrd="3" destOrd="0" parTransId="{542BC124-9D9F-4260-8A13-671245865973}" sibTransId="{7CFEB858-7D09-4292-AFD8-A460BF109FDB}"/>
-    <dgm:cxn modelId="{5146D501-AD3A-4D91-A2EE-6B8E055A8536}" type="presOf" srcId="{C9FFFE1F-6078-4D82-87D0-BC919E87007C}" destId="{F985ABD3-DA1F-4E90-952D-1C16820F198E}" srcOrd="0" destOrd="0" presId="urn:microsoft.com/office/officeart/2005/8/layout/vList5"/>
-    <dgm:cxn modelId="{2F03713C-0490-4725-99D7-5056B7C29DD9}" type="presOf" srcId="{E42DA33D-4309-45A4-8090-C7C1B8DE2840}" destId="{9951C6AC-0F0C-48FA-BECF-6C3F336159BF}" srcOrd="0" destOrd="0" presId="urn:microsoft.com/office/officeart/2005/8/layout/vList5"/>
-    <dgm:cxn modelId="{87BA7E12-F7AF-46BE-8604-29232418CB3A}" srcId="{E42DA33D-4309-45A4-8090-C7C1B8DE2840}" destId="{7204C1C4-4A05-4E69-9F7B-60981284C004}" srcOrd="0" destOrd="0" parTransId="{4413B713-B44E-40B8-B9EC-C52CD6FE6A10}" sibTransId="{03005108-F32D-4EFF-9439-890CCA627D66}"/>
-    <dgm:cxn modelId="{16F3F74B-7060-4D12-9C89-BB95B103C25C}" type="presOf" srcId="{D7EEFC11-8883-4ED2-BE60-DD96E84152F9}" destId="{76D300D9-3977-4D02-95E9-3905CCACBD1B}" srcOrd="0" destOrd="0" presId="urn:microsoft.com/office/officeart/2005/8/layout/vList5"/>
-    <dgm:cxn modelId="{F8EDE821-F4CD-4FD2-80DE-63681A6BFEE6}" type="presOf" srcId="{8CD26415-961D-4B68-B921-E5200F5307C6}" destId="{7991AEF3-84F5-4F2F-9A87-D93011516A86}" srcOrd="0" destOrd="0" presId="urn:microsoft.com/office/officeart/2005/8/layout/vList5"/>
-    <dgm:cxn modelId="{7B753C74-0022-47C2-9FF5-93322A5AF332}" type="presOf" srcId="{7204C1C4-4A05-4E69-9F7B-60981284C004}" destId="{83285697-B771-41E8-BF80-D6B7B2E260A7}" srcOrd="0" destOrd="0" presId="urn:microsoft.com/office/officeart/2005/8/layout/vList5"/>
-    <dgm:cxn modelId="{895F7E3F-AB1D-4DDA-9805-E992151AA0A5}" srcId="{E42DA33D-4309-45A4-8090-C7C1B8DE2840}" destId="{F764DBA7-A3E6-41AE-AAE3-82E4B8468FDE}" srcOrd="2" destOrd="0" parTransId="{DC130EEF-0F89-485F-A675-CEFBD90A8E41}" sibTransId="{41615984-E2C2-477B-BB5D-8BF374A79996}"/>
-    <dgm:cxn modelId="{83312643-ADFE-4B1B-815A-D60947C8A4EC}" srcId="{7204C1C4-4A05-4E69-9F7B-60981284C004}" destId="{CD90799B-3B74-4BC7-8657-98A1B4DCC681}" srcOrd="1" destOrd="0" parTransId="{751EC021-411F-4A76-B34F-42C814479026}" sibTransId="{7A7CB2A3-1623-4099-B0DA-33EDC01CA133}"/>
+    <dgm:cxn modelId="{F9191076-F8DA-4139-AB2E-8676FB0EE6B9}" srcId="{F764DBA7-A3E6-41AE-AAE3-82E4B8468FDE}" destId="{8CD26415-961D-4B68-B921-E5200F5307C6}" srcOrd="0" destOrd="0" parTransId="{BA48AF34-0E50-497A-9716-D728A68A822C}" sibTransId="{442A9638-1598-4307-926B-38E8B2F5EC42}"/>
     <dgm:cxn modelId="{A3BB4633-1B83-438C-B46A-5AF3D92225A3}" type="presParOf" srcId="{9951C6AC-0F0C-48FA-BECF-6C3F336159BF}" destId="{74EA5511-F8C7-4860-A01C-41612C829EF5}" srcOrd="0" destOrd="0" presId="urn:microsoft.com/office/officeart/2005/8/layout/vList5"/>
     <dgm:cxn modelId="{8F3604BB-2758-4462-926E-F93AA05F30B5}" type="presParOf" srcId="{74EA5511-F8C7-4860-A01C-41612C829EF5}" destId="{83285697-B771-41E8-BF80-D6B7B2E260A7}" srcOrd="0" destOrd="0" presId="urn:microsoft.com/office/officeart/2005/8/layout/vList5"/>
     <dgm:cxn modelId="{C5A249E9-42F1-43F9-8331-FBEE8E16B894}" type="presParOf" srcId="{74EA5511-F8C7-4860-A01C-41612C829EF5}" destId="{4069C5B0-E0D3-47C9-9E5F-416939C594B9}" srcOrd="1" destOrd="0" presId="urn:microsoft.com/office/officeart/2005/8/layout/vList5"/>
@@ -5354,7 +5354,7 @@
   <dgm:whole/>
   <dgm:extLst>
     <a:ext uri="http://schemas.microsoft.com/office/drawing/2008/diagram">
-      <dsp:dataModelExt xmlns:dsp="http://schemas.microsoft.com/office/drawing/2008/diagram" relId="rId6" minVer="http://schemas.openxmlformats.org/drawingml/2006/diagram"/>
+      <dsp:dataModelExt xmlns:dsp="http://schemas.microsoft.com/office/drawing/2008/diagram" xmlns="" relId="rId6" minVer="http://schemas.openxmlformats.org/drawingml/2006/diagram"/>
     </a:ext>
   </dgm:extLst>
 </dgm:dataModel>
@@ -5397,10 +5397,10 @@
         <a:lstStyle/>
         <a:p>
           <a:r>
-            <a:rPr lang="pt-BR" sz="1600" b="1" dirty="0" smtClean="0"/>
-            <a:t>Sem software local </a:t>
+            <a:rPr lang="pt-BR" sz="2400" b="1" dirty="0" smtClean="0"/>
+            <a:t>Interligar </a:t>
           </a:r>
-          <a:endParaRPr lang="pt-BR" sz="1600" b="1" dirty="0"/>
+          <a:endParaRPr lang="pt-BR" sz="2400" b="1" dirty="0"/>
         </a:p>
       </dgm:t>
     </dgm:pt>
@@ -5463,11 +5463,12 @@
         <a:bodyPr/>
         <a:lstStyle/>
         <a:p>
+          <a:pPr algn="l"/>
           <a:r>
-            <a:rPr lang="pt-BR" sz="1400" b="1" dirty="0" smtClean="0"/>
-            <a:t>?</a:t>
+            <a:rPr lang="pt-BR" sz="1800" b="1" dirty="0" smtClean="0"/>
+            <a:t>Pastorais</a:t>
           </a:r>
-          <a:endParaRPr lang="pt-BR" sz="1400" b="1" dirty="0"/>
+          <a:endParaRPr lang="pt-BR" sz="1800" b="1" dirty="0"/>
         </a:p>
       </dgm:t>
     </dgm:pt>
@@ -5515,11 +5516,12 @@
         <a:bodyPr/>
         <a:lstStyle/>
         <a:p>
+          <a:pPr algn="l"/>
           <a:r>
-            <a:rPr lang="pt-BR" sz="1600" b="1" dirty="0" smtClean="0"/>
-            <a:t>Mobilidade</a:t>
+            <a:rPr lang="pt-BR" sz="2400" b="1" dirty="0" smtClean="0"/>
+            <a:t>Padronizar</a:t>
           </a:r>
-          <a:endParaRPr lang="pt-BR" sz="1600" b="1" dirty="0"/>
+          <a:endParaRPr lang="pt-BR" sz="2400" b="1" dirty="0"/>
         </a:p>
       </dgm:t>
     </dgm:pt>
@@ -5583,10 +5585,10 @@
         <a:lstStyle/>
         <a:p>
           <a:r>
-            <a:rPr lang="pt-BR" sz="1400" b="1" dirty="0" smtClean="0"/>
+            <a:rPr lang="pt-BR" sz="1800" b="1" dirty="0" smtClean="0"/>
             <a:t>?</a:t>
           </a:r>
-          <a:endParaRPr lang="pt-BR" sz="1400" b="1" dirty="0"/>
+          <a:endParaRPr lang="pt-BR" sz="1800" b="1" dirty="0"/>
         </a:p>
       </dgm:t>
     </dgm:pt>
@@ -5635,10 +5637,10 @@
         <a:lstStyle/>
         <a:p>
           <a:r>
-            <a:rPr lang="pt-BR" sz="1600" b="1" dirty="0" smtClean="0"/>
-            <a:t>Recursos locais</a:t>
+            <a:rPr lang="pt-BR" sz="2400" b="1" dirty="0" smtClean="0"/>
+            <a:t>Facilitar</a:t>
           </a:r>
-          <a:endParaRPr lang="pt-BR" sz="1600" b="1" dirty="0"/>
+          <a:endParaRPr lang="pt-BR" sz="2400" b="1" dirty="0"/>
         </a:p>
       </dgm:t>
     </dgm:pt>
@@ -5716,6 +5718,41 @@
         </a:p>
       </dgm:t>
     </dgm:pt>
+    <dgm:pt modelId="{AB2E5A07-628C-4E92-90B5-D0FC29CDD9C7}">
+      <dgm:prSet phldrT="[Texto]" custT="1">
+        <dgm:style>
+          <a:lnRef idx="2">
+            <a:schemeClr val="accent1"/>
+          </a:lnRef>
+          <a:fillRef idx="1">
+            <a:schemeClr val="lt1"/>
+          </a:fillRef>
+          <a:effectRef idx="0">
+            <a:schemeClr val="accent1"/>
+          </a:effectRef>
+          <a:fontRef idx="minor">
+            <a:schemeClr val="dk1"/>
+          </a:fontRef>
+        </dgm:style>
+      </dgm:prSet>
+      <dgm:spPr/>
+      <dgm:t>
+        <a:bodyPr/>
+        <a:lstStyle/>
+        <a:p>
+          <a:pPr algn="l"/>
+          <a:endParaRPr lang="pt-BR" sz="1800" b="1" dirty="0"/>
+        </a:p>
+      </dgm:t>
+    </dgm:pt>
+    <dgm:pt modelId="{4015142C-E082-4615-B7AB-FB0D2987A9AC}" type="parTrans" cxnId="{7A1F2110-9C05-4201-A75F-73284CDE0F86}">
+      <dgm:prSet/>
+      <dgm:spPr/>
+    </dgm:pt>
+    <dgm:pt modelId="{1A383F36-FE35-43F6-9A56-87C1C2601885}" type="sibTrans" cxnId="{7A1F2110-9C05-4201-A75F-73284CDE0F86}">
+      <dgm:prSet/>
+      <dgm:spPr/>
+    </dgm:pt>
     <dgm:pt modelId="{BCDBC707-4A93-4D55-A61A-79732B703027}" type="pres">
       <dgm:prSet presAssocID="{E253E697-B0C3-42D4-81FD-D3ABCA72938E}" presName="linearFlow" presStyleCnt="0">
         <dgm:presLayoutVars>
@@ -5920,26 +5957,28 @@
     </dgm:pt>
   </dgm:ptLst>
   <dgm:cxnLst>
+    <dgm:cxn modelId="{C288C32A-3227-4782-B852-198321A78827}" type="presOf" srcId="{140DB818-E071-4B39-BEDA-37F84C79FBA2}" destId="{D6C82472-F7A1-44F8-BE16-C0E2E40E0D6B}" srcOrd="1" destOrd="0" presId="urn:microsoft.com/office/officeart/2005/8/layout/process3"/>
+    <dgm:cxn modelId="{021B0986-616E-47A6-BC20-5C2A8AA71A81}" type="presOf" srcId="{E253E697-B0C3-42D4-81FD-D3ABCA72938E}" destId="{BCDBC707-4A93-4D55-A61A-79732B703027}" srcOrd="0" destOrd="0" presId="urn:microsoft.com/office/officeart/2005/8/layout/process3"/>
+    <dgm:cxn modelId="{BB53AC73-5473-4487-A280-CC415E72C20C}" srcId="{E253E697-B0C3-42D4-81FD-D3ABCA72938E}" destId="{140DB818-E071-4B39-BEDA-37F84C79FBA2}" srcOrd="1" destOrd="0" parTransId="{5D492640-F330-4177-9F25-0C2545064803}" sibTransId="{AAA7816F-0D18-434B-AF27-E1709A042EA5}"/>
     <dgm:cxn modelId="{82215399-8FEF-435E-B12E-B0BBF6350A2D}" srcId="{140DB818-E071-4B39-BEDA-37F84C79FBA2}" destId="{57884B04-88D4-4FB2-8678-5199DF429E6F}" srcOrd="0" destOrd="0" parTransId="{C4B27B1D-C2E0-4804-B643-F031B63B66D3}" sibTransId="{B8942B1F-0DA1-4630-8D8B-34A3B43C11D5}"/>
+    <dgm:cxn modelId="{E22A4332-4F38-4397-A0CA-E07AB4FDA400}" type="presOf" srcId="{AD7A2D0A-69C1-40D4-AC3C-50ACA39C45C1}" destId="{EA7354A6-04B1-4A5C-BE93-3D503C066108}" srcOrd="0" destOrd="0" presId="urn:microsoft.com/office/officeart/2005/8/layout/process3"/>
+    <dgm:cxn modelId="{1BD557F6-3147-4A3E-96E1-8774CC36B89A}" srcId="{E253E697-B0C3-42D4-81FD-D3ABCA72938E}" destId="{AD7A2D0A-69C1-40D4-AC3C-50ACA39C45C1}" srcOrd="2" destOrd="0" parTransId="{B65DA3CC-30DF-4011-97FD-91E67EF19982}" sibTransId="{D8E3431A-1020-45BC-A3A1-D9601A2EED84}"/>
+    <dgm:cxn modelId="{625B97B1-48B9-4F79-AD12-9E967C7E5D25}" type="presOf" srcId="{57884B04-88D4-4FB2-8678-5199DF429E6F}" destId="{3E47BC9E-87C0-4D93-83F4-A810B62AEF07}" srcOrd="0" destOrd="0" presId="urn:microsoft.com/office/officeart/2005/8/layout/process3"/>
+    <dgm:cxn modelId="{1797C3E7-363E-4D4F-BF7B-E725B7DA6E80}" type="presOf" srcId="{579997AD-FA9A-4915-A323-8F17CA09514B}" destId="{E703F4C6-A0E0-49AD-9FAC-F47DD1F01258}" srcOrd="1" destOrd="0" presId="urn:microsoft.com/office/officeart/2005/8/layout/process3"/>
+    <dgm:cxn modelId="{5DDCBCED-AD9D-443E-B390-A89DFC1C749F}" type="presOf" srcId="{140DB818-E071-4B39-BEDA-37F84C79FBA2}" destId="{184053F0-8034-496C-9823-B7D238D8DC93}" srcOrd="0" destOrd="0" presId="urn:microsoft.com/office/officeart/2005/8/layout/process3"/>
+    <dgm:cxn modelId="{605658C6-069A-4135-B3FB-B8571120DFAF}" type="presOf" srcId="{4BA36FF7-0F0F-4341-A68C-01E8516603CD}" destId="{DADC7395-583C-4FD5-8691-3342B823E6CA}" srcOrd="1" destOrd="0" presId="urn:microsoft.com/office/officeart/2005/8/layout/process3"/>
+    <dgm:cxn modelId="{D95A37CA-F51F-4A08-8D0B-184665F642AA}" type="presOf" srcId="{579997AD-FA9A-4915-A323-8F17CA09514B}" destId="{330F8E89-32DF-4BC4-AED2-91D2D7CB94C5}" srcOrd="0" destOrd="0" presId="urn:microsoft.com/office/officeart/2005/8/layout/process3"/>
+    <dgm:cxn modelId="{13DDD5AB-9265-4DB2-9E66-512CAA799786}" srcId="{E253E697-B0C3-42D4-81FD-D3ABCA72938E}" destId="{4BA36FF7-0F0F-4341-A68C-01E8516603CD}" srcOrd="0" destOrd="0" parTransId="{9FBCD112-267C-4316-B4DD-D2608637A18B}" sibTransId="{579997AD-FA9A-4915-A323-8F17CA09514B}"/>
+    <dgm:cxn modelId="{3B833AF1-554A-4115-83EE-25F9C4E2AEFD}" type="presOf" srcId="{B2D64904-4778-414A-935C-AFC992C15E50}" destId="{A64C8272-FC1A-4572-A0B1-A3C36EACD2B6}" srcOrd="0" destOrd="0" presId="urn:microsoft.com/office/officeart/2005/8/layout/process3"/>
+    <dgm:cxn modelId="{AE01CECD-7460-4EE6-9855-462A6BAC54CD}" type="presOf" srcId="{21736AD5-ED16-41EE-9520-03DEC94C9DD9}" destId="{1993AEF3-68C8-4F83-9F1E-D1B7B5B4963C}" srcOrd="0" destOrd="0" presId="urn:microsoft.com/office/officeart/2005/8/layout/process3"/>
     <dgm:cxn modelId="{9C9CCD84-152C-4BF0-AE56-02A77DCE9308}" type="presOf" srcId="{AD7A2D0A-69C1-40D4-AC3C-50ACA39C45C1}" destId="{944B484B-F688-4CFA-A4FB-08B237CA5903}" srcOrd="1" destOrd="0" presId="urn:microsoft.com/office/officeart/2005/8/layout/process3"/>
-    <dgm:cxn modelId="{BB53AC73-5473-4487-A280-CC415E72C20C}" srcId="{E253E697-B0C3-42D4-81FD-D3ABCA72938E}" destId="{140DB818-E071-4B39-BEDA-37F84C79FBA2}" srcOrd="1" destOrd="0" parTransId="{5D492640-F330-4177-9F25-0C2545064803}" sibTransId="{AAA7816F-0D18-434B-AF27-E1709A042EA5}"/>
+    <dgm:cxn modelId="{D1284BD6-E3DA-48A8-BFF9-25C5710CED70}" type="presOf" srcId="{4BA36FF7-0F0F-4341-A68C-01E8516603CD}" destId="{209FD6B3-0ECB-4203-B962-7559934405BD}" srcOrd="0" destOrd="0" presId="urn:microsoft.com/office/officeart/2005/8/layout/process3"/>
+    <dgm:cxn modelId="{7DDFCDF5-FB4B-4B56-AB28-D717E8E38C18}" type="presOf" srcId="{AAA7816F-0D18-434B-AF27-E1709A042EA5}" destId="{A890346F-3222-4081-BF76-FED6671C2558}" srcOrd="1" destOrd="0" presId="urn:microsoft.com/office/officeart/2005/8/layout/process3"/>
+    <dgm:cxn modelId="{7A1F2110-9C05-4201-A75F-73284CDE0F86}" srcId="{4BA36FF7-0F0F-4341-A68C-01E8516603CD}" destId="{AB2E5A07-628C-4E92-90B5-D0FC29CDD9C7}" srcOrd="1" destOrd="0" parTransId="{4015142C-E082-4615-B7AB-FB0D2987A9AC}" sibTransId="{1A383F36-FE35-43F6-9A56-87C1C2601885}"/>
+    <dgm:cxn modelId="{7F41E571-0B1D-42DB-A0D6-32AC8948638C}" type="presOf" srcId="{AB2E5A07-628C-4E92-90B5-D0FC29CDD9C7}" destId="{A64C8272-FC1A-4572-A0B1-A3C36EACD2B6}" srcOrd="0" destOrd="1" presId="urn:microsoft.com/office/officeart/2005/8/layout/process3"/>
     <dgm:cxn modelId="{5A2ECE84-5973-469B-B8D7-72377C33E035}" type="presOf" srcId="{AAA7816F-0D18-434B-AF27-E1709A042EA5}" destId="{1390A124-BEDA-4A49-9B1B-0ED2FB571A6C}" srcOrd="0" destOrd="0" presId="urn:microsoft.com/office/officeart/2005/8/layout/process3"/>
-    <dgm:cxn modelId="{021B0986-616E-47A6-BC20-5C2A8AA71A81}" type="presOf" srcId="{E253E697-B0C3-42D4-81FD-D3ABCA72938E}" destId="{BCDBC707-4A93-4D55-A61A-79732B703027}" srcOrd="0" destOrd="0" presId="urn:microsoft.com/office/officeart/2005/8/layout/process3"/>
-    <dgm:cxn modelId="{605658C6-069A-4135-B3FB-B8571120DFAF}" type="presOf" srcId="{4BA36FF7-0F0F-4341-A68C-01E8516603CD}" destId="{DADC7395-583C-4FD5-8691-3342B823E6CA}" srcOrd="1" destOrd="0" presId="urn:microsoft.com/office/officeart/2005/8/layout/process3"/>
-    <dgm:cxn modelId="{7DDFCDF5-FB4B-4B56-AB28-D717E8E38C18}" type="presOf" srcId="{AAA7816F-0D18-434B-AF27-E1709A042EA5}" destId="{A890346F-3222-4081-BF76-FED6671C2558}" srcOrd="1" destOrd="0" presId="urn:microsoft.com/office/officeart/2005/8/layout/process3"/>
-    <dgm:cxn modelId="{1BD557F6-3147-4A3E-96E1-8774CC36B89A}" srcId="{E253E697-B0C3-42D4-81FD-D3ABCA72938E}" destId="{AD7A2D0A-69C1-40D4-AC3C-50ACA39C45C1}" srcOrd="2" destOrd="0" parTransId="{B65DA3CC-30DF-4011-97FD-91E67EF19982}" sibTransId="{D8E3431A-1020-45BC-A3A1-D9601A2EED84}"/>
-    <dgm:cxn modelId="{D95A37CA-F51F-4A08-8D0B-184665F642AA}" type="presOf" srcId="{579997AD-FA9A-4915-A323-8F17CA09514B}" destId="{330F8E89-32DF-4BC4-AED2-91D2D7CB94C5}" srcOrd="0" destOrd="0" presId="urn:microsoft.com/office/officeart/2005/8/layout/process3"/>
-    <dgm:cxn modelId="{3B833AF1-554A-4115-83EE-25F9C4E2AEFD}" type="presOf" srcId="{B2D64904-4778-414A-935C-AFC992C15E50}" destId="{A64C8272-FC1A-4572-A0B1-A3C36EACD2B6}" srcOrd="0" destOrd="0" presId="urn:microsoft.com/office/officeart/2005/8/layout/process3"/>
-    <dgm:cxn modelId="{13DDD5AB-9265-4DB2-9E66-512CAA799786}" srcId="{E253E697-B0C3-42D4-81FD-D3ABCA72938E}" destId="{4BA36FF7-0F0F-4341-A68C-01E8516603CD}" srcOrd="0" destOrd="0" parTransId="{9FBCD112-267C-4316-B4DD-D2608637A18B}" sibTransId="{579997AD-FA9A-4915-A323-8F17CA09514B}"/>
-    <dgm:cxn modelId="{5DDCBCED-AD9D-443E-B390-A89DFC1C749F}" type="presOf" srcId="{140DB818-E071-4B39-BEDA-37F84C79FBA2}" destId="{184053F0-8034-496C-9823-B7D238D8DC93}" srcOrd="0" destOrd="0" presId="urn:microsoft.com/office/officeart/2005/8/layout/process3"/>
-    <dgm:cxn modelId="{1797C3E7-363E-4D4F-BF7B-E725B7DA6E80}" type="presOf" srcId="{579997AD-FA9A-4915-A323-8F17CA09514B}" destId="{E703F4C6-A0E0-49AD-9FAC-F47DD1F01258}" srcOrd="1" destOrd="0" presId="urn:microsoft.com/office/officeart/2005/8/layout/process3"/>
     <dgm:cxn modelId="{E6108260-E385-432B-A806-C31C8E849437}" srcId="{4BA36FF7-0F0F-4341-A68C-01E8516603CD}" destId="{B2D64904-4778-414A-935C-AFC992C15E50}" srcOrd="0" destOrd="0" parTransId="{3886B039-ED5A-4C35-9224-7296F3AB00E8}" sibTransId="{F27A2EE6-AA94-4404-920A-4FEA4A59E153}"/>
-    <dgm:cxn modelId="{E22A4332-4F38-4397-A0CA-E07AB4FDA400}" type="presOf" srcId="{AD7A2D0A-69C1-40D4-AC3C-50ACA39C45C1}" destId="{EA7354A6-04B1-4A5C-BE93-3D503C066108}" srcOrd="0" destOrd="0" presId="urn:microsoft.com/office/officeart/2005/8/layout/process3"/>
-    <dgm:cxn modelId="{AE01CECD-7460-4EE6-9855-462A6BAC54CD}" type="presOf" srcId="{21736AD5-ED16-41EE-9520-03DEC94C9DD9}" destId="{1993AEF3-68C8-4F83-9F1E-D1B7B5B4963C}" srcOrd="0" destOrd="0" presId="urn:microsoft.com/office/officeart/2005/8/layout/process3"/>
-    <dgm:cxn modelId="{625B97B1-48B9-4F79-AD12-9E967C7E5D25}" type="presOf" srcId="{57884B04-88D4-4FB2-8678-5199DF429E6F}" destId="{3E47BC9E-87C0-4D93-83F4-A810B62AEF07}" srcOrd="0" destOrd="0" presId="urn:microsoft.com/office/officeart/2005/8/layout/process3"/>
-    <dgm:cxn modelId="{D1284BD6-E3DA-48A8-BFF9-25C5710CED70}" type="presOf" srcId="{4BA36FF7-0F0F-4341-A68C-01E8516603CD}" destId="{209FD6B3-0ECB-4203-B962-7559934405BD}" srcOrd="0" destOrd="0" presId="urn:microsoft.com/office/officeart/2005/8/layout/process3"/>
     <dgm:cxn modelId="{33D1B9A7-E56C-4778-97FB-A5B130BCA5C0}" srcId="{AD7A2D0A-69C1-40D4-AC3C-50ACA39C45C1}" destId="{21736AD5-ED16-41EE-9520-03DEC94C9DD9}" srcOrd="0" destOrd="0" parTransId="{9CB51E30-49E4-4E36-942B-179B5A0EC94C}" sibTransId="{DFDDDFD5-3525-4DBC-A81D-34093C1E23BA}"/>
-    <dgm:cxn modelId="{C288C32A-3227-4782-B852-198321A78827}" type="presOf" srcId="{140DB818-E071-4B39-BEDA-37F84C79FBA2}" destId="{D6C82472-F7A1-44F8-BE16-C0E2E40E0D6B}" srcOrd="1" destOrd="0" presId="urn:microsoft.com/office/officeart/2005/8/layout/process3"/>
     <dgm:cxn modelId="{7A716225-B15F-42A3-B0B1-95F5DAF585E6}" type="presParOf" srcId="{BCDBC707-4A93-4D55-A61A-79732B703027}" destId="{53AF55CF-52F1-471D-BD6D-B6FBBCD8ED56}" srcOrd="0" destOrd="0" presId="urn:microsoft.com/office/officeart/2005/8/layout/process3"/>
     <dgm:cxn modelId="{AB11F588-8517-43F7-B26C-B53A5C95128F}" type="presParOf" srcId="{53AF55CF-52F1-471D-BD6D-B6FBBCD8ED56}" destId="{209FD6B3-0ECB-4203-B962-7559934405BD}" srcOrd="0" destOrd="0" presId="urn:microsoft.com/office/officeart/2005/8/layout/process3"/>
     <dgm:cxn modelId="{ECA7C0B7-4EAB-47E7-B4DA-234ACDCD8581}" type="presParOf" srcId="{53AF55CF-52F1-471D-BD6D-B6FBBCD8ED56}" destId="{DADC7395-583C-4FD5-8691-3342B823E6CA}" srcOrd="1" destOrd="0" presId="urn:microsoft.com/office/officeart/2005/8/layout/process3"/>
@@ -5961,7 +6000,7 @@
   <dgm:whole/>
   <dgm:extLst>
     <a:ext uri="http://schemas.microsoft.com/office/drawing/2008/diagram">
-      <dsp:dataModelExt xmlns:dsp="http://schemas.microsoft.com/office/drawing/2008/diagram" relId="rId6" minVer="http://schemas.openxmlformats.org/drawingml/2006/diagram"/>
+      <dsp:dataModelExt xmlns:dsp="http://schemas.microsoft.com/office/drawing/2008/diagram" xmlns="" relId="rId6" minVer="http://schemas.openxmlformats.org/drawingml/2006/diagram"/>
     </a:ext>
   </dgm:extLst>
 </dgm:dataModel>
@@ -6255,6 +6294,13 @@
         </dgm:presLayoutVars>
       </dgm:prSet>
       <dgm:spPr/>
+      <dgm:t>
+        <a:bodyPr/>
+        <a:lstStyle/>
+        <a:p>
+          <a:endParaRPr lang="pt-BR"/>
+        </a:p>
+      </dgm:t>
     </dgm:pt>
     <dgm:pt modelId="{1AE39575-5131-457E-87D9-250C20E4AF30}" type="pres">
       <dgm:prSet presAssocID="{B41D75AE-2A29-4277-8DBB-D5E9CED79C4D}" presName="root" presStyleCnt="0">
@@ -6288,6 +6334,13 @@
         </dgm:presLayoutVars>
       </dgm:prSet>
       <dgm:spPr/>
+      <dgm:t>
+        <a:bodyPr/>
+        <a:lstStyle/>
+        <a:p>
+          <a:endParaRPr lang="pt-BR"/>
+        </a:p>
+      </dgm:t>
     </dgm:pt>
     <dgm:pt modelId="{0FA6566D-FEDB-48F5-ABEA-024A465C109F}" type="pres">
       <dgm:prSet presAssocID="{B41D75AE-2A29-4277-8DBB-D5E9CED79C4D}" presName="childShape" presStyleCnt="0">
@@ -6320,6 +6373,13 @@
         </dgm:presLayoutVars>
       </dgm:prSet>
       <dgm:spPr/>
+      <dgm:t>
+        <a:bodyPr/>
+        <a:lstStyle/>
+        <a:p>
+          <a:endParaRPr lang="pt-BR"/>
+        </a:p>
+      </dgm:t>
     </dgm:pt>
     <dgm:pt modelId="{714E1039-AB1A-451F-B96D-3478333B02AD}" type="pres">
       <dgm:prSet presAssocID="{8AB1D12E-E418-4915-8CED-6AB0C84761F4}" presName="childComposite" presStyleCnt="0">
@@ -6343,6 +6403,13 @@
         </dgm:presLayoutVars>
       </dgm:prSet>
       <dgm:spPr/>
+      <dgm:t>
+        <a:bodyPr/>
+        <a:lstStyle/>
+        <a:p>
+          <a:endParaRPr lang="pt-BR"/>
+        </a:p>
+      </dgm:t>
     </dgm:pt>
     <dgm:pt modelId="{5FAF6DA5-2465-4BF5-9700-5D88837B55E0}" type="pres">
       <dgm:prSet presAssocID="{AC6C1CB8-BE46-44FC-93D0-1A13ABC82896}" presName="childComposite" presStyleCnt="0">
@@ -6366,6 +6433,13 @@
         </dgm:presLayoutVars>
       </dgm:prSet>
       <dgm:spPr/>
+      <dgm:t>
+        <a:bodyPr/>
+        <a:lstStyle/>
+        <a:p>
+          <a:endParaRPr lang="pt-BR"/>
+        </a:p>
+      </dgm:t>
     </dgm:pt>
     <dgm:pt modelId="{4739CC76-1879-4428-9113-81461854485F}" type="pres">
       <dgm:prSet presAssocID="{AAC17C87-31E8-4276-B5AF-B8910E5CA9AA}" presName="root" presStyleCnt="0">
@@ -6399,6 +6473,13 @@
         </dgm:presLayoutVars>
       </dgm:prSet>
       <dgm:spPr/>
+      <dgm:t>
+        <a:bodyPr/>
+        <a:lstStyle/>
+        <a:p>
+          <a:endParaRPr lang="pt-BR"/>
+        </a:p>
+      </dgm:t>
     </dgm:pt>
     <dgm:pt modelId="{8916CAB2-5D03-4865-BE99-9310931B985C}" type="pres">
       <dgm:prSet presAssocID="{AAC17C87-31E8-4276-B5AF-B8910E5CA9AA}" presName="childShape" presStyleCnt="0">
@@ -6431,6 +6512,13 @@
         </dgm:presLayoutVars>
       </dgm:prSet>
       <dgm:spPr/>
+      <dgm:t>
+        <a:bodyPr/>
+        <a:lstStyle/>
+        <a:p>
+          <a:endParaRPr lang="pt-BR"/>
+        </a:p>
+      </dgm:t>
     </dgm:pt>
     <dgm:pt modelId="{04D70E1E-E0BB-4881-94EE-5A0B1EA590AE}" type="pres">
       <dgm:prSet presAssocID="{3973E519-921D-4357-808F-65EA81567642}" presName="childComposite" presStyleCnt="0">
@@ -6454,6 +6542,13 @@
         </dgm:presLayoutVars>
       </dgm:prSet>
       <dgm:spPr/>
+      <dgm:t>
+        <a:bodyPr/>
+        <a:lstStyle/>
+        <a:p>
+          <a:endParaRPr lang="pt-BR"/>
+        </a:p>
+      </dgm:t>
     </dgm:pt>
     <dgm:pt modelId="{FEBF50CC-C092-4B47-ACC4-1B61B3D473F4}" type="pres">
       <dgm:prSet presAssocID="{25E09C33-42FD-4F52-8CB0-452BF541B7EE}" presName="childComposite" presStyleCnt="0">
@@ -6477,26 +6572,33 @@
         </dgm:presLayoutVars>
       </dgm:prSet>
       <dgm:spPr/>
+      <dgm:t>
+        <a:bodyPr/>
+        <a:lstStyle/>
+        <a:p>
+          <a:endParaRPr lang="pt-BR"/>
+        </a:p>
+      </dgm:t>
     </dgm:pt>
   </dgm:ptLst>
   <dgm:cxnLst>
+    <dgm:cxn modelId="{925D1D41-F295-4BF5-8F35-6B0283EB1660}" srcId="{09E1FA74-CAD4-4D8F-8C9F-47DB10A12E4C}" destId="{B41D75AE-2A29-4277-8DBB-D5E9CED79C4D}" srcOrd="0" destOrd="0" parTransId="{E4BA2DF7-CD16-40C5-8D39-63D87AB06BAE}" sibTransId="{49219BB6-AF08-4355-8AAC-CB63EB613BD5}"/>
+    <dgm:cxn modelId="{94F1B5B2-61A2-400D-A8C6-E55B5540F793}" type="presOf" srcId="{B41D75AE-2A29-4277-8DBB-D5E9CED79C4D}" destId="{F0A18B1E-4B8C-49D0-A2C5-B72A0992791A}" srcOrd="0" destOrd="0" presId="urn:microsoft.com/office/officeart/2008/layout/SquareAccentList"/>
+    <dgm:cxn modelId="{E985D23C-CEF3-49BA-B2AA-6039D6462C30}" srcId="{B41D75AE-2A29-4277-8DBB-D5E9CED79C4D}" destId="{AC6C1CB8-BE46-44FC-93D0-1A13ABC82896}" srcOrd="2" destOrd="0" parTransId="{368D3FFA-1706-4155-9796-459F27FB3F7F}" sibTransId="{47583708-E552-4706-B015-578F522A21EB}"/>
+    <dgm:cxn modelId="{8ABF67CD-DAC4-41A3-926E-140CF6F92A23}" srcId="{B41D75AE-2A29-4277-8DBB-D5E9CED79C4D}" destId="{8AB1D12E-E418-4915-8CED-6AB0C84761F4}" srcOrd="1" destOrd="0" parTransId="{1BE8EC8D-27D7-49EA-907A-2F9B0ACF5DCA}" sibTransId="{293C271F-A78D-436A-A6CB-17A318394333}"/>
+    <dgm:cxn modelId="{9A6ED448-CFA2-47B1-840B-9E2EC9DFCAC6}" type="presOf" srcId="{8AB1D12E-E418-4915-8CED-6AB0C84761F4}" destId="{B93FB06B-349E-4C46-9386-C2A7693F919C}" srcOrd="0" destOrd="0" presId="urn:microsoft.com/office/officeart/2008/layout/SquareAccentList"/>
+    <dgm:cxn modelId="{22916866-A373-422E-8CBF-39C46B6193BE}" type="presOf" srcId="{B2A72572-DD94-49F3-9C74-F97F76DD77E8}" destId="{22C7BCBD-CEEE-4C3C-8575-8FCB6CDA438E}" srcOrd="0" destOrd="0" presId="urn:microsoft.com/office/officeart/2008/layout/SquareAccentList"/>
+    <dgm:cxn modelId="{20432680-5755-4423-833B-CC830ADE86E0}" type="presOf" srcId="{AC6C1CB8-BE46-44FC-93D0-1A13ABC82896}" destId="{3094B189-7DCD-4266-B46D-8752B3C3A89E}" srcOrd="0" destOrd="0" presId="urn:microsoft.com/office/officeart/2008/layout/SquareAccentList"/>
+    <dgm:cxn modelId="{762F7717-D26E-4D1C-A6FD-498F6E1B02A3}" srcId="{AAC17C87-31E8-4276-B5AF-B8910E5CA9AA}" destId="{3973E519-921D-4357-808F-65EA81567642}" srcOrd="1" destOrd="0" parTransId="{74AF20CE-7799-4C8E-A894-EE0C2D449A5F}" sibTransId="{ED0B01CC-F5BD-4E3D-9811-96F476147302}"/>
+    <dgm:cxn modelId="{1F206E67-18A9-468B-81B0-CFC639595DB4}" type="presOf" srcId="{AAC17C87-31E8-4276-B5AF-B8910E5CA9AA}" destId="{920C1E90-5036-40EE-8B7B-C03BC172C6F4}" srcOrd="0" destOrd="0" presId="urn:microsoft.com/office/officeart/2008/layout/SquareAccentList"/>
+    <dgm:cxn modelId="{3CFC8CA8-DC62-44AE-9367-B51D186B6958}" srcId="{09E1FA74-CAD4-4D8F-8C9F-47DB10A12E4C}" destId="{AAC17C87-31E8-4276-B5AF-B8910E5CA9AA}" srcOrd="1" destOrd="0" parTransId="{7EA781CD-E6A2-4979-963F-9C9A0A1B2730}" sibTransId="{B37090C3-402B-4158-91BD-832F4000D4BA}"/>
+    <dgm:cxn modelId="{8AA5F746-7156-4DB2-A9F1-5EE035A94C1A}" type="presOf" srcId="{25E09C33-42FD-4F52-8CB0-452BF541B7EE}" destId="{310F8D48-7B6A-4438-922B-86FD094F44BF}" srcOrd="0" destOrd="0" presId="urn:microsoft.com/office/officeart/2008/layout/SquareAccentList"/>
+    <dgm:cxn modelId="{1DC85611-0410-4ED4-8902-8BD2FFC85606}" type="presOf" srcId="{3973E519-921D-4357-808F-65EA81567642}" destId="{37B72757-B95B-4606-93FF-4ADF0BB6D429}" srcOrd="0" destOrd="0" presId="urn:microsoft.com/office/officeart/2008/layout/SquareAccentList"/>
+    <dgm:cxn modelId="{72C0EA02-CE57-4BCE-9DFC-77D06D07A6E0}" type="presOf" srcId="{09E1FA74-CAD4-4D8F-8C9F-47DB10A12E4C}" destId="{2971BC93-77C3-4078-A105-8597E86CC05C}" srcOrd="0" destOrd="0" presId="urn:microsoft.com/office/officeart/2008/layout/SquareAccentList"/>
     <dgm:cxn modelId="{81B1CFBD-C7CF-48AB-9083-40917936C34C}" type="presOf" srcId="{22AB3F71-BC8F-4768-888B-F6E1856CFD5B}" destId="{D13322E5-B7AE-4570-A9FC-84DF641F4452}" srcOrd="0" destOrd="0" presId="urn:microsoft.com/office/officeart/2008/layout/SquareAccentList"/>
-    <dgm:cxn modelId="{20432680-5755-4423-833B-CC830ADE86E0}" type="presOf" srcId="{AC6C1CB8-BE46-44FC-93D0-1A13ABC82896}" destId="{3094B189-7DCD-4266-B46D-8752B3C3A89E}" srcOrd="0" destOrd="0" presId="urn:microsoft.com/office/officeart/2008/layout/SquareAccentList"/>
-    <dgm:cxn modelId="{9A6ED448-CFA2-47B1-840B-9E2EC9DFCAC6}" type="presOf" srcId="{8AB1D12E-E418-4915-8CED-6AB0C84761F4}" destId="{B93FB06B-349E-4C46-9386-C2A7693F919C}" srcOrd="0" destOrd="0" presId="urn:microsoft.com/office/officeart/2008/layout/SquareAccentList"/>
     <dgm:cxn modelId="{60B80743-7E71-47A9-8589-B22F3F761233}" srcId="{B41D75AE-2A29-4277-8DBB-D5E9CED79C4D}" destId="{B2A72572-DD94-49F3-9C74-F97F76DD77E8}" srcOrd="0" destOrd="0" parTransId="{BE5BBF08-CB6C-410D-95EE-BD5BF25A6309}" sibTransId="{CFA313D8-C3A9-4765-881F-FD14965CDD61}"/>
-    <dgm:cxn modelId="{72C0EA02-CE57-4BCE-9DFC-77D06D07A6E0}" type="presOf" srcId="{09E1FA74-CAD4-4D8F-8C9F-47DB10A12E4C}" destId="{2971BC93-77C3-4078-A105-8597E86CC05C}" srcOrd="0" destOrd="0" presId="urn:microsoft.com/office/officeart/2008/layout/SquareAccentList"/>
-    <dgm:cxn modelId="{1F206E67-18A9-468B-81B0-CFC639595DB4}" type="presOf" srcId="{AAC17C87-31E8-4276-B5AF-B8910E5CA9AA}" destId="{920C1E90-5036-40EE-8B7B-C03BC172C6F4}" srcOrd="0" destOrd="0" presId="urn:microsoft.com/office/officeart/2008/layout/SquareAccentList"/>
+    <dgm:cxn modelId="{2FFE2D2F-5254-486D-A83F-5A8A96275BDB}" srcId="{AAC17C87-31E8-4276-B5AF-B8910E5CA9AA}" destId="{25E09C33-42FD-4F52-8CB0-452BF541B7EE}" srcOrd="2" destOrd="0" parTransId="{2E5C60CF-085B-4C66-A01B-83A3AF9AC5CE}" sibTransId="{F9299BC1-DA27-4702-A02B-E2D61037A6E5}"/>
     <dgm:cxn modelId="{47F9B3B4-FA63-45BD-B156-69D5C1732BE8}" srcId="{AAC17C87-31E8-4276-B5AF-B8910E5CA9AA}" destId="{22AB3F71-BC8F-4768-888B-F6E1856CFD5B}" srcOrd="0" destOrd="0" parTransId="{72548C30-62AA-4264-A91B-6E316ED2D1D5}" sibTransId="{C9F02517-C147-4C66-A0F0-11E0F557FBA6}"/>
-    <dgm:cxn modelId="{1DC85611-0410-4ED4-8902-8BD2FFC85606}" type="presOf" srcId="{3973E519-921D-4357-808F-65EA81567642}" destId="{37B72757-B95B-4606-93FF-4ADF0BB6D429}" srcOrd="0" destOrd="0" presId="urn:microsoft.com/office/officeart/2008/layout/SquareAccentList"/>
-    <dgm:cxn modelId="{8ABF67CD-DAC4-41A3-926E-140CF6F92A23}" srcId="{B41D75AE-2A29-4277-8DBB-D5E9CED79C4D}" destId="{8AB1D12E-E418-4915-8CED-6AB0C84761F4}" srcOrd="1" destOrd="0" parTransId="{1BE8EC8D-27D7-49EA-907A-2F9B0ACF5DCA}" sibTransId="{293C271F-A78D-436A-A6CB-17A318394333}"/>
-    <dgm:cxn modelId="{3CFC8CA8-DC62-44AE-9367-B51D186B6958}" srcId="{09E1FA74-CAD4-4D8F-8C9F-47DB10A12E4C}" destId="{AAC17C87-31E8-4276-B5AF-B8910E5CA9AA}" srcOrd="1" destOrd="0" parTransId="{7EA781CD-E6A2-4979-963F-9C9A0A1B2730}" sibTransId="{B37090C3-402B-4158-91BD-832F4000D4BA}"/>
-    <dgm:cxn modelId="{E985D23C-CEF3-49BA-B2AA-6039D6462C30}" srcId="{B41D75AE-2A29-4277-8DBB-D5E9CED79C4D}" destId="{AC6C1CB8-BE46-44FC-93D0-1A13ABC82896}" srcOrd="2" destOrd="0" parTransId="{368D3FFA-1706-4155-9796-459F27FB3F7F}" sibTransId="{47583708-E552-4706-B015-578F522A21EB}"/>
-    <dgm:cxn modelId="{762F7717-D26E-4D1C-A6FD-498F6E1B02A3}" srcId="{AAC17C87-31E8-4276-B5AF-B8910E5CA9AA}" destId="{3973E519-921D-4357-808F-65EA81567642}" srcOrd="1" destOrd="0" parTransId="{74AF20CE-7799-4C8E-A894-EE0C2D449A5F}" sibTransId="{ED0B01CC-F5BD-4E3D-9811-96F476147302}"/>
-    <dgm:cxn modelId="{2FFE2D2F-5254-486D-A83F-5A8A96275BDB}" srcId="{AAC17C87-31E8-4276-B5AF-B8910E5CA9AA}" destId="{25E09C33-42FD-4F52-8CB0-452BF541B7EE}" srcOrd="2" destOrd="0" parTransId="{2E5C60CF-085B-4C66-A01B-83A3AF9AC5CE}" sibTransId="{F9299BC1-DA27-4702-A02B-E2D61037A6E5}"/>
-    <dgm:cxn modelId="{8AA5F746-7156-4DB2-A9F1-5EE035A94C1A}" type="presOf" srcId="{25E09C33-42FD-4F52-8CB0-452BF541B7EE}" destId="{310F8D48-7B6A-4438-922B-86FD094F44BF}" srcOrd="0" destOrd="0" presId="urn:microsoft.com/office/officeart/2008/layout/SquareAccentList"/>
-    <dgm:cxn modelId="{94F1B5B2-61A2-400D-A8C6-E55B5540F793}" type="presOf" srcId="{B41D75AE-2A29-4277-8DBB-D5E9CED79C4D}" destId="{F0A18B1E-4B8C-49D0-A2C5-B72A0992791A}" srcOrd="0" destOrd="0" presId="urn:microsoft.com/office/officeart/2008/layout/SquareAccentList"/>
-    <dgm:cxn modelId="{22916866-A373-422E-8CBF-39C46B6193BE}" type="presOf" srcId="{B2A72572-DD94-49F3-9C74-F97F76DD77E8}" destId="{22C7BCBD-CEEE-4C3C-8575-8FCB6CDA438E}" srcOrd="0" destOrd="0" presId="urn:microsoft.com/office/officeart/2008/layout/SquareAccentList"/>
-    <dgm:cxn modelId="{925D1D41-F295-4BF5-8F35-6B0283EB1660}" srcId="{09E1FA74-CAD4-4D8F-8C9F-47DB10A12E4C}" destId="{B41D75AE-2A29-4277-8DBB-D5E9CED79C4D}" srcOrd="0" destOrd="0" parTransId="{E4BA2DF7-CD16-40C5-8D39-63D87AB06BAE}" sibTransId="{49219BB6-AF08-4355-8AAC-CB63EB613BD5}"/>
     <dgm:cxn modelId="{064285E3-34A1-4473-AFA2-984276405DD6}" type="presParOf" srcId="{2971BC93-77C3-4078-A105-8597E86CC05C}" destId="{1AE39575-5131-457E-87D9-250C20E4AF30}" srcOrd="0" destOrd="0" presId="urn:microsoft.com/office/officeart/2008/layout/SquareAccentList"/>
     <dgm:cxn modelId="{6FBA1FB6-3AEF-4196-91D5-1E807F540EF6}" type="presParOf" srcId="{1AE39575-5131-457E-87D9-250C20E4AF30}" destId="{118FBAA4-28AC-4EB8-89A4-219E83C3BCBE}" srcOrd="0" destOrd="0" presId="urn:microsoft.com/office/officeart/2008/layout/SquareAccentList"/>
     <dgm:cxn modelId="{C89C8E44-B260-4647-98D2-09067DCA96B7}" type="presParOf" srcId="{118FBAA4-28AC-4EB8-89A4-219E83C3BCBE}" destId="{78E90345-FE91-47A7-8E8D-7EC91F8F325D}" srcOrd="0" destOrd="0" presId="urn:microsoft.com/office/officeart/2008/layout/SquareAccentList"/>
@@ -6532,7 +6634,7 @@
   <dgm:whole/>
   <dgm:extLst>
     <a:ext uri="http://schemas.microsoft.com/office/drawing/2008/diagram">
-      <dsp:dataModelExt xmlns:dsp="http://schemas.microsoft.com/office/drawing/2008/diagram" relId="rId6" minVer="http://schemas.openxmlformats.org/drawingml/2006/diagram"/>
+      <dsp:dataModelExt xmlns:dsp="http://schemas.microsoft.com/office/drawing/2008/diagram" xmlns="" relId="rId6" minVer="http://schemas.openxmlformats.org/drawingml/2006/diagram"/>
     </a:ext>
   </dgm:extLst>
 </dgm:dataModel>
@@ -7305,30 +7407,30 @@
     </dgm:pt>
   </dgm:ptLst>
   <dgm:cxnLst>
-    <dgm:cxn modelId="{C9B3EE4E-01DF-4274-A896-B826614E44E8}" type="presOf" srcId="{1198010A-7CD9-47DF-8300-D5AB8FDF717B}" destId="{77351131-57DF-4AF2-A89D-95AF9C6149DC}" srcOrd="0" destOrd="1" presId="urn:microsoft.com/office/officeart/2005/8/layout/hProcess4"/>
+    <dgm:cxn modelId="{4696573D-7AAF-40C4-A299-E5634AF135CD}" type="presOf" srcId="{80BADE98-2C43-40D5-937A-874A1B627145}" destId="{388BBD37-9C2B-4172-8678-CDF3BB968BFB}" srcOrd="1" destOrd="0" presId="urn:microsoft.com/office/officeart/2005/8/layout/hProcess4"/>
+    <dgm:cxn modelId="{BF29565E-C27D-4C89-8F7E-C084E8C699E7}" srcId="{7DFE07BF-9A88-4152-9E58-09C9E20DB3CE}" destId="{1198010A-7CD9-47DF-8300-D5AB8FDF717B}" srcOrd="1" destOrd="0" parTransId="{67755E1A-2705-4297-9986-0E390CA27394}" sibTransId="{0231FB8D-A362-4F4A-8E56-6DAC699F1D6F}"/>
     <dgm:cxn modelId="{D8151DDD-A87C-4D2A-AE89-DC88BEAD8F5E}" type="presOf" srcId="{1198010A-7CD9-47DF-8300-D5AB8FDF717B}" destId="{CEA85225-BA33-4729-B542-7DD51242ADCB}" srcOrd="1" destOrd="1" presId="urn:microsoft.com/office/officeart/2005/8/layout/hProcess4"/>
-    <dgm:cxn modelId="{4696573D-7AAF-40C4-A299-E5634AF135CD}" type="presOf" srcId="{80BADE98-2C43-40D5-937A-874A1B627145}" destId="{388BBD37-9C2B-4172-8678-CDF3BB968BFB}" srcOrd="1" destOrd="0" presId="urn:microsoft.com/office/officeart/2005/8/layout/hProcess4"/>
-    <dgm:cxn modelId="{96F1515C-012C-4FBA-939B-73396FC64F01}" type="presOf" srcId="{7DFE07BF-9A88-4152-9E58-09C9E20DB3CE}" destId="{168FD8A5-9BA3-47FA-8D32-ED60BCA98D24}" srcOrd="0" destOrd="0" presId="urn:microsoft.com/office/officeart/2005/8/layout/hProcess4"/>
+    <dgm:cxn modelId="{C9D8935F-6C23-483A-8258-A9CABF3C76B0}" srcId="{4412B91F-CF8D-4A42-83DF-7CDCCDA80F7D}" destId="{3865D5FF-DA00-4906-B6F5-07C839464584}" srcOrd="1" destOrd="0" parTransId="{49FB8D0F-E70F-4A66-9F99-3E0F33864CA6}" sibTransId="{CFF97A55-CF3E-4E1D-AF04-5A3631D6CB6D}"/>
+    <dgm:cxn modelId="{A5D7F522-490D-4613-A205-B81A1D2FF7FB}" type="presOf" srcId="{F3A2DAB8-2AB9-419A-82D3-D743A16978C8}" destId="{301F9B7A-61FD-4D71-8D0E-DCB457B0DAC9}" srcOrd="0" destOrd="0" presId="urn:microsoft.com/office/officeart/2005/8/layout/hProcess4"/>
+    <dgm:cxn modelId="{CABFBE03-3760-43FE-A793-4570B6274A4D}" type="presOf" srcId="{2F3DF7DE-E5C9-4440-80D1-538313244BE6}" destId="{39B7AE1B-7006-4AD9-AFC0-AD9AB09ED28C}" srcOrd="1" destOrd="0" presId="urn:microsoft.com/office/officeart/2005/8/layout/hProcess4"/>
+    <dgm:cxn modelId="{E819844F-6C63-4A97-8468-0C16FFCB7637}" type="presOf" srcId="{2F3DF7DE-E5C9-4440-80D1-538313244BE6}" destId="{0C27C69B-3C82-4A7E-9AEC-146B678149A2}" srcOrd="0" destOrd="0" presId="urn:microsoft.com/office/officeart/2005/8/layout/hProcess4"/>
     <dgm:cxn modelId="{5CB851DE-B309-4D32-BF02-58D05478E534}" srcId="{7DFE07BF-9A88-4152-9E58-09C9E20DB3CE}" destId="{7F7E1F91-F6F4-48A9-B4FA-337B2EBD2C9A}" srcOrd="0" destOrd="0" parTransId="{0796D45F-4D57-413D-A4BB-33573B2F1CF3}" sibTransId="{0FC519C8-F4CD-4D2A-B852-2C233866BAF3}"/>
-    <dgm:cxn modelId="{BF29565E-C27D-4C89-8F7E-C084E8C699E7}" srcId="{7DFE07BF-9A88-4152-9E58-09C9E20DB3CE}" destId="{1198010A-7CD9-47DF-8300-D5AB8FDF717B}" srcOrd="1" destOrd="0" parTransId="{67755E1A-2705-4297-9986-0E390CA27394}" sibTransId="{0231FB8D-A362-4F4A-8E56-6DAC699F1D6F}"/>
-    <dgm:cxn modelId="{CABFBE03-3760-43FE-A793-4570B6274A4D}" type="presOf" srcId="{2F3DF7DE-E5C9-4440-80D1-538313244BE6}" destId="{39B7AE1B-7006-4AD9-AFC0-AD9AB09ED28C}" srcOrd="1" destOrd="0" presId="urn:microsoft.com/office/officeart/2005/8/layout/hProcess4"/>
+    <dgm:cxn modelId="{B4DEC388-DC62-483F-A05C-5555B345D4B2}" type="presOf" srcId="{7F7E1F91-F6F4-48A9-B4FA-337B2EBD2C9A}" destId="{77351131-57DF-4AF2-A89D-95AF9C6149DC}" srcOrd="0" destOrd="0" presId="urn:microsoft.com/office/officeart/2005/8/layout/hProcess4"/>
+    <dgm:cxn modelId="{9ED5A29A-4F56-4F4A-943D-8B8035CAB709}" type="presOf" srcId="{FFBB95A5-64CA-4277-8EC9-9A4877C06A11}" destId="{AE566E9F-D101-4F88-9692-208EF2AE8557}" srcOrd="0" destOrd="1" presId="urn:microsoft.com/office/officeart/2005/8/layout/hProcess4"/>
+    <dgm:cxn modelId="{286DB79C-095B-4A03-8241-456F11CF2F5D}" srcId="{F3A2DAB8-2AB9-419A-82D3-D743A16978C8}" destId="{FFBB95A5-64CA-4277-8EC9-9A4877C06A11}" srcOrd="1" destOrd="0" parTransId="{E5A1EA11-2B41-4DD3-8BF1-0CF84454CAE5}" sibTransId="{49EC4B80-42F4-4C68-8C02-F267FE81602E}"/>
+    <dgm:cxn modelId="{FCD6A96D-054B-4471-90ED-6EB5ED0EBFF9}" type="presOf" srcId="{CFF97A55-CF3E-4E1D-AF04-5A3631D6CB6D}" destId="{E5E8036A-476D-4F9C-9D7B-4ED08A33C842}" srcOrd="0" destOrd="0" presId="urn:microsoft.com/office/officeart/2005/8/layout/hProcess4"/>
     <dgm:cxn modelId="{C730B313-4D1D-4229-8314-A3150E0294B1}" type="presOf" srcId="{E68D9850-B3A4-4979-A4D0-E3D401A29AB5}" destId="{BB47B8A7-A69A-47BA-8429-499D75D98923}" srcOrd="0" destOrd="0" presId="urn:microsoft.com/office/officeart/2005/8/layout/hProcess4"/>
+    <dgm:cxn modelId="{076FA099-FCD5-4C11-8A08-746949589EB9}" type="presOf" srcId="{FFBB95A5-64CA-4277-8EC9-9A4877C06A11}" destId="{388BBD37-9C2B-4172-8678-CDF3BB968BFB}" srcOrd="1" destOrd="1" presId="urn:microsoft.com/office/officeart/2005/8/layout/hProcess4"/>
     <dgm:cxn modelId="{F52A89F1-D611-4436-8916-14DEFBEAC79D}" srcId="{4412B91F-CF8D-4A42-83DF-7CDCCDA80F7D}" destId="{7DFE07BF-9A88-4152-9E58-09C9E20DB3CE}" srcOrd="0" destOrd="0" parTransId="{F2C6A117-64F1-4ED9-9C2B-9510107D76CB}" sibTransId="{E68D9850-B3A4-4979-A4D0-E3D401A29AB5}"/>
-    <dgm:cxn modelId="{286DB79C-095B-4A03-8241-456F11CF2F5D}" srcId="{F3A2DAB8-2AB9-419A-82D3-D743A16978C8}" destId="{FFBB95A5-64CA-4277-8EC9-9A4877C06A11}" srcOrd="1" destOrd="0" parTransId="{E5A1EA11-2B41-4DD3-8BF1-0CF84454CAE5}" sibTransId="{49EC4B80-42F4-4C68-8C02-F267FE81602E}"/>
-    <dgm:cxn modelId="{9ED5A29A-4F56-4F4A-943D-8B8035CAB709}" type="presOf" srcId="{FFBB95A5-64CA-4277-8EC9-9A4877C06A11}" destId="{AE566E9F-D101-4F88-9692-208EF2AE8557}" srcOrd="0" destOrd="1" presId="urn:microsoft.com/office/officeart/2005/8/layout/hProcess4"/>
-    <dgm:cxn modelId="{B4DEC388-DC62-483F-A05C-5555B345D4B2}" type="presOf" srcId="{7F7E1F91-F6F4-48A9-B4FA-337B2EBD2C9A}" destId="{77351131-57DF-4AF2-A89D-95AF9C6149DC}" srcOrd="0" destOrd="0" presId="urn:microsoft.com/office/officeart/2005/8/layout/hProcess4"/>
-    <dgm:cxn modelId="{076FA099-FCD5-4C11-8A08-746949589EB9}" type="presOf" srcId="{FFBB95A5-64CA-4277-8EC9-9A4877C06A11}" destId="{388BBD37-9C2B-4172-8678-CDF3BB968BFB}" srcOrd="1" destOrd="1" presId="urn:microsoft.com/office/officeart/2005/8/layout/hProcess4"/>
     <dgm:cxn modelId="{FD321DDD-0FBF-4119-B35F-BF41A6D1FACA}" type="presOf" srcId="{80BADE98-2C43-40D5-937A-874A1B627145}" destId="{AE566E9F-D101-4F88-9692-208EF2AE8557}" srcOrd="0" destOrd="0" presId="urn:microsoft.com/office/officeart/2005/8/layout/hProcess4"/>
     <dgm:cxn modelId="{C03BE492-3E48-4B5B-B223-BD9B09A0499C}" type="presOf" srcId="{4412B91F-CF8D-4A42-83DF-7CDCCDA80F7D}" destId="{50C663CD-616C-44EE-98F1-BB5FDDDEDCC8}" srcOrd="0" destOrd="0" presId="urn:microsoft.com/office/officeart/2005/8/layout/hProcess4"/>
+    <dgm:cxn modelId="{4A7FA099-9464-4ACD-A790-6102C1584AD1}" srcId="{4412B91F-CF8D-4A42-83DF-7CDCCDA80F7D}" destId="{F3A2DAB8-2AB9-419A-82D3-D743A16978C8}" srcOrd="2" destOrd="0" parTransId="{62C15E06-9F1B-4472-A7B4-FEFADBC7E807}" sibTransId="{401344D0-ED0B-4340-9FCD-FF07FE375E6C}"/>
     <dgm:cxn modelId="{66AF1316-005D-4157-AB49-7D09464E8313}" type="presOf" srcId="{7F7E1F91-F6F4-48A9-B4FA-337B2EBD2C9A}" destId="{CEA85225-BA33-4729-B542-7DD51242ADCB}" srcOrd="1" destOrd="0" presId="urn:microsoft.com/office/officeart/2005/8/layout/hProcess4"/>
+    <dgm:cxn modelId="{D058A61E-2631-4792-87A9-3570D8D2DB0F}" srcId="{3865D5FF-DA00-4906-B6F5-07C839464584}" destId="{2F3DF7DE-E5C9-4440-80D1-538313244BE6}" srcOrd="0" destOrd="0" parTransId="{3C0BC7DD-F66C-4719-92AE-5E9E7825604D}" sibTransId="{4569B2FB-90CA-4536-9206-69C81C9FC0BD}"/>
     <dgm:cxn modelId="{F6F5BFB7-87A2-418B-8A67-5193C4B8B5C2}" type="presOf" srcId="{3865D5FF-DA00-4906-B6F5-07C839464584}" destId="{85BA2879-403E-43AC-A59E-A90A5FACC251}" srcOrd="0" destOrd="0" presId="urn:microsoft.com/office/officeart/2005/8/layout/hProcess4"/>
-    <dgm:cxn modelId="{D058A61E-2631-4792-87A9-3570D8D2DB0F}" srcId="{3865D5FF-DA00-4906-B6F5-07C839464584}" destId="{2F3DF7DE-E5C9-4440-80D1-538313244BE6}" srcOrd="0" destOrd="0" parTransId="{3C0BC7DD-F66C-4719-92AE-5E9E7825604D}" sibTransId="{4569B2FB-90CA-4536-9206-69C81C9FC0BD}"/>
+    <dgm:cxn modelId="{C9B3EE4E-01DF-4274-A896-B826614E44E8}" type="presOf" srcId="{1198010A-7CD9-47DF-8300-D5AB8FDF717B}" destId="{77351131-57DF-4AF2-A89D-95AF9C6149DC}" srcOrd="0" destOrd="1" presId="urn:microsoft.com/office/officeart/2005/8/layout/hProcess4"/>
+    <dgm:cxn modelId="{96F1515C-012C-4FBA-939B-73396FC64F01}" type="presOf" srcId="{7DFE07BF-9A88-4152-9E58-09C9E20DB3CE}" destId="{168FD8A5-9BA3-47FA-8D32-ED60BCA98D24}" srcOrd="0" destOrd="0" presId="urn:microsoft.com/office/officeart/2005/8/layout/hProcess4"/>
     <dgm:cxn modelId="{81BAC1B0-D183-4179-9A55-029F538E675D}" srcId="{F3A2DAB8-2AB9-419A-82D3-D743A16978C8}" destId="{80BADE98-2C43-40D5-937A-874A1B627145}" srcOrd="0" destOrd="0" parTransId="{61694F4E-3BB3-4806-8315-F9C9DE55D766}" sibTransId="{1B940CC1-D5C1-4465-A2E5-B629FA2D9A4E}"/>
-    <dgm:cxn modelId="{E819844F-6C63-4A97-8468-0C16FFCB7637}" type="presOf" srcId="{2F3DF7DE-E5C9-4440-80D1-538313244BE6}" destId="{0C27C69B-3C82-4A7E-9AEC-146B678149A2}" srcOrd="0" destOrd="0" presId="urn:microsoft.com/office/officeart/2005/8/layout/hProcess4"/>
-    <dgm:cxn modelId="{C9D8935F-6C23-483A-8258-A9CABF3C76B0}" srcId="{4412B91F-CF8D-4A42-83DF-7CDCCDA80F7D}" destId="{3865D5FF-DA00-4906-B6F5-07C839464584}" srcOrd="1" destOrd="0" parTransId="{49FB8D0F-E70F-4A66-9F99-3E0F33864CA6}" sibTransId="{CFF97A55-CF3E-4E1D-AF04-5A3631D6CB6D}"/>
-    <dgm:cxn modelId="{A5D7F522-490D-4613-A205-B81A1D2FF7FB}" type="presOf" srcId="{F3A2DAB8-2AB9-419A-82D3-D743A16978C8}" destId="{301F9B7A-61FD-4D71-8D0E-DCB457B0DAC9}" srcOrd="0" destOrd="0" presId="urn:microsoft.com/office/officeart/2005/8/layout/hProcess4"/>
-    <dgm:cxn modelId="{FCD6A96D-054B-4471-90ED-6EB5ED0EBFF9}" type="presOf" srcId="{CFF97A55-CF3E-4E1D-AF04-5A3631D6CB6D}" destId="{E5E8036A-476D-4F9C-9D7B-4ED08A33C842}" srcOrd="0" destOrd="0" presId="urn:microsoft.com/office/officeart/2005/8/layout/hProcess4"/>
-    <dgm:cxn modelId="{4A7FA099-9464-4ACD-A790-6102C1584AD1}" srcId="{4412B91F-CF8D-4A42-83DF-7CDCCDA80F7D}" destId="{F3A2DAB8-2AB9-419A-82D3-D743A16978C8}" srcOrd="2" destOrd="0" parTransId="{62C15E06-9F1B-4472-A7B4-FEFADBC7E807}" sibTransId="{401344D0-ED0B-4340-9FCD-FF07FE375E6C}"/>
     <dgm:cxn modelId="{DC8F0603-A30F-4881-8DB3-C28DAA5234EB}" type="presParOf" srcId="{50C663CD-616C-44EE-98F1-BB5FDDDEDCC8}" destId="{138CD9C0-127E-45DD-BA5D-F929D722FD16}" srcOrd="0" destOrd="0" presId="urn:microsoft.com/office/officeart/2005/8/layout/hProcess4"/>
     <dgm:cxn modelId="{5A02F5F5-BF03-478E-AB04-0CF1957AA6B2}" type="presParOf" srcId="{50C663CD-616C-44EE-98F1-BB5FDDDEDCC8}" destId="{EF0649EA-CFC7-443D-9E0B-71BBF1A268A7}" srcOrd="1" destOrd="0" presId="urn:microsoft.com/office/officeart/2005/8/layout/hProcess4"/>
     <dgm:cxn modelId="{28FB9728-D277-4EA0-9D1D-8BA739CBDE26}" type="presParOf" srcId="{50C663CD-616C-44EE-98F1-BB5FDDDEDCC8}" destId="{2FA38D1F-3777-488A-AF41-E467FA0BCCBE}" srcOrd="2" destOrd="0" presId="urn:microsoft.com/office/officeart/2005/8/layout/hProcess4"/>
@@ -7357,7 +7459,7 @@
   <dgm:whole/>
   <dgm:extLst>
     <a:ext uri="http://schemas.microsoft.com/office/drawing/2008/diagram">
-      <dsp:dataModelExt xmlns:dsp="http://schemas.microsoft.com/office/drawing/2008/diagram" relId="rId6" minVer="http://schemas.openxmlformats.org/drawingml/2006/diagram"/>
+      <dsp:dataModelExt xmlns:dsp="http://schemas.microsoft.com/office/drawing/2008/diagram" xmlns="" relId="rId6" minVer="http://schemas.openxmlformats.org/drawingml/2006/diagram"/>
     </a:ext>
   </dgm:extLst>
 </dgm:dataModel>
@@ -7795,29 +7897,29 @@
     </dgm:pt>
   </dgm:ptLst>
   <dgm:cxnLst>
-    <dgm:cxn modelId="{CFD51472-FE86-49A1-902F-BA2DC34B29F5}" type="presOf" srcId="{0F4EE5F8-CE65-4C01-BA1B-62373453CD4B}" destId="{FFC83820-1F59-4B99-B0E5-5EF505EF981A}" srcOrd="1" destOrd="0" presId="urn:microsoft.com/office/officeart/2005/8/layout/radial5"/>
     <dgm:cxn modelId="{7366D01B-7B1A-4F7E-8897-A92969695C89}" type="presOf" srcId="{88E727E9-53A4-4E95-A459-039A49E93B44}" destId="{BED8CFF9-57DF-415B-BFD2-F23237B98D78}" srcOrd="0" destOrd="0" presId="urn:microsoft.com/office/officeart/2005/8/layout/radial5"/>
-    <dgm:cxn modelId="{6E4D8FAC-DF79-4656-AACF-B63351959842}" type="presOf" srcId="{C9CB2A3C-AA8A-4C63-ADAF-BB4A990106BF}" destId="{D32B50BC-8F9A-4A06-941D-13004E7B3F17}" srcOrd="0" destOrd="0" presId="urn:microsoft.com/office/officeart/2005/8/layout/radial5"/>
-    <dgm:cxn modelId="{28AC89FC-11D9-4755-B886-3A3759AAC780}" type="presOf" srcId="{036DF210-BB24-491F-9B05-BED9EB97CCEA}" destId="{2BEFA425-F024-4BD4-B31D-0FB6C45896F7}" srcOrd="1" destOrd="0" presId="urn:microsoft.com/office/officeart/2005/8/layout/radial5"/>
-    <dgm:cxn modelId="{A2C98141-733B-400B-91DC-A4454889E5AA}" srcId="{9ADEF162-76FA-4A3C-8220-3CD2B3D3023E}" destId="{600CB5D7-2D85-4AF5-BB05-4A1B86521FA2}" srcOrd="1" destOrd="0" parTransId="{0F4EE5F8-CE65-4C01-BA1B-62373453CD4B}" sibTransId="{D8ED6D04-2132-4167-966C-2933CD0F8E51}"/>
+    <dgm:cxn modelId="{23207EC2-56B0-44E0-A6C7-84051896C37C}" type="presOf" srcId="{036DF210-BB24-491F-9B05-BED9EB97CCEA}" destId="{D858E594-9B1F-454E-812B-1D569755D339}" srcOrd="0" destOrd="0" presId="urn:microsoft.com/office/officeart/2005/8/layout/radial5"/>
+    <dgm:cxn modelId="{622C7C39-11F8-4758-9549-8841122B7ED2}" type="presOf" srcId="{31E1C8DB-A788-4C7C-8E35-369521C571A2}" destId="{4AE6AAFA-D59A-4F35-A5E8-C6D2EC6BBFF0}" srcOrd="0" destOrd="0" presId="urn:microsoft.com/office/officeart/2005/8/layout/radial5"/>
     <dgm:cxn modelId="{89D3A26C-01B0-47D3-9792-AD7AC1141C23}" type="presOf" srcId="{0F4EE5F8-CE65-4C01-BA1B-62373453CD4B}" destId="{9D95D45C-9B20-4A4E-AD6C-37161FDE50AF}" srcOrd="0" destOrd="0" presId="urn:microsoft.com/office/officeart/2005/8/layout/radial5"/>
-    <dgm:cxn modelId="{23207EC2-56B0-44E0-A6C7-84051896C37C}" type="presOf" srcId="{036DF210-BB24-491F-9B05-BED9EB97CCEA}" destId="{D858E594-9B1F-454E-812B-1D569755D339}" srcOrd="0" destOrd="0" presId="urn:microsoft.com/office/officeart/2005/8/layout/radial5"/>
-    <dgm:cxn modelId="{7442BC64-C27B-46B2-8FDA-C8CB7A69BB78}" type="presOf" srcId="{5CD5CAC8-AC56-4175-8B02-D9FDE7591724}" destId="{63B15D18-84CC-4B8C-A7B8-9D7C87C445EE}" srcOrd="1" destOrd="0" presId="urn:microsoft.com/office/officeart/2005/8/layout/radial5"/>
-    <dgm:cxn modelId="{4D528558-CCA4-4766-9340-8DBA49C0C449}" type="presOf" srcId="{E65E6258-30CC-439C-9E12-987FB207C0BA}" destId="{AE23CEE4-5E78-4BF2-A4EC-856A2ACE758E}" srcOrd="0" destOrd="0" presId="urn:microsoft.com/office/officeart/2005/8/layout/radial5"/>
-    <dgm:cxn modelId="{B760B6A1-7F60-4ADC-BA75-CB0BE4EEDB34}" type="presOf" srcId="{5CD5CAC8-AC56-4175-8B02-D9FDE7591724}" destId="{8F93543A-5059-4DE8-A2FC-A99D358C55C0}" srcOrd="0" destOrd="0" presId="urn:microsoft.com/office/officeart/2005/8/layout/radial5"/>
-    <dgm:cxn modelId="{A3234599-2A1F-4705-A7DB-C8EF644A84F6}" srcId="{9ADEF162-76FA-4A3C-8220-3CD2B3D3023E}" destId="{31E1C8DB-A788-4C7C-8E35-369521C571A2}" srcOrd="2" destOrd="0" parTransId="{5CD5CAC8-AC56-4175-8B02-D9FDE7591724}" sibTransId="{78634723-FA66-4AF5-9D17-D9106FB2D70F}"/>
-    <dgm:cxn modelId="{DB098DF9-4AC3-48C4-BC74-3A1AFF298A39}" srcId="{9ADEF162-76FA-4A3C-8220-3CD2B3D3023E}" destId="{597E7FEA-0A6D-4074-A2A0-EDBE84388C7A}" srcOrd="3" destOrd="0" parTransId="{C9CB2A3C-AA8A-4C63-ADAF-BB4A990106BF}" sibTransId="{78A577AF-6145-4A2C-8D9E-BB70A9BDA682}"/>
-    <dgm:cxn modelId="{E76B003B-3141-48DA-8297-E3AA243031E5}" type="presOf" srcId="{D4F2E4FB-49BF-4721-8707-3457AAE0EB88}" destId="{6A9D9649-AA51-48D6-B507-7AEDD979430C}" srcOrd="0" destOrd="0" presId="urn:microsoft.com/office/officeart/2005/8/layout/radial5"/>
-    <dgm:cxn modelId="{622C7C39-11F8-4758-9549-8841122B7ED2}" type="presOf" srcId="{31E1C8DB-A788-4C7C-8E35-369521C571A2}" destId="{4AE6AAFA-D59A-4F35-A5E8-C6D2EC6BBFF0}" srcOrd="0" destOrd="0" presId="urn:microsoft.com/office/officeart/2005/8/layout/radial5"/>
-    <dgm:cxn modelId="{CD189AED-CAFC-49C6-B708-4C84F713FF42}" type="presOf" srcId="{47D5C472-6F40-4426-8E86-BCB2F2BD330B}" destId="{E0159EA0-1A5D-476D-AD51-865243B2D714}" srcOrd="0" destOrd="0" presId="urn:microsoft.com/office/officeart/2005/8/layout/radial5"/>
-    <dgm:cxn modelId="{B7E99F65-BDD3-4DC8-BA59-474161888B08}" srcId="{9ADEF162-76FA-4A3C-8220-3CD2B3D3023E}" destId="{E65E6258-30CC-439C-9E12-987FB207C0BA}" srcOrd="4" destOrd="0" parTransId="{88E727E9-53A4-4E95-A459-039A49E93B44}" sibTransId="{C1A9E9C8-E1E8-41AC-8025-94E945EC2819}"/>
-    <dgm:cxn modelId="{F195A791-DD89-4913-8E1E-8DC4F82B6DC9}" srcId="{9ADEF162-76FA-4A3C-8220-3CD2B3D3023E}" destId="{47D5C472-6F40-4426-8E86-BCB2F2BD330B}" srcOrd="0" destOrd="0" parTransId="{036DF210-BB24-491F-9B05-BED9EB97CCEA}" sibTransId="{8F34451D-735F-4913-B0FC-D3B45BB4B61F}"/>
-    <dgm:cxn modelId="{0AB8AA39-130D-4082-8073-DCFF557B8490}" srcId="{D4F2E4FB-49BF-4721-8707-3457AAE0EB88}" destId="{9ADEF162-76FA-4A3C-8220-3CD2B3D3023E}" srcOrd="0" destOrd="0" parTransId="{70CEE8AE-1BA1-4498-BED4-2294652E694E}" sibTransId="{8D6656CE-2472-4600-8A8A-680BB044CFF5}"/>
-    <dgm:cxn modelId="{B6EF3246-0AA5-4CF3-8B72-C7979057E203}" type="presOf" srcId="{9ADEF162-76FA-4A3C-8220-3CD2B3D3023E}" destId="{18F2EB1D-555E-470E-B78B-9F32BC1302F0}" srcOrd="0" destOrd="0" presId="urn:microsoft.com/office/officeart/2005/8/layout/radial5"/>
-    <dgm:cxn modelId="{8F72D950-79DD-429B-81A7-418362F720F6}" type="presOf" srcId="{600CB5D7-2D85-4AF5-BB05-4A1B86521FA2}" destId="{892AB89D-9357-4946-A690-9AB770094366}" srcOrd="0" destOrd="0" presId="urn:microsoft.com/office/officeart/2005/8/layout/radial5"/>
     <dgm:cxn modelId="{20E80264-2731-447C-89A6-6EF6F3B07D7B}" type="presOf" srcId="{C9CB2A3C-AA8A-4C63-ADAF-BB4A990106BF}" destId="{DA7B04D8-8B81-4E5B-97E0-2DFA07EF08B4}" srcOrd="1" destOrd="0" presId="urn:microsoft.com/office/officeart/2005/8/layout/radial5"/>
     <dgm:cxn modelId="{742A00C4-D75C-4EB9-B6C7-8556F6BF3B40}" type="presOf" srcId="{88E727E9-53A4-4E95-A459-039A49E93B44}" destId="{30E14BBC-7822-4D38-BD74-0C71B2A3B30C}" srcOrd="1" destOrd="0" presId="urn:microsoft.com/office/officeart/2005/8/layout/radial5"/>
+    <dgm:cxn modelId="{A2C98141-733B-400B-91DC-A4454889E5AA}" srcId="{9ADEF162-76FA-4A3C-8220-3CD2B3D3023E}" destId="{600CB5D7-2D85-4AF5-BB05-4A1B86521FA2}" srcOrd="1" destOrd="0" parTransId="{0F4EE5F8-CE65-4C01-BA1B-62373453CD4B}" sibTransId="{D8ED6D04-2132-4167-966C-2933CD0F8E51}"/>
+    <dgm:cxn modelId="{0AB8AA39-130D-4082-8073-DCFF557B8490}" srcId="{D4F2E4FB-49BF-4721-8707-3457AAE0EB88}" destId="{9ADEF162-76FA-4A3C-8220-3CD2B3D3023E}" srcOrd="0" destOrd="0" parTransId="{70CEE8AE-1BA1-4498-BED4-2294652E694E}" sibTransId="{8D6656CE-2472-4600-8A8A-680BB044CFF5}"/>
+    <dgm:cxn modelId="{7442BC64-C27B-46B2-8FDA-C8CB7A69BB78}" type="presOf" srcId="{5CD5CAC8-AC56-4175-8B02-D9FDE7591724}" destId="{63B15D18-84CC-4B8C-A7B8-9D7C87C445EE}" srcOrd="1" destOrd="0" presId="urn:microsoft.com/office/officeart/2005/8/layout/radial5"/>
+    <dgm:cxn modelId="{A3234599-2A1F-4705-A7DB-C8EF644A84F6}" srcId="{9ADEF162-76FA-4A3C-8220-3CD2B3D3023E}" destId="{31E1C8DB-A788-4C7C-8E35-369521C571A2}" srcOrd="2" destOrd="0" parTransId="{5CD5CAC8-AC56-4175-8B02-D9FDE7591724}" sibTransId="{78634723-FA66-4AF5-9D17-D9106FB2D70F}"/>
+    <dgm:cxn modelId="{E76B003B-3141-48DA-8297-E3AA243031E5}" type="presOf" srcId="{D4F2E4FB-49BF-4721-8707-3457AAE0EB88}" destId="{6A9D9649-AA51-48D6-B507-7AEDD979430C}" srcOrd="0" destOrd="0" presId="urn:microsoft.com/office/officeart/2005/8/layout/radial5"/>
+    <dgm:cxn modelId="{4D528558-CCA4-4766-9340-8DBA49C0C449}" type="presOf" srcId="{E65E6258-30CC-439C-9E12-987FB207C0BA}" destId="{AE23CEE4-5E78-4BF2-A4EC-856A2ACE758E}" srcOrd="0" destOrd="0" presId="urn:microsoft.com/office/officeart/2005/8/layout/radial5"/>
+    <dgm:cxn modelId="{28AC89FC-11D9-4755-B886-3A3759AAC780}" type="presOf" srcId="{036DF210-BB24-491F-9B05-BED9EB97CCEA}" destId="{2BEFA425-F024-4BD4-B31D-0FB6C45896F7}" srcOrd="1" destOrd="0" presId="urn:microsoft.com/office/officeart/2005/8/layout/radial5"/>
+    <dgm:cxn modelId="{8F72D950-79DD-429B-81A7-418362F720F6}" type="presOf" srcId="{600CB5D7-2D85-4AF5-BB05-4A1B86521FA2}" destId="{892AB89D-9357-4946-A690-9AB770094366}" srcOrd="0" destOrd="0" presId="urn:microsoft.com/office/officeart/2005/8/layout/radial5"/>
+    <dgm:cxn modelId="{F195A791-DD89-4913-8E1E-8DC4F82B6DC9}" srcId="{9ADEF162-76FA-4A3C-8220-3CD2B3D3023E}" destId="{47D5C472-6F40-4426-8E86-BCB2F2BD330B}" srcOrd="0" destOrd="0" parTransId="{036DF210-BB24-491F-9B05-BED9EB97CCEA}" sibTransId="{8F34451D-735F-4913-B0FC-D3B45BB4B61F}"/>
+    <dgm:cxn modelId="{6E4D8FAC-DF79-4656-AACF-B63351959842}" type="presOf" srcId="{C9CB2A3C-AA8A-4C63-ADAF-BB4A990106BF}" destId="{D32B50BC-8F9A-4A06-941D-13004E7B3F17}" srcOrd="0" destOrd="0" presId="urn:microsoft.com/office/officeart/2005/8/layout/radial5"/>
+    <dgm:cxn modelId="{B6EF3246-0AA5-4CF3-8B72-C7979057E203}" type="presOf" srcId="{9ADEF162-76FA-4A3C-8220-3CD2B3D3023E}" destId="{18F2EB1D-555E-470E-B78B-9F32BC1302F0}" srcOrd="0" destOrd="0" presId="urn:microsoft.com/office/officeart/2005/8/layout/radial5"/>
+    <dgm:cxn modelId="{B760B6A1-7F60-4ADC-BA75-CB0BE4EEDB34}" type="presOf" srcId="{5CD5CAC8-AC56-4175-8B02-D9FDE7591724}" destId="{8F93543A-5059-4DE8-A2FC-A99D358C55C0}" srcOrd="0" destOrd="0" presId="urn:microsoft.com/office/officeart/2005/8/layout/radial5"/>
+    <dgm:cxn modelId="{DB098DF9-4AC3-48C4-BC74-3A1AFF298A39}" srcId="{9ADEF162-76FA-4A3C-8220-3CD2B3D3023E}" destId="{597E7FEA-0A6D-4074-A2A0-EDBE84388C7A}" srcOrd="3" destOrd="0" parTransId="{C9CB2A3C-AA8A-4C63-ADAF-BB4A990106BF}" sibTransId="{78A577AF-6145-4A2C-8D9E-BB70A9BDA682}"/>
+    <dgm:cxn modelId="{CD189AED-CAFC-49C6-B708-4C84F713FF42}" type="presOf" srcId="{47D5C472-6F40-4426-8E86-BCB2F2BD330B}" destId="{E0159EA0-1A5D-476D-AD51-865243B2D714}" srcOrd="0" destOrd="0" presId="urn:microsoft.com/office/officeart/2005/8/layout/radial5"/>
     <dgm:cxn modelId="{B076A0DE-C14B-4C8D-AC1B-44814383AFD4}" type="presOf" srcId="{597E7FEA-0A6D-4074-A2A0-EDBE84388C7A}" destId="{42C28B57-95B0-4561-B729-7C55DC80C4C3}" srcOrd="0" destOrd="0" presId="urn:microsoft.com/office/officeart/2005/8/layout/radial5"/>
+    <dgm:cxn modelId="{B7E99F65-BDD3-4DC8-BA59-474161888B08}" srcId="{9ADEF162-76FA-4A3C-8220-3CD2B3D3023E}" destId="{E65E6258-30CC-439C-9E12-987FB207C0BA}" srcOrd="4" destOrd="0" parTransId="{88E727E9-53A4-4E95-A459-039A49E93B44}" sibTransId="{C1A9E9C8-E1E8-41AC-8025-94E945EC2819}"/>
+    <dgm:cxn modelId="{CFD51472-FE86-49A1-902F-BA2DC34B29F5}" type="presOf" srcId="{0F4EE5F8-CE65-4C01-BA1B-62373453CD4B}" destId="{FFC83820-1F59-4B99-B0E5-5EF505EF981A}" srcOrd="1" destOrd="0" presId="urn:microsoft.com/office/officeart/2005/8/layout/radial5"/>
     <dgm:cxn modelId="{D491739B-54EC-489C-A1A7-1DBEF4DF8E38}" type="presParOf" srcId="{6A9D9649-AA51-48D6-B507-7AEDD979430C}" destId="{18F2EB1D-555E-470E-B78B-9F32BC1302F0}" srcOrd="0" destOrd="0" presId="urn:microsoft.com/office/officeart/2005/8/layout/radial5"/>
     <dgm:cxn modelId="{5AB7F0EB-EAF7-40B7-8C32-386285178AF5}" type="presParOf" srcId="{6A9D9649-AA51-48D6-B507-7AEDD979430C}" destId="{D858E594-9B1F-454E-812B-1D569755D339}" srcOrd="1" destOrd="0" presId="urn:microsoft.com/office/officeart/2005/8/layout/radial5"/>
     <dgm:cxn modelId="{5E5AB94B-B50E-481F-A3CF-F462EDC78FD1}" type="presParOf" srcId="{D858E594-9B1F-454E-812B-1D569755D339}" destId="{2BEFA425-F024-4BD4-B31D-0FB6C45896F7}" srcOrd="0" destOrd="0" presId="urn:microsoft.com/office/officeart/2005/8/layout/radial5"/>
@@ -7839,7 +7941,7 @@
   <dgm:whole/>
   <dgm:extLst>
     <a:ext uri="http://schemas.microsoft.com/office/drawing/2008/diagram">
-      <dsp:dataModelExt xmlns:dsp="http://schemas.microsoft.com/office/drawing/2008/diagram" relId="rId6" minVer="http://schemas.openxmlformats.org/drawingml/2006/diagram"/>
+      <dsp:dataModelExt xmlns:dsp="http://schemas.microsoft.com/office/drawing/2008/diagram" xmlns="" relId="rId6" minVer="http://schemas.openxmlformats.org/drawingml/2006/diagram"/>
     </a:ext>
   </dgm:extLst>
 </dgm:dataModel>
@@ -8785,25 +8887,25 @@
     </dgm:pt>
   </dgm:ptLst>
   <dgm:cxnLst>
+    <dgm:cxn modelId="{B7B87462-1DAB-4820-9D8D-39215A0FD83D}" srcId="{739AC528-84CD-4C4C-9AAA-944987E13663}" destId="{64726959-BFCF-468E-8583-201CF07ACAB4}" srcOrd="0" destOrd="0" parTransId="{1621746A-50DC-494D-BB5D-7D8ADC851307}" sibTransId="{8835803B-4868-4BFF-8B3A-814A6D4954C8}"/>
+    <dgm:cxn modelId="{7E93702C-2125-4942-BCFA-451032FA8C07}" type="presOf" srcId="{22558875-04DE-48A8-8D08-7DF713D16D36}" destId="{D78DBF14-3A29-4E42-B56E-7380E92A6552}" srcOrd="1" destOrd="0" presId="urn:microsoft.com/office/officeart/2005/8/layout/list1"/>
+    <dgm:cxn modelId="{BC163CB6-4CBD-44DB-AD17-AFC4FDDC684C}" type="presOf" srcId="{EBE94DE7-18A9-4985-A440-D262D93A6316}" destId="{62A2C154-6AB5-4321-A742-C06A0E020873}" srcOrd="0" destOrd="0" presId="urn:microsoft.com/office/officeart/2005/8/layout/list1"/>
+    <dgm:cxn modelId="{E7BB10A8-4E7A-44F2-865F-A7389730AEBC}" srcId="{739AC528-84CD-4C4C-9AAA-944987E13663}" destId="{B682214D-3E19-400B-B148-C04F02C27327}" srcOrd="4" destOrd="0" parTransId="{328229DF-DAE6-431B-9EB1-E273DFF5EA70}" sibTransId="{4037F445-FC2C-47AE-89AE-E418F2282E02}"/>
+    <dgm:cxn modelId="{4650B4FA-5E46-4507-BF35-61AB090D393E}" srcId="{739AC528-84CD-4C4C-9AAA-944987E13663}" destId="{22558875-04DE-48A8-8D08-7DF713D16D36}" srcOrd="2" destOrd="0" parTransId="{AEADCE07-7102-4416-8E67-31648F62FFBE}" sibTransId="{6C26663C-5E0F-469C-A84B-4E7D60C2ACED}"/>
+    <dgm:cxn modelId="{265C6533-7DF8-4BF6-8C28-3C782A037CF3}" type="presOf" srcId="{B682214D-3E19-400B-B148-C04F02C27327}" destId="{846A3F17-1641-4BB9-AC38-13C0E8AB7383}" srcOrd="0" destOrd="0" presId="urn:microsoft.com/office/officeart/2005/8/layout/list1"/>
+    <dgm:cxn modelId="{F9C7EEAC-7918-45CA-816F-B33C04B8B070}" srcId="{739AC528-84CD-4C4C-9AAA-944987E13663}" destId="{C0424938-EAAD-4AFD-89AA-F9DAA339B8CE}" srcOrd="3" destOrd="0" parTransId="{D85B5D0B-0237-4236-B15A-3AC15A4C8D6A}" sibTransId="{EBF62A40-6125-4DD5-8EDA-1F45E06B9030}"/>
+    <dgm:cxn modelId="{09CDA0F1-41AD-4AA3-BABC-AB3C68FE1F20}" type="presOf" srcId="{B682214D-3E19-400B-B148-C04F02C27327}" destId="{231A70AB-9760-4FFF-B875-5D31C52D60AE}" srcOrd="1" destOrd="0" presId="urn:microsoft.com/office/officeart/2005/8/layout/list1"/>
+    <dgm:cxn modelId="{1842B81B-6CE1-4E7A-B9A2-8AECFE2C9FD1}" type="presOf" srcId="{34E518D1-49BF-45FE-BD69-68CCC11C553D}" destId="{029B9D8C-4A77-4645-9520-CB1F079C0081}" srcOrd="1" destOrd="0" presId="urn:microsoft.com/office/officeart/2005/8/layout/list1"/>
+    <dgm:cxn modelId="{DC3681F8-CC97-4E15-8231-5EBA82EFEFD3}" type="presOf" srcId="{22558875-04DE-48A8-8D08-7DF713D16D36}" destId="{7CCD4125-60BB-4322-B726-7F91B5CDFF30}" srcOrd="0" destOrd="0" presId="urn:microsoft.com/office/officeart/2005/8/layout/list1"/>
     <dgm:cxn modelId="{D6B9F938-FD89-4765-A5F4-595BA2C69F68}" type="presOf" srcId="{34E518D1-49BF-45FE-BD69-68CCC11C553D}" destId="{390F44BF-71AC-4D9F-BF5E-075FA28FE010}" srcOrd="0" destOrd="0" presId="urn:microsoft.com/office/officeart/2005/8/layout/list1"/>
-    <dgm:cxn modelId="{98F30085-95A3-4899-83ED-263051B4121C}" srcId="{739AC528-84CD-4C4C-9AAA-944987E13663}" destId="{EBE94DE7-18A9-4985-A440-D262D93A6316}" srcOrd="1" destOrd="0" parTransId="{7151D90C-DDED-45CE-9D5D-F45918DF7AF3}" sibTransId="{11D717CD-56AA-45FC-9323-4DF14FDC4A6F}"/>
+    <dgm:cxn modelId="{08B77D2D-50A3-4665-B5BC-776198A4C49D}" type="presOf" srcId="{64726959-BFCF-468E-8583-201CF07ACAB4}" destId="{5CF09D25-445D-4024-9E09-27B9086F12C2}" srcOrd="0" destOrd="0" presId="urn:microsoft.com/office/officeart/2005/8/layout/list1"/>
     <dgm:cxn modelId="{492DC469-18AA-4F1C-B5CB-83AA42592B95}" srcId="{739AC528-84CD-4C4C-9AAA-944987E13663}" destId="{34E518D1-49BF-45FE-BD69-68CCC11C553D}" srcOrd="5" destOrd="0" parTransId="{6E148B5F-7DF9-4BF6-BE15-08EA16D770D4}" sibTransId="{23E81CB5-6F0A-42EB-ADC8-9150ECA984D5}"/>
+    <dgm:cxn modelId="{0E9F3CED-8870-48EB-AC03-616E89BB9C2E}" type="presOf" srcId="{64726959-BFCF-468E-8583-201CF07ACAB4}" destId="{B171C0C5-1265-474F-9A24-5267C4DEA6BB}" srcOrd="1" destOrd="0" presId="urn:microsoft.com/office/officeart/2005/8/layout/list1"/>
+    <dgm:cxn modelId="{E58C8AA9-859D-436C-829F-177A8BC2DA06}" type="presOf" srcId="{C0424938-EAAD-4AFD-89AA-F9DAA339B8CE}" destId="{6C17C5F1-150A-491F-92CE-A1BE931BB55D}" srcOrd="1" destOrd="0" presId="urn:microsoft.com/office/officeart/2005/8/layout/list1"/>
     <dgm:cxn modelId="{0E348F8C-122A-48CD-A8DB-40A9364F57F3}" type="presOf" srcId="{EBE94DE7-18A9-4985-A440-D262D93A6316}" destId="{9939078C-FCDB-4354-9260-A7140D211969}" srcOrd="1" destOrd="0" presId="urn:microsoft.com/office/officeart/2005/8/layout/list1"/>
     <dgm:cxn modelId="{917C61F7-4EFA-4F87-8A86-AA04AD093EB6}" type="presOf" srcId="{C0424938-EAAD-4AFD-89AA-F9DAA339B8CE}" destId="{3572EF4A-4D38-4BBD-9DE4-D188D70E2CAD}" srcOrd="0" destOrd="0" presId="urn:microsoft.com/office/officeart/2005/8/layout/list1"/>
-    <dgm:cxn modelId="{08B77D2D-50A3-4665-B5BC-776198A4C49D}" type="presOf" srcId="{64726959-BFCF-468E-8583-201CF07ACAB4}" destId="{5CF09D25-445D-4024-9E09-27B9086F12C2}" srcOrd="0" destOrd="0" presId="urn:microsoft.com/office/officeart/2005/8/layout/list1"/>
-    <dgm:cxn modelId="{E58C8AA9-859D-436C-829F-177A8BC2DA06}" type="presOf" srcId="{C0424938-EAAD-4AFD-89AA-F9DAA339B8CE}" destId="{6C17C5F1-150A-491F-92CE-A1BE931BB55D}" srcOrd="1" destOrd="0" presId="urn:microsoft.com/office/officeart/2005/8/layout/list1"/>
-    <dgm:cxn modelId="{B7B87462-1DAB-4820-9D8D-39215A0FD83D}" srcId="{739AC528-84CD-4C4C-9AAA-944987E13663}" destId="{64726959-BFCF-468E-8583-201CF07ACAB4}" srcOrd="0" destOrd="0" parTransId="{1621746A-50DC-494D-BB5D-7D8ADC851307}" sibTransId="{8835803B-4868-4BFF-8B3A-814A6D4954C8}"/>
-    <dgm:cxn modelId="{0E9F3CED-8870-48EB-AC03-616E89BB9C2E}" type="presOf" srcId="{64726959-BFCF-468E-8583-201CF07ACAB4}" destId="{B171C0C5-1265-474F-9A24-5267C4DEA6BB}" srcOrd="1" destOrd="0" presId="urn:microsoft.com/office/officeart/2005/8/layout/list1"/>
-    <dgm:cxn modelId="{E7BB10A8-4E7A-44F2-865F-A7389730AEBC}" srcId="{739AC528-84CD-4C4C-9AAA-944987E13663}" destId="{B682214D-3E19-400B-B148-C04F02C27327}" srcOrd="4" destOrd="0" parTransId="{328229DF-DAE6-431B-9EB1-E273DFF5EA70}" sibTransId="{4037F445-FC2C-47AE-89AE-E418F2282E02}"/>
-    <dgm:cxn modelId="{265C6533-7DF8-4BF6-8C28-3C782A037CF3}" type="presOf" srcId="{B682214D-3E19-400B-B148-C04F02C27327}" destId="{846A3F17-1641-4BB9-AC38-13C0E8AB7383}" srcOrd="0" destOrd="0" presId="urn:microsoft.com/office/officeart/2005/8/layout/list1"/>
-    <dgm:cxn modelId="{4650B4FA-5E46-4507-BF35-61AB090D393E}" srcId="{739AC528-84CD-4C4C-9AAA-944987E13663}" destId="{22558875-04DE-48A8-8D08-7DF713D16D36}" srcOrd="2" destOrd="0" parTransId="{AEADCE07-7102-4416-8E67-31648F62FFBE}" sibTransId="{6C26663C-5E0F-469C-A84B-4E7D60C2ACED}"/>
-    <dgm:cxn modelId="{F9C7EEAC-7918-45CA-816F-B33C04B8B070}" srcId="{739AC528-84CD-4C4C-9AAA-944987E13663}" destId="{C0424938-EAAD-4AFD-89AA-F9DAA339B8CE}" srcOrd="3" destOrd="0" parTransId="{D85B5D0B-0237-4236-B15A-3AC15A4C8D6A}" sibTransId="{EBF62A40-6125-4DD5-8EDA-1F45E06B9030}"/>
-    <dgm:cxn modelId="{09CDA0F1-41AD-4AA3-BABC-AB3C68FE1F20}" type="presOf" srcId="{B682214D-3E19-400B-B148-C04F02C27327}" destId="{231A70AB-9760-4FFF-B875-5D31C52D60AE}" srcOrd="1" destOrd="0" presId="urn:microsoft.com/office/officeart/2005/8/layout/list1"/>
+    <dgm:cxn modelId="{98F30085-95A3-4899-83ED-263051B4121C}" srcId="{739AC528-84CD-4C4C-9AAA-944987E13663}" destId="{EBE94DE7-18A9-4985-A440-D262D93A6316}" srcOrd="1" destOrd="0" parTransId="{7151D90C-DDED-45CE-9D5D-F45918DF7AF3}" sibTransId="{11D717CD-56AA-45FC-9323-4DF14FDC4A6F}"/>
     <dgm:cxn modelId="{81B323AF-A255-4CEA-BAE8-041C43CF3A80}" type="presOf" srcId="{739AC528-84CD-4C4C-9AAA-944987E13663}" destId="{5C305753-02C2-4005-B25D-F75DD4B08137}" srcOrd="0" destOrd="0" presId="urn:microsoft.com/office/officeart/2005/8/layout/list1"/>
-    <dgm:cxn modelId="{7E93702C-2125-4942-BCFA-451032FA8C07}" type="presOf" srcId="{22558875-04DE-48A8-8D08-7DF713D16D36}" destId="{D78DBF14-3A29-4E42-B56E-7380E92A6552}" srcOrd="1" destOrd="0" presId="urn:microsoft.com/office/officeart/2005/8/layout/list1"/>
-    <dgm:cxn modelId="{1842B81B-6CE1-4E7A-B9A2-8AECFE2C9FD1}" type="presOf" srcId="{34E518D1-49BF-45FE-BD69-68CCC11C553D}" destId="{029B9D8C-4A77-4645-9520-CB1F079C0081}" srcOrd="1" destOrd="0" presId="urn:microsoft.com/office/officeart/2005/8/layout/list1"/>
-    <dgm:cxn modelId="{DC3681F8-CC97-4E15-8231-5EBA82EFEFD3}" type="presOf" srcId="{22558875-04DE-48A8-8D08-7DF713D16D36}" destId="{7CCD4125-60BB-4322-B726-7F91B5CDFF30}" srcOrd="0" destOrd="0" presId="urn:microsoft.com/office/officeart/2005/8/layout/list1"/>
-    <dgm:cxn modelId="{BC163CB6-4CBD-44DB-AD17-AFC4FDDC684C}" type="presOf" srcId="{EBE94DE7-18A9-4985-A440-D262D93A6316}" destId="{62A2C154-6AB5-4321-A742-C06A0E020873}" srcOrd="0" destOrd="0" presId="urn:microsoft.com/office/officeart/2005/8/layout/list1"/>
     <dgm:cxn modelId="{5CEE8E5E-6F76-4967-8862-364C72A0F09D}" type="presParOf" srcId="{5C305753-02C2-4005-B25D-F75DD4B08137}" destId="{B34D6D7E-5F2E-4AC9-BD73-0DDE9F8BB618}" srcOrd="0" destOrd="0" presId="urn:microsoft.com/office/officeart/2005/8/layout/list1"/>
     <dgm:cxn modelId="{49AB42FC-D96F-419C-AA12-35C9654D957E}" type="presParOf" srcId="{B34D6D7E-5F2E-4AC9-BD73-0DDE9F8BB618}" destId="{5CF09D25-445D-4024-9E09-27B9086F12C2}" srcOrd="0" destOrd="0" presId="urn:microsoft.com/office/officeart/2005/8/layout/list1"/>
     <dgm:cxn modelId="{16B0EBB0-1939-4496-898C-63BE915DB1B6}" type="presParOf" srcId="{B34D6D7E-5F2E-4AC9-BD73-0DDE9F8BB618}" destId="{B171C0C5-1265-474F-9A24-5267C4DEA6BB}" srcOrd="1" destOrd="0" presId="urn:microsoft.com/office/officeart/2005/8/layout/list1"/>
@@ -8844,14 +8946,14 @@
   <dgm:whole/>
   <dgm:extLst>
     <a:ext uri="http://schemas.microsoft.com/office/drawing/2008/diagram">
-      <dsp:dataModelExt xmlns:dsp="http://schemas.microsoft.com/office/drawing/2008/diagram" relId="rId6" minVer="http://schemas.openxmlformats.org/drawingml/2006/diagram"/>
+      <dsp:dataModelExt xmlns:dsp="http://schemas.microsoft.com/office/drawing/2008/diagram" xmlns="" relId="rId6" minVer="http://schemas.openxmlformats.org/drawingml/2006/diagram"/>
     </a:ext>
   </dgm:extLst>
 </dgm:dataModel>
 </file>
 
 <file path=ppt/diagrams/drawing1.xml><?xml version="1.0" encoding="utf-8"?>
-<dsp:drawing xmlns:dgm="http://schemas.openxmlformats.org/drawingml/2006/diagram" xmlns:dsp="http://schemas.microsoft.com/office/drawing/2008/diagram" xmlns:a="http://schemas.openxmlformats.org/drawingml/2006/main">
+<dsp:drawing xmlns:dgm="http://schemas.openxmlformats.org/drawingml/2006/diagram" xmlns:a="http://schemas.openxmlformats.org/drawingml/2006/main" xmlns:dsp="http://schemas.microsoft.com/office/drawing/2008/diagram">
   <dsp:spTree>
     <dsp:nvGrpSpPr>
       <dsp:cNvPr id="0" name=""/>
@@ -8985,9 +9087,9 @@
           <a:endParaRPr lang="pt-BR" sz="1600" kern="1200" dirty="0"/>
         </a:p>
       </dsp:txBody>
-      <dsp:txXfrm rot="-5400000">
-        <a:off x="3127248" y="153763"/>
-        <a:ext cx="5517004" cy="786505"/>
+      <dsp:txXfrm rot="5400000">
+        <a:off x="5471223" y="-2232760"/>
+        <a:ext cx="871601" cy="5559552"/>
       </dsp:txXfrm>
     </dsp:sp>
     <dsp:sp modelId="{83285697-B771-41E8-BF80-D6B7B2E260A7}">
@@ -9140,8 +9242,8 @@
         </a:p>
       </dsp:txBody>
       <dsp:txXfrm>
-        <a:off x="53185" y="53185"/>
-        <a:ext cx="3020878" cy="983131"/>
+        <a:off x="0" y="0"/>
+        <a:ext cx="3127248" cy="1089501"/>
       </dsp:txXfrm>
     </dsp:sp>
     <dsp:sp modelId="{76D300D9-3977-4D02-95E9-3905CCACBD1B}">
@@ -9229,9 +9331,9 @@
           <a:endParaRPr lang="pt-BR" sz="1600" kern="1200" dirty="0"/>
         </a:p>
       </dsp:txBody>
-      <dsp:txXfrm rot="-5400000">
-        <a:off x="3127248" y="1297740"/>
-        <a:ext cx="5517004" cy="786505"/>
+      <dsp:txXfrm rot="5400000">
+        <a:off x="5471223" y="-1088783"/>
+        <a:ext cx="871601" cy="5559552"/>
       </dsp:txXfrm>
     </dsp:sp>
     <dsp:sp modelId="{1C4CF5AE-B0A9-4E79-99D0-8192DD361FD5}">
@@ -9384,8 +9486,8 @@
         </a:p>
       </dsp:txBody>
       <dsp:txXfrm>
-        <a:off x="53185" y="1199426"/>
-        <a:ext cx="3020878" cy="983131"/>
+        <a:off x="0" y="1146241"/>
+        <a:ext cx="3127248" cy="1089501"/>
       </dsp:txXfrm>
     </dsp:sp>
     <dsp:sp modelId="{7991AEF3-84F5-4F2F-9A87-D93011516A86}">
@@ -9481,9 +9583,9 @@
           <a:endParaRPr lang="pt-BR" sz="1600" kern="1200" dirty="0"/>
         </a:p>
       </dsp:txBody>
-      <dsp:txXfrm rot="-5400000">
-        <a:off x="3127248" y="2441716"/>
-        <a:ext cx="5517004" cy="786505"/>
+      <dsp:txXfrm rot="5400000">
+        <a:off x="5471223" y="55193"/>
+        <a:ext cx="871601" cy="5559552"/>
       </dsp:txXfrm>
     </dsp:sp>
     <dsp:sp modelId="{DE3A8CA3-F5E7-47D6-9409-0DAEFC3883C5}">
@@ -9636,8 +9738,8 @@
         </a:p>
       </dsp:txBody>
       <dsp:txXfrm>
-        <a:off x="53185" y="2343403"/>
-        <a:ext cx="3020878" cy="983131"/>
+        <a:off x="0" y="2290218"/>
+        <a:ext cx="3127248" cy="1089501"/>
       </dsp:txXfrm>
     </dsp:sp>
     <dsp:sp modelId="{232E8D04-E732-492E-A284-139D99DFE02C}">
@@ -9729,9 +9831,9 @@
           <a:endParaRPr lang="pt-BR" sz="1600" kern="1200" dirty="0"/>
         </a:p>
       </dsp:txBody>
-      <dsp:txXfrm rot="-5400000">
-        <a:off x="3127248" y="3585693"/>
-        <a:ext cx="5517004" cy="786505"/>
+      <dsp:txXfrm rot="5400000">
+        <a:off x="5471223" y="1199170"/>
+        <a:ext cx="871601" cy="5559552"/>
       </dsp:txXfrm>
     </dsp:sp>
     <dsp:sp modelId="{F985ABD3-DA1F-4E90-952D-1C16820F198E}">
@@ -9884,8 +9986,8 @@
         </a:p>
       </dsp:txBody>
       <dsp:txXfrm>
-        <a:off x="53185" y="3487380"/>
-        <a:ext cx="3020878" cy="983131"/>
+        <a:off x="0" y="3434195"/>
+        <a:ext cx="3127248" cy="1089501"/>
       </dsp:txXfrm>
     </dsp:sp>
   </dsp:spTree>
@@ -9893,7 +9995,7 @@
 </file>
 
 <file path=ppt/diagrams/drawing2.xml><?xml version="1.0" encoding="utf-8"?>
-<dsp:drawing xmlns:dgm="http://schemas.openxmlformats.org/drawingml/2006/diagram" xmlns:dsp="http://schemas.microsoft.com/office/drawing/2008/diagram" xmlns:a="http://schemas.openxmlformats.org/drawingml/2006/main">
+<dsp:drawing xmlns:dgm="http://schemas.openxmlformats.org/drawingml/2006/diagram" xmlns:a="http://schemas.openxmlformats.org/drawingml/2006/main" xmlns:dsp="http://schemas.microsoft.com/office/drawing/2008/diagram">
   <dsp:spTree>
     <dsp:nvGrpSpPr>
       <dsp:cNvPr id="0" name=""/>
@@ -10005,12 +10107,12 @@
         </a:fontRef>
       </dsp:style>
       <dsp:txBody>
-        <a:bodyPr spcFirstLastPara="0" vert="horz" wrap="square" lIns="113792" tIns="113792" rIns="113792" bIns="60960" numCol="1" spcCol="1270" anchor="t" anchorCtr="0">
+        <a:bodyPr spcFirstLastPara="0" vert="horz" wrap="square" lIns="170688" tIns="170688" rIns="170688" bIns="91440" numCol="1" spcCol="1270" anchor="t" anchorCtr="0">
           <a:noAutofit/>
         </a:bodyPr>
         <a:lstStyle/>
         <a:p>
-          <a:pPr lvl="0" algn="l" defTabSz="711200">
+          <a:pPr lvl="0" algn="l" defTabSz="1066800">
             <a:lnSpc>
               <a:spcPct val="90000"/>
             </a:lnSpc>
@@ -10022,10 +10124,10 @@
             </a:spcAft>
           </a:pPr>
           <a:r>
-            <a:rPr lang="pt-BR" sz="1600" b="1" kern="1200" dirty="0" smtClean="0"/>
-            <a:t>Sem software local </a:t>
+            <a:rPr lang="pt-BR" sz="2400" b="1" kern="1200" dirty="0" smtClean="0"/>
+            <a:t>Interligar </a:t>
           </a:r>
-          <a:endParaRPr lang="pt-BR" sz="1600" b="1" kern="1200" dirty="0"/>
+          <a:endParaRPr lang="pt-BR" sz="2400" b="1" kern="1200" dirty="0"/>
         </a:p>
       </dsp:txBody>
       <dsp:txXfrm>
@@ -10074,12 +10176,12 @@
         </a:fontRef>
       </dsp:style>
       <dsp:txBody>
-        <a:bodyPr spcFirstLastPara="0" vert="horz" wrap="square" lIns="99568" tIns="99568" rIns="99568" bIns="99568" numCol="1" spcCol="1270" anchor="t" anchorCtr="0">
+        <a:bodyPr spcFirstLastPara="0" vert="horz" wrap="square" lIns="128016" tIns="128016" rIns="128016" bIns="128016" numCol="1" spcCol="1270" anchor="t" anchorCtr="0">
           <a:noAutofit/>
         </a:bodyPr>
         <a:lstStyle/>
         <a:p>
-          <a:pPr marL="114300" lvl="1" indent="-114300" algn="l" defTabSz="622300">
+          <a:pPr marL="171450" lvl="1" indent="-171450" algn="l" defTabSz="800100">
             <a:lnSpc>
               <a:spcPct val="90000"/>
             </a:lnSpc>
@@ -10092,15 +10194,30 @@
             <a:buChar char="••"/>
           </a:pPr>
           <a:r>
-            <a:rPr lang="pt-BR" sz="1400" b="1" kern="1200" dirty="0" smtClean="0"/>
-            <a:t>?</a:t>
+            <a:rPr lang="pt-BR" sz="1800" b="1" kern="1200" dirty="0" smtClean="0"/>
+            <a:t>Pastorais</a:t>
           </a:r>
-          <a:endParaRPr lang="pt-BR" sz="1400" b="1" kern="1200" dirty="0"/>
+          <a:endParaRPr lang="pt-BR" sz="1800" b="1" kern="1200" dirty="0"/>
+        </a:p>
+        <a:p>
+          <a:pPr marL="171450" lvl="1" indent="-171450" algn="l" defTabSz="800100">
+            <a:lnSpc>
+              <a:spcPct val="90000"/>
+            </a:lnSpc>
+            <a:spcBef>
+              <a:spcPct val="0"/>
+            </a:spcBef>
+            <a:spcAft>
+              <a:spcPct val="15000"/>
+            </a:spcAft>
+            <a:buChar char="••"/>
+          </a:pPr>
+          <a:endParaRPr lang="pt-BR" sz="1800" b="1" kern="1200" dirty="0"/>
         </a:p>
       </dsp:txBody>
       <dsp:txXfrm>
-        <a:off x="464215" y="870209"/>
-        <a:ext cx="1849381" cy="3571326"/>
+        <a:off x="406678" y="812672"/>
+        <a:ext cx="1964455" cy="3686400"/>
       </dsp:txXfrm>
     </dsp:sp>
     <dsp:sp modelId="{330F8E89-32DF-4BC4-AED2-91D2D7CB94C5}">
@@ -10229,8 +10346,8 @@
         </a:p>
       </dsp:txBody>
       <dsp:txXfrm>
-        <a:off x="2266580" y="273052"/>
-        <a:ext cx="484617" cy="293456"/>
+        <a:off x="2266580" y="175234"/>
+        <a:ext cx="631345" cy="489092"/>
       </dsp:txXfrm>
     </dsp:sp>
     <dsp:sp modelId="{D6C82472-F7A1-44F8-BE16-C0E2E40E0D6B}">
@@ -10338,12 +10455,12 @@
         </a:fontRef>
       </dsp:style>
       <dsp:txBody>
-        <a:bodyPr spcFirstLastPara="0" vert="horz" wrap="square" lIns="113792" tIns="113792" rIns="113792" bIns="60960" numCol="1" spcCol="1270" anchor="t" anchorCtr="0">
+        <a:bodyPr spcFirstLastPara="0" vert="horz" wrap="square" lIns="170688" tIns="170688" rIns="170688" bIns="91440" numCol="1" spcCol="1270" anchor="t" anchorCtr="0">
           <a:noAutofit/>
         </a:bodyPr>
         <a:lstStyle/>
         <a:p>
-          <a:pPr lvl="0" algn="l" defTabSz="711200">
+          <a:pPr lvl="0" algn="l" defTabSz="1066800">
             <a:lnSpc>
               <a:spcPct val="90000"/>
             </a:lnSpc>
@@ -10355,10 +10472,10 @@
             </a:spcAft>
           </a:pPr>
           <a:r>
-            <a:rPr lang="pt-BR" sz="1600" b="1" kern="1200" dirty="0" smtClean="0"/>
-            <a:t>Mobilidade</a:t>
+            <a:rPr lang="pt-BR" sz="2400" b="1" kern="1200" dirty="0" smtClean="0"/>
+            <a:t>Padronizar</a:t>
           </a:r>
-          <a:endParaRPr lang="pt-BR" sz="1600" b="1" kern="1200" dirty="0"/>
+          <a:endParaRPr lang="pt-BR" sz="2400" b="1" kern="1200" dirty="0"/>
         </a:p>
       </dsp:txBody>
       <dsp:txXfrm>
@@ -10407,12 +10524,12 @@
         </a:fontRef>
       </dsp:style>
       <dsp:txBody>
-        <a:bodyPr spcFirstLastPara="0" vert="horz" wrap="square" lIns="99568" tIns="99568" rIns="99568" bIns="99568" numCol="1" spcCol="1270" anchor="t" anchorCtr="0">
+        <a:bodyPr spcFirstLastPara="0" vert="horz" wrap="square" lIns="128016" tIns="128016" rIns="128016" bIns="128016" numCol="1" spcCol="1270" anchor="t" anchorCtr="0">
           <a:noAutofit/>
         </a:bodyPr>
         <a:lstStyle/>
         <a:p>
-          <a:pPr marL="114300" lvl="1" indent="-114300" algn="l" defTabSz="622300">
+          <a:pPr marL="171450" lvl="1" indent="-171450" algn="l" defTabSz="800100">
             <a:lnSpc>
               <a:spcPct val="90000"/>
             </a:lnSpc>
@@ -10425,15 +10542,15 @@
             <a:buChar char="••"/>
           </a:pPr>
           <a:r>
-            <a:rPr lang="pt-BR" sz="1400" b="1" kern="1200" dirty="0" smtClean="0"/>
+            <a:rPr lang="pt-BR" sz="1800" b="1" kern="1200" dirty="0" smtClean="0"/>
             <a:t>?</a:t>
           </a:r>
-          <a:endParaRPr lang="pt-BR" sz="1400" b="1" kern="1200" dirty="0"/>
+          <a:endParaRPr lang="pt-BR" sz="1800" b="1" kern="1200" dirty="0"/>
         </a:p>
       </dsp:txBody>
       <dsp:txXfrm>
-        <a:off x="3619888" y="870209"/>
-        <a:ext cx="1849381" cy="3571326"/>
+        <a:off x="3562351" y="812672"/>
+        <a:ext cx="1964455" cy="3686400"/>
       </dsp:txXfrm>
     </dsp:sp>
     <dsp:sp modelId="{1390A124-BEDA-4A49-9B1B-0ED2FB571A6C}">
@@ -10562,8 +10679,8 @@
         </a:p>
       </dsp:txBody>
       <dsp:txXfrm>
-        <a:off x="5422252" y="273052"/>
-        <a:ext cx="484617" cy="293456"/>
+        <a:off x="5422252" y="175234"/>
+        <a:ext cx="631345" cy="489092"/>
       </dsp:txXfrm>
     </dsp:sp>
     <dsp:sp modelId="{944B484B-F688-4CFA-A4FB-08B237CA5903}">
@@ -10671,12 +10788,12 @@
         </a:fontRef>
       </dsp:style>
       <dsp:txBody>
-        <a:bodyPr spcFirstLastPara="0" vert="horz" wrap="square" lIns="113792" tIns="113792" rIns="113792" bIns="60960" numCol="1" spcCol="1270" anchor="t" anchorCtr="0">
+        <a:bodyPr spcFirstLastPara="0" vert="horz" wrap="square" lIns="170688" tIns="170688" rIns="170688" bIns="91440" numCol="1" spcCol="1270" anchor="t" anchorCtr="0">
           <a:noAutofit/>
         </a:bodyPr>
         <a:lstStyle/>
         <a:p>
-          <a:pPr lvl="0" algn="l" defTabSz="711200">
+          <a:pPr lvl="0" algn="l" defTabSz="1066800">
             <a:lnSpc>
               <a:spcPct val="90000"/>
             </a:lnSpc>
@@ -10688,10 +10805,10 @@
             </a:spcAft>
           </a:pPr>
           <a:r>
-            <a:rPr lang="pt-BR" sz="1600" b="1" kern="1200" dirty="0" smtClean="0"/>
-            <a:t>Recursos locais</a:t>
+            <a:rPr lang="pt-BR" sz="2400" b="1" kern="1200" dirty="0" smtClean="0"/>
+            <a:t>Facilitar</a:t>
           </a:r>
-          <a:endParaRPr lang="pt-BR" sz="1600" b="1" kern="1200" dirty="0"/>
+          <a:endParaRPr lang="pt-BR" sz="2400" b="1" kern="1200" dirty="0"/>
         </a:p>
       </dsp:txBody>
       <dsp:txXfrm>
@@ -10765,8 +10882,8 @@
         </a:p>
       </dsp:txBody>
       <dsp:txXfrm>
-        <a:off x="6775561" y="870209"/>
-        <a:ext cx="1849381" cy="3571326"/>
+        <a:off x="6718024" y="812672"/>
+        <a:ext cx="1964455" cy="3686400"/>
       </dsp:txXfrm>
     </dsp:sp>
   </dsp:spTree>
@@ -10774,7 +10891,7 @@
 </file>
 
 <file path=ppt/diagrams/drawing3.xml><?xml version="1.0" encoding="utf-8"?>
-<dsp:drawing xmlns:dgm="http://schemas.openxmlformats.org/drawingml/2006/diagram" xmlns:dsp="http://schemas.microsoft.com/office/drawing/2008/diagram" xmlns:a="http://schemas.openxmlformats.org/drawingml/2006/main">
+<dsp:drawing xmlns:dgm="http://schemas.openxmlformats.org/drawingml/2006/diagram" xmlns:a="http://schemas.openxmlformats.org/drawingml/2006/main" xmlns:dsp="http://schemas.microsoft.com/office/drawing/2008/diagram">
   <dsp:spTree>
     <dsp:nvGrpSpPr>
       <dsp:cNvPr id="0" name=""/>
@@ -10926,7 +11043,7 @@
               <a:spcPct val="35000"/>
             </a:spcAft>
           </a:pPr>
-          <a:endParaRPr lang="pt-BR" sz="5700" kern="1200"/>
+          <a:endParaRPr lang="pt-BR" sz="5700" kern="1200" dirty="0"/>
         </a:p>
       </dsp:txBody>
       <dsp:txXfrm>
@@ -11491,7 +11608,7 @@
               <a:spcPct val="35000"/>
             </a:spcAft>
           </a:pPr>
-          <a:endParaRPr lang="pt-BR" sz="2600" kern="1200"/>
+          <a:endParaRPr lang="pt-BR" sz="2600" kern="1200" dirty="0"/>
         </a:p>
       </dsp:txBody>
       <dsp:txXfrm>
@@ -11710,7 +11827,7 @@
 </file>
 
 <file path=ppt/diagrams/drawing4.xml><?xml version="1.0" encoding="utf-8"?>
-<dsp:drawing xmlns:dgm="http://schemas.openxmlformats.org/drawingml/2006/diagram" xmlns:dsp="http://schemas.microsoft.com/office/drawing/2008/diagram" xmlns:a="http://schemas.openxmlformats.org/drawingml/2006/main">
+<dsp:drawing xmlns:dgm="http://schemas.openxmlformats.org/drawingml/2006/diagram" xmlns:a="http://schemas.openxmlformats.org/drawingml/2006/main" xmlns:dsp="http://schemas.microsoft.com/office/drawing/2008/diagram">
   <dsp:spTree>
     <dsp:nvGrpSpPr>
       <dsp:cNvPr id="0" name=""/>
@@ -11873,8 +11990,8 @@
         </a:p>
       </dsp:txBody>
       <dsp:txXfrm>
-        <a:off x="39060" y="1530890"/>
-        <a:ext cx="2303089" cy="1135290"/>
+        <a:off x="3739" y="1495569"/>
+        <a:ext cx="2373731" cy="1205932"/>
       </dsp:txXfrm>
     </dsp:sp>
     <dsp:sp modelId="{BB47B8A7-A69A-47BA-8429-499D75D98923}">
@@ -12134,8 +12251,8 @@
         </a:p>
       </dsp:txBody>
       <dsp:txXfrm>
-        <a:off x="470048" y="957997"/>
-        <a:ext cx="2071451" cy="619249"/>
+        <a:off x="450782" y="938731"/>
+        <a:ext cx="2109983" cy="657781"/>
       </dsp:txXfrm>
     </dsp:sp>
     <dsp:sp modelId="{0C27C69B-3C82-4A7E-9AEC-146B678149A2}">
@@ -12273,8 +12390,8 @@
         </a:p>
       </dsp:txBody>
       <dsp:txXfrm>
-        <a:off x="3059981" y="1859781"/>
-        <a:ext cx="2303089" cy="1135290"/>
+        <a:off x="3024660" y="1824460"/>
+        <a:ext cx="2373731" cy="1205932"/>
       </dsp:txXfrm>
     </dsp:sp>
     <dsp:sp modelId="{E5E8036A-476D-4F9C-9D7B-4ED08A33C842}">
@@ -12540,8 +12657,8 @@
         </a:p>
       </dsp:txBody>
       <dsp:txXfrm>
-        <a:off x="3494386" y="958002"/>
-        <a:ext cx="2071451" cy="619249"/>
+        <a:off x="3475120" y="938736"/>
+        <a:ext cx="2109983" cy="657781"/>
       </dsp:txXfrm>
     </dsp:sp>
     <dsp:sp modelId="{AE566E9F-D101-4F88-9692-208EF2AE8557}">
@@ -12700,8 +12817,8 @@
         </a:p>
       </dsp:txBody>
       <dsp:txXfrm>
-        <a:off x="6080901" y="1530890"/>
-        <a:ext cx="2303089" cy="1135290"/>
+        <a:off x="6045580" y="1495569"/>
+        <a:ext cx="2373731" cy="1205932"/>
       </dsp:txXfrm>
     </dsp:sp>
     <dsp:sp modelId="{301F9B7A-61FD-4D71-8D0E-DCB457B0DAC9}">
@@ -12837,8 +12954,8 @@
         </a:p>
       </dsp:txBody>
       <dsp:txXfrm>
-        <a:off x="6518704" y="957997"/>
-        <a:ext cx="2071451" cy="619249"/>
+        <a:off x="6499438" y="938731"/>
+        <a:ext cx="2109983" cy="657781"/>
       </dsp:txXfrm>
     </dsp:sp>
   </dsp:spTree>
@@ -12846,7 +12963,7 @@
 </file>
 
 <file path=ppt/diagrams/drawing5.xml><?xml version="1.0" encoding="utf-8"?>
-<dsp:drawing xmlns:dgm="http://schemas.openxmlformats.org/drawingml/2006/diagram" xmlns:dsp="http://schemas.microsoft.com/office/drawing/2008/diagram" xmlns:a="http://schemas.openxmlformats.org/drawingml/2006/main">
+<dsp:drawing xmlns:dgm="http://schemas.openxmlformats.org/drawingml/2006/diagram" xmlns:a="http://schemas.openxmlformats.org/drawingml/2006/main" xmlns:dsp="http://schemas.microsoft.com/office/drawing/2008/diagram">
   <dsp:spTree>
     <dsp:nvGrpSpPr>
       <dsp:cNvPr id="0" name=""/>
@@ -12926,8 +13043,8 @@
         </a:p>
       </dsp:txBody>
       <dsp:txXfrm>
-        <a:off x="3786273" y="1862231"/>
-        <a:ext cx="1114252" cy="1143857"/>
+        <a:off x="3555504" y="1625330"/>
+        <a:ext cx="1575790" cy="1617659"/>
       </dsp:txXfrm>
     </dsp:sp>
     <dsp:sp modelId="{D858E594-9B1F-454E-812B-1D569755D339}">
@@ -12994,9 +13111,9 @@
           <a:endParaRPr lang="pt-BR" sz="1900" kern="1200"/>
         </a:p>
       </dsp:txBody>
-      <dsp:txXfrm>
-        <a:off x="4279522" y="1355251"/>
-        <a:ext cx="127756" cy="260884"/>
+      <dsp:txXfrm rot="16200000">
+        <a:off x="4252145" y="1240913"/>
+        <a:ext cx="182509" cy="434806"/>
       </dsp:txXfrm>
     </dsp:sp>
     <dsp:sp modelId="{E0159EA0-1A5D-476D-AD51-865243B2D714}">
@@ -13068,8 +13185,8 @@
         </a:p>
       </dsp:txBody>
       <dsp:txXfrm>
-        <a:off x="3891260" y="189412"/>
-        <a:ext cx="904278" cy="904278"/>
+        <a:off x="3703978" y="2130"/>
+        <a:ext cx="1278842" cy="1278842"/>
       </dsp:txXfrm>
     </dsp:sp>
     <dsp:sp modelId="{9D95D45C-9B20-4A4E-AD6C-37161FDE50AF}">
@@ -13136,9 +13253,9 @@
           <a:endParaRPr lang="pt-BR" sz="1900" kern="1200"/>
         </a:p>
       </dsp:txBody>
-      <dsp:txXfrm>
-        <a:off x="5167295" y="2014117"/>
-        <a:ext cx="134807" cy="260884"/>
+      <dsp:txXfrm rot="20520000">
+        <a:off x="5165881" y="1918229"/>
+        <a:ext cx="192581" cy="434806"/>
       </dsp:txXfrm>
     </dsp:sp>
     <dsp:sp modelId="{892AB89D-9357-4946-A690-9AB770094366}">
@@ -13210,8 +13327,8 @@
         </a:p>
       </dsp:txBody>
       <dsp:txXfrm>
-        <a:off x="5596131" y="1428074"/>
-        <a:ext cx="904278" cy="904278"/>
+        <a:off x="5408849" y="1240792"/>
+        <a:ext cx="1278842" cy="1278842"/>
       </dsp:txXfrm>
     </dsp:sp>
     <dsp:sp modelId="{8F93543A-5059-4DE8-A2FC-A99D358C55C0}">
@@ -13278,9 +13395,9 @@
           <a:endParaRPr lang="pt-BR" sz="1900" kern="1200"/>
         </a:p>
       </dsp:txBody>
-      <dsp:txXfrm>
-        <a:off x="4833046" y="3067474"/>
-        <a:ext cx="130509" cy="260884"/>
+      <dsp:txXfrm rot="3240000">
+        <a:off x="4821518" y="3003138"/>
+        <a:ext cx="186441" cy="434806"/>
       </dsp:txXfrm>
     </dsp:sp>
     <dsp:sp modelId="{4AE6AAFA-D59A-4F35-A5E8-C6D2EC6BBFF0}">
@@ -13352,8 +13469,8 @@
         </a:p>
       </dsp:txBody>
       <dsp:txXfrm>
-        <a:off x="4944929" y="3432270"/>
-        <a:ext cx="904278" cy="904278"/>
+        <a:off x="4757647" y="3244988"/>
+        <a:ext cx="1278842" cy="1278842"/>
       </dsp:txXfrm>
     </dsp:sp>
     <dsp:sp modelId="{D32B50BC-8F9A-4A06-941D-13004E7B3F17}">
@@ -13420,9 +13537,9 @@
           <a:endParaRPr lang="pt-BR" sz="1900" kern="1200"/>
         </a:p>
       </dsp:txBody>
-      <dsp:txXfrm rot="10800000">
-        <a:off x="3723243" y="3067474"/>
-        <a:ext cx="130509" cy="260884"/>
+      <dsp:txXfrm rot="7560000">
+        <a:off x="3678839" y="3003138"/>
+        <a:ext cx="186441" cy="434806"/>
       </dsp:txXfrm>
     </dsp:sp>
     <dsp:sp modelId="{42C28B57-95B0-4561-B729-7C55DC80C4C3}">
@@ -13494,8 +13611,8 @@
         </a:p>
       </dsp:txBody>
       <dsp:txXfrm>
-        <a:off x="2837592" y="3432270"/>
-        <a:ext cx="904278" cy="904278"/>
+        <a:off x="2650310" y="3244988"/>
+        <a:ext cx="1278842" cy="1278842"/>
       </dsp:txXfrm>
     </dsp:sp>
     <dsp:sp modelId="{BED8CFF9-57DF-415B-BFD2-F23237B98D78}">
@@ -13562,9 +13679,9 @@
           <a:endParaRPr lang="pt-BR" sz="1900" kern="1200"/>
         </a:p>
       </dsp:txBody>
-      <dsp:txXfrm rot="10800000">
-        <a:off x="3384696" y="2014117"/>
-        <a:ext cx="134807" cy="260884"/>
+      <dsp:txXfrm rot="11880000">
+        <a:off x="3328336" y="1918229"/>
+        <a:ext cx="192581" cy="434806"/>
       </dsp:txXfrm>
     </dsp:sp>
     <dsp:sp modelId="{AE23CEE4-5E78-4BF2-A4EC-856A2ACE758E}">
@@ -13636,8 +13753,8 @@
         </a:p>
       </dsp:txBody>
       <dsp:txXfrm>
-        <a:off x="2186389" y="1428074"/>
-        <a:ext cx="904278" cy="904278"/>
+        <a:off x="1999107" y="1240792"/>
+        <a:ext cx="1278842" cy="1278842"/>
       </dsp:txXfrm>
     </dsp:sp>
   </dsp:spTree>
@@ -13645,979 +13762,13 @@
 </file>
 
 <file path=ppt/diagrams/drawing6.xml><?xml version="1.0" encoding="utf-8"?>
-<dsp:drawing xmlns:dgm="http://schemas.openxmlformats.org/drawingml/2006/diagram" xmlns:dsp="http://schemas.microsoft.com/office/drawing/2008/diagram" xmlns:a="http://schemas.openxmlformats.org/drawingml/2006/main">
+<dsp:drawing xmlns:dgm="http://schemas.openxmlformats.org/drawingml/2006/diagram" xmlns:a="http://schemas.openxmlformats.org/drawingml/2006/main" xmlns:dsp="http://schemas.microsoft.com/office/drawing/2008/diagram">
   <dsp:spTree>
     <dsp:nvGrpSpPr>
       <dsp:cNvPr id="0" name=""/>
       <dsp:cNvGrpSpPr/>
     </dsp:nvGrpSpPr>
     <dsp:grpSpPr/>
-    <dsp:sp modelId="{AA8514B8-7EBB-4287-ACDB-81BB8EE3A65E}">
-      <dsp:nvSpPr>
-        <dsp:cNvPr id="0" name=""/>
-        <dsp:cNvSpPr/>
-      </dsp:nvSpPr>
-      <dsp:spPr>
-        <a:xfrm>
-          <a:off x="0" y="327899"/>
-          <a:ext cx="8686800" cy="504000"/>
-        </a:xfrm>
-        <a:prstGeom prst="rect">
-          <a:avLst/>
-        </a:prstGeom>
-        <a:gradFill rotWithShape="1">
-          <a:gsLst>
-            <a:gs pos="0">
-              <a:schemeClr val="accent6">
-                <a:tint val="30000"/>
-                <a:satMod val="250000"/>
-              </a:schemeClr>
-            </a:gs>
-            <a:gs pos="72000">
-              <a:schemeClr val="accent6">
-                <a:tint val="75000"/>
-                <a:satMod val="210000"/>
-              </a:schemeClr>
-            </a:gs>
-            <a:gs pos="100000">
-              <a:schemeClr val="accent6">
-                <a:tint val="85000"/>
-                <a:satMod val="210000"/>
-              </a:schemeClr>
-            </a:gs>
-          </a:gsLst>
-          <a:lin ang="5400000" scaled="1"/>
-        </a:gradFill>
-        <a:ln w="10000" cap="flat" cmpd="sng" algn="ctr">
-          <a:solidFill>
-            <a:schemeClr val="accent6"/>
-          </a:solidFill>
-          <a:prstDash val="solid"/>
-        </a:ln>
-        <a:effectLst>
-          <a:outerShdw blurRad="76200" dist="50800" dir="5400000" rotWithShape="0">
-            <a:srgbClr val="4E3B30">
-              <a:alpha val="60000"/>
-            </a:srgbClr>
-          </a:outerShdw>
-        </a:effectLst>
-        <a:scene3d>
-          <a:camera prst="orthographicFront"/>
-          <a:lightRig rig="flat" dir="t"/>
-        </a:scene3d>
-        <a:sp3d z="190500" extrusionH="12700"/>
-      </dsp:spPr>
-      <dsp:style>
-        <a:lnRef idx="1">
-          <a:schemeClr val="accent6"/>
-        </a:lnRef>
-        <a:fillRef idx="2">
-          <a:schemeClr val="accent6"/>
-        </a:fillRef>
-        <a:effectRef idx="1">
-          <a:schemeClr val="accent6"/>
-        </a:effectRef>
-        <a:fontRef idx="minor">
-          <a:schemeClr val="dk1"/>
-        </a:fontRef>
-      </dsp:style>
-    </dsp:sp>
-    <dsp:sp modelId="{B171C0C5-1265-474F-9A24-5267C4DEA6BB}">
-      <dsp:nvSpPr>
-        <dsp:cNvPr id="0" name=""/>
-        <dsp:cNvSpPr/>
-      </dsp:nvSpPr>
-      <dsp:spPr>
-        <a:xfrm>
-          <a:off x="434340" y="0"/>
-          <a:ext cx="6080760" cy="590400"/>
-        </a:xfrm>
-        <a:prstGeom prst="roundRect">
-          <a:avLst/>
-        </a:prstGeom>
-        <a:solidFill>
-          <a:srgbClr val="92D050"/>
-        </a:solidFill>
-        <a:ln>
-          <a:noFill/>
-        </a:ln>
-        <a:effectLst>
-          <a:outerShdw blurRad="76200" dist="50800" dir="5400000" rotWithShape="0">
-            <a:srgbClr val="4E3B30">
-              <a:alpha val="60000"/>
-            </a:srgbClr>
-          </a:outerShdw>
-        </a:effectLst>
-        <a:scene3d>
-          <a:camera prst="orthographicFront"/>
-          <a:lightRig rig="flat" dir="t"/>
-        </a:scene3d>
-        <a:sp3d contourW="12700" prstMaterial="matte">
-          <a:bevelT w="60000" h="50800"/>
-          <a:contourClr>
-            <a:schemeClr val="accent6">
-              <a:shade val="60000"/>
-              <a:satMod val="110000"/>
-            </a:schemeClr>
-          </a:contourClr>
-        </a:sp3d>
-      </dsp:spPr>
-      <dsp:style>
-        <a:lnRef idx="0">
-          <a:schemeClr val="accent6"/>
-        </a:lnRef>
-        <a:fillRef idx="3">
-          <a:schemeClr val="accent6"/>
-        </a:fillRef>
-        <a:effectRef idx="3">
-          <a:schemeClr val="accent6"/>
-        </a:effectRef>
-        <a:fontRef idx="minor">
-          <a:schemeClr val="lt1"/>
-        </a:fontRef>
-      </dsp:style>
-      <dsp:txBody>
-        <a:bodyPr spcFirstLastPara="0" vert="horz" wrap="square" lIns="229838" tIns="0" rIns="229838" bIns="0" numCol="1" spcCol="1270" anchor="ctr" anchorCtr="0">
-          <a:noAutofit/>
-        </a:bodyPr>
-        <a:lstStyle/>
-        <a:p>
-          <a:pPr lvl="0" algn="l" defTabSz="889000">
-            <a:lnSpc>
-              <a:spcPct val="90000"/>
-            </a:lnSpc>
-            <a:spcBef>
-              <a:spcPct val="0"/>
-            </a:spcBef>
-            <a:spcAft>
-              <a:spcPct val="35000"/>
-            </a:spcAft>
-          </a:pPr>
-          <a:r>
-            <a:rPr lang="pt-BR" sz="2000" b="1" kern="1200" smtClean="0">
-              <a:solidFill>
-                <a:srgbClr val="0070C0"/>
-              </a:solidFill>
-            </a:rPr>
-            <a:t>Dinamização de registro de atividades</a:t>
-          </a:r>
-          <a:endParaRPr lang="pt-BR" sz="2000" b="1" kern="1200" dirty="0">
-            <a:solidFill>
-              <a:srgbClr val="0070C0"/>
-            </a:solidFill>
-          </a:endParaRPr>
-        </a:p>
-      </dsp:txBody>
-      <dsp:txXfrm>
-        <a:off x="463161" y="28821"/>
-        <a:ext cx="6023118" cy="532758"/>
-      </dsp:txXfrm>
-    </dsp:sp>
-    <dsp:sp modelId="{122429B3-75B2-4400-B819-CC67C8478699}">
-      <dsp:nvSpPr>
-        <dsp:cNvPr id="0" name=""/>
-        <dsp:cNvSpPr/>
-      </dsp:nvSpPr>
-      <dsp:spPr>
-        <a:xfrm>
-          <a:off x="0" y="1235099"/>
-          <a:ext cx="8686800" cy="504000"/>
-        </a:xfrm>
-        <a:prstGeom prst="rect">
-          <a:avLst/>
-        </a:prstGeom>
-        <a:gradFill rotWithShape="1">
-          <a:gsLst>
-            <a:gs pos="0">
-              <a:schemeClr val="accent6">
-                <a:tint val="30000"/>
-                <a:satMod val="250000"/>
-              </a:schemeClr>
-            </a:gs>
-            <a:gs pos="72000">
-              <a:schemeClr val="accent6">
-                <a:tint val="75000"/>
-                <a:satMod val="210000"/>
-              </a:schemeClr>
-            </a:gs>
-            <a:gs pos="100000">
-              <a:schemeClr val="accent6">
-                <a:tint val="85000"/>
-                <a:satMod val="210000"/>
-              </a:schemeClr>
-            </a:gs>
-          </a:gsLst>
-          <a:lin ang="5400000" scaled="1"/>
-        </a:gradFill>
-        <a:ln w="10000" cap="flat" cmpd="sng" algn="ctr">
-          <a:solidFill>
-            <a:schemeClr val="accent6"/>
-          </a:solidFill>
-          <a:prstDash val="solid"/>
-        </a:ln>
-        <a:effectLst>
-          <a:outerShdw blurRad="76200" dist="50800" dir="5400000" rotWithShape="0">
-            <a:srgbClr val="4E3B30">
-              <a:alpha val="60000"/>
-            </a:srgbClr>
-          </a:outerShdw>
-        </a:effectLst>
-        <a:scene3d>
-          <a:camera prst="orthographicFront"/>
-          <a:lightRig rig="flat" dir="t"/>
-        </a:scene3d>
-        <a:sp3d z="190500" extrusionH="12700"/>
-      </dsp:spPr>
-      <dsp:style>
-        <a:lnRef idx="1">
-          <a:schemeClr val="accent6"/>
-        </a:lnRef>
-        <a:fillRef idx="2">
-          <a:schemeClr val="accent6"/>
-        </a:fillRef>
-        <a:effectRef idx="1">
-          <a:schemeClr val="accent6"/>
-        </a:effectRef>
-        <a:fontRef idx="minor">
-          <a:schemeClr val="dk1"/>
-        </a:fontRef>
-      </dsp:style>
-    </dsp:sp>
-    <dsp:sp modelId="{9939078C-FCDB-4354-9260-A7140D211969}">
-      <dsp:nvSpPr>
-        <dsp:cNvPr id="0" name=""/>
-        <dsp:cNvSpPr/>
-      </dsp:nvSpPr>
-      <dsp:spPr>
-        <a:xfrm>
-          <a:off x="434340" y="895849"/>
-          <a:ext cx="6080760" cy="590400"/>
-        </a:xfrm>
-        <a:prstGeom prst="roundRect">
-          <a:avLst/>
-        </a:prstGeom>
-        <a:solidFill>
-          <a:srgbClr val="92D050"/>
-        </a:solidFill>
-        <a:ln>
-          <a:noFill/>
-        </a:ln>
-        <a:effectLst>
-          <a:outerShdw blurRad="76200" dist="50800" dir="5400000" rotWithShape="0">
-            <a:srgbClr val="4E3B30">
-              <a:alpha val="60000"/>
-            </a:srgbClr>
-          </a:outerShdw>
-        </a:effectLst>
-        <a:scene3d>
-          <a:camera prst="orthographicFront"/>
-          <a:lightRig rig="flat" dir="t"/>
-        </a:scene3d>
-        <a:sp3d contourW="12700" prstMaterial="matte">
-          <a:bevelT w="60000" h="50800"/>
-          <a:contourClr>
-            <a:schemeClr val="accent6">
-              <a:shade val="60000"/>
-              <a:satMod val="110000"/>
-            </a:schemeClr>
-          </a:contourClr>
-        </a:sp3d>
-      </dsp:spPr>
-      <dsp:style>
-        <a:lnRef idx="0">
-          <a:schemeClr val="accent6"/>
-        </a:lnRef>
-        <a:fillRef idx="3">
-          <a:schemeClr val="accent6"/>
-        </a:fillRef>
-        <a:effectRef idx="3">
-          <a:schemeClr val="accent6"/>
-        </a:effectRef>
-        <a:fontRef idx="minor">
-          <a:schemeClr val="lt1"/>
-        </a:fontRef>
-      </dsp:style>
-      <dsp:txBody>
-        <a:bodyPr spcFirstLastPara="0" vert="horz" wrap="square" lIns="229838" tIns="0" rIns="229838" bIns="0" numCol="1" spcCol="1270" anchor="ctr" anchorCtr="0">
-          <a:noAutofit/>
-        </a:bodyPr>
-        <a:lstStyle/>
-        <a:p>
-          <a:pPr lvl="0" algn="l" defTabSz="889000">
-            <a:lnSpc>
-              <a:spcPct val="90000"/>
-            </a:lnSpc>
-            <a:spcBef>
-              <a:spcPct val="0"/>
-            </a:spcBef>
-            <a:spcAft>
-              <a:spcPct val="35000"/>
-            </a:spcAft>
-          </a:pPr>
-          <a:r>
-            <a:rPr lang="pt-BR" sz="2000" b="1" kern="1200" smtClean="0">
-              <a:solidFill>
-                <a:srgbClr val="0070C0"/>
-              </a:solidFill>
-            </a:rPr>
-            <a:t> Acesso web em dispositivos moveis</a:t>
-          </a:r>
-          <a:endParaRPr lang="pt-BR" sz="2000" b="1" kern="1200" dirty="0">
-            <a:solidFill>
-              <a:srgbClr val="0070C0"/>
-            </a:solidFill>
-          </a:endParaRPr>
-        </a:p>
-      </dsp:txBody>
-      <dsp:txXfrm>
-        <a:off x="463161" y="924670"/>
-        <a:ext cx="6023118" cy="532758"/>
-      </dsp:txXfrm>
-    </dsp:sp>
-    <dsp:sp modelId="{06A3C85D-CDEB-4A13-9986-AD53F22D8EA9}">
-      <dsp:nvSpPr>
-        <dsp:cNvPr id="0" name=""/>
-        <dsp:cNvSpPr/>
-      </dsp:nvSpPr>
-      <dsp:spPr>
-        <a:xfrm>
-          <a:off x="0" y="2142299"/>
-          <a:ext cx="8686800" cy="504000"/>
-        </a:xfrm>
-        <a:prstGeom prst="rect">
-          <a:avLst/>
-        </a:prstGeom>
-        <a:gradFill rotWithShape="1">
-          <a:gsLst>
-            <a:gs pos="0">
-              <a:schemeClr val="accent6">
-                <a:tint val="30000"/>
-                <a:satMod val="250000"/>
-              </a:schemeClr>
-            </a:gs>
-            <a:gs pos="72000">
-              <a:schemeClr val="accent6">
-                <a:tint val="75000"/>
-                <a:satMod val="210000"/>
-              </a:schemeClr>
-            </a:gs>
-            <a:gs pos="100000">
-              <a:schemeClr val="accent6">
-                <a:tint val="85000"/>
-                <a:satMod val="210000"/>
-              </a:schemeClr>
-            </a:gs>
-          </a:gsLst>
-          <a:lin ang="5400000" scaled="1"/>
-        </a:gradFill>
-        <a:ln w="10000" cap="flat" cmpd="sng" algn="ctr">
-          <a:solidFill>
-            <a:schemeClr val="accent6"/>
-          </a:solidFill>
-          <a:prstDash val="solid"/>
-        </a:ln>
-        <a:effectLst>
-          <a:outerShdw blurRad="76200" dist="50800" dir="5400000" rotWithShape="0">
-            <a:srgbClr val="4E3B30">
-              <a:alpha val="60000"/>
-            </a:srgbClr>
-          </a:outerShdw>
-        </a:effectLst>
-        <a:scene3d>
-          <a:camera prst="orthographicFront"/>
-          <a:lightRig rig="flat" dir="t"/>
-        </a:scene3d>
-        <a:sp3d z="190500" extrusionH="12700"/>
-      </dsp:spPr>
-      <dsp:style>
-        <a:lnRef idx="1">
-          <a:schemeClr val="accent6"/>
-        </a:lnRef>
-        <a:fillRef idx="2">
-          <a:schemeClr val="accent6"/>
-        </a:fillRef>
-        <a:effectRef idx="1">
-          <a:schemeClr val="accent6"/>
-        </a:effectRef>
-        <a:fontRef idx="minor">
-          <a:schemeClr val="dk1"/>
-        </a:fontRef>
-      </dsp:style>
-    </dsp:sp>
-    <dsp:sp modelId="{D78DBF14-3A29-4E42-B56E-7380E92A6552}">
-      <dsp:nvSpPr>
-        <dsp:cNvPr id="0" name=""/>
-        <dsp:cNvSpPr/>
-      </dsp:nvSpPr>
-      <dsp:spPr>
-        <a:xfrm>
-          <a:off x="434340" y="1803049"/>
-          <a:ext cx="6080760" cy="590400"/>
-        </a:xfrm>
-        <a:prstGeom prst="roundRect">
-          <a:avLst/>
-        </a:prstGeom>
-        <a:solidFill>
-          <a:srgbClr val="92D050"/>
-        </a:solidFill>
-        <a:ln>
-          <a:noFill/>
-        </a:ln>
-        <a:effectLst>
-          <a:outerShdw blurRad="76200" dist="50800" dir="5400000" rotWithShape="0">
-            <a:srgbClr val="4E3B30">
-              <a:alpha val="60000"/>
-            </a:srgbClr>
-          </a:outerShdw>
-        </a:effectLst>
-        <a:scene3d>
-          <a:camera prst="orthographicFront"/>
-          <a:lightRig rig="flat" dir="t"/>
-        </a:scene3d>
-        <a:sp3d contourW="12700" prstMaterial="matte">
-          <a:bevelT w="60000" h="50800"/>
-          <a:contourClr>
-            <a:schemeClr val="accent6">
-              <a:shade val="60000"/>
-              <a:satMod val="110000"/>
-            </a:schemeClr>
-          </a:contourClr>
-        </a:sp3d>
-      </dsp:spPr>
-      <dsp:style>
-        <a:lnRef idx="0">
-          <a:schemeClr val="accent6"/>
-        </a:lnRef>
-        <a:fillRef idx="3">
-          <a:schemeClr val="accent6"/>
-        </a:fillRef>
-        <a:effectRef idx="3">
-          <a:schemeClr val="accent6"/>
-        </a:effectRef>
-        <a:fontRef idx="minor">
-          <a:schemeClr val="lt1"/>
-        </a:fontRef>
-      </dsp:style>
-      <dsp:txBody>
-        <a:bodyPr spcFirstLastPara="0" vert="horz" wrap="square" lIns="229838" tIns="0" rIns="229838" bIns="0" numCol="1" spcCol="1270" anchor="ctr" anchorCtr="0">
-          <a:noAutofit/>
-        </a:bodyPr>
-        <a:lstStyle/>
-        <a:p>
-          <a:pPr lvl="0" algn="l" defTabSz="889000">
-            <a:lnSpc>
-              <a:spcPct val="90000"/>
-            </a:lnSpc>
-            <a:spcBef>
-              <a:spcPct val="0"/>
-            </a:spcBef>
-            <a:spcAft>
-              <a:spcPct val="35000"/>
-            </a:spcAft>
-          </a:pPr>
-          <a:r>
-            <a:rPr lang="pt-BR" sz="2000" b="1" kern="1200" smtClean="0">
-              <a:solidFill>
-                <a:srgbClr val="0070C0"/>
-              </a:solidFill>
-            </a:rPr>
-            <a:t>Trabalho em grupo em ambiente multiusuário</a:t>
-          </a:r>
-          <a:endParaRPr lang="pt-BR" sz="2000" b="1" kern="1200" dirty="0">
-            <a:solidFill>
-              <a:srgbClr val="0070C0"/>
-            </a:solidFill>
-          </a:endParaRPr>
-        </a:p>
-      </dsp:txBody>
-      <dsp:txXfrm>
-        <a:off x="463161" y="1831870"/>
-        <a:ext cx="6023118" cy="532758"/>
-      </dsp:txXfrm>
-    </dsp:sp>
-    <dsp:sp modelId="{BC58E8B0-740A-43C6-B230-1401E78D7A5B}">
-      <dsp:nvSpPr>
-        <dsp:cNvPr id="0" name=""/>
-        <dsp:cNvSpPr/>
-      </dsp:nvSpPr>
-      <dsp:spPr>
-        <a:xfrm>
-          <a:off x="0" y="3049499"/>
-          <a:ext cx="8686800" cy="504000"/>
-        </a:xfrm>
-        <a:prstGeom prst="rect">
-          <a:avLst/>
-        </a:prstGeom>
-        <a:gradFill rotWithShape="1">
-          <a:gsLst>
-            <a:gs pos="0">
-              <a:schemeClr val="accent6">
-                <a:tint val="30000"/>
-                <a:satMod val="250000"/>
-              </a:schemeClr>
-            </a:gs>
-            <a:gs pos="72000">
-              <a:schemeClr val="accent6">
-                <a:tint val="75000"/>
-                <a:satMod val="210000"/>
-              </a:schemeClr>
-            </a:gs>
-            <a:gs pos="100000">
-              <a:schemeClr val="accent6">
-                <a:tint val="85000"/>
-                <a:satMod val="210000"/>
-              </a:schemeClr>
-            </a:gs>
-          </a:gsLst>
-          <a:lin ang="5400000" scaled="1"/>
-        </a:gradFill>
-        <a:ln w="10000" cap="flat" cmpd="sng" algn="ctr">
-          <a:solidFill>
-            <a:schemeClr val="accent6"/>
-          </a:solidFill>
-          <a:prstDash val="solid"/>
-        </a:ln>
-        <a:effectLst>
-          <a:outerShdw blurRad="76200" dist="50800" dir="5400000" rotWithShape="0">
-            <a:srgbClr val="4E3B30">
-              <a:alpha val="60000"/>
-            </a:srgbClr>
-          </a:outerShdw>
-        </a:effectLst>
-        <a:scene3d>
-          <a:camera prst="orthographicFront"/>
-          <a:lightRig rig="flat" dir="t"/>
-        </a:scene3d>
-        <a:sp3d z="190500" extrusionH="12700"/>
-      </dsp:spPr>
-      <dsp:style>
-        <a:lnRef idx="1">
-          <a:schemeClr val="accent6"/>
-        </a:lnRef>
-        <a:fillRef idx="2">
-          <a:schemeClr val="accent6"/>
-        </a:fillRef>
-        <a:effectRef idx="1">
-          <a:schemeClr val="accent6"/>
-        </a:effectRef>
-        <a:fontRef idx="minor">
-          <a:schemeClr val="dk1"/>
-        </a:fontRef>
-      </dsp:style>
-    </dsp:sp>
-    <dsp:sp modelId="{6C17C5F1-150A-491F-92CE-A1BE931BB55D}">
-      <dsp:nvSpPr>
-        <dsp:cNvPr id="0" name=""/>
-        <dsp:cNvSpPr/>
-      </dsp:nvSpPr>
-      <dsp:spPr>
-        <a:xfrm>
-          <a:off x="434340" y="2754299"/>
-          <a:ext cx="6080760" cy="590400"/>
-        </a:xfrm>
-        <a:prstGeom prst="roundRect">
-          <a:avLst/>
-        </a:prstGeom>
-        <a:solidFill>
-          <a:srgbClr val="92D050"/>
-        </a:solidFill>
-        <a:ln>
-          <a:noFill/>
-        </a:ln>
-        <a:effectLst>
-          <a:outerShdw blurRad="76200" dist="50800" dir="5400000" rotWithShape="0">
-            <a:srgbClr val="4E3B30">
-              <a:alpha val="60000"/>
-            </a:srgbClr>
-          </a:outerShdw>
-        </a:effectLst>
-        <a:scene3d>
-          <a:camera prst="orthographicFront"/>
-          <a:lightRig rig="flat" dir="t"/>
-        </a:scene3d>
-        <a:sp3d contourW="12700" prstMaterial="matte">
-          <a:bevelT w="60000" h="50800"/>
-          <a:contourClr>
-            <a:schemeClr val="accent6">
-              <a:shade val="60000"/>
-              <a:satMod val="110000"/>
-            </a:schemeClr>
-          </a:contourClr>
-        </a:sp3d>
-      </dsp:spPr>
-      <dsp:style>
-        <a:lnRef idx="0">
-          <a:schemeClr val="accent6"/>
-        </a:lnRef>
-        <a:fillRef idx="3">
-          <a:schemeClr val="accent6"/>
-        </a:fillRef>
-        <a:effectRef idx="3">
-          <a:schemeClr val="accent6"/>
-        </a:effectRef>
-        <a:fontRef idx="minor">
-          <a:schemeClr val="lt1"/>
-        </a:fontRef>
-      </dsp:style>
-      <dsp:txBody>
-        <a:bodyPr spcFirstLastPara="0" vert="horz" wrap="square" lIns="229838" tIns="0" rIns="229838" bIns="0" numCol="1" spcCol="1270" anchor="ctr" anchorCtr="0">
-          <a:noAutofit/>
-        </a:bodyPr>
-        <a:lstStyle/>
-        <a:p>
-          <a:pPr lvl="0" algn="l" defTabSz="889000">
-            <a:lnSpc>
-              <a:spcPct val="90000"/>
-            </a:lnSpc>
-            <a:spcBef>
-              <a:spcPct val="0"/>
-            </a:spcBef>
-            <a:spcAft>
-              <a:spcPct val="35000"/>
-            </a:spcAft>
-          </a:pPr>
-          <a:r>
-            <a:rPr lang="pt-BR" sz="2000" b="1" kern="1200" dirty="0" smtClean="0">
-              <a:solidFill>
-                <a:srgbClr val="0070C0"/>
-              </a:solidFill>
-            </a:rPr>
-            <a:t>Controles acadêmicos  </a:t>
-          </a:r>
-          <a:endParaRPr lang="pt-BR" sz="2000" b="1" kern="1200" dirty="0">
-            <a:solidFill>
-              <a:srgbClr val="0070C0"/>
-            </a:solidFill>
-          </a:endParaRPr>
-        </a:p>
-      </dsp:txBody>
-      <dsp:txXfrm>
-        <a:off x="463161" y="2783120"/>
-        <a:ext cx="6023118" cy="532758"/>
-      </dsp:txXfrm>
-    </dsp:sp>
-    <dsp:sp modelId="{7D8B9C6D-02C3-420B-906C-B43C36EE3306}">
-      <dsp:nvSpPr>
-        <dsp:cNvPr id="0" name=""/>
-        <dsp:cNvSpPr/>
-      </dsp:nvSpPr>
-      <dsp:spPr>
-        <a:xfrm>
-          <a:off x="0" y="3956699"/>
-          <a:ext cx="8686800" cy="504000"/>
-        </a:xfrm>
-        <a:prstGeom prst="rect">
-          <a:avLst/>
-        </a:prstGeom>
-        <a:gradFill rotWithShape="1">
-          <a:gsLst>
-            <a:gs pos="0">
-              <a:schemeClr val="accent6">
-                <a:tint val="30000"/>
-                <a:satMod val="250000"/>
-              </a:schemeClr>
-            </a:gs>
-            <a:gs pos="72000">
-              <a:schemeClr val="accent6">
-                <a:tint val="75000"/>
-                <a:satMod val="210000"/>
-              </a:schemeClr>
-            </a:gs>
-            <a:gs pos="100000">
-              <a:schemeClr val="accent6">
-                <a:tint val="85000"/>
-                <a:satMod val="210000"/>
-              </a:schemeClr>
-            </a:gs>
-          </a:gsLst>
-          <a:lin ang="5400000" scaled="1"/>
-        </a:gradFill>
-        <a:ln w="10000" cap="flat" cmpd="sng" algn="ctr">
-          <a:solidFill>
-            <a:schemeClr val="accent6"/>
-          </a:solidFill>
-          <a:prstDash val="solid"/>
-        </a:ln>
-        <a:effectLst>
-          <a:outerShdw blurRad="76200" dist="50800" dir="5400000" rotWithShape="0">
-            <a:srgbClr val="4E3B30">
-              <a:alpha val="60000"/>
-            </a:srgbClr>
-          </a:outerShdw>
-        </a:effectLst>
-        <a:scene3d>
-          <a:camera prst="orthographicFront"/>
-          <a:lightRig rig="flat" dir="t"/>
-        </a:scene3d>
-        <a:sp3d z="190500" extrusionH="12700"/>
-      </dsp:spPr>
-      <dsp:style>
-        <a:lnRef idx="1">
-          <a:schemeClr val="accent6"/>
-        </a:lnRef>
-        <a:fillRef idx="2">
-          <a:schemeClr val="accent6"/>
-        </a:fillRef>
-        <a:effectRef idx="1">
-          <a:schemeClr val="accent6"/>
-        </a:effectRef>
-        <a:fontRef idx="minor">
-          <a:schemeClr val="dk1"/>
-        </a:fontRef>
-      </dsp:style>
-    </dsp:sp>
-    <dsp:sp modelId="{231A70AB-9760-4FFF-B875-5D31C52D60AE}">
-      <dsp:nvSpPr>
-        <dsp:cNvPr id="0" name=""/>
-        <dsp:cNvSpPr/>
-      </dsp:nvSpPr>
-      <dsp:spPr>
-        <a:xfrm>
-          <a:off x="434340" y="3661499"/>
-          <a:ext cx="6080760" cy="590400"/>
-        </a:xfrm>
-        <a:prstGeom prst="roundRect">
-          <a:avLst/>
-        </a:prstGeom>
-        <a:solidFill>
-          <a:srgbClr val="92D050"/>
-        </a:solidFill>
-        <a:ln>
-          <a:noFill/>
-        </a:ln>
-        <a:effectLst>
-          <a:outerShdw blurRad="76200" dist="50800" dir="5400000" rotWithShape="0">
-            <a:srgbClr val="4E3B30">
-              <a:alpha val="60000"/>
-            </a:srgbClr>
-          </a:outerShdw>
-        </a:effectLst>
-        <a:scene3d>
-          <a:camera prst="orthographicFront"/>
-          <a:lightRig rig="flat" dir="t"/>
-        </a:scene3d>
-        <a:sp3d contourW="12700" prstMaterial="matte">
-          <a:bevelT w="60000" h="50800"/>
-          <a:contourClr>
-            <a:schemeClr val="accent6">
-              <a:shade val="60000"/>
-              <a:satMod val="110000"/>
-            </a:schemeClr>
-          </a:contourClr>
-        </a:sp3d>
-      </dsp:spPr>
-      <dsp:style>
-        <a:lnRef idx="0">
-          <a:schemeClr val="accent6"/>
-        </a:lnRef>
-        <a:fillRef idx="3">
-          <a:schemeClr val="accent6"/>
-        </a:fillRef>
-        <a:effectRef idx="3">
-          <a:schemeClr val="accent6"/>
-        </a:effectRef>
-        <a:fontRef idx="minor">
-          <a:schemeClr val="lt1"/>
-        </a:fontRef>
-      </dsp:style>
-      <dsp:txBody>
-        <a:bodyPr spcFirstLastPara="0" vert="horz" wrap="square" lIns="229838" tIns="0" rIns="229838" bIns="0" numCol="1" spcCol="1270" anchor="ctr" anchorCtr="0">
-          <a:noAutofit/>
-        </a:bodyPr>
-        <a:lstStyle/>
-        <a:p>
-          <a:pPr lvl="0" algn="l" defTabSz="889000">
-            <a:lnSpc>
-              <a:spcPct val="90000"/>
-            </a:lnSpc>
-            <a:spcBef>
-              <a:spcPct val="0"/>
-            </a:spcBef>
-            <a:spcAft>
-              <a:spcPct val="35000"/>
-            </a:spcAft>
-          </a:pPr>
-          <a:r>
-            <a:rPr lang="pt-BR" sz="2000" b="1" kern="1200" smtClean="0">
-              <a:solidFill>
-                <a:srgbClr val="0070C0"/>
-              </a:solidFill>
-            </a:rPr>
-            <a:t>Controles financeiros</a:t>
-          </a:r>
-          <a:endParaRPr lang="pt-BR" sz="2000" b="1" kern="1200" dirty="0">
-            <a:solidFill>
-              <a:srgbClr val="0070C0"/>
-            </a:solidFill>
-          </a:endParaRPr>
-        </a:p>
-      </dsp:txBody>
-      <dsp:txXfrm>
-        <a:off x="463161" y="3690320"/>
-        <a:ext cx="6023118" cy="532758"/>
-      </dsp:txXfrm>
-    </dsp:sp>
-    <dsp:sp modelId="{338DDB9A-A6BB-4D1C-8303-E07E7D076CB7}">
-      <dsp:nvSpPr>
-        <dsp:cNvPr id="0" name=""/>
-        <dsp:cNvSpPr/>
-      </dsp:nvSpPr>
-      <dsp:spPr>
-        <a:xfrm>
-          <a:off x="0" y="4863899"/>
-          <a:ext cx="8686800" cy="504000"/>
-        </a:xfrm>
-        <a:prstGeom prst="rect">
-          <a:avLst/>
-        </a:prstGeom>
-        <a:gradFill rotWithShape="1">
-          <a:gsLst>
-            <a:gs pos="0">
-              <a:schemeClr val="accent6">
-                <a:tint val="30000"/>
-                <a:satMod val="250000"/>
-              </a:schemeClr>
-            </a:gs>
-            <a:gs pos="72000">
-              <a:schemeClr val="accent6">
-                <a:tint val="75000"/>
-                <a:satMod val="210000"/>
-              </a:schemeClr>
-            </a:gs>
-            <a:gs pos="100000">
-              <a:schemeClr val="accent6">
-                <a:tint val="85000"/>
-                <a:satMod val="210000"/>
-              </a:schemeClr>
-            </a:gs>
-          </a:gsLst>
-          <a:lin ang="5400000" scaled="1"/>
-        </a:gradFill>
-        <a:ln w="10000" cap="flat" cmpd="sng" algn="ctr">
-          <a:solidFill>
-            <a:schemeClr val="accent6"/>
-          </a:solidFill>
-          <a:prstDash val="solid"/>
-        </a:ln>
-        <a:effectLst>
-          <a:outerShdw blurRad="76200" dist="50800" dir="5400000" rotWithShape="0">
-            <a:srgbClr val="4E3B30">
-              <a:alpha val="60000"/>
-            </a:srgbClr>
-          </a:outerShdw>
-        </a:effectLst>
-        <a:scene3d>
-          <a:camera prst="orthographicFront"/>
-          <a:lightRig rig="flat" dir="t"/>
-        </a:scene3d>
-        <a:sp3d z="190500" extrusionH="12700"/>
-      </dsp:spPr>
-      <dsp:style>
-        <a:lnRef idx="1">
-          <a:schemeClr val="accent6"/>
-        </a:lnRef>
-        <a:fillRef idx="2">
-          <a:schemeClr val="accent6"/>
-        </a:fillRef>
-        <a:effectRef idx="1">
-          <a:schemeClr val="accent6"/>
-        </a:effectRef>
-        <a:fontRef idx="minor">
-          <a:schemeClr val="dk1"/>
-        </a:fontRef>
-      </dsp:style>
-    </dsp:sp>
-    <dsp:sp modelId="{029B9D8C-4A77-4645-9520-CB1F079C0081}">
-      <dsp:nvSpPr>
-        <dsp:cNvPr id="0" name=""/>
-        <dsp:cNvSpPr/>
-      </dsp:nvSpPr>
-      <dsp:spPr>
-        <a:xfrm>
-          <a:off x="434340" y="4568699"/>
-          <a:ext cx="6080760" cy="590400"/>
-        </a:xfrm>
-        <a:prstGeom prst="roundRect">
-          <a:avLst/>
-        </a:prstGeom>
-        <a:solidFill>
-          <a:srgbClr val="92D050"/>
-        </a:solidFill>
-        <a:ln>
-          <a:noFill/>
-        </a:ln>
-        <a:effectLst>
-          <a:outerShdw blurRad="76200" dist="50800" dir="5400000" rotWithShape="0">
-            <a:srgbClr val="4E3B30">
-              <a:alpha val="60000"/>
-            </a:srgbClr>
-          </a:outerShdw>
-        </a:effectLst>
-        <a:scene3d>
-          <a:camera prst="orthographicFront"/>
-          <a:lightRig rig="flat" dir="t"/>
-        </a:scene3d>
-        <a:sp3d contourW="12700" prstMaterial="matte">
-          <a:bevelT w="60000" h="50800"/>
-          <a:contourClr>
-            <a:schemeClr val="accent6">
-              <a:shade val="60000"/>
-              <a:satMod val="110000"/>
-            </a:schemeClr>
-          </a:contourClr>
-        </a:sp3d>
-      </dsp:spPr>
-      <dsp:style>
-        <a:lnRef idx="0">
-          <a:schemeClr val="accent6"/>
-        </a:lnRef>
-        <a:fillRef idx="3">
-          <a:schemeClr val="accent6"/>
-        </a:fillRef>
-        <a:effectRef idx="3">
-          <a:schemeClr val="accent6"/>
-        </a:effectRef>
-        <a:fontRef idx="minor">
-          <a:schemeClr val="lt1"/>
-        </a:fontRef>
-      </dsp:style>
-      <dsp:txBody>
-        <a:bodyPr spcFirstLastPara="0" vert="horz" wrap="square" lIns="229838" tIns="0" rIns="229838" bIns="0" numCol="1" spcCol="1270" anchor="ctr" anchorCtr="0">
-          <a:noAutofit/>
-        </a:bodyPr>
-        <a:lstStyle/>
-        <a:p>
-          <a:pPr lvl="0" algn="l" defTabSz="889000">
-            <a:lnSpc>
-              <a:spcPct val="90000"/>
-            </a:lnSpc>
-            <a:spcBef>
-              <a:spcPct val="0"/>
-            </a:spcBef>
-            <a:spcAft>
-              <a:spcPct val="35000"/>
-            </a:spcAft>
-          </a:pPr>
-          <a:r>
-            <a:rPr lang="pt-BR" sz="2000" b="1" kern="1200" smtClean="0">
-              <a:solidFill>
-                <a:srgbClr val="0070C0"/>
-              </a:solidFill>
-            </a:rPr>
-            <a:t>Controle de contas a pagar</a:t>
-          </a:r>
-          <a:endParaRPr lang="pt-BR" sz="2000" b="1" kern="1200" dirty="0">
-            <a:solidFill>
-              <a:srgbClr val="0070C0"/>
-            </a:solidFill>
-          </a:endParaRPr>
-        </a:p>
-      </dsp:txBody>
-      <dsp:txXfrm>
-        <a:off x="463161" y="4597520"/>
-        <a:ext cx="6023118" cy="532758"/>
-      </dsp:txXfrm>
-    </dsp:sp>
   </dsp:spTree>
 </dsp:drawing>
 </file>
@@ -23181,7 +22332,7 @@
             <a:fld id="{229FDC3E-7424-49CF-AF38-AA35F4C77C8D}" type="datetimeFigureOut">
               <a:rPr lang="pt-BR" smtClean="0"/>
               <a:pPr/>
-              <a:t>16/05/2014</a:t>
+              <a:t>22/05/2014</a:t>
             </a:fld>
             <a:endParaRPr lang="pt-BR"/>
           </a:p>
@@ -23353,7 +22504,7 @@
             <a:fld id="{229FDC3E-7424-49CF-AF38-AA35F4C77C8D}" type="datetimeFigureOut">
               <a:rPr lang="pt-BR" smtClean="0"/>
               <a:pPr/>
-              <a:t>16/05/2014</a:t>
+              <a:t>22/05/2014</a:t>
             </a:fld>
             <a:endParaRPr lang="pt-BR"/>
           </a:p>
@@ -23530,7 +22681,7 @@
             <a:fld id="{229FDC3E-7424-49CF-AF38-AA35F4C77C8D}" type="datetimeFigureOut">
               <a:rPr lang="pt-BR" smtClean="0"/>
               <a:pPr/>
-              <a:t>16/05/2014</a:t>
+              <a:t>22/05/2014</a:t>
             </a:fld>
             <a:endParaRPr lang="pt-BR"/>
           </a:p>
@@ -23697,7 +22848,7 @@
             <a:fld id="{229FDC3E-7424-49CF-AF38-AA35F4C77C8D}" type="datetimeFigureOut">
               <a:rPr lang="pt-BR" smtClean="0"/>
               <a:pPr/>
-              <a:t>16/05/2014</a:t>
+              <a:t>22/05/2014</a:t>
             </a:fld>
             <a:endParaRPr lang="pt-BR"/>
           </a:p>
@@ -23933,7 +23084,7 @@
             <a:fld id="{229FDC3E-7424-49CF-AF38-AA35F4C77C8D}" type="datetimeFigureOut">
               <a:rPr lang="pt-BR" smtClean="0"/>
               <a:pPr/>
-              <a:t>16/05/2014</a:t>
+              <a:t>22/05/2014</a:t>
             </a:fld>
             <a:endParaRPr lang="pt-BR"/>
           </a:p>
@@ -24231,7 +23382,7 @@
             <a:fld id="{229FDC3E-7424-49CF-AF38-AA35F4C77C8D}" type="datetimeFigureOut">
               <a:rPr lang="pt-BR" smtClean="0"/>
               <a:pPr/>
-              <a:t>16/05/2014</a:t>
+              <a:t>22/05/2014</a:t>
             </a:fld>
             <a:endParaRPr lang="pt-BR"/>
           </a:p>
@@ -24617,7 +23768,7 @@
             <a:fld id="{229FDC3E-7424-49CF-AF38-AA35F4C77C8D}" type="datetimeFigureOut">
               <a:rPr lang="pt-BR" smtClean="0"/>
               <a:pPr/>
-              <a:t>16/05/2014</a:t>
+              <a:t>22/05/2014</a:t>
             </a:fld>
             <a:endParaRPr lang="pt-BR"/>
           </a:p>
@@ -24792,7 +23943,7 @@
             <a:fld id="{229FDC3E-7424-49CF-AF38-AA35F4C77C8D}" type="datetimeFigureOut">
               <a:rPr lang="pt-BR" smtClean="0"/>
               <a:pPr/>
-              <a:t>16/05/2014</a:t>
+              <a:t>22/05/2014</a:t>
             </a:fld>
             <a:endParaRPr lang="pt-BR"/>
           </a:p>
@@ -24884,7 +24035,7 @@
             <a:fld id="{229FDC3E-7424-49CF-AF38-AA35F4C77C8D}" type="datetimeFigureOut">
               <a:rPr lang="pt-BR" smtClean="0"/>
               <a:pPr/>
-              <a:t>16/05/2014</a:t>
+              <a:t>22/05/2014</a:t>
             </a:fld>
             <a:endParaRPr lang="pt-BR"/>
           </a:p>
@@ -25181,7 +24332,7 @@
             <a:fld id="{229FDC3E-7424-49CF-AF38-AA35F4C77C8D}" type="datetimeFigureOut">
               <a:rPr lang="pt-BR" smtClean="0"/>
               <a:pPr/>
-              <a:t>16/05/2014</a:t>
+              <a:t>22/05/2014</a:t>
             </a:fld>
             <a:endParaRPr lang="pt-BR"/>
           </a:p>
@@ -25317,7 +24468,7 @@
             <a:fld id="{229FDC3E-7424-49CF-AF38-AA35F4C77C8D}" type="datetimeFigureOut">
               <a:rPr lang="pt-BR" smtClean="0"/>
               <a:pPr/>
-              <a:t>16/05/2014</a:t>
+              <a:t>22/05/2014</a:t>
             </a:fld>
             <a:endParaRPr lang="pt-BR"/>
           </a:p>
@@ -25622,7 +24773,7 @@
             <a:fld id="{229FDC3E-7424-49CF-AF38-AA35F4C77C8D}" type="datetimeFigureOut">
               <a:rPr lang="pt-BR" smtClean="0"/>
               <a:pPr/>
-              <a:t>16/05/2014</a:t>
+              <a:t>22/05/2014</a:t>
             </a:fld>
             <a:endParaRPr lang="pt-BR"/>
           </a:p>
@@ -26387,7 +25538,7 @@
             <p:ph idx="1"/>
             <p:extLst>
               <p:ext uri="{D42A27DB-BD31-4B8C-83A1-F6EECF244321}">
-                <p14:modId xmlns:p14="http://schemas.microsoft.com/office/powerpoint/2010/main" val="2208909862"/>
+                <p14:modId xmlns:p14="http://schemas.microsoft.com/office/powerpoint/2010/main" xmlns="" val="2208909862"/>
               </p:ext>
             </p:extLst>
           </p:nvPr>
@@ -26743,7 +25894,7 @@
             <p:ph idx="1"/>
             <p:extLst>
               <p:ext uri="{D42A27DB-BD31-4B8C-83A1-F6EECF244321}">
-                <p14:modId xmlns:p14="http://schemas.microsoft.com/office/powerpoint/2010/main" val="2118870426"/>
+                <p14:modId xmlns:p14="http://schemas.microsoft.com/office/powerpoint/2010/main" xmlns="" val="2118870426"/>
               </p:ext>
             </p:extLst>
           </p:nvPr>
@@ -26823,7 +25974,7 @@
             <p:ph idx="1"/>
             <p:extLst>
               <p:ext uri="{D42A27DB-BD31-4B8C-83A1-F6EECF244321}">
-                <p14:modId xmlns:p14="http://schemas.microsoft.com/office/powerpoint/2010/main" val="736405372"/>
+                <p14:modId xmlns:p14="http://schemas.microsoft.com/office/powerpoint/2010/main" xmlns="" val="736405372"/>
               </p:ext>
             </p:extLst>
           </p:nvPr>

</xml_diff>

<commit_message>
2014 06 03 15:00
#3
</commit_message>
<xml_diff>
--- a/SAS/Planejamento/Docs/#3 - Apresentação do projeto.pptx
+++ b/SAS/Planejamento/Docs/#3 - Apresentação do projeto.pptx
@@ -4971,7 +4971,11 @@
         <a:p>
           <a:r>
             <a:rPr lang="pt-BR" sz="1600" dirty="0" smtClean="0"/>
-            <a:t>Ricardo  Design gráfico </a:t>
+            <a:t>Ricardo  Design </a:t>
+          </a:r>
+          <a:r>
+            <a:rPr lang="pt-BR" sz="1600" dirty="0" smtClean="0"/>
+            <a:t>gráfico</a:t>
           </a:r>
           <a:endParaRPr lang="pt-BR" sz="1600" dirty="0"/>
         </a:p>
@@ -5142,6 +5146,51 @@
         </a:p>
       </dgm:t>
     </dgm:pt>
+    <dgm:pt modelId="{173220D9-50C9-488E-A9A9-489CC4741688}">
+      <dgm:prSet phldrT="[Texto]" custT="1"/>
+      <dgm:spPr>
+        <a:solidFill>
+          <a:schemeClr val="accent6">
+            <a:lumMod val="60000"/>
+            <a:lumOff val="40000"/>
+            <a:alpha val="90000"/>
+          </a:schemeClr>
+        </a:solidFill>
+      </dgm:spPr>
+      <dgm:t>
+        <a:bodyPr/>
+        <a:lstStyle/>
+        <a:p>
+          <a:r>
+            <a:rPr lang="pt-BR" sz="1600" dirty="0" smtClean="0"/>
+            <a:t>Marlon   Design gráfico</a:t>
+          </a:r>
+          <a:endParaRPr lang="pt-BR" sz="1600" dirty="0"/>
+        </a:p>
+      </dgm:t>
+    </dgm:pt>
+    <dgm:pt modelId="{697FBDF5-834B-4E5D-BD0B-12A48E5AAFF4}" type="parTrans" cxnId="{D46377DF-2182-4F84-AFF5-DB9944A33CEB}">
+      <dgm:prSet/>
+      <dgm:spPr/>
+      <dgm:t>
+        <a:bodyPr/>
+        <a:lstStyle/>
+        <a:p>
+          <a:endParaRPr lang="pt-BR"/>
+        </a:p>
+      </dgm:t>
+    </dgm:pt>
+    <dgm:pt modelId="{5A7C2A10-2078-49E3-9412-D762C6EE25B3}" type="sibTrans" cxnId="{D46377DF-2182-4F84-AFF5-DB9944A33CEB}">
+      <dgm:prSet/>
+      <dgm:spPr/>
+      <dgm:t>
+        <a:bodyPr/>
+        <a:lstStyle/>
+        <a:p>
+          <a:endParaRPr lang="pt-BR"/>
+        </a:p>
+      </dgm:t>
+    </dgm:pt>
     <dgm:pt modelId="{9951C6AC-0F0C-48FA-BECF-6C3F336159BF}" type="pres">
       <dgm:prSet presAssocID="{E42DA33D-4309-45A4-8090-C7C1B8DE2840}" presName="Name0" presStyleCnt="0">
         <dgm:presLayoutVars>
@@ -5314,6 +5363,7 @@
   </dgm:ptLst>
   <dgm:cxnLst>
     <dgm:cxn modelId="{49439F5F-703F-42C8-AC41-9D10F0F390C7}" srcId="{C9FFFE1F-6078-4D82-87D0-BC919E87007C}" destId="{3D263D67-4D7A-41A5-91A5-670388FEE69F}" srcOrd="0" destOrd="0" parTransId="{ACF50AC0-88E8-48BB-8EA1-B472F428EFC8}" sibTransId="{E1C076EE-C718-4411-AC8A-F6087CE2E2FC}"/>
+    <dgm:cxn modelId="{5841D8E5-D5C7-4B41-9DAE-560DF7678DA7}" type="presOf" srcId="{173220D9-50C9-488E-A9A9-489CC4741688}" destId="{4069C5B0-E0D3-47C9-9E5F-416939C594B9}" srcOrd="0" destOrd="3" presId="urn:microsoft.com/office/officeart/2005/8/layout/vList5"/>
     <dgm:cxn modelId="{29B6EE33-46BD-4DFF-8EAB-6F54D53EE694}" srcId="{7204C1C4-4A05-4E69-9F7B-60981284C004}" destId="{FEEFF06B-F309-4B5C-9120-F2D5BB2A0B0A}" srcOrd="0" destOrd="0" parTransId="{92393A6B-0584-45D2-B927-C5E52B55B04B}" sibTransId="{9A34E78C-3E18-40E0-9559-08591574FBDD}"/>
     <dgm:cxn modelId="{F8EDE821-F4CD-4FD2-80DE-63681A6BFEE6}" type="presOf" srcId="{8CD26415-961D-4B68-B921-E5200F5307C6}" destId="{7991AEF3-84F5-4F2F-9A87-D93011516A86}" srcOrd="0" destOrd="0" presId="urn:microsoft.com/office/officeart/2005/8/layout/vList5"/>
     <dgm:cxn modelId="{E320DCA1-229B-464B-A3C2-83EF157F38FD}" type="presOf" srcId="{FEEFF06B-F309-4B5C-9120-F2D5BB2A0B0A}" destId="{4069C5B0-E0D3-47C9-9E5F-416939C594B9}" srcOrd="0" destOrd="0" presId="urn:microsoft.com/office/officeart/2005/8/layout/vList5"/>
@@ -5329,6 +5379,7 @@
     <dgm:cxn modelId="{87BA7E12-F7AF-46BE-8604-29232418CB3A}" srcId="{E42DA33D-4309-45A4-8090-C7C1B8DE2840}" destId="{7204C1C4-4A05-4E69-9F7B-60981284C004}" srcOrd="0" destOrd="0" parTransId="{4413B713-B44E-40B8-B9EC-C52CD6FE6A10}" sibTransId="{03005108-F32D-4EFF-9439-890CCA627D66}"/>
     <dgm:cxn modelId="{83312643-ADFE-4B1B-815A-D60947C8A4EC}" srcId="{7204C1C4-4A05-4E69-9F7B-60981284C004}" destId="{CD90799B-3B74-4BC7-8657-98A1B4DCC681}" srcOrd="1" destOrd="0" parTransId="{751EC021-411F-4A76-B34F-42C814479026}" sibTransId="{7A7CB2A3-1623-4099-B0DA-33EDC01CA133}"/>
     <dgm:cxn modelId="{02D36449-91AF-4126-9259-E191C70B70F8}" type="presOf" srcId="{3D263D67-4D7A-41A5-91A5-670388FEE69F}" destId="{232E8D04-E732-492E-A284-139D99DFE02C}" srcOrd="0" destOrd="0" presId="urn:microsoft.com/office/officeart/2005/8/layout/vList5"/>
+    <dgm:cxn modelId="{D46377DF-2182-4F84-AFF5-DB9944A33CEB}" srcId="{7204C1C4-4A05-4E69-9F7B-60981284C004}" destId="{173220D9-50C9-488E-A9A9-489CC4741688}" srcOrd="3" destOrd="0" parTransId="{697FBDF5-834B-4E5D-BD0B-12A48E5AAFF4}" sibTransId="{5A7C2A10-2078-49E3-9412-D762C6EE25B3}"/>
     <dgm:cxn modelId="{2F03713C-0490-4725-99D7-5056B7C29DD9}" type="presOf" srcId="{E42DA33D-4309-45A4-8090-C7C1B8DE2840}" destId="{9951C6AC-0F0C-48FA-BECF-6C3F336159BF}" srcOrd="0" destOrd="0" presId="urn:microsoft.com/office/officeart/2005/8/layout/vList5"/>
     <dgm:cxn modelId="{7B753C74-0022-47C2-9FF5-93322A5AF332}" type="presOf" srcId="{7204C1C4-4A05-4E69-9F7B-60981284C004}" destId="{83285697-B771-41E8-BF80-D6B7B2E260A7}" srcOrd="0" destOrd="0" presId="urn:microsoft.com/office/officeart/2005/8/layout/vList5"/>
     <dgm:cxn modelId="{8A68C0B9-F522-4B3B-9EBF-E7A9F6BA3F83}" type="presOf" srcId="{F764DBA7-A3E6-41AE-AAE3-82E4B8468FDE}" destId="{DE3A8CA3-F5E7-47D6-9409-0DAEFC3883C5}" srcOrd="0" destOrd="0" presId="urn:microsoft.com/office/officeart/2005/8/layout/vList5"/>
@@ -5973,8 +6024,8 @@
     <dgm:cxn modelId="{AE01CECD-7460-4EE6-9855-462A6BAC54CD}" type="presOf" srcId="{21736AD5-ED16-41EE-9520-03DEC94C9DD9}" destId="{1993AEF3-68C8-4F83-9F1E-D1B7B5B4963C}" srcOrd="0" destOrd="0" presId="urn:microsoft.com/office/officeart/2005/8/layout/process3"/>
     <dgm:cxn modelId="{9C9CCD84-152C-4BF0-AE56-02A77DCE9308}" type="presOf" srcId="{AD7A2D0A-69C1-40D4-AC3C-50ACA39C45C1}" destId="{944B484B-F688-4CFA-A4FB-08B237CA5903}" srcOrd="1" destOrd="0" presId="urn:microsoft.com/office/officeart/2005/8/layout/process3"/>
     <dgm:cxn modelId="{D1284BD6-E3DA-48A8-BFF9-25C5710CED70}" type="presOf" srcId="{4BA36FF7-0F0F-4341-A68C-01E8516603CD}" destId="{209FD6B3-0ECB-4203-B962-7559934405BD}" srcOrd="0" destOrd="0" presId="urn:microsoft.com/office/officeart/2005/8/layout/process3"/>
+    <dgm:cxn modelId="{7A1F2110-9C05-4201-A75F-73284CDE0F86}" srcId="{4BA36FF7-0F0F-4341-A68C-01E8516603CD}" destId="{AB2E5A07-628C-4E92-90B5-D0FC29CDD9C7}" srcOrd="1" destOrd="0" parTransId="{4015142C-E082-4615-B7AB-FB0D2987A9AC}" sibTransId="{1A383F36-FE35-43F6-9A56-87C1C2601885}"/>
     <dgm:cxn modelId="{7DDFCDF5-FB4B-4B56-AB28-D717E8E38C18}" type="presOf" srcId="{AAA7816F-0D18-434B-AF27-E1709A042EA5}" destId="{A890346F-3222-4081-BF76-FED6671C2558}" srcOrd="1" destOrd="0" presId="urn:microsoft.com/office/officeart/2005/8/layout/process3"/>
-    <dgm:cxn modelId="{7A1F2110-9C05-4201-A75F-73284CDE0F86}" srcId="{4BA36FF7-0F0F-4341-A68C-01E8516603CD}" destId="{AB2E5A07-628C-4E92-90B5-D0FC29CDD9C7}" srcOrd="1" destOrd="0" parTransId="{4015142C-E082-4615-B7AB-FB0D2987A9AC}" sibTransId="{1A383F36-FE35-43F6-9A56-87C1C2601885}"/>
     <dgm:cxn modelId="{7F41E571-0B1D-42DB-A0D6-32AC8948638C}" type="presOf" srcId="{AB2E5A07-628C-4E92-90B5-D0FC29CDD9C7}" destId="{A64C8272-FC1A-4572-A0B1-A3C36EACD2B6}" srcOrd="0" destOrd="1" presId="urn:microsoft.com/office/officeart/2005/8/layout/process3"/>
     <dgm:cxn modelId="{5A2ECE84-5973-469B-B8D7-72377C33E035}" type="presOf" srcId="{AAA7816F-0D18-434B-AF27-E1709A042EA5}" destId="{1390A124-BEDA-4A49-9B1B-0ED2FB571A6C}" srcOrd="0" destOrd="0" presId="urn:microsoft.com/office/officeart/2005/8/layout/process3"/>
     <dgm:cxn modelId="{E6108260-E385-432B-A806-C31C8E849437}" srcId="{4BA36FF7-0F0F-4341-A68C-01E8516603CD}" destId="{B2D64904-4778-414A-935C-AFC992C15E50}" srcOrd="0" destOrd="0" parTransId="{3886B039-ED5A-4C35-9224-7296F3AB00E8}" sibTransId="{F27A2EE6-AA94-4404-920A-4FEA4A59E153}"/>
@@ -8967,8 +9018,8 @@
       </dsp:nvSpPr>
       <dsp:spPr>
         <a:xfrm rot="5400000">
-          <a:off x="5471223" y="-2232760"/>
-          <a:ext cx="871601" cy="5559552"/>
+          <a:off x="5436808" y="-2189562"/>
+          <a:ext cx="940430" cy="5559552"/>
         </a:xfrm>
         <a:prstGeom prst="round2SameRect">
           <a:avLst/>
@@ -9082,14 +9133,37 @@
           </a:pPr>
           <a:r>
             <a:rPr lang="pt-BR" sz="1600" kern="1200" dirty="0" smtClean="0"/>
-            <a:t>Ricardo  Design gráfico </a:t>
+            <a:t>Ricardo  Design </a:t>
+          </a:r>
+          <a:r>
+            <a:rPr lang="pt-BR" sz="1600" kern="1200" dirty="0" smtClean="0"/>
+            <a:t>gráfico</a:t>
           </a:r>
           <a:endParaRPr lang="pt-BR" sz="1600" kern="1200" dirty="0"/>
         </a:p>
+        <a:p>
+          <a:pPr marL="171450" lvl="1" indent="-171450" algn="l" defTabSz="711200">
+            <a:lnSpc>
+              <a:spcPct val="90000"/>
+            </a:lnSpc>
+            <a:spcBef>
+              <a:spcPct val="0"/>
+            </a:spcBef>
+            <a:spcAft>
+              <a:spcPct val="15000"/>
+            </a:spcAft>
+            <a:buChar char="••"/>
+          </a:pPr>
+          <a:r>
+            <a:rPr lang="pt-BR" sz="1600" kern="1200" dirty="0" smtClean="0"/>
+            <a:t>Marlon   Design gráfico</a:t>
+          </a:r>
+          <a:endParaRPr lang="pt-BR" sz="1600" kern="1200" dirty="0"/>
+        </a:p>
       </dsp:txBody>
       <dsp:txXfrm rot="5400000">
-        <a:off x="5471223" y="-2232760"/>
-        <a:ext cx="871601" cy="5559552"/>
+        <a:off x="5436808" y="-2189562"/>
+        <a:ext cx="940430" cy="5559552"/>
       </dsp:txXfrm>
     </dsp:sp>
     <dsp:sp modelId="{83285697-B771-41E8-BF80-D6B7B2E260A7}">
@@ -9100,7 +9174,7 @@
       <dsp:spPr>
         <a:xfrm>
           <a:off x="0" y="0"/>
-          <a:ext cx="3127248" cy="1089501"/>
+          <a:ext cx="3127248" cy="1175538"/>
         </a:xfrm>
         <a:prstGeom prst="roundRect">
           <a:avLst/>
@@ -9243,7 +9317,7 @@
       </dsp:txBody>
       <dsp:txXfrm>
         <a:off x="0" y="0"/>
-        <a:ext cx="3127248" cy="1089501"/>
+        <a:ext cx="3127248" cy="1175538"/>
       </dsp:txXfrm>
     </dsp:sp>
     <dsp:sp modelId="{76D300D9-3977-4D02-95E9-3905CCACBD1B}">
@@ -9253,8 +9327,8 @@
       </dsp:nvSpPr>
       <dsp:spPr>
         <a:xfrm rot="5400000">
-          <a:off x="5471223" y="-1088783"/>
-          <a:ext cx="871601" cy="5559552"/>
+          <a:off x="5436808" y="-955247"/>
+          <a:ext cx="940430" cy="5559552"/>
         </a:xfrm>
         <a:prstGeom prst="round2SameRect">
           <a:avLst/>
@@ -9332,8 +9406,8 @@
         </a:p>
       </dsp:txBody>
       <dsp:txXfrm rot="5400000">
-        <a:off x="5471223" y="-1088783"/>
-        <a:ext cx="871601" cy="5559552"/>
+        <a:off x="5436808" y="-955247"/>
+        <a:ext cx="940430" cy="5559552"/>
       </dsp:txXfrm>
     </dsp:sp>
     <dsp:sp modelId="{1C4CF5AE-B0A9-4E79-99D0-8192DD361FD5}">
@@ -9343,8 +9417,8 @@
       </dsp:nvSpPr>
       <dsp:spPr>
         <a:xfrm>
-          <a:off x="0" y="1146241"/>
-          <a:ext cx="3127248" cy="1089501"/>
+          <a:off x="0" y="1236759"/>
+          <a:ext cx="3127248" cy="1175538"/>
         </a:xfrm>
         <a:prstGeom prst="roundRect">
           <a:avLst/>
@@ -9486,8 +9560,8 @@
         </a:p>
       </dsp:txBody>
       <dsp:txXfrm>
-        <a:off x="0" y="1146241"/>
-        <a:ext cx="3127248" cy="1089501"/>
+        <a:off x="0" y="1236759"/>
+        <a:ext cx="3127248" cy="1175538"/>
       </dsp:txXfrm>
     </dsp:sp>
     <dsp:sp modelId="{7991AEF3-84F5-4F2F-9A87-D93011516A86}">
@@ -9497,8 +9571,8 @@
       </dsp:nvSpPr>
       <dsp:spPr>
         <a:xfrm rot="5400000">
-          <a:off x="5471223" y="55193"/>
-          <a:ext cx="871601" cy="5559552"/>
+          <a:off x="5436808" y="279068"/>
+          <a:ext cx="940430" cy="5559552"/>
         </a:xfrm>
         <a:prstGeom prst="round2SameRect">
           <a:avLst/>
@@ -9584,8 +9658,8 @@
         </a:p>
       </dsp:txBody>
       <dsp:txXfrm rot="5400000">
-        <a:off x="5471223" y="55193"/>
-        <a:ext cx="871601" cy="5559552"/>
+        <a:off x="5436808" y="279068"/>
+        <a:ext cx="940430" cy="5559552"/>
       </dsp:txXfrm>
     </dsp:sp>
     <dsp:sp modelId="{DE3A8CA3-F5E7-47D6-9409-0DAEFC3883C5}">
@@ -9595,8 +9669,8 @@
       </dsp:nvSpPr>
       <dsp:spPr>
         <a:xfrm>
-          <a:off x="0" y="2290218"/>
-          <a:ext cx="3127248" cy="1089501"/>
+          <a:off x="0" y="2471074"/>
+          <a:ext cx="3127248" cy="1175538"/>
         </a:xfrm>
         <a:prstGeom prst="roundRect">
           <a:avLst/>
@@ -9738,8 +9812,8 @@
         </a:p>
       </dsp:txBody>
       <dsp:txXfrm>
-        <a:off x="0" y="2290218"/>
-        <a:ext cx="3127248" cy="1089501"/>
+        <a:off x="0" y="2471074"/>
+        <a:ext cx="3127248" cy="1175538"/>
       </dsp:txXfrm>
     </dsp:sp>
     <dsp:sp modelId="{232E8D04-E732-492E-A284-139D99DFE02C}">
@@ -9749,8 +9823,8 @@
       </dsp:nvSpPr>
       <dsp:spPr>
         <a:xfrm rot="5400000">
-          <a:off x="5471223" y="1199170"/>
-          <a:ext cx="871601" cy="5559552"/>
+          <a:off x="5436808" y="1513383"/>
+          <a:ext cx="940430" cy="5559552"/>
         </a:xfrm>
         <a:prstGeom prst="round2SameRect">
           <a:avLst/>
@@ -9832,8 +9906,8 @@
         </a:p>
       </dsp:txBody>
       <dsp:txXfrm rot="5400000">
-        <a:off x="5471223" y="1199170"/>
-        <a:ext cx="871601" cy="5559552"/>
+        <a:off x="5436808" y="1513383"/>
+        <a:ext cx="940430" cy="5559552"/>
       </dsp:txXfrm>
     </dsp:sp>
     <dsp:sp modelId="{F985ABD3-DA1F-4E90-952D-1C16820F198E}">
@@ -9843,8 +9917,8 @@
       </dsp:nvSpPr>
       <dsp:spPr>
         <a:xfrm>
-          <a:off x="0" y="3434195"/>
-          <a:ext cx="3127248" cy="1089501"/>
+          <a:off x="0" y="3705390"/>
+          <a:ext cx="3127248" cy="1175538"/>
         </a:xfrm>
         <a:prstGeom prst="roundRect">
           <a:avLst/>
@@ -9986,8 +10060,8 @@
         </a:p>
       </dsp:txBody>
       <dsp:txXfrm>
-        <a:off x="0" y="3434195"/>
-        <a:ext cx="3127248" cy="1089501"/>
+        <a:off x="0" y="3705390"/>
+        <a:ext cx="3127248" cy="1175538"/>
       </dsp:txXfrm>
     </dsp:sp>
   </dsp:spTree>
@@ -13769,6 +13843,972 @@
       <dsp:cNvGrpSpPr/>
     </dsp:nvGrpSpPr>
     <dsp:grpSpPr/>
+    <dsp:sp modelId="{AA8514B8-7EBB-4287-ACDB-81BB8EE3A65E}">
+      <dsp:nvSpPr>
+        <dsp:cNvPr id="0" name=""/>
+        <dsp:cNvSpPr/>
+      </dsp:nvSpPr>
+      <dsp:spPr>
+        <a:xfrm>
+          <a:off x="0" y="327899"/>
+          <a:ext cx="8686800" cy="504000"/>
+        </a:xfrm>
+        <a:prstGeom prst="rect">
+          <a:avLst/>
+        </a:prstGeom>
+        <a:gradFill rotWithShape="1">
+          <a:gsLst>
+            <a:gs pos="0">
+              <a:schemeClr val="accent6">
+                <a:tint val="30000"/>
+                <a:satMod val="250000"/>
+              </a:schemeClr>
+            </a:gs>
+            <a:gs pos="72000">
+              <a:schemeClr val="accent6">
+                <a:tint val="75000"/>
+                <a:satMod val="210000"/>
+              </a:schemeClr>
+            </a:gs>
+            <a:gs pos="100000">
+              <a:schemeClr val="accent6">
+                <a:tint val="85000"/>
+                <a:satMod val="210000"/>
+              </a:schemeClr>
+            </a:gs>
+          </a:gsLst>
+          <a:lin ang="5400000" scaled="1"/>
+        </a:gradFill>
+        <a:ln w="10000" cap="flat" cmpd="sng" algn="ctr">
+          <a:solidFill>
+            <a:schemeClr val="accent6"/>
+          </a:solidFill>
+          <a:prstDash val="solid"/>
+        </a:ln>
+        <a:effectLst>
+          <a:outerShdw blurRad="76200" dist="50800" dir="5400000" rotWithShape="0">
+            <a:srgbClr val="4E3B30">
+              <a:alpha val="60000"/>
+            </a:srgbClr>
+          </a:outerShdw>
+        </a:effectLst>
+        <a:scene3d>
+          <a:camera prst="orthographicFront"/>
+          <a:lightRig rig="flat" dir="t"/>
+        </a:scene3d>
+        <a:sp3d z="190500" extrusionH="12700"/>
+      </dsp:spPr>
+      <dsp:style>
+        <a:lnRef idx="1">
+          <a:schemeClr val="accent6"/>
+        </a:lnRef>
+        <a:fillRef idx="2">
+          <a:schemeClr val="accent6"/>
+        </a:fillRef>
+        <a:effectRef idx="1">
+          <a:schemeClr val="accent6"/>
+        </a:effectRef>
+        <a:fontRef idx="minor">
+          <a:schemeClr val="dk1"/>
+        </a:fontRef>
+      </dsp:style>
+    </dsp:sp>
+    <dsp:sp modelId="{B171C0C5-1265-474F-9A24-5267C4DEA6BB}">
+      <dsp:nvSpPr>
+        <dsp:cNvPr id="0" name=""/>
+        <dsp:cNvSpPr/>
+      </dsp:nvSpPr>
+      <dsp:spPr>
+        <a:xfrm>
+          <a:off x="434340" y="0"/>
+          <a:ext cx="6080760" cy="590400"/>
+        </a:xfrm>
+        <a:prstGeom prst="roundRect">
+          <a:avLst/>
+        </a:prstGeom>
+        <a:solidFill>
+          <a:srgbClr val="92D050"/>
+        </a:solidFill>
+        <a:ln>
+          <a:noFill/>
+        </a:ln>
+        <a:effectLst>
+          <a:outerShdw blurRad="76200" dist="50800" dir="5400000" rotWithShape="0">
+            <a:srgbClr val="4E3B30">
+              <a:alpha val="60000"/>
+            </a:srgbClr>
+          </a:outerShdw>
+        </a:effectLst>
+        <a:scene3d>
+          <a:camera prst="orthographicFront"/>
+          <a:lightRig rig="flat" dir="t"/>
+        </a:scene3d>
+        <a:sp3d contourW="12700" prstMaterial="matte">
+          <a:bevelT w="60000" h="50800"/>
+          <a:contourClr>
+            <a:schemeClr val="accent6">
+              <a:shade val="60000"/>
+              <a:satMod val="110000"/>
+            </a:schemeClr>
+          </a:contourClr>
+        </a:sp3d>
+      </dsp:spPr>
+      <dsp:style>
+        <a:lnRef idx="0">
+          <a:schemeClr val="accent6"/>
+        </a:lnRef>
+        <a:fillRef idx="3">
+          <a:schemeClr val="accent6"/>
+        </a:fillRef>
+        <a:effectRef idx="3">
+          <a:schemeClr val="accent6"/>
+        </a:effectRef>
+        <a:fontRef idx="minor">
+          <a:schemeClr val="lt1"/>
+        </a:fontRef>
+      </dsp:style>
+      <dsp:txBody>
+        <a:bodyPr spcFirstLastPara="0" vert="horz" wrap="square" lIns="229838" tIns="0" rIns="229838" bIns="0" numCol="1" spcCol="1270" anchor="ctr" anchorCtr="0">
+          <a:noAutofit/>
+        </a:bodyPr>
+        <a:lstStyle/>
+        <a:p>
+          <a:pPr lvl="0" algn="l" defTabSz="889000">
+            <a:lnSpc>
+              <a:spcPct val="90000"/>
+            </a:lnSpc>
+            <a:spcBef>
+              <a:spcPct val="0"/>
+            </a:spcBef>
+            <a:spcAft>
+              <a:spcPct val="35000"/>
+            </a:spcAft>
+          </a:pPr>
+          <a:r>
+            <a:rPr lang="pt-BR" sz="2000" b="1" kern="1200" smtClean="0">
+              <a:solidFill>
+                <a:srgbClr val="0070C0"/>
+              </a:solidFill>
+            </a:rPr>
+            <a:t>Dinamização de registro de atividades</a:t>
+          </a:r>
+          <a:endParaRPr lang="pt-BR" sz="2000" b="1" kern="1200" dirty="0">
+            <a:solidFill>
+              <a:srgbClr val="0070C0"/>
+            </a:solidFill>
+          </a:endParaRPr>
+        </a:p>
+      </dsp:txBody>
+      <dsp:txXfrm>
+        <a:off x="434340" y="0"/>
+        <a:ext cx="6080760" cy="590400"/>
+      </dsp:txXfrm>
+    </dsp:sp>
+    <dsp:sp modelId="{122429B3-75B2-4400-B819-CC67C8478699}">
+      <dsp:nvSpPr>
+        <dsp:cNvPr id="0" name=""/>
+        <dsp:cNvSpPr/>
+      </dsp:nvSpPr>
+      <dsp:spPr>
+        <a:xfrm>
+          <a:off x="0" y="1235099"/>
+          <a:ext cx="8686800" cy="504000"/>
+        </a:xfrm>
+        <a:prstGeom prst="rect">
+          <a:avLst/>
+        </a:prstGeom>
+        <a:gradFill rotWithShape="1">
+          <a:gsLst>
+            <a:gs pos="0">
+              <a:schemeClr val="accent6">
+                <a:tint val="30000"/>
+                <a:satMod val="250000"/>
+              </a:schemeClr>
+            </a:gs>
+            <a:gs pos="72000">
+              <a:schemeClr val="accent6">
+                <a:tint val="75000"/>
+                <a:satMod val="210000"/>
+              </a:schemeClr>
+            </a:gs>
+            <a:gs pos="100000">
+              <a:schemeClr val="accent6">
+                <a:tint val="85000"/>
+                <a:satMod val="210000"/>
+              </a:schemeClr>
+            </a:gs>
+          </a:gsLst>
+          <a:lin ang="5400000" scaled="1"/>
+        </a:gradFill>
+        <a:ln w="10000" cap="flat" cmpd="sng" algn="ctr">
+          <a:solidFill>
+            <a:schemeClr val="accent6"/>
+          </a:solidFill>
+          <a:prstDash val="solid"/>
+        </a:ln>
+        <a:effectLst>
+          <a:outerShdw blurRad="76200" dist="50800" dir="5400000" rotWithShape="0">
+            <a:srgbClr val="4E3B30">
+              <a:alpha val="60000"/>
+            </a:srgbClr>
+          </a:outerShdw>
+        </a:effectLst>
+        <a:scene3d>
+          <a:camera prst="orthographicFront"/>
+          <a:lightRig rig="flat" dir="t"/>
+        </a:scene3d>
+        <a:sp3d z="190500" extrusionH="12700"/>
+      </dsp:spPr>
+      <dsp:style>
+        <a:lnRef idx="1">
+          <a:schemeClr val="accent6"/>
+        </a:lnRef>
+        <a:fillRef idx="2">
+          <a:schemeClr val="accent6"/>
+        </a:fillRef>
+        <a:effectRef idx="1">
+          <a:schemeClr val="accent6"/>
+        </a:effectRef>
+        <a:fontRef idx="minor">
+          <a:schemeClr val="dk1"/>
+        </a:fontRef>
+      </dsp:style>
+    </dsp:sp>
+    <dsp:sp modelId="{9939078C-FCDB-4354-9260-A7140D211969}">
+      <dsp:nvSpPr>
+        <dsp:cNvPr id="0" name=""/>
+        <dsp:cNvSpPr/>
+      </dsp:nvSpPr>
+      <dsp:spPr>
+        <a:xfrm>
+          <a:off x="434340" y="895849"/>
+          <a:ext cx="6080760" cy="590400"/>
+        </a:xfrm>
+        <a:prstGeom prst="roundRect">
+          <a:avLst/>
+        </a:prstGeom>
+        <a:solidFill>
+          <a:srgbClr val="92D050"/>
+        </a:solidFill>
+        <a:ln>
+          <a:noFill/>
+        </a:ln>
+        <a:effectLst>
+          <a:outerShdw blurRad="76200" dist="50800" dir="5400000" rotWithShape="0">
+            <a:srgbClr val="4E3B30">
+              <a:alpha val="60000"/>
+            </a:srgbClr>
+          </a:outerShdw>
+        </a:effectLst>
+        <a:scene3d>
+          <a:camera prst="orthographicFront"/>
+          <a:lightRig rig="flat" dir="t"/>
+        </a:scene3d>
+        <a:sp3d contourW="12700" prstMaterial="matte">
+          <a:bevelT w="60000" h="50800"/>
+          <a:contourClr>
+            <a:schemeClr val="accent6">
+              <a:shade val="60000"/>
+              <a:satMod val="110000"/>
+            </a:schemeClr>
+          </a:contourClr>
+        </a:sp3d>
+      </dsp:spPr>
+      <dsp:style>
+        <a:lnRef idx="0">
+          <a:schemeClr val="accent6"/>
+        </a:lnRef>
+        <a:fillRef idx="3">
+          <a:schemeClr val="accent6"/>
+        </a:fillRef>
+        <a:effectRef idx="3">
+          <a:schemeClr val="accent6"/>
+        </a:effectRef>
+        <a:fontRef idx="minor">
+          <a:schemeClr val="lt1"/>
+        </a:fontRef>
+      </dsp:style>
+      <dsp:txBody>
+        <a:bodyPr spcFirstLastPara="0" vert="horz" wrap="square" lIns="229838" tIns="0" rIns="229838" bIns="0" numCol="1" spcCol="1270" anchor="ctr" anchorCtr="0">
+          <a:noAutofit/>
+        </a:bodyPr>
+        <a:lstStyle/>
+        <a:p>
+          <a:pPr lvl="0" algn="l" defTabSz="889000">
+            <a:lnSpc>
+              <a:spcPct val="90000"/>
+            </a:lnSpc>
+            <a:spcBef>
+              <a:spcPct val="0"/>
+            </a:spcBef>
+            <a:spcAft>
+              <a:spcPct val="35000"/>
+            </a:spcAft>
+          </a:pPr>
+          <a:r>
+            <a:rPr lang="pt-BR" sz="2000" b="1" kern="1200" smtClean="0">
+              <a:solidFill>
+                <a:srgbClr val="0070C0"/>
+              </a:solidFill>
+            </a:rPr>
+            <a:t> Acesso web em dispositivos moveis</a:t>
+          </a:r>
+          <a:endParaRPr lang="pt-BR" sz="2000" b="1" kern="1200" dirty="0">
+            <a:solidFill>
+              <a:srgbClr val="0070C0"/>
+            </a:solidFill>
+          </a:endParaRPr>
+        </a:p>
+      </dsp:txBody>
+      <dsp:txXfrm>
+        <a:off x="434340" y="895849"/>
+        <a:ext cx="6080760" cy="590400"/>
+      </dsp:txXfrm>
+    </dsp:sp>
+    <dsp:sp modelId="{06A3C85D-CDEB-4A13-9986-AD53F22D8EA9}">
+      <dsp:nvSpPr>
+        <dsp:cNvPr id="0" name=""/>
+        <dsp:cNvSpPr/>
+      </dsp:nvSpPr>
+      <dsp:spPr>
+        <a:xfrm>
+          <a:off x="0" y="2142299"/>
+          <a:ext cx="8686800" cy="504000"/>
+        </a:xfrm>
+        <a:prstGeom prst="rect">
+          <a:avLst/>
+        </a:prstGeom>
+        <a:gradFill rotWithShape="1">
+          <a:gsLst>
+            <a:gs pos="0">
+              <a:schemeClr val="accent6">
+                <a:tint val="30000"/>
+                <a:satMod val="250000"/>
+              </a:schemeClr>
+            </a:gs>
+            <a:gs pos="72000">
+              <a:schemeClr val="accent6">
+                <a:tint val="75000"/>
+                <a:satMod val="210000"/>
+              </a:schemeClr>
+            </a:gs>
+            <a:gs pos="100000">
+              <a:schemeClr val="accent6">
+                <a:tint val="85000"/>
+                <a:satMod val="210000"/>
+              </a:schemeClr>
+            </a:gs>
+          </a:gsLst>
+          <a:lin ang="5400000" scaled="1"/>
+        </a:gradFill>
+        <a:ln w="10000" cap="flat" cmpd="sng" algn="ctr">
+          <a:solidFill>
+            <a:schemeClr val="accent6"/>
+          </a:solidFill>
+          <a:prstDash val="solid"/>
+        </a:ln>
+        <a:effectLst>
+          <a:outerShdw blurRad="76200" dist="50800" dir="5400000" rotWithShape="0">
+            <a:srgbClr val="4E3B30">
+              <a:alpha val="60000"/>
+            </a:srgbClr>
+          </a:outerShdw>
+        </a:effectLst>
+        <a:scene3d>
+          <a:camera prst="orthographicFront"/>
+          <a:lightRig rig="flat" dir="t"/>
+        </a:scene3d>
+        <a:sp3d z="190500" extrusionH="12700"/>
+      </dsp:spPr>
+      <dsp:style>
+        <a:lnRef idx="1">
+          <a:schemeClr val="accent6"/>
+        </a:lnRef>
+        <a:fillRef idx="2">
+          <a:schemeClr val="accent6"/>
+        </a:fillRef>
+        <a:effectRef idx="1">
+          <a:schemeClr val="accent6"/>
+        </a:effectRef>
+        <a:fontRef idx="minor">
+          <a:schemeClr val="dk1"/>
+        </a:fontRef>
+      </dsp:style>
+    </dsp:sp>
+    <dsp:sp modelId="{D78DBF14-3A29-4E42-B56E-7380E92A6552}">
+      <dsp:nvSpPr>
+        <dsp:cNvPr id="0" name=""/>
+        <dsp:cNvSpPr/>
+      </dsp:nvSpPr>
+      <dsp:spPr>
+        <a:xfrm>
+          <a:off x="434340" y="1803049"/>
+          <a:ext cx="6080760" cy="590400"/>
+        </a:xfrm>
+        <a:prstGeom prst="roundRect">
+          <a:avLst/>
+        </a:prstGeom>
+        <a:solidFill>
+          <a:srgbClr val="92D050"/>
+        </a:solidFill>
+        <a:ln>
+          <a:noFill/>
+        </a:ln>
+        <a:effectLst>
+          <a:outerShdw blurRad="76200" dist="50800" dir="5400000" rotWithShape="0">
+            <a:srgbClr val="4E3B30">
+              <a:alpha val="60000"/>
+            </a:srgbClr>
+          </a:outerShdw>
+        </a:effectLst>
+        <a:scene3d>
+          <a:camera prst="orthographicFront"/>
+          <a:lightRig rig="flat" dir="t"/>
+        </a:scene3d>
+        <a:sp3d contourW="12700" prstMaterial="matte">
+          <a:bevelT w="60000" h="50800"/>
+          <a:contourClr>
+            <a:schemeClr val="accent6">
+              <a:shade val="60000"/>
+              <a:satMod val="110000"/>
+            </a:schemeClr>
+          </a:contourClr>
+        </a:sp3d>
+      </dsp:spPr>
+      <dsp:style>
+        <a:lnRef idx="0">
+          <a:schemeClr val="accent6"/>
+        </a:lnRef>
+        <a:fillRef idx="3">
+          <a:schemeClr val="accent6"/>
+        </a:fillRef>
+        <a:effectRef idx="3">
+          <a:schemeClr val="accent6"/>
+        </a:effectRef>
+        <a:fontRef idx="minor">
+          <a:schemeClr val="lt1"/>
+        </a:fontRef>
+      </dsp:style>
+      <dsp:txBody>
+        <a:bodyPr spcFirstLastPara="0" vert="horz" wrap="square" lIns="229838" tIns="0" rIns="229838" bIns="0" numCol="1" spcCol="1270" anchor="ctr" anchorCtr="0">
+          <a:noAutofit/>
+        </a:bodyPr>
+        <a:lstStyle/>
+        <a:p>
+          <a:pPr lvl="0" algn="l" defTabSz="889000">
+            <a:lnSpc>
+              <a:spcPct val="90000"/>
+            </a:lnSpc>
+            <a:spcBef>
+              <a:spcPct val="0"/>
+            </a:spcBef>
+            <a:spcAft>
+              <a:spcPct val="35000"/>
+            </a:spcAft>
+          </a:pPr>
+          <a:r>
+            <a:rPr lang="pt-BR" sz="2000" b="1" kern="1200" smtClean="0">
+              <a:solidFill>
+                <a:srgbClr val="0070C0"/>
+              </a:solidFill>
+            </a:rPr>
+            <a:t>Trabalho em grupo em ambiente multiusuário</a:t>
+          </a:r>
+          <a:endParaRPr lang="pt-BR" sz="2000" b="1" kern="1200" dirty="0">
+            <a:solidFill>
+              <a:srgbClr val="0070C0"/>
+            </a:solidFill>
+          </a:endParaRPr>
+        </a:p>
+      </dsp:txBody>
+      <dsp:txXfrm>
+        <a:off x="434340" y="1803049"/>
+        <a:ext cx="6080760" cy="590400"/>
+      </dsp:txXfrm>
+    </dsp:sp>
+    <dsp:sp modelId="{BC58E8B0-740A-43C6-B230-1401E78D7A5B}">
+      <dsp:nvSpPr>
+        <dsp:cNvPr id="0" name=""/>
+        <dsp:cNvSpPr/>
+      </dsp:nvSpPr>
+      <dsp:spPr>
+        <a:xfrm>
+          <a:off x="0" y="3049499"/>
+          <a:ext cx="8686800" cy="504000"/>
+        </a:xfrm>
+        <a:prstGeom prst="rect">
+          <a:avLst/>
+        </a:prstGeom>
+        <a:gradFill rotWithShape="1">
+          <a:gsLst>
+            <a:gs pos="0">
+              <a:schemeClr val="accent6">
+                <a:tint val="30000"/>
+                <a:satMod val="250000"/>
+              </a:schemeClr>
+            </a:gs>
+            <a:gs pos="72000">
+              <a:schemeClr val="accent6">
+                <a:tint val="75000"/>
+                <a:satMod val="210000"/>
+              </a:schemeClr>
+            </a:gs>
+            <a:gs pos="100000">
+              <a:schemeClr val="accent6">
+                <a:tint val="85000"/>
+                <a:satMod val="210000"/>
+              </a:schemeClr>
+            </a:gs>
+          </a:gsLst>
+          <a:lin ang="5400000" scaled="1"/>
+        </a:gradFill>
+        <a:ln w="10000" cap="flat" cmpd="sng" algn="ctr">
+          <a:solidFill>
+            <a:schemeClr val="accent6"/>
+          </a:solidFill>
+          <a:prstDash val="solid"/>
+        </a:ln>
+        <a:effectLst>
+          <a:outerShdw blurRad="76200" dist="50800" dir="5400000" rotWithShape="0">
+            <a:srgbClr val="4E3B30">
+              <a:alpha val="60000"/>
+            </a:srgbClr>
+          </a:outerShdw>
+        </a:effectLst>
+        <a:scene3d>
+          <a:camera prst="orthographicFront"/>
+          <a:lightRig rig="flat" dir="t"/>
+        </a:scene3d>
+        <a:sp3d z="190500" extrusionH="12700"/>
+      </dsp:spPr>
+      <dsp:style>
+        <a:lnRef idx="1">
+          <a:schemeClr val="accent6"/>
+        </a:lnRef>
+        <a:fillRef idx="2">
+          <a:schemeClr val="accent6"/>
+        </a:fillRef>
+        <a:effectRef idx="1">
+          <a:schemeClr val="accent6"/>
+        </a:effectRef>
+        <a:fontRef idx="minor">
+          <a:schemeClr val="dk1"/>
+        </a:fontRef>
+      </dsp:style>
+    </dsp:sp>
+    <dsp:sp modelId="{6C17C5F1-150A-491F-92CE-A1BE931BB55D}">
+      <dsp:nvSpPr>
+        <dsp:cNvPr id="0" name=""/>
+        <dsp:cNvSpPr/>
+      </dsp:nvSpPr>
+      <dsp:spPr>
+        <a:xfrm>
+          <a:off x="434340" y="2754299"/>
+          <a:ext cx="6080760" cy="590400"/>
+        </a:xfrm>
+        <a:prstGeom prst="roundRect">
+          <a:avLst/>
+        </a:prstGeom>
+        <a:solidFill>
+          <a:srgbClr val="92D050"/>
+        </a:solidFill>
+        <a:ln>
+          <a:noFill/>
+        </a:ln>
+        <a:effectLst>
+          <a:outerShdw blurRad="76200" dist="50800" dir="5400000" rotWithShape="0">
+            <a:srgbClr val="4E3B30">
+              <a:alpha val="60000"/>
+            </a:srgbClr>
+          </a:outerShdw>
+        </a:effectLst>
+        <a:scene3d>
+          <a:camera prst="orthographicFront"/>
+          <a:lightRig rig="flat" dir="t"/>
+        </a:scene3d>
+        <a:sp3d contourW="12700" prstMaterial="matte">
+          <a:bevelT w="60000" h="50800"/>
+          <a:contourClr>
+            <a:schemeClr val="accent6">
+              <a:shade val="60000"/>
+              <a:satMod val="110000"/>
+            </a:schemeClr>
+          </a:contourClr>
+        </a:sp3d>
+      </dsp:spPr>
+      <dsp:style>
+        <a:lnRef idx="0">
+          <a:schemeClr val="accent6"/>
+        </a:lnRef>
+        <a:fillRef idx="3">
+          <a:schemeClr val="accent6"/>
+        </a:fillRef>
+        <a:effectRef idx="3">
+          <a:schemeClr val="accent6"/>
+        </a:effectRef>
+        <a:fontRef idx="minor">
+          <a:schemeClr val="lt1"/>
+        </a:fontRef>
+      </dsp:style>
+      <dsp:txBody>
+        <a:bodyPr spcFirstLastPara="0" vert="horz" wrap="square" lIns="229838" tIns="0" rIns="229838" bIns="0" numCol="1" spcCol="1270" anchor="ctr" anchorCtr="0">
+          <a:noAutofit/>
+        </a:bodyPr>
+        <a:lstStyle/>
+        <a:p>
+          <a:pPr lvl="0" algn="l" defTabSz="889000">
+            <a:lnSpc>
+              <a:spcPct val="90000"/>
+            </a:lnSpc>
+            <a:spcBef>
+              <a:spcPct val="0"/>
+            </a:spcBef>
+            <a:spcAft>
+              <a:spcPct val="35000"/>
+            </a:spcAft>
+          </a:pPr>
+          <a:r>
+            <a:rPr lang="pt-BR" sz="2000" b="1" kern="1200" dirty="0" smtClean="0">
+              <a:solidFill>
+                <a:srgbClr val="0070C0"/>
+              </a:solidFill>
+            </a:rPr>
+            <a:t>Controles acadêmicos  </a:t>
+          </a:r>
+          <a:endParaRPr lang="pt-BR" sz="2000" b="1" kern="1200" dirty="0">
+            <a:solidFill>
+              <a:srgbClr val="0070C0"/>
+            </a:solidFill>
+          </a:endParaRPr>
+        </a:p>
+      </dsp:txBody>
+      <dsp:txXfrm>
+        <a:off x="434340" y="2754299"/>
+        <a:ext cx="6080760" cy="590400"/>
+      </dsp:txXfrm>
+    </dsp:sp>
+    <dsp:sp modelId="{7D8B9C6D-02C3-420B-906C-B43C36EE3306}">
+      <dsp:nvSpPr>
+        <dsp:cNvPr id="0" name=""/>
+        <dsp:cNvSpPr/>
+      </dsp:nvSpPr>
+      <dsp:spPr>
+        <a:xfrm>
+          <a:off x="0" y="3956699"/>
+          <a:ext cx="8686800" cy="504000"/>
+        </a:xfrm>
+        <a:prstGeom prst="rect">
+          <a:avLst/>
+        </a:prstGeom>
+        <a:gradFill rotWithShape="1">
+          <a:gsLst>
+            <a:gs pos="0">
+              <a:schemeClr val="accent6">
+                <a:tint val="30000"/>
+                <a:satMod val="250000"/>
+              </a:schemeClr>
+            </a:gs>
+            <a:gs pos="72000">
+              <a:schemeClr val="accent6">
+                <a:tint val="75000"/>
+                <a:satMod val="210000"/>
+              </a:schemeClr>
+            </a:gs>
+            <a:gs pos="100000">
+              <a:schemeClr val="accent6">
+                <a:tint val="85000"/>
+                <a:satMod val="210000"/>
+              </a:schemeClr>
+            </a:gs>
+          </a:gsLst>
+          <a:lin ang="5400000" scaled="1"/>
+        </a:gradFill>
+        <a:ln w="10000" cap="flat" cmpd="sng" algn="ctr">
+          <a:solidFill>
+            <a:schemeClr val="accent6"/>
+          </a:solidFill>
+          <a:prstDash val="solid"/>
+        </a:ln>
+        <a:effectLst>
+          <a:outerShdw blurRad="76200" dist="50800" dir="5400000" rotWithShape="0">
+            <a:srgbClr val="4E3B30">
+              <a:alpha val="60000"/>
+            </a:srgbClr>
+          </a:outerShdw>
+        </a:effectLst>
+        <a:scene3d>
+          <a:camera prst="orthographicFront"/>
+          <a:lightRig rig="flat" dir="t"/>
+        </a:scene3d>
+        <a:sp3d z="190500" extrusionH="12700"/>
+      </dsp:spPr>
+      <dsp:style>
+        <a:lnRef idx="1">
+          <a:schemeClr val="accent6"/>
+        </a:lnRef>
+        <a:fillRef idx="2">
+          <a:schemeClr val="accent6"/>
+        </a:fillRef>
+        <a:effectRef idx="1">
+          <a:schemeClr val="accent6"/>
+        </a:effectRef>
+        <a:fontRef idx="minor">
+          <a:schemeClr val="dk1"/>
+        </a:fontRef>
+      </dsp:style>
+    </dsp:sp>
+    <dsp:sp modelId="{231A70AB-9760-4FFF-B875-5D31C52D60AE}">
+      <dsp:nvSpPr>
+        <dsp:cNvPr id="0" name=""/>
+        <dsp:cNvSpPr/>
+      </dsp:nvSpPr>
+      <dsp:spPr>
+        <a:xfrm>
+          <a:off x="434340" y="3661499"/>
+          <a:ext cx="6080760" cy="590400"/>
+        </a:xfrm>
+        <a:prstGeom prst="roundRect">
+          <a:avLst/>
+        </a:prstGeom>
+        <a:solidFill>
+          <a:srgbClr val="92D050"/>
+        </a:solidFill>
+        <a:ln>
+          <a:noFill/>
+        </a:ln>
+        <a:effectLst>
+          <a:outerShdw blurRad="76200" dist="50800" dir="5400000" rotWithShape="0">
+            <a:srgbClr val="4E3B30">
+              <a:alpha val="60000"/>
+            </a:srgbClr>
+          </a:outerShdw>
+        </a:effectLst>
+        <a:scene3d>
+          <a:camera prst="orthographicFront"/>
+          <a:lightRig rig="flat" dir="t"/>
+        </a:scene3d>
+        <a:sp3d contourW="12700" prstMaterial="matte">
+          <a:bevelT w="60000" h="50800"/>
+          <a:contourClr>
+            <a:schemeClr val="accent6">
+              <a:shade val="60000"/>
+              <a:satMod val="110000"/>
+            </a:schemeClr>
+          </a:contourClr>
+        </a:sp3d>
+      </dsp:spPr>
+      <dsp:style>
+        <a:lnRef idx="0">
+          <a:schemeClr val="accent6"/>
+        </a:lnRef>
+        <a:fillRef idx="3">
+          <a:schemeClr val="accent6"/>
+        </a:fillRef>
+        <a:effectRef idx="3">
+          <a:schemeClr val="accent6"/>
+        </a:effectRef>
+        <a:fontRef idx="minor">
+          <a:schemeClr val="lt1"/>
+        </a:fontRef>
+      </dsp:style>
+      <dsp:txBody>
+        <a:bodyPr spcFirstLastPara="0" vert="horz" wrap="square" lIns="229838" tIns="0" rIns="229838" bIns="0" numCol="1" spcCol="1270" anchor="ctr" anchorCtr="0">
+          <a:noAutofit/>
+        </a:bodyPr>
+        <a:lstStyle/>
+        <a:p>
+          <a:pPr lvl="0" algn="l" defTabSz="889000">
+            <a:lnSpc>
+              <a:spcPct val="90000"/>
+            </a:lnSpc>
+            <a:spcBef>
+              <a:spcPct val="0"/>
+            </a:spcBef>
+            <a:spcAft>
+              <a:spcPct val="35000"/>
+            </a:spcAft>
+          </a:pPr>
+          <a:r>
+            <a:rPr lang="pt-BR" sz="2000" b="1" kern="1200" smtClean="0">
+              <a:solidFill>
+                <a:srgbClr val="0070C0"/>
+              </a:solidFill>
+            </a:rPr>
+            <a:t>Controles financeiros</a:t>
+          </a:r>
+          <a:endParaRPr lang="pt-BR" sz="2000" b="1" kern="1200" dirty="0">
+            <a:solidFill>
+              <a:srgbClr val="0070C0"/>
+            </a:solidFill>
+          </a:endParaRPr>
+        </a:p>
+      </dsp:txBody>
+      <dsp:txXfrm>
+        <a:off x="434340" y="3661499"/>
+        <a:ext cx="6080760" cy="590400"/>
+      </dsp:txXfrm>
+    </dsp:sp>
+    <dsp:sp modelId="{338DDB9A-A6BB-4D1C-8303-E07E7D076CB7}">
+      <dsp:nvSpPr>
+        <dsp:cNvPr id="0" name=""/>
+        <dsp:cNvSpPr/>
+      </dsp:nvSpPr>
+      <dsp:spPr>
+        <a:xfrm>
+          <a:off x="0" y="4863899"/>
+          <a:ext cx="8686800" cy="504000"/>
+        </a:xfrm>
+        <a:prstGeom prst="rect">
+          <a:avLst/>
+        </a:prstGeom>
+        <a:gradFill rotWithShape="1">
+          <a:gsLst>
+            <a:gs pos="0">
+              <a:schemeClr val="accent6">
+                <a:tint val="30000"/>
+                <a:satMod val="250000"/>
+              </a:schemeClr>
+            </a:gs>
+            <a:gs pos="72000">
+              <a:schemeClr val="accent6">
+                <a:tint val="75000"/>
+                <a:satMod val="210000"/>
+              </a:schemeClr>
+            </a:gs>
+            <a:gs pos="100000">
+              <a:schemeClr val="accent6">
+                <a:tint val="85000"/>
+                <a:satMod val="210000"/>
+              </a:schemeClr>
+            </a:gs>
+          </a:gsLst>
+          <a:lin ang="5400000" scaled="1"/>
+        </a:gradFill>
+        <a:ln w="10000" cap="flat" cmpd="sng" algn="ctr">
+          <a:solidFill>
+            <a:schemeClr val="accent6"/>
+          </a:solidFill>
+          <a:prstDash val="solid"/>
+        </a:ln>
+        <a:effectLst>
+          <a:outerShdw blurRad="76200" dist="50800" dir="5400000" rotWithShape="0">
+            <a:srgbClr val="4E3B30">
+              <a:alpha val="60000"/>
+            </a:srgbClr>
+          </a:outerShdw>
+        </a:effectLst>
+        <a:scene3d>
+          <a:camera prst="orthographicFront"/>
+          <a:lightRig rig="flat" dir="t"/>
+        </a:scene3d>
+        <a:sp3d z="190500" extrusionH="12700"/>
+      </dsp:spPr>
+      <dsp:style>
+        <a:lnRef idx="1">
+          <a:schemeClr val="accent6"/>
+        </a:lnRef>
+        <a:fillRef idx="2">
+          <a:schemeClr val="accent6"/>
+        </a:fillRef>
+        <a:effectRef idx="1">
+          <a:schemeClr val="accent6"/>
+        </a:effectRef>
+        <a:fontRef idx="minor">
+          <a:schemeClr val="dk1"/>
+        </a:fontRef>
+      </dsp:style>
+    </dsp:sp>
+    <dsp:sp modelId="{029B9D8C-4A77-4645-9520-CB1F079C0081}">
+      <dsp:nvSpPr>
+        <dsp:cNvPr id="0" name=""/>
+        <dsp:cNvSpPr/>
+      </dsp:nvSpPr>
+      <dsp:spPr>
+        <a:xfrm>
+          <a:off x="434340" y="4568699"/>
+          <a:ext cx="6080760" cy="590400"/>
+        </a:xfrm>
+        <a:prstGeom prst="roundRect">
+          <a:avLst/>
+        </a:prstGeom>
+        <a:solidFill>
+          <a:srgbClr val="92D050"/>
+        </a:solidFill>
+        <a:ln>
+          <a:noFill/>
+        </a:ln>
+        <a:effectLst>
+          <a:outerShdw blurRad="76200" dist="50800" dir="5400000" rotWithShape="0">
+            <a:srgbClr val="4E3B30">
+              <a:alpha val="60000"/>
+            </a:srgbClr>
+          </a:outerShdw>
+        </a:effectLst>
+        <a:scene3d>
+          <a:camera prst="orthographicFront"/>
+          <a:lightRig rig="flat" dir="t"/>
+        </a:scene3d>
+        <a:sp3d contourW="12700" prstMaterial="matte">
+          <a:bevelT w="60000" h="50800"/>
+          <a:contourClr>
+            <a:schemeClr val="accent6">
+              <a:shade val="60000"/>
+              <a:satMod val="110000"/>
+            </a:schemeClr>
+          </a:contourClr>
+        </a:sp3d>
+      </dsp:spPr>
+      <dsp:style>
+        <a:lnRef idx="0">
+          <a:schemeClr val="accent6"/>
+        </a:lnRef>
+        <a:fillRef idx="3">
+          <a:schemeClr val="accent6"/>
+        </a:fillRef>
+        <a:effectRef idx="3">
+          <a:schemeClr val="accent6"/>
+        </a:effectRef>
+        <a:fontRef idx="minor">
+          <a:schemeClr val="lt1"/>
+        </a:fontRef>
+      </dsp:style>
+      <dsp:txBody>
+        <a:bodyPr spcFirstLastPara="0" vert="horz" wrap="square" lIns="229838" tIns="0" rIns="229838" bIns="0" numCol="1" spcCol="1270" anchor="ctr" anchorCtr="0">
+          <a:noAutofit/>
+        </a:bodyPr>
+        <a:lstStyle/>
+        <a:p>
+          <a:pPr lvl="0" algn="l" defTabSz="889000">
+            <a:lnSpc>
+              <a:spcPct val="90000"/>
+            </a:lnSpc>
+            <a:spcBef>
+              <a:spcPct val="0"/>
+            </a:spcBef>
+            <a:spcAft>
+              <a:spcPct val="35000"/>
+            </a:spcAft>
+          </a:pPr>
+          <a:r>
+            <a:rPr lang="pt-BR" sz="2000" b="1" kern="1200" smtClean="0">
+              <a:solidFill>
+                <a:srgbClr val="0070C0"/>
+              </a:solidFill>
+            </a:rPr>
+            <a:t>Controle de contas a pagar</a:t>
+          </a:r>
+          <a:endParaRPr lang="pt-BR" sz="2000" b="1" kern="1200" dirty="0">
+            <a:solidFill>
+              <a:srgbClr val="0070C0"/>
+            </a:solidFill>
+          </a:endParaRPr>
+        </a:p>
+      </dsp:txBody>
+      <dsp:txXfrm>
+        <a:off x="434340" y="4568699"/>
+        <a:ext cx="6080760" cy="590400"/>
+      </dsp:txXfrm>
+    </dsp:sp>
   </dsp:spTree>
 </dsp:drawing>
 </file>
@@ -22332,7 +23372,7 @@
             <a:fld id="{229FDC3E-7424-49CF-AF38-AA35F4C77C8D}" type="datetimeFigureOut">
               <a:rPr lang="pt-BR" smtClean="0"/>
               <a:pPr/>
-              <a:t>22/05/2014</a:t>
+              <a:t>03/06/2014</a:t>
             </a:fld>
             <a:endParaRPr lang="pt-BR"/>
           </a:p>
@@ -22504,7 +23544,7 @@
             <a:fld id="{229FDC3E-7424-49CF-AF38-AA35F4C77C8D}" type="datetimeFigureOut">
               <a:rPr lang="pt-BR" smtClean="0"/>
               <a:pPr/>
-              <a:t>22/05/2014</a:t>
+              <a:t>03/06/2014</a:t>
             </a:fld>
             <a:endParaRPr lang="pt-BR"/>
           </a:p>
@@ -22681,7 +23721,7 @@
             <a:fld id="{229FDC3E-7424-49CF-AF38-AA35F4C77C8D}" type="datetimeFigureOut">
               <a:rPr lang="pt-BR" smtClean="0"/>
               <a:pPr/>
-              <a:t>22/05/2014</a:t>
+              <a:t>03/06/2014</a:t>
             </a:fld>
             <a:endParaRPr lang="pt-BR"/>
           </a:p>
@@ -22848,7 +23888,7 @@
             <a:fld id="{229FDC3E-7424-49CF-AF38-AA35F4C77C8D}" type="datetimeFigureOut">
               <a:rPr lang="pt-BR" smtClean="0"/>
               <a:pPr/>
-              <a:t>22/05/2014</a:t>
+              <a:t>03/06/2014</a:t>
             </a:fld>
             <a:endParaRPr lang="pt-BR"/>
           </a:p>
@@ -23084,7 +24124,7 @@
             <a:fld id="{229FDC3E-7424-49CF-AF38-AA35F4C77C8D}" type="datetimeFigureOut">
               <a:rPr lang="pt-BR" smtClean="0"/>
               <a:pPr/>
-              <a:t>22/05/2014</a:t>
+              <a:t>03/06/2014</a:t>
             </a:fld>
             <a:endParaRPr lang="pt-BR"/>
           </a:p>
@@ -23382,7 +24422,7 @@
             <a:fld id="{229FDC3E-7424-49CF-AF38-AA35F4C77C8D}" type="datetimeFigureOut">
               <a:rPr lang="pt-BR" smtClean="0"/>
               <a:pPr/>
-              <a:t>22/05/2014</a:t>
+              <a:t>03/06/2014</a:t>
             </a:fld>
             <a:endParaRPr lang="pt-BR"/>
           </a:p>
@@ -23768,7 +24808,7 @@
             <a:fld id="{229FDC3E-7424-49CF-AF38-AA35F4C77C8D}" type="datetimeFigureOut">
               <a:rPr lang="pt-BR" smtClean="0"/>
               <a:pPr/>
-              <a:t>22/05/2014</a:t>
+              <a:t>03/06/2014</a:t>
             </a:fld>
             <a:endParaRPr lang="pt-BR"/>
           </a:p>
@@ -23943,7 +24983,7 @@
             <a:fld id="{229FDC3E-7424-49CF-AF38-AA35F4C77C8D}" type="datetimeFigureOut">
               <a:rPr lang="pt-BR" smtClean="0"/>
               <a:pPr/>
-              <a:t>22/05/2014</a:t>
+              <a:t>03/06/2014</a:t>
             </a:fld>
             <a:endParaRPr lang="pt-BR"/>
           </a:p>
@@ -24035,7 +25075,7 @@
             <a:fld id="{229FDC3E-7424-49CF-AF38-AA35F4C77C8D}" type="datetimeFigureOut">
               <a:rPr lang="pt-BR" smtClean="0"/>
               <a:pPr/>
-              <a:t>22/05/2014</a:t>
+              <a:t>03/06/2014</a:t>
             </a:fld>
             <a:endParaRPr lang="pt-BR"/>
           </a:p>
@@ -24332,7 +25372,7 @@
             <a:fld id="{229FDC3E-7424-49CF-AF38-AA35F4C77C8D}" type="datetimeFigureOut">
               <a:rPr lang="pt-BR" smtClean="0"/>
               <a:pPr/>
-              <a:t>22/05/2014</a:t>
+              <a:t>03/06/2014</a:t>
             </a:fld>
             <a:endParaRPr lang="pt-BR"/>
           </a:p>
@@ -24468,7 +25508,7 @@
             <a:fld id="{229FDC3E-7424-49CF-AF38-AA35F4C77C8D}" type="datetimeFigureOut">
               <a:rPr lang="pt-BR" smtClean="0"/>
               <a:pPr/>
-              <a:t>22/05/2014</a:t>
+              <a:t>03/06/2014</a:t>
             </a:fld>
             <a:endParaRPr lang="pt-BR"/>
           </a:p>
@@ -24773,7 +25813,7 @@
             <a:fld id="{229FDC3E-7424-49CF-AF38-AA35F4C77C8D}" type="datetimeFigureOut">
               <a:rPr lang="pt-BR" smtClean="0"/>
               <a:pPr/>
-              <a:t>22/05/2014</a:t>
+              <a:t>03/06/2014</a:t>
             </a:fld>
             <a:endParaRPr lang="pt-BR"/>
           </a:p>
@@ -25538,7 +26578,7 @@
             <p:ph idx="1"/>
             <p:extLst>
               <p:ext uri="{D42A27DB-BD31-4B8C-83A1-F6EECF244321}">
-                <p14:modId xmlns:p14="http://schemas.microsoft.com/office/powerpoint/2010/main" xmlns="" val="2208909862"/>
+                <p14:modId xmlns="" xmlns:p14="http://schemas.microsoft.com/office/powerpoint/2010/main" val="2208909862"/>
               </p:ext>
             </p:extLst>
           </p:nvPr>
@@ -25820,8 +26860,8 @@
           </p:nvPr>
         </p:nvGraphicFramePr>
         <p:xfrm>
-          <a:off x="304800" y="1554163"/>
-          <a:ext cx="8686800" cy="4525962"/>
+          <a:off x="457200" y="1484784"/>
+          <a:ext cx="8686800" cy="4883373"/>
         </p:xfrm>
         <a:graphic>
           <a:graphicData uri="http://schemas.openxmlformats.org/drawingml/2006/diagram">
@@ -25894,7 +26934,7 @@
             <p:ph idx="1"/>
             <p:extLst>
               <p:ext uri="{D42A27DB-BD31-4B8C-83A1-F6EECF244321}">
-                <p14:modId xmlns:p14="http://schemas.microsoft.com/office/powerpoint/2010/main" xmlns="" val="2118870426"/>
+                <p14:modId xmlns="" xmlns:p14="http://schemas.microsoft.com/office/powerpoint/2010/main" val="2118870426"/>
               </p:ext>
             </p:extLst>
           </p:nvPr>
@@ -25974,7 +27014,7 @@
             <p:ph idx="1"/>
             <p:extLst>
               <p:ext uri="{D42A27DB-BD31-4B8C-83A1-F6EECF244321}">
-                <p14:modId xmlns:p14="http://schemas.microsoft.com/office/powerpoint/2010/main" xmlns="" val="736405372"/>
+                <p14:modId xmlns="" xmlns:p14="http://schemas.microsoft.com/office/powerpoint/2010/main" val="736405372"/>
               </p:ext>
             </p:extLst>
           </p:nvPr>

</xml_diff>

<commit_message>
2014 07 15 07:27
#3 ediçao da app
</commit_message>
<xml_diff>
--- a/SAS/Planejamento/Docs/#3 - Apresentação do projeto.pptx
+++ b/SAS/Planejamento/Docs/#3 - Apresentação do projeto.pptx
@@ -4971,11 +4971,7 @@
         <a:p>
           <a:r>
             <a:rPr lang="pt-BR" sz="1600" dirty="0" smtClean="0"/>
-            <a:t>Ricardo  Design </a:t>
-          </a:r>
-          <a:r>
-            <a:rPr lang="pt-BR" sz="1600" dirty="0" smtClean="0"/>
-            <a:t>gráfico</a:t>
+            <a:t>Ricardo  Design gráfico</a:t>
           </a:r>
           <a:endParaRPr lang="pt-BR" sz="1600" dirty="0"/>
         </a:p>
@@ -5405,7 +5401,7 @@
   <dgm:whole/>
   <dgm:extLst>
     <a:ext uri="http://schemas.microsoft.com/office/drawing/2008/diagram">
-      <dsp:dataModelExt xmlns:dsp="http://schemas.microsoft.com/office/drawing/2008/diagram" xmlns="" relId="rId6" minVer="http://schemas.openxmlformats.org/drawingml/2006/diagram"/>
+      <dsp:dataModelExt xmlns="" xmlns:dsp="http://schemas.microsoft.com/office/drawing/2008/diagram" relId="rId6" minVer="http://schemas.openxmlformats.org/drawingml/2006/diagram"/>
     </a:ext>
   </dgm:extLst>
 </dgm:dataModel>
@@ -5516,10 +5512,10 @@
         <a:p>
           <a:pPr algn="l"/>
           <a:r>
-            <a:rPr lang="pt-BR" sz="1800" b="1" dirty="0" smtClean="0"/>
+            <a:rPr lang="pt-BR" sz="1400" b="1" dirty="0" smtClean="0"/>
             <a:t>Pastorais</a:t>
           </a:r>
-          <a:endParaRPr lang="pt-BR" sz="1800" b="1" dirty="0"/>
+          <a:endParaRPr lang="pt-BR" sz="1400" b="1" dirty="0"/>
         </a:p>
       </dgm:t>
     </dgm:pt>
@@ -5636,10 +5632,10 @@
         <a:lstStyle/>
         <a:p>
           <a:r>
-            <a:rPr lang="pt-BR" sz="1800" b="1" dirty="0" smtClean="0"/>
-            <a:t>?</a:t>
+            <a:rPr lang="pt-BR" sz="1400" b="1" dirty="0" smtClean="0"/>
+            <a:t>Emissão Documentos</a:t>
           </a:r>
-          <a:endParaRPr lang="pt-BR" sz="1800" b="1" dirty="0"/>
+          <a:endParaRPr lang="pt-BR" sz="1400" b="1" dirty="0"/>
         </a:p>
       </dgm:t>
     </dgm:pt>
@@ -5741,7 +5737,7 @@
         <a:p>
           <a:r>
             <a:rPr lang="pt-BR" sz="1400" b="1" dirty="0" smtClean="0"/>
-            <a:t>?</a:t>
+            <a:t>Comunicação </a:t>
           </a:r>
           <a:endParaRPr lang="pt-BR" sz="1400" b="1" dirty="0"/>
         </a:p>
@@ -5759,6 +5755,505 @@
       </dgm:t>
     </dgm:pt>
     <dgm:pt modelId="{DFDDDFD5-3525-4DBC-A81D-34093C1E23BA}" type="sibTrans" cxnId="{33D1B9A7-E56C-4778-97FB-A5B130BCA5C0}">
+      <dgm:prSet/>
+      <dgm:spPr/>
+      <dgm:t>
+        <a:bodyPr/>
+        <a:lstStyle/>
+        <a:p>
+          <a:endParaRPr lang="pt-BR"/>
+        </a:p>
+      </dgm:t>
+    </dgm:pt>
+    <dgm:pt modelId="{EAE6F129-AF20-489F-B448-BFE264B615C1}">
+      <dgm:prSet phldrT="[Texto]" custT="1">
+        <dgm:style>
+          <a:lnRef idx="2">
+            <a:schemeClr val="accent1"/>
+          </a:lnRef>
+          <a:fillRef idx="1">
+            <a:schemeClr val="lt1"/>
+          </a:fillRef>
+          <a:effectRef idx="0">
+            <a:schemeClr val="accent1"/>
+          </a:effectRef>
+          <a:fontRef idx="minor">
+            <a:schemeClr val="dk1"/>
+          </a:fontRef>
+        </dgm:style>
+      </dgm:prSet>
+      <dgm:spPr/>
+      <dgm:t>
+        <a:bodyPr/>
+        <a:lstStyle/>
+        <a:p>
+          <a:r>
+            <a:rPr lang="pt-BR" sz="1400" b="1" dirty="0" smtClean="0"/>
+            <a:t>Registros de atividades</a:t>
+          </a:r>
+          <a:endParaRPr lang="pt-BR" sz="1400" b="1" dirty="0"/>
+        </a:p>
+      </dgm:t>
+    </dgm:pt>
+    <dgm:pt modelId="{C0D5B7C3-AA00-473E-8E71-2FD79A462FEE}" type="parTrans" cxnId="{E3287FDC-8A55-45DA-AEE5-89AB63B59CE0}">
+      <dgm:prSet/>
+      <dgm:spPr/>
+      <dgm:t>
+        <a:bodyPr/>
+        <a:lstStyle/>
+        <a:p>
+          <a:endParaRPr lang="pt-BR"/>
+        </a:p>
+      </dgm:t>
+    </dgm:pt>
+    <dgm:pt modelId="{401713F0-76B5-43A2-A4F5-305F4CA21957}" type="sibTrans" cxnId="{E3287FDC-8A55-45DA-AEE5-89AB63B59CE0}">
+      <dgm:prSet/>
+      <dgm:spPr/>
+      <dgm:t>
+        <a:bodyPr/>
+        <a:lstStyle/>
+        <a:p>
+          <a:endParaRPr lang="pt-BR"/>
+        </a:p>
+      </dgm:t>
+    </dgm:pt>
+    <dgm:pt modelId="{2CABE3B6-2EEA-4A99-BBE7-085383B9725D}">
+      <dgm:prSet phldrT="[Texto]" custT="1">
+        <dgm:style>
+          <a:lnRef idx="2">
+            <a:schemeClr val="accent1"/>
+          </a:lnRef>
+          <a:fillRef idx="1">
+            <a:schemeClr val="lt1"/>
+          </a:fillRef>
+          <a:effectRef idx="0">
+            <a:schemeClr val="accent1"/>
+          </a:effectRef>
+          <a:fontRef idx="minor">
+            <a:schemeClr val="dk1"/>
+          </a:fontRef>
+        </dgm:style>
+      </dgm:prSet>
+      <dgm:spPr/>
+      <dgm:t>
+        <a:bodyPr/>
+        <a:lstStyle/>
+        <a:p>
+          <a:r>
+            <a:rPr lang="pt-BR" sz="1400" b="1" dirty="0" smtClean="0"/>
+            <a:t>Consultas</a:t>
+          </a:r>
+          <a:endParaRPr lang="pt-BR" sz="1400" b="1" dirty="0"/>
+        </a:p>
+      </dgm:t>
+    </dgm:pt>
+    <dgm:pt modelId="{E50B1FFE-B27A-488D-9E1C-753288103707}" type="parTrans" cxnId="{9C28426E-782A-4827-A1AF-DF19DEE0E663}">
+      <dgm:prSet/>
+      <dgm:spPr/>
+      <dgm:t>
+        <a:bodyPr/>
+        <a:lstStyle/>
+        <a:p>
+          <a:endParaRPr lang="pt-BR"/>
+        </a:p>
+      </dgm:t>
+    </dgm:pt>
+    <dgm:pt modelId="{4AC18B29-D66A-4290-B0B1-638894B89790}" type="sibTrans" cxnId="{9C28426E-782A-4827-A1AF-DF19DEE0E663}">
+      <dgm:prSet/>
+      <dgm:spPr/>
+      <dgm:t>
+        <a:bodyPr/>
+        <a:lstStyle/>
+        <a:p>
+          <a:endParaRPr lang="pt-BR"/>
+        </a:p>
+      </dgm:t>
+    </dgm:pt>
+    <dgm:pt modelId="{835444D0-9403-488B-8CF6-1BA423F14FF4}">
+      <dgm:prSet phldrT="[Texto]" custT="1">
+        <dgm:style>
+          <a:lnRef idx="2">
+            <a:schemeClr val="accent1"/>
+          </a:lnRef>
+          <a:fillRef idx="1">
+            <a:schemeClr val="lt1"/>
+          </a:fillRef>
+          <a:effectRef idx="0">
+            <a:schemeClr val="accent1"/>
+          </a:effectRef>
+          <a:fontRef idx="minor">
+            <a:schemeClr val="dk1"/>
+          </a:fontRef>
+        </dgm:style>
+      </dgm:prSet>
+      <dgm:spPr/>
+      <dgm:t>
+        <a:bodyPr/>
+        <a:lstStyle/>
+        <a:p>
+          <a:pPr algn="l"/>
+          <a:r>
+            <a:rPr lang="pt-BR" sz="1400" b="1" dirty="0" smtClean="0"/>
+            <a:t>Compartilhamento de dados</a:t>
+          </a:r>
+          <a:endParaRPr lang="pt-BR" sz="1400" b="1" dirty="0"/>
+        </a:p>
+      </dgm:t>
+    </dgm:pt>
+    <dgm:pt modelId="{C29ED5FF-29B9-4D55-9C15-3D427BB84784}" type="parTrans" cxnId="{2E04EE15-0EFD-4A5E-96F9-C3FE50E596F5}">
+      <dgm:prSet/>
+      <dgm:spPr/>
+      <dgm:t>
+        <a:bodyPr/>
+        <a:lstStyle/>
+        <a:p>
+          <a:endParaRPr lang="pt-BR"/>
+        </a:p>
+      </dgm:t>
+    </dgm:pt>
+    <dgm:pt modelId="{F0580B45-2587-4095-A289-2D6D62D7D0E2}" type="sibTrans" cxnId="{2E04EE15-0EFD-4A5E-96F9-C3FE50E596F5}">
+      <dgm:prSet/>
+      <dgm:spPr/>
+      <dgm:t>
+        <a:bodyPr/>
+        <a:lstStyle/>
+        <a:p>
+          <a:endParaRPr lang="pt-BR"/>
+        </a:p>
+      </dgm:t>
+    </dgm:pt>
+    <dgm:pt modelId="{0F73E91A-24E8-44FC-8282-F39E528AC837}">
+      <dgm:prSet phldrT="[Texto]" custT="1">
+        <dgm:style>
+          <a:lnRef idx="2">
+            <a:schemeClr val="accent1"/>
+          </a:lnRef>
+          <a:fillRef idx="1">
+            <a:schemeClr val="lt1"/>
+          </a:fillRef>
+          <a:effectRef idx="0">
+            <a:schemeClr val="accent1"/>
+          </a:effectRef>
+          <a:fontRef idx="minor">
+            <a:schemeClr val="dk1"/>
+          </a:fontRef>
+        </dgm:style>
+      </dgm:prSet>
+      <dgm:spPr/>
+      <dgm:t>
+        <a:bodyPr/>
+        <a:lstStyle/>
+        <a:p>
+          <a:pPr algn="l"/>
+          <a:endParaRPr lang="pt-BR" sz="1400" b="1" dirty="0"/>
+        </a:p>
+      </dgm:t>
+    </dgm:pt>
+    <dgm:pt modelId="{C1AA1994-3B2F-47C9-8F5B-A08CE6A5D095}" type="parTrans" cxnId="{22BA4952-EA9D-42A7-ABA5-EAD0B5F9B167}">
+      <dgm:prSet/>
+      <dgm:spPr/>
+      <dgm:t>
+        <a:bodyPr/>
+        <a:lstStyle/>
+        <a:p>
+          <a:endParaRPr lang="pt-BR"/>
+        </a:p>
+      </dgm:t>
+    </dgm:pt>
+    <dgm:pt modelId="{F93555B6-77A8-4728-91CF-7AF5B0C7EE62}" type="sibTrans" cxnId="{22BA4952-EA9D-42A7-ABA5-EAD0B5F9B167}">
+      <dgm:prSet/>
+      <dgm:spPr/>
+      <dgm:t>
+        <a:bodyPr/>
+        <a:lstStyle/>
+        <a:p>
+          <a:endParaRPr lang="pt-BR"/>
+        </a:p>
+      </dgm:t>
+    </dgm:pt>
+    <dgm:pt modelId="{F9D38618-21A9-472D-92B4-2079A7013EA4}">
+      <dgm:prSet phldrT="[Texto]" custT="1">
+        <dgm:style>
+          <a:lnRef idx="2">
+            <a:schemeClr val="accent1"/>
+          </a:lnRef>
+          <a:fillRef idx="1">
+            <a:schemeClr val="lt1"/>
+          </a:fillRef>
+          <a:effectRef idx="0">
+            <a:schemeClr val="accent1"/>
+          </a:effectRef>
+          <a:fontRef idx="minor">
+            <a:schemeClr val="dk1"/>
+          </a:fontRef>
+        </dgm:style>
+      </dgm:prSet>
+      <dgm:spPr/>
+      <dgm:t>
+        <a:bodyPr/>
+        <a:lstStyle/>
+        <a:p>
+          <a:endParaRPr lang="pt-BR" sz="1400" b="1" dirty="0"/>
+        </a:p>
+      </dgm:t>
+    </dgm:pt>
+    <dgm:pt modelId="{181E5304-5E89-4CE3-A1FA-1A4445AF15C8}" type="parTrans" cxnId="{9DB33BD0-4DBA-4C3F-846F-F2711FE0E6BD}">
+      <dgm:prSet/>
+      <dgm:spPr/>
+      <dgm:t>
+        <a:bodyPr/>
+        <a:lstStyle/>
+        <a:p>
+          <a:endParaRPr lang="pt-BR"/>
+        </a:p>
+      </dgm:t>
+    </dgm:pt>
+    <dgm:pt modelId="{DEBEAAE4-E6F2-4848-9079-BE40B31BACCD}" type="sibTrans" cxnId="{9DB33BD0-4DBA-4C3F-846F-F2711FE0E6BD}">
+      <dgm:prSet/>
+      <dgm:spPr/>
+      <dgm:t>
+        <a:bodyPr/>
+        <a:lstStyle/>
+        <a:p>
+          <a:endParaRPr lang="pt-BR"/>
+        </a:p>
+      </dgm:t>
+    </dgm:pt>
+    <dgm:pt modelId="{59BF4FD9-4BF0-450F-A924-D7283EA0A3C2}">
+      <dgm:prSet phldrT="[Texto]" custT="1">
+        <dgm:style>
+          <a:lnRef idx="2">
+            <a:schemeClr val="accent1"/>
+          </a:lnRef>
+          <a:fillRef idx="1">
+            <a:schemeClr val="lt1"/>
+          </a:fillRef>
+          <a:effectRef idx="0">
+            <a:schemeClr val="accent1"/>
+          </a:effectRef>
+          <a:fontRef idx="minor">
+            <a:schemeClr val="dk1"/>
+          </a:fontRef>
+        </dgm:style>
+      </dgm:prSet>
+      <dgm:spPr/>
+      <dgm:t>
+        <a:bodyPr/>
+        <a:lstStyle/>
+        <a:p>
+          <a:pPr algn="l"/>
+          <a:endParaRPr lang="pt-BR" sz="1400" b="1" dirty="0"/>
+        </a:p>
+      </dgm:t>
+    </dgm:pt>
+    <dgm:pt modelId="{8761CF33-9B88-4BC0-8A8D-8E4B646981F2}" type="parTrans" cxnId="{4B0F930D-EE14-4620-9947-895E9A1529BF}">
+      <dgm:prSet/>
+      <dgm:spPr/>
+      <dgm:t>
+        <a:bodyPr/>
+        <a:lstStyle/>
+        <a:p>
+          <a:endParaRPr lang="pt-BR"/>
+        </a:p>
+      </dgm:t>
+    </dgm:pt>
+    <dgm:pt modelId="{9F8163B5-F294-45D7-AEAF-EA88EBB3B6A3}" type="sibTrans" cxnId="{4B0F930D-EE14-4620-9947-895E9A1529BF}">
+      <dgm:prSet/>
+      <dgm:spPr/>
+      <dgm:t>
+        <a:bodyPr/>
+        <a:lstStyle/>
+        <a:p>
+          <a:endParaRPr lang="pt-BR"/>
+        </a:p>
+      </dgm:t>
+    </dgm:pt>
+    <dgm:pt modelId="{0F3E3240-049E-4C85-83B0-4A38B3BAD305}">
+      <dgm:prSet phldrT="[Texto]" custT="1">
+        <dgm:style>
+          <a:lnRef idx="2">
+            <a:schemeClr val="accent1"/>
+          </a:lnRef>
+          <a:fillRef idx="1">
+            <a:schemeClr val="lt1"/>
+          </a:fillRef>
+          <a:effectRef idx="0">
+            <a:schemeClr val="accent1"/>
+          </a:effectRef>
+          <a:fontRef idx="minor">
+            <a:schemeClr val="dk1"/>
+          </a:fontRef>
+        </dgm:style>
+      </dgm:prSet>
+      <dgm:spPr/>
+      <dgm:t>
+        <a:bodyPr/>
+        <a:lstStyle/>
+        <a:p>
+          <a:endParaRPr lang="pt-BR" sz="1400" b="1" dirty="0"/>
+        </a:p>
+      </dgm:t>
+    </dgm:pt>
+    <dgm:pt modelId="{500CBC5A-72EC-4F1F-8BD7-22D81C693AA8}" type="parTrans" cxnId="{E5B78FEC-B1D9-4EC3-A03E-DD89AE2D8BBB}">
+      <dgm:prSet/>
+      <dgm:spPr/>
+      <dgm:t>
+        <a:bodyPr/>
+        <a:lstStyle/>
+        <a:p>
+          <a:endParaRPr lang="pt-BR"/>
+        </a:p>
+      </dgm:t>
+    </dgm:pt>
+    <dgm:pt modelId="{6817EB24-D370-4C5E-ABB4-525C433C69F0}" type="sibTrans" cxnId="{E5B78FEC-B1D9-4EC3-A03E-DD89AE2D8BBB}">
+      <dgm:prSet/>
+      <dgm:spPr/>
+      <dgm:t>
+        <a:bodyPr/>
+        <a:lstStyle/>
+        <a:p>
+          <a:endParaRPr lang="pt-BR"/>
+        </a:p>
+      </dgm:t>
+    </dgm:pt>
+    <dgm:pt modelId="{C5FC6C3C-ED92-4431-9B44-CD976E59FF5E}">
+      <dgm:prSet phldrT="[Texto]" custT="1">
+        <dgm:style>
+          <a:lnRef idx="2">
+            <a:schemeClr val="accent1"/>
+          </a:lnRef>
+          <a:fillRef idx="1">
+            <a:schemeClr val="lt1"/>
+          </a:fillRef>
+          <a:effectRef idx="0">
+            <a:schemeClr val="accent1"/>
+          </a:effectRef>
+          <a:fontRef idx="minor">
+            <a:schemeClr val="dk1"/>
+          </a:fontRef>
+        </dgm:style>
+      </dgm:prSet>
+      <dgm:spPr/>
+      <dgm:t>
+        <a:bodyPr/>
+        <a:lstStyle/>
+        <a:p>
+          <a:r>
+            <a:rPr lang="pt-BR" sz="1400" b="1" dirty="0" smtClean="0"/>
+            <a:t>Interação entre grupos</a:t>
+          </a:r>
+          <a:endParaRPr lang="pt-BR" sz="1400" b="1" dirty="0"/>
+        </a:p>
+      </dgm:t>
+    </dgm:pt>
+    <dgm:pt modelId="{AE0E9CC2-5345-4F36-A90C-AD2752E7E9E6}" type="parTrans" cxnId="{C8252A43-F89B-4ED8-9407-8C4E3235C497}">
+      <dgm:prSet/>
+      <dgm:spPr/>
+      <dgm:t>
+        <a:bodyPr/>
+        <a:lstStyle/>
+        <a:p>
+          <a:endParaRPr lang="pt-BR"/>
+        </a:p>
+      </dgm:t>
+    </dgm:pt>
+    <dgm:pt modelId="{28F32126-D00F-495F-BE9C-85E968D4121F}" type="sibTrans" cxnId="{C8252A43-F89B-4ED8-9407-8C4E3235C497}">
+      <dgm:prSet/>
+      <dgm:spPr/>
+      <dgm:t>
+        <a:bodyPr/>
+        <a:lstStyle/>
+        <a:p>
+          <a:endParaRPr lang="pt-BR"/>
+        </a:p>
+      </dgm:t>
+    </dgm:pt>
+    <dgm:pt modelId="{A7D226C9-5E92-4FD2-9426-D029994EEFDC}">
+      <dgm:prSet phldrT="[Texto]" custT="1">
+        <dgm:style>
+          <a:lnRef idx="2">
+            <a:schemeClr val="accent1"/>
+          </a:lnRef>
+          <a:fillRef idx="1">
+            <a:schemeClr val="lt1"/>
+          </a:fillRef>
+          <a:effectRef idx="0">
+            <a:schemeClr val="accent1"/>
+          </a:effectRef>
+          <a:fontRef idx="minor">
+            <a:schemeClr val="dk1"/>
+          </a:fontRef>
+        </dgm:style>
+      </dgm:prSet>
+      <dgm:spPr/>
+      <dgm:t>
+        <a:bodyPr/>
+        <a:lstStyle/>
+        <a:p>
+          <a:endParaRPr lang="pt-BR" sz="1400" b="1" dirty="0"/>
+        </a:p>
+      </dgm:t>
+    </dgm:pt>
+    <dgm:pt modelId="{416E4625-0C19-49C1-9768-BDBCCA30B93C}" type="parTrans" cxnId="{95E1E2D3-B64B-4AEA-BF04-D1CA2E013D44}">
+      <dgm:prSet/>
+      <dgm:spPr/>
+      <dgm:t>
+        <a:bodyPr/>
+        <a:lstStyle/>
+        <a:p>
+          <a:endParaRPr lang="pt-BR"/>
+        </a:p>
+      </dgm:t>
+    </dgm:pt>
+    <dgm:pt modelId="{618C3FCC-A047-4A59-B8AE-EB8EEF617890}" type="sibTrans" cxnId="{95E1E2D3-B64B-4AEA-BF04-D1CA2E013D44}">
+      <dgm:prSet/>
+      <dgm:spPr/>
+      <dgm:t>
+        <a:bodyPr/>
+        <a:lstStyle/>
+        <a:p>
+          <a:endParaRPr lang="pt-BR"/>
+        </a:p>
+      </dgm:t>
+    </dgm:pt>
+    <dgm:pt modelId="{30BC9797-C8E3-4728-AA34-A33AFEAA692E}">
+      <dgm:prSet phldrT="[Texto]" custT="1">
+        <dgm:style>
+          <a:lnRef idx="2">
+            <a:schemeClr val="accent1"/>
+          </a:lnRef>
+          <a:fillRef idx="1">
+            <a:schemeClr val="lt1"/>
+          </a:fillRef>
+          <a:effectRef idx="0">
+            <a:schemeClr val="accent1"/>
+          </a:effectRef>
+          <a:fontRef idx="minor">
+            <a:schemeClr val="dk1"/>
+          </a:fontRef>
+        </dgm:style>
+      </dgm:prSet>
+      <dgm:spPr/>
+      <dgm:t>
+        <a:bodyPr/>
+        <a:lstStyle/>
+        <a:p>
+          <a:endParaRPr lang="pt-BR" sz="1800" b="1" dirty="0"/>
+        </a:p>
+      </dgm:t>
+    </dgm:pt>
+    <dgm:pt modelId="{054B1F8E-E9AC-4A78-BB16-7D8497700B75}" type="sibTrans" cxnId="{D0D17C37-7497-44FA-8908-85838A8EB613}">
+      <dgm:prSet/>
+      <dgm:spPr/>
+      <dgm:t>
+        <a:bodyPr/>
+        <a:lstStyle/>
+        <a:p>
+          <a:endParaRPr lang="pt-BR"/>
+        </a:p>
+      </dgm:t>
+    </dgm:pt>
+    <dgm:pt modelId="{22B7AA6B-9EFA-4D2B-9167-284C1AC4B3BE}" type="parTrans" cxnId="{D0D17C37-7497-44FA-8908-85838A8EB613}">
       <dgm:prSet/>
       <dgm:spPr/>
       <dgm:t>
@@ -5792,17 +6287,31 @@
         <a:lstStyle/>
         <a:p>
           <a:pPr algn="l"/>
-          <a:endParaRPr lang="pt-BR" sz="1800" b="1" dirty="0"/>
+          <a:endParaRPr lang="pt-BR" sz="1400" b="1" dirty="0"/>
+        </a:p>
+      </dgm:t>
+    </dgm:pt>
+    <dgm:pt modelId="{1A383F36-FE35-43F6-9A56-87C1C2601885}" type="sibTrans" cxnId="{7A1F2110-9C05-4201-A75F-73284CDE0F86}">
+      <dgm:prSet/>
+      <dgm:spPr/>
+      <dgm:t>
+        <a:bodyPr/>
+        <a:lstStyle/>
+        <a:p>
+          <a:endParaRPr lang="pt-BR"/>
         </a:p>
       </dgm:t>
     </dgm:pt>
     <dgm:pt modelId="{4015142C-E082-4615-B7AB-FB0D2987A9AC}" type="parTrans" cxnId="{7A1F2110-9C05-4201-A75F-73284CDE0F86}">
       <dgm:prSet/>
       <dgm:spPr/>
-    </dgm:pt>
-    <dgm:pt modelId="{1A383F36-FE35-43F6-9A56-87C1C2601885}" type="sibTrans" cxnId="{7A1F2110-9C05-4201-A75F-73284CDE0F86}">
-      <dgm:prSet/>
-      <dgm:spPr/>
+      <dgm:t>
+        <a:bodyPr/>
+        <a:lstStyle/>
+        <a:p>
+          <a:endParaRPr lang="pt-BR"/>
+        </a:p>
+      </dgm:t>
     </dgm:pt>
     <dgm:pt modelId="{BCDBC707-4A93-4D55-A61A-79732B703027}" type="pres">
       <dgm:prSet presAssocID="{E253E697-B0C3-42D4-81FD-D3ABCA72938E}" presName="linearFlow" presStyleCnt="0">
@@ -5854,7 +6363,7 @@
       </dgm:t>
     </dgm:pt>
     <dgm:pt modelId="{A64C8272-FC1A-4572-A0B1-A3C36EACD2B6}" type="pres">
-      <dgm:prSet presAssocID="{4BA36FF7-0F0F-4341-A68C-01E8516603CD}" presName="desTx" presStyleLbl="fgAcc1" presStyleIdx="0" presStyleCnt="3">
+      <dgm:prSet presAssocID="{4BA36FF7-0F0F-4341-A68C-01E8516603CD}" presName="desTx" presStyleLbl="fgAcc1" presStyleIdx="0" presStyleCnt="3" custScaleX="164686" custScaleY="39969" custLinFactNeighborX="11056" custLinFactNeighborY="364">
         <dgm:presLayoutVars>
           <dgm:bulletEnabled val="1"/>
         </dgm:presLayoutVars>
@@ -5869,7 +6378,7 @@
       </dgm:t>
     </dgm:pt>
     <dgm:pt modelId="{330F8E89-32DF-4BC4-AED2-91D2D7CB94C5}" type="pres">
-      <dgm:prSet presAssocID="{579997AD-FA9A-4915-A323-8F17CA09514B}" presName="sibTrans" presStyleLbl="sibTrans2D1" presStyleIdx="0" presStyleCnt="2"/>
+      <dgm:prSet presAssocID="{579997AD-FA9A-4915-A323-8F17CA09514B}" presName="sibTrans" presStyleLbl="sibTrans2D1" presStyleIdx="0" presStyleCnt="2" custScaleX="147442" custScaleY="201821"/>
       <dgm:spPr/>
       <dgm:t>
         <a:bodyPr/>
@@ -5912,7 +6421,7 @@
       </dgm:t>
     </dgm:pt>
     <dgm:pt modelId="{D6C82472-F7A1-44F8-BE16-C0E2E40E0D6B}" type="pres">
-      <dgm:prSet presAssocID="{140DB818-E071-4B39-BEDA-37F84C79FBA2}" presName="parSh" presStyleLbl="node1" presStyleIdx="1" presStyleCnt="3"/>
+      <dgm:prSet presAssocID="{140DB818-E071-4B39-BEDA-37F84C79FBA2}" presName="parSh" presStyleLbl="node1" presStyleIdx="1" presStyleCnt="3" custScaleX="107759"/>
       <dgm:spPr/>
       <dgm:t>
         <a:bodyPr/>
@@ -5923,7 +6432,7 @@
       </dgm:t>
     </dgm:pt>
     <dgm:pt modelId="{3E47BC9E-87C0-4D93-83F4-A810B62AEF07}" type="pres">
-      <dgm:prSet presAssocID="{140DB818-E071-4B39-BEDA-37F84C79FBA2}" presName="desTx" presStyleLbl="fgAcc1" presStyleIdx="1" presStyleCnt="3">
+      <dgm:prSet presAssocID="{140DB818-E071-4B39-BEDA-37F84C79FBA2}" presName="desTx" presStyleLbl="fgAcc1" presStyleIdx="1" presStyleCnt="3" custScaleX="156074" custScaleY="39876" custLinFactNeighborX="3151" custLinFactNeighborY="273">
         <dgm:presLayoutVars>
           <dgm:bulletEnabled val="1"/>
         </dgm:presLayoutVars>
@@ -5938,7 +6447,7 @@
       </dgm:t>
     </dgm:pt>
     <dgm:pt modelId="{1390A124-BEDA-4A49-9B1B-0ED2FB571A6C}" type="pres">
-      <dgm:prSet presAssocID="{AAA7816F-0D18-434B-AF27-E1709A042EA5}" presName="sibTrans" presStyleLbl="sibTrans2D1" presStyleIdx="1" presStyleCnt="2"/>
+      <dgm:prSet presAssocID="{AAA7816F-0D18-434B-AF27-E1709A042EA5}" presName="sibTrans" presStyleLbl="sibTrans2D1" presStyleIdx="1" presStyleCnt="2" custScaleX="161748" custScaleY="200726"/>
       <dgm:spPr/>
       <dgm:t>
         <a:bodyPr/>
@@ -5992,7 +6501,7 @@
       </dgm:t>
     </dgm:pt>
     <dgm:pt modelId="{1993AEF3-68C8-4F83-9F1E-D1B7B5B4963C}" type="pres">
-      <dgm:prSet presAssocID="{AD7A2D0A-69C1-40D4-AC3C-50ACA39C45C1}" presName="desTx" presStyleLbl="fgAcc1" presStyleIdx="2" presStyleCnt="3">
+      <dgm:prSet presAssocID="{AD7A2D0A-69C1-40D4-AC3C-50ACA39C45C1}" presName="desTx" presStyleLbl="fgAcc1" presStyleIdx="2" presStyleCnt="3" custScaleX="142588" custScaleY="39578">
         <dgm:presLayoutVars>
           <dgm:bulletEnabled val="1"/>
         </dgm:presLayoutVars>
@@ -6008,28 +6517,48 @@
     </dgm:pt>
   </dgm:ptLst>
   <dgm:cxnLst>
+    <dgm:cxn modelId="{22BA4952-EA9D-42A7-ABA5-EAD0B5F9B167}" srcId="{4BA36FF7-0F0F-4341-A68C-01E8516603CD}" destId="{0F73E91A-24E8-44FC-8282-F39E528AC837}" srcOrd="3" destOrd="0" parTransId="{C1AA1994-3B2F-47C9-8F5B-A08CE6A5D095}" sibTransId="{F93555B6-77A8-4728-91CF-7AF5B0C7EE62}"/>
+    <dgm:cxn modelId="{82215399-8FEF-435E-B12E-B0BBF6350A2D}" srcId="{140DB818-E071-4B39-BEDA-37F84C79FBA2}" destId="{57884B04-88D4-4FB2-8678-5199DF429E6F}" srcOrd="0" destOrd="0" parTransId="{C4B27B1D-C2E0-4804-B643-F031B63B66D3}" sibTransId="{B8942B1F-0DA1-4630-8D8B-34A3B43C11D5}"/>
+    <dgm:cxn modelId="{9C9CCD84-152C-4BF0-AE56-02A77DCE9308}" type="presOf" srcId="{AD7A2D0A-69C1-40D4-AC3C-50ACA39C45C1}" destId="{944B484B-F688-4CFA-A4FB-08B237CA5903}" srcOrd="1" destOrd="0" presId="urn:microsoft.com/office/officeart/2005/8/layout/process3"/>
+    <dgm:cxn modelId="{BB53AC73-5473-4487-A280-CC415E72C20C}" srcId="{E253E697-B0C3-42D4-81FD-D3ABCA72938E}" destId="{140DB818-E071-4B39-BEDA-37F84C79FBA2}" srcOrd="1" destOrd="0" parTransId="{5D492640-F330-4177-9F25-0C2545064803}" sibTransId="{AAA7816F-0D18-434B-AF27-E1709A042EA5}"/>
+    <dgm:cxn modelId="{95E1E2D3-B64B-4AEA-BF04-D1CA2E013D44}" srcId="{AD7A2D0A-69C1-40D4-AC3C-50ACA39C45C1}" destId="{A7D226C9-5E92-4FD2-9426-D029994EEFDC}" srcOrd="3" destOrd="0" parTransId="{416E4625-0C19-49C1-9768-BDBCCA30B93C}" sibTransId="{618C3FCC-A047-4A59-B8AE-EB8EEF617890}"/>
+    <dgm:cxn modelId="{5A2ECE84-5973-469B-B8D7-72377C33E035}" type="presOf" srcId="{AAA7816F-0D18-434B-AF27-E1709A042EA5}" destId="{1390A124-BEDA-4A49-9B1B-0ED2FB571A6C}" srcOrd="0" destOrd="0" presId="urn:microsoft.com/office/officeart/2005/8/layout/process3"/>
+    <dgm:cxn modelId="{021B0986-616E-47A6-BC20-5C2A8AA71A81}" type="presOf" srcId="{E253E697-B0C3-42D4-81FD-D3ABCA72938E}" destId="{BCDBC707-4A93-4D55-A61A-79732B703027}" srcOrd="0" destOrd="0" presId="urn:microsoft.com/office/officeart/2005/8/layout/process3"/>
+    <dgm:cxn modelId="{4B0F930D-EE14-4620-9947-895E9A1529BF}" srcId="{4BA36FF7-0F0F-4341-A68C-01E8516603CD}" destId="{59BF4FD9-4BF0-450F-A924-D7283EA0A3C2}" srcOrd="1" destOrd="0" parTransId="{8761CF33-9B88-4BC0-8A8D-8E4B646981F2}" sibTransId="{9F8163B5-F294-45D7-AEAF-EA88EBB3B6A3}"/>
+    <dgm:cxn modelId="{70E001FD-178A-4D81-BB4B-147BB392D9CB}" type="presOf" srcId="{A7D226C9-5E92-4FD2-9426-D029994EEFDC}" destId="{1993AEF3-68C8-4F83-9F1E-D1B7B5B4963C}" srcOrd="0" destOrd="3" presId="urn:microsoft.com/office/officeart/2005/8/layout/process3"/>
+    <dgm:cxn modelId="{E3287FDC-8A55-45DA-AEE5-89AB63B59CE0}" srcId="{AD7A2D0A-69C1-40D4-AC3C-50ACA39C45C1}" destId="{EAE6F129-AF20-489F-B448-BFE264B615C1}" srcOrd="2" destOrd="0" parTransId="{C0D5B7C3-AA00-473E-8E71-2FD79A462FEE}" sibTransId="{401713F0-76B5-43A2-A4F5-305F4CA21957}"/>
+    <dgm:cxn modelId="{605658C6-069A-4135-B3FB-B8571120DFAF}" type="presOf" srcId="{4BA36FF7-0F0F-4341-A68C-01E8516603CD}" destId="{DADC7395-583C-4FD5-8691-3342B823E6CA}" srcOrd="1" destOrd="0" presId="urn:microsoft.com/office/officeart/2005/8/layout/process3"/>
+    <dgm:cxn modelId="{7DDFCDF5-FB4B-4B56-AB28-D717E8E38C18}" type="presOf" srcId="{AAA7816F-0D18-434B-AF27-E1709A042EA5}" destId="{A890346F-3222-4081-BF76-FED6671C2558}" srcOrd="1" destOrd="0" presId="urn:microsoft.com/office/officeart/2005/8/layout/process3"/>
+    <dgm:cxn modelId="{B365E08F-B81F-401D-9E99-497F8A61C238}" type="presOf" srcId="{C5FC6C3C-ED92-4431-9B44-CD976E59FF5E}" destId="{1993AEF3-68C8-4F83-9F1E-D1B7B5B4963C}" srcOrd="0" destOrd="4" presId="urn:microsoft.com/office/officeart/2005/8/layout/process3"/>
+    <dgm:cxn modelId="{F0F7D5BF-9EC9-43ED-84F4-D150E7AD87DD}" type="presOf" srcId="{F9D38618-21A9-472D-92B4-2079A7013EA4}" destId="{3E47BC9E-87C0-4D93-83F4-A810B62AEF07}" srcOrd="0" destOrd="1" presId="urn:microsoft.com/office/officeart/2005/8/layout/process3"/>
+    <dgm:cxn modelId="{7A1F2110-9C05-4201-A75F-73284CDE0F86}" srcId="{4BA36FF7-0F0F-4341-A68C-01E8516603CD}" destId="{AB2E5A07-628C-4E92-90B5-D0FC29CDD9C7}" srcOrd="4" destOrd="0" parTransId="{4015142C-E082-4615-B7AB-FB0D2987A9AC}" sibTransId="{1A383F36-FE35-43F6-9A56-87C1C2601885}"/>
+    <dgm:cxn modelId="{2E04EE15-0EFD-4A5E-96F9-C3FE50E596F5}" srcId="{4BA36FF7-0F0F-4341-A68C-01E8516603CD}" destId="{835444D0-9403-488B-8CF6-1BA423F14FF4}" srcOrd="2" destOrd="0" parTransId="{C29ED5FF-29B9-4D55-9C15-3D427BB84784}" sibTransId="{F0580B45-2587-4095-A289-2D6D62D7D0E2}"/>
+    <dgm:cxn modelId="{1BD557F6-3147-4A3E-96E1-8774CC36B89A}" srcId="{E253E697-B0C3-42D4-81FD-D3ABCA72938E}" destId="{AD7A2D0A-69C1-40D4-AC3C-50ACA39C45C1}" srcOrd="2" destOrd="0" parTransId="{B65DA3CC-30DF-4011-97FD-91E67EF19982}" sibTransId="{D8E3431A-1020-45BC-A3A1-D9601A2EED84}"/>
+    <dgm:cxn modelId="{D95A37CA-F51F-4A08-8D0B-184665F642AA}" type="presOf" srcId="{579997AD-FA9A-4915-A323-8F17CA09514B}" destId="{330F8E89-32DF-4BC4-AED2-91D2D7CB94C5}" srcOrd="0" destOrd="0" presId="urn:microsoft.com/office/officeart/2005/8/layout/process3"/>
+    <dgm:cxn modelId="{3B833AF1-554A-4115-83EE-25F9C4E2AEFD}" type="presOf" srcId="{B2D64904-4778-414A-935C-AFC992C15E50}" destId="{A64C8272-FC1A-4572-A0B1-A3C36EACD2B6}" srcOrd="0" destOrd="0" presId="urn:microsoft.com/office/officeart/2005/8/layout/process3"/>
+    <dgm:cxn modelId="{13DDD5AB-9265-4DB2-9E66-512CAA799786}" srcId="{E253E697-B0C3-42D4-81FD-D3ABCA72938E}" destId="{4BA36FF7-0F0F-4341-A68C-01E8516603CD}" srcOrd="0" destOrd="0" parTransId="{9FBCD112-267C-4316-B4DD-D2608637A18B}" sibTransId="{579997AD-FA9A-4915-A323-8F17CA09514B}"/>
+    <dgm:cxn modelId="{C8252A43-F89B-4ED8-9407-8C4E3235C497}" srcId="{AD7A2D0A-69C1-40D4-AC3C-50ACA39C45C1}" destId="{C5FC6C3C-ED92-4431-9B44-CD976E59FF5E}" srcOrd="4" destOrd="0" parTransId="{AE0E9CC2-5345-4F36-A90C-AD2752E7E9E6}" sibTransId="{28F32126-D00F-495F-BE9C-85E968D4121F}"/>
+    <dgm:cxn modelId="{99730F66-1996-4851-98CF-04F6604FC848}" type="presOf" srcId="{30BC9797-C8E3-4728-AA34-A33AFEAA692E}" destId="{3E47BC9E-87C0-4D93-83F4-A810B62AEF07}" srcOrd="0" destOrd="3" presId="urn:microsoft.com/office/officeart/2005/8/layout/process3"/>
+    <dgm:cxn modelId="{DEDC3CF2-2819-42A2-BCCA-5AD74688BCE7}" type="presOf" srcId="{EAE6F129-AF20-489F-B448-BFE264B615C1}" destId="{1993AEF3-68C8-4F83-9F1E-D1B7B5B4963C}" srcOrd="0" destOrd="2" presId="urn:microsoft.com/office/officeart/2005/8/layout/process3"/>
+    <dgm:cxn modelId="{2458B5BE-C8FA-424E-82B1-59249C8FD969}" type="presOf" srcId="{59BF4FD9-4BF0-450F-A924-D7283EA0A3C2}" destId="{A64C8272-FC1A-4572-A0B1-A3C36EACD2B6}" srcOrd="0" destOrd="1" presId="urn:microsoft.com/office/officeart/2005/8/layout/process3"/>
+    <dgm:cxn modelId="{5DDCBCED-AD9D-443E-B390-A89DFC1C749F}" type="presOf" srcId="{140DB818-E071-4B39-BEDA-37F84C79FBA2}" destId="{184053F0-8034-496C-9823-B7D238D8DC93}" srcOrd="0" destOrd="0" presId="urn:microsoft.com/office/officeart/2005/8/layout/process3"/>
+    <dgm:cxn modelId="{9DB33BD0-4DBA-4C3F-846F-F2711FE0E6BD}" srcId="{140DB818-E071-4B39-BEDA-37F84C79FBA2}" destId="{F9D38618-21A9-472D-92B4-2079A7013EA4}" srcOrd="1" destOrd="0" parTransId="{181E5304-5E89-4CE3-A1FA-1A4445AF15C8}" sibTransId="{DEBEAAE4-E6F2-4848-9079-BE40B31BACCD}"/>
+    <dgm:cxn modelId="{1797C3E7-363E-4D4F-BF7B-E725B7DA6E80}" type="presOf" srcId="{579997AD-FA9A-4915-A323-8F17CA09514B}" destId="{E703F4C6-A0E0-49AD-9FAC-F47DD1F01258}" srcOrd="1" destOrd="0" presId="urn:microsoft.com/office/officeart/2005/8/layout/process3"/>
+    <dgm:cxn modelId="{9BA353C9-342D-4AC1-B18F-375E8BA8C074}" type="presOf" srcId="{2CABE3B6-2EEA-4A99-BBE7-085383B9725D}" destId="{3E47BC9E-87C0-4D93-83F4-A810B62AEF07}" srcOrd="0" destOrd="2" presId="urn:microsoft.com/office/officeart/2005/8/layout/process3"/>
+    <dgm:cxn modelId="{D0D17C37-7497-44FA-8908-85838A8EB613}" srcId="{140DB818-E071-4B39-BEDA-37F84C79FBA2}" destId="{30BC9797-C8E3-4728-AA34-A33AFEAA692E}" srcOrd="3" destOrd="0" parTransId="{22B7AA6B-9EFA-4D2B-9167-284C1AC4B3BE}" sibTransId="{054B1F8E-E9AC-4A78-BB16-7D8497700B75}"/>
+    <dgm:cxn modelId="{E6108260-E385-432B-A806-C31C8E849437}" srcId="{4BA36FF7-0F0F-4341-A68C-01E8516603CD}" destId="{B2D64904-4778-414A-935C-AFC992C15E50}" srcOrd="0" destOrd="0" parTransId="{3886B039-ED5A-4C35-9224-7296F3AB00E8}" sibTransId="{F27A2EE6-AA94-4404-920A-4FEA4A59E153}"/>
+    <dgm:cxn modelId="{9C28426E-782A-4827-A1AF-DF19DEE0E663}" srcId="{140DB818-E071-4B39-BEDA-37F84C79FBA2}" destId="{2CABE3B6-2EEA-4A99-BBE7-085383B9725D}" srcOrd="2" destOrd="0" parTransId="{E50B1FFE-B27A-488D-9E1C-753288103707}" sibTransId="{4AC18B29-D66A-4290-B0B1-638894B89790}"/>
+    <dgm:cxn modelId="{E22A4332-4F38-4397-A0CA-E07AB4FDA400}" type="presOf" srcId="{AD7A2D0A-69C1-40D4-AC3C-50ACA39C45C1}" destId="{EA7354A6-04B1-4A5C-BE93-3D503C066108}" srcOrd="0" destOrd="0" presId="urn:microsoft.com/office/officeart/2005/8/layout/process3"/>
+    <dgm:cxn modelId="{E5B78FEC-B1D9-4EC3-A03E-DD89AE2D8BBB}" srcId="{AD7A2D0A-69C1-40D4-AC3C-50ACA39C45C1}" destId="{0F3E3240-049E-4C85-83B0-4A38B3BAD305}" srcOrd="1" destOrd="0" parTransId="{500CBC5A-72EC-4F1F-8BD7-22D81C693AA8}" sibTransId="{6817EB24-D370-4C5E-ABB4-525C433C69F0}"/>
+    <dgm:cxn modelId="{3E2D5840-5BEF-43B9-949A-04752B46AD4F}" type="presOf" srcId="{0F73E91A-24E8-44FC-8282-F39E528AC837}" destId="{A64C8272-FC1A-4572-A0B1-A3C36EACD2B6}" srcOrd="0" destOrd="3" presId="urn:microsoft.com/office/officeart/2005/8/layout/process3"/>
+    <dgm:cxn modelId="{7F41E571-0B1D-42DB-A0D6-32AC8948638C}" type="presOf" srcId="{AB2E5A07-628C-4E92-90B5-D0FC29CDD9C7}" destId="{A64C8272-FC1A-4572-A0B1-A3C36EACD2B6}" srcOrd="0" destOrd="4" presId="urn:microsoft.com/office/officeart/2005/8/layout/process3"/>
+    <dgm:cxn modelId="{9F5BFA76-CC6B-4880-BD6E-7917A3B8011E}" type="presOf" srcId="{0F3E3240-049E-4C85-83B0-4A38B3BAD305}" destId="{1993AEF3-68C8-4F83-9F1E-D1B7B5B4963C}" srcOrd="0" destOrd="1" presId="urn:microsoft.com/office/officeart/2005/8/layout/process3"/>
+    <dgm:cxn modelId="{56B5A9B6-E058-4348-883F-BE413F7AEF39}" type="presOf" srcId="{835444D0-9403-488B-8CF6-1BA423F14FF4}" destId="{A64C8272-FC1A-4572-A0B1-A3C36EACD2B6}" srcOrd="0" destOrd="2" presId="urn:microsoft.com/office/officeart/2005/8/layout/process3"/>
+    <dgm:cxn modelId="{AE01CECD-7460-4EE6-9855-462A6BAC54CD}" type="presOf" srcId="{21736AD5-ED16-41EE-9520-03DEC94C9DD9}" destId="{1993AEF3-68C8-4F83-9F1E-D1B7B5B4963C}" srcOrd="0" destOrd="0" presId="urn:microsoft.com/office/officeart/2005/8/layout/process3"/>
+    <dgm:cxn modelId="{625B97B1-48B9-4F79-AD12-9E967C7E5D25}" type="presOf" srcId="{57884B04-88D4-4FB2-8678-5199DF429E6F}" destId="{3E47BC9E-87C0-4D93-83F4-A810B62AEF07}" srcOrd="0" destOrd="0" presId="urn:microsoft.com/office/officeart/2005/8/layout/process3"/>
+    <dgm:cxn modelId="{D1284BD6-E3DA-48A8-BFF9-25C5710CED70}" type="presOf" srcId="{4BA36FF7-0F0F-4341-A68C-01E8516603CD}" destId="{209FD6B3-0ECB-4203-B962-7559934405BD}" srcOrd="0" destOrd="0" presId="urn:microsoft.com/office/officeart/2005/8/layout/process3"/>
+    <dgm:cxn modelId="{33D1B9A7-E56C-4778-97FB-A5B130BCA5C0}" srcId="{AD7A2D0A-69C1-40D4-AC3C-50ACA39C45C1}" destId="{21736AD5-ED16-41EE-9520-03DEC94C9DD9}" srcOrd="0" destOrd="0" parTransId="{9CB51E30-49E4-4E36-942B-179B5A0EC94C}" sibTransId="{DFDDDFD5-3525-4DBC-A81D-34093C1E23BA}"/>
     <dgm:cxn modelId="{C288C32A-3227-4782-B852-198321A78827}" type="presOf" srcId="{140DB818-E071-4B39-BEDA-37F84C79FBA2}" destId="{D6C82472-F7A1-44F8-BE16-C0E2E40E0D6B}" srcOrd="1" destOrd="0" presId="urn:microsoft.com/office/officeart/2005/8/layout/process3"/>
-    <dgm:cxn modelId="{021B0986-616E-47A6-BC20-5C2A8AA71A81}" type="presOf" srcId="{E253E697-B0C3-42D4-81FD-D3ABCA72938E}" destId="{BCDBC707-4A93-4D55-A61A-79732B703027}" srcOrd="0" destOrd="0" presId="urn:microsoft.com/office/officeart/2005/8/layout/process3"/>
-    <dgm:cxn modelId="{BB53AC73-5473-4487-A280-CC415E72C20C}" srcId="{E253E697-B0C3-42D4-81FD-D3ABCA72938E}" destId="{140DB818-E071-4B39-BEDA-37F84C79FBA2}" srcOrd="1" destOrd="0" parTransId="{5D492640-F330-4177-9F25-0C2545064803}" sibTransId="{AAA7816F-0D18-434B-AF27-E1709A042EA5}"/>
-    <dgm:cxn modelId="{82215399-8FEF-435E-B12E-B0BBF6350A2D}" srcId="{140DB818-E071-4B39-BEDA-37F84C79FBA2}" destId="{57884B04-88D4-4FB2-8678-5199DF429E6F}" srcOrd="0" destOrd="0" parTransId="{C4B27B1D-C2E0-4804-B643-F031B63B66D3}" sibTransId="{B8942B1F-0DA1-4630-8D8B-34A3B43C11D5}"/>
-    <dgm:cxn modelId="{E22A4332-4F38-4397-A0CA-E07AB4FDA400}" type="presOf" srcId="{AD7A2D0A-69C1-40D4-AC3C-50ACA39C45C1}" destId="{EA7354A6-04B1-4A5C-BE93-3D503C066108}" srcOrd="0" destOrd="0" presId="urn:microsoft.com/office/officeart/2005/8/layout/process3"/>
-    <dgm:cxn modelId="{1BD557F6-3147-4A3E-96E1-8774CC36B89A}" srcId="{E253E697-B0C3-42D4-81FD-D3ABCA72938E}" destId="{AD7A2D0A-69C1-40D4-AC3C-50ACA39C45C1}" srcOrd="2" destOrd="0" parTransId="{B65DA3CC-30DF-4011-97FD-91E67EF19982}" sibTransId="{D8E3431A-1020-45BC-A3A1-D9601A2EED84}"/>
-    <dgm:cxn modelId="{625B97B1-48B9-4F79-AD12-9E967C7E5D25}" type="presOf" srcId="{57884B04-88D4-4FB2-8678-5199DF429E6F}" destId="{3E47BC9E-87C0-4D93-83F4-A810B62AEF07}" srcOrd="0" destOrd="0" presId="urn:microsoft.com/office/officeart/2005/8/layout/process3"/>
-    <dgm:cxn modelId="{1797C3E7-363E-4D4F-BF7B-E725B7DA6E80}" type="presOf" srcId="{579997AD-FA9A-4915-A323-8F17CA09514B}" destId="{E703F4C6-A0E0-49AD-9FAC-F47DD1F01258}" srcOrd="1" destOrd="0" presId="urn:microsoft.com/office/officeart/2005/8/layout/process3"/>
-    <dgm:cxn modelId="{5DDCBCED-AD9D-443E-B390-A89DFC1C749F}" type="presOf" srcId="{140DB818-E071-4B39-BEDA-37F84C79FBA2}" destId="{184053F0-8034-496C-9823-B7D238D8DC93}" srcOrd="0" destOrd="0" presId="urn:microsoft.com/office/officeart/2005/8/layout/process3"/>
-    <dgm:cxn modelId="{605658C6-069A-4135-B3FB-B8571120DFAF}" type="presOf" srcId="{4BA36FF7-0F0F-4341-A68C-01E8516603CD}" destId="{DADC7395-583C-4FD5-8691-3342B823E6CA}" srcOrd="1" destOrd="0" presId="urn:microsoft.com/office/officeart/2005/8/layout/process3"/>
-    <dgm:cxn modelId="{D95A37CA-F51F-4A08-8D0B-184665F642AA}" type="presOf" srcId="{579997AD-FA9A-4915-A323-8F17CA09514B}" destId="{330F8E89-32DF-4BC4-AED2-91D2D7CB94C5}" srcOrd="0" destOrd="0" presId="urn:microsoft.com/office/officeart/2005/8/layout/process3"/>
-    <dgm:cxn modelId="{13DDD5AB-9265-4DB2-9E66-512CAA799786}" srcId="{E253E697-B0C3-42D4-81FD-D3ABCA72938E}" destId="{4BA36FF7-0F0F-4341-A68C-01E8516603CD}" srcOrd="0" destOrd="0" parTransId="{9FBCD112-267C-4316-B4DD-D2608637A18B}" sibTransId="{579997AD-FA9A-4915-A323-8F17CA09514B}"/>
-    <dgm:cxn modelId="{3B833AF1-554A-4115-83EE-25F9C4E2AEFD}" type="presOf" srcId="{B2D64904-4778-414A-935C-AFC992C15E50}" destId="{A64C8272-FC1A-4572-A0B1-A3C36EACD2B6}" srcOrd="0" destOrd="0" presId="urn:microsoft.com/office/officeart/2005/8/layout/process3"/>
-    <dgm:cxn modelId="{AE01CECD-7460-4EE6-9855-462A6BAC54CD}" type="presOf" srcId="{21736AD5-ED16-41EE-9520-03DEC94C9DD9}" destId="{1993AEF3-68C8-4F83-9F1E-D1B7B5B4963C}" srcOrd="0" destOrd="0" presId="urn:microsoft.com/office/officeart/2005/8/layout/process3"/>
-    <dgm:cxn modelId="{9C9CCD84-152C-4BF0-AE56-02A77DCE9308}" type="presOf" srcId="{AD7A2D0A-69C1-40D4-AC3C-50ACA39C45C1}" destId="{944B484B-F688-4CFA-A4FB-08B237CA5903}" srcOrd="1" destOrd="0" presId="urn:microsoft.com/office/officeart/2005/8/layout/process3"/>
-    <dgm:cxn modelId="{D1284BD6-E3DA-48A8-BFF9-25C5710CED70}" type="presOf" srcId="{4BA36FF7-0F0F-4341-A68C-01E8516603CD}" destId="{209FD6B3-0ECB-4203-B962-7559934405BD}" srcOrd="0" destOrd="0" presId="urn:microsoft.com/office/officeart/2005/8/layout/process3"/>
-    <dgm:cxn modelId="{7A1F2110-9C05-4201-A75F-73284CDE0F86}" srcId="{4BA36FF7-0F0F-4341-A68C-01E8516603CD}" destId="{AB2E5A07-628C-4E92-90B5-D0FC29CDD9C7}" srcOrd="1" destOrd="0" parTransId="{4015142C-E082-4615-B7AB-FB0D2987A9AC}" sibTransId="{1A383F36-FE35-43F6-9A56-87C1C2601885}"/>
-    <dgm:cxn modelId="{7DDFCDF5-FB4B-4B56-AB28-D717E8E38C18}" type="presOf" srcId="{AAA7816F-0D18-434B-AF27-E1709A042EA5}" destId="{A890346F-3222-4081-BF76-FED6671C2558}" srcOrd="1" destOrd="0" presId="urn:microsoft.com/office/officeart/2005/8/layout/process3"/>
-    <dgm:cxn modelId="{7F41E571-0B1D-42DB-A0D6-32AC8948638C}" type="presOf" srcId="{AB2E5A07-628C-4E92-90B5-D0FC29CDD9C7}" destId="{A64C8272-FC1A-4572-A0B1-A3C36EACD2B6}" srcOrd="0" destOrd="1" presId="urn:microsoft.com/office/officeart/2005/8/layout/process3"/>
-    <dgm:cxn modelId="{5A2ECE84-5973-469B-B8D7-72377C33E035}" type="presOf" srcId="{AAA7816F-0D18-434B-AF27-E1709A042EA5}" destId="{1390A124-BEDA-4A49-9B1B-0ED2FB571A6C}" srcOrd="0" destOrd="0" presId="urn:microsoft.com/office/officeart/2005/8/layout/process3"/>
-    <dgm:cxn modelId="{E6108260-E385-432B-A806-C31C8E849437}" srcId="{4BA36FF7-0F0F-4341-A68C-01E8516603CD}" destId="{B2D64904-4778-414A-935C-AFC992C15E50}" srcOrd="0" destOrd="0" parTransId="{3886B039-ED5A-4C35-9224-7296F3AB00E8}" sibTransId="{F27A2EE6-AA94-4404-920A-4FEA4A59E153}"/>
-    <dgm:cxn modelId="{33D1B9A7-E56C-4778-97FB-A5B130BCA5C0}" srcId="{AD7A2D0A-69C1-40D4-AC3C-50ACA39C45C1}" destId="{21736AD5-ED16-41EE-9520-03DEC94C9DD9}" srcOrd="0" destOrd="0" parTransId="{9CB51E30-49E4-4E36-942B-179B5A0EC94C}" sibTransId="{DFDDDFD5-3525-4DBC-A81D-34093C1E23BA}"/>
     <dgm:cxn modelId="{7A716225-B15F-42A3-B0B1-95F5DAF585E6}" type="presParOf" srcId="{BCDBC707-4A93-4D55-A61A-79732B703027}" destId="{53AF55CF-52F1-471D-BD6D-B6FBBCD8ED56}" srcOrd="0" destOrd="0" presId="urn:microsoft.com/office/officeart/2005/8/layout/process3"/>
     <dgm:cxn modelId="{AB11F588-8517-43F7-B26C-B53A5C95128F}" type="presParOf" srcId="{53AF55CF-52F1-471D-BD6D-B6FBBCD8ED56}" destId="{209FD6B3-0ECB-4203-B962-7559934405BD}" srcOrd="0" destOrd="0" presId="urn:microsoft.com/office/officeart/2005/8/layout/process3"/>
     <dgm:cxn modelId="{ECA7C0B7-4EAB-47E7-B4DA-234ACDCD8581}" type="presParOf" srcId="{53AF55CF-52F1-471D-BD6D-B6FBBCD8ED56}" destId="{DADC7395-583C-4FD5-8691-3342B823E6CA}" srcOrd="1" destOrd="0" presId="urn:microsoft.com/office/officeart/2005/8/layout/process3"/>
@@ -6051,7 +6580,7 @@
   <dgm:whole/>
   <dgm:extLst>
     <a:ext uri="http://schemas.microsoft.com/office/drawing/2008/diagram">
-      <dsp:dataModelExt xmlns:dsp="http://schemas.microsoft.com/office/drawing/2008/diagram" xmlns="" relId="rId6" minVer="http://schemas.openxmlformats.org/drawingml/2006/diagram"/>
+      <dsp:dataModelExt xmlns="" xmlns:dsp="http://schemas.microsoft.com/office/drawing/2008/diagram" relId="rId6" minVer="http://schemas.openxmlformats.org/drawingml/2006/diagram"/>
     </a:ext>
   </dgm:extLst>
 </dgm:dataModel>
@@ -6061,7 +6590,7 @@
 <dgm:dataModel xmlns:dgm="http://schemas.openxmlformats.org/drawingml/2006/diagram" xmlns:a="http://schemas.openxmlformats.org/drawingml/2006/main">
   <dgm:ptLst>
     <dgm:pt modelId="{09E1FA74-CAD4-4D8F-8C9F-47DB10A12E4C}" type="doc">
-      <dgm:prSet loTypeId="urn:microsoft.com/office/officeart/2008/layout/SquareAccentList" loCatId="list" qsTypeId="urn:microsoft.com/office/officeart/2005/8/quickstyle/simple1" qsCatId="simple" csTypeId="urn:microsoft.com/office/officeart/2005/8/colors/accent1_2" csCatId="accent1" phldr="0"/>
+      <dgm:prSet loTypeId="urn:microsoft.com/office/officeart/2008/layout/SquareAccentList" loCatId="list" qsTypeId="urn:microsoft.com/office/officeart/2005/8/quickstyle/simple1" qsCatId="simple" csTypeId="urn:microsoft.com/office/officeart/2005/8/colors/accent1_2" csCatId="accent1" phldr="1"/>
       <dgm:spPr/>
       <dgm:t>
         <a:bodyPr/>
@@ -6072,12 +6601,16 @@
       </dgm:t>
     </dgm:pt>
     <dgm:pt modelId="{B41D75AE-2A29-4277-8DBB-D5E9CED79C4D}">
-      <dgm:prSet phldrT="[Texto]" phldr="1"/>
+      <dgm:prSet phldrT="[Texto]"/>
       <dgm:spPr/>
       <dgm:t>
         <a:bodyPr/>
         <a:lstStyle/>
         <a:p>
+          <a:r>
+            <a:rPr lang="pt-BR" dirty="0" smtClean="0"/>
+            <a:t>Dificuldades</a:t>
+          </a:r>
           <a:endParaRPr lang="pt-BR" dirty="0"/>
         </a:p>
       </dgm:t>
@@ -6105,13 +6638,17 @@
       </dgm:t>
     </dgm:pt>
     <dgm:pt modelId="{B2A72572-DD94-49F3-9C74-F97F76DD77E8}">
-      <dgm:prSet phldrT="[Texto]" phldr="1"/>
+      <dgm:prSet phldrT="[Texto]"/>
       <dgm:spPr/>
       <dgm:t>
         <a:bodyPr/>
         <a:lstStyle/>
         <a:p>
-          <a:endParaRPr lang="pt-BR"/>
+          <a:r>
+            <a:rPr lang="pt-BR" dirty="0" smtClean="0"/>
+            <a:t>Controles atividades</a:t>
+          </a:r>
+          <a:endParaRPr lang="pt-BR" dirty="0"/>
         </a:p>
       </dgm:t>
     </dgm:pt>
@@ -6138,13 +6675,17 @@
       </dgm:t>
     </dgm:pt>
     <dgm:pt modelId="{8AB1D12E-E418-4915-8CED-6AB0C84761F4}">
-      <dgm:prSet phldrT="[Texto]" phldr="1"/>
+      <dgm:prSet phldrT="[Texto]"/>
       <dgm:spPr/>
       <dgm:t>
         <a:bodyPr/>
         <a:lstStyle/>
         <a:p>
-          <a:endParaRPr lang="pt-BR"/>
+          <a:r>
+            <a:rPr lang="pt-BR" dirty="0" smtClean="0"/>
+            <a:t>Manter históricos</a:t>
+          </a:r>
+          <a:endParaRPr lang="pt-BR" dirty="0"/>
         </a:p>
       </dgm:t>
     </dgm:pt>
@@ -6171,13 +6712,17 @@
       </dgm:t>
     </dgm:pt>
     <dgm:pt modelId="{AC6C1CB8-BE46-44FC-93D0-1A13ABC82896}">
-      <dgm:prSet phldrT="[Texto]" phldr="1"/>
+      <dgm:prSet phldrT="[Texto]"/>
       <dgm:spPr/>
       <dgm:t>
         <a:bodyPr/>
         <a:lstStyle/>
         <a:p>
-          <a:endParaRPr lang="pt-BR"/>
+          <a:r>
+            <a:rPr lang="pt-BR" dirty="0" smtClean="0"/>
+            <a:t>Fragmentação dos dados</a:t>
+          </a:r>
+          <a:endParaRPr lang="pt-BR" dirty="0"/>
         </a:p>
       </dgm:t>
     </dgm:pt>
@@ -6204,13 +6749,13 @@
       </dgm:t>
     </dgm:pt>
     <dgm:pt modelId="{AAC17C87-31E8-4276-B5AF-B8910E5CA9AA}">
-      <dgm:prSet phldrT="[Texto]" phldr="1"/>
+      <dgm:prSet phldrT="[Texto]"/>
       <dgm:spPr/>
       <dgm:t>
         <a:bodyPr/>
         <a:lstStyle/>
         <a:p>
-          <a:endParaRPr lang="pt-BR"/>
+          <a:endParaRPr lang="pt-BR" dirty="0"/>
         </a:p>
       </dgm:t>
     </dgm:pt>
@@ -6309,7 +6854,7 @@
         <a:bodyPr/>
         <a:lstStyle/>
         <a:p>
-          <a:endParaRPr lang="pt-BR"/>
+          <a:endParaRPr lang="pt-BR" dirty="0"/>
         </a:p>
       </dgm:t>
     </dgm:pt>
@@ -6685,7 +7230,7 @@
   <dgm:whole/>
   <dgm:extLst>
     <a:ext uri="http://schemas.microsoft.com/office/drawing/2008/diagram">
-      <dsp:dataModelExt xmlns:dsp="http://schemas.microsoft.com/office/drawing/2008/diagram" xmlns="" relId="rId6" minVer="http://schemas.openxmlformats.org/drawingml/2006/diagram"/>
+      <dsp:dataModelExt xmlns="" xmlns:dsp="http://schemas.microsoft.com/office/drawing/2008/diagram" relId="rId6" minVer="http://schemas.openxmlformats.org/drawingml/2006/diagram"/>
     </a:ext>
   </dgm:extLst>
 </dgm:dataModel>
@@ -7510,7 +8055,7 @@
   <dgm:whole/>
   <dgm:extLst>
     <a:ext uri="http://schemas.microsoft.com/office/drawing/2008/diagram">
-      <dsp:dataModelExt xmlns:dsp="http://schemas.microsoft.com/office/drawing/2008/diagram" xmlns="" relId="rId6" minVer="http://schemas.openxmlformats.org/drawingml/2006/diagram"/>
+      <dsp:dataModelExt xmlns="" xmlns:dsp="http://schemas.microsoft.com/office/drawing/2008/diagram" relId="rId6" minVer="http://schemas.openxmlformats.org/drawingml/2006/diagram"/>
     </a:ext>
   </dgm:extLst>
 </dgm:dataModel>
@@ -7992,7 +8537,7 @@
   <dgm:whole/>
   <dgm:extLst>
     <a:ext uri="http://schemas.microsoft.com/office/drawing/2008/diagram">
-      <dsp:dataModelExt xmlns:dsp="http://schemas.microsoft.com/office/drawing/2008/diagram" xmlns="" relId="rId6" minVer="http://schemas.openxmlformats.org/drawingml/2006/diagram"/>
+      <dsp:dataModelExt xmlns="" xmlns:dsp="http://schemas.microsoft.com/office/drawing/2008/diagram" relId="rId6" minVer="http://schemas.openxmlformats.org/drawingml/2006/diagram"/>
     </a:ext>
   </dgm:extLst>
 </dgm:dataModel>
@@ -8997,7 +9542,7 @@
   <dgm:whole/>
   <dgm:extLst>
     <a:ext uri="http://schemas.microsoft.com/office/drawing/2008/diagram">
-      <dsp:dataModelExt xmlns:dsp="http://schemas.microsoft.com/office/drawing/2008/diagram" xmlns="" relId="rId6" minVer="http://schemas.openxmlformats.org/drawingml/2006/diagram"/>
+      <dsp:dataModelExt xmlns="" xmlns:dsp="http://schemas.microsoft.com/office/drawing/2008/diagram" relId="rId6" minVer="http://schemas.openxmlformats.org/drawingml/2006/diagram"/>
     </a:ext>
   </dgm:extLst>
 </dgm:dataModel>
@@ -23372,7 +23917,7 @@
             <a:fld id="{229FDC3E-7424-49CF-AF38-AA35F4C77C8D}" type="datetimeFigureOut">
               <a:rPr lang="pt-BR" smtClean="0"/>
               <a:pPr/>
-              <a:t>03/06/2014</a:t>
+              <a:t>15/07/2014</a:t>
             </a:fld>
             <a:endParaRPr lang="pt-BR"/>
           </a:p>
@@ -23544,7 +24089,7 @@
             <a:fld id="{229FDC3E-7424-49CF-AF38-AA35F4C77C8D}" type="datetimeFigureOut">
               <a:rPr lang="pt-BR" smtClean="0"/>
               <a:pPr/>
-              <a:t>03/06/2014</a:t>
+              <a:t>15/07/2014</a:t>
             </a:fld>
             <a:endParaRPr lang="pt-BR"/>
           </a:p>
@@ -23721,7 +24266,7 @@
             <a:fld id="{229FDC3E-7424-49CF-AF38-AA35F4C77C8D}" type="datetimeFigureOut">
               <a:rPr lang="pt-BR" smtClean="0"/>
               <a:pPr/>
-              <a:t>03/06/2014</a:t>
+              <a:t>15/07/2014</a:t>
             </a:fld>
             <a:endParaRPr lang="pt-BR"/>
           </a:p>
@@ -23888,7 +24433,7 @@
             <a:fld id="{229FDC3E-7424-49CF-AF38-AA35F4C77C8D}" type="datetimeFigureOut">
               <a:rPr lang="pt-BR" smtClean="0"/>
               <a:pPr/>
-              <a:t>03/06/2014</a:t>
+              <a:t>15/07/2014</a:t>
             </a:fld>
             <a:endParaRPr lang="pt-BR"/>
           </a:p>
@@ -24124,7 +24669,7 @@
             <a:fld id="{229FDC3E-7424-49CF-AF38-AA35F4C77C8D}" type="datetimeFigureOut">
               <a:rPr lang="pt-BR" smtClean="0"/>
               <a:pPr/>
-              <a:t>03/06/2014</a:t>
+              <a:t>15/07/2014</a:t>
             </a:fld>
             <a:endParaRPr lang="pt-BR"/>
           </a:p>
@@ -24422,7 +24967,7 @@
             <a:fld id="{229FDC3E-7424-49CF-AF38-AA35F4C77C8D}" type="datetimeFigureOut">
               <a:rPr lang="pt-BR" smtClean="0"/>
               <a:pPr/>
-              <a:t>03/06/2014</a:t>
+              <a:t>15/07/2014</a:t>
             </a:fld>
             <a:endParaRPr lang="pt-BR"/>
           </a:p>
@@ -24808,7 +25353,7 @@
             <a:fld id="{229FDC3E-7424-49CF-AF38-AA35F4C77C8D}" type="datetimeFigureOut">
               <a:rPr lang="pt-BR" smtClean="0"/>
               <a:pPr/>
-              <a:t>03/06/2014</a:t>
+              <a:t>15/07/2014</a:t>
             </a:fld>
             <a:endParaRPr lang="pt-BR"/>
           </a:p>
@@ -24983,7 +25528,7 @@
             <a:fld id="{229FDC3E-7424-49CF-AF38-AA35F4C77C8D}" type="datetimeFigureOut">
               <a:rPr lang="pt-BR" smtClean="0"/>
               <a:pPr/>
-              <a:t>03/06/2014</a:t>
+              <a:t>15/07/2014</a:t>
             </a:fld>
             <a:endParaRPr lang="pt-BR"/>
           </a:p>
@@ -25075,7 +25620,7 @@
             <a:fld id="{229FDC3E-7424-49CF-AF38-AA35F4C77C8D}" type="datetimeFigureOut">
               <a:rPr lang="pt-BR" smtClean="0"/>
               <a:pPr/>
-              <a:t>03/06/2014</a:t>
+              <a:t>15/07/2014</a:t>
             </a:fld>
             <a:endParaRPr lang="pt-BR"/>
           </a:p>
@@ -25372,7 +25917,7 @@
             <a:fld id="{229FDC3E-7424-49CF-AF38-AA35F4C77C8D}" type="datetimeFigureOut">
               <a:rPr lang="pt-BR" smtClean="0"/>
               <a:pPr/>
-              <a:t>03/06/2014</a:t>
+              <a:t>15/07/2014</a:t>
             </a:fld>
             <a:endParaRPr lang="pt-BR"/>
           </a:p>
@@ -25508,7 +26053,7 @@
             <a:fld id="{229FDC3E-7424-49CF-AF38-AA35F4C77C8D}" type="datetimeFigureOut">
               <a:rPr lang="pt-BR" smtClean="0"/>
               <a:pPr/>
-              <a:t>03/06/2014</a:t>
+              <a:t>15/07/2014</a:t>
             </a:fld>
             <a:endParaRPr lang="pt-BR"/>
           </a:p>
@@ -25813,7 +26358,7 @@
             <a:fld id="{229FDC3E-7424-49CF-AF38-AA35F4C77C8D}" type="datetimeFigureOut">
               <a:rPr lang="pt-BR" smtClean="0"/>
               <a:pPr/>
-              <a:t>03/06/2014</a:t>
+              <a:t>15/07/2014</a:t>
             </a:fld>
             <a:endParaRPr lang="pt-BR"/>
           </a:p>
@@ -26578,7 +27123,7 @@
             <p:ph idx="1"/>
             <p:extLst>
               <p:ext uri="{D42A27DB-BD31-4B8C-83A1-F6EECF244321}">
-                <p14:modId xmlns="" xmlns:p14="http://schemas.microsoft.com/office/powerpoint/2010/main" val="2208909862"/>
+                <p14:modId xmlns:p14="http://schemas.microsoft.com/office/powerpoint/2010/main" xmlns="" val="2208909862"/>
               </p:ext>
             </p:extLst>
           </p:nvPr>
@@ -26934,7 +27479,7 @@
             <p:ph idx="1"/>
             <p:extLst>
               <p:ext uri="{D42A27DB-BD31-4B8C-83A1-F6EECF244321}">
-                <p14:modId xmlns="" xmlns:p14="http://schemas.microsoft.com/office/powerpoint/2010/main" val="2118870426"/>
+                <p14:modId xmlns:p14="http://schemas.microsoft.com/office/powerpoint/2010/main" xmlns="" val="2118870426"/>
               </p:ext>
             </p:extLst>
           </p:nvPr>
@@ -27014,7 +27559,7 @@
             <p:ph idx="1"/>
             <p:extLst>
               <p:ext uri="{D42A27DB-BD31-4B8C-83A1-F6EECF244321}">
-                <p14:modId xmlns="" xmlns:p14="http://schemas.microsoft.com/office/powerpoint/2010/main" val="736405372"/>
+                <p14:modId xmlns:p14="http://schemas.microsoft.com/office/powerpoint/2010/main" xmlns="" val="736405372"/>
               </p:ext>
             </p:extLst>
           </p:nvPr>

</xml_diff>

<commit_message>
2014 07 22 10:07
Ediação da app
Conceito da apliacação
</commit_message>
<xml_diff>
--- a/SAS/Planejamento/Docs/#3 - Apresentação do projeto.pptx
+++ b/SAS/Planejamento/Docs/#3 - Apresentação do projeto.pptx
@@ -11,13 +11,12 @@
     <p:sldId id="265" r:id="rId5"/>
     <p:sldId id="269" r:id="rId6"/>
     <p:sldId id="264" r:id="rId7"/>
-    <p:sldId id="274" r:id="rId8"/>
-    <p:sldId id="260" r:id="rId9"/>
-    <p:sldId id="261" r:id="rId10"/>
-    <p:sldId id="257" r:id="rId11"/>
-    <p:sldId id="270" r:id="rId12"/>
-    <p:sldId id="271" r:id="rId13"/>
-    <p:sldId id="272" r:id="rId14"/>
+    <p:sldId id="260" r:id="rId8"/>
+    <p:sldId id="261" r:id="rId9"/>
+    <p:sldId id="257" r:id="rId10"/>
+    <p:sldId id="270" r:id="rId11"/>
+    <p:sldId id="271" r:id="rId12"/>
+    <p:sldId id="272" r:id="rId13"/>
   </p:sldIdLst>
   <p:sldSz cx="9144000" cy="6858000" type="screen4x3"/>
   <p:notesSz cx="6858000" cy="9144000"/>
@@ -3108,15 +3107,17 @@
 </file>
 
 <file path=ppt/diagrams/colors5.xml><?xml version="1.0" encoding="utf-8"?>
-<dgm:colorsDef xmlns:dgm="http://schemas.openxmlformats.org/drawingml/2006/diagram" xmlns:a="http://schemas.openxmlformats.org/drawingml/2006/main" uniqueId="urn:microsoft.com/office/officeart/2005/8/colors/accent1_2">
+<dgm:colorsDef xmlns:dgm="http://schemas.openxmlformats.org/drawingml/2006/diagram" xmlns:a="http://schemas.openxmlformats.org/drawingml/2006/main" uniqueId="urn:microsoft.com/office/officeart/2005/8/colors/accent2_5">
   <dgm:title val=""/>
   <dgm:desc val=""/>
   <dgm:catLst>
-    <dgm:cat type="accent1" pri="11200"/>
+    <dgm:cat type="accent2" pri="11500"/>
   </dgm:catLst>
   <dgm:styleLbl name="node0">
-    <dgm:fillClrLst meth="repeat">
-      <a:schemeClr val="accent1"/>
+    <dgm:fillClrLst meth="cycle">
+      <a:schemeClr val="accent2">
+        <a:alpha val="80000"/>
+      </a:schemeClr>
     </dgm:fillClrLst>
     <dgm:linClrLst meth="repeat">
       <a:schemeClr val="lt1"/>
@@ -3126,21 +3127,14 @@
     <dgm:txFillClrLst/>
     <dgm:txEffectClrLst/>
   </dgm:styleLbl>
-  <dgm:styleLbl name="alignNode1">
-    <dgm:fillClrLst meth="repeat">
-      <a:schemeClr val="accent1"/>
-    </dgm:fillClrLst>
-    <dgm:linClrLst meth="repeat">
-      <a:schemeClr val="accent1"/>
-    </dgm:linClrLst>
-    <dgm:effectClrLst/>
-    <dgm:txLinClrLst/>
-    <dgm:txFillClrLst/>
-    <dgm:txEffectClrLst/>
-  </dgm:styleLbl>
   <dgm:styleLbl name="node1">
-    <dgm:fillClrLst meth="repeat">
-      <a:schemeClr val="accent1"/>
+    <dgm:fillClrLst>
+      <a:schemeClr val="accent2">
+        <a:alpha val="90000"/>
+      </a:schemeClr>
+      <a:schemeClr val="accent2">
+        <a:alpha val="50000"/>
+      </a:schemeClr>
     </dgm:fillClrLst>
     <dgm:linClrLst meth="repeat">
       <a:schemeClr val="lt1"/>
@@ -3150,9 +3144,37 @@
     <dgm:txFillClrLst/>
     <dgm:txEffectClrLst/>
   </dgm:styleLbl>
+  <dgm:styleLbl name="alignNode1">
+    <dgm:fillClrLst>
+      <a:schemeClr val="accent2">
+        <a:alpha val="90000"/>
+      </a:schemeClr>
+      <a:schemeClr val="accent2">
+        <a:alpha val="50000"/>
+      </a:schemeClr>
+    </dgm:fillClrLst>
+    <dgm:linClrLst>
+      <a:schemeClr val="accent2">
+        <a:alpha val="90000"/>
+      </a:schemeClr>
+      <a:schemeClr val="accent2">
+        <a:alpha val="50000"/>
+      </a:schemeClr>
+    </dgm:linClrLst>
+    <dgm:effectClrLst/>
+    <dgm:txLinClrLst/>
+    <dgm:txFillClrLst/>
+    <dgm:txEffectClrLst/>
+  </dgm:styleLbl>
   <dgm:styleLbl name="lnNode1">
-    <dgm:fillClrLst meth="repeat">
-      <a:schemeClr val="accent1"/>
+    <dgm:fillClrLst>
+      <a:schemeClr val="accent2">
+        <a:shade val="90000"/>
+      </a:schemeClr>
+      <a:schemeClr val="accent2">
+        <a:alpha val="50000"/>
+        <a:tint val="50000"/>
+      </a:schemeClr>
     </dgm:fillClrLst>
     <dgm:linClrLst meth="repeat">
       <a:schemeClr val="lt1"/>
@@ -3163,10 +3185,14 @@
     <dgm:txEffectClrLst/>
   </dgm:styleLbl>
   <dgm:styleLbl name="vennNode1">
-    <dgm:fillClrLst meth="repeat">
-      <a:schemeClr val="accent1">
+    <dgm:fillClrLst>
+      <a:schemeClr val="accent2">
+        <a:shade val="80000"/>
         <a:alpha val="50000"/>
       </a:schemeClr>
+      <a:schemeClr val="accent2">
+        <a:alpha val="20000"/>
+      </a:schemeClr>
     </dgm:fillClrLst>
     <dgm:linClrLst meth="repeat">
       <a:schemeClr val="lt1"/>
@@ -3177,8 +3203,10 @@
     <dgm:txEffectClrLst/>
   </dgm:styleLbl>
   <dgm:styleLbl name="node2">
-    <dgm:fillClrLst meth="repeat">
-      <a:schemeClr val="accent1"/>
+    <dgm:fillClrLst>
+      <a:schemeClr val="accent2">
+        <a:alpha val="70000"/>
+      </a:schemeClr>
     </dgm:fillClrLst>
     <dgm:linClrLst meth="repeat">
       <a:schemeClr val="lt1"/>
@@ -3189,8 +3217,10 @@
     <dgm:txEffectClrLst/>
   </dgm:styleLbl>
   <dgm:styleLbl name="node3">
-    <dgm:fillClrLst meth="repeat">
-      <a:schemeClr val="accent1"/>
+    <dgm:fillClrLst>
+      <a:schemeClr val="accent2">
+        <a:alpha val="50000"/>
+      </a:schemeClr>
     </dgm:fillClrLst>
     <dgm:linClrLst meth="repeat">
       <a:schemeClr val="lt1"/>
@@ -3201,8 +3231,10 @@
     <dgm:txEffectClrLst/>
   </dgm:styleLbl>
   <dgm:styleLbl name="node4">
-    <dgm:fillClrLst meth="repeat">
-      <a:schemeClr val="accent1"/>
+    <dgm:fillClrLst>
+      <a:schemeClr val="accent2">
+        <a:alpha val="30000"/>
+      </a:schemeClr>
     </dgm:fillClrLst>
     <dgm:linClrLst meth="repeat">
       <a:schemeClr val="lt1"/>
@@ -3213,9 +3245,14 @@
     <dgm:txEffectClrLst/>
   </dgm:styleLbl>
   <dgm:styleLbl name="fgImgPlace1">
-    <dgm:fillClrLst meth="repeat">
-      <a:schemeClr val="accent1">
+    <dgm:fillClrLst>
+      <a:schemeClr val="accent2">
         <a:tint val="50000"/>
+        <a:alpha val="90000"/>
+      </a:schemeClr>
+      <a:schemeClr val="accent2">
+        <a:tint val="20000"/>
+        <a:alpha val="50000"/>
       </a:schemeClr>
     </dgm:fillClrLst>
     <dgm:linClrLst meth="repeat">
@@ -3229,9 +3266,12 @@
     <dgm:txEffectClrLst/>
   </dgm:styleLbl>
   <dgm:styleLbl name="alignImgPlace1">
-    <dgm:fillClrLst meth="repeat">
-      <a:schemeClr val="accent1">
+    <dgm:fillClrLst>
+      <a:schemeClr val="accent2">
         <a:tint val="50000"/>
+      </a:schemeClr>
+      <a:schemeClr val="accent2">
+        <a:tint val="20000"/>
       </a:schemeClr>
     </dgm:fillClrLst>
     <dgm:linClrLst meth="repeat">
@@ -3245,9 +3285,12 @@
     <dgm:txEffectClrLst/>
   </dgm:styleLbl>
   <dgm:styleLbl name="bgImgPlace1">
-    <dgm:fillClrLst meth="repeat">
-      <a:schemeClr val="accent1">
+    <dgm:fillClrLst>
+      <a:schemeClr val="accent2">
         <a:tint val="50000"/>
+      </a:schemeClr>
+      <a:schemeClr val="accent2">
+        <a:tint val="20000"/>
       </a:schemeClr>
     </dgm:fillClrLst>
     <dgm:linClrLst meth="repeat">
@@ -3261,15 +3304,21 @@
     <dgm:txEffectClrLst/>
   </dgm:styleLbl>
   <dgm:styleLbl name="sibTrans2D1">
-    <dgm:fillClrLst meth="repeat">
-      <a:schemeClr val="accent1">
-        <a:tint val="60000"/>
+    <dgm:fillClrLst>
+      <a:schemeClr val="accent2">
+        <a:shade val="90000"/>
       </a:schemeClr>
-    </dgm:fillClrLst>
-    <dgm:linClrLst meth="repeat">
-      <a:schemeClr val="accent1">
-        <a:tint val="60000"/>
+      <a:schemeClr val="accent2">
+        <a:tint val="50000"/>
       </a:schemeClr>
+    </dgm:fillClrLst>
+    <dgm:linClrLst>
+      <a:schemeClr val="accent2">
+        <a:shade val="90000"/>
+      </a:schemeClr>
+      <a:schemeClr val="accent2">
+        <a:tint val="50000"/>
+      </a:schemeClr>
     </dgm:linClrLst>
     <dgm:effectClrLst/>
     <dgm:txLinClrLst/>
@@ -3277,15 +3326,21 @@
     <dgm:txEffectClrLst/>
   </dgm:styleLbl>
   <dgm:styleLbl name="fgSibTrans2D1">
-    <dgm:fillClrLst meth="repeat">
-      <a:schemeClr val="accent1">
-        <a:tint val="60000"/>
+    <dgm:fillClrLst>
+      <a:schemeClr val="accent2">
+        <a:shade val="90000"/>
       </a:schemeClr>
-    </dgm:fillClrLst>
-    <dgm:linClrLst meth="repeat">
-      <a:schemeClr val="accent1">
-        <a:tint val="60000"/>
+      <a:schemeClr val="accent2">
+        <a:tint val="50000"/>
       </a:schemeClr>
+    </dgm:fillClrLst>
+    <dgm:linClrLst>
+      <a:schemeClr val="accent2">
+        <a:shade val="90000"/>
+      </a:schemeClr>
+      <a:schemeClr val="accent2">
+        <a:tint val="50000"/>
+      </a:schemeClr>
     </dgm:linClrLst>
     <dgm:effectClrLst/>
     <dgm:txLinClrLst/>
@@ -3293,15 +3348,21 @@
     <dgm:txEffectClrLst/>
   </dgm:styleLbl>
   <dgm:styleLbl name="bgSibTrans2D1">
-    <dgm:fillClrLst meth="repeat">
-      <a:schemeClr val="accent1">
-        <a:tint val="60000"/>
+    <dgm:fillClrLst>
+      <a:schemeClr val="accent2">
+        <a:shade val="90000"/>
       </a:schemeClr>
-    </dgm:fillClrLst>
-    <dgm:linClrLst meth="repeat">
-      <a:schemeClr val="accent1">
-        <a:tint val="60000"/>
+      <a:schemeClr val="accent2">
+        <a:tint val="50000"/>
       </a:schemeClr>
+    </dgm:fillClrLst>
+    <dgm:linClrLst>
+      <a:schemeClr val="accent2">
+        <a:shade val="90000"/>
+      </a:schemeClr>
+      <a:schemeClr val="accent2">
+        <a:tint val="50000"/>
+      </a:schemeClr>
     </dgm:linClrLst>
     <dgm:effectClrLst/>
     <dgm:txLinClrLst/>
@@ -3309,11 +3370,21 @@
     <dgm:txEffectClrLst/>
   </dgm:styleLbl>
   <dgm:styleLbl name="sibTrans1D1">
-    <dgm:fillClrLst meth="repeat">
-      <a:schemeClr val="accent1"/>
-    </dgm:fillClrLst>
-    <dgm:linClrLst meth="repeat">
-      <a:schemeClr val="accent1"/>
+    <dgm:fillClrLst>
+      <a:schemeClr val="accent2">
+        <a:shade val="90000"/>
+      </a:schemeClr>
+      <a:schemeClr val="accent2">
+        <a:tint val="50000"/>
+      </a:schemeClr>
+    </dgm:fillClrLst>
+    <dgm:linClrLst>
+      <a:schemeClr val="accent2">
+        <a:shade val="90000"/>
+      </a:schemeClr>
+      <a:schemeClr val="accent2">
+        <a:tint val="50000"/>
+      </a:schemeClr>
     </dgm:linClrLst>
     <dgm:effectClrLst/>
     <dgm:txLinClrLst/>
@@ -3324,12 +3395,10 @@
   </dgm:styleLbl>
   <dgm:styleLbl name="callout">
     <dgm:fillClrLst meth="repeat">
-      <a:schemeClr val="accent1"/>
+      <a:schemeClr val="accent2"/>
     </dgm:fillClrLst>
     <dgm:linClrLst meth="repeat">
-      <a:schemeClr val="accent1">
-        <a:tint val="50000"/>
-      </a:schemeClr>
+      <a:schemeClr val="accent2"/>
     </dgm:linClrLst>
     <dgm:effectClrLst/>
     <dgm:txLinClrLst/>
@@ -3340,7 +3409,9 @@
   </dgm:styleLbl>
   <dgm:styleLbl name="asst0">
     <dgm:fillClrLst meth="repeat">
-      <a:schemeClr val="accent1"/>
+      <a:schemeClr val="accent2">
+        <a:alpha val="90000"/>
+      </a:schemeClr>
     </dgm:fillClrLst>
     <dgm:linClrLst meth="repeat">
       <a:schemeClr val="lt1"/>
@@ -3352,7 +3423,9 @@
   </dgm:styleLbl>
   <dgm:styleLbl name="asst1">
     <dgm:fillClrLst meth="repeat">
-      <a:schemeClr val="accent1"/>
+      <a:schemeClr val="accent2">
+        <a:alpha val="90000"/>
+      </a:schemeClr>
     </dgm:fillClrLst>
     <dgm:linClrLst meth="repeat">
       <a:schemeClr val="lt1"/>
@@ -3363,8 +3436,10 @@
     <dgm:txEffectClrLst/>
   </dgm:styleLbl>
   <dgm:styleLbl name="asst2">
-    <dgm:fillClrLst meth="repeat">
-      <a:schemeClr val="accent1"/>
+    <dgm:fillClrLst>
+      <a:schemeClr val="accent2">
+        <a:alpha val="90000"/>
+      </a:schemeClr>
     </dgm:fillClrLst>
     <dgm:linClrLst meth="repeat">
       <a:schemeClr val="lt1"/>
@@ -3375,8 +3450,10 @@
     <dgm:txEffectClrLst/>
   </dgm:styleLbl>
   <dgm:styleLbl name="asst3">
-    <dgm:fillClrLst meth="repeat">
-      <a:schemeClr val="accent1"/>
+    <dgm:fillClrLst>
+      <a:schemeClr val="accent2">
+        <a:alpha val="70000"/>
+      </a:schemeClr>
     </dgm:fillClrLst>
     <dgm:linClrLst meth="repeat">
       <a:schemeClr val="lt1"/>
@@ -3387,8 +3464,10 @@
     <dgm:txEffectClrLst/>
   </dgm:styleLbl>
   <dgm:styleLbl name="asst4">
-    <dgm:fillClrLst meth="repeat">
-      <a:schemeClr val="accent1"/>
+    <dgm:fillClrLst>
+      <a:schemeClr val="accent2">
+        <a:alpha val="50000"/>
+      </a:schemeClr>
     </dgm:fillClrLst>
     <dgm:linClrLst meth="repeat">
       <a:schemeClr val="lt1"/>
@@ -3400,71 +3479,79 @@
   </dgm:styleLbl>
   <dgm:styleLbl name="parChTrans2D1">
     <dgm:fillClrLst meth="repeat">
-      <a:schemeClr val="accent1">
-        <a:tint val="60000"/>
+      <a:schemeClr val="accent2">
+        <a:shade val="80000"/>
       </a:schemeClr>
     </dgm:fillClrLst>
     <dgm:linClrLst meth="repeat">
-      <a:schemeClr val="accent1">
-        <a:tint val="60000"/>
+      <a:schemeClr val="accent2">
+        <a:shade val="80000"/>
       </a:schemeClr>
     </dgm:linClrLst>
     <dgm:effectClrLst/>
     <dgm:txLinClrLst/>
-    <dgm:txFillClrLst meth="repeat">
-      <a:schemeClr val="lt1"/>
-    </dgm:txFillClrLst>
+    <dgm:txFillClrLst/>
     <dgm:txEffectClrLst/>
   </dgm:styleLbl>
   <dgm:styleLbl name="parChTrans2D2">
     <dgm:fillClrLst meth="repeat">
-      <a:schemeClr val="accent1"/>
+      <a:schemeClr val="accent2">
+        <a:tint val="90000"/>
+      </a:schemeClr>
     </dgm:fillClrLst>
     <dgm:linClrLst meth="repeat">
-      <a:schemeClr val="accent1"/>
-    </dgm:linClrLst>
-    <dgm:effectClrLst/>
-    <dgm:txLinClrLst/>
-    <dgm:txFillClrLst meth="repeat">
-      <a:schemeClr val="lt1"/>
-    </dgm:txFillClrLst>
+      <a:schemeClr val="accent2">
+        <a:tint val="90000"/>
+      </a:schemeClr>
+    </dgm:linClrLst>
+    <dgm:effectClrLst/>
+    <dgm:txLinClrLst/>
+    <dgm:txFillClrLst/>
     <dgm:txEffectClrLst/>
   </dgm:styleLbl>
   <dgm:styleLbl name="parChTrans2D3">
     <dgm:fillClrLst meth="repeat">
-      <a:schemeClr val="accent1"/>
+      <a:schemeClr val="accent2">
+        <a:tint val="70000"/>
+      </a:schemeClr>
     </dgm:fillClrLst>
     <dgm:linClrLst meth="repeat">
-      <a:schemeClr val="accent1"/>
-    </dgm:linClrLst>
-    <dgm:effectClrLst/>
-    <dgm:txLinClrLst/>
-    <dgm:txFillClrLst meth="repeat">
-      <a:schemeClr val="lt1"/>
-    </dgm:txFillClrLst>
+      <a:schemeClr val="accent2">
+        <a:tint val="70000"/>
+      </a:schemeClr>
+    </dgm:linClrLst>
+    <dgm:effectClrLst/>
+    <dgm:txLinClrLst/>
+    <dgm:txFillClrLst/>
     <dgm:txEffectClrLst/>
   </dgm:styleLbl>
   <dgm:styleLbl name="parChTrans2D4">
     <dgm:fillClrLst meth="repeat">
-      <a:schemeClr val="accent1"/>
+      <a:schemeClr val="accent2">
+        <a:tint val="50000"/>
+      </a:schemeClr>
     </dgm:fillClrLst>
     <dgm:linClrLst meth="repeat">
-      <a:schemeClr val="accent1"/>
+      <a:schemeClr val="accent2">
+        <a:tint val="50000"/>
+      </a:schemeClr>
     </dgm:linClrLst>
     <dgm:effectClrLst/>
     <dgm:txLinClrLst/>
     <dgm:txFillClrLst meth="repeat">
-      <a:schemeClr val="lt1"/>
+      <a:schemeClr val="dk1"/>
     </dgm:txFillClrLst>
     <dgm:txEffectClrLst/>
   </dgm:styleLbl>
   <dgm:styleLbl name="parChTrans1D1">
     <dgm:fillClrLst meth="repeat">
-      <a:schemeClr val="accent1"/>
+      <a:schemeClr val="accent2">
+        <a:shade val="80000"/>
+      </a:schemeClr>
     </dgm:fillClrLst>
     <dgm:linClrLst meth="repeat">
-      <a:schemeClr val="accent1">
-        <a:shade val="60000"/>
+      <a:schemeClr val="accent2">
+        <a:shade val="80000"/>
       </a:schemeClr>
     </dgm:linClrLst>
     <dgm:effectClrLst/>
@@ -3476,11 +3563,13 @@
   </dgm:styleLbl>
   <dgm:styleLbl name="parChTrans1D2">
     <dgm:fillClrLst meth="repeat">
-      <a:schemeClr val="accent1"/>
+      <a:schemeClr val="accent2">
+        <a:tint val="90000"/>
+      </a:schemeClr>
     </dgm:fillClrLst>
     <dgm:linClrLst meth="repeat">
-      <a:schemeClr val="accent1">
-        <a:shade val="60000"/>
+      <a:schemeClr val="accent2">
+        <a:tint val="90000"/>
       </a:schemeClr>
     </dgm:linClrLst>
     <dgm:effectClrLst/>
@@ -3492,11 +3581,13 @@
   </dgm:styleLbl>
   <dgm:styleLbl name="parChTrans1D3">
     <dgm:fillClrLst meth="repeat">
-      <a:schemeClr val="accent1"/>
+      <a:schemeClr val="accent2">
+        <a:tint val="70000"/>
+      </a:schemeClr>
     </dgm:fillClrLst>
     <dgm:linClrLst meth="repeat">
-      <a:schemeClr val="accent1">
-        <a:shade val="80000"/>
+      <a:schemeClr val="accent2">
+        <a:tint val="70000"/>
       </a:schemeClr>
     </dgm:linClrLst>
     <dgm:effectClrLst/>
@@ -3508,11 +3599,13 @@
   </dgm:styleLbl>
   <dgm:styleLbl name="parChTrans1D4">
     <dgm:fillClrLst meth="repeat">
-      <a:schemeClr val="accent1"/>
+      <a:schemeClr val="accent2">
+        <a:tint val="50000"/>
+      </a:schemeClr>
     </dgm:fillClrLst>
     <dgm:linClrLst meth="repeat">
-      <a:schemeClr val="accent1">
-        <a:shade val="80000"/>
+      <a:schemeClr val="accent2">
+        <a:tint val="50000"/>
       </a:schemeClr>
     </dgm:linClrLst>
     <dgm:effectClrLst/>
@@ -3528,8 +3621,13 @@
         <a:alpha val="90000"/>
       </a:schemeClr>
     </dgm:fillClrLst>
-    <dgm:linClrLst meth="repeat">
-      <a:schemeClr val="accent1"/>
+    <dgm:linClrLst>
+      <a:schemeClr val="accent2">
+        <a:alpha val="90000"/>
+      </a:schemeClr>
+      <a:schemeClr val="accent2">
+        <a:alpha val="50000"/>
+      </a:schemeClr>
     </dgm:linClrLst>
     <dgm:effectClrLst/>
     <dgm:txLinClrLst/>
@@ -3544,8 +3642,13 @@
         <a:alpha val="90000"/>
       </a:schemeClr>
     </dgm:fillClrLst>
-    <dgm:linClrLst meth="repeat">
-      <a:schemeClr val="accent1"/>
+    <dgm:linClrLst>
+      <a:schemeClr val="accent2">
+        <a:alpha val="90000"/>
+      </a:schemeClr>
+      <a:schemeClr val="accent2">
+        <a:alpha val="50000"/>
+      </a:schemeClr>
     </dgm:linClrLst>
     <dgm:effectClrLst/>
     <dgm:txLinClrLst/>
@@ -3560,8 +3663,13 @@
         <a:alpha val="90000"/>
       </a:schemeClr>
     </dgm:fillClrLst>
-    <dgm:linClrLst meth="repeat">
-      <a:schemeClr val="accent1"/>
+    <dgm:linClrLst>
+      <a:schemeClr val="accent2">
+        <a:alpha val="90000"/>
+      </a:schemeClr>
+      <a:schemeClr val="accent2">
+        <a:alpha val="50000"/>
+      </a:schemeClr>
     </dgm:linClrLst>
     <dgm:effectClrLst/>
     <dgm:txLinClrLst/>
@@ -3576,8 +3684,13 @@
         <a:alpha val="40000"/>
       </a:schemeClr>
     </dgm:fillClrLst>
-    <dgm:linClrLst meth="repeat">
-      <a:schemeClr val="accent1"/>
+    <dgm:linClrLst>
+      <a:schemeClr val="accent2">
+        <a:alpha val="90000"/>
+      </a:schemeClr>
+      <a:schemeClr val="accent2">
+        <a:alpha val="50000"/>
+      </a:schemeClr>
     </dgm:linClrLst>
     <dgm:effectClrLst/>
     <dgm:txLinClrLst/>
@@ -3592,8 +3705,13 @@
         <a:alpha val="90000"/>
       </a:schemeClr>
     </dgm:fillClrLst>
-    <dgm:linClrLst meth="repeat">
-      <a:schemeClr val="accent1"/>
+    <dgm:linClrLst>
+      <a:schemeClr val="accent2">
+        <a:alpha val="90000"/>
+      </a:schemeClr>
+      <a:schemeClr val="accent2">
+        <a:alpha val="50000"/>
+      </a:schemeClr>
     </dgm:linClrLst>
     <dgm:effectClrLst/>
     <dgm:txLinClrLst/>
@@ -3606,8 +3724,13 @@
     <dgm:fillClrLst meth="repeat">
       <a:schemeClr val="lt1"/>
     </dgm:fillClrLst>
-    <dgm:linClrLst meth="repeat">
-      <a:schemeClr val="accent1"/>
+    <dgm:linClrLst>
+      <a:schemeClr val="accent2">
+        <a:alpha val="90000"/>
+      </a:schemeClr>
+      <a:schemeClr val="accent2">
+        <a:alpha val="50000"/>
+      </a:schemeClr>
     </dgm:linClrLst>
     <dgm:effectClrLst/>
     <dgm:txLinClrLst/>
@@ -3621,7 +3744,7 @@
       <a:schemeClr val="lt1"/>
     </dgm:fillClrLst>
     <dgm:linClrLst meth="repeat">
-      <a:schemeClr val="accent1"/>
+      <a:schemeClr val="accent2"/>
     </dgm:linClrLst>
     <dgm:effectClrLst/>
     <dgm:txLinClrLst/>
@@ -3635,7 +3758,7 @@
       <a:schemeClr val="lt1"/>
     </dgm:fillClrLst>
     <dgm:linClrLst meth="repeat">
-      <a:schemeClr val="accent1"/>
+      <a:schemeClr val="accent2"/>
     </dgm:linClrLst>
     <dgm:effectClrLst/>
     <dgm:txLinClrLst/>
@@ -3645,14 +3768,18 @@
     <dgm:txEffectClrLst/>
   </dgm:styleLbl>
   <dgm:styleLbl name="fgAccFollowNode1">
-    <dgm:fillClrLst meth="repeat">
-      <a:schemeClr val="accent1">
+    <dgm:fillClrLst>
+      <a:schemeClr val="accent2">
         <a:alpha val="90000"/>
         <a:tint val="40000"/>
       </a:schemeClr>
+      <a:schemeClr val="accent2">
+        <a:alpha val="50000"/>
+        <a:tint val="40000"/>
+      </a:schemeClr>
     </dgm:fillClrLst>
     <dgm:linClrLst meth="repeat">
-      <a:schemeClr val="accent1">
+      <a:schemeClr val="accent2">
         <a:alpha val="90000"/>
         <a:tint val="40000"/>
       </a:schemeClr>
@@ -3666,13 +3793,13 @@
   </dgm:styleLbl>
   <dgm:styleLbl name="alignAccFollowNode1">
     <dgm:fillClrLst meth="repeat">
-      <a:schemeClr val="accent1">
+      <a:schemeClr val="accent2">
         <a:alpha val="90000"/>
         <a:tint val="40000"/>
       </a:schemeClr>
     </dgm:fillClrLst>
     <dgm:linClrLst meth="repeat">
-      <a:schemeClr val="accent1">
+      <a:schemeClr val="accent2">
         <a:alpha val="90000"/>
         <a:tint val="40000"/>
       </a:schemeClr>
@@ -3686,16 +3813,13 @@
   </dgm:styleLbl>
   <dgm:styleLbl name="bgAccFollowNode1">
     <dgm:fillClrLst meth="repeat">
-      <a:schemeClr val="accent1">
+      <a:schemeClr val="accent2">
         <a:alpha val="90000"/>
         <a:tint val="40000"/>
       </a:schemeClr>
     </dgm:fillClrLst>
     <dgm:linClrLst meth="repeat">
-      <a:schemeClr val="accent1">
-        <a:alpha val="90000"/>
-        <a:tint val="40000"/>
-      </a:schemeClr>
+      <a:schemeClr val="lt1"/>
     </dgm:linClrLst>
     <dgm:effectClrLst/>
     <dgm:txLinClrLst/>
@@ -3711,7 +3835,9 @@
       </a:schemeClr>
     </dgm:fillClrLst>
     <dgm:linClrLst meth="repeat">
-      <a:schemeClr val="accent1"/>
+      <a:schemeClr val="accent2">
+        <a:shade val="80000"/>
+      </a:schemeClr>
     </dgm:linClrLst>
     <dgm:effectClrLst/>
     <dgm:txLinClrLst/>
@@ -3727,7 +3853,9 @@
       </a:schemeClr>
     </dgm:fillClrLst>
     <dgm:linClrLst meth="repeat">
-      <a:schemeClr val="accent1"/>
+      <a:schemeClr val="accent2">
+        <a:tint val="90000"/>
+      </a:schemeClr>
     </dgm:linClrLst>
     <dgm:effectClrLst/>
     <dgm:txLinClrLst/>
@@ -3743,7 +3871,9 @@
       </a:schemeClr>
     </dgm:fillClrLst>
     <dgm:linClrLst meth="repeat">
-      <a:schemeClr val="accent1"/>
+      <a:schemeClr val="accent2">
+        <a:tint val="70000"/>
+      </a:schemeClr>
     </dgm:linClrLst>
     <dgm:effectClrLst/>
     <dgm:txLinClrLst/>
@@ -3759,7 +3889,9 @@
       </a:schemeClr>
     </dgm:fillClrLst>
     <dgm:linClrLst meth="repeat">
-      <a:schemeClr val="accent1"/>
+      <a:schemeClr val="accent2">
+        <a:tint val="50000"/>
+      </a:schemeClr>
     </dgm:linClrLst>
     <dgm:effectClrLst/>
     <dgm:txLinClrLst/>
@@ -3770,12 +3902,12 @@
   </dgm:styleLbl>
   <dgm:styleLbl name="bgShp">
     <dgm:fillClrLst meth="repeat">
-      <a:schemeClr val="accent1">
+      <a:schemeClr val="accent2">
         <a:tint val="40000"/>
       </a:schemeClr>
     </dgm:fillClrLst>
     <dgm:linClrLst meth="repeat">
-      <a:schemeClr val="accent1"/>
+      <a:schemeClr val="dk1"/>
     </dgm:linClrLst>
     <dgm:effectClrLst/>
     <dgm:txLinClrLst/>
@@ -3786,12 +3918,12 @@
   </dgm:styleLbl>
   <dgm:styleLbl name="dkBgShp">
     <dgm:fillClrLst meth="repeat">
-      <a:schemeClr val="accent1">
-        <a:shade val="80000"/>
+      <a:schemeClr val="accent2">
+        <a:shade val="90000"/>
       </a:schemeClr>
     </dgm:fillClrLst>
     <dgm:linClrLst meth="repeat">
-      <a:schemeClr val="accent1"/>
+      <a:schemeClr val="dk1"/>
     </dgm:linClrLst>
     <dgm:effectClrLst/>
     <dgm:txLinClrLst/>
@@ -3802,13 +3934,13 @@
   </dgm:styleLbl>
   <dgm:styleLbl name="trBgShp">
     <dgm:fillClrLst meth="repeat">
-      <a:schemeClr val="accent1">
+      <a:schemeClr val="accent2">
         <a:tint val="50000"/>
         <a:alpha val="40000"/>
       </a:schemeClr>
     </dgm:fillClrLst>
     <dgm:linClrLst meth="repeat">
-      <a:schemeClr val="accent1"/>
+      <a:schemeClr val="accent2"/>
     </dgm:linClrLst>
     <dgm:effectClrLst/>
     <dgm:txLinClrLst/>
@@ -3819,8 +3951,8 @@
   </dgm:styleLbl>
   <dgm:styleLbl name="fgShp">
     <dgm:fillClrLst meth="repeat">
-      <a:schemeClr val="accent1">
-        <a:tint val="60000"/>
+      <a:schemeClr val="accent2">
+        <a:tint val="40000"/>
       </a:schemeClr>
     </dgm:fillClrLst>
     <dgm:linClrLst meth="repeat">
@@ -5340,7 +5472,7 @@
   <dgm:whole/>
   <dgm:extLst>
     <a:ext uri="http://schemas.microsoft.com/office/drawing/2008/diagram">
-      <dsp:dataModelExt xmlns="" xmlns:dsp="http://schemas.microsoft.com/office/drawing/2008/diagram" relId="rId6" minVer="http://schemas.openxmlformats.org/drawingml/2006/diagram"/>
+      <dsp:dataModelExt xmlns:dsp="http://schemas.microsoft.com/office/drawing/2008/diagram" xmlns="" relId="rId6" minVer="http://schemas.openxmlformats.org/drawingml/2006/diagram"/>
     </a:ext>
   </dgm:extLst>
 </dgm:dataModel>
@@ -5876,7 +6008,7 @@
   <dgm:whole/>
   <dgm:extLst>
     <a:ext uri="http://schemas.microsoft.com/office/drawing/2008/diagram">
-      <dsp:dataModelExt xmlns="" xmlns:dsp="http://schemas.microsoft.com/office/drawing/2008/diagram" relId="rId6" minVer="http://schemas.openxmlformats.org/drawingml/2006/diagram"/>
+      <dsp:dataModelExt xmlns:dsp="http://schemas.microsoft.com/office/drawing/2008/diagram" xmlns="" relId="rId6" minVer="http://schemas.openxmlformats.org/drawingml/2006/diagram"/>
     </a:ext>
   </dgm:extLst>
 </dgm:dataModel>
@@ -7237,7 +7369,7 @@
   <dgm:whole/>
   <dgm:extLst>
     <a:ext uri="http://schemas.microsoft.com/office/drawing/2008/diagram">
-      <dsp:dataModelExt xmlns="" xmlns:dsp="http://schemas.microsoft.com/office/drawing/2008/diagram" relId="rId6" minVer="http://schemas.openxmlformats.org/drawingml/2006/diagram"/>
+      <dsp:dataModelExt xmlns:dsp="http://schemas.microsoft.com/office/drawing/2008/diagram" xmlns="" relId="rId6" minVer="http://schemas.openxmlformats.org/drawingml/2006/diagram"/>
     </a:ext>
   </dgm:extLst>
 </dgm:dataModel>
@@ -7289,7 +7421,11 @@
     </dgm:pt>
     <dgm:pt modelId="{E68D9850-B3A4-4979-A4D0-E3D401A29AB5}" type="sibTrans" cxnId="{F52A89F1-D611-4436-8916-14DEFBEAC79D}">
       <dgm:prSet/>
-      <dgm:spPr/>
+      <dgm:spPr>
+        <a:solidFill>
+          <a:srgbClr val="00B0F0"/>
+        </a:solidFill>
+      </dgm:spPr>
       <dgm:t>
         <a:bodyPr/>
         <a:lstStyle/>
@@ -7326,7 +7462,11 @@
     </dgm:pt>
     <dgm:pt modelId="{CFF97A55-CF3E-4E1D-AF04-5A3631D6CB6D}" type="sibTrans" cxnId="{C9D8935F-6C23-483A-8258-A9CABF3C76B0}">
       <dgm:prSet/>
-      <dgm:spPr/>
+      <dgm:spPr>
+        <a:solidFill>
+          <a:srgbClr val="00B0F0"/>
+        </a:solidFill>
+      </dgm:spPr>
       <dgm:t>
         <a:bodyPr/>
         <a:lstStyle/>
@@ -7380,10 +7520,10 @@
         <a:lstStyle/>
         <a:p>
           <a:r>
-            <a:rPr lang="pt-BR" sz="2400" b="1" dirty="0" smtClean="0"/>
+            <a:rPr lang="pt-BR" sz="2000" b="1" dirty="0" smtClean="0"/>
             <a:t>Processa de solicitações de usuário</a:t>
           </a:r>
-          <a:endParaRPr lang="pt-BR" sz="2400" b="1" dirty="0"/>
+          <a:endParaRPr lang="pt-BR" sz="2000" b="1" dirty="0"/>
         </a:p>
       </dgm:t>
     </dgm:pt>
@@ -7417,10 +7557,10 @@
         <a:lstStyle/>
         <a:p>
           <a:r>
-            <a:rPr lang="pt-BR" sz="2400" b="1" dirty="0" smtClean="0"/>
+            <a:rPr lang="pt-BR" sz="2000" b="1" dirty="0" smtClean="0"/>
             <a:t>Dispositivo de conexão com sistema</a:t>
           </a:r>
-          <a:endParaRPr lang="pt-BR" sz="2400" b="1" dirty="0">
+          <a:endParaRPr lang="pt-BR" sz="2000" b="1" dirty="0">
             <a:solidFill>
               <a:srgbClr val="66FFFF"/>
             </a:solidFill>
@@ -7458,10 +7598,10 @@
         <a:lstStyle/>
         <a:p>
           <a:r>
-            <a:rPr lang="pt-BR" sz="2400" b="1" dirty="0" smtClean="0"/>
+            <a:rPr lang="pt-BR" sz="2000" b="1" dirty="0" smtClean="0"/>
             <a:t>Ambiente de servidor de dados</a:t>
           </a:r>
-          <a:endParaRPr lang="pt-BR" sz="2400" b="1" dirty="0">
+          <a:endParaRPr lang="pt-BR" sz="2000" b="1" dirty="0">
             <a:solidFill>
               <a:srgbClr val="66FFFF"/>
             </a:solidFill>
@@ -7537,7 +7677,7 @@
       </dgm:t>
     </dgm:pt>
     <dgm:pt modelId="{0485A0FB-C96E-42E5-BCAA-9C72A8F02D43}" type="pres">
-      <dgm:prSet presAssocID="{7DFE07BF-9A88-4152-9E58-09C9E20DB3CE}" presName="parSh" presStyleLbl="node1" presStyleIdx="0" presStyleCnt="3" custScaleX="118442" custScaleY="119776" custLinFactNeighborX="580" custLinFactNeighborY="-24051"/>
+      <dgm:prSet presAssocID="{7DFE07BF-9A88-4152-9E58-09C9E20DB3CE}" presName="parSh" presStyleLbl="node1" presStyleIdx="0" presStyleCnt="3" custScaleX="118442" custScaleY="236077" custLinFactNeighborX="580" custLinFactNeighborY="-24051"/>
       <dgm:spPr/>
       <dgm:t>
         <a:bodyPr/>
@@ -7548,7 +7688,7 @@
       </dgm:t>
     </dgm:pt>
     <dgm:pt modelId="{01AD925A-7CA7-4489-9AE4-70C9408355AF}" type="pres">
-      <dgm:prSet presAssocID="{7DFE07BF-9A88-4152-9E58-09C9E20DB3CE}" presName="desTx" presStyleLbl="fgAcc1" presStyleIdx="0" presStyleCnt="3" custScaleX="123543">
+      <dgm:prSet presAssocID="{7DFE07BF-9A88-4152-9E58-09C9E20DB3CE}" presName="desTx" presStyleLbl="fgAcc1" presStyleIdx="0" presStyleCnt="3" custScaleX="123543" custScaleY="150979">
         <dgm:presLayoutVars>
           <dgm:bulletEnabled val="1"/>
         </dgm:presLayoutVars>
@@ -7563,9 +7703,9 @@
       </dgm:t>
     </dgm:pt>
     <dgm:pt modelId="{9986BED9-1E6C-4CA8-9EA5-87820C541D88}" type="pres">
-      <dgm:prSet presAssocID="{E68D9850-B3A4-4979-A4D0-E3D401A29AB5}" presName="sibTrans" presStyleLbl="sibTrans2D1" presStyleIdx="0" presStyleCnt="2" custScaleX="148110"/>
+      <dgm:prSet presAssocID="{E68D9850-B3A4-4979-A4D0-E3D401A29AB5}" presName="sibTrans" presStyleLbl="sibTrans2D1" presStyleIdx="0" presStyleCnt="2" custScaleX="96916" custLinFactNeighborX="-12010" custLinFactNeighborY="-36455"/>
       <dgm:spPr>
-        <a:prstGeom prst="leftRightArrow">
+        <a:prstGeom prst="leftArrow">
           <a:avLst/>
         </a:prstGeom>
       </dgm:spPr>
@@ -7617,7 +7757,7 @@
       </dgm:t>
     </dgm:pt>
     <dgm:pt modelId="{6F0A5B10-B2E3-4C10-8EF4-E66809BE6F24}" type="pres">
-      <dgm:prSet presAssocID="{3865D5FF-DA00-4906-B6F5-07C839464584}" presName="parSh" presStyleLbl="node1" presStyleIdx="1" presStyleCnt="3" custScaleX="129382" custScaleY="119776" custLinFactNeighborX="-469" custLinFactNeighborY="-24051"/>
+      <dgm:prSet presAssocID="{3865D5FF-DA00-4906-B6F5-07C839464584}" presName="parSh" presStyleLbl="node1" presStyleIdx="1" presStyleCnt="3" custScaleX="129382" custScaleY="236478" custLinFactNeighborX="-469" custLinFactNeighborY="-24051"/>
       <dgm:spPr/>
       <dgm:t>
         <a:bodyPr/>
@@ -7628,7 +7768,7 @@
       </dgm:t>
     </dgm:pt>
     <dgm:pt modelId="{F26C71D2-1B5B-43C3-9D83-12F332E90749}" type="pres">
-      <dgm:prSet presAssocID="{3865D5FF-DA00-4906-B6F5-07C839464584}" presName="desTx" presStyleLbl="fgAcc1" presStyleIdx="1" presStyleCnt="3" custScaleX="123543">
+      <dgm:prSet presAssocID="{3865D5FF-DA00-4906-B6F5-07C839464584}" presName="desTx" presStyleLbl="fgAcc1" presStyleIdx="1" presStyleCnt="3" custScaleX="123543" custScaleY="155340">
         <dgm:presLayoutVars>
           <dgm:bulletEnabled val="1"/>
         </dgm:presLayoutVars>
@@ -7643,9 +7783,9 @@
       </dgm:t>
     </dgm:pt>
     <dgm:pt modelId="{6426DFE0-48C9-4067-B292-3D8AAA497A0A}" type="pres">
-      <dgm:prSet presAssocID="{CFF97A55-CF3E-4E1D-AF04-5A3631D6CB6D}" presName="sibTrans" presStyleLbl="sibTrans2D1" presStyleIdx="1" presStyleCnt="2" custScaleX="148110"/>
+      <dgm:prSet presAssocID="{CFF97A55-CF3E-4E1D-AF04-5A3631D6CB6D}" presName="sibTrans" presStyleLbl="sibTrans2D1" presStyleIdx="1" presStyleCnt="2" custScaleX="96916" custLinFactNeighborX="-311" custLinFactNeighborY="-48388"/>
       <dgm:spPr>
-        <a:prstGeom prst="leftRightArrow">
+        <a:prstGeom prst="leftArrow">
           <a:avLst/>
         </a:prstGeom>
       </dgm:spPr>
@@ -7697,7 +7837,7 @@
       </dgm:t>
     </dgm:pt>
     <dgm:pt modelId="{0C769A1E-767C-46A7-9C71-600FC05CC6D4}" type="pres">
-      <dgm:prSet presAssocID="{F3A2DAB8-2AB9-419A-82D3-D743A16978C8}" presName="parSh" presStyleLbl="node1" presStyleIdx="2" presStyleCnt="3" custScaleX="127427" custScaleY="119776" custLinFactNeighborX="-469" custLinFactNeighborY="-24051"/>
+      <dgm:prSet presAssocID="{F3A2DAB8-2AB9-419A-82D3-D743A16978C8}" presName="parSh" presStyleLbl="node1" presStyleIdx="2" presStyleCnt="3" custScaleX="127427" custScaleY="223911" custLinFactNeighborX="3846" custLinFactNeighborY="-28233"/>
       <dgm:spPr/>
       <dgm:t>
         <a:bodyPr/>
@@ -7708,7 +7848,7 @@
       </dgm:t>
     </dgm:pt>
     <dgm:pt modelId="{F28562CB-6812-4937-94DD-6D3F41B217CE}" type="pres">
-      <dgm:prSet presAssocID="{F3A2DAB8-2AB9-419A-82D3-D743A16978C8}" presName="desTx" presStyleLbl="fgAcc1" presStyleIdx="2" presStyleCnt="3" custScaleX="123543">
+      <dgm:prSet presAssocID="{F3A2DAB8-2AB9-419A-82D3-D743A16978C8}" presName="desTx" presStyleLbl="fgAcc1" presStyleIdx="2" presStyleCnt="3" custScaleX="123543" custScaleY="152060" custLinFactNeighborX="2604" custLinFactNeighborY="-1460">
         <dgm:presLayoutVars>
           <dgm:bulletEnabled val="1"/>
         </dgm:presLayoutVars>
@@ -7724,26 +7864,26 @@
     </dgm:pt>
   </dgm:ptLst>
   <dgm:cxnLst>
+    <dgm:cxn modelId="{782E63EF-2A81-4D45-87AA-DB7355AC4F6C}" type="presOf" srcId="{7DFE07BF-9A88-4152-9E58-09C9E20DB3CE}" destId="{0485A0FB-C96E-42E5-BCAA-9C72A8F02D43}" srcOrd="1" destOrd="0" presId="urn:microsoft.com/office/officeart/2005/8/layout/process3"/>
+    <dgm:cxn modelId="{4DDC4302-FA95-4815-9D86-E44346A96A9B}" type="presOf" srcId="{F3A2DAB8-2AB9-419A-82D3-D743A16978C8}" destId="{0C769A1E-767C-46A7-9C71-600FC05CC6D4}" srcOrd="1" destOrd="0" presId="urn:microsoft.com/office/officeart/2005/8/layout/process3"/>
+    <dgm:cxn modelId="{6A637A3B-899C-4509-8ECC-0083D16EC93D}" type="presOf" srcId="{80BADE98-2C43-40D5-937A-874A1B627145}" destId="{F28562CB-6812-4937-94DD-6D3F41B217CE}" srcOrd="0" destOrd="0" presId="urn:microsoft.com/office/officeart/2005/8/layout/process3"/>
+    <dgm:cxn modelId="{D058A61E-2631-4792-87A9-3570D8D2DB0F}" srcId="{3865D5FF-DA00-4906-B6F5-07C839464584}" destId="{2F3DF7DE-E5C9-4440-80D1-538313244BE6}" srcOrd="0" destOrd="0" parTransId="{3C0BC7DD-F66C-4719-92AE-5E9E7825604D}" sibTransId="{4569B2FB-90CA-4536-9206-69C81C9FC0BD}"/>
+    <dgm:cxn modelId="{53E53B73-2F4A-414E-A392-96DA5283A4BE}" type="presOf" srcId="{2F3DF7DE-E5C9-4440-80D1-538313244BE6}" destId="{F26C71D2-1B5B-43C3-9D83-12F332E90749}" srcOrd="0" destOrd="0" presId="urn:microsoft.com/office/officeart/2005/8/layout/process3"/>
+    <dgm:cxn modelId="{E685725A-434D-4735-82BC-F1784D89BEC7}" type="presOf" srcId="{F3A2DAB8-2AB9-419A-82D3-D743A16978C8}" destId="{5F67B61D-1890-4707-AC93-F90C8402B758}" srcOrd="0" destOrd="0" presId="urn:microsoft.com/office/officeart/2005/8/layout/process3"/>
+    <dgm:cxn modelId="{C98F67F6-2098-448B-8A63-E2EF5CDFB1A0}" type="presOf" srcId="{E68D9850-B3A4-4979-A4D0-E3D401A29AB5}" destId="{9986BED9-1E6C-4CA8-9EA5-87820C541D88}" srcOrd="0" destOrd="0" presId="urn:microsoft.com/office/officeart/2005/8/layout/process3"/>
+    <dgm:cxn modelId="{F52A89F1-D611-4436-8916-14DEFBEAC79D}" srcId="{4412B91F-CF8D-4A42-83DF-7CDCCDA80F7D}" destId="{7DFE07BF-9A88-4152-9E58-09C9E20DB3CE}" srcOrd="0" destOrd="0" parTransId="{F2C6A117-64F1-4ED9-9C2B-9510107D76CB}" sibTransId="{E68D9850-B3A4-4979-A4D0-E3D401A29AB5}"/>
+    <dgm:cxn modelId="{2C7BD933-2580-4498-859B-2952411ACC5F}" type="presOf" srcId="{7DFE07BF-9A88-4152-9E58-09C9E20DB3CE}" destId="{0135851C-059A-4F41-A717-89AAE1AEB50F}" srcOrd="0" destOrd="0" presId="urn:microsoft.com/office/officeart/2005/8/layout/process3"/>
+    <dgm:cxn modelId="{81BAC1B0-D183-4179-9A55-029F538E675D}" srcId="{F3A2DAB8-2AB9-419A-82D3-D743A16978C8}" destId="{80BADE98-2C43-40D5-937A-874A1B627145}" srcOrd="0" destOrd="0" parTransId="{61694F4E-3BB3-4806-8315-F9C9DE55D766}" sibTransId="{1B940CC1-D5C1-4465-A2E5-B629FA2D9A4E}"/>
+    <dgm:cxn modelId="{4A7FA099-9464-4ACD-A790-6102C1584AD1}" srcId="{4412B91F-CF8D-4A42-83DF-7CDCCDA80F7D}" destId="{F3A2DAB8-2AB9-419A-82D3-D743A16978C8}" srcOrd="2" destOrd="0" parTransId="{62C15E06-9F1B-4472-A7B4-FEFADBC7E807}" sibTransId="{401344D0-ED0B-4340-9FCD-FF07FE375E6C}"/>
     <dgm:cxn modelId="{2ABFC505-761D-4C13-A6CB-CE0854F9D0DE}" type="presOf" srcId="{3865D5FF-DA00-4906-B6F5-07C839464584}" destId="{6F0A5B10-B2E3-4C10-8EF4-E66809BE6F24}" srcOrd="1" destOrd="0" presId="urn:microsoft.com/office/officeart/2005/8/layout/process3"/>
-    <dgm:cxn modelId="{81BAC1B0-D183-4179-9A55-029F538E675D}" srcId="{F3A2DAB8-2AB9-419A-82D3-D743A16978C8}" destId="{80BADE98-2C43-40D5-937A-874A1B627145}" srcOrd="0" destOrd="0" parTransId="{61694F4E-3BB3-4806-8315-F9C9DE55D766}" sibTransId="{1B940CC1-D5C1-4465-A2E5-B629FA2D9A4E}"/>
-    <dgm:cxn modelId="{782E63EF-2A81-4D45-87AA-DB7355AC4F6C}" type="presOf" srcId="{7DFE07BF-9A88-4152-9E58-09C9E20DB3CE}" destId="{0485A0FB-C96E-42E5-BCAA-9C72A8F02D43}" srcOrd="1" destOrd="0" presId="urn:microsoft.com/office/officeart/2005/8/layout/process3"/>
+    <dgm:cxn modelId="{C9D8935F-6C23-483A-8258-A9CABF3C76B0}" srcId="{4412B91F-CF8D-4A42-83DF-7CDCCDA80F7D}" destId="{3865D5FF-DA00-4906-B6F5-07C839464584}" srcOrd="1" destOrd="0" parTransId="{49FB8D0F-E70F-4A66-9F99-3E0F33864CA6}" sibTransId="{CFF97A55-CF3E-4E1D-AF04-5A3631D6CB6D}"/>
+    <dgm:cxn modelId="{97E23C99-380C-4A30-95A7-A9D36BE51A4C}" type="presOf" srcId="{CFF97A55-CF3E-4E1D-AF04-5A3631D6CB6D}" destId="{ADB6516E-958F-4D77-964F-7E73D0745BE8}" srcOrd="1" destOrd="0" presId="urn:microsoft.com/office/officeart/2005/8/layout/process3"/>
+    <dgm:cxn modelId="{98AD3F7A-F57A-4E45-BC55-D4C0412273B8}" type="presOf" srcId="{CFF97A55-CF3E-4E1D-AF04-5A3631D6CB6D}" destId="{6426DFE0-48C9-4067-B292-3D8AAA497A0A}" srcOrd="0" destOrd="0" presId="urn:microsoft.com/office/officeart/2005/8/layout/process3"/>
+    <dgm:cxn modelId="{63B84C71-06A5-460D-8652-797129A28122}" type="presOf" srcId="{E68D9850-B3A4-4979-A4D0-E3D401A29AB5}" destId="{E4A5A372-2D69-40DC-9020-A18D4ABB5405}" srcOrd="1" destOrd="0" presId="urn:microsoft.com/office/officeart/2005/8/layout/process3"/>
+    <dgm:cxn modelId="{5CB851DE-B309-4D32-BF02-58D05478E534}" srcId="{7DFE07BF-9A88-4152-9E58-09C9E20DB3CE}" destId="{7F7E1F91-F6F4-48A9-B4FA-337B2EBD2C9A}" srcOrd="0" destOrd="0" parTransId="{0796D45F-4D57-413D-A4BB-33573B2F1CF3}" sibTransId="{0FC519C8-F4CD-4D2A-B852-2C233866BAF3}"/>
     <dgm:cxn modelId="{F0F87E19-8628-4C4C-8EFA-948B72ABC85D}" type="presOf" srcId="{4412B91F-CF8D-4A42-83DF-7CDCCDA80F7D}" destId="{CC0EE527-85CD-48F3-B644-D95743DA8B8E}" srcOrd="0" destOrd="0" presId="urn:microsoft.com/office/officeart/2005/8/layout/process3"/>
-    <dgm:cxn modelId="{63B84C71-06A5-460D-8652-797129A28122}" type="presOf" srcId="{E68D9850-B3A4-4979-A4D0-E3D401A29AB5}" destId="{E4A5A372-2D69-40DC-9020-A18D4ABB5405}" srcOrd="1" destOrd="0" presId="urn:microsoft.com/office/officeart/2005/8/layout/process3"/>
-    <dgm:cxn modelId="{F52A89F1-D611-4436-8916-14DEFBEAC79D}" srcId="{4412B91F-CF8D-4A42-83DF-7CDCCDA80F7D}" destId="{7DFE07BF-9A88-4152-9E58-09C9E20DB3CE}" srcOrd="0" destOrd="0" parTransId="{F2C6A117-64F1-4ED9-9C2B-9510107D76CB}" sibTransId="{E68D9850-B3A4-4979-A4D0-E3D401A29AB5}"/>
-    <dgm:cxn modelId="{4DDC4302-FA95-4815-9D86-E44346A96A9B}" type="presOf" srcId="{F3A2DAB8-2AB9-419A-82D3-D743A16978C8}" destId="{0C769A1E-767C-46A7-9C71-600FC05CC6D4}" srcOrd="1" destOrd="0" presId="urn:microsoft.com/office/officeart/2005/8/layout/process3"/>
-    <dgm:cxn modelId="{2C7BD933-2580-4498-859B-2952411ACC5F}" type="presOf" srcId="{7DFE07BF-9A88-4152-9E58-09C9E20DB3CE}" destId="{0135851C-059A-4F41-A717-89AAE1AEB50F}" srcOrd="0" destOrd="0" presId="urn:microsoft.com/office/officeart/2005/8/layout/process3"/>
-    <dgm:cxn modelId="{5CB851DE-B309-4D32-BF02-58D05478E534}" srcId="{7DFE07BF-9A88-4152-9E58-09C9E20DB3CE}" destId="{7F7E1F91-F6F4-48A9-B4FA-337B2EBD2C9A}" srcOrd="0" destOrd="0" parTransId="{0796D45F-4D57-413D-A4BB-33573B2F1CF3}" sibTransId="{0FC519C8-F4CD-4D2A-B852-2C233866BAF3}"/>
-    <dgm:cxn modelId="{C98F67F6-2098-448B-8A63-E2EF5CDFB1A0}" type="presOf" srcId="{E68D9850-B3A4-4979-A4D0-E3D401A29AB5}" destId="{9986BED9-1E6C-4CA8-9EA5-87820C541D88}" srcOrd="0" destOrd="0" presId="urn:microsoft.com/office/officeart/2005/8/layout/process3"/>
-    <dgm:cxn modelId="{6A637A3B-899C-4509-8ECC-0083D16EC93D}" type="presOf" srcId="{80BADE98-2C43-40D5-937A-874A1B627145}" destId="{F28562CB-6812-4937-94DD-6D3F41B217CE}" srcOrd="0" destOrd="0" presId="urn:microsoft.com/office/officeart/2005/8/layout/process3"/>
-    <dgm:cxn modelId="{53E53B73-2F4A-414E-A392-96DA5283A4BE}" type="presOf" srcId="{2F3DF7DE-E5C9-4440-80D1-538313244BE6}" destId="{F26C71D2-1B5B-43C3-9D83-12F332E90749}" srcOrd="0" destOrd="0" presId="urn:microsoft.com/office/officeart/2005/8/layout/process3"/>
-    <dgm:cxn modelId="{4A7FA099-9464-4ACD-A790-6102C1584AD1}" srcId="{4412B91F-CF8D-4A42-83DF-7CDCCDA80F7D}" destId="{F3A2DAB8-2AB9-419A-82D3-D743A16978C8}" srcOrd="2" destOrd="0" parTransId="{62C15E06-9F1B-4472-A7B4-FEFADBC7E807}" sibTransId="{401344D0-ED0B-4340-9FCD-FF07FE375E6C}"/>
-    <dgm:cxn modelId="{E685725A-434D-4735-82BC-F1784D89BEC7}" type="presOf" srcId="{F3A2DAB8-2AB9-419A-82D3-D743A16978C8}" destId="{5F67B61D-1890-4707-AC93-F90C8402B758}" srcOrd="0" destOrd="0" presId="urn:microsoft.com/office/officeart/2005/8/layout/process3"/>
-    <dgm:cxn modelId="{C9D8935F-6C23-483A-8258-A9CABF3C76B0}" srcId="{4412B91F-CF8D-4A42-83DF-7CDCCDA80F7D}" destId="{3865D5FF-DA00-4906-B6F5-07C839464584}" srcOrd="1" destOrd="0" parTransId="{49FB8D0F-E70F-4A66-9F99-3E0F33864CA6}" sibTransId="{CFF97A55-CF3E-4E1D-AF04-5A3631D6CB6D}"/>
+    <dgm:cxn modelId="{54A84918-B1E5-42A4-934B-54B333BEFA14}" type="presOf" srcId="{3865D5FF-DA00-4906-B6F5-07C839464584}" destId="{E0453C94-1B77-4126-81A7-EE21FDBFFF1D}" srcOrd="0" destOrd="0" presId="urn:microsoft.com/office/officeart/2005/8/layout/process3"/>
     <dgm:cxn modelId="{F7B76B57-E0F7-4B01-B1E4-456EB3A552E6}" type="presOf" srcId="{7F7E1F91-F6F4-48A9-B4FA-337B2EBD2C9A}" destId="{01AD925A-7CA7-4489-9AE4-70C9408355AF}" srcOrd="0" destOrd="0" presId="urn:microsoft.com/office/officeart/2005/8/layout/process3"/>
-    <dgm:cxn modelId="{54A84918-B1E5-42A4-934B-54B333BEFA14}" type="presOf" srcId="{3865D5FF-DA00-4906-B6F5-07C839464584}" destId="{E0453C94-1B77-4126-81A7-EE21FDBFFF1D}" srcOrd="0" destOrd="0" presId="urn:microsoft.com/office/officeart/2005/8/layout/process3"/>
-    <dgm:cxn modelId="{98AD3F7A-F57A-4E45-BC55-D4C0412273B8}" type="presOf" srcId="{CFF97A55-CF3E-4E1D-AF04-5A3631D6CB6D}" destId="{6426DFE0-48C9-4067-B292-3D8AAA497A0A}" srcOrd="0" destOrd="0" presId="urn:microsoft.com/office/officeart/2005/8/layout/process3"/>
-    <dgm:cxn modelId="{D058A61E-2631-4792-87A9-3570D8D2DB0F}" srcId="{3865D5FF-DA00-4906-B6F5-07C839464584}" destId="{2F3DF7DE-E5C9-4440-80D1-538313244BE6}" srcOrd="0" destOrd="0" parTransId="{3C0BC7DD-F66C-4719-92AE-5E9E7825604D}" sibTransId="{4569B2FB-90CA-4536-9206-69C81C9FC0BD}"/>
-    <dgm:cxn modelId="{97E23C99-380C-4A30-95A7-A9D36BE51A4C}" type="presOf" srcId="{CFF97A55-CF3E-4E1D-AF04-5A3631D6CB6D}" destId="{ADB6516E-958F-4D77-964F-7E73D0745BE8}" srcOrd="1" destOrd="0" presId="urn:microsoft.com/office/officeart/2005/8/layout/process3"/>
     <dgm:cxn modelId="{EC7650D3-7D57-4DD6-BE23-B52713BBC6B1}" type="presParOf" srcId="{CC0EE527-85CD-48F3-B644-D95743DA8B8E}" destId="{77B2758C-7769-4628-AD70-3783AE199BD2}" srcOrd="0" destOrd="0" presId="urn:microsoft.com/office/officeart/2005/8/layout/process3"/>
     <dgm:cxn modelId="{2DF3BF4C-E0CD-42D4-8AD5-D1292590E932}" type="presParOf" srcId="{77B2758C-7769-4628-AD70-3783AE199BD2}" destId="{0135851C-059A-4F41-A717-89AAE1AEB50F}" srcOrd="0" destOrd="0" presId="urn:microsoft.com/office/officeart/2005/8/layout/process3"/>
     <dgm:cxn modelId="{4EA38216-8BA1-48E5-9623-3C6A04305534}" type="presParOf" srcId="{77B2758C-7769-4628-AD70-3783AE199BD2}" destId="{0485A0FB-C96E-42E5-BCAA-9C72A8F02D43}" srcOrd="1" destOrd="0" presId="urn:microsoft.com/office/officeart/2005/8/layout/process3"/>
@@ -7765,7 +7905,7 @@
   <dgm:whole/>
   <dgm:extLst>
     <a:ext uri="http://schemas.microsoft.com/office/drawing/2008/diagram">
-      <dsp:dataModelExt xmlns="" xmlns:dsp="http://schemas.microsoft.com/office/drawing/2008/diagram" relId="rId6" minVer="http://schemas.openxmlformats.org/drawingml/2006/diagram"/>
+      <dsp:dataModelExt xmlns:dsp="http://schemas.microsoft.com/office/drawing/2008/diagram" xmlns="" relId="rId6" minVer="http://schemas.openxmlformats.org/drawingml/2006/diagram"/>
     </a:ext>
   </dgm:extLst>
 </dgm:dataModel>
@@ -7775,7 +7915,7 @@
 <dgm:dataModel xmlns:dgm="http://schemas.openxmlformats.org/drawingml/2006/diagram" xmlns:a="http://schemas.openxmlformats.org/drawingml/2006/main">
   <dgm:ptLst>
     <dgm:pt modelId="{D4F2E4FB-49BF-4721-8707-3457AAE0EB88}" type="doc">
-      <dgm:prSet loTypeId="urn:microsoft.com/office/officeart/2005/8/layout/radial5" loCatId="relationship" qsTypeId="urn:microsoft.com/office/officeart/2005/8/quickstyle/simple1" qsCatId="simple" csTypeId="urn:microsoft.com/office/officeart/2005/8/colors/accent1_2" csCatId="accent1" phldr="1"/>
+      <dgm:prSet loTypeId="urn:microsoft.com/office/officeart/2005/8/layout/radial1" loCatId="relationship" qsTypeId="urn:microsoft.com/office/officeart/2005/8/quickstyle/3d1" qsCatId="3D" csTypeId="urn:microsoft.com/office/officeart/2005/8/colors/accent2_5" csCatId="accent2" phldr="1"/>
       <dgm:spPr/>
       <dgm:t>
         <a:bodyPr/>
@@ -7793,10 +7933,18 @@
         <a:lstStyle/>
         <a:p>
           <a:r>
-            <a:rPr lang="pt-BR" sz="1400" dirty="0" smtClean="0"/>
+            <a:rPr lang="pt-BR" sz="2400" b="1" dirty="0" smtClean="0">
+              <a:solidFill>
+                <a:srgbClr val="FFFF00"/>
+              </a:solidFill>
+            </a:rPr>
             <a:t>Paróquia</a:t>
           </a:r>
-          <a:endParaRPr lang="pt-BR" sz="1400" dirty="0"/>
+          <a:endParaRPr lang="pt-BR" sz="2400" b="1" dirty="0">
+            <a:solidFill>
+              <a:srgbClr val="FFFF00"/>
+            </a:solidFill>
+          </a:endParaRPr>
         </a:p>
       </dgm:t>
     </dgm:pt>
@@ -7823,13 +7971,25 @@
       </dgm:t>
     </dgm:pt>
     <dgm:pt modelId="{47D5C472-6F40-4426-8E86-BCB2F2BD330B}">
-      <dgm:prSet phldrT="[Texto]" phldr="1" custT="1"/>
+      <dgm:prSet phldrT="[Texto]" custT="1"/>
       <dgm:spPr/>
       <dgm:t>
         <a:bodyPr/>
         <a:lstStyle/>
         <a:p>
-          <a:endParaRPr lang="pt-BR" sz="1400" dirty="0"/>
+          <a:r>
+            <a:rPr lang="pt-BR" sz="1800" b="1" dirty="0" smtClean="0">
+              <a:solidFill>
+                <a:srgbClr val="66FFFF"/>
+              </a:solidFill>
+            </a:rPr>
+            <a:t>Ação solidária</a:t>
+          </a:r>
+          <a:endParaRPr lang="pt-BR" sz="1800" b="1" dirty="0">
+            <a:solidFill>
+              <a:srgbClr val="66FFFF"/>
+            </a:solidFill>
+          </a:endParaRPr>
         </a:p>
       </dgm:t>
     </dgm:pt>
@@ -7856,13 +8016,25 @@
       </dgm:t>
     </dgm:pt>
     <dgm:pt modelId="{31E1C8DB-A788-4C7C-8E35-369521C571A2}">
-      <dgm:prSet phldrT="[Texto]" phldr="1" custT="1"/>
+      <dgm:prSet phldrT="[Texto]" custT="1"/>
       <dgm:spPr/>
       <dgm:t>
         <a:bodyPr/>
         <a:lstStyle/>
         <a:p>
-          <a:endParaRPr lang="pt-BR" sz="1400" dirty="0"/>
+          <a:r>
+            <a:rPr lang="pt-BR" sz="1800" b="1" dirty="0" smtClean="0">
+              <a:solidFill>
+                <a:srgbClr val="66FFFF"/>
+              </a:solidFill>
+            </a:rPr>
+            <a:t>Outros</a:t>
+          </a:r>
+          <a:endParaRPr lang="pt-BR" sz="1800" b="1" dirty="0">
+            <a:solidFill>
+              <a:srgbClr val="66FFFF"/>
+            </a:solidFill>
+          </a:endParaRPr>
         </a:p>
       </dgm:t>
     </dgm:pt>
@@ -7888,72 +8060,6 @@
         </a:p>
       </dgm:t>
     </dgm:pt>
-    <dgm:pt modelId="{597E7FEA-0A6D-4074-A2A0-EDBE84388C7A}">
-      <dgm:prSet phldrT="[Texto]" phldr="1" custT="1"/>
-      <dgm:spPr/>
-      <dgm:t>
-        <a:bodyPr/>
-        <a:lstStyle/>
-        <a:p>
-          <a:endParaRPr lang="pt-BR" sz="1400"/>
-        </a:p>
-      </dgm:t>
-    </dgm:pt>
-    <dgm:pt modelId="{C9CB2A3C-AA8A-4C63-ADAF-BB4A990106BF}" type="parTrans" cxnId="{DB098DF9-4AC3-48C4-BC74-3A1AFF298A39}">
-      <dgm:prSet/>
-      <dgm:spPr/>
-      <dgm:t>
-        <a:bodyPr/>
-        <a:lstStyle/>
-        <a:p>
-          <a:endParaRPr lang="pt-BR"/>
-        </a:p>
-      </dgm:t>
-    </dgm:pt>
-    <dgm:pt modelId="{78A577AF-6145-4A2C-8D9E-BB70A9BDA682}" type="sibTrans" cxnId="{DB098DF9-4AC3-48C4-BC74-3A1AFF298A39}">
-      <dgm:prSet/>
-      <dgm:spPr/>
-      <dgm:t>
-        <a:bodyPr/>
-        <a:lstStyle/>
-        <a:p>
-          <a:endParaRPr lang="pt-BR"/>
-        </a:p>
-      </dgm:t>
-    </dgm:pt>
-    <dgm:pt modelId="{E65E6258-30CC-439C-9E12-987FB207C0BA}">
-      <dgm:prSet phldrT="[Texto]" phldr="1" custT="1"/>
-      <dgm:spPr/>
-      <dgm:t>
-        <a:bodyPr/>
-        <a:lstStyle/>
-        <a:p>
-          <a:endParaRPr lang="pt-BR" sz="1400" dirty="0"/>
-        </a:p>
-      </dgm:t>
-    </dgm:pt>
-    <dgm:pt modelId="{88E727E9-53A4-4E95-A459-039A49E93B44}" type="parTrans" cxnId="{B7E99F65-BDD3-4DC8-BA59-474161888B08}">
-      <dgm:prSet/>
-      <dgm:spPr/>
-      <dgm:t>
-        <a:bodyPr/>
-        <a:lstStyle/>
-        <a:p>
-          <a:endParaRPr lang="pt-BR"/>
-        </a:p>
-      </dgm:t>
-    </dgm:pt>
-    <dgm:pt modelId="{C1A9E9C8-E1E8-41AC-8025-94E945EC2819}" type="sibTrans" cxnId="{B7E99F65-BDD3-4DC8-BA59-474161888B08}">
-      <dgm:prSet/>
-      <dgm:spPr/>
-      <dgm:t>
-        <a:bodyPr/>
-        <a:lstStyle/>
-        <a:p>
-          <a:endParaRPr lang="pt-BR"/>
-        </a:p>
-      </dgm:t>
-    </dgm:pt>
     <dgm:pt modelId="{600CB5D7-2D85-4AF5-BB05-4A1B86521FA2}">
       <dgm:prSet phldrT="[Texto]" custT="1"/>
       <dgm:spPr/>
@@ -7961,7 +8067,19 @@
         <a:bodyPr/>
         <a:lstStyle/>
         <a:p>
-          <a:endParaRPr lang="pt-BR" sz="1400" dirty="0"/>
+          <a:r>
+            <a:rPr lang="pt-BR" sz="1800" b="1" dirty="0" smtClean="0">
+              <a:solidFill>
+                <a:srgbClr val="66FFFF"/>
+              </a:solidFill>
+            </a:rPr>
+            <a:t>Catequese</a:t>
+          </a:r>
+          <a:endParaRPr lang="pt-BR" sz="1800" b="1" dirty="0">
+            <a:solidFill>
+              <a:srgbClr val="66FFFF"/>
+            </a:solidFill>
+          </a:endParaRPr>
         </a:p>
       </dgm:t>
     </dgm:pt>
@@ -7987,8 +8105,53 @@
         </a:p>
       </dgm:t>
     </dgm:pt>
-    <dgm:pt modelId="{6A9D9649-AA51-48D6-B507-7AEDD979430C}" type="pres">
-      <dgm:prSet presAssocID="{D4F2E4FB-49BF-4721-8707-3457AAE0EB88}" presName="Name0" presStyleCnt="0">
+    <dgm:pt modelId="{D9DDF621-EEE4-4358-AA21-46B98A42D9DB}">
+      <dgm:prSet phldrT="[Texto]" custT="1"/>
+      <dgm:spPr/>
+      <dgm:t>
+        <a:bodyPr/>
+        <a:lstStyle/>
+        <a:p>
+          <a:r>
+            <a:rPr lang="pt-BR" sz="1800" b="1" dirty="0" smtClean="0">
+              <a:solidFill>
+                <a:srgbClr val="66FFFF"/>
+              </a:solidFill>
+            </a:rPr>
+            <a:t>Pastoral familiar	</a:t>
+          </a:r>
+          <a:endParaRPr lang="pt-BR" sz="1800" b="1" dirty="0">
+            <a:solidFill>
+              <a:srgbClr val="66FFFF"/>
+            </a:solidFill>
+          </a:endParaRPr>
+        </a:p>
+      </dgm:t>
+    </dgm:pt>
+    <dgm:pt modelId="{DFD30755-1B35-4D9D-A38B-63A7E0D8C714}" type="sibTrans" cxnId="{C4940F3D-B9E6-4660-AB57-C285341B7D63}">
+      <dgm:prSet/>
+      <dgm:spPr/>
+      <dgm:t>
+        <a:bodyPr/>
+        <a:lstStyle/>
+        <a:p>
+          <a:endParaRPr lang="pt-BR"/>
+        </a:p>
+      </dgm:t>
+    </dgm:pt>
+    <dgm:pt modelId="{5A7674B0-C2E4-49D2-A32B-4525CF9180F8}" type="parTrans" cxnId="{C4940F3D-B9E6-4660-AB57-C285341B7D63}">
+      <dgm:prSet/>
+      <dgm:spPr/>
+      <dgm:t>
+        <a:bodyPr/>
+        <a:lstStyle/>
+        <a:p>
+          <a:endParaRPr lang="pt-BR"/>
+        </a:p>
+      </dgm:t>
+    </dgm:pt>
+    <dgm:pt modelId="{8BE509CE-6CEB-456E-98AB-071E9798BBE6}" type="pres">
+      <dgm:prSet presAssocID="{D4F2E4FB-49BF-4721-8707-3457AAE0EB88}" presName="cycle" presStyleCnt="0">
         <dgm:presLayoutVars>
           <dgm:chMax val="1"/>
           <dgm:dir/>
@@ -8005,8 +8168,8 @@
         </a:p>
       </dgm:t>
     </dgm:pt>
-    <dgm:pt modelId="{18F2EB1D-555E-470E-B78B-9F32BC1302F0}" type="pres">
-      <dgm:prSet presAssocID="{9ADEF162-76FA-4A3C-8220-3CD2B3D3023E}" presName="centerShape" presStyleLbl="node0" presStyleIdx="0" presStyleCnt="1" custScaleX="123220" custScaleY="126494"/>
+    <dgm:pt modelId="{BDE3E4C7-8057-4579-B356-D9461424C263}" type="pres">
+      <dgm:prSet presAssocID="{9ADEF162-76FA-4A3C-8220-3CD2B3D3023E}" presName="centerShape" presStyleLbl="node0" presStyleIdx="0" presStyleCnt="1" custScaleX="128855"/>
       <dgm:spPr/>
       <dgm:t>
         <a:bodyPr/>
@@ -8016,8 +8179,8 @@
         </a:p>
       </dgm:t>
     </dgm:pt>
-    <dgm:pt modelId="{D858E594-9B1F-454E-812B-1D569755D339}" type="pres">
-      <dgm:prSet presAssocID="{036DF210-BB24-491F-9B05-BED9EB97CCEA}" presName="parTrans" presStyleLbl="sibTrans2D1" presStyleIdx="0" presStyleCnt="5"/>
+    <dgm:pt modelId="{DB1550D9-ABF3-4F2B-8E67-E1CEA10516E4}" type="pres">
+      <dgm:prSet presAssocID="{036DF210-BB24-491F-9B05-BED9EB97CCEA}" presName="Name9" presStyleLbl="parChTrans1D2" presStyleIdx="0" presStyleCnt="4"/>
       <dgm:spPr/>
       <dgm:t>
         <a:bodyPr/>
@@ -8027,8 +8190,8 @@
         </a:p>
       </dgm:t>
     </dgm:pt>
-    <dgm:pt modelId="{2BEFA425-F024-4BD4-B31D-0FB6C45896F7}" type="pres">
-      <dgm:prSet presAssocID="{036DF210-BB24-491F-9B05-BED9EB97CCEA}" presName="connectorText" presStyleLbl="sibTrans2D1" presStyleIdx="0" presStyleCnt="5"/>
+    <dgm:pt modelId="{A552497F-8CAD-4CCB-B8F8-AB3728F01B66}" type="pres">
+      <dgm:prSet presAssocID="{036DF210-BB24-491F-9B05-BED9EB97CCEA}" presName="connTx" presStyleLbl="parChTrans1D2" presStyleIdx="0" presStyleCnt="4"/>
       <dgm:spPr/>
       <dgm:t>
         <a:bodyPr/>
@@ -8038,8 +8201,8 @@
         </a:p>
       </dgm:t>
     </dgm:pt>
-    <dgm:pt modelId="{E0159EA0-1A5D-476D-AD51-865243B2D714}" type="pres">
-      <dgm:prSet presAssocID="{47D5C472-6F40-4426-8E86-BCB2F2BD330B}" presName="node" presStyleLbl="node1" presStyleIdx="0" presStyleCnt="5">
+    <dgm:pt modelId="{1BA1A60B-DB91-42A4-8A23-386BD88E7249}" type="pres">
+      <dgm:prSet presAssocID="{47D5C472-6F40-4426-8E86-BCB2F2BD330B}" presName="node" presStyleLbl="node1" presStyleIdx="0" presStyleCnt="4" custScaleX="128855">
         <dgm:presLayoutVars>
           <dgm:bulletEnabled val="1"/>
         </dgm:presLayoutVars>
@@ -8053,8 +8216,8 @@
         </a:p>
       </dgm:t>
     </dgm:pt>
-    <dgm:pt modelId="{9D95D45C-9B20-4A4E-AD6C-37161FDE50AF}" type="pres">
-      <dgm:prSet presAssocID="{0F4EE5F8-CE65-4C01-BA1B-62373453CD4B}" presName="parTrans" presStyleLbl="sibTrans2D1" presStyleIdx="1" presStyleCnt="5"/>
+    <dgm:pt modelId="{5301AC84-2576-4645-A3A5-CD1FD68C0D58}" type="pres">
+      <dgm:prSet presAssocID="{0F4EE5F8-CE65-4C01-BA1B-62373453CD4B}" presName="Name9" presStyleLbl="parChTrans1D2" presStyleIdx="1" presStyleCnt="4"/>
       <dgm:spPr/>
       <dgm:t>
         <a:bodyPr/>
@@ -8064,8 +8227,8 @@
         </a:p>
       </dgm:t>
     </dgm:pt>
-    <dgm:pt modelId="{FFC83820-1F59-4B99-B0E5-5EF505EF981A}" type="pres">
-      <dgm:prSet presAssocID="{0F4EE5F8-CE65-4C01-BA1B-62373453CD4B}" presName="connectorText" presStyleLbl="sibTrans2D1" presStyleIdx="1" presStyleCnt="5"/>
+    <dgm:pt modelId="{8D407620-7228-4FAB-92D6-F90D099227B7}" type="pres">
+      <dgm:prSet presAssocID="{0F4EE5F8-CE65-4C01-BA1B-62373453CD4B}" presName="connTx" presStyleLbl="parChTrans1D2" presStyleIdx="1" presStyleCnt="4"/>
       <dgm:spPr/>
       <dgm:t>
         <a:bodyPr/>
@@ -8075,8 +8238,8 @@
         </a:p>
       </dgm:t>
     </dgm:pt>
-    <dgm:pt modelId="{892AB89D-9357-4946-A690-9AB770094366}" type="pres">
-      <dgm:prSet presAssocID="{600CB5D7-2D85-4AF5-BB05-4A1B86521FA2}" presName="node" presStyleLbl="node1" presStyleIdx="1" presStyleCnt="5">
+    <dgm:pt modelId="{EE3E81F8-67F5-4149-A111-7181108DA414}" type="pres">
+      <dgm:prSet presAssocID="{600CB5D7-2D85-4AF5-BB05-4A1B86521FA2}" presName="node" presStyleLbl="node1" presStyleIdx="1" presStyleCnt="4" custScaleX="128855" custRadScaleRad="143469" custRadScaleInc="973">
         <dgm:presLayoutVars>
           <dgm:bulletEnabled val="1"/>
         </dgm:presLayoutVars>
@@ -8090,8 +8253,8 @@
         </a:p>
       </dgm:t>
     </dgm:pt>
-    <dgm:pt modelId="{8F93543A-5059-4DE8-A2FC-A99D358C55C0}" type="pres">
-      <dgm:prSet presAssocID="{5CD5CAC8-AC56-4175-8B02-D9FDE7591724}" presName="parTrans" presStyleLbl="sibTrans2D1" presStyleIdx="2" presStyleCnt="5"/>
+    <dgm:pt modelId="{E257CB2D-EE0D-470B-B5D3-13291BA657E1}" type="pres">
+      <dgm:prSet presAssocID="{5CD5CAC8-AC56-4175-8B02-D9FDE7591724}" presName="Name9" presStyleLbl="parChTrans1D2" presStyleIdx="2" presStyleCnt="4"/>
       <dgm:spPr/>
       <dgm:t>
         <a:bodyPr/>
@@ -8101,8 +8264,8 @@
         </a:p>
       </dgm:t>
     </dgm:pt>
-    <dgm:pt modelId="{63B15D18-84CC-4B8C-A7B8-9D7C87C445EE}" type="pres">
-      <dgm:prSet presAssocID="{5CD5CAC8-AC56-4175-8B02-D9FDE7591724}" presName="connectorText" presStyleLbl="sibTrans2D1" presStyleIdx="2" presStyleCnt="5"/>
+    <dgm:pt modelId="{A093D335-C5E6-4F79-8A8C-0A4517C436AF}" type="pres">
+      <dgm:prSet presAssocID="{5CD5CAC8-AC56-4175-8B02-D9FDE7591724}" presName="connTx" presStyleLbl="parChTrans1D2" presStyleIdx="2" presStyleCnt="4"/>
       <dgm:spPr/>
       <dgm:t>
         <a:bodyPr/>
@@ -8112,8 +8275,8 @@
         </a:p>
       </dgm:t>
     </dgm:pt>
-    <dgm:pt modelId="{4AE6AAFA-D59A-4F35-A5E8-C6D2EC6BBFF0}" type="pres">
-      <dgm:prSet presAssocID="{31E1C8DB-A788-4C7C-8E35-369521C571A2}" presName="node" presStyleLbl="node1" presStyleIdx="2" presStyleCnt="5">
+    <dgm:pt modelId="{863E9C95-4D35-4D80-8FF7-E34BA1AF170C}" type="pres">
+      <dgm:prSet presAssocID="{31E1C8DB-A788-4C7C-8E35-369521C571A2}" presName="node" presStyleLbl="node1" presStyleIdx="2" presStyleCnt="4" custScaleX="128855">
         <dgm:presLayoutVars>
           <dgm:bulletEnabled val="1"/>
         </dgm:presLayoutVars>
@@ -8127,8 +8290,8 @@
         </a:p>
       </dgm:t>
     </dgm:pt>
-    <dgm:pt modelId="{D32B50BC-8F9A-4A06-941D-13004E7B3F17}" type="pres">
-      <dgm:prSet presAssocID="{C9CB2A3C-AA8A-4C63-ADAF-BB4A990106BF}" presName="parTrans" presStyleLbl="sibTrans2D1" presStyleIdx="3" presStyleCnt="5"/>
+    <dgm:pt modelId="{20417B74-94E5-4840-BF37-972B8D6C451B}" type="pres">
+      <dgm:prSet presAssocID="{5A7674B0-C2E4-49D2-A32B-4525CF9180F8}" presName="Name9" presStyleLbl="parChTrans1D2" presStyleIdx="3" presStyleCnt="4"/>
       <dgm:spPr/>
       <dgm:t>
         <a:bodyPr/>
@@ -8138,8 +8301,8 @@
         </a:p>
       </dgm:t>
     </dgm:pt>
-    <dgm:pt modelId="{DA7B04D8-8B81-4E5B-97E0-2DFA07EF08B4}" type="pres">
-      <dgm:prSet presAssocID="{C9CB2A3C-AA8A-4C63-ADAF-BB4A990106BF}" presName="connectorText" presStyleLbl="sibTrans2D1" presStyleIdx="3" presStyleCnt="5"/>
+    <dgm:pt modelId="{1385A504-9932-43FD-8475-43DF1EC07135}" type="pres">
+      <dgm:prSet presAssocID="{5A7674B0-C2E4-49D2-A32B-4525CF9180F8}" presName="connTx" presStyleLbl="parChTrans1D2" presStyleIdx="3" presStyleCnt="4"/>
       <dgm:spPr/>
       <dgm:t>
         <a:bodyPr/>
@@ -8149,8 +8312,8 @@
         </a:p>
       </dgm:t>
     </dgm:pt>
-    <dgm:pt modelId="{42C28B57-95B0-4561-B729-7C55DC80C4C3}" type="pres">
-      <dgm:prSet presAssocID="{597E7FEA-0A6D-4074-A2A0-EDBE84388C7A}" presName="node" presStyleLbl="node1" presStyleIdx="3" presStyleCnt="5">
+    <dgm:pt modelId="{6B362DF4-5D96-4089-A9F0-D02ED909FA49}" type="pres">
+      <dgm:prSet presAssocID="{D9DDF621-EEE4-4358-AA21-46B98A42D9DB}" presName="node" presStyleLbl="node1" presStyleIdx="3" presStyleCnt="4" custScaleX="128855" custRadScaleRad="139273" custRadScaleInc="-1002">
         <dgm:presLayoutVars>
           <dgm:bulletEnabled val="1"/>
         </dgm:presLayoutVars>
@@ -8164,90 +8327,46 @@
         </a:p>
       </dgm:t>
     </dgm:pt>
-    <dgm:pt modelId="{BED8CFF9-57DF-415B-BFD2-F23237B98D78}" type="pres">
-      <dgm:prSet presAssocID="{88E727E9-53A4-4E95-A459-039A49E93B44}" presName="parTrans" presStyleLbl="sibTrans2D1" presStyleIdx="4" presStyleCnt="5"/>
-      <dgm:spPr/>
-      <dgm:t>
-        <a:bodyPr/>
-        <a:lstStyle/>
-        <a:p>
-          <a:endParaRPr lang="pt-BR"/>
-        </a:p>
-      </dgm:t>
-    </dgm:pt>
-    <dgm:pt modelId="{30E14BBC-7822-4D38-BD74-0C71B2A3B30C}" type="pres">
-      <dgm:prSet presAssocID="{88E727E9-53A4-4E95-A459-039A49E93B44}" presName="connectorText" presStyleLbl="sibTrans2D1" presStyleIdx="4" presStyleCnt="5"/>
-      <dgm:spPr/>
-      <dgm:t>
-        <a:bodyPr/>
-        <a:lstStyle/>
-        <a:p>
-          <a:endParaRPr lang="pt-BR"/>
-        </a:p>
-      </dgm:t>
-    </dgm:pt>
-    <dgm:pt modelId="{AE23CEE4-5E78-4BF2-A4EC-856A2ACE758E}" type="pres">
-      <dgm:prSet presAssocID="{E65E6258-30CC-439C-9E12-987FB207C0BA}" presName="node" presStyleLbl="node1" presStyleIdx="4" presStyleCnt="5">
-        <dgm:presLayoutVars>
-          <dgm:bulletEnabled val="1"/>
-        </dgm:presLayoutVars>
-      </dgm:prSet>
-      <dgm:spPr/>
-      <dgm:t>
-        <a:bodyPr/>
-        <a:lstStyle/>
-        <a:p>
-          <a:endParaRPr lang="pt-BR"/>
-        </a:p>
-      </dgm:t>
-    </dgm:pt>
   </dgm:ptLst>
   <dgm:cxnLst>
-    <dgm:cxn modelId="{7366D01B-7B1A-4F7E-8897-A92969695C89}" type="presOf" srcId="{88E727E9-53A4-4E95-A459-039A49E93B44}" destId="{BED8CFF9-57DF-415B-BFD2-F23237B98D78}" srcOrd="0" destOrd="0" presId="urn:microsoft.com/office/officeart/2005/8/layout/radial5"/>
-    <dgm:cxn modelId="{23207EC2-56B0-44E0-A6C7-84051896C37C}" type="presOf" srcId="{036DF210-BB24-491F-9B05-BED9EB97CCEA}" destId="{D858E594-9B1F-454E-812B-1D569755D339}" srcOrd="0" destOrd="0" presId="urn:microsoft.com/office/officeart/2005/8/layout/radial5"/>
-    <dgm:cxn modelId="{622C7C39-11F8-4758-9549-8841122B7ED2}" type="presOf" srcId="{31E1C8DB-A788-4C7C-8E35-369521C571A2}" destId="{4AE6AAFA-D59A-4F35-A5E8-C6D2EC6BBFF0}" srcOrd="0" destOrd="0" presId="urn:microsoft.com/office/officeart/2005/8/layout/radial5"/>
-    <dgm:cxn modelId="{89D3A26C-01B0-47D3-9792-AD7AC1141C23}" type="presOf" srcId="{0F4EE5F8-CE65-4C01-BA1B-62373453CD4B}" destId="{9D95D45C-9B20-4A4E-AD6C-37161FDE50AF}" srcOrd="0" destOrd="0" presId="urn:microsoft.com/office/officeart/2005/8/layout/radial5"/>
-    <dgm:cxn modelId="{20E80264-2731-447C-89A6-6EF6F3B07D7B}" type="presOf" srcId="{C9CB2A3C-AA8A-4C63-ADAF-BB4A990106BF}" destId="{DA7B04D8-8B81-4E5B-97E0-2DFA07EF08B4}" srcOrd="1" destOrd="0" presId="urn:microsoft.com/office/officeart/2005/8/layout/radial5"/>
-    <dgm:cxn modelId="{742A00C4-D75C-4EB9-B6C7-8556F6BF3B40}" type="presOf" srcId="{88E727E9-53A4-4E95-A459-039A49E93B44}" destId="{30E14BBC-7822-4D38-BD74-0C71B2A3B30C}" srcOrd="1" destOrd="0" presId="urn:microsoft.com/office/officeart/2005/8/layout/radial5"/>
+    <dgm:cxn modelId="{7A131CEC-AD74-4E7B-AF0B-D802B9255906}" type="presOf" srcId="{0F4EE5F8-CE65-4C01-BA1B-62373453CD4B}" destId="{8D407620-7228-4FAB-92D6-F90D099227B7}" srcOrd="1" destOrd="0" presId="urn:microsoft.com/office/officeart/2005/8/layout/radial1"/>
+    <dgm:cxn modelId="{C4940F3D-B9E6-4660-AB57-C285341B7D63}" srcId="{9ADEF162-76FA-4A3C-8220-3CD2B3D3023E}" destId="{D9DDF621-EEE4-4358-AA21-46B98A42D9DB}" srcOrd="3" destOrd="0" parTransId="{5A7674B0-C2E4-49D2-A32B-4525CF9180F8}" sibTransId="{DFD30755-1B35-4D9D-A38B-63A7E0D8C714}"/>
+    <dgm:cxn modelId="{F195A791-DD89-4913-8E1E-8DC4F82B6DC9}" srcId="{9ADEF162-76FA-4A3C-8220-3CD2B3D3023E}" destId="{47D5C472-6F40-4426-8E86-BCB2F2BD330B}" srcOrd="0" destOrd="0" parTransId="{036DF210-BB24-491F-9B05-BED9EB97CCEA}" sibTransId="{8F34451D-735F-4913-B0FC-D3B45BB4B61F}"/>
+    <dgm:cxn modelId="{A9ED23A1-5786-470F-A5CA-C597776F03B2}" type="presOf" srcId="{0F4EE5F8-CE65-4C01-BA1B-62373453CD4B}" destId="{5301AC84-2576-4645-A3A5-CD1FD68C0D58}" srcOrd="0" destOrd="0" presId="urn:microsoft.com/office/officeart/2005/8/layout/radial1"/>
+    <dgm:cxn modelId="{0AB8AA39-130D-4082-8073-DCFF557B8490}" srcId="{D4F2E4FB-49BF-4721-8707-3457AAE0EB88}" destId="{9ADEF162-76FA-4A3C-8220-3CD2B3D3023E}" srcOrd="0" destOrd="0" parTransId="{70CEE8AE-1BA1-4498-BED4-2294652E694E}" sibTransId="{8D6656CE-2472-4600-8A8A-680BB044CFF5}"/>
+    <dgm:cxn modelId="{7116AD4E-9B35-4A15-BCB9-9754894B44B5}" type="presOf" srcId="{47D5C472-6F40-4426-8E86-BCB2F2BD330B}" destId="{1BA1A60B-DB91-42A4-8A23-386BD88E7249}" srcOrd="0" destOrd="0" presId="urn:microsoft.com/office/officeart/2005/8/layout/radial1"/>
+    <dgm:cxn modelId="{58D9E769-8B60-437B-82AB-95D055889FCB}" type="presOf" srcId="{31E1C8DB-A788-4C7C-8E35-369521C571A2}" destId="{863E9C95-4D35-4D80-8FF7-E34BA1AF170C}" srcOrd="0" destOrd="0" presId="urn:microsoft.com/office/officeart/2005/8/layout/radial1"/>
+    <dgm:cxn modelId="{0E34E0B0-FDA0-4F2B-989D-96317070AD80}" type="presOf" srcId="{036DF210-BB24-491F-9B05-BED9EB97CCEA}" destId="{A552497F-8CAD-4CCB-B8F8-AB3728F01B66}" srcOrd="1" destOrd="0" presId="urn:microsoft.com/office/officeart/2005/8/layout/radial1"/>
+    <dgm:cxn modelId="{684C4FA6-FF7E-459C-971A-CEFD6A9C674A}" type="presOf" srcId="{D4F2E4FB-49BF-4721-8707-3457AAE0EB88}" destId="{8BE509CE-6CEB-456E-98AB-071E9798BBE6}" srcOrd="0" destOrd="0" presId="urn:microsoft.com/office/officeart/2005/8/layout/radial1"/>
+    <dgm:cxn modelId="{A3234599-2A1F-4705-A7DB-C8EF644A84F6}" srcId="{9ADEF162-76FA-4A3C-8220-3CD2B3D3023E}" destId="{31E1C8DB-A788-4C7C-8E35-369521C571A2}" srcOrd="2" destOrd="0" parTransId="{5CD5CAC8-AC56-4175-8B02-D9FDE7591724}" sibTransId="{78634723-FA66-4AF5-9D17-D9106FB2D70F}"/>
+    <dgm:cxn modelId="{EFE5443B-C1A1-420B-AA4A-3C37A0C2170B}" type="presOf" srcId="{9ADEF162-76FA-4A3C-8220-3CD2B3D3023E}" destId="{BDE3E4C7-8057-4579-B356-D9461424C263}" srcOrd="0" destOrd="0" presId="urn:microsoft.com/office/officeart/2005/8/layout/radial1"/>
+    <dgm:cxn modelId="{E5B6E3AE-7725-47DD-B924-3D4DEBC6C3E8}" type="presOf" srcId="{600CB5D7-2D85-4AF5-BB05-4A1B86521FA2}" destId="{EE3E81F8-67F5-4149-A111-7181108DA414}" srcOrd="0" destOrd="0" presId="urn:microsoft.com/office/officeart/2005/8/layout/radial1"/>
+    <dgm:cxn modelId="{40D7AD9B-1C74-4622-AE60-25DFA28585FA}" type="presOf" srcId="{5CD5CAC8-AC56-4175-8B02-D9FDE7591724}" destId="{E257CB2D-EE0D-470B-B5D3-13291BA657E1}" srcOrd="0" destOrd="0" presId="urn:microsoft.com/office/officeart/2005/8/layout/radial1"/>
+    <dgm:cxn modelId="{E83101D7-79EF-4C85-A348-4E8BCDA37D54}" type="presOf" srcId="{5A7674B0-C2E4-49D2-A32B-4525CF9180F8}" destId="{20417B74-94E5-4840-BF37-972B8D6C451B}" srcOrd="0" destOrd="0" presId="urn:microsoft.com/office/officeart/2005/8/layout/radial1"/>
+    <dgm:cxn modelId="{455E97C9-913A-4497-86EE-9B936815079D}" type="presOf" srcId="{5CD5CAC8-AC56-4175-8B02-D9FDE7591724}" destId="{A093D335-C5E6-4F79-8A8C-0A4517C436AF}" srcOrd="1" destOrd="0" presId="urn:microsoft.com/office/officeart/2005/8/layout/radial1"/>
+    <dgm:cxn modelId="{AADACD72-7485-403B-B92C-22E4CC629A91}" type="presOf" srcId="{036DF210-BB24-491F-9B05-BED9EB97CCEA}" destId="{DB1550D9-ABF3-4F2B-8E67-E1CEA10516E4}" srcOrd="0" destOrd="0" presId="urn:microsoft.com/office/officeart/2005/8/layout/radial1"/>
+    <dgm:cxn modelId="{8FAEEB90-7557-49E8-873F-F881FC60DAFE}" type="presOf" srcId="{5A7674B0-C2E4-49D2-A32B-4525CF9180F8}" destId="{1385A504-9932-43FD-8475-43DF1EC07135}" srcOrd="1" destOrd="0" presId="urn:microsoft.com/office/officeart/2005/8/layout/radial1"/>
     <dgm:cxn modelId="{A2C98141-733B-400B-91DC-A4454889E5AA}" srcId="{9ADEF162-76FA-4A3C-8220-3CD2B3D3023E}" destId="{600CB5D7-2D85-4AF5-BB05-4A1B86521FA2}" srcOrd="1" destOrd="0" parTransId="{0F4EE5F8-CE65-4C01-BA1B-62373453CD4B}" sibTransId="{D8ED6D04-2132-4167-966C-2933CD0F8E51}"/>
-    <dgm:cxn modelId="{0AB8AA39-130D-4082-8073-DCFF557B8490}" srcId="{D4F2E4FB-49BF-4721-8707-3457AAE0EB88}" destId="{9ADEF162-76FA-4A3C-8220-3CD2B3D3023E}" srcOrd="0" destOrd="0" parTransId="{70CEE8AE-1BA1-4498-BED4-2294652E694E}" sibTransId="{8D6656CE-2472-4600-8A8A-680BB044CFF5}"/>
-    <dgm:cxn modelId="{7442BC64-C27B-46B2-8FDA-C8CB7A69BB78}" type="presOf" srcId="{5CD5CAC8-AC56-4175-8B02-D9FDE7591724}" destId="{63B15D18-84CC-4B8C-A7B8-9D7C87C445EE}" srcOrd="1" destOrd="0" presId="urn:microsoft.com/office/officeart/2005/8/layout/radial5"/>
-    <dgm:cxn modelId="{A3234599-2A1F-4705-A7DB-C8EF644A84F6}" srcId="{9ADEF162-76FA-4A3C-8220-3CD2B3D3023E}" destId="{31E1C8DB-A788-4C7C-8E35-369521C571A2}" srcOrd="2" destOrd="0" parTransId="{5CD5CAC8-AC56-4175-8B02-D9FDE7591724}" sibTransId="{78634723-FA66-4AF5-9D17-D9106FB2D70F}"/>
-    <dgm:cxn modelId="{E76B003B-3141-48DA-8297-E3AA243031E5}" type="presOf" srcId="{D4F2E4FB-49BF-4721-8707-3457AAE0EB88}" destId="{6A9D9649-AA51-48D6-B507-7AEDD979430C}" srcOrd="0" destOrd="0" presId="urn:microsoft.com/office/officeart/2005/8/layout/radial5"/>
-    <dgm:cxn modelId="{4D528558-CCA4-4766-9340-8DBA49C0C449}" type="presOf" srcId="{E65E6258-30CC-439C-9E12-987FB207C0BA}" destId="{AE23CEE4-5E78-4BF2-A4EC-856A2ACE758E}" srcOrd="0" destOrd="0" presId="urn:microsoft.com/office/officeart/2005/8/layout/radial5"/>
-    <dgm:cxn modelId="{28AC89FC-11D9-4755-B886-3A3759AAC780}" type="presOf" srcId="{036DF210-BB24-491F-9B05-BED9EB97CCEA}" destId="{2BEFA425-F024-4BD4-B31D-0FB6C45896F7}" srcOrd="1" destOrd="0" presId="urn:microsoft.com/office/officeart/2005/8/layout/radial5"/>
-    <dgm:cxn modelId="{8F72D950-79DD-429B-81A7-418362F720F6}" type="presOf" srcId="{600CB5D7-2D85-4AF5-BB05-4A1B86521FA2}" destId="{892AB89D-9357-4946-A690-9AB770094366}" srcOrd="0" destOrd="0" presId="urn:microsoft.com/office/officeart/2005/8/layout/radial5"/>
-    <dgm:cxn modelId="{F195A791-DD89-4913-8E1E-8DC4F82B6DC9}" srcId="{9ADEF162-76FA-4A3C-8220-3CD2B3D3023E}" destId="{47D5C472-6F40-4426-8E86-BCB2F2BD330B}" srcOrd="0" destOrd="0" parTransId="{036DF210-BB24-491F-9B05-BED9EB97CCEA}" sibTransId="{8F34451D-735F-4913-B0FC-D3B45BB4B61F}"/>
-    <dgm:cxn modelId="{6E4D8FAC-DF79-4656-AACF-B63351959842}" type="presOf" srcId="{C9CB2A3C-AA8A-4C63-ADAF-BB4A990106BF}" destId="{D32B50BC-8F9A-4A06-941D-13004E7B3F17}" srcOrd="0" destOrd="0" presId="urn:microsoft.com/office/officeart/2005/8/layout/radial5"/>
-    <dgm:cxn modelId="{B6EF3246-0AA5-4CF3-8B72-C7979057E203}" type="presOf" srcId="{9ADEF162-76FA-4A3C-8220-3CD2B3D3023E}" destId="{18F2EB1D-555E-470E-B78B-9F32BC1302F0}" srcOrd="0" destOrd="0" presId="urn:microsoft.com/office/officeart/2005/8/layout/radial5"/>
-    <dgm:cxn modelId="{B760B6A1-7F60-4ADC-BA75-CB0BE4EEDB34}" type="presOf" srcId="{5CD5CAC8-AC56-4175-8B02-D9FDE7591724}" destId="{8F93543A-5059-4DE8-A2FC-A99D358C55C0}" srcOrd="0" destOrd="0" presId="urn:microsoft.com/office/officeart/2005/8/layout/radial5"/>
-    <dgm:cxn modelId="{DB098DF9-4AC3-48C4-BC74-3A1AFF298A39}" srcId="{9ADEF162-76FA-4A3C-8220-3CD2B3D3023E}" destId="{597E7FEA-0A6D-4074-A2A0-EDBE84388C7A}" srcOrd="3" destOrd="0" parTransId="{C9CB2A3C-AA8A-4C63-ADAF-BB4A990106BF}" sibTransId="{78A577AF-6145-4A2C-8D9E-BB70A9BDA682}"/>
-    <dgm:cxn modelId="{CD189AED-CAFC-49C6-B708-4C84F713FF42}" type="presOf" srcId="{47D5C472-6F40-4426-8E86-BCB2F2BD330B}" destId="{E0159EA0-1A5D-476D-AD51-865243B2D714}" srcOrd="0" destOrd="0" presId="urn:microsoft.com/office/officeart/2005/8/layout/radial5"/>
-    <dgm:cxn modelId="{B076A0DE-C14B-4C8D-AC1B-44814383AFD4}" type="presOf" srcId="{597E7FEA-0A6D-4074-A2A0-EDBE84388C7A}" destId="{42C28B57-95B0-4561-B729-7C55DC80C4C3}" srcOrd="0" destOrd="0" presId="urn:microsoft.com/office/officeart/2005/8/layout/radial5"/>
-    <dgm:cxn modelId="{B7E99F65-BDD3-4DC8-BA59-474161888B08}" srcId="{9ADEF162-76FA-4A3C-8220-3CD2B3D3023E}" destId="{E65E6258-30CC-439C-9E12-987FB207C0BA}" srcOrd="4" destOrd="0" parTransId="{88E727E9-53A4-4E95-A459-039A49E93B44}" sibTransId="{C1A9E9C8-E1E8-41AC-8025-94E945EC2819}"/>
-    <dgm:cxn modelId="{CFD51472-FE86-49A1-902F-BA2DC34B29F5}" type="presOf" srcId="{0F4EE5F8-CE65-4C01-BA1B-62373453CD4B}" destId="{FFC83820-1F59-4B99-B0E5-5EF505EF981A}" srcOrd="1" destOrd="0" presId="urn:microsoft.com/office/officeart/2005/8/layout/radial5"/>
-    <dgm:cxn modelId="{D491739B-54EC-489C-A1A7-1DBEF4DF8E38}" type="presParOf" srcId="{6A9D9649-AA51-48D6-B507-7AEDD979430C}" destId="{18F2EB1D-555E-470E-B78B-9F32BC1302F0}" srcOrd="0" destOrd="0" presId="urn:microsoft.com/office/officeart/2005/8/layout/radial5"/>
-    <dgm:cxn modelId="{5AB7F0EB-EAF7-40B7-8C32-386285178AF5}" type="presParOf" srcId="{6A9D9649-AA51-48D6-B507-7AEDD979430C}" destId="{D858E594-9B1F-454E-812B-1D569755D339}" srcOrd="1" destOrd="0" presId="urn:microsoft.com/office/officeart/2005/8/layout/radial5"/>
-    <dgm:cxn modelId="{5E5AB94B-B50E-481F-A3CF-F462EDC78FD1}" type="presParOf" srcId="{D858E594-9B1F-454E-812B-1D569755D339}" destId="{2BEFA425-F024-4BD4-B31D-0FB6C45896F7}" srcOrd="0" destOrd="0" presId="urn:microsoft.com/office/officeart/2005/8/layout/radial5"/>
-    <dgm:cxn modelId="{6B7C6AAD-0141-4C9D-8D64-FC6F6ADA9CE6}" type="presParOf" srcId="{6A9D9649-AA51-48D6-B507-7AEDD979430C}" destId="{E0159EA0-1A5D-476D-AD51-865243B2D714}" srcOrd="2" destOrd="0" presId="urn:microsoft.com/office/officeart/2005/8/layout/radial5"/>
-    <dgm:cxn modelId="{7B38FD55-A5EA-45B4-98BA-37944428E1BB}" type="presParOf" srcId="{6A9D9649-AA51-48D6-B507-7AEDD979430C}" destId="{9D95D45C-9B20-4A4E-AD6C-37161FDE50AF}" srcOrd="3" destOrd="0" presId="urn:microsoft.com/office/officeart/2005/8/layout/radial5"/>
-    <dgm:cxn modelId="{5869A8F4-1E5F-4927-8C46-158F4E332014}" type="presParOf" srcId="{9D95D45C-9B20-4A4E-AD6C-37161FDE50AF}" destId="{FFC83820-1F59-4B99-B0E5-5EF505EF981A}" srcOrd="0" destOrd="0" presId="urn:microsoft.com/office/officeart/2005/8/layout/radial5"/>
-    <dgm:cxn modelId="{D5878A1E-2FAF-42E3-9F3C-1A872474F218}" type="presParOf" srcId="{6A9D9649-AA51-48D6-B507-7AEDD979430C}" destId="{892AB89D-9357-4946-A690-9AB770094366}" srcOrd="4" destOrd="0" presId="urn:microsoft.com/office/officeart/2005/8/layout/radial5"/>
-    <dgm:cxn modelId="{FE384528-8958-4B12-819A-58DD6AA6E9F3}" type="presParOf" srcId="{6A9D9649-AA51-48D6-B507-7AEDD979430C}" destId="{8F93543A-5059-4DE8-A2FC-A99D358C55C0}" srcOrd="5" destOrd="0" presId="urn:microsoft.com/office/officeart/2005/8/layout/radial5"/>
-    <dgm:cxn modelId="{99AE9AB9-86FB-455B-A147-63ED78F5DD8F}" type="presParOf" srcId="{8F93543A-5059-4DE8-A2FC-A99D358C55C0}" destId="{63B15D18-84CC-4B8C-A7B8-9D7C87C445EE}" srcOrd="0" destOrd="0" presId="urn:microsoft.com/office/officeart/2005/8/layout/radial5"/>
-    <dgm:cxn modelId="{9E10A2CD-4CA3-4F8B-A375-8245C75B1054}" type="presParOf" srcId="{6A9D9649-AA51-48D6-B507-7AEDD979430C}" destId="{4AE6AAFA-D59A-4F35-A5E8-C6D2EC6BBFF0}" srcOrd="6" destOrd="0" presId="urn:microsoft.com/office/officeart/2005/8/layout/radial5"/>
-    <dgm:cxn modelId="{E86A992F-CF49-422A-9A2B-382F2AB45ACB}" type="presParOf" srcId="{6A9D9649-AA51-48D6-B507-7AEDD979430C}" destId="{D32B50BC-8F9A-4A06-941D-13004E7B3F17}" srcOrd="7" destOrd="0" presId="urn:microsoft.com/office/officeart/2005/8/layout/radial5"/>
-    <dgm:cxn modelId="{80B1D6F9-B73E-4D73-8538-6B96B6369400}" type="presParOf" srcId="{D32B50BC-8F9A-4A06-941D-13004E7B3F17}" destId="{DA7B04D8-8B81-4E5B-97E0-2DFA07EF08B4}" srcOrd="0" destOrd="0" presId="urn:microsoft.com/office/officeart/2005/8/layout/radial5"/>
-    <dgm:cxn modelId="{F758910C-8DB2-4B35-A4D3-97A87E1632BB}" type="presParOf" srcId="{6A9D9649-AA51-48D6-B507-7AEDD979430C}" destId="{42C28B57-95B0-4561-B729-7C55DC80C4C3}" srcOrd="8" destOrd="0" presId="urn:microsoft.com/office/officeart/2005/8/layout/radial5"/>
-    <dgm:cxn modelId="{C540D912-04C5-46FA-B744-D65458050CBC}" type="presParOf" srcId="{6A9D9649-AA51-48D6-B507-7AEDD979430C}" destId="{BED8CFF9-57DF-415B-BFD2-F23237B98D78}" srcOrd="9" destOrd="0" presId="urn:microsoft.com/office/officeart/2005/8/layout/radial5"/>
-    <dgm:cxn modelId="{4AE9697D-2422-48EC-A14A-0247DC23964E}" type="presParOf" srcId="{BED8CFF9-57DF-415B-BFD2-F23237B98D78}" destId="{30E14BBC-7822-4D38-BD74-0C71B2A3B30C}" srcOrd="0" destOrd="0" presId="urn:microsoft.com/office/officeart/2005/8/layout/radial5"/>
-    <dgm:cxn modelId="{F5528EBD-8017-4221-8757-CD6217DFFA5C}" type="presParOf" srcId="{6A9D9649-AA51-48D6-B507-7AEDD979430C}" destId="{AE23CEE4-5E78-4BF2-A4EC-856A2ACE758E}" srcOrd="10" destOrd="0" presId="urn:microsoft.com/office/officeart/2005/8/layout/radial5"/>
+    <dgm:cxn modelId="{921CFC44-4A47-479B-8F0C-6065E48672F0}" type="presOf" srcId="{D9DDF621-EEE4-4358-AA21-46B98A42D9DB}" destId="{6B362DF4-5D96-4089-A9F0-D02ED909FA49}" srcOrd="0" destOrd="0" presId="urn:microsoft.com/office/officeart/2005/8/layout/radial1"/>
+    <dgm:cxn modelId="{40B80260-4F20-4EA7-8EFC-AE7AAD1D88F9}" type="presParOf" srcId="{8BE509CE-6CEB-456E-98AB-071E9798BBE6}" destId="{BDE3E4C7-8057-4579-B356-D9461424C263}" srcOrd="0" destOrd="0" presId="urn:microsoft.com/office/officeart/2005/8/layout/radial1"/>
+    <dgm:cxn modelId="{A12562E2-62D4-4899-998B-1592CB49944E}" type="presParOf" srcId="{8BE509CE-6CEB-456E-98AB-071E9798BBE6}" destId="{DB1550D9-ABF3-4F2B-8E67-E1CEA10516E4}" srcOrd="1" destOrd="0" presId="urn:microsoft.com/office/officeart/2005/8/layout/radial1"/>
+    <dgm:cxn modelId="{64DFAA21-F50A-4B9F-A6F4-4663370C86DF}" type="presParOf" srcId="{DB1550D9-ABF3-4F2B-8E67-E1CEA10516E4}" destId="{A552497F-8CAD-4CCB-B8F8-AB3728F01B66}" srcOrd="0" destOrd="0" presId="urn:microsoft.com/office/officeart/2005/8/layout/radial1"/>
+    <dgm:cxn modelId="{6F34DF68-E6F1-4B81-9E1D-C152781186CA}" type="presParOf" srcId="{8BE509CE-6CEB-456E-98AB-071E9798BBE6}" destId="{1BA1A60B-DB91-42A4-8A23-386BD88E7249}" srcOrd="2" destOrd="0" presId="urn:microsoft.com/office/officeart/2005/8/layout/radial1"/>
+    <dgm:cxn modelId="{D1902FAD-48C4-44BB-A8B2-946D3D8C9254}" type="presParOf" srcId="{8BE509CE-6CEB-456E-98AB-071E9798BBE6}" destId="{5301AC84-2576-4645-A3A5-CD1FD68C0D58}" srcOrd="3" destOrd="0" presId="urn:microsoft.com/office/officeart/2005/8/layout/radial1"/>
+    <dgm:cxn modelId="{92C6E13F-103B-4D4F-91B2-72388AD0908B}" type="presParOf" srcId="{5301AC84-2576-4645-A3A5-CD1FD68C0D58}" destId="{8D407620-7228-4FAB-92D6-F90D099227B7}" srcOrd="0" destOrd="0" presId="urn:microsoft.com/office/officeart/2005/8/layout/radial1"/>
+    <dgm:cxn modelId="{9930AE19-BB2B-4024-80AA-90782EEFF86A}" type="presParOf" srcId="{8BE509CE-6CEB-456E-98AB-071E9798BBE6}" destId="{EE3E81F8-67F5-4149-A111-7181108DA414}" srcOrd="4" destOrd="0" presId="urn:microsoft.com/office/officeart/2005/8/layout/radial1"/>
+    <dgm:cxn modelId="{D86DADC8-C4ED-49FD-9D45-B372DB253C9D}" type="presParOf" srcId="{8BE509CE-6CEB-456E-98AB-071E9798BBE6}" destId="{E257CB2D-EE0D-470B-B5D3-13291BA657E1}" srcOrd="5" destOrd="0" presId="urn:microsoft.com/office/officeart/2005/8/layout/radial1"/>
+    <dgm:cxn modelId="{31B1443A-9D87-4730-AEF1-99B46BC2C666}" type="presParOf" srcId="{E257CB2D-EE0D-470B-B5D3-13291BA657E1}" destId="{A093D335-C5E6-4F79-8A8C-0A4517C436AF}" srcOrd="0" destOrd="0" presId="urn:microsoft.com/office/officeart/2005/8/layout/radial1"/>
+    <dgm:cxn modelId="{AEEB47F5-D0A6-46C6-B10D-F1EC9E1A90FE}" type="presParOf" srcId="{8BE509CE-6CEB-456E-98AB-071E9798BBE6}" destId="{863E9C95-4D35-4D80-8FF7-E34BA1AF170C}" srcOrd="6" destOrd="0" presId="urn:microsoft.com/office/officeart/2005/8/layout/radial1"/>
+    <dgm:cxn modelId="{12488AC7-123E-4635-A0C1-FB6EE21A24E1}" type="presParOf" srcId="{8BE509CE-6CEB-456E-98AB-071E9798BBE6}" destId="{20417B74-94E5-4840-BF37-972B8D6C451B}" srcOrd="7" destOrd="0" presId="urn:microsoft.com/office/officeart/2005/8/layout/radial1"/>
+    <dgm:cxn modelId="{CB883620-2903-4F03-8C1A-59DCDA6BB8CD}" type="presParOf" srcId="{20417B74-94E5-4840-BF37-972B8D6C451B}" destId="{1385A504-9932-43FD-8475-43DF1EC07135}" srcOrd="0" destOrd="0" presId="urn:microsoft.com/office/officeart/2005/8/layout/radial1"/>
+    <dgm:cxn modelId="{F36DC51C-BED2-416B-886E-B95628CEBD28}" type="presParOf" srcId="{8BE509CE-6CEB-456E-98AB-071E9798BBE6}" destId="{6B362DF4-5D96-4089-A9F0-D02ED909FA49}" srcOrd="8" destOrd="0" presId="urn:microsoft.com/office/officeart/2005/8/layout/radial1"/>
   </dgm:cxnLst>
   <dgm:bg/>
   <dgm:whole/>
   <dgm:extLst>
     <a:ext uri="http://schemas.microsoft.com/office/drawing/2008/diagram">
-      <dsp:dataModelExt xmlns="" xmlns:dsp="http://schemas.microsoft.com/office/drawing/2008/diagram" relId="rId6" minVer="http://schemas.openxmlformats.org/drawingml/2006/diagram"/>
+      <dsp:dataModelExt xmlns:dsp="http://schemas.microsoft.com/office/drawing/2008/diagram" xmlns="" relId="rId6" minVer="http://schemas.openxmlformats.org/drawingml/2006/diagram"/>
     </a:ext>
   </dgm:extLst>
 </dgm:dataModel>
@@ -9252,7 +9371,7 @@
   <dgm:whole/>
   <dgm:extLst>
     <a:ext uri="http://schemas.microsoft.com/office/drawing/2008/diagram">
-      <dsp:dataModelExt xmlns="" xmlns:dsp="http://schemas.microsoft.com/office/drawing/2008/diagram" relId="rId6" minVer="http://schemas.openxmlformats.org/drawingml/2006/diagram"/>
+      <dsp:dataModelExt xmlns:dsp="http://schemas.microsoft.com/office/drawing/2008/diagram" xmlns="" relId="rId6" minVer="http://schemas.openxmlformats.org/drawingml/2006/diagram"/>
     </a:ext>
   </dgm:extLst>
 </dgm:dataModel>
@@ -16686,12 +16805,12 @@
 </file>
 
 <file path=ppt/diagrams/layout5.xml><?xml version="1.0" encoding="utf-8"?>
-<dgm:layoutDef xmlns:dgm="http://schemas.openxmlformats.org/drawingml/2006/diagram" xmlns:a="http://schemas.openxmlformats.org/drawingml/2006/main" uniqueId="urn:microsoft.com/office/officeart/2005/8/layout/radial5">
+<dgm:layoutDef xmlns:dgm="http://schemas.openxmlformats.org/drawingml/2006/diagram" xmlns:a="http://schemas.openxmlformats.org/drawingml/2006/main" uniqueId="urn:microsoft.com/office/officeart/2005/8/layout/radial1">
   <dgm:title val=""/>
   <dgm:desc val=""/>
   <dgm:catLst>
-    <dgm:cat type="relationship" pri="23000"/>
-    <dgm:cat type="cycle" pri="11000"/>
+    <dgm:cat type="relationship" pri="22000"/>
+    <dgm:cat type="cycle" pri="10000"/>
   </dgm:catLst>
   <dgm:sampData>
     <dgm:dataModel>
@@ -16768,22 +16887,33 @@
       <dgm:whole/>
     </dgm:dataModel>
   </dgm:clrData>
-  <dgm:layoutNode name="Name0">
+  <dgm:layoutNode name="cycle">
     <dgm:varLst>
       <dgm:chMax val="1"/>
       <dgm:dir/>
       <dgm:animLvl val="ctr"/>
       <dgm:resizeHandles val="exact"/>
     </dgm:varLst>
-    <dgm:choose name="Name1">
-      <dgm:if name="Name2" func="var" arg="dir" op="equ" val="norm">
-        <dgm:alg type="cycle">
-          <dgm:param type="stAng" val="0"/>
-          <dgm:param type="spanAng" val="360"/>
-          <dgm:param type="ctrShpMap" val="fNode"/>
-        </dgm:alg>
+    <dgm:choose name="Name0">
+      <dgm:if name="Name1" func="var" arg="dir" op="equ" val="norm">
+        <dgm:choose name="Name2">
+          <dgm:if name="Name3" axis="ch ch" ptType="node node" st="1 1" cnt="1 0" func="cnt" op="lte" val="1">
+            <dgm:alg type="cycle">
+              <dgm:param type="stAng" val="90"/>
+              <dgm:param type="spanAng" val="360"/>
+              <dgm:param type="ctrShpMap" val="fNode"/>
+            </dgm:alg>
+          </dgm:if>
+          <dgm:else name="Name4">
+            <dgm:alg type="cycle">
+              <dgm:param type="stAng" val="0"/>
+              <dgm:param type="spanAng" val="360"/>
+              <dgm:param type="ctrShpMap" val="fNode"/>
+            </dgm:alg>
+          </dgm:else>
+        </dgm:choose>
       </dgm:if>
-      <dgm:else name="Name3">
+      <dgm:else name="Name5">
         <dgm:alg type="cycle">
           <dgm:param type="stAng" val="0"/>
           <dgm:param type="spanAng" val="-360"/>
@@ -16797,50 +16927,16 @@
     <dgm:presOf/>
     <dgm:constrLst>
       <dgm:constr type="w" for="ch" forName="centerShape" refType="w"/>
-      <dgm:constr type="w" for="ch" forName="parTrans" refType="w" refFor="ch" refForName="centerShape" fact="0.4"/>
-      <dgm:constr type="w" for="ch" forName="node" refType="w" refFor="ch" refForName="centerShape" op="equ" fact="1.25"/>
-      <dgm:constr type="sp" refType="w" refFor="ch" refForName="centerShape" op="equ" fact="0.4"/>
+      <dgm:constr type="w" for="ch" forName="node" refType="w" refFor="ch" refForName="centerShape" op="equ"/>
+      <dgm:constr type="sp" refType="w" refFor="ch" refForName="node" fact="0.3"/>
       <dgm:constr type="sibSp" refType="w" refFor="ch" refForName="node" fact="0.3"/>
       <dgm:constr type="primFontSz" for="ch" forName="centerShape" val="65"/>
       <dgm:constr type="primFontSz" for="des" forName="node" op="equ" val="65"/>
-      <dgm:constr type="primFontSz" for="des" forName="node" refType="primFontSz" refFor="ch" refForName="centerShape" op="lte"/>
-      <dgm:constr type="primFontSz" for="des" forName="connectorText" op="equ" val="55"/>
-      <dgm:constr type="primFontSz" for="des" forName="connectorText" refType="primFontSz" refFor="ch" refForName="centerShape" op="lte" fact="0.8"/>
-      <dgm:constr type="primFontSz" for="des" forName="connectorText" refType="primFontSz" refFor="des" refForName="node" op="lte"/>
+      <dgm:constr type="primFontSz" for="des" forName="connTx" val="55"/>
+      <dgm:constr type="primFontSz" for="des" forName="connTx" refType="primFontSz" refFor="ch" refForName="centerShape" op="lte" fact="0.8"/>
     </dgm:constrLst>
-    <dgm:choose name="Name4">
-      <dgm:if name="Name5" axis="ch ch" ptType="node node" st="1 1" cnt="1 0" func="cnt" op="lte" val="6">
-        <dgm:ruleLst>
-          <dgm:rule type="w" for="ch" forName="node" val="NaN" fact="1" max="NaN"/>
-        </dgm:ruleLst>
-      </dgm:if>
-      <dgm:if name="Name6" axis="ch ch" ptType="node node" st="1 1" cnt="1 0" func="cnt" op="lte" val="8">
-        <dgm:ruleLst>
-          <dgm:rule type="w" for="ch" forName="node" val="NaN" fact="0.9" max="NaN"/>
-        </dgm:ruleLst>
-      </dgm:if>
-      <dgm:if name="Name7" axis="ch ch" ptType="node node" st="1 1" cnt="1 0" func="cnt" op="lte" val="10">
-        <dgm:ruleLst>
-          <dgm:rule type="w" for="ch" forName="node" val="NaN" fact="0.8" max="NaN"/>
-        </dgm:ruleLst>
-      </dgm:if>
-      <dgm:if name="Name8" axis="ch ch" ptType="node node" st="1 1" cnt="1 0" func="cnt" op="lte" val="12">
-        <dgm:ruleLst>
-          <dgm:rule type="w" for="ch" forName="node" val="NaN" fact="0.7" max="NaN"/>
-        </dgm:ruleLst>
-      </dgm:if>
-      <dgm:if name="Name9" axis="ch ch" ptType="node node" st="1 1" cnt="1 0" func="cnt" op="lte" val="14">
-        <dgm:ruleLst>
-          <dgm:rule type="w" for="ch" forName="node" val="NaN" fact="0.6" max="NaN"/>
-        </dgm:ruleLst>
-      </dgm:if>
-      <dgm:else name="Name10">
-        <dgm:ruleLst>
-          <dgm:rule type="w" for="ch" forName="node" val="NaN" fact="0.5" max="NaN"/>
-        </dgm:ruleLst>
-      </dgm:else>
-    </dgm:choose>
-    <dgm:forEach name="Name11" axis="ch" ptType="node" cnt="1">
+    <dgm:ruleLst/>
+    <dgm:forEach name="Name6" axis="ch" ptType="node" cnt="1">
       <dgm:layoutNode name="centerShape" styleLbl="node0">
         <dgm:alg type="tx"/>
         <dgm:shape xmlns:r="http://schemas.openxmlformats.org/officeDocument/2006/relationships" type="ellipse" r:blip="">
@@ -16849,51 +16945,64 @@
         <dgm:presOf axis="self"/>
         <dgm:constrLst>
           <dgm:constr type="h" refType="w"/>
-          <dgm:constr type="tMarg" refType="primFontSz" fact="0.1"/>
-          <dgm:constr type="bMarg" refType="primFontSz" fact="0.1"/>
-          <dgm:constr type="lMarg" refType="primFontSz" fact="0.1"/>
-          <dgm:constr type="rMarg" refType="primFontSz" fact="0.1"/>
+          <dgm:constr type="tMarg" refType="primFontSz" fact="0.05"/>
+          <dgm:constr type="bMarg" refType="primFontSz" fact="0.05"/>
+          <dgm:constr type="lMarg" refType="primFontSz" fact="0.05"/>
+          <dgm:constr type="rMarg" refType="primFontSz" fact="0.05"/>
         </dgm:constrLst>
         <dgm:ruleLst>
           <dgm:rule type="primFontSz" val="5" fact="NaN" max="NaN"/>
         </dgm:ruleLst>
       </dgm:layoutNode>
-      <dgm:forEach name="Name12" axis="ch">
-        <dgm:forEach name="Name13" axis="self" ptType="parTrans">
-          <dgm:layoutNode name="parTrans" styleLbl="sibTrans2D1">
+      <dgm:forEach name="Name7" axis="ch">
+        <dgm:forEach name="Name8" axis="self" ptType="parTrans">
+          <dgm:layoutNode name="Name9">
             <dgm:alg type="conn">
+              <dgm:param type="dim" val="1D"/>
               <dgm:param type="begPts" val="auto"/>
               <dgm:param type="endPts" val="auto"/>
+              <dgm:param type="begSty" val="noArr"/>
+              <dgm:param type="endSty" val="noArr"/>
             </dgm:alg>
             <dgm:shape xmlns:r="http://schemas.openxmlformats.org/officeDocument/2006/relationships" type="conn" r:blip="">
               <dgm:adjLst/>
             </dgm:shape>
             <dgm:presOf axis="self"/>
             <dgm:constrLst>
-              <dgm:constr type="h" refType="w" fact="0.85"/>
+              <dgm:constr type="connDist"/>
+              <dgm:constr type="userA" for="ch" refType="connDist"/>
+              <dgm:constr type="w" val="1"/>
+              <dgm:constr type="h" val="5"/>
+              <dgm:constr type="begPad"/>
+              <dgm:constr type="endPad"/>
             </dgm:constrLst>
             <dgm:ruleLst/>
-            <dgm:layoutNode name="connectorText">
+            <dgm:layoutNode name="connTx">
               <dgm:alg type="tx">
                 <dgm:param type="autoTxRot" val="grav"/>
               </dgm:alg>
-              <dgm:shape xmlns:r="http://schemas.openxmlformats.org/officeDocument/2006/relationships" type="conn" r:blip="" hideGeom="1">
+              <dgm:shape xmlns:r="http://schemas.openxmlformats.org/officeDocument/2006/relationships" type="rect" r:blip="" hideGeom="1">
                 <dgm:adjLst/>
               </dgm:shape>
               <dgm:presOf axis="self"/>
               <dgm:constrLst>
-                <dgm:constr type="lMarg"/>
-                <dgm:constr type="rMarg"/>
+                <dgm:constr type="userA"/>
+                <dgm:constr type="w" refType="userA" fact="0.05"/>
+                <dgm:constr type="h" refType="userA" fact="0.05"/>
+                <dgm:constr type="lMarg" val="1"/>
+                <dgm:constr type="rMarg" val="1"/>
                 <dgm:constr type="tMarg"/>
                 <dgm:constr type="bMarg"/>
               </dgm:constrLst>
               <dgm:ruleLst>
+                <dgm:rule type="w" val="NaN" fact="0.8" max="NaN"/>
+                <dgm:rule type="h" val="NaN" fact="1" max="NaN"/>
                 <dgm:rule type="primFontSz" val="5" fact="NaN" max="NaN"/>
               </dgm:ruleLst>
             </dgm:layoutNode>
           </dgm:layoutNode>
         </dgm:forEach>
-        <dgm:forEach name="Name14" axis="self" ptType="node">
+        <dgm:forEach name="Name10" axis="self" ptType="node">
           <dgm:layoutNode name="node" styleLbl="node1">
             <dgm:varLst>
               <dgm:bulletEnabled val="1"/>
@@ -16907,13 +17016,12 @@
             <dgm:presOf axis="desOrSelf" ptType="node"/>
             <dgm:constrLst>
               <dgm:constr type="h" refType="w"/>
-              <dgm:constr type="tMarg" refType="primFontSz" fact="0.1"/>
-              <dgm:constr type="bMarg" refType="primFontSz" fact="0.1"/>
-              <dgm:constr type="lMarg" refType="primFontSz" fact="0.1"/>
-              <dgm:constr type="rMarg" refType="primFontSz" fact="0.1"/>
+              <dgm:constr type="tMarg" refType="primFontSz" fact="0.05"/>
+              <dgm:constr type="bMarg" refType="primFontSz" fact="0.05"/>
+              <dgm:constr type="lMarg" refType="primFontSz" fact="0.05"/>
+              <dgm:constr type="rMarg" refType="primFontSz" fact="0.05"/>
             </dgm:constrLst>
             <dgm:ruleLst>
-              <dgm:rule type="w" val="INF" fact="NaN" max="NaN"/>
               <dgm:rule type="primFontSz" val="5" fact="NaN" max="NaN"/>
             </dgm:ruleLst>
           </dgm:layoutNode>
@@ -21650,11 +21758,11 @@
 </file>
 
 <file path=ppt/diagrams/quickStyle5.xml><?xml version="1.0" encoding="utf-8"?>
-<dgm:styleDef xmlns:dgm="http://schemas.openxmlformats.org/drawingml/2006/diagram" xmlns:a="http://schemas.openxmlformats.org/drawingml/2006/main" uniqueId="urn:microsoft.com/office/officeart/2005/8/quickstyle/simple1">
+<dgm:styleDef xmlns:dgm="http://schemas.openxmlformats.org/drawingml/2006/diagram" xmlns:a="http://schemas.openxmlformats.org/drawingml/2006/main" uniqueId="urn:microsoft.com/office/officeart/2005/8/quickstyle/3d1">
   <dgm:title val=""/>
   <dgm:desc val=""/>
   <dgm:catLst>
-    <dgm:cat type="simple" pri="10100"/>
+    <dgm:cat type="3D" pri="11100"/>
   </dgm:catLst>
   <dgm:scene3d>
     <a:camera prst="orthographicFront"/>
@@ -21663,18 +21771,21 @@
   <dgm:styleLbl name="node0">
     <dgm:scene3d>
       <a:camera prst="orthographicFront"/>
-      <a:lightRig rig="threePt" dir="t"/>
-    </dgm:scene3d>
-    <dgm:sp3d/>
-    <dgm:txPr/>
-    <dgm:style>
-      <a:lnRef idx="2">
-        <a:scrgbClr r="0" g="0" b="0"/>
-      </a:lnRef>
-      <a:fillRef idx="1">
-        <a:scrgbClr r="0" g="0" b="0"/>
-      </a:fillRef>
-      <a:effectRef idx="0">
+      <a:lightRig rig="flat" dir="t"/>
+    </dgm:scene3d>
+    <dgm:sp3d prstMaterial="plastic">
+      <a:bevelT w="120900" h="88900"/>
+      <a:bevelB w="88900" h="31750" prst="angle"/>
+    </dgm:sp3d>
+    <dgm:txPr/>
+    <dgm:style>
+      <a:lnRef idx="0">
+        <a:scrgbClr r="0" g="0" b="0"/>
+      </a:lnRef>
+      <a:fillRef idx="3">
+        <a:scrgbClr r="0" g="0" b="0"/>
+      </a:fillRef>
+      <a:effectRef idx="2">
         <a:scrgbClr r="0" g="0" b="0"/>
       </a:effectRef>
       <a:fontRef idx="minor">
@@ -21685,18 +21796,21 @@
   <dgm:styleLbl name="lnNode1">
     <dgm:scene3d>
       <a:camera prst="orthographicFront"/>
-      <a:lightRig rig="threePt" dir="t"/>
-    </dgm:scene3d>
-    <dgm:sp3d/>
-    <dgm:txPr/>
-    <dgm:style>
-      <a:lnRef idx="2">
-        <a:scrgbClr r="0" g="0" b="0"/>
-      </a:lnRef>
-      <a:fillRef idx="1">
-        <a:scrgbClr r="0" g="0" b="0"/>
-      </a:fillRef>
-      <a:effectRef idx="0">
+      <a:lightRig rig="flat" dir="t"/>
+    </dgm:scene3d>
+    <dgm:sp3d prstMaterial="plastic">
+      <a:bevelT w="120900" h="88900"/>
+      <a:bevelB w="88900" h="31750" prst="angle"/>
+    </dgm:sp3d>
+    <dgm:txPr/>
+    <dgm:style>
+      <a:lnRef idx="0">
+        <a:scrgbClr r="0" g="0" b="0"/>
+      </a:lnRef>
+      <a:fillRef idx="3">
+        <a:scrgbClr r="0" g="0" b="0"/>
+      </a:fillRef>
+      <a:effectRef idx="1">
         <a:scrgbClr r="0" g="0" b="0"/>
       </a:effectRef>
       <a:fontRef idx="minor">
@@ -21707,18 +21821,21 @@
   <dgm:styleLbl name="vennNode1">
     <dgm:scene3d>
       <a:camera prst="orthographicFront"/>
-      <a:lightRig rig="threePt" dir="t"/>
-    </dgm:scene3d>
-    <dgm:sp3d/>
-    <dgm:txPr/>
-    <dgm:style>
-      <a:lnRef idx="2">
+      <a:lightRig rig="flat" dir="t"/>
+    </dgm:scene3d>
+    <dgm:sp3d prstMaterial="plastic">
+      <a:bevelT w="120900" h="88900"/>
+      <a:bevelB w="88900" h="31750" prst="angle"/>
+    </dgm:sp3d>
+    <dgm:txPr/>
+    <dgm:style>
+      <a:lnRef idx="0">
         <a:scrgbClr r="0" g="0" b="0"/>
       </a:lnRef>
       <a:fillRef idx="1">
         <a:scrgbClr r="0" g="0" b="0"/>
       </a:fillRef>
-      <a:effectRef idx="0">
+      <a:effectRef idx="1">
         <a:scrgbClr r="0" g="0" b="0"/>
       </a:effectRef>
       <a:fontRef idx="minor">
@@ -21729,18 +21846,21 @@
   <dgm:styleLbl name="alignNode1">
     <dgm:scene3d>
       <a:camera prst="orthographicFront"/>
-      <a:lightRig rig="threePt" dir="t"/>
-    </dgm:scene3d>
-    <dgm:sp3d/>
-    <dgm:txPr/>
-    <dgm:style>
-      <a:lnRef idx="2">
-        <a:scrgbClr r="0" g="0" b="0"/>
-      </a:lnRef>
-      <a:fillRef idx="1">
-        <a:scrgbClr r="0" g="0" b="0"/>
-      </a:fillRef>
-      <a:effectRef idx="0">
+      <a:lightRig rig="flat" dir="t"/>
+    </dgm:scene3d>
+    <dgm:sp3d prstMaterial="plastic">
+      <a:bevelT w="120900" h="88900"/>
+      <a:bevelB w="88900" h="31750" prst="angle"/>
+    </dgm:sp3d>
+    <dgm:txPr/>
+    <dgm:style>
+      <a:lnRef idx="1">
+        <a:scrgbClr r="0" g="0" b="0"/>
+      </a:lnRef>
+      <a:fillRef idx="3">
+        <a:scrgbClr r="0" g="0" b="0"/>
+      </a:fillRef>
+      <a:effectRef idx="2">
         <a:scrgbClr r="0" g="0" b="0"/>
       </a:effectRef>
       <a:fontRef idx="minor">
@@ -21751,18 +21871,21 @@
   <dgm:styleLbl name="node1">
     <dgm:scene3d>
       <a:camera prst="orthographicFront"/>
-      <a:lightRig rig="threePt" dir="t"/>
-    </dgm:scene3d>
-    <dgm:sp3d/>
-    <dgm:txPr/>
-    <dgm:style>
-      <a:lnRef idx="2">
-        <a:scrgbClr r="0" g="0" b="0"/>
-      </a:lnRef>
-      <a:fillRef idx="1">
-        <a:scrgbClr r="0" g="0" b="0"/>
-      </a:fillRef>
-      <a:effectRef idx="0">
+      <a:lightRig rig="flat" dir="t"/>
+    </dgm:scene3d>
+    <dgm:sp3d prstMaterial="plastic">
+      <a:bevelT w="120900" h="88900"/>
+      <a:bevelB w="88900" h="31750" prst="angle"/>
+    </dgm:sp3d>
+    <dgm:txPr/>
+    <dgm:style>
+      <a:lnRef idx="0">
+        <a:scrgbClr r="0" g="0" b="0"/>
+      </a:lnRef>
+      <a:fillRef idx="3">
+        <a:scrgbClr r="0" g="0" b="0"/>
+      </a:fillRef>
+      <a:effectRef idx="2">
         <a:scrgbClr r="0" g="0" b="0"/>
       </a:effectRef>
       <a:fontRef idx="minor">
@@ -21773,18 +21896,21 @@
   <dgm:styleLbl name="node2">
     <dgm:scene3d>
       <a:camera prst="orthographicFront"/>
-      <a:lightRig rig="threePt" dir="t"/>
-    </dgm:scene3d>
-    <dgm:sp3d/>
-    <dgm:txPr/>
-    <dgm:style>
-      <a:lnRef idx="2">
-        <a:scrgbClr r="0" g="0" b="0"/>
-      </a:lnRef>
-      <a:fillRef idx="1">
-        <a:scrgbClr r="0" g="0" b="0"/>
-      </a:fillRef>
-      <a:effectRef idx="0">
+      <a:lightRig rig="flat" dir="t"/>
+    </dgm:scene3d>
+    <dgm:sp3d prstMaterial="plastic">
+      <a:bevelT w="120900" h="88900"/>
+      <a:bevelB w="88900" h="31750" prst="angle"/>
+    </dgm:sp3d>
+    <dgm:txPr/>
+    <dgm:style>
+      <a:lnRef idx="0">
+        <a:scrgbClr r="0" g="0" b="0"/>
+      </a:lnRef>
+      <a:fillRef idx="3">
+        <a:scrgbClr r="0" g="0" b="0"/>
+      </a:fillRef>
+      <a:effectRef idx="1">
         <a:scrgbClr r="0" g="0" b="0"/>
       </a:effectRef>
       <a:fontRef idx="minor">
@@ -21795,18 +21921,21 @@
   <dgm:styleLbl name="node3">
     <dgm:scene3d>
       <a:camera prst="orthographicFront"/>
-      <a:lightRig rig="threePt" dir="t"/>
-    </dgm:scene3d>
-    <dgm:sp3d/>
-    <dgm:txPr/>
-    <dgm:style>
-      <a:lnRef idx="2">
-        <a:scrgbClr r="0" g="0" b="0"/>
-      </a:lnRef>
-      <a:fillRef idx="1">
-        <a:scrgbClr r="0" g="0" b="0"/>
-      </a:fillRef>
-      <a:effectRef idx="0">
+      <a:lightRig rig="flat" dir="t"/>
+    </dgm:scene3d>
+    <dgm:sp3d prstMaterial="plastic">
+      <a:bevelT w="120900" h="88900"/>
+      <a:bevelB w="88900" h="31750" prst="angle"/>
+    </dgm:sp3d>
+    <dgm:txPr/>
+    <dgm:style>
+      <a:lnRef idx="0">
+        <a:scrgbClr r="0" g="0" b="0"/>
+      </a:lnRef>
+      <a:fillRef idx="3">
+        <a:scrgbClr r="0" g="0" b="0"/>
+      </a:fillRef>
+      <a:effectRef idx="1">
         <a:scrgbClr r="0" g="0" b="0"/>
       </a:effectRef>
       <a:fontRef idx="minor">
@@ -21817,18 +21946,21 @@
   <dgm:styleLbl name="node4">
     <dgm:scene3d>
       <a:camera prst="orthographicFront"/>
-      <a:lightRig rig="threePt" dir="t"/>
-    </dgm:scene3d>
-    <dgm:sp3d/>
-    <dgm:txPr/>
-    <dgm:style>
-      <a:lnRef idx="2">
-        <a:scrgbClr r="0" g="0" b="0"/>
-      </a:lnRef>
-      <a:fillRef idx="1">
-        <a:scrgbClr r="0" g="0" b="0"/>
-      </a:fillRef>
-      <a:effectRef idx="0">
+      <a:lightRig rig="flat" dir="t"/>
+    </dgm:scene3d>
+    <dgm:sp3d prstMaterial="plastic">
+      <a:bevelT w="120900" h="88900"/>
+      <a:bevelB w="88900" h="31750" prst="angle"/>
+    </dgm:sp3d>
+    <dgm:txPr/>
+    <dgm:style>
+      <a:lnRef idx="0">
+        <a:scrgbClr r="0" g="0" b="0"/>
+      </a:lnRef>
+      <a:fillRef idx="3">
+        <a:scrgbClr r="0" g="0" b="0"/>
+      </a:fillRef>
+      <a:effectRef idx="1">
         <a:scrgbClr r="0" g="0" b="0"/>
       </a:effectRef>
       <a:fontRef idx="minor">
@@ -21839,18 +21971,21 @@
   <dgm:styleLbl name="fgImgPlace1">
     <dgm:scene3d>
       <a:camera prst="orthographicFront"/>
-      <a:lightRig rig="threePt" dir="t"/>
-    </dgm:scene3d>
-    <dgm:sp3d/>
-    <dgm:txPr/>
-    <dgm:style>
-      <a:lnRef idx="2">
-        <a:scrgbClr r="0" g="0" b="0"/>
-      </a:lnRef>
-      <a:fillRef idx="1">
-        <a:scrgbClr r="0" g="0" b="0"/>
-      </a:fillRef>
-      <a:effectRef idx="0">
+      <a:lightRig rig="flat" dir="t"/>
+    </dgm:scene3d>
+    <dgm:sp3d z="127000" prstMaterial="plastic">
+      <a:bevelT w="88900" h="88900"/>
+      <a:bevelB w="88900" h="31750" prst="angle"/>
+    </dgm:sp3d>
+    <dgm:txPr/>
+    <dgm:style>
+      <a:lnRef idx="0">
+        <a:scrgbClr r="0" g="0" b="0"/>
+      </a:lnRef>
+      <a:fillRef idx="3">
+        <a:scrgbClr r="0" g="0" b="0"/>
+      </a:fillRef>
+      <a:effectRef idx="2">
         <a:scrgbClr r="0" g="0" b="0"/>
       </a:effectRef>
       <a:fontRef idx="minor"/>
@@ -21859,18 +21994,21 @@
   <dgm:styleLbl name="alignImgPlace1">
     <dgm:scene3d>
       <a:camera prst="orthographicFront"/>
-      <a:lightRig rig="threePt" dir="t"/>
-    </dgm:scene3d>
-    <dgm:sp3d/>
-    <dgm:txPr/>
-    <dgm:style>
-      <a:lnRef idx="2">
-        <a:scrgbClr r="0" g="0" b="0"/>
-      </a:lnRef>
-      <a:fillRef idx="1">
-        <a:scrgbClr r="0" g="0" b="0"/>
-      </a:fillRef>
-      <a:effectRef idx="0">
+      <a:lightRig rig="flat" dir="t"/>
+    </dgm:scene3d>
+    <dgm:sp3d prstMaterial="plastic">
+      <a:bevelT w="88900" h="88900"/>
+      <a:bevelB w="88900" h="31750" prst="angle"/>
+    </dgm:sp3d>
+    <dgm:txPr/>
+    <dgm:style>
+      <a:lnRef idx="0">
+        <a:scrgbClr r="0" g="0" b="0"/>
+      </a:lnRef>
+      <a:fillRef idx="3">
+        <a:scrgbClr r="0" g="0" b="0"/>
+      </a:fillRef>
+      <a:effectRef idx="2">
         <a:scrgbClr r="0" g="0" b="0"/>
       </a:effectRef>
       <a:fontRef idx="minor"/>
@@ -21879,18 +22017,21 @@
   <dgm:styleLbl name="bgImgPlace1">
     <dgm:scene3d>
       <a:camera prst="orthographicFront"/>
-      <a:lightRig rig="threePt" dir="t"/>
-    </dgm:scene3d>
-    <dgm:sp3d/>
-    <dgm:txPr/>
-    <dgm:style>
-      <a:lnRef idx="2">
-        <a:scrgbClr r="0" g="0" b="0"/>
-      </a:lnRef>
-      <a:fillRef idx="1">
-        <a:scrgbClr r="0" g="0" b="0"/>
-      </a:fillRef>
-      <a:effectRef idx="0">
+      <a:lightRig rig="flat" dir="t"/>
+    </dgm:scene3d>
+    <dgm:sp3d z="-190500" prstMaterial="plastic">
+      <a:bevelT w="88900" h="88900"/>
+      <a:bevelB w="88900" h="31750" prst="angle"/>
+    </dgm:sp3d>
+    <dgm:txPr/>
+    <dgm:style>
+      <a:lnRef idx="0">
+        <a:scrgbClr r="0" g="0" b="0"/>
+      </a:lnRef>
+      <a:fillRef idx="3">
+        <a:scrgbClr r="0" g="0" b="0"/>
+      </a:fillRef>
+      <a:effectRef idx="2">
         <a:scrgbClr r="0" g="0" b="0"/>
       </a:effectRef>
       <a:fontRef idx="minor"/>
@@ -21899,18 +22040,21 @@
   <dgm:styleLbl name="sibTrans2D1">
     <dgm:scene3d>
       <a:camera prst="orthographicFront"/>
-      <a:lightRig rig="threePt" dir="t"/>
-    </dgm:scene3d>
-    <dgm:sp3d/>
+      <a:lightRig rig="flat" dir="t"/>
+    </dgm:scene3d>
+    <dgm:sp3d z="-80000" prstMaterial="plastic">
+      <a:bevelT w="50800" h="50800"/>
+      <a:bevelB w="25400" h="25400" prst="angle"/>
+    </dgm:sp3d>
     <dgm:txPr/>
     <dgm:style>
       <a:lnRef idx="0">
         <a:scrgbClr r="0" g="0" b="0"/>
       </a:lnRef>
-      <a:fillRef idx="1">
-        <a:scrgbClr r="0" g="0" b="0"/>
-      </a:fillRef>
-      <a:effectRef idx="0">
+      <a:fillRef idx="3">
+        <a:scrgbClr r="0" g="0" b="0"/>
+      </a:fillRef>
+      <a:effectRef idx="2">
         <a:scrgbClr r="0" g="0" b="0"/>
       </a:effectRef>
       <a:fontRef idx="minor">
@@ -21921,18 +22065,21 @@
   <dgm:styleLbl name="fgSibTrans2D1">
     <dgm:scene3d>
       <a:camera prst="orthographicFront"/>
-      <a:lightRig rig="threePt" dir="t"/>
-    </dgm:scene3d>
-    <dgm:sp3d/>
+      <a:lightRig rig="flat" dir="t"/>
+    </dgm:scene3d>
+    <dgm:sp3d z="127000" prstMaterial="plastic">
+      <a:bevelT w="50800" h="50800"/>
+      <a:bevelB w="25400" h="25400" prst="angle"/>
+    </dgm:sp3d>
     <dgm:txPr/>
     <dgm:style>
       <a:lnRef idx="0">
         <a:scrgbClr r="0" g="0" b="0"/>
       </a:lnRef>
-      <a:fillRef idx="1">
-        <a:scrgbClr r="0" g="0" b="0"/>
-      </a:fillRef>
-      <a:effectRef idx="0">
+      <a:fillRef idx="3">
+        <a:scrgbClr r="0" g="0" b="0"/>
+      </a:fillRef>
+      <a:effectRef idx="2">
         <a:scrgbClr r="0" g="0" b="0"/>
       </a:effectRef>
       <a:fontRef idx="minor">
@@ -21943,18 +22090,21 @@
   <dgm:styleLbl name="bgSibTrans2D1">
     <dgm:scene3d>
       <a:camera prst="orthographicFront"/>
-      <a:lightRig rig="threePt" dir="t"/>
-    </dgm:scene3d>
-    <dgm:sp3d/>
+      <a:lightRig rig="flat" dir="t"/>
+    </dgm:scene3d>
+    <dgm:sp3d z="-190500" prstMaterial="plastic">
+      <a:bevelT w="50800" h="50800"/>
+      <a:bevelB w="25400" h="25400" prst="angle"/>
+    </dgm:sp3d>
     <dgm:txPr/>
     <dgm:style>
       <a:lnRef idx="0">
         <a:scrgbClr r="0" g="0" b="0"/>
       </a:lnRef>
-      <a:fillRef idx="1">
-        <a:scrgbClr r="0" g="0" b="0"/>
-      </a:fillRef>
-      <a:effectRef idx="0">
+      <a:fillRef idx="3">
+        <a:scrgbClr r="0" g="0" b="0"/>
+      </a:fillRef>
+      <a:effectRef idx="2">
         <a:scrgbClr r="0" g="0" b="0"/>
       </a:effectRef>
       <a:fontRef idx="minor">
@@ -21965,15 +22115,35 @@
   <dgm:styleLbl name="sibTrans1D1">
     <dgm:scene3d>
       <a:camera prst="orthographicFront"/>
+      <a:lightRig rig="flat" dir="t"/>
+    </dgm:scene3d>
+    <dgm:sp3d z="-40000" prstMaterial="matte"/>
+    <dgm:txPr/>
+    <dgm:style>
+      <a:lnRef idx="1">
+        <a:scrgbClr r="0" g="0" b="0"/>
+      </a:lnRef>
+      <a:fillRef idx="0">
+        <a:scrgbClr r="0" g="0" b="0"/>
+      </a:fillRef>
+      <a:effectRef idx="0">
+        <a:scrgbClr r="0" g="0" b="0"/>
+      </a:effectRef>
+      <a:fontRef idx="minor"/>
+    </dgm:style>
+  </dgm:styleLbl>
+  <dgm:styleLbl name="callout">
+    <dgm:scene3d>
+      <a:camera prst="orthographicFront"/>
       <a:lightRig rig="threePt" dir="t"/>
     </dgm:scene3d>
-    <dgm:sp3d/>
-    <dgm:txPr/>
-    <dgm:style>
-      <a:lnRef idx="1">
-        <a:scrgbClr r="0" g="0" b="0"/>
-      </a:lnRef>
-      <a:fillRef idx="0">
+    <dgm:sp3d z="127000" prstMaterial="matte"/>
+    <dgm:txPr/>
+    <dgm:style>
+      <a:lnRef idx="2">
+        <a:scrgbClr r="0" g="0" b="0"/>
+      </a:lnRef>
+      <a:fillRef idx="1">
         <a:scrgbClr r="0" g="0" b="0"/>
       </a:fillRef>
       <a:effectRef idx="0">
@@ -21982,41 +22152,24 @@
       <a:fontRef idx="minor"/>
     </dgm:style>
   </dgm:styleLbl>
-  <dgm:styleLbl name="callout">
-    <dgm:scene3d>
-      <a:camera prst="orthographicFront"/>
-      <a:lightRig rig="threePt" dir="t"/>
-    </dgm:scene3d>
-    <dgm:sp3d/>
-    <dgm:txPr/>
-    <dgm:style>
-      <a:lnRef idx="2">
-        <a:scrgbClr r="0" g="0" b="0"/>
-      </a:lnRef>
-      <a:fillRef idx="1">
-        <a:scrgbClr r="0" g="0" b="0"/>
-      </a:fillRef>
-      <a:effectRef idx="0">
-        <a:scrgbClr r="0" g="0" b="0"/>
-      </a:effectRef>
-      <a:fontRef idx="minor"/>
-    </dgm:style>
-  </dgm:styleLbl>
   <dgm:styleLbl name="asst0">
     <dgm:scene3d>
       <a:camera prst="orthographicFront"/>
-      <a:lightRig rig="threePt" dir="t"/>
-    </dgm:scene3d>
-    <dgm:sp3d/>
-    <dgm:txPr/>
-    <dgm:style>
-      <a:lnRef idx="2">
-        <a:scrgbClr r="0" g="0" b="0"/>
-      </a:lnRef>
-      <a:fillRef idx="1">
-        <a:scrgbClr r="0" g="0" b="0"/>
-      </a:fillRef>
-      <a:effectRef idx="0">
+      <a:lightRig rig="flat" dir="t"/>
+    </dgm:scene3d>
+    <dgm:sp3d prstMaterial="plastic">
+      <a:bevelT w="120900" h="88900"/>
+      <a:bevelB w="88900" h="31750" prst="angle"/>
+    </dgm:sp3d>
+    <dgm:txPr/>
+    <dgm:style>
+      <a:lnRef idx="0">
+        <a:scrgbClr r="0" g="0" b="0"/>
+      </a:lnRef>
+      <a:fillRef idx="3">
+        <a:scrgbClr r="0" g="0" b="0"/>
+      </a:fillRef>
+      <a:effectRef idx="1">
         <a:scrgbClr r="0" g="0" b="0"/>
       </a:effectRef>
       <a:fontRef idx="minor">
@@ -22027,18 +22180,21 @@
   <dgm:styleLbl name="asst1">
     <dgm:scene3d>
       <a:camera prst="orthographicFront"/>
-      <a:lightRig rig="threePt" dir="t"/>
-    </dgm:scene3d>
-    <dgm:sp3d/>
-    <dgm:txPr/>
-    <dgm:style>
-      <a:lnRef idx="2">
-        <a:scrgbClr r="0" g="0" b="0"/>
-      </a:lnRef>
-      <a:fillRef idx="1">
-        <a:scrgbClr r="0" g="0" b="0"/>
-      </a:fillRef>
-      <a:effectRef idx="0">
+      <a:lightRig rig="flat" dir="t"/>
+    </dgm:scene3d>
+    <dgm:sp3d prstMaterial="plastic">
+      <a:bevelT w="120900" h="88900"/>
+      <a:bevelB w="88900" h="31750" prst="angle"/>
+    </dgm:sp3d>
+    <dgm:txPr/>
+    <dgm:style>
+      <a:lnRef idx="0">
+        <a:scrgbClr r="0" g="0" b="0"/>
+      </a:lnRef>
+      <a:fillRef idx="3">
+        <a:scrgbClr r="0" g="0" b="0"/>
+      </a:fillRef>
+      <a:effectRef idx="1">
         <a:scrgbClr r="0" g="0" b="0"/>
       </a:effectRef>
       <a:fontRef idx="minor">
@@ -22049,18 +22205,21 @@
   <dgm:styleLbl name="asst2">
     <dgm:scene3d>
       <a:camera prst="orthographicFront"/>
-      <a:lightRig rig="threePt" dir="t"/>
-    </dgm:scene3d>
-    <dgm:sp3d/>
-    <dgm:txPr/>
-    <dgm:style>
-      <a:lnRef idx="2">
-        <a:scrgbClr r="0" g="0" b="0"/>
-      </a:lnRef>
-      <a:fillRef idx="1">
-        <a:scrgbClr r="0" g="0" b="0"/>
-      </a:fillRef>
-      <a:effectRef idx="0">
+      <a:lightRig rig="flat" dir="t"/>
+    </dgm:scene3d>
+    <dgm:sp3d prstMaterial="plastic">
+      <a:bevelT w="120900" h="88900"/>
+      <a:bevelB w="88900" h="31750" prst="angle"/>
+    </dgm:sp3d>
+    <dgm:txPr/>
+    <dgm:style>
+      <a:lnRef idx="0">
+        <a:scrgbClr r="0" g="0" b="0"/>
+      </a:lnRef>
+      <a:fillRef idx="3">
+        <a:scrgbClr r="0" g="0" b="0"/>
+      </a:fillRef>
+      <a:effectRef idx="1">
         <a:scrgbClr r="0" g="0" b="0"/>
       </a:effectRef>
       <a:fontRef idx="minor">
@@ -22071,18 +22230,21 @@
   <dgm:styleLbl name="asst3">
     <dgm:scene3d>
       <a:camera prst="orthographicFront"/>
-      <a:lightRig rig="threePt" dir="t"/>
-    </dgm:scene3d>
-    <dgm:sp3d/>
-    <dgm:txPr/>
-    <dgm:style>
-      <a:lnRef idx="2">
-        <a:scrgbClr r="0" g="0" b="0"/>
-      </a:lnRef>
-      <a:fillRef idx="1">
-        <a:scrgbClr r="0" g="0" b="0"/>
-      </a:fillRef>
-      <a:effectRef idx="0">
+      <a:lightRig rig="flat" dir="t"/>
+    </dgm:scene3d>
+    <dgm:sp3d prstMaterial="plastic">
+      <a:bevelT w="120900" h="88900"/>
+      <a:bevelB w="88900" h="31750" prst="angle"/>
+    </dgm:sp3d>
+    <dgm:txPr/>
+    <dgm:style>
+      <a:lnRef idx="0">
+        <a:scrgbClr r="0" g="0" b="0"/>
+      </a:lnRef>
+      <a:fillRef idx="3">
+        <a:scrgbClr r="0" g="0" b="0"/>
+      </a:fillRef>
+      <a:effectRef idx="1">
         <a:scrgbClr r="0" g="0" b="0"/>
       </a:effectRef>
       <a:fontRef idx="minor">
@@ -22090,21 +22252,24 @@
       </a:fontRef>
     </dgm:style>
   </dgm:styleLbl>
-  <dgm:styleLbl name="asst4">
-    <dgm:scene3d>
-      <a:camera prst="orthographicFront"/>
-      <a:lightRig rig="threePt" dir="t"/>
-    </dgm:scene3d>
-    <dgm:sp3d/>
-    <dgm:txPr/>
-    <dgm:style>
-      <a:lnRef idx="2">
-        <a:scrgbClr r="0" g="0" b="0"/>
-      </a:lnRef>
-      <a:fillRef idx="1">
-        <a:scrgbClr r="0" g="0" b="0"/>
-      </a:fillRef>
-      <a:effectRef idx="0">
+  <dgm:styleLbl name="parChTrans2D1">
+    <dgm:scene3d>
+      <a:camera prst="orthographicFront"/>
+      <a:lightRig rig="flat" dir="t"/>
+    </dgm:scene3d>
+    <dgm:sp3d z="-100000" prstMaterial="plastic">
+      <a:bevelT w="120900" h="88900"/>
+      <a:bevelB w="88900" h="31750" prst="angle"/>
+    </dgm:sp3d>
+    <dgm:txPr/>
+    <dgm:style>
+      <a:lnRef idx="0">
+        <a:scrgbClr r="0" g="0" b="0"/>
+      </a:lnRef>
+      <a:fillRef idx="3">
+        <a:scrgbClr r="0" g="0" b="0"/>
+      </a:fillRef>
+      <a:effectRef idx="1">
         <a:scrgbClr r="0" g="0" b="0"/>
       </a:effectRef>
       <a:fontRef idx="minor">
@@ -22112,21 +22277,24 @@
       </a:fontRef>
     </dgm:style>
   </dgm:styleLbl>
-  <dgm:styleLbl name="parChTrans2D1">
-    <dgm:scene3d>
-      <a:camera prst="orthographicFront"/>
-      <a:lightRig rig="threePt" dir="t"/>
-    </dgm:scene3d>
-    <dgm:sp3d/>
-    <dgm:txPr/>
-    <dgm:style>
-      <a:lnRef idx="2">
-        <a:scrgbClr r="0" g="0" b="0"/>
-      </a:lnRef>
-      <a:fillRef idx="1">
-        <a:scrgbClr r="0" g="0" b="0"/>
-      </a:fillRef>
-      <a:effectRef idx="0">
+  <dgm:styleLbl name="parChTrans2D2">
+    <dgm:scene3d>
+      <a:camera prst="orthographicFront"/>
+      <a:lightRig rig="flat" dir="t"/>
+    </dgm:scene3d>
+    <dgm:sp3d z="-60000" prstMaterial="plastic">
+      <a:bevelT w="120900" h="88900"/>
+      <a:bevelB w="88900" h="31750" prst="angle"/>
+    </dgm:sp3d>
+    <dgm:txPr/>
+    <dgm:style>
+      <a:lnRef idx="0">
+        <a:scrgbClr r="0" g="0" b="0"/>
+      </a:lnRef>
+      <a:fillRef idx="3">
+        <a:scrgbClr r="0" g="0" b="0"/>
+      </a:fillRef>
+      <a:effectRef idx="1">
         <a:scrgbClr r="0" g="0" b="0"/>
       </a:effectRef>
       <a:fontRef idx="minor">
@@ -22134,21 +22302,24 @@
       </a:fontRef>
     </dgm:style>
   </dgm:styleLbl>
-  <dgm:styleLbl name="parChTrans2D2">
-    <dgm:scene3d>
-      <a:camera prst="orthographicFront"/>
-      <a:lightRig rig="threePt" dir="t"/>
-    </dgm:scene3d>
-    <dgm:sp3d/>
-    <dgm:txPr/>
-    <dgm:style>
-      <a:lnRef idx="2">
-        <a:scrgbClr r="0" g="0" b="0"/>
-      </a:lnRef>
-      <a:fillRef idx="1">
-        <a:scrgbClr r="0" g="0" b="0"/>
-      </a:fillRef>
-      <a:effectRef idx="0">
+  <dgm:styleLbl name="parChTrans2D3">
+    <dgm:scene3d>
+      <a:camera prst="orthographicFront"/>
+      <a:lightRig rig="flat" dir="t"/>
+    </dgm:scene3d>
+    <dgm:sp3d z="-60000" prstMaterial="plastic">
+      <a:bevelT w="120900" h="88900"/>
+      <a:bevelB w="88900" h="31750" prst="angle"/>
+    </dgm:sp3d>
+    <dgm:txPr/>
+    <dgm:style>
+      <a:lnRef idx="0">
+        <a:scrgbClr r="0" g="0" b="0"/>
+      </a:lnRef>
+      <a:fillRef idx="3">
+        <a:scrgbClr r="0" g="0" b="0"/>
+      </a:fillRef>
+      <a:effectRef idx="1">
         <a:scrgbClr r="0" g="0" b="0"/>
       </a:effectRef>
       <a:fontRef idx="minor">
@@ -22156,21 +22327,24 @@
       </a:fontRef>
     </dgm:style>
   </dgm:styleLbl>
-  <dgm:styleLbl name="parChTrans2D3">
-    <dgm:scene3d>
-      <a:camera prst="orthographicFront"/>
-      <a:lightRig rig="threePt" dir="t"/>
-    </dgm:scene3d>
-    <dgm:sp3d/>
-    <dgm:txPr/>
-    <dgm:style>
-      <a:lnRef idx="2">
-        <a:scrgbClr r="0" g="0" b="0"/>
-      </a:lnRef>
-      <a:fillRef idx="1">
-        <a:scrgbClr r="0" g="0" b="0"/>
-      </a:fillRef>
-      <a:effectRef idx="0">
+  <dgm:styleLbl name="parChTrans2D4">
+    <dgm:scene3d>
+      <a:camera prst="orthographicFront"/>
+      <a:lightRig rig="flat" dir="t"/>
+    </dgm:scene3d>
+    <dgm:sp3d z="-60000" prstMaterial="plastic">
+      <a:bevelT w="120900" h="88900"/>
+      <a:bevelB w="88900" h="31750" prst="angle"/>
+    </dgm:sp3d>
+    <dgm:txPr/>
+    <dgm:style>
+      <a:lnRef idx="0">
+        <a:scrgbClr r="0" g="0" b="0"/>
+      </a:lnRef>
+      <a:fillRef idx="3">
+        <a:scrgbClr r="0" g="0" b="0"/>
+      </a:fillRef>
+      <a:effectRef idx="1">
         <a:scrgbClr r="0" g="0" b="0"/>
       </a:effectRef>
       <a:fontRef idx="minor">
@@ -22178,486 +22352,503 @@
       </a:fontRef>
     </dgm:style>
   </dgm:styleLbl>
-  <dgm:styleLbl name="parChTrans2D4">
-    <dgm:scene3d>
-      <a:camera prst="orthographicFront"/>
-      <a:lightRig rig="threePt" dir="t"/>
-    </dgm:scene3d>
-    <dgm:sp3d/>
+  <dgm:styleLbl name="parChTrans1D1">
+    <dgm:scene3d>
+      <a:camera prst="orthographicFront"/>
+      <a:lightRig rig="flat" dir="t"/>
+    </dgm:scene3d>
+    <dgm:sp3d prstMaterial="matte"/>
     <dgm:txPr/>
     <dgm:style>
       <a:lnRef idx="2">
         <a:scrgbClr r="0" g="0" b="0"/>
       </a:lnRef>
+      <a:fillRef idx="0">
+        <a:scrgbClr r="0" g="0" b="0"/>
+      </a:fillRef>
+      <a:effectRef idx="0">
+        <a:scrgbClr r="0" g="0" b="0"/>
+      </a:effectRef>
+      <a:fontRef idx="minor"/>
+    </dgm:style>
+  </dgm:styleLbl>
+  <dgm:styleLbl name="parChTrans1D2">
+    <dgm:scene3d>
+      <a:camera prst="orthographicFront"/>
+      <a:lightRig rig="flat" dir="t"/>
+    </dgm:scene3d>
+    <dgm:sp3d prstMaterial="matte"/>
+    <dgm:txPr/>
+    <dgm:style>
+      <a:lnRef idx="2">
+        <a:scrgbClr r="0" g="0" b="0"/>
+      </a:lnRef>
+      <a:fillRef idx="0">
+        <a:scrgbClr r="0" g="0" b="0"/>
+      </a:fillRef>
+      <a:effectRef idx="0">
+        <a:scrgbClr r="0" g="0" b="0"/>
+      </a:effectRef>
+      <a:fontRef idx="minor"/>
+    </dgm:style>
+  </dgm:styleLbl>
+  <dgm:styleLbl name="parChTrans1D3">
+    <dgm:scene3d>
+      <a:camera prst="orthographicFront"/>
+      <a:lightRig rig="flat" dir="t"/>
+    </dgm:scene3d>
+    <dgm:sp3d prstMaterial="matte"/>
+    <dgm:txPr/>
+    <dgm:style>
+      <a:lnRef idx="2">
+        <a:scrgbClr r="0" g="0" b="0"/>
+      </a:lnRef>
+      <a:fillRef idx="0">
+        <a:scrgbClr r="0" g="0" b="0"/>
+      </a:fillRef>
+      <a:effectRef idx="0">
+        <a:scrgbClr r="0" g="0" b="0"/>
+      </a:effectRef>
+      <a:fontRef idx="minor"/>
+    </dgm:style>
+  </dgm:styleLbl>
+  <dgm:styleLbl name="parChTrans1D4">
+    <dgm:scene3d>
+      <a:camera prst="orthographicFront"/>
+      <a:lightRig rig="flat" dir="t"/>
+    </dgm:scene3d>
+    <dgm:sp3d prstMaterial="matte"/>
+    <dgm:txPr/>
+    <dgm:style>
+      <a:lnRef idx="2">
+        <a:scrgbClr r="0" g="0" b="0"/>
+      </a:lnRef>
+      <a:fillRef idx="0">
+        <a:scrgbClr r="0" g="0" b="0"/>
+      </a:fillRef>
+      <a:effectRef idx="0">
+        <a:scrgbClr r="0" g="0" b="0"/>
+      </a:effectRef>
+      <a:fontRef idx="minor"/>
+    </dgm:style>
+  </dgm:styleLbl>
+  <dgm:styleLbl name="fgAcc1">
+    <dgm:scene3d>
+      <a:camera prst="orthographicFront"/>
+      <a:lightRig rig="flat" dir="t"/>
+    </dgm:scene3d>
+    <dgm:sp3d z="190500" extrusionH="12700" prstMaterial="plastic">
+      <a:bevelT w="50800" h="50800"/>
+    </dgm:sp3d>
+    <dgm:txPr/>
+    <dgm:style>
+      <a:lnRef idx="1">
+        <a:scrgbClr r="0" g="0" b="0"/>
+      </a:lnRef>
       <a:fillRef idx="1">
         <a:scrgbClr r="0" g="0" b="0"/>
       </a:fillRef>
+      <a:effectRef idx="2">
+        <a:scrgbClr r="0" g="0" b="0"/>
+      </a:effectRef>
+      <a:fontRef idx="minor"/>
+    </dgm:style>
+  </dgm:styleLbl>
+  <dgm:styleLbl name="conFgAcc1">
+    <dgm:scene3d>
+      <a:camera prst="orthographicFront"/>
+      <a:lightRig rig="flat" dir="t"/>
+    </dgm:scene3d>
+    <dgm:sp3d z="190500" extrusionH="12700" prstMaterial="plastic">
+      <a:bevelT w="50800" h="50800"/>
+    </dgm:sp3d>
+    <dgm:txPr/>
+    <dgm:style>
+      <a:lnRef idx="1">
+        <a:scrgbClr r="0" g="0" b="0"/>
+      </a:lnRef>
+      <a:fillRef idx="1">
+        <a:scrgbClr r="0" g="0" b="0"/>
+      </a:fillRef>
+      <a:effectRef idx="2">
+        <a:scrgbClr r="0" g="0" b="0"/>
+      </a:effectRef>
+      <a:fontRef idx="minor"/>
+    </dgm:style>
+  </dgm:styleLbl>
+  <dgm:styleLbl name="alignAcc1">
+    <dgm:scene3d>
+      <a:camera prst="orthographicFront"/>
+      <a:lightRig rig="flat" dir="t"/>
+    </dgm:scene3d>
+    <dgm:sp3d extrusionH="12700" prstMaterial="plastic">
+      <a:bevelT w="50800" h="50800"/>
+    </dgm:sp3d>
+    <dgm:txPr/>
+    <dgm:style>
+      <a:lnRef idx="1">
+        <a:scrgbClr r="0" g="0" b="0"/>
+      </a:lnRef>
+      <a:fillRef idx="1">
+        <a:scrgbClr r="0" g="0" b="0"/>
+      </a:fillRef>
+      <a:effectRef idx="2">
+        <a:scrgbClr r="0" g="0" b="0"/>
+      </a:effectRef>
+      <a:fontRef idx="minor"/>
+    </dgm:style>
+  </dgm:styleLbl>
+  <dgm:styleLbl name="trAlignAcc1">
+    <dgm:scene3d>
+      <a:camera prst="orthographicFront"/>
+      <a:lightRig rig="flat" dir="t"/>
+    </dgm:scene3d>
+    <dgm:sp3d extrusionH="12700" prstMaterial="plastic">
+      <a:bevelT w="50800" h="50800"/>
+    </dgm:sp3d>
+    <dgm:txPr/>
+    <dgm:style>
+      <a:lnRef idx="1">
+        <a:scrgbClr r="0" g="0" b="0"/>
+      </a:lnRef>
+      <a:fillRef idx="1">
+        <a:scrgbClr r="0" g="0" b="0"/>
+      </a:fillRef>
+      <a:effectRef idx="2">
+        <a:scrgbClr r="0" g="0" b="0"/>
+      </a:effectRef>
+      <a:fontRef idx="minor"/>
+    </dgm:style>
+  </dgm:styleLbl>
+  <dgm:styleLbl name="bgAcc1">
+    <dgm:scene3d>
+      <a:camera prst="orthographicFront"/>
+      <a:lightRig rig="flat" dir="t"/>
+    </dgm:scene3d>
+    <dgm:sp3d z="-190500" extrusionH="12700" prstMaterial="plastic">
+      <a:bevelT w="50800" h="50800"/>
+    </dgm:sp3d>
+    <dgm:txPr/>
+    <dgm:style>
+      <a:lnRef idx="1">
+        <a:scrgbClr r="0" g="0" b="0"/>
+      </a:lnRef>
+      <a:fillRef idx="1">
+        <a:scrgbClr r="0" g="0" b="0"/>
+      </a:fillRef>
+      <a:effectRef idx="2">
+        <a:scrgbClr r="0" g="0" b="0"/>
+      </a:effectRef>
+      <a:fontRef idx="minor"/>
+    </dgm:style>
+  </dgm:styleLbl>
+  <dgm:styleLbl name="solidFgAcc1">
+    <dgm:scene3d>
+      <a:camera prst="orthographicFront"/>
+      <a:lightRig rig="flat" dir="t"/>
+    </dgm:scene3d>
+    <dgm:sp3d z="190500" extrusionH="12700" prstMaterial="plastic">
+      <a:bevelT w="50800" h="50800"/>
+    </dgm:sp3d>
+    <dgm:txPr/>
+    <dgm:style>
+      <a:lnRef idx="1">
+        <a:scrgbClr r="0" g="0" b="0"/>
+      </a:lnRef>
+      <a:fillRef idx="1">
+        <a:scrgbClr r="0" g="0" b="0"/>
+      </a:fillRef>
+      <a:effectRef idx="2">
+        <a:scrgbClr r="0" g="0" b="0"/>
+      </a:effectRef>
+      <a:fontRef idx="minor"/>
+    </dgm:style>
+  </dgm:styleLbl>
+  <dgm:styleLbl name="solidAlignAcc1">
+    <dgm:scene3d>
+      <a:camera prst="orthographicFront"/>
+      <a:lightRig rig="flat" dir="t"/>
+    </dgm:scene3d>
+    <dgm:sp3d extrusionH="12700" prstMaterial="plastic">
+      <a:bevelT w="50800" h="50800"/>
+    </dgm:sp3d>
+    <dgm:txPr/>
+    <dgm:style>
+      <a:lnRef idx="1">
+        <a:scrgbClr r="0" g="0" b="0"/>
+      </a:lnRef>
+      <a:fillRef idx="1">
+        <a:scrgbClr r="0" g="0" b="0"/>
+      </a:fillRef>
+      <a:effectRef idx="2">
+        <a:scrgbClr r="0" g="0" b="0"/>
+      </a:effectRef>
+      <a:fontRef idx="minor"/>
+    </dgm:style>
+  </dgm:styleLbl>
+  <dgm:styleLbl name="solidBgAcc1">
+    <dgm:scene3d>
+      <a:camera prst="orthographicFront"/>
+      <a:lightRig rig="flat" dir="t"/>
+    </dgm:scene3d>
+    <dgm:sp3d z="-190500" extrusionH="12700" prstMaterial="plastic">
+      <a:bevelT w="50800" h="50800"/>
+    </dgm:sp3d>
+    <dgm:txPr/>
+    <dgm:style>
+      <a:lnRef idx="1">
+        <a:scrgbClr r="0" g="0" b="0"/>
+      </a:lnRef>
+      <a:fillRef idx="1">
+        <a:scrgbClr r="0" g="0" b="0"/>
+      </a:fillRef>
+      <a:effectRef idx="2">
+        <a:scrgbClr r="0" g="0" b="0"/>
+      </a:effectRef>
+      <a:fontRef idx="minor"/>
+    </dgm:style>
+  </dgm:styleLbl>
+  <dgm:styleLbl name="fgAccFollowNode1">
+    <dgm:scene3d>
+      <a:camera prst="orthographicFront"/>
+      <a:lightRig rig="flat" dir="t"/>
+    </dgm:scene3d>
+    <dgm:sp3d z="190500" extrusionH="12700" prstMaterial="plastic">
+      <a:bevelT w="50800" h="50800"/>
+    </dgm:sp3d>
+    <dgm:txPr/>
+    <dgm:style>
+      <a:lnRef idx="1">
+        <a:scrgbClr r="0" g="0" b="0"/>
+      </a:lnRef>
+      <a:fillRef idx="1">
+        <a:scrgbClr r="0" g="0" b="0"/>
+      </a:fillRef>
+      <a:effectRef idx="2">
+        <a:scrgbClr r="0" g="0" b="0"/>
+      </a:effectRef>
+      <a:fontRef idx="minor"/>
+    </dgm:style>
+  </dgm:styleLbl>
+  <dgm:styleLbl name="alignAccFollowNode1">
+    <dgm:scene3d>
+      <a:camera prst="orthographicFront"/>
+      <a:lightRig rig="flat" dir="t"/>
+    </dgm:scene3d>
+    <dgm:sp3d extrusionH="12700" prstMaterial="plastic">
+      <a:bevelT w="50800" h="50800"/>
+    </dgm:sp3d>
+    <dgm:txPr/>
+    <dgm:style>
+      <a:lnRef idx="1">
+        <a:scrgbClr r="0" g="0" b="0"/>
+      </a:lnRef>
+      <a:fillRef idx="1">
+        <a:scrgbClr r="0" g="0" b="0"/>
+      </a:fillRef>
+      <a:effectRef idx="2">
+        <a:scrgbClr r="0" g="0" b="0"/>
+      </a:effectRef>
+      <a:fontRef idx="minor"/>
+    </dgm:style>
+  </dgm:styleLbl>
+  <dgm:styleLbl name="bgAccFollowNode1">
+    <dgm:scene3d>
+      <a:camera prst="orthographicFront"/>
+      <a:lightRig rig="flat" dir="t"/>
+    </dgm:scene3d>
+    <dgm:sp3d z="-190500" extrusionH="12700" prstMaterial="plastic">
+      <a:bevelT w="50800" h="50800"/>
+    </dgm:sp3d>
+    <dgm:txPr/>
+    <dgm:style>
+      <a:lnRef idx="1">
+        <a:scrgbClr r="0" g="0" b="0"/>
+      </a:lnRef>
+      <a:fillRef idx="1">
+        <a:scrgbClr r="0" g="0" b="0"/>
+      </a:fillRef>
+      <a:effectRef idx="2">
+        <a:scrgbClr r="0" g="0" b="0"/>
+      </a:effectRef>
+      <a:fontRef idx="minor"/>
+    </dgm:style>
+  </dgm:styleLbl>
+  <dgm:styleLbl name="fgAcc0">
+    <dgm:scene3d>
+      <a:camera prst="orthographicFront"/>
+      <a:lightRig rig="flat" dir="t"/>
+    </dgm:scene3d>
+    <dgm:sp3d z="190500" extrusionH="12700" prstMaterial="plastic">
+      <a:bevelT w="50800" h="50800"/>
+    </dgm:sp3d>
+    <dgm:txPr/>
+    <dgm:style>
+      <a:lnRef idx="1">
+        <a:scrgbClr r="0" g="0" b="0"/>
+      </a:lnRef>
+      <a:fillRef idx="1">
+        <a:scrgbClr r="0" g="0" b="0"/>
+      </a:fillRef>
+      <a:effectRef idx="2">
+        <a:scrgbClr r="0" g="0" b="0"/>
+      </a:effectRef>
+      <a:fontRef idx="minor"/>
+    </dgm:style>
+  </dgm:styleLbl>
+  <dgm:styleLbl name="fgAcc2">
+    <dgm:scene3d>
+      <a:camera prst="orthographicFront"/>
+      <a:lightRig rig="flat" dir="t"/>
+    </dgm:scene3d>
+    <dgm:sp3d z="190500" extrusionH="12700" prstMaterial="plastic">
+      <a:bevelT w="50800" h="50800"/>
+    </dgm:sp3d>
+    <dgm:txPr/>
+    <dgm:style>
+      <a:lnRef idx="1">
+        <a:scrgbClr r="0" g="0" b="0"/>
+      </a:lnRef>
+      <a:fillRef idx="1">
+        <a:scrgbClr r="0" g="0" b="0"/>
+      </a:fillRef>
+      <a:effectRef idx="2">
+        <a:scrgbClr r="0" g="0" b="0"/>
+      </a:effectRef>
+      <a:fontRef idx="minor"/>
+    </dgm:style>
+  </dgm:styleLbl>
+  <dgm:styleLbl name="fgAcc3">
+    <dgm:scene3d>
+      <a:camera prst="orthographicFront"/>
+      <a:lightRig rig="flat" dir="t"/>
+    </dgm:scene3d>
+    <dgm:sp3d z="190500" extrusionH="12700" prstMaterial="plastic">
+      <a:bevelT w="50800" h="50800"/>
+    </dgm:sp3d>
+    <dgm:txPr/>
+    <dgm:style>
+      <a:lnRef idx="1">
+        <a:scrgbClr r="0" g="0" b="0"/>
+      </a:lnRef>
+      <a:fillRef idx="1">
+        <a:scrgbClr r="0" g="0" b="0"/>
+      </a:fillRef>
+      <a:effectRef idx="2">
+        <a:scrgbClr r="0" g="0" b="0"/>
+      </a:effectRef>
+      <a:fontRef idx="minor"/>
+    </dgm:style>
+  </dgm:styleLbl>
+  <dgm:styleLbl name="fgAcc4">
+    <dgm:scene3d>
+      <a:camera prst="orthographicFront"/>
+      <a:lightRig rig="flat" dir="t"/>
+    </dgm:scene3d>
+    <dgm:sp3d z="190500" extrusionH="12700" prstMaterial="plastic">
+      <a:bevelT w="50800" h="50800"/>
+    </dgm:sp3d>
+    <dgm:txPr/>
+    <dgm:style>
+      <a:lnRef idx="1">
+        <a:scrgbClr r="0" g="0" b="0"/>
+      </a:lnRef>
+      <a:fillRef idx="1">
+        <a:scrgbClr r="0" g="0" b="0"/>
+      </a:fillRef>
+      <a:effectRef idx="2">
+        <a:scrgbClr r="0" g="0" b="0"/>
+      </a:effectRef>
+      <a:fontRef idx="minor"/>
+    </dgm:style>
+  </dgm:styleLbl>
+  <dgm:styleLbl name="bgShp">
+    <dgm:scene3d>
+      <a:camera prst="orthographicFront"/>
+      <a:lightRig rig="flat" dir="t"/>
+    </dgm:scene3d>
+    <dgm:sp3d z="-190500" extrusionH="12700" prstMaterial="plastic">
+      <a:bevelT w="50800" h="50800"/>
+    </dgm:sp3d>
+    <dgm:txPr/>
+    <dgm:style>
+      <a:lnRef idx="0">
+        <a:scrgbClr r="0" g="0" b="0"/>
+      </a:lnRef>
+      <a:fillRef idx="3">
+        <a:scrgbClr r="0" g="0" b="0"/>
+      </a:fillRef>
       <a:effectRef idx="0">
+        <a:scrgbClr r="0" g="0" b="0"/>
+      </a:effectRef>
+      <a:fontRef idx="minor"/>
+    </dgm:style>
+  </dgm:styleLbl>
+  <dgm:styleLbl name="dkBgShp">
+    <dgm:scene3d>
+      <a:camera prst="orthographicFront"/>
+      <a:lightRig rig="flat" dir="t"/>
+    </dgm:scene3d>
+    <dgm:sp3d z="-190500" extrusionH="12700" prstMaterial="plastic">
+      <a:bevelT w="50800" h="50800"/>
+    </dgm:sp3d>
+    <dgm:txPr/>
+    <dgm:style>
+      <a:lnRef idx="0">
+        <a:scrgbClr r="0" g="0" b="0"/>
+      </a:lnRef>
+      <a:fillRef idx="2">
+        <a:scrgbClr r="0" g="0" b="0"/>
+      </a:fillRef>
+      <a:effectRef idx="0">
+        <a:scrgbClr r="0" g="0" b="0"/>
+      </a:effectRef>
+      <a:fontRef idx="minor"/>
+    </dgm:style>
+  </dgm:styleLbl>
+  <dgm:styleLbl name="trBgShp">
+    <dgm:scene3d>
+      <a:camera prst="orthographicFront"/>
+      <a:lightRig rig="flat" dir="t"/>
+    </dgm:scene3d>
+    <dgm:sp3d z="-190500" extrusionH="12700" prstMaterial="matte"/>
+    <dgm:txPr/>
+    <dgm:style>
+      <a:lnRef idx="0">
+        <a:scrgbClr r="0" g="0" b="0"/>
+      </a:lnRef>
+      <a:fillRef idx="1">
+        <a:scrgbClr r="0" g="0" b="0"/>
+      </a:fillRef>
+      <a:effectRef idx="0">
+        <a:scrgbClr r="0" g="0" b="0"/>
+      </a:effectRef>
+      <a:fontRef idx="minor"/>
+    </dgm:style>
+  </dgm:styleLbl>
+  <dgm:styleLbl name="fgShp">
+    <dgm:scene3d>
+      <a:camera prst="orthographicFront"/>
+      <a:lightRig rig="flat" dir="t"/>
+    </dgm:scene3d>
+    <dgm:sp3d z="190500" prstMaterial="plastic">
+      <a:bevelT w="120900" h="88900"/>
+      <a:bevelB w="88900" h="31750" prst="angle"/>
+    </dgm:sp3d>
+    <dgm:txPr/>
+    <dgm:style>
+      <a:lnRef idx="0">
+        <a:scrgbClr r="0" g="0" b="0"/>
+      </a:lnRef>
+      <a:fillRef idx="1">
+        <a:scrgbClr r="0" g="0" b="0"/>
+      </a:fillRef>
+      <a:effectRef idx="3">
         <a:scrgbClr r="0" g="0" b="0"/>
       </a:effectRef>
       <a:fontRef idx="minor">
         <a:schemeClr val="lt1"/>
       </a:fontRef>
-    </dgm:style>
-  </dgm:styleLbl>
-  <dgm:styleLbl name="parChTrans1D1">
-    <dgm:scene3d>
-      <a:camera prst="orthographicFront"/>
-      <a:lightRig rig="threePt" dir="t"/>
-    </dgm:scene3d>
-    <dgm:sp3d/>
-    <dgm:txPr/>
-    <dgm:style>
-      <a:lnRef idx="2">
-        <a:scrgbClr r="0" g="0" b="0"/>
-      </a:lnRef>
-      <a:fillRef idx="0">
-        <a:scrgbClr r="0" g="0" b="0"/>
-      </a:fillRef>
-      <a:effectRef idx="0">
-        <a:scrgbClr r="0" g="0" b="0"/>
-      </a:effectRef>
-      <a:fontRef idx="minor"/>
-    </dgm:style>
-  </dgm:styleLbl>
-  <dgm:styleLbl name="parChTrans1D2">
-    <dgm:scene3d>
-      <a:camera prst="orthographicFront"/>
-      <a:lightRig rig="threePt" dir="t"/>
-    </dgm:scene3d>
-    <dgm:sp3d/>
-    <dgm:txPr/>
-    <dgm:style>
-      <a:lnRef idx="2">
-        <a:scrgbClr r="0" g="0" b="0"/>
-      </a:lnRef>
-      <a:fillRef idx="0">
-        <a:scrgbClr r="0" g="0" b="0"/>
-      </a:fillRef>
-      <a:effectRef idx="0">
-        <a:scrgbClr r="0" g="0" b="0"/>
-      </a:effectRef>
-      <a:fontRef idx="minor"/>
-    </dgm:style>
-  </dgm:styleLbl>
-  <dgm:styleLbl name="parChTrans1D3">
-    <dgm:scene3d>
-      <a:camera prst="orthographicFront"/>
-      <a:lightRig rig="threePt" dir="t"/>
-    </dgm:scene3d>
-    <dgm:sp3d/>
-    <dgm:txPr/>
-    <dgm:style>
-      <a:lnRef idx="2">
-        <a:scrgbClr r="0" g="0" b="0"/>
-      </a:lnRef>
-      <a:fillRef idx="0">
-        <a:scrgbClr r="0" g="0" b="0"/>
-      </a:fillRef>
-      <a:effectRef idx="0">
-        <a:scrgbClr r="0" g="0" b="0"/>
-      </a:effectRef>
-      <a:fontRef idx="minor"/>
-    </dgm:style>
-  </dgm:styleLbl>
-  <dgm:styleLbl name="parChTrans1D4">
-    <dgm:scene3d>
-      <a:camera prst="orthographicFront"/>
-      <a:lightRig rig="threePt" dir="t"/>
-    </dgm:scene3d>
-    <dgm:sp3d/>
-    <dgm:txPr/>
-    <dgm:style>
-      <a:lnRef idx="2">
-        <a:scrgbClr r="0" g="0" b="0"/>
-      </a:lnRef>
-      <a:fillRef idx="0">
-        <a:scrgbClr r="0" g="0" b="0"/>
-      </a:fillRef>
-      <a:effectRef idx="0">
-        <a:scrgbClr r="0" g="0" b="0"/>
-      </a:effectRef>
-      <a:fontRef idx="minor"/>
-    </dgm:style>
-  </dgm:styleLbl>
-  <dgm:styleLbl name="fgAcc1">
-    <dgm:scene3d>
-      <a:camera prst="orthographicFront"/>
-      <a:lightRig rig="threePt" dir="t"/>
-    </dgm:scene3d>
-    <dgm:sp3d/>
-    <dgm:txPr/>
-    <dgm:style>
-      <a:lnRef idx="2">
-        <a:scrgbClr r="0" g="0" b="0"/>
-      </a:lnRef>
-      <a:fillRef idx="1">
-        <a:scrgbClr r="0" g="0" b="0"/>
-      </a:fillRef>
-      <a:effectRef idx="0">
-        <a:scrgbClr r="0" g="0" b="0"/>
-      </a:effectRef>
-      <a:fontRef idx="minor"/>
-    </dgm:style>
-  </dgm:styleLbl>
-  <dgm:styleLbl name="conFgAcc1">
-    <dgm:scene3d>
-      <a:camera prst="orthographicFront"/>
-      <a:lightRig rig="threePt" dir="t"/>
-    </dgm:scene3d>
-    <dgm:sp3d/>
-    <dgm:txPr/>
-    <dgm:style>
-      <a:lnRef idx="2">
-        <a:scrgbClr r="0" g="0" b="0"/>
-      </a:lnRef>
-      <a:fillRef idx="1">
-        <a:scrgbClr r="0" g="0" b="0"/>
-      </a:fillRef>
-      <a:effectRef idx="0">
-        <a:scrgbClr r="0" g="0" b="0"/>
-      </a:effectRef>
-      <a:fontRef idx="minor"/>
-    </dgm:style>
-  </dgm:styleLbl>
-  <dgm:styleLbl name="alignAcc1">
-    <dgm:scene3d>
-      <a:camera prst="orthographicFront"/>
-      <a:lightRig rig="threePt" dir="t"/>
-    </dgm:scene3d>
-    <dgm:sp3d/>
-    <dgm:txPr/>
-    <dgm:style>
-      <a:lnRef idx="2">
-        <a:scrgbClr r="0" g="0" b="0"/>
-      </a:lnRef>
-      <a:fillRef idx="1">
-        <a:scrgbClr r="0" g="0" b="0"/>
-      </a:fillRef>
-      <a:effectRef idx="0">
-        <a:scrgbClr r="0" g="0" b="0"/>
-      </a:effectRef>
-      <a:fontRef idx="minor"/>
-    </dgm:style>
-  </dgm:styleLbl>
-  <dgm:styleLbl name="trAlignAcc1">
-    <dgm:scene3d>
-      <a:camera prst="orthographicFront"/>
-      <a:lightRig rig="threePt" dir="t"/>
-    </dgm:scene3d>
-    <dgm:sp3d/>
-    <dgm:txPr/>
-    <dgm:style>
-      <a:lnRef idx="1">
-        <a:scrgbClr r="0" g="0" b="0"/>
-      </a:lnRef>
-      <a:fillRef idx="1">
-        <a:scrgbClr r="0" g="0" b="0"/>
-      </a:fillRef>
-      <a:effectRef idx="0">
-        <a:scrgbClr r="0" g="0" b="0"/>
-      </a:effectRef>
-      <a:fontRef idx="minor"/>
-    </dgm:style>
-  </dgm:styleLbl>
-  <dgm:styleLbl name="bgAcc1">
-    <dgm:scene3d>
-      <a:camera prst="orthographicFront"/>
-      <a:lightRig rig="threePt" dir="t"/>
-    </dgm:scene3d>
-    <dgm:sp3d/>
-    <dgm:txPr/>
-    <dgm:style>
-      <a:lnRef idx="2">
-        <a:scrgbClr r="0" g="0" b="0"/>
-      </a:lnRef>
-      <a:fillRef idx="1">
-        <a:scrgbClr r="0" g="0" b="0"/>
-      </a:fillRef>
-      <a:effectRef idx="0">
-        <a:scrgbClr r="0" g="0" b="0"/>
-      </a:effectRef>
-      <a:fontRef idx="minor"/>
-    </dgm:style>
-  </dgm:styleLbl>
-  <dgm:styleLbl name="solidFgAcc1">
-    <dgm:scene3d>
-      <a:camera prst="orthographicFront"/>
-      <a:lightRig rig="threePt" dir="t"/>
-    </dgm:scene3d>
-    <dgm:sp3d/>
-    <dgm:txPr/>
-    <dgm:style>
-      <a:lnRef idx="2">
-        <a:scrgbClr r="0" g="0" b="0"/>
-      </a:lnRef>
-      <a:fillRef idx="1">
-        <a:scrgbClr r="0" g="0" b="0"/>
-      </a:fillRef>
-      <a:effectRef idx="0">
-        <a:scrgbClr r="0" g="0" b="0"/>
-      </a:effectRef>
-      <a:fontRef idx="minor"/>
-    </dgm:style>
-  </dgm:styleLbl>
-  <dgm:styleLbl name="solidAlignAcc1">
-    <dgm:scene3d>
-      <a:camera prst="orthographicFront"/>
-      <a:lightRig rig="threePt" dir="t"/>
-    </dgm:scene3d>
-    <dgm:sp3d/>
-    <dgm:txPr/>
-    <dgm:style>
-      <a:lnRef idx="2">
-        <a:scrgbClr r="0" g="0" b="0"/>
-      </a:lnRef>
-      <a:fillRef idx="1">
-        <a:scrgbClr r="0" g="0" b="0"/>
-      </a:fillRef>
-      <a:effectRef idx="0">
-        <a:scrgbClr r="0" g="0" b="0"/>
-      </a:effectRef>
-      <a:fontRef idx="minor"/>
-    </dgm:style>
-  </dgm:styleLbl>
-  <dgm:styleLbl name="solidBgAcc1">
-    <dgm:scene3d>
-      <a:camera prst="orthographicFront"/>
-      <a:lightRig rig="threePt" dir="t"/>
-    </dgm:scene3d>
-    <dgm:sp3d/>
-    <dgm:txPr/>
-    <dgm:style>
-      <a:lnRef idx="2">
-        <a:scrgbClr r="0" g="0" b="0"/>
-      </a:lnRef>
-      <a:fillRef idx="1">
-        <a:scrgbClr r="0" g="0" b="0"/>
-      </a:fillRef>
-      <a:effectRef idx="0">
-        <a:scrgbClr r="0" g="0" b="0"/>
-      </a:effectRef>
-      <a:fontRef idx="minor"/>
-    </dgm:style>
-  </dgm:styleLbl>
-  <dgm:styleLbl name="fgAccFollowNode1">
-    <dgm:scene3d>
-      <a:camera prst="orthographicFront"/>
-      <a:lightRig rig="threePt" dir="t"/>
-    </dgm:scene3d>
-    <dgm:sp3d/>
-    <dgm:txPr/>
-    <dgm:style>
-      <a:lnRef idx="2">
-        <a:scrgbClr r="0" g="0" b="0"/>
-      </a:lnRef>
-      <a:fillRef idx="1">
-        <a:scrgbClr r="0" g="0" b="0"/>
-      </a:fillRef>
-      <a:effectRef idx="0">
-        <a:scrgbClr r="0" g="0" b="0"/>
-      </a:effectRef>
-      <a:fontRef idx="minor"/>
-    </dgm:style>
-  </dgm:styleLbl>
-  <dgm:styleLbl name="alignAccFollowNode1">
-    <dgm:scene3d>
-      <a:camera prst="orthographicFront"/>
-      <a:lightRig rig="threePt" dir="t"/>
-    </dgm:scene3d>
-    <dgm:sp3d/>
-    <dgm:txPr/>
-    <dgm:style>
-      <a:lnRef idx="2">
-        <a:scrgbClr r="0" g="0" b="0"/>
-      </a:lnRef>
-      <a:fillRef idx="1">
-        <a:scrgbClr r="0" g="0" b="0"/>
-      </a:fillRef>
-      <a:effectRef idx="0">
-        <a:scrgbClr r="0" g="0" b="0"/>
-      </a:effectRef>
-      <a:fontRef idx="minor"/>
-    </dgm:style>
-  </dgm:styleLbl>
-  <dgm:styleLbl name="bgAccFollowNode1">
-    <dgm:scene3d>
-      <a:camera prst="orthographicFront"/>
-      <a:lightRig rig="threePt" dir="t"/>
-    </dgm:scene3d>
-    <dgm:sp3d/>
-    <dgm:txPr/>
-    <dgm:style>
-      <a:lnRef idx="2">
-        <a:scrgbClr r="0" g="0" b="0"/>
-      </a:lnRef>
-      <a:fillRef idx="1">
-        <a:scrgbClr r="0" g="0" b="0"/>
-      </a:fillRef>
-      <a:effectRef idx="0">
-        <a:scrgbClr r="0" g="0" b="0"/>
-      </a:effectRef>
-      <a:fontRef idx="minor"/>
-    </dgm:style>
-  </dgm:styleLbl>
-  <dgm:styleLbl name="fgAcc0">
-    <dgm:scene3d>
-      <a:camera prst="orthographicFront"/>
-      <a:lightRig rig="threePt" dir="t"/>
-    </dgm:scene3d>
-    <dgm:sp3d/>
-    <dgm:txPr/>
-    <dgm:style>
-      <a:lnRef idx="2">
-        <a:scrgbClr r="0" g="0" b="0"/>
-      </a:lnRef>
-      <a:fillRef idx="1">
-        <a:scrgbClr r="0" g="0" b="0"/>
-      </a:fillRef>
-      <a:effectRef idx="0">
-        <a:scrgbClr r="0" g="0" b="0"/>
-      </a:effectRef>
-      <a:fontRef idx="minor"/>
-    </dgm:style>
-  </dgm:styleLbl>
-  <dgm:styleLbl name="fgAcc2">
-    <dgm:scene3d>
-      <a:camera prst="orthographicFront"/>
-      <a:lightRig rig="threePt" dir="t"/>
-    </dgm:scene3d>
-    <dgm:sp3d/>
-    <dgm:txPr/>
-    <dgm:style>
-      <a:lnRef idx="2">
-        <a:scrgbClr r="0" g="0" b="0"/>
-      </a:lnRef>
-      <a:fillRef idx="1">
-        <a:scrgbClr r="0" g="0" b="0"/>
-      </a:fillRef>
-      <a:effectRef idx="0">
-        <a:scrgbClr r="0" g="0" b="0"/>
-      </a:effectRef>
-      <a:fontRef idx="minor"/>
-    </dgm:style>
-  </dgm:styleLbl>
-  <dgm:styleLbl name="fgAcc3">
-    <dgm:scene3d>
-      <a:camera prst="orthographicFront"/>
-      <a:lightRig rig="threePt" dir="t"/>
-    </dgm:scene3d>
-    <dgm:sp3d/>
-    <dgm:txPr/>
-    <dgm:style>
-      <a:lnRef idx="2">
-        <a:scrgbClr r="0" g="0" b="0"/>
-      </a:lnRef>
-      <a:fillRef idx="1">
-        <a:scrgbClr r="0" g="0" b="0"/>
-      </a:fillRef>
-      <a:effectRef idx="0">
-        <a:scrgbClr r="0" g="0" b="0"/>
-      </a:effectRef>
-      <a:fontRef idx="minor"/>
-    </dgm:style>
-  </dgm:styleLbl>
-  <dgm:styleLbl name="fgAcc4">
-    <dgm:scene3d>
-      <a:camera prst="orthographicFront"/>
-      <a:lightRig rig="threePt" dir="t"/>
-    </dgm:scene3d>
-    <dgm:sp3d/>
-    <dgm:txPr/>
-    <dgm:style>
-      <a:lnRef idx="2">
-        <a:scrgbClr r="0" g="0" b="0"/>
-      </a:lnRef>
-      <a:fillRef idx="1">
-        <a:scrgbClr r="0" g="0" b="0"/>
-      </a:fillRef>
-      <a:effectRef idx="0">
-        <a:scrgbClr r="0" g="0" b="0"/>
-      </a:effectRef>
-      <a:fontRef idx="minor"/>
-    </dgm:style>
-  </dgm:styleLbl>
-  <dgm:styleLbl name="bgShp">
-    <dgm:scene3d>
-      <a:camera prst="orthographicFront"/>
-      <a:lightRig rig="threePt" dir="t"/>
-    </dgm:scene3d>
-    <dgm:sp3d/>
-    <dgm:txPr/>
-    <dgm:style>
-      <a:lnRef idx="0">
-        <a:scrgbClr r="0" g="0" b="0"/>
-      </a:lnRef>
-      <a:fillRef idx="1">
-        <a:scrgbClr r="0" g="0" b="0"/>
-      </a:fillRef>
-      <a:effectRef idx="0">
-        <a:scrgbClr r="0" g="0" b="0"/>
-      </a:effectRef>
-      <a:fontRef idx="minor"/>
-    </dgm:style>
-  </dgm:styleLbl>
-  <dgm:styleLbl name="dkBgShp">
-    <dgm:scene3d>
-      <a:camera prst="orthographicFront"/>
-      <a:lightRig rig="threePt" dir="t"/>
-    </dgm:scene3d>
-    <dgm:sp3d/>
-    <dgm:txPr/>
-    <dgm:style>
-      <a:lnRef idx="0">
-        <a:scrgbClr r="0" g="0" b="0"/>
-      </a:lnRef>
-      <a:fillRef idx="1">
-        <a:scrgbClr r="0" g="0" b="0"/>
-      </a:fillRef>
-      <a:effectRef idx="0">
-        <a:scrgbClr r="0" g="0" b="0"/>
-      </a:effectRef>
-      <a:fontRef idx="minor"/>
-    </dgm:style>
-  </dgm:styleLbl>
-  <dgm:styleLbl name="trBgShp">
-    <dgm:scene3d>
-      <a:camera prst="orthographicFront"/>
-      <a:lightRig rig="threePt" dir="t"/>
-    </dgm:scene3d>
-    <dgm:sp3d/>
-    <dgm:txPr/>
-    <dgm:style>
-      <a:lnRef idx="0">
-        <a:scrgbClr r="0" g="0" b="0"/>
-      </a:lnRef>
-      <a:fillRef idx="1">
-        <a:scrgbClr r="0" g="0" b="0"/>
-      </a:fillRef>
-      <a:effectRef idx="0">
-        <a:scrgbClr r="0" g="0" b="0"/>
-      </a:effectRef>
-      <a:fontRef idx="minor"/>
-    </dgm:style>
-  </dgm:styleLbl>
-  <dgm:styleLbl name="fgShp">
-    <dgm:scene3d>
-      <a:camera prst="orthographicFront"/>
-      <a:lightRig rig="threePt" dir="t"/>
-    </dgm:scene3d>
-    <dgm:sp3d/>
-    <dgm:txPr/>
-    <dgm:style>
-      <a:lnRef idx="2">
-        <a:scrgbClr r="0" g="0" b="0"/>
-      </a:lnRef>
-      <a:fillRef idx="1">
-        <a:scrgbClr r="0" g="0" b="0"/>
-      </a:fillRef>
-      <a:effectRef idx="0">
-        <a:scrgbClr r="0" g="0" b="0"/>
-      </a:effectRef>
-      <a:fontRef idx="minor"/>
     </dgm:style>
   </dgm:styleLbl>
   <dgm:styleLbl name="revTx">
@@ -23976,7 +24167,7 @@
             <a:fld id="{229FDC3E-7424-49CF-AF38-AA35F4C77C8D}" type="datetimeFigureOut">
               <a:rPr lang="pt-BR" smtClean="0"/>
               <a:pPr/>
-              <a:t>21/07/2014</a:t>
+              <a:t>22/07/2014</a:t>
             </a:fld>
             <a:endParaRPr lang="pt-BR"/>
           </a:p>
@@ -24148,7 +24339,7 @@
             <a:fld id="{229FDC3E-7424-49CF-AF38-AA35F4C77C8D}" type="datetimeFigureOut">
               <a:rPr lang="pt-BR" smtClean="0"/>
               <a:pPr/>
-              <a:t>21/07/2014</a:t>
+              <a:t>22/07/2014</a:t>
             </a:fld>
             <a:endParaRPr lang="pt-BR"/>
           </a:p>
@@ -24325,7 +24516,7 @@
             <a:fld id="{229FDC3E-7424-49CF-AF38-AA35F4C77C8D}" type="datetimeFigureOut">
               <a:rPr lang="pt-BR" smtClean="0"/>
               <a:pPr/>
-              <a:t>21/07/2014</a:t>
+              <a:t>22/07/2014</a:t>
             </a:fld>
             <a:endParaRPr lang="pt-BR"/>
           </a:p>
@@ -24492,7 +24683,7 @@
             <a:fld id="{229FDC3E-7424-49CF-AF38-AA35F4C77C8D}" type="datetimeFigureOut">
               <a:rPr lang="pt-BR" smtClean="0"/>
               <a:pPr/>
-              <a:t>21/07/2014</a:t>
+              <a:t>22/07/2014</a:t>
             </a:fld>
             <a:endParaRPr lang="pt-BR"/>
           </a:p>
@@ -24728,7 +24919,7 @@
             <a:fld id="{229FDC3E-7424-49CF-AF38-AA35F4C77C8D}" type="datetimeFigureOut">
               <a:rPr lang="pt-BR" smtClean="0"/>
               <a:pPr/>
-              <a:t>21/07/2014</a:t>
+              <a:t>22/07/2014</a:t>
             </a:fld>
             <a:endParaRPr lang="pt-BR"/>
           </a:p>
@@ -25026,7 +25217,7 @@
             <a:fld id="{229FDC3E-7424-49CF-AF38-AA35F4C77C8D}" type="datetimeFigureOut">
               <a:rPr lang="pt-BR" smtClean="0"/>
               <a:pPr/>
-              <a:t>21/07/2014</a:t>
+              <a:t>22/07/2014</a:t>
             </a:fld>
             <a:endParaRPr lang="pt-BR"/>
           </a:p>
@@ -25412,7 +25603,7 @@
             <a:fld id="{229FDC3E-7424-49CF-AF38-AA35F4C77C8D}" type="datetimeFigureOut">
               <a:rPr lang="pt-BR" smtClean="0"/>
               <a:pPr/>
-              <a:t>21/07/2014</a:t>
+              <a:t>22/07/2014</a:t>
             </a:fld>
             <a:endParaRPr lang="pt-BR"/>
           </a:p>
@@ -25587,7 +25778,7 @@
             <a:fld id="{229FDC3E-7424-49CF-AF38-AA35F4C77C8D}" type="datetimeFigureOut">
               <a:rPr lang="pt-BR" smtClean="0"/>
               <a:pPr/>
-              <a:t>21/07/2014</a:t>
+              <a:t>22/07/2014</a:t>
             </a:fld>
             <a:endParaRPr lang="pt-BR"/>
           </a:p>
@@ -25679,7 +25870,7 @@
             <a:fld id="{229FDC3E-7424-49CF-AF38-AA35F4C77C8D}" type="datetimeFigureOut">
               <a:rPr lang="pt-BR" smtClean="0"/>
               <a:pPr/>
-              <a:t>21/07/2014</a:t>
+              <a:t>22/07/2014</a:t>
             </a:fld>
             <a:endParaRPr lang="pt-BR"/>
           </a:p>
@@ -25976,7 +26167,7 @@
             <a:fld id="{229FDC3E-7424-49CF-AF38-AA35F4C77C8D}" type="datetimeFigureOut">
               <a:rPr lang="pt-BR" smtClean="0"/>
               <a:pPr/>
-              <a:t>21/07/2014</a:t>
+              <a:t>22/07/2014</a:t>
             </a:fld>
             <a:endParaRPr lang="pt-BR"/>
           </a:p>
@@ -26112,7 +26303,7 @@
             <a:fld id="{229FDC3E-7424-49CF-AF38-AA35F4C77C8D}" type="datetimeFigureOut">
               <a:rPr lang="pt-BR" smtClean="0"/>
               <a:pPr/>
-              <a:t>21/07/2014</a:t>
+              <a:t>22/07/2014</a:t>
             </a:fld>
             <a:endParaRPr lang="pt-BR"/>
           </a:p>
@@ -26417,7 +26608,7 @@
             <a:fld id="{229FDC3E-7424-49CF-AF38-AA35F4C77C8D}" type="datetimeFigureOut">
               <a:rPr lang="pt-BR" smtClean="0"/>
               <a:pPr/>
-              <a:t>21/07/2014</a:t>
+              <a:t>22/07/2014</a:t>
             </a:fld>
             <a:endParaRPr lang="pt-BR"/>
           </a:p>
@@ -27079,91 +27270,6 @@
             <p:ph type="title"/>
           </p:nvPr>
         </p:nvSpPr>
-        <p:spPr>
-          <a:xfrm>
-            <a:off x="457200" y="260648"/>
-            <a:ext cx="8686800" cy="838200"/>
-          </a:xfrm>
-        </p:spPr>
-        <p:txBody>
-          <a:bodyPr/>
-          <a:lstStyle/>
-          <a:p>
-            <a:r>
-              <a:rPr lang="pt-BR" dirty="0" smtClean="0"/>
-              <a:t>abrangência</a:t>
-            </a:r>
-            <a:endParaRPr lang="pt-BR" dirty="0"/>
-          </a:p>
-        </p:txBody>
-      </p:sp>
-      <p:graphicFrame>
-        <p:nvGraphicFramePr>
-          <p:cNvPr id="4" name="Espaço Reservado para Conteúdo 3"/>
-          <p:cNvGraphicFramePr>
-            <a:graphicFrameLocks noGrp="1"/>
-          </p:cNvGraphicFramePr>
-          <p:nvPr>
-            <p:ph idx="1"/>
-            <p:extLst>
-              <p:ext uri="{D42A27DB-BD31-4B8C-83A1-F6EECF244321}">
-                <p14:modId xmlns:p14="http://schemas.microsoft.com/office/powerpoint/2010/main" xmlns="" val="2208909862"/>
-              </p:ext>
-            </p:extLst>
-          </p:nvPr>
-        </p:nvGraphicFramePr>
-        <p:xfrm>
-          <a:off x="304800" y="1268761"/>
-          <a:ext cx="8686800" cy="5400599"/>
-        </p:xfrm>
-        <a:graphic>
-          <a:graphicData uri="http://schemas.openxmlformats.org/drawingml/2006/diagram">
-            <dgm:relIds xmlns:dgm="http://schemas.openxmlformats.org/drawingml/2006/diagram" xmlns:r="http://schemas.openxmlformats.org/officeDocument/2006/relationships" r:dm="rId2" r:lo="rId3" r:qs="rId4" r:cs="rId5"/>
-          </a:graphicData>
-        </a:graphic>
-      </p:graphicFrame>
-    </p:spTree>
-  </p:cSld>
-  <p:clrMapOvr>
-    <a:masterClrMapping/>
-  </p:clrMapOvr>
-  <p:timing>
-    <p:tnLst>
-      <p:par>
-        <p:cTn id="1" dur="indefinite" restart="never" nodeType="tmRoot"/>
-      </p:par>
-    </p:tnLst>
-  </p:timing>
-</p:sld>
-</file>
-
-<file path=ppt/slides/slide11.xml><?xml version="1.0" encoding="utf-8"?>
-<p:sld xmlns:a="http://schemas.openxmlformats.org/drawingml/2006/main" xmlns:r="http://schemas.openxmlformats.org/officeDocument/2006/relationships" xmlns:p="http://schemas.openxmlformats.org/presentationml/2006/main">
-  <p:cSld>
-    <p:spTree>
-      <p:nvGrpSpPr>
-        <p:cNvPr id="1" name=""/>
-        <p:cNvGrpSpPr/>
-        <p:nvPr/>
-      </p:nvGrpSpPr>
-      <p:grpSpPr>
-        <a:xfrm>
-          <a:off x="0" y="0"/>
-          <a:ext cx="0" cy="0"/>
-          <a:chOff x="0" y="0"/>
-          <a:chExt cx="0" cy="0"/>
-        </a:xfrm>
-      </p:grpSpPr>
-      <p:sp>
-        <p:nvSpPr>
-          <p:cNvPr id="2" name="Título 1"/>
-          <p:cNvSpPr>
-            <a:spLocks noGrp="1"/>
-          </p:cNvSpPr>
-          <p:nvPr>
-            <p:ph type="title"/>
-          </p:nvPr>
-        </p:nvSpPr>
         <p:spPr/>
         <p:txBody>
           <a:bodyPr/>
@@ -27211,7 +27317,7 @@
 </p:sld>
 </file>
 
-<file path=ppt/slides/slide12.xml><?xml version="1.0" encoding="utf-8"?>
+<file path=ppt/slides/slide11.xml><?xml version="1.0" encoding="utf-8"?>
 <p:sld xmlns:a="http://schemas.openxmlformats.org/drawingml/2006/main" xmlns:r="http://schemas.openxmlformats.org/officeDocument/2006/relationships" xmlns:p="http://schemas.openxmlformats.org/presentationml/2006/main">
   <p:cSld>
     <p:spTree>
@@ -27285,7 +27391,7 @@
 </p:sld>
 </file>
 
-<file path=ppt/slides/slide13.xml><?xml version="1.0" encoding="utf-8"?>
+<file path=ppt/slides/slide12.xml><?xml version="1.0" encoding="utf-8"?>
 <p:sld xmlns:a="http://schemas.openxmlformats.org/drawingml/2006/main" xmlns:r="http://schemas.openxmlformats.org/officeDocument/2006/relationships" xmlns:p="http://schemas.openxmlformats.org/presentationml/2006/main">
   <p:cSld>
     <p:spTree>
@@ -27557,7 +27663,7 @@
             <p:ph idx="1"/>
             <p:extLst>
               <p:ext uri="{D42A27DB-BD31-4B8C-83A1-F6EECF244321}">
-                <p14:modId xmlns:p14="http://schemas.microsoft.com/office/powerpoint/2010/main" xmlns="" val="736405372"/>
+                <p14:modId xmlns="" xmlns:p14="http://schemas.microsoft.com/office/powerpoint/2010/main" val="736405372"/>
               </p:ext>
             </p:extLst>
           </p:nvPr>
@@ -27710,7 +27816,7 @@
             <p:ph idx="1"/>
             <p:extLst>
               <p:ext uri="{D42A27DB-BD31-4B8C-83A1-F6EECF244321}">
-                <p14:modId xmlns:p14="http://schemas.microsoft.com/office/powerpoint/2010/main" xmlns="" val="2118870426"/>
+                <p14:modId xmlns="" xmlns:p14="http://schemas.microsoft.com/office/powerpoint/2010/main" val="2118870426"/>
               </p:ext>
             </p:extLst>
           </p:nvPr>
@@ -27772,39 +27878,72 @@
           <a:bodyPr/>
           <a:lstStyle/>
           <a:p>
+            <a:r>
+              <a:rPr lang="pt-BR" dirty="0" smtClean="0"/>
+              <a:t>Conceito funcional Da aplicação </a:t>
+            </a:r>
             <a:endParaRPr lang="pt-BR" dirty="0"/>
           </a:p>
         </p:txBody>
       </p:sp>
-      <p:pic>
-        <p:nvPicPr>
-          <p:cNvPr id="4" name="Espaço Reservado para Conteúdo 3" descr="H2fO1MKb-bando-de-dados-s-.png"/>
-          <p:cNvPicPr>
-            <a:picLocks noGrp="1" noChangeAspect="1"/>
-          </p:cNvPicPr>
+      <p:graphicFrame>
+        <p:nvGraphicFramePr>
+          <p:cNvPr id="4" name="Espaço Reservado para Conteúdo 3"/>
+          <p:cNvGraphicFramePr>
+            <a:graphicFrameLocks noGrp="1"/>
+          </p:cNvGraphicFramePr>
           <p:nvPr>
             <p:ph idx="1"/>
           </p:nvPr>
+        </p:nvGraphicFramePr>
+        <p:xfrm>
+          <a:off x="214282" y="3286124"/>
+          <a:ext cx="8686800" cy="3571876"/>
+        </p:xfrm>
+        <a:graphic>
+          <a:graphicData uri="http://schemas.openxmlformats.org/drawingml/2006/diagram">
+            <dgm:relIds xmlns:dgm="http://schemas.openxmlformats.org/drawingml/2006/diagram" xmlns:r="http://schemas.openxmlformats.org/officeDocument/2006/relationships" r:dm="rId2" r:lo="rId3" r:qs="rId4" r:cs="rId5"/>
+          </a:graphicData>
+        </a:graphic>
+      </p:graphicFrame>
+      <p:pic>
+        <p:nvPicPr>
+          <p:cNvPr id="5" name="Espaço Reservado para Conteúdo 5" descr="faq 4.png"/>
+          <p:cNvPicPr>
+            <a:picLocks noChangeAspect="1"/>
+          </p:cNvPicPr>
+          <p:nvPr/>
         </p:nvPicPr>
         <p:blipFill>
-          <a:blip r:embed="rId2"/>
+          <a:blip r:embed="rId6">
+            <a:clrChange>
+              <a:clrFrom>
+                <a:srgbClr val="FFFFFF"/>
+              </a:clrFrom>
+              <a:clrTo>
+                <a:srgbClr val="FFFFFF">
+                  <a:alpha val="0"/>
+                </a:srgbClr>
+              </a:clrTo>
+            </a:clrChange>
+          </a:blip>
+          <a:srcRect l="5738" t="22871" r="8197" b="31388"/>
           <a:stretch>
             <a:fillRect/>
           </a:stretch>
         </p:blipFill>
         <p:spPr>
           <a:xfrm>
-            <a:off x="357158" y="1571612"/>
-            <a:ext cx="8480789" cy="4929222"/>
+            <a:off x="214282" y="1500174"/>
+            <a:ext cx="8715436" cy="1857388"/>
           </a:xfrm>
-          <a:solidFill>
-            <a:schemeClr val="accent1"/>
-          </a:solidFill>
-          <a:effectLst>
-            <a:innerShdw blurRad="114300">
-              <a:prstClr val="black"/>
-            </a:innerShdw>
-          </a:effectLst>
+          <a:prstGeom prst="rect">
+            <a:avLst/>
+          </a:prstGeom>
+          <a:noFill/>
+          <a:ln>
+            <a:noFill/>
+          </a:ln>
         </p:spPr>
       </p:pic>
     </p:spTree>
@@ -27856,7 +27995,7 @@
           <a:p>
             <a:r>
               <a:rPr lang="pt-BR" dirty="0" smtClean="0"/>
-              <a:t>Conceito funcional Da aplicação </a:t>
+              <a:t>Integração</a:t>
             </a:r>
             <a:endParaRPr lang="pt-BR" dirty="0"/>
           </a:p>
@@ -27864,7 +28003,7 @@
       </p:sp>
       <p:graphicFrame>
         <p:nvGraphicFramePr>
-          <p:cNvPr id="4" name="Espaço Reservado para Conteúdo 3"/>
+          <p:cNvPr id="10" name="Espaço Reservado para Conteúdo 9"/>
           <p:cNvGraphicFramePr>
             <a:graphicFrameLocks noGrp="1"/>
           </p:cNvGraphicFramePr>
@@ -27873,8 +28012,8 @@
           </p:nvPr>
         </p:nvGraphicFramePr>
         <p:xfrm>
-          <a:off x="285720" y="2071678"/>
-          <a:ext cx="8686800" cy="4525962"/>
+          <a:off x="304800" y="1357298"/>
+          <a:ext cx="6696092" cy="5072098"/>
         </p:xfrm>
         <a:graphic>
           <a:graphicData uri="http://schemas.openxmlformats.org/drawingml/2006/diagram">
@@ -27882,6 +28021,159 @@
           </a:graphicData>
         </a:graphic>
       </p:graphicFrame>
+      <p:sp>
+        <p:nvSpPr>
+          <p:cNvPr id="6" name="Elipse 5"/>
+          <p:cNvSpPr/>
+          <p:nvPr/>
+        </p:nvSpPr>
+        <p:spPr>
+          <a:xfrm>
+            <a:off x="7072330" y="928670"/>
+            <a:ext cx="1857388" cy="1343028"/>
+          </a:xfrm>
+          <a:prstGeom prst="ellipse">
+            <a:avLst/>
+          </a:prstGeom>
+          <a:solidFill>
+            <a:schemeClr val="accent6">
+              <a:lumMod val="60000"/>
+              <a:lumOff val="40000"/>
+            </a:schemeClr>
+          </a:solidFill>
+        </p:spPr>
+        <p:style>
+          <a:lnRef idx="0">
+            <a:schemeClr val="accent6"/>
+          </a:lnRef>
+          <a:fillRef idx="3">
+            <a:schemeClr val="accent6"/>
+          </a:fillRef>
+          <a:effectRef idx="3">
+            <a:schemeClr val="accent6"/>
+          </a:effectRef>
+          <a:fontRef idx="minor">
+            <a:schemeClr val="lt1"/>
+          </a:fontRef>
+        </p:style>
+        <p:txBody>
+          <a:bodyPr rtlCol="0" anchor="ctr"/>
+          <a:lstStyle/>
+          <a:p>
+            <a:pPr algn="ctr"/>
+            <a:r>
+              <a:rPr lang="pt-BR" b="1" dirty="0" smtClean="0">
+                <a:solidFill>
+                  <a:schemeClr val="accent3">
+                    <a:lumMod val="20000"/>
+                    <a:lumOff val="80000"/>
+                  </a:schemeClr>
+                </a:solidFill>
+              </a:rPr>
+              <a:t>Outras</a:t>
+            </a:r>
+          </a:p>
+          <a:p>
+            <a:pPr algn="ctr"/>
+            <a:r>
+              <a:rPr lang="pt-BR" b="1" dirty="0" smtClean="0">
+                <a:solidFill>
+                  <a:schemeClr val="accent3">
+                    <a:lumMod val="20000"/>
+                    <a:lumOff val="80000"/>
+                  </a:schemeClr>
+                </a:solidFill>
+              </a:rPr>
+              <a:t>paróquias</a:t>
+            </a:r>
+            <a:endParaRPr lang="pt-BR" b="1" dirty="0">
+              <a:solidFill>
+                <a:schemeClr val="accent3">
+                  <a:lumMod val="20000"/>
+                  <a:lumOff val="80000"/>
+                </a:schemeClr>
+              </a:solidFill>
+            </a:endParaRPr>
+          </a:p>
+        </p:txBody>
+      </p:sp>
+      <p:cxnSp>
+        <p:nvCxnSpPr>
+          <p:cNvPr id="25" name="Conector de seta reta 24"/>
+          <p:cNvCxnSpPr/>
+          <p:nvPr/>
+        </p:nvCxnSpPr>
+        <p:spPr>
+          <a:xfrm flipV="1">
+            <a:off x="4500562" y="1928802"/>
+            <a:ext cx="2500330" cy="1428760"/>
+          </a:xfrm>
+          <a:prstGeom prst="straightConnector1">
+            <a:avLst/>
+          </a:prstGeom>
+          <a:ln>
+            <a:headEnd type="arrow"/>
+            <a:tailEnd type="arrow"/>
+          </a:ln>
+        </p:spPr>
+        <p:style>
+          <a:lnRef idx="2">
+            <a:schemeClr val="accent1"/>
+          </a:lnRef>
+          <a:fillRef idx="0">
+            <a:schemeClr val="accent1"/>
+          </a:fillRef>
+          <a:effectRef idx="1">
+            <a:schemeClr val="accent1"/>
+          </a:effectRef>
+          <a:fontRef idx="minor">
+            <a:schemeClr val="tx1"/>
+          </a:fontRef>
+        </p:style>
+      </p:cxnSp>
+      <p:sp>
+        <p:nvSpPr>
+          <p:cNvPr id="37" name="CaixaDeTexto 36"/>
+          <p:cNvSpPr txBox="1"/>
+          <p:nvPr/>
+        </p:nvSpPr>
+        <p:spPr>
+          <a:xfrm>
+            <a:off x="4786314" y="5929330"/>
+            <a:ext cx="4143404" cy="707886"/>
+          </a:xfrm>
+          <a:prstGeom prst="rect">
+            <a:avLst/>
+          </a:prstGeom>
+          <a:noFill/>
+        </p:spPr>
+        <p:txBody>
+          <a:bodyPr wrap="square" rtlCol="0">
+            <a:spAutoFit/>
+          </a:bodyPr>
+          <a:lstStyle/>
+          <a:p>
+            <a:pPr algn="just"/>
+            <a:r>
+              <a:rPr lang="pt-BR" sz="2000" b="1" dirty="0" smtClean="0">
+                <a:solidFill>
+                  <a:schemeClr val="accent1">
+                    <a:lumMod val="75000"/>
+                  </a:schemeClr>
+                </a:solidFill>
+              </a:rPr>
+              <a:t>A integração é ilimitada apenas deve-se avaliar sua viabilidade.</a:t>
+            </a:r>
+            <a:endParaRPr lang="pt-BR" sz="2000" b="1" dirty="0">
+              <a:solidFill>
+                <a:schemeClr val="accent1">
+                  <a:lumMod val="75000"/>
+                </a:schemeClr>
+              </a:solidFill>
+            </a:endParaRPr>
+          </a:p>
+        </p:txBody>
+      </p:sp>
     </p:spTree>
   </p:cSld>
   <p:clrMapOvr>
@@ -27924,14 +28216,19 @@
             <p:ph type="title"/>
           </p:nvPr>
         </p:nvSpPr>
-        <p:spPr/>
+        <p:spPr>
+          <a:xfrm>
+            <a:off x="457200" y="260648"/>
+            <a:ext cx="8686800" cy="838200"/>
+          </a:xfrm>
+        </p:spPr>
         <p:txBody>
           <a:bodyPr/>
           <a:lstStyle/>
           <a:p>
             <a:r>
               <a:rPr lang="pt-BR" dirty="0" smtClean="0"/>
-              <a:t>Integração</a:t>
+              <a:t>abrangência</a:t>
             </a:r>
             <a:endParaRPr lang="pt-BR" dirty="0"/>
           </a:p>
@@ -27939,17 +28236,22 @@
       </p:sp>
       <p:graphicFrame>
         <p:nvGraphicFramePr>
-          <p:cNvPr id="10" name="Espaço Reservado para Conteúdo 9"/>
+          <p:cNvPr id="4" name="Espaço Reservado para Conteúdo 3"/>
           <p:cNvGraphicFramePr>
             <a:graphicFrameLocks noGrp="1"/>
           </p:cNvGraphicFramePr>
           <p:nvPr>
             <p:ph idx="1"/>
+            <p:extLst>
+              <p:ext uri="{D42A27DB-BD31-4B8C-83A1-F6EECF244321}">
+                <p14:modId xmlns="" xmlns:p14="http://schemas.microsoft.com/office/powerpoint/2010/main" val="2208909862"/>
+              </p:ext>
+            </p:extLst>
           </p:nvPr>
         </p:nvGraphicFramePr>
         <p:xfrm>
-          <a:off x="304800" y="1554163"/>
-          <a:ext cx="8686800" cy="4525962"/>
+          <a:off x="304800" y="1268761"/>
+          <a:ext cx="8686800" cy="5400599"/>
         </p:xfrm>
         <a:graphic>
           <a:graphicData uri="http://schemas.openxmlformats.org/drawingml/2006/diagram">

</xml_diff>

<commit_message>
2014 07 26 10:07
#3 Ediação a app
</commit_message>
<xml_diff>
--- a/SAS/Planejamento/Docs/#3 - Apresentação do projeto.pptx
+++ b/SAS/Planejamento/Docs/#3 - Apresentação do projeto.pptx
@@ -4206,7 +4206,15 @@
             <a:rPr lang="pt-BR" sz="1600" dirty="0" err="1" smtClean="0"/>
             <a:t>TICs</a:t>
           </a:r>
-          <a:endParaRPr lang="pt-BR" sz="1600" dirty="0"/>
+          <a:r>
+            <a:rPr lang="pt-BR" sz="1600" dirty="0" smtClean="0"/>
+            <a:t> (</a:t>
+          </a:r>
+          <a:r>
+            <a:rPr lang="pt-BR" sz="800" dirty="0" smtClean="0"/>
+            <a:t>Tecnologias da Informação e Comunicação colaborativas)</a:t>
+          </a:r>
+          <a:endParaRPr lang="pt-BR" sz="800" dirty="0"/>
         </a:p>
       </dgm:t>
     </dgm:pt>
@@ -6867,15 +6875,7 @@
         <a:p>
           <a:r>
             <a:rPr lang="pt-BR" b="1" dirty="0" smtClean="0"/>
-            <a:t>Processa </a:t>
-          </a:r>
-          <a:r>
-            <a:rPr lang="pt-BR" b="1" dirty="0" smtClean="0"/>
-            <a:t> </a:t>
-          </a:r>
-          <a:r>
-            <a:rPr lang="pt-BR" b="1" dirty="0" smtClean="0"/>
-            <a:t>solicitações de usuário</a:t>
+            <a:t>Processa  solicitações de usuário</a:t>
           </a:r>
           <a:endParaRPr lang="pt-BR" b="1" dirty="0"/>
         </a:p>
@@ -8500,7 +8500,15 @@
             <a:rPr lang="pt-BR" sz="1600" kern="1200" dirty="0" err="1" smtClean="0"/>
             <a:t>TICs</a:t>
           </a:r>
-          <a:endParaRPr lang="pt-BR" sz="1600" kern="1200" dirty="0"/>
+          <a:r>
+            <a:rPr lang="pt-BR" sz="1600" kern="1200" dirty="0" smtClean="0"/>
+            <a:t> (</a:t>
+          </a:r>
+          <a:r>
+            <a:rPr lang="pt-BR" sz="800" kern="1200" dirty="0" smtClean="0"/>
+            <a:t>Tecnologias da Informação e Comunicação colaborativas)</a:t>
+          </a:r>
+          <a:endParaRPr lang="pt-BR" sz="800" kern="1200" dirty="0"/>
         </a:p>
       </dsp:txBody>
       <dsp:txXfrm rot="5400000">
@@ -10637,15 +10645,7 @@
           </a:pPr>
           <a:r>
             <a:rPr lang="pt-BR" sz="1800" b="1" kern="1200" dirty="0" smtClean="0"/>
-            <a:t>Processa </a:t>
-          </a:r>
-          <a:r>
-            <a:rPr lang="pt-BR" sz="1800" b="1" kern="1200" dirty="0" smtClean="0"/>
-            <a:t> </a:t>
-          </a:r>
-          <a:r>
-            <a:rPr lang="pt-BR" sz="1800" b="1" kern="1200" dirty="0" smtClean="0"/>
-            <a:t>solicitações de usuário</a:t>
+            <a:t>Processa  solicitações de usuário</a:t>
           </a:r>
           <a:endParaRPr lang="pt-BR" sz="1800" b="1" kern="1200" dirty="0"/>
         </a:p>
@@ -19392,7 +19392,7 @@
             <a:fld id="{229FDC3E-7424-49CF-AF38-AA35F4C77C8D}" type="datetimeFigureOut">
               <a:rPr lang="pt-BR" smtClean="0"/>
               <a:pPr/>
-              <a:t>25/07/2014</a:t>
+              <a:t>26/07/2014</a:t>
             </a:fld>
             <a:endParaRPr lang="pt-BR"/>
           </a:p>
@@ -19564,7 +19564,7 @@
             <a:fld id="{229FDC3E-7424-49CF-AF38-AA35F4C77C8D}" type="datetimeFigureOut">
               <a:rPr lang="pt-BR" smtClean="0"/>
               <a:pPr/>
-              <a:t>25/07/2014</a:t>
+              <a:t>26/07/2014</a:t>
             </a:fld>
             <a:endParaRPr lang="pt-BR"/>
           </a:p>
@@ -19741,7 +19741,7 @@
             <a:fld id="{229FDC3E-7424-49CF-AF38-AA35F4C77C8D}" type="datetimeFigureOut">
               <a:rPr lang="pt-BR" smtClean="0"/>
               <a:pPr/>
-              <a:t>25/07/2014</a:t>
+              <a:t>26/07/2014</a:t>
             </a:fld>
             <a:endParaRPr lang="pt-BR"/>
           </a:p>
@@ -19908,7 +19908,7 @@
             <a:fld id="{229FDC3E-7424-49CF-AF38-AA35F4C77C8D}" type="datetimeFigureOut">
               <a:rPr lang="pt-BR" smtClean="0"/>
               <a:pPr/>
-              <a:t>25/07/2014</a:t>
+              <a:t>26/07/2014</a:t>
             </a:fld>
             <a:endParaRPr lang="pt-BR"/>
           </a:p>
@@ -20144,7 +20144,7 @@
             <a:fld id="{229FDC3E-7424-49CF-AF38-AA35F4C77C8D}" type="datetimeFigureOut">
               <a:rPr lang="pt-BR" smtClean="0"/>
               <a:pPr/>
-              <a:t>25/07/2014</a:t>
+              <a:t>26/07/2014</a:t>
             </a:fld>
             <a:endParaRPr lang="pt-BR"/>
           </a:p>
@@ -20442,7 +20442,7 @@
             <a:fld id="{229FDC3E-7424-49CF-AF38-AA35F4C77C8D}" type="datetimeFigureOut">
               <a:rPr lang="pt-BR" smtClean="0"/>
               <a:pPr/>
-              <a:t>25/07/2014</a:t>
+              <a:t>26/07/2014</a:t>
             </a:fld>
             <a:endParaRPr lang="pt-BR"/>
           </a:p>
@@ -20828,7 +20828,7 @@
             <a:fld id="{229FDC3E-7424-49CF-AF38-AA35F4C77C8D}" type="datetimeFigureOut">
               <a:rPr lang="pt-BR" smtClean="0"/>
               <a:pPr/>
-              <a:t>25/07/2014</a:t>
+              <a:t>26/07/2014</a:t>
             </a:fld>
             <a:endParaRPr lang="pt-BR"/>
           </a:p>
@@ -21003,7 +21003,7 @@
             <a:fld id="{229FDC3E-7424-49CF-AF38-AA35F4C77C8D}" type="datetimeFigureOut">
               <a:rPr lang="pt-BR" smtClean="0"/>
               <a:pPr/>
-              <a:t>25/07/2014</a:t>
+              <a:t>26/07/2014</a:t>
             </a:fld>
             <a:endParaRPr lang="pt-BR"/>
           </a:p>
@@ -21095,7 +21095,7 @@
             <a:fld id="{229FDC3E-7424-49CF-AF38-AA35F4C77C8D}" type="datetimeFigureOut">
               <a:rPr lang="pt-BR" smtClean="0"/>
               <a:pPr/>
-              <a:t>25/07/2014</a:t>
+              <a:t>26/07/2014</a:t>
             </a:fld>
             <a:endParaRPr lang="pt-BR"/>
           </a:p>
@@ -21392,7 +21392,7 @@
             <a:fld id="{229FDC3E-7424-49CF-AF38-AA35F4C77C8D}" type="datetimeFigureOut">
               <a:rPr lang="pt-BR" smtClean="0"/>
               <a:pPr/>
-              <a:t>25/07/2014</a:t>
+              <a:t>26/07/2014</a:t>
             </a:fld>
             <a:endParaRPr lang="pt-BR"/>
           </a:p>
@@ -21528,7 +21528,7 @@
             <a:fld id="{229FDC3E-7424-49CF-AF38-AA35F4C77C8D}" type="datetimeFigureOut">
               <a:rPr lang="pt-BR" smtClean="0"/>
               <a:pPr/>
-              <a:t>25/07/2014</a:t>
+              <a:t>26/07/2014</a:t>
             </a:fld>
             <a:endParaRPr lang="pt-BR"/>
           </a:p>
@@ -21833,7 +21833,7 @@
             <a:fld id="{229FDC3E-7424-49CF-AF38-AA35F4C77C8D}" type="datetimeFigureOut">
               <a:rPr lang="pt-BR" smtClean="0"/>
               <a:pPr/>
-              <a:t>25/07/2014</a:t>
+              <a:t>26/07/2014</a:t>
             </a:fld>
             <a:endParaRPr lang="pt-BR"/>
           </a:p>
@@ -22502,27 +22502,544 @@
           <a:p>
             <a:r>
               <a:rPr lang="pt-BR" dirty="0" smtClean="0"/>
-              <a:t>Facilidade de manutenção</a:t>
+              <a:t>manutenção</a:t>
             </a:r>
             <a:endParaRPr lang="pt-BR" dirty="0"/>
           </a:p>
         </p:txBody>
       </p:sp>
+      <p:pic>
+        <p:nvPicPr>
+          <p:cNvPr id="7" name="Espaço Reservado para Conteúdo 5" descr="faq 4.png"/>
+          <p:cNvPicPr>
+            <a:picLocks noChangeAspect="1"/>
+          </p:cNvPicPr>
+          <p:nvPr/>
+        </p:nvPicPr>
+        <p:blipFill>
+          <a:blip r:embed="rId2" cstate="print">
+            <a:clrChange>
+              <a:clrFrom>
+                <a:srgbClr val="FFFFFF"/>
+              </a:clrFrom>
+              <a:clrTo>
+                <a:srgbClr val="FFFFFF">
+                  <a:alpha val="0"/>
+                </a:srgbClr>
+              </a:clrTo>
+            </a:clrChange>
+          </a:blip>
+          <a:srcRect l="5738" t="22871" r="44314" b="31388"/>
+          <a:stretch>
+            <a:fillRect/>
+          </a:stretch>
+        </p:blipFill>
+        <p:spPr>
+          <a:xfrm>
+            <a:off x="683568" y="1700808"/>
+            <a:ext cx="4680520" cy="3240360"/>
+          </a:xfrm>
+          <a:prstGeom prst="rect">
+            <a:avLst/>
+          </a:prstGeom>
+          <a:noFill/>
+          <a:ln>
+            <a:noFill/>
+          </a:ln>
+          <a:effectLst>
+            <a:softEdge rad="12700"/>
+          </a:effectLst>
+        </p:spPr>
+      </p:pic>
       <p:sp>
         <p:nvSpPr>
-          <p:cNvPr id="3" name="Espaço Reservado para Conteúdo 2"/>
-          <p:cNvSpPr>
-            <a:spLocks noGrp="1"/>
-          </p:cNvSpPr>
-          <p:nvPr>
-            <p:ph idx="1"/>
-          </p:nvPr>
+          <p:cNvPr id="10" name="Elipse 9"/>
+          <p:cNvSpPr/>
+          <p:nvPr/>
         </p:nvSpPr>
-        <p:spPr/>
+        <p:spPr>
+          <a:xfrm>
+            <a:off x="395536" y="1484784"/>
+            <a:ext cx="5688632" cy="4032448"/>
+          </a:xfrm>
+          <a:prstGeom prst="ellipse">
+            <a:avLst/>
+          </a:prstGeom>
+          <a:noFill/>
+          <a:ln w="76200">
+            <a:solidFill>
+              <a:srgbClr val="FF0000"/>
+            </a:solidFill>
+          </a:ln>
+        </p:spPr>
+        <p:style>
+          <a:lnRef idx="0">
+            <a:schemeClr val="accent6"/>
+          </a:lnRef>
+          <a:fillRef idx="3">
+            <a:schemeClr val="accent6"/>
+          </a:fillRef>
+          <a:effectRef idx="3">
+            <a:schemeClr val="accent6"/>
+          </a:effectRef>
+          <a:fontRef idx="minor">
+            <a:schemeClr val="lt1"/>
+          </a:fontRef>
+        </p:style>
         <p:txBody>
-          <a:bodyPr/>
+          <a:bodyPr rtlCol="0" anchor="ctr"/>
           <a:lstStyle/>
           <a:p>
+            <a:pPr algn="ctr"/>
+            <a:endParaRPr lang="pt-BR" b="1" dirty="0" smtClean="0">
+              <a:solidFill>
+                <a:schemeClr val="accent3">
+                  <a:lumMod val="20000"/>
+                  <a:lumOff val="80000"/>
+                </a:schemeClr>
+              </a:solidFill>
+            </a:endParaRPr>
+          </a:p>
+        </p:txBody>
+      </p:sp>
+      <p:sp>
+        <p:nvSpPr>
+          <p:cNvPr id="14" name="CaixaDeTexto 13"/>
+          <p:cNvSpPr txBox="1"/>
+          <p:nvPr/>
+        </p:nvSpPr>
+        <p:spPr>
+          <a:xfrm>
+            <a:off x="251520" y="2924944"/>
+            <a:ext cx="2775039" cy="1077218"/>
+          </a:xfrm>
+          <a:prstGeom prst="rect">
+            <a:avLst/>
+          </a:prstGeom>
+          <a:noFill/>
+          <a:ln>
+            <a:noFill/>
+          </a:ln>
+        </p:spPr>
+        <p:txBody>
+          <a:bodyPr wrap="square" rtlCol="0">
+            <a:spAutoFit/>
+          </a:bodyPr>
+          <a:lstStyle/>
+          <a:p>
+            <a:pPr algn="ctr"/>
+            <a:r>
+              <a:rPr lang="pt-BR" sz="3200" b="1" dirty="0" smtClean="0">
+                <a:ln w="18415" cmpd="sng">
+                  <a:solidFill>
+                    <a:srgbClr val="FFFFFF"/>
+                  </a:solidFill>
+                  <a:prstDash val="solid"/>
+                </a:ln>
+                <a:solidFill>
+                  <a:srgbClr val="FFFF00"/>
+                </a:solidFill>
+                <a:effectLst>
+                  <a:outerShdw blurRad="63500" dir="3600000" algn="tl" rotWithShape="0">
+                    <a:srgbClr val="000000">
+                      <a:alpha val="70000"/>
+                    </a:srgbClr>
+                  </a:outerShdw>
+                </a:effectLst>
+                <a:latin typeface="Comic Sans MS" pitchFamily="66" charset="0"/>
+                <a:cs typeface="Aharoni" pitchFamily="2" charset="-79"/>
+              </a:rPr>
+              <a:t>Base de dados </a:t>
+            </a:r>
+            <a:endParaRPr lang="pt-BR" sz="3200" b="1" dirty="0">
+              <a:ln w="18415" cmpd="sng">
+                <a:solidFill>
+                  <a:srgbClr val="FFFFFF"/>
+                </a:solidFill>
+                <a:prstDash val="solid"/>
+              </a:ln>
+              <a:solidFill>
+                <a:srgbClr val="FFFF00"/>
+              </a:solidFill>
+              <a:effectLst>
+                <a:outerShdw blurRad="63500" dir="3600000" algn="tl" rotWithShape="0">
+                  <a:srgbClr val="000000">
+                    <a:alpha val="70000"/>
+                  </a:srgbClr>
+                </a:outerShdw>
+              </a:effectLst>
+              <a:latin typeface="Comic Sans MS" pitchFamily="66" charset="0"/>
+              <a:cs typeface="Aharoni" pitchFamily="2" charset="-79"/>
+            </a:endParaRPr>
+          </a:p>
+        </p:txBody>
+      </p:sp>
+      <p:sp>
+        <p:nvSpPr>
+          <p:cNvPr id="15" name="CaixaDeTexto 14"/>
+          <p:cNvSpPr txBox="1"/>
+          <p:nvPr/>
+        </p:nvSpPr>
+        <p:spPr>
+          <a:xfrm>
+            <a:off x="3491880" y="3140968"/>
+            <a:ext cx="2016224" cy="584775"/>
+          </a:xfrm>
+          <a:prstGeom prst="rect">
+            <a:avLst/>
+          </a:prstGeom>
+          <a:noFill/>
+          <a:ln>
+            <a:noFill/>
+          </a:ln>
+        </p:spPr>
+        <p:txBody>
+          <a:bodyPr wrap="square" rtlCol="0">
+            <a:spAutoFit/>
+          </a:bodyPr>
+          <a:lstStyle/>
+          <a:p>
+            <a:pPr algn="ctr"/>
+            <a:r>
+              <a:rPr lang="pt-BR" sz="3200" b="1" dirty="0" smtClean="0">
+                <a:ln w="18415" cmpd="sng">
+                  <a:solidFill>
+                    <a:srgbClr val="FFFFFF"/>
+                  </a:solidFill>
+                  <a:prstDash val="solid"/>
+                </a:ln>
+                <a:solidFill>
+                  <a:srgbClr val="FFFF00"/>
+                </a:solidFill>
+                <a:effectLst>
+                  <a:outerShdw blurRad="63500" dir="3600000" algn="tl" rotWithShape="0">
+                    <a:srgbClr val="000000">
+                      <a:alpha val="70000"/>
+                    </a:srgbClr>
+                  </a:outerShdw>
+                </a:effectLst>
+                <a:latin typeface="Comic Sans MS" pitchFamily="66" charset="0"/>
+                <a:cs typeface="Aharoni" pitchFamily="2" charset="-79"/>
+              </a:rPr>
+              <a:t>Aplicação</a:t>
+            </a:r>
+            <a:endParaRPr lang="pt-BR" sz="3200" b="1" dirty="0">
+              <a:ln w="18415" cmpd="sng">
+                <a:solidFill>
+                  <a:srgbClr val="FFFFFF"/>
+                </a:solidFill>
+                <a:prstDash val="solid"/>
+              </a:ln>
+              <a:solidFill>
+                <a:srgbClr val="FFFF00"/>
+              </a:solidFill>
+              <a:effectLst>
+                <a:outerShdw blurRad="63500" dir="3600000" algn="tl" rotWithShape="0">
+                  <a:srgbClr val="000000">
+                    <a:alpha val="70000"/>
+                  </a:srgbClr>
+                </a:outerShdw>
+              </a:effectLst>
+              <a:latin typeface="Comic Sans MS" pitchFamily="66" charset="0"/>
+              <a:cs typeface="Aharoni" pitchFamily="2" charset="-79"/>
+            </a:endParaRPr>
+          </a:p>
+        </p:txBody>
+      </p:sp>
+      <p:pic>
+        <p:nvPicPr>
+          <p:cNvPr id="8" name="Espaço Reservado para Conteúdo 5" descr="faq 4.png"/>
+          <p:cNvPicPr>
+            <a:picLocks noChangeAspect="1"/>
+          </p:cNvPicPr>
+          <p:nvPr/>
+        </p:nvPicPr>
+        <p:blipFill>
+          <a:blip r:embed="rId2" cstate="print">
+            <a:clrChange>
+              <a:clrFrom>
+                <a:srgbClr val="FFFFFF"/>
+              </a:clrFrom>
+              <a:clrTo>
+                <a:srgbClr val="FFFFFF">
+                  <a:alpha val="0"/>
+                </a:srgbClr>
+              </a:clrTo>
+            </a:clrChange>
+          </a:blip>
+          <a:srcRect l="62732" t="26307" r="10130" b="34051"/>
+          <a:stretch>
+            <a:fillRect/>
+          </a:stretch>
+        </p:blipFill>
+        <p:spPr>
+          <a:xfrm>
+            <a:off x="7956376" y="2420888"/>
+            <a:ext cx="944763" cy="1052736"/>
+          </a:xfrm>
+          <a:prstGeom prst="rect">
+            <a:avLst/>
+          </a:prstGeom>
+          <a:noFill/>
+          <a:ln>
+            <a:noFill/>
+          </a:ln>
+          <a:effectLst>
+            <a:softEdge rad="12700"/>
+          </a:effectLst>
+        </p:spPr>
+      </p:pic>
+      <p:pic>
+        <p:nvPicPr>
+          <p:cNvPr id="9" name="Espaço Reservado para Conteúdo 5" descr="faq 4.png"/>
+          <p:cNvPicPr>
+            <a:picLocks noChangeAspect="1"/>
+          </p:cNvPicPr>
+          <p:nvPr/>
+        </p:nvPicPr>
+        <p:blipFill>
+          <a:blip r:embed="rId2" cstate="print">
+            <a:clrChange>
+              <a:clrFrom>
+                <a:srgbClr val="FFFFFF"/>
+              </a:clrFrom>
+              <a:clrTo>
+                <a:srgbClr val="FFFFFF">
+                  <a:alpha val="0"/>
+                </a:srgbClr>
+              </a:clrTo>
+            </a:clrChange>
+          </a:blip>
+          <a:srcRect l="62732" t="26307" r="10130" b="34051"/>
+          <a:stretch>
+            <a:fillRect/>
+          </a:stretch>
+        </p:blipFill>
+        <p:spPr>
+          <a:xfrm>
+            <a:off x="7092280" y="1268760"/>
+            <a:ext cx="944763" cy="1052736"/>
+          </a:xfrm>
+          <a:prstGeom prst="rect">
+            <a:avLst/>
+          </a:prstGeom>
+          <a:noFill/>
+          <a:ln>
+            <a:noFill/>
+          </a:ln>
+          <a:effectLst>
+            <a:softEdge rad="12700"/>
+          </a:effectLst>
+        </p:spPr>
+      </p:pic>
+      <p:pic>
+        <p:nvPicPr>
+          <p:cNvPr id="11" name="Espaço Reservado para Conteúdo 5" descr="faq 4.png"/>
+          <p:cNvPicPr>
+            <a:picLocks noChangeAspect="1"/>
+          </p:cNvPicPr>
+          <p:nvPr/>
+        </p:nvPicPr>
+        <p:blipFill>
+          <a:blip r:embed="rId2" cstate="print">
+            <a:clrChange>
+              <a:clrFrom>
+                <a:srgbClr val="FFFFFF"/>
+              </a:clrFrom>
+              <a:clrTo>
+                <a:srgbClr val="FFFFFF">
+                  <a:alpha val="0"/>
+                </a:srgbClr>
+              </a:clrTo>
+            </a:clrChange>
+          </a:blip>
+          <a:srcRect l="62732" t="26307" r="10130" b="34051"/>
+          <a:stretch>
+            <a:fillRect/>
+          </a:stretch>
+        </p:blipFill>
+        <p:spPr>
+          <a:xfrm>
+            <a:off x="7092280" y="4725144"/>
+            <a:ext cx="944763" cy="1052736"/>
+          </a:xfrm>
+          <a:prstGeom prst="rect">
+            <a:avLst/>
+          </a:prstGeom>
+          <a:noFill/>
+          <a:ln>
+            <a:noFill/>
+          </a:ln>
+          <a:effectLst>
+            <a:softEdge rad="12700"/>
+          </a:effectLst>
+        </p:spPr>
+      </p:pic>
+      <p:pic>
+        <p:nvPicPr>
+          <p:cNvPr id="12" name="Espaço Reservado para Conteúdo 5" descr="faq 4.png"/>
+          <p:cNvPicPr>
+            <a:picLocks noChangeAspect="1"/>
+          </p:cNvPicPr>
+          <p:nvPr/>
+        </p:nvPicPr>
+        <p:blipFill>
+          <a:blip r:embed="rId2" cstate="print">
+            <a:clrChange>
+              <a:clrFrom>
+                <a:srgbClr val="FFFFFF"/>
+              </a:clrFrom>
+              <a:clrTo>
+                <a:srgbClr val="FFFFFF">
+                  <a:alpha val="0"/>
+                </a:srgbClr>
+              </a:clrTo>
+            </a:clrChange>
+          </a:blip>
+          <a:srcRect l="62732" t="26307" r="10130" b="34051"/>
+          <a:stretch>
+            <a:fillRect/>
+          </a:stretch>
+        </p:blipFill>
+        <p:spPr>
+          <a:xfrm>
+            <a:off x="7956376" y="3717032"/>
+            <a:ext cx="944763" cy="1052736"/>
+          </a:xfrm>
+          <a:prstGeom prst="rect">
+            <a:avLst/>
+          </a:prstGeom>
+          <a:noFill/>
+          <a:ln>
+            <a:noFill/>
+          </a:ln>
+          <a:effectLst>
+            <a:softEdge rad="12700"/>
+          </a:effectLst>
+        </p:spPr>
+      </p:pic>
+      <p:sp>
+        <p:nvSpPr>
+          <p:cNvPr id="19" name="Arco 18"/>
+          <p:cNvSpPr/>
+          <p:nvPr/>
+        </p:nvSpPr>
+        <p:spPr>
+          <a:xfrm>
+            <a:off x="4914037" y="2420887"/>
+            <a:ext cx="1458162" cy="2232249"/>
+          </a:xfrm>
+          <a:prstGeom prst="arc">
+            <a:avLst>
+              <a:gd name="adj1" fmla="val 17521235"/>
+              <a:gd name="adj2" fmla="val 3943273"/>
+            </a:avLst>
+          </a:prstGeom>
+          <a:ln w="38100"/>
+        </p:spPr>
+        <p:style>
+          <a:lnRef idx="1">
+            <a:schemeClr val="accent1"/>
+          </a:lnRef>
+          <a:fillRef idx="0">
+            <a:schemeClr val="accent1"/>
+          </a:fillRef>
+          <a:effectRef idx="0">
+            <a:schemeClr val="accent1"/>
+          </a:effectRef>
+          <a:fontRef idx="minor">
+            <a:schemeClr val="tx1"/>
+          </a:fontRef>
+        </p:style>
+        <p:txBody>
+          <a:bodyPr rtlCol="0" anchor="ctr"/>
+          <a:lstStyle/>
+          <a:p>
+            <a:pPr algn="ctr"/>
+            <a:endParaRPr lang="pt-BR"/>
+          </a:p>
+        </p:txBody>
+      </p:sp>
+      <p:sp>
+        <p:nvSpPr>
+          <p:cNvPr id="21" name="Arco 20"/>
+          <p:cNvSpPr/>
+          <p:nvPr/>
+        </p:nvSpPr>
+        <p:spPr>
+          <a:xfrm>
+            <a:off x="4878033" y="2150857"/>
+            <a:ext cx="1782198" cy="2790311"/>
+          </a:xfrm>
+          <a:prstGeom prst="arc">
+            <a:avLst>
+              <a:gd name="adj1" fmla="val 17108996"/>
+              <a:gd name="adj2" fmla="val 4335599"/>
+            </a:avLst>
+          </a:prstGeom>
+          <a:ln w="38100"/>
+        </p:spPr>
+        <p:style>
+          <a:lnRef idx="1">
+            <a:schemeClr val="accent1"/>
+          </a:lnRef>
+          <a:fillRef idx="0">
+            <a:schemeClr val="accent1"/>
+          </a:fillRef>
+          <a:effectRef idx="0">
+            <a:schemeClr val="accent1"/>
+          </a:effectRef>
+          <a:fontRef idx="minor">
+            <a:schemeClr val="tx1"/>
+          </a:fontRef>
+        </p:style>
+        <p:txBody>
+          <a:bodyPr rtlCol="0" anchor="ctr"/>
+          <a:lstStyle/>
+          <a:p>
+            <a:pPr algn="ctr"/>
+            <a:endParaRPr lang="pt-BR"/>
+          </a:p>
+        </p:txBody>
+      </p:sp>
+      <p:sp>
+        <p:nvSpPr>
+          <p:cNvPr id="22" name="Arco 21"/>
+          <p:cNvSpPr/>
+          <p:nvPr/>
+        </p:nvSpPr>
+        <p:spPr>
+          <a:xfrm>
+            <a:off x="4788024" y="1880826"/>
+            <a:ext cx="2160240" cy="3348374"/>
+          </a:xfrm>
+          <a:prstGeom prst="arc">
+            <a:avLst>
+              <a:gd name="adj1" fmla="val 16782102"/>
+              <a:gd name="adj2" fmla="val 4855251"/>
+            </a:avLst>
+          </a:prstGeom>
+          <a:ln w="38100"/>
+        </p:spPr>
+        <p:style>
+          <a:lnRef idx="1">
+            <a:schemeClr val="accent1"/>
+          </a:lnRef>
+          <a:fillRef idx="0">
+            <a:schemeClr val="accent1"/>
+          </a:fillRef>
+          <a:effectRef idx="0">
+            <a:schemeClr val="accent1"/>
+          </a:effectRef>
+          <a:fontRef idx="minor">
+            <a:schemeClr val="tx1"/>
+          </a:fontRef>
+        </p:style>
+        <p:txBody>
+          <a:bodyPr rtlCol="0" anchor="ctr"/>
+          <a:lstStyle/>
+          <a:p>
+            <a:pPr algn="ctr"/>
             <a:endParaRPr lang="pt-BR"/>
           </a:p>
         </p:txBody>
@@ -22814,7 +23331,7 @@
             <p:ph idx="1"/>
             <p:extLst>
               <p:ext uri="{D42A27DB-BD31-4B8C-83A1-F6EECF244321}">
-                <p14:modId xmlns:p14="http://schemas.microsoft.com/office/powerpoint/2010/main" xmlns="" val="736405372"/>
+                <p14:modId xmlns="" xmlns:p14="http://schemas.microsoft.com/office/powerpoint/2010/main" val="736405372"/>
               </p:ext>
             </p:extLst>
           </p:nvPr>
@@ -22967,7 +23484,7 @@
             <p:ph idx="1"/>
             <p:extLst>
               <p:ext uri="{D42A27DB-BD31-4B8C-83A1-F6EECF244321}">
-                <p14:modId xmlns:p14="http://schemas.microsoft.com/office/powerpoint/2010/main" xmlns="" val="2118870426"/>
+                <p14:modId xmlns="" xmlns:p14="http://schemas.microsoft.com/office/powerpoint/2010/main" val="2118870426"/>
               </p:ext>
             </p:extLst>
           </p:nvPr>
@@ -23369,29 +23886,94 @@
           <a:lstStyle/>
           <a:p>
             <a:r>
-              <a:rPr lang="pt-BR" dirty="0" smtClean="0"/>
-              <a:t>Mobilidade</a:t>
+              <a:rPr lang="pt-BR" dirty="0" err="1" smtClean="0"/>
+              <a:t>asessibildade</a:t>
             </a:r>
             <a:endParaRPr lang="pt-BR" dirty="0"/>
           </a:p>
         </p:txBody>
       </p:sp>
+      <p:pic>
+        <p:nvPicPr>
+          <p:cNvPr id="4" name="Espaço Reservado para Conteúdo 7" descr="Tried-Cloud-Computing.jpg"/>
+          <p:cNvPicPr>
+            <a:picLocks noChangeAspect="1"/>
+          </p:cNvPicPr>
+          <p:nvPr/>
+        </p:nvPicPr>
+        <p:blipFill>
+          <a:blip r:embed="rId2" cstate="print"/>
+          <a:stretch>
+            <a:fillRect/>
+          </a:stretch>
+        </p:blipFill>
+        <p:spPr>
+          <a:xfrm>
+            <a:off x="467544" y="1340768"/>
+            <a:ext cx="8352928" cy="4680520"/>
+          </a:xfrm>
+          <a:prstGeom prst="ellipse">
+            <a:avLst/>
+          </a:prstGeom>
+          <a:ln>
+            <a:noFill/>
+          </a:ln>
+        </p:spPr>
+        <p:style>
+          <a:lnRef idx="2">
+            <a:schemeClr val="dk1"/>
+          </a:lnRef>
+          <a:fillRef idx="1">
+            <a:schemeClr val="lt1"/>
+          </a:fillRef>
+          <a:effectRef idx="0">
+            <a:schemeClr val="dk1"/>
+          </a:effectRef>
+          <a:fontRef idx="minor">
+            <a:schemeClr val="dk1"/>
+          </a:fontRef>
+        </p:style>
+      </p:pic>
       <p:sp>
         <p:nvSpPr>
-          <p:cNvPr id="3" name="Espaço Reservado para Conteúdo 2"/>
-          <p:cNvSpPr>
-            <a:spLocks noGrp="1"/>
-          </p:cNvSpPr>
-          <p:nvPr>
-            <p:ph idx="1"/>
-          </p:nvPr>
+          <p:cNvPr id="9" name="CaixaDeTexto 8"/>
+          <p:cNvSpPr txBox="1"/>
+          <p:nvPr/>
         </p:nvSpPr>
-        <p:spPr/>
+        <p:spPr>
+          <a:xfrm>
+            <a:off x="251520" y="6237312"/>
+            <a:ext cx="8678198" cy="400110"/>
+          </a:xfrm>
+          <a:prstGeom prst="rect">
+            <a:avLst/>
+          </a:prstGeom>
+          <a:noFill/>
+        </p:spPr>
         <p:txBody>
-          <a:bodyPr/>
+          <a:bodyPr wrap="square" rtlCol="0">
+            <a:spAutoFit/>
+          </a:bodyPr>
           <a:lstStyle/>
           <a:p>
-            <a:endParaRPr lang="pt-BR"/>
+            <a:pPr algn="ctr"/>
+            <a:r>
+              <a:rPr lang="pt-BR" sz="2000" b="1" dirty="0" smtClean="0">
+                <a:solidFill>
+                  <a:schemeClr val="accent1">
+                    <a:lumMod val="75000"/>
+                  </a:schemeClr>
+                </a:solidFill>
+              </a:rPr>
+              <a:t>A Mobilidade  é muito importante para a vida útil do software</a:t>
+            </a:r>
+            <a:endParaRPr lang="pt-BR" sz="2000" b="1" dirty="0">
+              <a:solidFill>
+                <a:schemeClr val="accent1">
+                  <a:lumMod val="75000"/>
+                </a:schemeClr>
+              </a:solidFill>
+            </a:endParaRPr>
           </a:p>
         </p:txBody>
       </p:sp>

</xml_diff>